<commit_message>
started on my tdd in report
</commit_message>
<xml_diff>
--- a/slutredovisning.pptx
+++ b/slutredovisning.pptx
@@ -225,7 +225,7 @@
           <a:p>
             <a:fld id="{78657D70-8167-4127-866D-BAA56A2DFFEF}" type="datetimeFigureOut">
               <a:rPr lang="sv-SE" smtClean="0"/>
-              <a:t>2016-10-12</a:t>
+              <a:t>2019-10-29</a:t>
             </a:fld>
             <a:endParaRPr lang="sv-SE"/>
           </a:p>
@@ -2908,41 +2908,8 @@
                 <a:ea typeface="+mn-ea"/>
                 <a:cs typeface="+mn-cs"/>
               </a:rPr>
-              <a:t> </a:t>
-            </a:r>
-            <a:r>
-              <a:rPr lang="sv-SE" sz="1200" kern="1200" dirty="0" smtClean="0">
-                <a:solidFill>
-                  <a:schemeClr val="tx1"/>
-                </a:solidFill>
-                <a:effectLst/>
-                <a:latin typeface="+mn-lt"/>
-                <a:ea typeface="+mn-ea"/>
-                <a:cs typeface="+mn-cs"/>
-              </a:rPr>
-              <a:t>projektet. Om ni har använt versionshanteringssystemet ordentligt bör all information som efterfrågas här finnas i det. Tänk på att kodexemplen ska vara </a:t>
-            </a:r>
-            <a:r>
-              <a:rPr lang="sv-SE" sz="1200" kern="1200" dirty="0" smtClean="0">
-                <a:solidFill>
-                  <a:schemeClr val="tx1"/>
-                </a:solidFill>
-                <a:effectLst/>
-                <a:latin typeface="+mn-lt"/>
-                <a:ea typeface="+mn-ea"/>
-                <a:cs typeface="+mn-cs"/>
-              </a:rPr>
-              <a:t>läsbara. </a:t>
-            </a:r>
-            <a:endParaRPr lang="sv-SE" sz="1200" kern="1200" dirty="0" smtClean="0">
-              <a:solidFill>
-                <a:schemeClr val="tx1"/>
-              </a:solidFill>
-              <a:effectLst/>
-              <a:latin typeface="+mn-lt"/>
-              <a:ea typeface="+mn-ea"/>
-              <a:cs typeface="+mn-cs"/>
-            </a:endParaRPr>
+              <a:t> projektet. Om ni har använt versionshanteringssystemet ordentligt bör all information som efterfrågas här finnas i det. Tänk på att kodexemplen ska vara läsbara. </a:t>
+            </a:r>
           </a:p>
           <a:p>
             <a:endParaRPr lang="sv-SE" dirty="0"/>
@@ -3685,7 +3652,7 @@
           <a:p>
             <a:fld id="{B4C653A3-D7FF-4AF7-943B-34A467C3139E}" type="datetimeFigureOut">
               <a:rPr lang="sv-SE" smtClean="0"/>
-              <a:t>2016-10-12</a:t>
+              <a:t>2019-10-29</a:t>
             </a:fld>
             <a:endParaRPr lang="sv-SE"/>
           </a:p>
@@ -3855,7 +3822,7 @@
           <a:p>
             <a:fld id="{B4C653A3-D7FF-4AF7-943B-34A467C3139E}" type="datetimeFigureOut">
               <a:rPr lang="sv-SE" smtClean="0"/>
-              <a:t>2016-10-12</a:t>
+              <a:t>2019-10-29</a:t>
             </a:fld>
             <a:endParaRPr lang="sv-SE"/>
           </a:p>
@@ -4035,7 +4002,7 @@
           <a:p>
             <a:fld id="{B4C653A3-D7FF-4AF7-943B-34A467C3139E}" type="datetimeFigureOut">
               <a:rPr lang="sv-SE" smtClean="0"/>
-              <a:t>2016-10-12</a:t>
+              <a:t>2019-10-29</a:t>
             </a:fld>
             <a:endParaRPr lang="sv-SE"/>
           </a:p>
@@ -4205,7 +4172,7 @@
           <a:p>
             <a:fld id="{B4C653A3-D7FF-4AF7-943B-34A467C3139E}" type="datetimeFigureOut">
               <a:rPr lang="sv-SE" smtClean="0"/>
-              <a:t>2016-10-12</a:t>
+              <a:t>2019-10-29</a:t>
             </a:fld>
             <a:endParaRPr lang="sv-SE"/>
           </a:p>
@@ -4451,7 +4418,7 @@
           <a:p>
             <a:fld id="{B4C653A3-D7FF-4AF7-943B-34A467C3139E}" type="datetimeFigureOut">
               <a:rPr lang="sv-SE" smtClean="0"/>
-              <a:t>2016-10-12</a:t>
+              <a:t>2019-10-29</a:t>
             </a:fld>
             <a:endParaRPr lang="sv-SE"/>
           </a:p>
@@ -4683,7 +4650,7 @@
           <a:p>
             <a:fld id="{B4C653A3-D7FF-4AF7-943B-34A467C3139E}" type="datetimeFigureOut">
               <a:rPr lang="sv-SE" smtClean="0"/>
-              <a:t>2016-10-12</a:t>
+              <a:t>2019-10-29</a:t>
             </a:fld>
             <a:endParaRPr lang="sv-SE"/>
           </a:p>
@@ -5050,7 +5017,7 @@
           <a:p>
             <a:fld id="{B4C653A3-D7FF-4AF7-943B-34A467C3139E}" type="datetimeFigureOut">
               <a:rPr lang="sv-SE" smtClean="0"/>
-              <a:t>2016-10-12</a:t>
+              <a:t>2019-10-29</a:t>
             </a:fld>
             <a:endParaRPr lang="sv-SE"/>
           </a:p>
@@ -5168,7 +5135,7 @@
           <a:p>
             <a:fld id="{B4C653A3-D7FF-4AF7-943B-34A467C3139E}" type="datetimeFigureOut">
               <a:rPr lang="sv-SE" smtClean="0"/>
-              <a:t>2016-10-12</a:t>
+              <a:t>2019-10-29</a:t>
             </a:fld>
             <a:endParaRPr lang="sv-SE"/>
           </a:p>
@@ -5263,7 +5230,7 @@
           <a:p>
             <a:fld id="{B4C653A3-D7FF-4AF7-943B-34A467C3139E}" type="datetimeFigureOut">
               <a:rPr lang="sv-SE" smtClean="0"/>
-              <a:t>2016-10-12</a:t>
+              <a:t>2019-10-29</a:t>
             </a:fld>
             <a:endParaRPr lang="sv-SE"/>
           </a:p>
@@ -5540,7 +5507,7 @@
           <a:p>
             <a:fld id="{B4C653A3-D7FF-4AF7-943B-34A467C3139E}" type="datetimeFigureOut">
               <a:rPr lang="sv-SE" smtClean="0"/>
-              <a:t>2016-10-12</a:t>
+              <a:t>2019-10-29</a:t>
             </a:fld>
             <a:endParaRPr lang="sv-SE"/>
           </a:p>
@@ -5793,7 +5760,7 @@
           <a:p>
             <a:fld id="{B4C653A3-D7FF-4AF7-943B-34A467C3139E}" type="datetimeFigureOut">
               <a:rPr lang="sv-SE" smtClean="0"/>
-              <a:t>2016-10-12</a:t>
+              <a:t>2019-10-29</a:t>
             </a:fld>
             <a:endParaRPr lang="sv-SE"/>
           </a:p>
@@ -6006,7 +5973,7 @@
           <a:p>
             <a:fld id="{B4C653A3-D7FF-4AF7-943B-34A467C3139E}" type="datetimeFigureOut">
               <a:rPr lang="sv-SE" smtClean="0"/>
-              <a:t>2016-10-12</a:t>
+              <a:t>2019-10-29</a:t>
             </a:fld>
             <a:endParaRPr lang="sv-SE"/>
           </a:p>
@@ -6428,11 +6395,11 @@
           <a:p>
             <a:r>
               <a:rPr lang="sv-SE" dirty="0" smtClean="0"/>
-              <a:t>Grupp nr</a:t>
-            </a:r>
-            <a:r>
-              <a:rPr lang="sv-SE" smtClean="0"/>
-              <a:t>: NR</a:t>
+              <a:t>Grupp nr: </a:t>
+            </a:r>
+            <a:r>
+              <a:rPr lang="sv-SE" dirty="0" smtClean="0"/>
+              <a:t>11</a:t>
             </a:r>
             <a:endParaRPr lang="sv-SE" dirty="0"/>
           </a:p>
@@ -6455,7 +6422,17 @@
           <a:p>
             <a:r>
               <a:rPr lang="sv-SE" dirty="0" smtClean="0"/>
-              <a:t>Namn och e-post till samtliga gruppmedlemmar</a:t>
+              <a:t>Linnéa Palmgren, lipa7972@student.su.se</a:t>
+            </a:r>
+          </a:p>
+          <a:p>
+            <a:r>
+              <a:rPr lang="sv-SE" dirty="0" smtClean="0"/>
+              <a:t>Namn </a:t>
+            </a:r>
+            <a:r>
+              <a:rPr lang="sv-SE" dirty="0" smtClean="0"/>
+              <a:t>och e-post till samtliga gruppmedlemmar</a:t>
             </a:r>
             <a:endParaRPr lang="sv-SE" dirty="0"/>
           </a:p>
@@ -7339,7 +7316,32 @@
           <a:p>
             <a:r>
               <a:rPr lang="sv-SE" dirty="0" smtClean="0"/>
-              <a:t>Vilka verktyg använde ni? </a:t>
+              <a:t>Vilka verktyg använde ni</a:t>
+            </a:r>
+            <a:r>
+              <a:rPr lang="sv-SE" dirty="0" smtClean="0"/>
+              <a:t>?</a:t>
+            </a:r>
+          </a:p>
+          <a:p>
+            <a:r>
+              <a:rPr lang="sv-SE" dirty="0" err="1" smtClean="0"/>
+              <a:t>JUnit</a:t>
+            </a:r>
+            <a:endParaRPr lang="sv-SE" dirty="0" smtClean="0"/>
+          </a:p>
+          <a:p>
+            <a:r>
+              <a:rPr lang="sv-SE" dirty="0" err="1" smtClean="0"/>
+              <a:t>Ant</a:t>
+            </a:r>
+            <a:r>
+              <a:rPr lang="sv-SE" dirty="0" smtClean="0"/>
+              <a:t> </a:t>
+            </a:r>
+            <a:r>
+              <a:rPr lang="sv-SE" dirty="0" smtClean="0"/>
+              <a:t> </a:t>
             </a:r>
             <a:endParaRPr lang="sv-SE" dirty="0"/>
           </a:p>

</xml_diff>

<commit_message>
trying to push changes made in pptx
</commit_message>
<xml_diff>
--- a/slutredovisning.pptx
+++ b/slutredovisning.pptx
@@ -6395,11 +6395,7 @@
           <a:p>
             <a:r>
               <a:rPr lang="sv-SE" dirty="0" smtClean="0"/>
-              <a:t>Grupp nr: </a:t>
-            </a:r>
-            <a:r>
-              <a:rPr lang="sv-SE" dirty="0" smtClean="0"/>
-              <a:t>11</a:t>
+              <a:t>Grupp nr: 11</a:t>
             </a:r>
             <a:endParaRPr lang="sv-SE" dirty="0"/>
           </a:p>
@@ -6428,11 +6424,7 @@
           <a:p>
             <a:r>
               <a:rPr lang="sv-SE" dirty="0" smtClean="0"/>
-              <a:t>Namn </a:t>
-            </a:r>
-            <a:r>
-              <a:rPr lang="sv-SE" dirty="0" smtClean="0"/>
-              <a:t>och e-post till samtliga gruppmedlemmar</a:t>
+              <a:t>Namn och e-post till samtliga gruppmedlemmar</a:t>
             </a:r>
             <a:endParaRPr lang="sv-SE" dirty="0"/>
           </a:p>
@@ -7316,11 +7308,7 @@
           <a:p>
             <a:r>
               <a:rPr lang="sv-SE" dirty="0" smtClean="0"/>
-              <a:t>Vilka verktyg använde ni</a:t>
-            </a:r>
-            <a:r>
-              <a:rPr lang="sv-SE" dirty="0" smtClean="0"/>
-              <a:t>?</a:t>
+              <a:t>Vilka verktyg använde ni?</a:t>
             </a:r>
           </a:p>
           <a:p>
@@ -7337,11 +7325,7 @@
             </a:r>
             <a:r>
               <a:rPr lang="sv-SE" dirty="0" smtClean="0"/>
-              <a:t> </a:t>
-            </a:r>
-            <a:r>
-              <a:rPr lang="sv-SE" dirty="0" smtClean="0"/>
-              <a:t> </a:t>
+              <a:t>  </a:t>
             </a:r>
             <a:endParaRPr lang="sv-SE" dirty="0"/>
           </a:p>

</xml_diff>

<commit_message>
i m an idiot, i think i fixed it
</commit_message>
<xml_diff>
--- a/slutredovisning.pptx
+++ b/slutredovisning.pptx
@@ -5,40 +5,41 @@
     <p:sldMasterId id="2147483648" r:id="rId1"/>
   </p:sldMasterIdLst>
   <p:notesMasterIdLst>
-    <p:notesMasterId r:id="rId28"/>
+    <p:notesMasterId r:id="rId29"/>
   </p:notesMasterIdLst>
   <p:sldIdLst>
     <p:sldId id="256" r:id="rId2"/>
     <p:sldId id="257" r:id="rId3"/>
     <p:sldId id="258" r:id="rId4"/>
     <p:sldId id="259" r:id="rId5"/>
-    <p:sldId id="260" r:id="rId6"/>
-    <p:sldId id="261" r:id="rId7"/>
-    <p:sldId id="262" r:id="rId8"/>
-    <p:sldId id="263" r:id="rId9"/>
-    <p:sldId id="264" r:id="rId10"/>
-    <p:sldId id="265" r:id="rId11"/>
-    <p:sldId id="266" r:id="rId12"/>
-    <p:sldId id="267" r:id="rId13"/>
-    <p:sldId id="268" r:id="rId14"/>
-    <p:sldId id="269" r:id="rId15"/>
-    <p:sldId id="270" r:id="rId16"/>
-    <p:sldId id="272" r:id="rId17"/>
-    <p:sldId id="271" r:id="rId18"/>
-    <p:sldId id="273" r:id="rId19"/>
-    <p:sldId id="274" r:id="rId20"/>
-    <p:sldId id="275" r:id="rId21"/>
-    <p:sldId id="276" r:id="rId22"/>
-    <p:sldId id="277" r:id="rId23"/>
-    <p:sldId id="278" r:id="rId24"/>
-    <p:sldId id="279" r:id="rId25"/>
-    <p:sldId id="280" r:id="rId26"/>
-    <p:sldId id="281" r:id="rId27"/>
+    <p:sldId id="282" r:id="rId6"/>
+    <p:sldId id="260" r:id="rId7"/>
+    <p:sldId id="261" r:id="rId8"/>
+    <p:sldId id="262" r:id="rId9"/>
+    <p:sldId id="263" r:id="rId10"/>
+    <p:sldId id="264" r:id="rId11"/>
+    <p:sldId id="265" r:id="rId12"/>
+    <p:sldId id="266" r:id="rId13"/>
+    <p:sldId id="267" r:id="rId14"/>
+    <p:sldId id="268" r:id="rId15"/>
+    <p:sldId id="269" r:id="rId16"/>
+    <p:sldId id="270" r:id="rId17"/>
+    <p:sldId id="272" r:id="rId18"/>
+    <p:sldId id="271" r:id="rId19"/>
+    <p:sldId id="273" r:id="rId20"/>
+    <p:sldId id="274" r:id="rId21"/>
+    <p:sldId id="275" r:id="rId22"/>
+    <p:sldId id="276" r:id="rId23"/>
+    <p:sldId id="277" r:id="rId24"/>
+    <p:sldId id="278" r:id="rId25"/>
+    <p:sldId id="279" r:id="rId26"/>
+    <p:sldId id="280" r:id="rId27"/>
+    <p:sldId id="281" r:id="rId28"/>
   </p:sldIdLst>
   <p:sldSz cx="12192000" cy="6858000"/>
   <p:notesSz cx="6858000" cy="9144000"/>
   <p:custDataLst>
-    <p:tags r:id="rId29"/>
+    <p:tags r:id="rId30"/>
   </p:custDataLst>
   <p:defaultTextStyle>
     <a:defPPr>
@@ -648,7 +649,7 @@
                 <a:ea typeface="+mn-ea"/>
                 <a:cs typeface="+mn-cs"/>
               </a:rPr>
-              <a:t>En kort textuell presentation av vad ni valt ut för att tillämpa tillståndsmaskiner på och vilket eller vilka kriterier ni använder för att ta fram testfall från maskinen. Ni ska kort motivera valet, och ge tillräckligt med information för att det ska gå att bedöma er. Detta avsnitt och de följande ska finnas för samtliga delar ni tillämpat tillståndsmaskiner på. Om ni inte tillämpat tillståndsmaskiner tar ni bort dessa bilder.</a:t>
+              <a:t>En testmatris som visar sambandet mellan ekvivalensklasserna och testfallen för denna del.</a:t>
             </a:r>
           </a:p>
           <a:p>
@@ -682,7 +683,7 @@
     </p:spTree>
     <p:extLst>
       <p:ext uri="{BB962C8B-B14F-4D97-AF65-F5344CB8AC3E}">
-        <p14:creationId xmlns:p14="http://schemas.microsoft.com/office/powerpoint/2010/main" val="2041626993"/>
+        <p14:creationId xmlns:p14="http://schemas.microsoft.com/office/powerpoint/2010/main" val="3837171916"/>
       </p:ext>
     </p:extLst>
   </p:cSld>
@@ -736,10 +737,37 @@
           <a:bodyPr/>
           <a:lstStyle/>
           <a:p>
-            <a:r>
-              <a:rPr lang="sv-SE" dirty="0" smtClean="0"/>
-              <a:t>Själva tillståndsmaskinen</a:t>
-            </a:r>
+            <a:pPr marL="0" marR="0" lvl="0" indent="0" algn="l" defTabSz="914400" rtl="0" eaLnBrk="1" fontAlgn="auto" latinLnBrk="0" hangingPunct="1">
+              <a:lnSpc>
+                <a:spcPct val="100000"/>
+              </a:lnSpc>
+              <a:spcBef>
+                <a:spcPts val="0"/>
+              </a:spcBef>
+              <a:spcAft>
+                <a:spcPts val="0"/>
+              </a:spcAft>
+              <a:buClrTx/>
+              <a:buSzTx/>
+              <a:buFontTx/>
+              <a:buNone/>
+              <a:tabLst/>
+              <a:defRPr/>
+            </a:pPr>
+            <a:r>
+              <a:rPr lang="sv-SE" sz="1200" kern="1200" dirty="0" smtClean="0">
+                <a:solidFill>
+                  <a:schemeClr val="tx1"/>
+                </a:solidFill>
+                <a:effectLst/>
+                <a:latin typeface="+mn-lt"/>
+                <a:ea typeface="+mn-ea"/>
+                <a:cs typeface="+mn-cs"/>
+              </a:rPr>
+              <a:t>En kort textuell presentation av vad ni valt ut för att tillämpa tillståndsmaskiner på och vilket eller vilka kriterier ni använder för att ta fram testfall från maskinen. Ni ska kort motivera valet, och ge tillräckligt med information för att det ska gå att bedöma er. Detta avsnitt och de följande ska finnas för samtliga delar ni tillämpat tillståndsmaskiner på. Om ni inte tillämpat tillståndsmaskiner tar ni bort dessa bilder.</a:t>
+            </a:r>
+          </a:p>
+          <a:p>
             <a:endParaRPr lang="sv-SE" dirty="0"/>
           </a:p>
         </p:txBody>
@@ -770,7 +798,7 @@
     </p:spTree>
     <p:extLst>
       <p:ext uri="{BB962C8B-B14F-4D97-AF65-F5344CB8AC3E}">
-        <p14:creationId xmlns:p14="http://schemas.microsoft.com/office/powerpoint/2010/main" val="1235134485"/>
+        <p14:creationId xmlns:p14="http://schemas.microsoft.com/office/powerpoint/2010/main" val="2041626993"/>
       </p:ext>
     </p:extLst>
   </p:cSld>
@@ -824,6 +852,94 @@
           <a:bodyPr/>
           <a:lstStyle/>
           <a:p>
+            <a:r>
+              <a:rPr lang="sv-SE" dirty="0" smtClean="0"/>
+              <a:t>Själva tillståndsmaskinen</a:t>
+            </a:r>
+            <a:endParaRPr lang="sv-SE" dirty="0"/>
+          </a:p>
+        </p:txBody>
+      </p:sp>
+      <p:sp>
+        <p:nvSpPr>
+          <p:cNvPr id="4" name="Platshållare för bildnummer 3"/>
+          <p:cNvSpPr>
+            <a:spLocks noGrp="1"/>
+          </p:cNvSpPr>
+          <p:nvPr>
+            <p:ph type="sldNum" sz="quarter" idx="10"/>
+          </p:nvPr>
+        </p:nvSpPr>
+        <p:spPr/>
+        <p:txBody>
+          <a:bodyPr/>
+          <a:lstStyle/>
+          <a:p>
+            <a:fld id="{8667F948-D2CB-486C-A2EA-FEABC2DAAE8D}" type="slidenum">
+              <a:rPr lang="sv-SE" smtClean="0"/>
+              <a:t>12</a:t>
+            </a:fld>
+            <a:endParaRPr lang="sv-SE"/>
+          </a:p>
+        </p:txBody>
+      </p:sp>
+    </p:spTree>
+    <p:extLst>
+      <p:ext uri="{BB962C8B-B14F-4D97-AF65-F5344CB8AC3E}">
+        <p14:creationId xmlns:p14="http://schemas.microsoft.com/office/powerpoint/2010/main" val="1235134485"/>
+      </p:ext>
+    </p:extLst>
+  </p:cSld>
+  <p:clrMapOvr>
+    <a:masterClrMapping/>
+  </p:clrMapOvr>
+</p:notes>
+</file>
+
+<file path=ppt/notesSlides/notesSlide13.xml><?xml version="1.0" encoding="utf-8"?>
+<p:notes xmlns:a="http://schemas.openxmlformats.org/drawingml/2006/main" xmlns:r="http://schemas.openxmlformats.org/officeDocument/2006/relationships" xmlns:p="http://schemas.openxmlformats.org/presentationml/2006/main">
+  <p:cSld>
+    <p:spTree>
+      <p:nvGrpSpPr>
+        <p:cNvPr id="1" name=""/>
+        <p:cNvGrpSpPr/>
+        <p:nvPr/>
+      </p:nvGrpSpPr>
+      <p:grpSpPr>
+        <a:xfrm>
+          <a:off x="0" y="0"/>
+          <a:ext cx="0" cy="0"/>
+          <a:chOff x="0" y="0"/>
+          <a:chExt cx="0" cy="0"/>
+        </a:xfrm>
+      </p:grpSpPr>
+      <p:sp>
+        <p:nvSpPr>
+          <p:cNvPr id="2" name="Platshållare för bildobjekt 1"/>
+          <p:cNvSpPr>
+            <a:spLocks noGrp="1" noRot="1" noChangeAspect="1"/>
+          </p:cNvSpPr>
+          <p:nvPr>
+            <p:ph type="sldImg"/>
+          </p:nvPr>
+        </p:nvSpPr>
+        <p:spPr/>
+      </p:sp>
+      <p:sp>
+        <p:nvSpPr>
+          <p:cNvPr id="3" name="Platshållare för anteckningar 2"/>
+          <p:cNvSpPr>
+            <a:spLocks noGrp="1"/>
+          </p:cNvSpPr>
+          <p:nvPr>
+            <p:ph type="body" idx="1"/>
+          </p:nvPr>
+        </p:nvSpPr>
+        <p:spPr/>
+        <p:txBody>
+          <a:bodyPr/>
+          <a:lstStyle/>
+          <a:p>
             <a:pPr marL="0" marR="0" lvl="0" indent="0" algn="l" defTabSz="914400" rtl="0" eaLnBrk="1" fontAlgn="auto" latinLnBrk="0" hangingPunct="1">
               <a:lnSpc>
                 <a:spcPct val="100000"/>
@@ -877,7 +993,7 @@
           <a:p>
             <a:fld id="{8667F948-D2CB-486C-A2EA-FEABC2DAAE8D}" type="slidenum">
               <a:rPr lang="sv-SE" smtClean="0"/>
-              <a:t>12</a:t>
+              <a:t>13</a:t>
             </a:fld>
             <a:endParaRPr lang="sv-SE"/>
           </a:p>
@@ -896,7 +1012,7 @@
 </p:notes>
 </file>
 
-<file path=ppt/notesSlides/notesSlide13.xml><?xml version="1.0" encoding="utf-8"?>
+<file path=ppt/notesSlides/notesSlide14.xml><?xml version="1.0" encoding="utf-8"?>
 <p:notes xmlns:a="http://schemas.openxmlformats.org/drawingml/2006/main" xmlns:r="http://schemas.openxmlformats.org/officeDocument/2006/relationships" xmlns:p="http://schemas.openxmlformats.org/presentationml/2006/main">
   <p:cSld>
     <p:spTree>
@@ -1061,7 +1177,7 @@
           <a:p>
             <a:fld id="{8667F948-D2CB-486C-A2EA-FEABC2DAAE8D}" type="slidenum">
               <a:rPr lang="sv-SE" smtClean="0"/>
-              <a:t>13</a:t>
+              <a:t>14</a:t>
             </a:fld>
             <a:endParaRPr lang="sv-SE"/>
           </a:p>
@@ -1080,7 +1196,7 @@
 </p:notes>
 </file>
 
-<file path=ppt/notesSlides/notesSlide14.xml><?xml version="1.0" encoding="utf-8"?>
+<file path=ppt/notesSlides/notesSlide15.xml><?xml version="1.0" encoding="utf-8"?>
 <p:notes xmlns:a="http://schemas.openxmlformats.org/drawingml/2006/main" xmlns:r="http://schemas.openxmlformats.org/officeDocument/2006/relationships" xmlns:p="http://schemas.openxmlformats.org/presentationml/2006/main">
   <p:cSld>
     <p:spTree>
@@ -1176,7 +1292,7 @@
           <a:p>
             <a:fld id="{8667F948-D2CB-486C-A2EA-FEABC2DAAE8D}" type="slidenum">
               <a:rPr lang="sv-SE" smtClean="0"/>
-              <a:t>14</a:t>
+              <a:t>15</a:t>
             </a:fld>
             <a:endParaRPr lang="sv-SE"/>
           </a:p>
@@ -1186,94 +1302,6 @@
     <p:extLst>
       <p:ext uri="{BB962C8B-B14F-4D97-AF65-F5344CB8AC3E}">
         <p14:creationId xmlns:p14="http://schemas.microsoft.com/office/powerpoint/2010/main" val="504764227"/>
-      </p:ext>
-    </p:extLst>
-  </p:cSld>
-  <p:clrMapOvr>
-    <a:masterClrMapping/>
-  </p:clrMapOvr>
-</p:notes>
-</file>
-
-<file path=ppt/notesSlides/notesSlide15.xml><?xml version="1.0" encoding="utf-8"?>
-<p:notes xmlns:a="http://schemas.openxmlformats.org/drawingml/2006/main" xmlns:r="http://schemas.openxmlformats.org/officeDocument/2006/relationships" xmlns:p="http://schemas.openxmlformats.org/presentationml/2006/main">
-  <p:cSld>
-    <p:spTree>
-      <p:nvGrpSpPr>
-        <p:cNvPr id="1" name=""/>
-        <p:cNvGrpSpPr/>
-        <p:nvPr/>
-      </p:nvGrpSpPr>
-      <p:grpSpPr>
-        <a:xfrm>
-          <a:off x="0" y="0"/>
-          <a:ext cx="0" cy="0"/>
-          <a:chOff x="0" y="0"/>
-          <a:chExt cx="0" cy="0"/>
-        </a:xfrm>
-      </p:grpSpPr>
-      <p:sp>
-        <p:nvSpPr>
-          <p:cNvPr id="2" name="Platshållare för bildobjekt 1"/>
-          <p:cNvSpPr>
-            <a:spLocks noGrp="1" noRot="1" noChangeAspect="1"/>
-          </p:cNvSpPr>
-          <p:nvPr>
-            <p:ph type="sldImg"/>
-          </p:nvPr>
-        </p:nvSpPr>
-        <p:spPr/>
-      </p:sp>
-      <p:sp>
-        <p:nvSpPr>
-          <p:cNvPr id="3" name="Platshållare för anteckningar 2"/>
-          <p:cNvSpPr>
-            <a:spLocks noGrp="1"/>
-          </p:cNvSpPr>
-          <p:nvPr>
-            <p:ph type="body" idx="1"/>
-          </p:nvPr>
-        </p:nvSpPr>
-        <p:spPr/>
-        <p:txBody>
-          <a:bodyPr/>
-          <a:lstStyle/>
-          <a:p>
-            <a:r>
-              <a:rPr lang="sv-SE" dirty="0" smtClean="0"/>
-              <a:t>Själva beslutstabellen</a:t>
-            </a:r>
-            <a:endParaRPr lang="sv-SE" dirty="0"/>
-          </a:p>
-        </p:txBody>
-      </p:sp>
-      <p:sp>
-        <p:nvSpPr>
-          <p:cNvPr id="4" name="Platshållare för bildnummer 3"/>
-          <p:cNvSpPr>
-            <a:spLocks noGrp="1"/>
-          </p:cNvSpPr>
-          <p:nvPr>
-            <p:ph type="sldNum" sz="quarter" idx="10"/>
-          </p:nvPr>
-        </p:nvSpPr>
-        <p:spPr/>
-        <p:txBody>
-          <a:bodyPr/>
-          <a:lstStyle/>
-          <a:p>
-            <a:fld id="{8667F948-D2CB-486C-A2EA-FEABC2DAAE8D}" type="slidenum">
-              <a:rPr lang="sv-SE" smtClean="0"/>
-              <a:t>15</a:t>
-            </a:fld>
-            <a:endParaRPr lang="sv-SE"/>
-          </a:p>
-        </p:txBody>
-      </p:sp>
-    </p:spTree>
-    <p:extLst>
-      <p:ext uri="{BB962C8B-B14F-4D97-AF65-F5344CB8AC3E}">
-        <p14:creationId xmlns:p14="http://schemas.microsoft.com/office/powerpoint/2010/main" val="2646750995"/>
       </p:ext>
     </p:extLst>
   </p:cSld>
@@ -1329,7 +1357,7 @@
           <a:p>
             <a:r>
               <a:rPr lang="sv-SE" dirty="0" smtClean="0"/>
-              <a:t>Beslutsträdet om ni gjort ett sådant</a:t>
+              <a:t>Själva beslutstabellen</a:t>
             </a:r>
             <a:endParaRPr lang="sv-SE" dirty="0"/>
           </a:p>
@@ -1361,7 +1389,7 @@
     </p:spTree>
     <p:extLst>
       <p:ext uri="{BB962C8B-B14F-4D97-AF65-F5344CB8AC3E}">
-        <p14:creationId xmlns:p14="http://schemas.microsoft.com/office/powerpoint/2010/main" val="1191027264"/>
+        <p14:creationId xmlns:p14="http://schemas.microsoft.com/office/powerpoint/2010/main" val="2646750995"/>
       </p:ext>
     </p:extLst>
   </p:cSld>
@@ -1415,6 +1443,94 @@
           <a:bodyPr/>
           <a:lstStyle/>
           <a:p>
+            <a:r>
+              <a:rPr lang="sv-SE" dirty="0" smtClean="0"/>
+              <a:t>Beslutsträdet om ni gjort ett sådant</a:t>
+            </a:r>
+            <a:endParaRPr lang="sv-SE" dirty="0"/>
+          </a:p>
+        </p:txBody>
+      </p:sp>
+      <p:sp>
+        <p:nvSpPr>
+          <p:cNvPr id="4" name="Platshållare för bildnummer 3"/>
+          <p:cNvSpPr>
+            <a:spLocks noGrp="1"/>
+          </p:cNvSpPr>
+          <p:nvPr>
+            <p:ph type="sldNum" sz="quarter" idx="10"/>
+          </p:nvPr>
+        </p:nvSpPr>
+        <p:spPr/>
+        <p:txBody>
+          <a:bodyPr/>
+          <a:lstStyle/>
+          <a:p>
+            <a:fld id="{8667F948-D2CB-486C-A2EA-FEABC2DAAE8D}" type="slidenum">
+              <a:rPr lang="sv-SE" smtClean="0"/>
+              <a:t>17</a:t>
+            </a:fld>
+            <a:endParaRPr lang="sv-SE"/>
+          </a:p>
+        </p:txBody>
+      </p:sp>
+    </p:spTree>
+    <p:extLst>
+      <p:ext uri="{BB962C8B-B14F-4D97-AF65-F5344CB8AC3E}">
+        <p14:creationId xmlns:p14="http://schemas.microsoft.com/office/powerpoint/2010/main" val="1191027264"/>
+      </p:ext>
+    </p:extLst>
+  </p:cSld>
+  <p:clrMapOvr>
+    <a:masterClrMapping/>
+  </p:clrMapOvr>
+</p:notes>
+</file>
+
+<file path=ppt/notesSlides/notesSlide18.xml><?xml version="1.0" encoding="utf-8"?>
+<p:notes xmlns:a="http://schemas.openxmlformats.org/drawingml/2006/main" xmlns:r="http://schemas.openxmlformats.org/officeDocument/2006/relationships" xmlns:p="http://schemas.openxmlformats.org/presentationml/2006/main">
+  <p:cSld>
+    <p:spTree>
+      <p:nvGrpSpPr>
+        <p:cNvPr id="1" name=""/>
+        <p:cNvGrpSpPr/>
+        <p:nvPr/>
+      </p:nvGrpSpPr>
+      <p:grpSpPr>
+        <a:xfrm>
+          <a:off x="0" y="0"/>
+          <a:ext cx="0" cy="0"/>
+          <a:chOff x="0" y="0"/>
+          <a:chExt cx="0" cy="0"/>
+        </a:xfrm>
+      </p:grpSpPr>
+      <p:sp>
+        <p:nvSpPr>
+          <p:cNvPr id="2" name="Platshållare för bildobjekt 1"/>
+          <p:cNvSpPr>
+            <a:spLocks noGrp="1" noRot="1" noChangeAspect="1"/>
+          </p:cNvSpPr>
+          <p:nvPr>
+            <p:ph type="sldImg"/>
+          </p:nvPr>
+        </p:nvSpPr>
+        <p:spPr/>
+      </p:sp>
+      <p:sp>
+        <p:nvSpPr>
+          <p:cNvPr id="3" name="Platshållare för anteckningar 2"/>
+          <p:cNvSpPr>
+            <a:spLocks noGrp="1"/>
+          </p:cNvSpPr>
+          <p:nvPr>
+            <p:ph type="body" idx="1"/>
+          </p:nvPr>
+        </p:nvSpPr>
+        <p:spPr/>
+        <p:txBody>
+          <a:bodyPr/>
+          <a:lstStyle/>
+          <a:p>
             <a:pPr marL="0" marR="0" lvl="0" indent="0" algn="l" defTabSz="914400" rtl="0" eaLnBrk="1" fontAlgn="auto" latinLnBrk="0" hangingPunct="1">
               <a:lnSpc>
                 <a:spcPct val="100000"/>
@@ -1468,7 +1584,7 @@
           <a:p>
             <a:fld id="{8667F948-D2CB-486C-A2EA-FEABC2DAAE8D}" type="slidenum">
               <a:rPr lang="sv-SE" smtClean="0"/>
-              <a:t>17</a:t>
+              <a:t>18</a:t>
             </a:fld>
             <a:endParaRPr lang="sv-SE"/>
           </a:p>
@@ -1487,7 +1603,7 @@
 </p:notes>
 </file>
 
-<file path=ppt/notesSlides/notesSlide18.xml><?xml version="1.0" encoding="utf-8"?>
+<file path=ppt/notesSlides/notesSlide19.xml><?xml version="1.0" encoding="utf-8"?>
 <p:notes xmlns:a="http://schemas.openxmlformats.org/drawingml/2006/main" xmlns:r="http://schemas.openxmlformats.org/officeDocument/2006/relationships" xmlns:p="http://schemas.openxmlformats.org/presentationml/2006/main">
   <p:cSld>
     <p:spTree>
@@ -1607,7 +1723,7 @@
           <a:p>
             <a:fld id="{8667F948-D2CB-486C-A2EA-FEABC2DAAE8D}" type="slidenum">
               <a:rPr lang="sv-SE" smtClean="0"/>
-              <a:t>18</a:t>
+              <a:t>19</a:t>
             </a:fld>
             <a:endParaRPr lang="sv-SE"/>
           </a:p>
@@ -1626,7 +1742,91 @@
 </p:notes>
 </file>
 
-<file path=ppt/notesSlides/notesSlide19.xml><?xml version="1.0" encoding="utf-8"?>
+<file path=ppt/notesSlides/notesSlide2.xml><?xml version="1.0" encoding="utf-8"?>
+<p:notes xmlns:a="http://schemas.openxmlformats.org/drawingml/2006/main" xmlns:r="http://schemas.openxmlformats.org/officeDocument/2006/relationships" xmlns:p="http://schemas.openxmlformats.org/presentationml/2006/main">
+  <p:cSld>
+    <p:spTree>
+      <p:nvGrpSpPr>
+        <p:cNvPr id="1" name=""/>
+        <p:cNvGrpSpPr/>
+        <p:nvPr/>
+      </p:nvGrpSpPr>
+      <p:grpSpPr>
+        <a:xfrm>
+          <a:off x="0" y="0"/>
+          <a:ext cx="0" cy="0"/>
+          <a:chOff x="0" y="0"/>
+          <a:chExt cx="0" cy="0"/>
+        </a:xfrm>
+      </p:grpSpPr>
+      <p:sp>
+        <p:nvSpPr>
+          <p:cNvPr id="2" name="Platshållare för bildobjekt 1"/>
+          <p:cNvSpPr>
+            <a:spLocks noGrp="1" noRot="1" noChangeAspect="1"/>
+          </p:cNvSpPr>
+          <p:nvPr>
+            <p:ph type="sldImg"/>
+          </p:nvPr>
+        </p:nvSpPr>
+        <p:spPr/>
+      </p:sp>
+      <p:sp>
+        <p:nvSpPr>
+          <p:cNvPr id="3" name="Platshållare för anteckningar 2"/>
+          <p:cNvSpPr>
+            <a:spLocks noGrp="1"/>
+          </p:cNvSpPr>
+          <p:nvPr>
+            <p:ph type="body" idx="1"/>
+          </p:nvPr>
+        </p:nvSpPr>
+        <p:spPr/>
+        <p:txBody>
+          <a:bodyPr/>
+          <a:lstStyle/>
+          <a:p>
+            <a:endParaRPr lang="sv-SE"/>
+          </a:p>
+        </p:txBody>
+      </p:sp>
+      <p:sp>
+        <p:nvSpPr>
+          <p:cNvPr id="4" name="Platshållare för bildnummer 3"/>
+          <p:cNvSpPr>
+            <a:spLocks noGrp="1"/>
+          </p:cNvSpPr>
+          <p:nvPr>
+            <p:ph type="sldNum" sz="quarter" idx="10"/>
+          </p:nvPr>
+        </p:nvSpPr>
+        <p:spPr/>
+        <p:txBody>
+          <a:bodyPr/>
+          <a:lstStyle/>
+          <a:p>
+            <a:fld id="{8667F948-D2CB-486C-A2EA-FEABC2DAAE8D}" type="slidenum">
+              <a:rPr lang="sv-SE" smtClean="0"/>
+              <a:t>2</a:t>
+            </a:fld>
+            <a:endParaRPr lang="sv-SE"/>
+          </a:p>
+        </p:txBody>
+      </p:sp>
+    </p:spTree>
+    <p:extLst>
+      <p:ext uri="{BB962C8B-B14F-4D97-AF65-F5344CB8AC3E}">
+        <p14:creationId xmlns:p14="http://schemas.microsoft.com/office/powerpoint/2010/main" val="335544334"/>
+      </p:ext>
+    </p:extLst>
+  </p:cSld>
+  <p:clrMapOvr>
+    <a:masterClrMapping/>
+  </p:clrMapOvr>
+</p:notes>
+</file>
+
+<file path=ppt/notesSlides/notesSlide20.xml><?xml version="1.0" encoding="utf-8"?>
 <p:notes xmlns:a="http://schemas.openxmlformats.org/drawingml/2006/main" xmlns:r="http://schemas.openxmlformats.org/officeDocument/2006/relationships" xmlns:p="http://schemas.openxmlformats.org/presentationml/2006/main">
   <p:cSld>
     <p:spTree>
@@ -1722,7 +1922,7 @@
           <a:p>
             <a:fld id="{8667F948-D2CB-486C-A2EA-FEABC2DAAE8D}" type="slidenum">
               <a:rPr lang="sv-SE" smtClean="0"/>
-              <a:t>19</a:t>
+              <a:t>20</a:t>
             </a:fld>
             <a:endParaRPr lang="sv-SE"/>
           </a:p>
@@ -1741,91 +1941,7 @@
 </p:notes>
 </file>
 
-<file path=ppt/notesSlides/notesSlide2.xml><?xml version="1.0" encoding="utf-8"?>
-<p:notes xmlns:a="http://schemas.openxmlformats.org/drawingml/2006/main" xmlns:r="http://schemas.openxmlformats.org/officeDocument/2006/relationships" xmlns:p="http://schemas.openxmlformats.org/presentationml/2006/main">
-  <p:cSld>
-    <p:spTree>
-      <p:nvGrpSpPr>
-        <p:cNvPr id="1" name=""/>
-        <p:cNvGrpSpPr/>
-        <p:nvPr/>
-      </p:nvGrpSpPr>
-      <p:grpSpPr>
-        <a:xfrm>
-          <a:off x="0" y="0"/>
-          <a:ext cx="0" cy="0"/>
-          <a:chOff x="0" y="0"/>
-          <a:chExt cx="0" cy="0"/>
-        </a:xfrm>
-      </p:grpSpPr>
-      <p:sp>
-        <p:nvSpPr>
-          <p:cNvPr id="2" name="Platshållare för bildobjekt 1"/>
-          <p:cNvSpPr>
-            <a:spLocks noGrp="1" noRot="1" noChangeAspect="1"/>
-          </p:cNvSpPr>
-          <p:nvPr>
-            <p:ph type="sldImg"/>
-          </p:nvPr>
-        </p:nvSpPr>
-        <p:spPr/>
-      </p:sp>
-      <p:sp>
-        <p:nvSpPr>
-          <p:cNvPr id="3" name="Platshållare för anteckningar 2"/>
-          <p:cNvSpPr>
-            <a:spLocks noGrp="1"/>
-          </p:cNvSpPr>
-          <p:nvPr>
-            <p:ph type="body" idx="1"/>
-          </p:nvPr>
-        </p:nvSpPr>
-        <p:spPr/>
-        <p:txBody>
-          <a:bodyPr/>
-          <a:lstStyle/>
-          <a:p>
-            <a:endParaRPr lang="sv-SE"/>
-          </a:p>
-        </p:txBody>
-      </p:sp>
-      <p:sp>
-        <p:nvSpPr>
-          <p:cNvPr id="4" name="Platshållare för bildnummer 3"/>
-          <p:cNvSpPr>
-            <a:spLocks noGrp="1"/>
-          </p:cNvSpPr>
-          <p:nvPr>
-            <p:ph type="sldNum" sz="quarter" idx="10"/>
-          </p:nvPr>
-        </p:nvSpPr>
-        <p:spPr/>
-        <p:txBody>
-          <a:bodyPr/>
-          <a:lstStyle/>
-          <a:p>
-            <a:fld id="{8667F948-D2CB-486C-A2EA-FEABC2DAAE8D}" type="slidenum">
-              <a:rPr lang="sv-SE" smtClean="0"/>
-              <a:t>2</a:t>
-            </a:fld>
-            <a:endParaRPr lang="sv-SE"/>
-          </a:p>
-        </p:txBody>
-      </p:sp>
-    </p:spTree>
-    <p:extLst>
-      <p:ext uri="{BB962C8B-B14F-4D97-AF65-F5344CB8AC3E}">
-        <p14:creationId xmlns:p14="http://schemas.microsoft.com/office/powerpoint/2010/main" val="335544334"/>
-      </p:ext>
-    </p:extLst>
-  </p:cSld>
-  <p:clrMapOvr>
-    <a:masterClrMapping/>
-  </p:clrMapOvr>
-</p:notes>
-</file>
-
-<file path=ppt/notesSlides/notesSlide20.xml><?xml version="1.0" encoding="utf-8"?>
+<file path=ppt/notesSlides/notesSlide21.xml><?xml version="1.0" encoding="utf-8"?>
 <p:notes xmlns:a="http://schemas.openxmlformats.org/drawingml/2006/main" xmlns:r="http://schemas.openxmlformats.org/officeDocument/2006/relationships" xmlns:p="http://schemas.openxmlformats.org/presentationml/2006/main">
   <p:cSld>
     <p:spTree>
@@ -1945,7 +2061,7 @@
           <a:p>
             <a:fld id="{8667F948-D2CB-486C-A2EA-FEABC2DAAE8D}" type="slidenum">
               <a:rPr lang="sv-SE" smtClean="0"/>
-              <a:t>20</a:t>
+              <a:t>21</a:t>
             </a:fld>
             <a:endParaRPr lang="sv-SE"/>
           </a:p>
@@ -1964,7 +2080,7 @@
 </p:notes>
 </file>
 
-<file path=ppt/notesSlides/notesSlide21.xml><?xml version="1.0" encoding="utf-8"?>
+<file path=ppt/notesSlides/notesSlide22.xml><?xml version="1.0" encoding="utf-8"?>
 <p:notes xmlns:a="http://schemas.openxmlformats.org/drawingml/2006/main" xmlns:r="http://schemas.openxmlformats.org/officeDocument/2006/relationships" xmlns:p="http://schemas.openxmlformats.org/presentationml/2006/main">
   <p:cSld>
     <p:spTree>
@@ -2060,7 +2176,7 @@
           <a:p>
             <a:fld id="{8667F948-D2CB-486C-A2EA-FEABC2DAAE8D}" type="slidenum">
               <a:rPr lang="sv-SE" smtClean="0"/>
-              <a:t>21</a:t>
+              <a:t>22</a:t>
             </a:fld>
             <a:endParaRPr lang="sv-SE"/>
           </a:p>
@@ -2079,7 +2195,7 @@
 </p:notes>
 </file>
 
-<file path=ppt/notesSlides/notesSlide22.xml><?xml version="1.0" encoding="utf-8"?>
+<file path=ppt/notesSlides/notesSlide23.xml><?xml version="1.0" encoding="utf-8"?>
 <p:notes xmlns:a="http://schemas.openxmlformats.org/drawingml/2006/main" xmlns:r="http://schemas.openxmlformats.org/officeDocument/2006/relationships" xmlns:p="http://schemas.openxmlformats.org/presentationml/2006/main">
   <p:cSld>
     <p:spTree>
@@ -2175,7 +2291,7 @@
           <a:p>
             <a:fld id="{8667F948-D2CB-486C-A2EA-FEABC2DAAE8D}" type="slidenum">
               <a:rPr lang="sv-SE" smtClean="0"/>
-              <a:t>22</a:t>
+              <a:t>23</a:t>
             </a:fld>
             <a:endParaRPr lang="sv-SE"/>
           </a:p>
@@ -2194,7 +2310,7 @@
 </p:notes>
 </file>
 
-<file path=ppt/notesSlides/notesSlide23.xml><?xml version="1.0" encoding="utf-8"?>
+<file path=ppt/notesSlides/notesSlide24.xml><?xml version="1.0" encoding="utf-8"?>
 <p:notes xmlns:a="http://schemas.openxmlformats.org/drawingml/2006/main" xmlns:r="http://schemas.openxmlformats.org/officeDocument/2006/relationships" xmlns:p="http://schemas.openxmlformats.org/presentationml/2006/main">
   <p:cSld>
     <p:spTree>
@@ -2290,7 +2406,7 @@
           <a:p>
             <a:fld id="{8667F948-D2CB-486C-A2EA-FEABC2DAAE8D}" type="slidenum">
               <a:rPr lang="sv-SE" smtClean="0"/>
-              <a:t>23</a:t>
+              <a:t>24</a:t>
             </a:fld>
             <a:endParaRPr lang="sv-SE"/>
           </a:p>
@@ -2309,7 +2425,7 @@
 </p:notes>
 </file>
 
-<file path=ppt/notesSlides/notesSlide24.xml><?xml version="1.0" encoding="utf-8"?>
+<file path=ppt/notesSlides/notesSlide25.xml><?xml version="1.0" encoding="utf-8"?>
 <p:notes xmlns:a="http://schemas.openxmlformats.org/drawingml/2006/main" xmlns:r="http://schemas.openxmlformats.org/officeDocument/2006/relationships" xmlns:p="http://schemas.openxmlformats.org/presentationml/2006/main">
   <p:cSld>
     <p:spTree>
@@ -2433,7 +2549,7 @@
           <a:p>
             <a:fld id="{8667F948-D2CB-486C-A2EA-FEABC2DAAE8D}" type="slidenum">
               <a:rPr lang="sv-SE" smtClean="0"/>
-              <a:t>24</a:t>
+              <a:t>25</a:t>
             </a:fld>
             <a:endParaRPr lang="sv-SE"/>
           </a:p>
@@ -2452,7 +2568,7 @@
 </p:notes>
 </file>
 
-<file path=ppt/notesSlides/notesSlide25.xml><?xml version="1.0" encoding="utf-8"?>
+<file path=ppt/notesSlides/notesSlide26.xml><?xml version="1.0" encoding="utf-8"?>
 <p:notes xmlns:a="http://schemas.openxmlformats.org/drawingml/2006/main" xmlns:r="http://schemas.openxmlformats.org/officeDocument/2006/relationships" xmlns:p="http://schemas.openxmlformats.org/presentationml/2006/main">
   <p:cSld>
     <p:spTree>
@@ -2548,7 +2664,7 @@
           <a:p>
             <a:fld id="{8667F948-D2CB-486C-A2EA-FEABC2DAAE8D}" type="slidenum">
               <a:rPr lang="sv-SE" smtClean="0"/>
-              <a:t>25</a:t>
+              <a:t>26</a:t>
             </a:fld>
             <a:endParaRPr lang="sv-SE"/>
           </a:p>
@@ -2567,7 +2683,7 @@
 </p:notes>
 </file>
 
-<file path=ppt/notesSlides/notesSlide26.xml><?xml version="1.0" encoding="utf-8"?>
+<file path=ppt/notesSlides/notesSlide27.xml><?xml version="1.0" encoding="utf-8"?>
 <p:notes xmlns:a="http://schemas.openxmlformats.org/drawingml/2006/main" xmlns:r="http://schemas.openxmlformats.org/officeDocument/2006/relationships" xmlns:p="http://schemas.openxmlformats.org/presentationml/2006/main">
   <p:cSld>
     <p:spTree>
@@ -2663,7 +2779,7 @@
           <a:p>
             <a:fld id="{8667F948-D2CB-486C-A2EA-FEABC2DAAE8D}" type="slidenum">
               <a:rPr lang="sv-SE" smtClean="0"/>
-              <a:t>26</a:t>
+              <a:t>27</a:t>
             </a:fld>
             <a:endParaRPr lang="sv-SE"/>
           </a:p>
@@ -3014,8 +3130,64 @@
               <a:defRPr/>
             </a:pPr>
             <a:r>
-              <a:rPr lang="sv-SE" dirty="0" smtClean="0"/>
-              <a:t>En diskussion om vilka era erfarenheter ni dragit av att tillämpa TDD. Det finns inget rätt eller fel här. Enda sättet att bli underkända är att bara fuska över punkten och säga något pliktskyldigt.</a:t>
+              <a:rPr lang="sv-SE" sz="1200" kern="1200" dirty="0" smtClean="0">
+                <a:solidFill>
+                  <a:schemeClr val="tx1"/>
+                </a:solidFill>
+                <a:effectLst/>
+                <a:latin typeface="+mn-lt"/>
+                <a:ea typeface="+mn-ea"/>
+                <a:cs typeface="+mn-cs"/>
+              </a:rPr>
+              <a:t>Två eller tre exempel per</a:t>
+            </a:r>
+            <a:r>
+              <a:rPr lang="sv-SE" sz="1200" kern="1200" baseline="0" dirty="0" smtClean="0">
+                <a:solidFill>
+                  <a:schemeClr val="tx1"/>
+                </a:solidFill>
+                <a:effectLst/>
+                <a:latin typeface="+mn-lt"/>
+                <a:ea typeface="+mn-ea"/>
+                <a:cs typeface="+mn-cs"/>
+              </a:rPr>
+              <a:t> person i projektet på hur ni tillämpat TDD med koden för såväl testfallen som koden som ska testas. (Det kan alltså bli upp till 15 sidor för en fempersonersgrupp.) Exemplen ska vara från olika </a:t>
+            </a:r>
+            <a:r>
+              <a:rPr lang="sv-SE" sz="1200" kern="1200" baseline="0" dirty="0" err="1" smtClean="0">
+                <a:solidFill>
+                  <a:schemeClr val="tx1"/>
+                </a:solidFill>
+                <a:effectLst/>
+                <a:latin typeface="+mn-lt"/>
+                <a:ea typeface="+mn-ea"/>
+                <a:cs typeface="+mn-cs"/>
+              </a:rPr>
+              <a:t>faser</a:t>
+            </a:r>
+            <a:r>
+              <a:rPr lang="sv-SE" sz="1200" kern="1200" dirty="0" err="1" smtClean="0">
+                <a:solidFill>
+                  <a:schemeClr val="tx1"/>
+                </a:solidFill>
+                <a:effectLst/>
+                <a:latin typeface="+mn-lt"/>
+                <a:ea typeface="+mn-ea"/>
+                <a:cs typeface="+mn-cs"/>
+              </a:rPr>
+              <a:t>i</a:t>
+            </a:r>
+            <a:r>
+              <a:rPr lang="sv-SE" sz="1200" kern="1200" dirty="0" smtClean="0">
+                <a:solidFill>
+                  <a:schemeClr val="tx1"/>
+                </a:solidFill>
+                <a:effectLst/>
+                <a:latin typeface="+mn-lt"/>
+                <a:ea typeface="+mn-ea"/>
+                <a:cs typeface="+mn-cs"/>
+              </a:rPr>
+              <a:t> projektet. Om ni har använt versionshanteringssystemet ordentligt bör all information som efterfrågas här finnas i det. Tänk på att kodexemplen ska vara läsbara. </a:t>
             </a:r>
           </a:p>
           <a:p>
@@ -3049,7 +3221,7 @@
     </p:spTree>
     <p:extLst>
       <p:ext uri="{BB962C8B-B14F-4D97-AF65-F5344CB8AC3E}">
-        <p14:creationId xmlns:p14="http://schemas.microsoft.com/office/powerpoint/2010/main" val="4160569562"/>
+        <p14:creationId xmlns:p14="http://schemas.microsoft.com/office/powerpoint/2010/main" val="3938006417"/>
       </p:ext>
     </p:extLst>
   </p:cSld>
@@ -3121,16 +3293,8 @@
               <a:defRPr/>
             </a:pPr>
             <a:r>
-              <a:rPr lang="sv-SE" sz="1200" kern="1200" dirty="0" smtClean="0">
-                <a:solidFill>
-                  <a:schemeClr val="tx1"/>
-                </a:solidFill>
-                <a:effectLst/>
-                <a:latin typeface="+mn-lt"/>
-                <a:ea typeface="+mn-ea"/>
-                <a:cs typeface="+mn-cs"/>
-              </a:rPr>
-              <a:t>En kort textuell presentation av vad ni valt ut för att tillämpa ekvivalensklassuppdelning på. Ni ska kort motivera valet, och ge tillräckligt med information för att det ska gå att bedöma er. Detta avsnitt och de följande (till och med testmatrisen) ska finnas för samtliga delar ni tillämpat ekvivalensklassuppdelning på. Om ni inte tillämpat ekvivalensklassuppdelning tar ni bort dessa bilder.</a:t>
+              <a:rPr lang="sv-SE" dirty="0" smtClean="0"/>
+              <a:t>En diskussion om vilka era erfarenheter ni dragit av att tillämpa TDD. Det finns inget rätt eller fel här. Enda sättet att bli underkända är att bara fuska över punkten och säga något pliktskyldigt.</a:t>
             </a:r>
           </a:p>
           <a:p>
@@ -3164,7 +3328,7 @@
     </p:spTree>
     <p:extLst>
       <p:ext uri="{BB962C8B-B14F-4D97-AF65-F5344CB8AC3E}">
-        <p14:creationId xmlns:p14="http://schemas.microsoft.com/office/powerpoint/2010/main" val="2473427308"/>
+        <p14:creationId xmlns:p14="http://schemas.microsoft.com/office/powerpoint/2010/main" val="4160569562"/>
       </p:ext>
     </p:extLst>
   </p:cSld>
@@ -3245,29 +3409,8 @@
                 <a:ea typeface="+mn-ea"/>
                 <a:cs typeface="+mn-cs"/>
               </a:rPr>
-              <a:t>Samtliga ekvivalensklasser för denna del presenterade på ett tydligt sätt. Använd</a:t>
-            </a:r>
-            <a:r>
-              <a:rPr lang="sv-SE" sz="1200" kern="1200" baseline="0" dirty="0" smtClean="0">
-                <a:solidFill>
-                  <a:schemeClr val="tx1"/>
-                </a:solidFill>
-                <a:effectLst/>
-                <a:latin typeface="+mn-lt"/>
-                <a:ea typeface="+mn-ea"/>
-                <a:cs typeface="+mn-cs"/>
-              </a:rPr>
-              <a:t> gärna flera sidor om det behövs.</a:t>
-            </a:r>
-            <a:endParaRPr lang="sv-SE" sz="1200" kern="1200" dirty="0" smtClean="0">
-              <a:solidFill>
-                <a:schemeClr val="tx1"/>
-              </a:solidFill>
-              <a:effectLst/>
-              <a:latin typeface="+mn-lt"/>
-              <a:ea typeface="+mn-ea"/>
-              <a:cs typeface="+mn-cs"/>
-            </a:endParaRPr>
+              <a:t>En kort textuell presentation av vad ni valt ut för att tillämpa ekvivalensklassuppdelning på. Ni ska kort motivera valet, och ge tillräckligt med information för att det ska gå att bedöma er. Detta avsnitt och de följande (till och med testmatrisen) ska finnas för samtliga delar ni tillämpat ekvivalensklassuppdelning på. Om ni inte tillämpat ekvivalensklassuppdelning tar ni bort dessa bilder.</a:t>
+            </a:r>
           </a:p>
           <a:p>
             <a:endParaRPr lang="sv-SE" dirty="0"/>
@@ -3300,7 +3443,7 @@
     </p:spTree>
     <p:extLst>
       <p:ext uri="{BB962C8B-B14F-4D97-AF65-F5344CB8AC3E}">
-        <p14:creationId xmlns:p14="http://schemas.microsoft.com/office/powerpoint/2010/main" val="2613784504"/>
+        <p14:creationId xmlns:p14="http://schemas.microsoft.com/office/powerpoint/2010/main" val="2473427308"/>
       </p:ext>
     </p:extLst>
   </p:cSld>
@@ -3354,6 +3497,23 @@
           <a:bodyPr/>
           <a:lstStyle/>
           <a:p>
+            <a:pPr marL="0" marR="0" lvl="0" indent="0" algn="l" defTabSz="914400" rtl="0" eaLnBrk="1" fontAlgn="auto" latinLnBrk="0" hangingPunct="1">
+              <a:lnSpc>
+                <a:spcPct val="100000"/>
+              </a:lnSpc>
+              <a:spcBef>
+                <a:spcPts val="0"/>
+              </a:spcBef>
+              <a:spcAft>
+                <a:spcPts val="0"/>
+              </a:spcAft>
+              <a:buClrTx/>
+              <a:buSzTx/>
+              <a:buFontTx/>
+              <a:buNone/>
+              <a:tabLst/>
+              <a:defRPr/>
+            </a:pPr>
             <a:r>
               <a:rPr lang="sv-SE" sz="1200" kern="1200" dirty="0" smtClean="0">
                 <a:solidFill>
@@ -3364,8 +3524,31 @@
                 <a:ea typeface="+mn-ea"/>
                 <a:cs typeface="+mn-cs"/>
               </a:rPr>
-              <a:t>Testfallen som ni fått fram från ekvivalensklasserna. Observera att vi inte vill ha någon kod här, utan bara en tydlig presentation av testfallen i någon lämplig tabellform. </a:t>
-            </a:r>
+              <a:t>Samtliga ekvivalensklasser för denna del presenterade på ett tydligt sätt. Använd</a:t>
+            </a:r>
+            <a:r>
+              <a:rPr lang="sv-SE" sz="1200" kern="1200" baseline="0" dirty="0" smtClean="0">
+                <a:solidFill>
+                  <a:schemeClr val="tx1"/>
+                </a:solidFill>
+                <a:effectLst/>
+                <a:latin typeface="+mn-lt"/>
+                <a:ea typeface="+mn-ea"/>
+                <a:cs typeface="+mn-cs"/>
+              </a:rPr>
+              <a:t> gärna flera sidor om det behövs.</a:t>
+            </a:r>
+            <a:endParaRPr lang="sv-SE" sz="1200" kern="1200" dirty="0" smtClean="0">
+              <a:solidFill>
+                <a:schemeClr val="tx1"/>
+              </a:solidFill>
+              <a:effectLst/>
+              <a:latin typeface="+mn-lt"/>
+              <a:ea typeface="+mn-ea"/>
+              <a:cs typeface="+mn-cs"/>
+            </a:endParaRPr>
+          </a:p>
+          <a:p>
             <a:endParaRPr lang="sv-SE" dirty="0"/>
           </a:p>
         </p:txBody>
@@ -3396,7 +3579,7 @@
     </p:spTree>
     <p:extLst>
       <p:ext uri="{BB962C8B-B14F-4D97-AF65-F5344CB8AC3E}">
-        <p14:creationId xmlns:p14="http://schemas.microsoft.com/office/powerpoint/2010/main" val="3514630878"/>
+        <p14:creationId xmlns:p14="http://schemas.microsoft.com/office/powerpoint/2010/main" val="2613784504"/>
       </p:ext>
     </p:extLst>
   </p:cSld>
@@ -3450,23 +3633,6 @@
           <a:bodyPr/>
           <a:lstStyle/>
           <a:p>
-            <a:pPr marL="0" marR="0" lvl="0" indent="0" algn="l" defTabSz="914400" rtl="0" eaLnBrk="1" fontAlgn="auto" latinLnBrk="0" hangingPunct="1">
-              <a:lnSpc>
-                <a:spcPct val="100000"/>
-              </a:lnSpc>
-              <a:spcBef>
-                <a:spcPts val="0"/>
-              </a:spcBef>
-              <a:spcAft>
-                <a:spcPts val="0"/>
-              </a:spcAft>
-              <a:buClrTx/>
-              <a:buSzTx/>
-              <a:buFontTx/>
-              <a:buNone/>
-              <a:tabLst/>
-              <a:defRPr/>
-            </a:pPr>
             <a:r>
               <a:rPr lang="sv-SE" sz="1200" kern="1200" dirty="0" smtClean="0">
                 <a:solidFill>
@@ -3477,10 +3643,8 @@
                 <a:ea typeface="+mn-ea"/>
                 <a:cs typeface="+mn-cs"/>
               </a:rPr>
-              <a:t>En testmatris som visar sambandet mellan ekvivalensklasserna och testfallen för denna del.</a:t>
-            </a:r>
-          </a:p>
-          <a:p>
+              <a:t>Testfallen som ni fått fram från ekvivalensklasserna. Observera att vi inte vill ha någon kod här, utan bara en tydlig presentation av testfallen i någon lämplig tabellform. </a:t>
+            </a:r>
             <a:endParaRPr lang="sv-SE" dirty="0"/>
           </a:p>
         </p:txBody>
@@ -3511,7 +3675,7 @@
     </p:spTree>
     <p:extLst>
       <p:ext uri="{BB962C8B-B14F-4D97-AF65-F5344CB8AC3E}">
-        <p14:creationId xmlns:p14="http://schemas.microsoft.com/office/powerpoint/2010/main" val="3837171916"/>
+        <p14:creationId xmlns:p14="http://schemas.microsoft.com/office/powerpoint/2010/main" val="3514630878"/>
       </p:ext>
     </p:extLst>
   </p:cSld>
@@ -6395,7 +6559,11 @@
           <a:p>
             <a:r>
               <a:rPr lang="sv-SE" dirty="0" smtClean="0"/>
-              <a:t>Grupp nr: 11</a:t>
+              <a:t>Grupp nr: </a:t>
+            </a:r>
+            <a:r>
+              <a:rPr lang="sv-SE" dirty="0" smtClean="0"/>
+              <a:t>11</a:t>
             </a:r>
             <a:endParaRPr lang="sv-SE" dirty="0"/>
           </a:p>
@@ -6424,7 +6592,11 @@
           <a:p>
             <a:r>
               <a:rPr lang="sv-SE" dirty="0" smtClean="0"/>
-              <a:t>Namn och e-post till samtliga gruppmedlemmar</a:t>
+              <a:t>Namn </a:t>
+            </a:r>
+            <a:r>
+              <a:rPr lang="sv-SE" dirty="0" smtClean="0"/>
+              <a:t>och e-post till samtliga gruppmedlemmar</a:t>
             </a:r>
             <a:endParaRPr lang="sv-SE" dirty="0"/>
           </a:p>
@@ -6535,7 +6707,7 @@
           <a:p>
             <a:r>
               <a:rPr lang="sv-SE" dirty="0" smtClean="0"/>
-              <a:t>Tillståndsmaskiner</a:t>
+              <a:t>Testmatris</a:t>
             </a:r>
             <a:endParaRPr lang="sv-SE" dirty="0"/>
           </a:p>
@@ -6566,7 +6738,7 @@
     </p:custDataLst>
     <p:extLst>
       <p:ext uri="{BB962C8B-B14F-4D97-AF65-F5344CB8AC3E}">
-        <p14:creationId xmlns:p14="http://schemas.microsoft.com/office/powerpoint/2010/main" val="1230194705"/>
+        <p14:creationId xmlns:p14="http://schemas.microsoft.com/office/powerpoint/2010/main" val="1900409101"/>
       </p:ext>
     </p:extLst>
   </p:cSld>
@@ -6610,7 +6782,7 @@
           <a:p>
             <a:r>
               <a:rPr lang="sv-SE" dirty="0" smtClean="0"/>
-              <a:t>Tillståndsmaskinen</a:t>
+              <a:t>Tillståndsmaskiner</a:t>
             </a:r>
             <a:endParaRPr lang="sv-SE" dirty="0"/>
           </a:p>
@@ -6641,7 +6813,7 @@
     </p:custDataLst>
     <p:extLst>
       <p:ext uri="{BB962C8B-B14F-4D97-AF65-F5344CB8AC3E}">
-        <p14:creationId xmlns:p14="http://schemas.microsoft.com/office/powerpoint/2010/main" val="2924590265"/>
+        <p14:creationId xmlns:p14="http://schemas.microsoft.com/office/powerpoint/2010/main" val="1230194705"/>
       </p:ext>
     </p:extLst>
   </p:cSld>
@@ -6685,7 +6857,7 @@
           <a:p>
             <a:r>
               <a:rPr lang="sv-SE" dirty="0" smtClean="0"/>
-              <a:t>Testfall</a:t>
+              <a:t>Tillståndsmaskinen</a:t>
             </a:r>
             <a:endParaRPr lang="sv-SE" dirty="0"/>
           </a:p>
@@ -6716,7 +6888,7 @@
     </p:custDataLst>
     <p:extLst>
       <p:ext uri="{BB962C8B-B14F-4D97-AF65-F5344CB8AC3E}">
-        <p14:creationId xmlns:p14="http://schemas.microsoft.com/office/powerpoint/2010/main" val="1268711775"/>
+        <p14:creationId xmlns:p14="http://schemas.microsoft.com/office/powerpoint/2010/main" val="2924590265"/>
       </p:ext>
     </p:extLst>
   </p:cSld>
@@ -6760,7 +6932,7 @@
           <a:p>
             <a:r>
               <a:rPr lang="sv-SE" dirty="0" smtClean="0"/>
-              <a:t>Testmatris</a:t>
+              <a:t>Testfall</a:t>
             </a:r>
             <a:endParaRPr lang="sv-SE" dirty="0"/>
           </a:p>
@@ -6791,7 +6963,7 @@
     </p:custDataLst>
     <p:extLst>
       <p:ext uri="{BB962C8B-B14F-4D97-AF65-F5344CB8AC3E}">
-        <p14:creationId xmlns:p14="http://schemas.microsoft.com/office/powerpoint/2010/main" val="2129764329"/>
+        <p14:creationId xmlns:p14="http://schemas.microsoft.com/office/powerpoint/2010/main" val="1268711775"/>
       </p:ext>
     </p:extLst>
   </p:cSld>
@@ -6835,7 +7007,7 @@
           <a:p>
             <a:r>
               <a:rPr lang="sv-SE" dirty="0" smtClean="0"/>
-              <a:t>Beslutstabeller/beslutsträd</a:t>
+              <a:t>Testmatris</a:t>
             </a:r>
             <a:endParaRPr lang="sv-SE" dirty="0"/>
           </a:p>
@@ -6866,7 +7038,7 @@
     </p:custDataLst>
     <p:extLst>
       <p:ext uri="{BB962C8B-B14F-4D97-AF65-F5344CB8AC3E}">
-        <p14:creationId xmlns:p14="http://schemas.microsoft.com/office/powerpoint/2010/main" val="2726864417"/>
+        <p14:creationId xmlns:p14="http://schemas.microsoft.com/office/powerpoint/2010/main" val="2129764329"/>
       </p:ext>
     </p:extLst>
   </p:cSld>
@@ -6910,7 +7082,7 @@
           <a:p>
             <a:r>
               <a:rPr lang="sv-SE" dirty="0" smtClean="0"/>
-              <a:t>Beslutstabell</a:t>
+              <a:t>Beslutstabeller/beslutsträd</a:t>
             </a:r>
             <a:endParaRPr lang="sv-SE" dirty="0"/>
           </a:p>
@@ -6941,7 +7113,7 @@
     </p:custDataLst>
     <p:extLst>
       <p:ext uri="{BB962C8B-B14F-4D97-AF65-F5344CB8AC3E}">
-        <p14:creationId xmlns:p14="http://schemas.microsoft.com/office/powerpoint/2010/main" val="804679524"/>
+        <p14:creationId xmlns:p14="http://schemas.microsoft.com/office/powerpoint/2010/main" val="2726864417"/>
       </p:ext>
     </p:extLst>
   </p:cSld>
@@ -6985,7 +7157,7 @@
           <a:p>
             <a:r>
               <a:rPr lang="sv-SE" dirty="0" smtClean="0"/>
-              <a:t>Beslutsträd</a:t>
+              <a:t>Beslutstabell</a:t>
             </a:r>
             <a:endParaRPr lang="sv-SE" dirty="0"/>
           </a:p>
@@ -7016,7 +7188,7 @@
     </p:custDataLst>
     <p:extLst>
       <p:ext uri="{BB962C8B-B14F-4D97-AF65-F5344CB8AC3E}">
-        <p14:creationId xmlns:p14="http://schemas.microsoft.com/office/powerpoint/2010/main" val="3386033166"/>
+        <p14:creationId xmlns:p14="http://schemas.microsoft.com/office/powerpoint/2010/main" val="804679524"/>
       </p:ext>
     </p:extLst>
   </p:cSld>
@@ -7060,7 +7232,7 @@
           <a:p>
             <a:r>
               <a:rPr lang="sv-SE" dirty="0" smtClean="0"/>
-              <a:t>Testfall</a:t>
+              <a:t>Beslutsträd</a:t>
             </a:r>
             <a:endParaRPr lang="sv-SE" dirty="0"/>
           </a:p>
@@ -7091,7 +7263,7 @@
     </p:custDataLst>
     <p:extLst>
       <p:ext uri="{BB962C8B-B14F-4D97-AF65-F5344CB8AC3E}">
-        <p14:creationId xmlns:p14="http://schemas.microsoft.com/office/powerpoint/2010/main" val="1644214412"/>
+        <p14:creationId xmlns:p14="http://schemas.microsoft.com/office/powerpoint/2010/main" val="3386033166"/>
       </p:ext>
     </p:extLst>
   </p:cSld>
@@ -7135,7 +7307,7 @@
           <a:p>
             <a:r>
               <a:rPr lang="sv-SE" dirty="0" smtClean="0"/>
-              <a:t>Granskning</a:t>
+              <a:t>Testfall</a:t>
             </a:r>
             <a:endParaRPr lang="sv-SE" dirty="0"/>
           </a:p>
@@ -7166,7 +7338,7 @@
     </p:custDataLst>
     <p:extLst>
       <p:ext uri="{BB962C8B-B14F-4D97-AF65-F5344CB8AC3E}">
-        <p14:creationId xmlns:p14="http://schemas.microsoft.com/office/powerpoint/2010/main" val="3427005653"/>
+        <p14:creationId xmlns:p14="http://schemas.microsoft.com/office/powerpoint/2010/main" val="1644214412"/>
       </p:ext>
     </p:extLst>
   </p:cSld>
@@ -7210,7 +7382,7 @@
           <a:p>
             <a:r>
               <a:rPr lang="sv-SE" dirty="0" smtClean="0"/>
-              <a:t>Granskningsrapport</a:t>
+              <a:t>Granskning</a:t>
             </a:r>
             <a:endParaRPr lang="sv-SE" dirty="0"/>
           </a:p>
@@ -7241,7 +7413,7 @@
     </p:custDataLst>
     <p:extLst>
       <p:ext uri="{BB962C8B-B14F-4D97-AF65-F5344CB8AC3E}">
-        <p14:creationId xmlns:p14="http://schemas.microsoft.com/office/powerpoint/2010/main" val="3874197174"/>
+        <p14:creationId xmlns:p14="http://schemas.microsoft.com/office/powerpoint/2010/main" val="3427005653"/>
       </p:ext>
     </p:extLst>
   </p:cSld>
@@ -7308,7 +7480,11 @@
           <a:p>
             <a:r>
               <a:rPr lang="sv-SE" dirty="0" smtClean="0"/>
-              <a:t>Vilka verktyg använde ni?</a:t>
+              <a:t>Vilka verktyg använde ni</a:t>
+            </a:r>
+            <a:r>
+              <a:rPr lang="sv-SE" dirty="0" smtClean="0"/>
+              <a:t>?</a:t>
             </a:r>
           </a:p>
           <a:p>
@@ -7325,7 +7501,11 @@
             </a:r>
             <a:r>
               <a:rPr lang="sv-SE" dirty="0" smtClean="0"/>
-              <a:t>  </a:t>
+              <a:t> </a:t>
+            </a:r>
+            <a:r>
+              <a:rPr lang="sv-SE" dirty="0" smtClean="0"/>
+              <a:t> </a:t>
             </a:r>
             <a:endParaRPr lang="sv-SE" dirty="0"/>
           </a:p>
@@ -7381,7 +7561,7 @@
           <a:p>
             <a:r>
               <a:rPr lang="sv-SE" dirty="0" smtClean="0"/>
-              <a:t>Erfarenheter av granskning</a:t>
+              <a:t>Granskningsrapport</a:t>
             </a:r>
             <a:endParaRPr lang="sv-SE" dirty="0"/>
           </a:p>
@@ -7412,7 +7592,7 @@
     </p:custDataLst>
     <p:extLst>
       <p:ext uri="{BB962C8B-B14F-4D97-AF65-F5344CB8AC3E}">
-        <p14:creationId xmlns:p14="http://schemas.microsoft.com/office/powerpoint/2010/main" val="724679724"/>
+        <p14:creationId xmlns:p14="http://schemas.microsoft.com/office/powerpoint/2010/main" val="3874197174"/>
       </p:ext>
     </p:extLst>
   </p:cSld>
@@ -7456,7 +7636,7 @@
           <a:p>
             <a:r>
               <a:rPr lang="sv-SE" dirty="0" smtClean="0"/>
-              <a:t>Kodkritiksystem</a:t>
+              <a:t>Erfarenheter av granskning</a:t>
             </a:r>
             <a:endParaRPr lang="sv-SE" dirty="0"/>
           </a:p>
@@ -7487,7 +7667,7 @@
     </p:custDataLst>
     <p:extLst>
       <p:ext uri="{BB962C8B-B14F-4D97-AF65-F5344CB8AC3E}">
-        <p14:creationId xmlns:p14="http://schemas.microsoft.com/office/powerpoint/2010/main" val="847618868"/>
+        <p14:creationId xmlns:p14="http://schemas.microsoft.com/office/powerpoint/2010/main" val="724679724"/>
       </p:ext>
     </p:extLst>
   </p:cSld>
@@ -7531,7 +7711,7 @@
           <a:p>
             <a:r>
               <a:rPr lang="sv-SE" dirty="0" smtClean="0"/>
-              <a:t>Statiska mått</a:t>
+              <a:t>Kodkritiksystem</a:t>
             </a:r>
             <a:endParaRPr lang="sv-SE" dirty="0"/>
           </a:p>
@@ -7562,7 +7742,7 @@
     </p:custDataLst>
     <p:extLst>
       <p:ext uri="{BB962C8B-B14F-4D97-AF65-F5344CB8AC3E}">
-        <p14:creationId xmlns:p14="http://schemas.microsoft.com/office/powerpoint/2010/main" val="3620096591"/>
+        <p14:creationId xmlns:p14="http://schemas.microsoft.com/office/powerpoint/2010/main" val="847618868"/>
       </p:ext>
     </p:extLst>
   </p:cSld>
@@ -7606,7 +7786,7 @@
           <a:p>
             <a:r>
               <a:rPr lang="sv-SE" dirty="0" smtClean="0"/>
-              <a:t>Täckningsgrad</a:t>
+              <a:t>Statiska mått</a:t>
             </a:r>
             <a:endParaRPr lang="sv-SE" dirty="0"/>
           </a:p>
@@ -7637,7 +7817,7 @@
     </p:custDataLst>
     <p:extLst>
       <p:ext uri="{BB962C8B-B14F-4D97-AF65-F5344CB8AC3E}">
-        <p14:creationId xmlns:p14="http://schemas.microsoft.com/office/powerpoint/2010/main" val="3476279416"/>
+        <p14:creationId xmlns:p14="http://schemas.microsoft.com/office/powerpoint/2010/main" val="3620096591"/>
       </p:ext>
     </p:extLst>
   </p:cSld>
@@ -7681,7 +7861,7 @@
           <a:p>
             <a:r>
               <a:rPr lang="sv-SE" dirty="0" smtClean="0"/>
-              <a:t>Profiler</a:t>
+              <a:t>Täckningsgrad</a:t>
             </a:r>
             <a:endParaRPr lang="sv-SE" dirty="0"/>
           </a:p>
@@ -7712,7 +7892,7 @@
     </p:custDataLst>
     <p:extLst>
       <p:ext uri="{BB962C8B-B14F-4D97-AF65-F5344CB8AC3E}">
-        <p14:creationId xmlns:p14="http://schemas.microsoft.com/office/powerpoint/2010/main" val="4124232571"/>
+        <p14:creationId xmlns:p14="http://schemas.microsoft.com/office/powerpoint/2010/main" val="3476279416"/>
       </p:ext>
     </p:extLst>
   </p:cSld>
@@ -7756,7 +7936,7 @@
           <a:p>
             <a:r>
               <a:rPr lang="sv-SE" dirty="0" smtClean="0"/>
-              <a:t>Byggscript</a:t>
+              <a:t>Profiler</a:t>
             </a:r>
             <a:endParaRPr lang="sv-SE" dirty="0"/>
           </a:p>
@@ -7787,7 +7967,7 @@
     </p:custDataLst>
     <p:extLst>
       <p:ext uri="{BB962C8B-B14F-4D97-AF65-F5344CB8AC3E}">
-        <p14:creationId xmlns:p14="http://schemas.microsoft.com/office/powerpoint/2010/main" val="963717311"/>
+        <p14:creationId xmlns:p14="http://schemas.microsoft.com/office/powerpoint/2010/main" val="4124232571"/>
       </p:ext>
     </p:extLst>
   </p:cSld>
@@ -7831,6 +8011,81 @@
           <a:p>
             <a:r>
               <a:rPr lang="sv-SE" dirty="0" smtClean="0"/>
+              <a:t>Byggscript</a:t>
+            </a:r>
+            <a:endParaRPr lang="sv-SE" dirty="0"/>
+          </a:p>
+        </p:txBody>
+      </p:sp>
+      <p:sp>
+        <p:nvSpPr>
+          <p:cNvPr id="3" name="Platshållare för innehåll 2"/>
+          <p:cNvSpPr>
+            <a:spLocks noGrp="1"/>
+          </p:cNvSpPr>
+          <p:nvPr>
+            <p:ph idx="1"/>
+          </p:nvPr>
+        </p:nvSpPr>
+        <p:spPr/>
+        <p:txBody>
+          <a:bodyPr/>
+          <a:lstStyle/>
+          <a:p>
+            <a:endParaRPr lang="sv-SE"/>
+          </a:p>
+        </p:txBody>
+      </p:sp>
+    </p:spTree>
+    <p:custDataLst>
+      <p:tags r:id="rId1"/>
+    </p:custDataLst>
+    <p:extLst>
+      <p:ext uri="{BB962C8B-B14F-4D97-AF65-F5344CB8AC3E}">
+        <p14:creationId xmlns:p14="http://schemas.microsoft.com/office/powerpoint/2010/main" val="963717311"/>
+      </p:ext>
+    </p:extLst>
+  </p:cSld>
+  <p:clrMapOvr>
+    <a:masterClrMapping/>
+  </p:clrMapOvr>
+</p:sld>
+</file>
+
+<file path=ppt/slides/slide27.xml><?xml version="1.0" encoding="utf-8"?>
+<p:sld xmlns:a="http://schemas.openxmlformats.org/drawingml/2006/main" xmlns:r="http://schemas.openxmlformats.org/officeDocument/2006/relationships" xmlns:p="http://schemas.openxmlformats.org/presentationml/2006/main">
+  <p:cSld>
+    <p:spTree>
+      <p:nvGrpSpPr>
+        <p:cNvPr id="1" name=""/>
+        <p:cNvGrpSpPr/>
+        <p:nvPr/>
+      </p:nvGrpSpPr>
+      <p:grpSpPr>
+        <a:xfrm>
+          <a:off x="0" y="0"/>
+          <a:ext cx="0" cy="0"/>
+          <a:chOff x="0" y="0"/>
+          <a:chExt cx="0" cy="0"/>
+        </a:xfrm>
+      </p:grpSpPr>
+      <p:sp>
+        <p:nvSpPr>
+          <p:cNvPr id="2" name="Rubrik 1"/>
+          <p:cNvSpPr>
+            <a:spLocks noGrp="1"/>
+          </p:cNvSpPr>
+          <p:nvPr>
+            <p:ph type="title"/>
+          </p:nvPr>
+        </p:nvSpPr>
+        <p:spPr/>
+        <p:txBody>
+          <a:bodyPr/>
+          <a:lstStyle/>
+          <a:p>
+            <a:r>
+              <a:rPr lang="sv-SE" dirty="0" smtClean="0"/>
               <a:t>Övrigt</a:t>
             </a:r>
             <a:endParaRPr lang="sv-SE" dirty="0"/>
@@ -7981,7 +8236,11 @@
           <a:p>
             <a:r>
               <a:rPr lang="sv-SE" dirty="0" smtClean="0"/>
-              <a:t>TDD-exempel: namn</a:t>
+              <a:t>TDD-exempel: </a:t>
+            </a:r>
+            <a:r>
+              <a:rPr lang="sv-SE" dirty="0" smtClean="0"/>
+              <a:t>namn (kopiera denna sida och fyll i kopian)</a:t>
             </a:r>
             <a:endParaRPr lang="sv-SE" dirty="0"/>
           </a:p>
@@ -8106,7 +8365,7 @@
       </p:grpSpPr>
       <p:sp>
         <p:nvSpPr>
-          <p:cNvPr id="9" name="Rubrik 8"/>
+          <p:cNvPr id="2" name="Rubrik 1"/>
           <p:cNvSpPr>
             <a:spLocks noGrp="1"/>
           </p:cNvSpPr>
@@ -8121,7 +8380,11 @@
           <a:p>
             <a:r>
               <a:rPr lang="sv-SE" dirty="0" smtClean="0"/>
-              <a:t>TDD erfarenheter</a:t>
+              <a:t>TDD-exempel: </a:t>
+            </a:r>
+            <a:r>
+              <a:rPr lang="sv-SE" dirty="0" smtClean="0"/>
+              <a:t>Linnéa Palmgren</a:t>
             </a:r>
             <a:endParaRPr lang="sv-SE" dirty="0"/>
           </a:p>
@@ -8129,20 +8392,85 @@
       </p:sp>
       <p:sp>
         <p:nvSpPr>
-          <p:cNvPr id="10" name="Platshållare för innehåll 9"/>
-          <p:cNvSpPr>
-            <a:spLocks noGrp="1"/>
-          </p:cNvSpPr>
-          <p:nvPr>
-            <p:ph idx="1"/>
-          </p:nvPr>
-        </p:nvSpPr>
-        <p:spPr/>
-        <p:txBody>
-          <a:bodyPr/>
-          <a:lstStyle/>
-          <a:p>
+          <p:cNvPr id="4" name="Platshållare för text 3"/>
+          <p:cNvSpPr>
+            <a:spLocks noGrp="1"/>
+          </p:cNvSpPr>
+          <p:nvPr>
+            <p:ph type="body" idx="1"/>
+          </p:nvPr>
+        </p:nvSpPr>
+        <p:spPr/>
+        <p:txBody>
+          <a:bodyPr/>
+          <a:lstStyle/>
+          <a:p>
+            <a:r>
+              <a:rPr lang="sv-SE" dirty="0" err="1" smtClean="0"/>
+              <a:t>Testkod</a:t>
+            </a:r>
             <a:endParaRPr lang="sv-SE" dirty="0"/>
+          </a:p>
+        </p:txBody>
+      </p:sp>
+      <p:sp>
+        <p:nvSpPr>
+          <p:cNvPr id="5" name="Platshållare för innehåll 4"/>
+          <p:cNvSpPr>
+            <a:spLocks noGrp="1"/>
+          </p:cNvSpPr>
+          <p:nvPr>
+            <p:ph sz="half" idx="2"/>
+          </p:nvPr>
+        </p:nvSpPr>
+        <p:spPr/>
+        <p:txBody>
+          <a:bodyPr/>
+          <a:lstStyle/>
+          <a:p>
+            <a:endParaRPr lang="sv-SE" dirty="0"/>
+          </a:p>
+        </p:txBody>
+      </p:sp>
+      <p:sp>
+        <p:nvSpPr>
+          <p:cNvPr id="6" name="Platshållare för text 5"/>
+          <p:cNvSpPr>
+            <a:spLocks noGrp="1"/>
+          </p:cNvSpPr>
+          <p:nvPr>
+            <p:ph type="body" sz="quarter" idx="3"/>
+          </p:nvPr>
+        </p:nvSpPr>
+        <p:spPr/>
+        <p:txBody>
+          <a:bodyPr/>
+          <a:lstStyle/>
+          <a:p>
+            <a:r>
+              <a:rPr lang="sv-SE" dirty="0" smtClean="0"/>
+              <a:t>Koden som testas</a:t>
+            </a:r>
+            <a:endParaRPr lang="sv-SE" dirty="0"/>
+          </a:p>
+        </p:txBody>
+      </p:sp>
+      <p:sp>
+        <p:nvSpPr>
+          <p:cNvPr id="7" name="Platshållare för innehåll 6"/>
+          <p:cNvSpPr>
+            <a:spLocks noGrp="1"/>
+          </p:cNvSpPr>
+          <p:nvPr>
+            <p:ph sz="quarter" idx="4"/>
+          </p:nvPr>
+        </p:nvSpPr>
+        <p:spPr/>
+        <p:txBody>
+          <a:bodyPr/>
+          <a:lstStyle/>
+          <a:p>
+            <a:endParaRPr lang="sv-SE"/>
           </a:p>
         </p:txBody>
       </p:sp>
@@ -8152,7 +8480,7 @@
     </p:custDataLst>
     <p:extLst>
       <p:ext uri="{BB962C8B-B14F-4D97-AF65-F5344CB8AC3E}">
-        <p14:creationId xmlns:p14="http://schemas.microsoft.com/office/powerpoint/2010/main" val="1458286633"/>
+        <p14:creationId xmlns:p14="http://schemas.microsoft.com/office/powerpoint/2010/main" val="2114169958"/>
       </p:ext>
     </p:extLst>
   </p:cSld>
@@ -8181,7 +8509,7 @@
       </p:grpSpPr>
       <p:sp>
         <p:nvSpPr>
-          <p:cNvPr id="2" name="Rubrik 1"/>
+          <p:cNvPr id="9" name="Rubrik 8"/>
           <p:cNvSpPr>
             <a:spLocks noGrp="1"/>
           </p:cNvSpPr>
@@ -8196,7 +8524,7 @@
           <a:p>
             <a:r>
               <a:rPr lang="sv-SE" dirty="0" smtClean="0"/>
-              <a:t>Testfallsdesign ekvivalensklasser</a:t>
+              <a:t>TDD erfarenheter</a:t>
             </a:r>
             <a:endParaRPr lang="sv-SE" dirty="0"/>
           </a:p>
@@ -8204,7 +8532,7 @@
       </p:sp>
       <p:sp>
         <p:nvSpPr>
-          <p:cNvPr id="3" name="Platshållare för innehåll 2"/>
+          <p:cNvPr id="10" name="Platshållare för innehåll 9"/>
           <p:cNvSpPr>
             <a:spLocks noGrp="1"/>
           </p:cNvSpPr>
@@ -8217,7 +8545,7 @@
           <a:bodyPr/>
           <a:lstStyle/>
           <a:p>
-            <a:endParaRPr lang="sv-SE"/>
+            <a:endParaRPr lang="sv-SE" dirty="0"/>
           </a:p>
         </p:txBody>
       </p:sp>
@@ -8227,7 +8555,7 @@
     </p:custDataLst>
     <p:extLst>
       <p:ext uri="{BB962C8B-B14F-4D97-AF65-F5344CB8AC3E}">
-        <p14:creationId xmlns:p14="http://schemas.microsoft.com/office/powerpoint/2010/main" val="3480241241"/>
+        <p14:creationId xmlns:p14="http://schemas.microsoft.com/office/powerpoint/2010/main" val="1458286633"/>
       </p:ext>
     </p:extLst>
   </p:cSld>
@@ -8271,7 +8599,7 @@
           <a:p>
             <a:r>
               <a:rPr lang="sv-SE" dirty="0" smtClean="0"/>
-              <a:t>Ekvivalensklasserna</a:t>
+              <a:t>Testfallsdesign ekvivalensklasser</a:t>
             </a:r>
             <a:endParaRPr lang="sv-SE" dirty="0"/>
           </a:p>
@@ -8302,7 +8630,7 @@
     </p:custDataLst>
     <p:extLst>
       <p:ext uri="{BB962C8B-B14F-4D97-AF65-F5344CB8AC3E}">
-        <p14:creationId xmlns:p14="http://schemas.microsoft.com/office/powerpoint/2010/main" val="3750412782"/>
+        <p14:creationId xmlns:p14="http://schemas.microsoft.com/office/powerpoint/2010/main" val="3480241241"/>
       </p:ext>
     </p:extLst>
   </p:cSld>
@@ -8346,7 +8674,7 @@
           <a:p>
             <a:r>
               <a:rPr lang="sv-SE" dirty="0" smtClean="0"/>
-              <a:t>Testfall</a:t>
+              <a:t>Ekvivalensklasserna</a:t>
             </a:r>
             <a:endParaRPr lang="sv-SE" dirty="0"/>
           </a:p>
@@ -8377,7 +8705,7 @@
     </p:custDataLst>
     <p:extLst>
       <p:ext uri="{BB962C8B-B14F-4D97-AF65-F5344CB8AC3E}">
-        <p14:creationId xmlns:p14="http://schemas.microsoft.com/office/powerpoint/2010/main" val="3595241904"/>
+        <p14:creationId xmlns:p14="http://schemas.microsoft.com/office/powerpoint/2010/main" val="3750412782"/>
       </p:ext>
     </p:extLst>
   </p:cSld>
@@ -8421,7 +8749,7 @@
           <a:p>
             <a:r>
               <a:rPr lang="sv-SE" dirty="0" smtClean="0"/>
-              <a:t>Testmatris</a:t>
+              <a:t>Testfall</a:t>
             </a:r>
             <a:endParaRPr lang="sv-SE" dirty="0"/>
           </a:p>
@@ -8452,7 +8780,7 @@
     </p:custDataLst>
     <p:extLst>
       <p:ext uri="{BB962C8B-B14F-4D97-AF65-F5344CB8AC3E}">
-        <p14:creationId xmlns:p14="http://schemas.microsoft.com/office/powerpoint/2010/main" val="1900409101"/>
+        <p14:creationId xmlns:p14="http://schemas.microsoft.com/office/powerpoint/2010/main" val="3595241904"/>
       </p:ext>
     </p:extLst>
   </p:cSld>
@@ -8578,6 +8906,12 @@
 </file>
 
 <file path=ppt/tags/tag27.xml><?xml version="1.0" encoding="utf-8"?>
+<p:tagLst xmlns:a="http://schemas.openxmlformats.org/drawingml/2006/main" xmlns:r="http://schemas.openxmlformats.org/officeDocument/2006/relationships" xmlns:p="http://schemas.openxmlformats.org/presentationml/2006/main">
+  <p:tag name="ARTICULATE_SLIDE_THUMBNAIL_REFRESH" val="1"/>
+</p:tagLst>
+</file>
+
+<file path=ppt/tags/tag28.xml><?xml version="1.0" encoding="utf-8"?>
 <p:tagLst xmlns:a="http://schemas.openxmlformats.org/drawingml/2006/main" xmlns:r="http://schemas.openxmlformats.org/officeDocument/2006/relationships" xmlns:p="http://schemas.openxmlformats.org/presentationml/2006/main">
   <p:tag name="ARTICULATE_SLIDE_THUMBNAIL_REFRESH" val="1"/>
 </p:tagLst>

</xml_diff>

<commit_message>
added TTD for me #Bjargey
</commit_message>
<xml_diff>
--- a/slutredovisning.pptx
+++ b/slutredovisning.pptx
@@ -5,41 +5,44 @@
     <p:sldMasterId id="2147483648" r:id="rId1"/>
   </p:sldMasterIdLst>
   <p:notesMasterIdLst>
-    <p:notesMasterId r:id="rId29"/>
+    <p:notesMasterId r:id="rId32"/>
   </p:notesMasterIdLst>
   <p:sldIdLst>
-    <p:sldId id="256" r:id="rId2"/>
+    <p:sldId id="286" r:id="rId2"/>
     <p:sldId id="257" r:id="rId3"/>
     <p:sldId id="258" r:id="rId4"/>
     <p:sldId id="259" r:id="rId5"/>
     <p:sldId id="282" r:id="rId6"/>
-    <p:sldId id="260" r:id="rId7"/>
-    <p:sldId id="261" r:id="rId8"/>
-    <p:sldId id="262" r:id="rId9"/>
-    <p:sldId id="263" r:id="rId10"/>
-    <p:sldId id="264" r:id="rId11"/>
-    <p:sldId id="265" r:id="rId12"/>
-    <p:sldId id="266" r:id="rId13"/>
-    <p:sldId id="267" r:id="rId14"/>
-    <p:sldId id="268" r:id="rId15"/>
-    <p:sldId id="269" r:id="rId16"/>
-    <p:sldId id="270" r:id="rId17"/>
-    <p:sldId id="272" r:id="rId18"/>
-    <p:sldId id="271" r:id="rId19"/>
-    <p:sldId id="273" r:id="rId20"/>
-    <p:sldId id="274" r:id="rId21"/>
-    <p:sldId id="275" r:id="rId22"/>
-    <p:sldId id="276" r:id="rId23"/>
-    <p:sldId id="277" r:id="rId24"/>
-    <p:sldId id="278" r:id="rId25"/>
-    <p:sldId id="279" r:id="rId26"/>
-    <p:sldId id="280" r:id="rId27"/>
-    <p:sldId id="281" r:id="rId28"/>
+    <p:sldId id="283" r:id="rId7"/>
+    <p:sldId id="284" r:id="rId8"/>
+    <p:sldId id="285" r:id="rId9"/>
+    <p:sldId id="260" r:id="rId10"/>
+    <p:sldId id="261" r:id="rId11"/>
+    <p:sldId id="262" r:id="rId12"/>
+    <p:sldId id="263" r:id="rId13"/>
+    <p:sldId id="264" r:id="rId14"/>
+    <p:sldId id="265" r:id="rId15"/>
+    <p:sldId id="266" r:id="rId16"/>
+    <p:sldId id="267" r:id="rId17"/>
+    <p:sldId id="268" r:id="rId18"/>
+    <p:sldId id="269" r:id="rId19"/>
+    <p:sldId id="270" r:id="rId20"/>
+    <p:sldId id="272" r:id="rId21"/>
+    <p:sldId id="271" r:id="rId22"/>
+    <p:sldId id="273" r:id="rId23"/>
+    <p:sldId id="274" r:id="rId24"/>
+    <p:sldId id="275" r:id="rId25"/>
+    <p:sldId id="276" r:id="rId26"/>
+    <p:sldId id="277" r:id="rId27"/>
+    <p:sldId id="278" r:id="rId28"/>
+    <p:sldId id="279" r:id="rId29"/>
+    <p:sldId id="280" r:id="rId30"/>
+    <p:sldId id="281" r:id="rId31"/>
   </p:sldIdLst>
   <p:sldSz cx="12192000" cy="6858000"/>
   <p:notesSz cx="6858000" cy="9144000"/>
   <p:custDataLst>
-    <p:tags r:id="rId30"/>
+    <p:tags r:id="rId33"/>
   </p:custDataLst>
   <p:defaultTextStyle>
     <a:defPPr>
@@ -290,38 +293,37 @@
           <a:p>
             <a:pPr lvl="0"/>
             <a:r>
-              <a:rPr lang="sv-SE" smtClean="0"/>
+              <a:rPr lang="sv-SE"/>
               <a:t>Klicka här för att ändra format på bakgrundstexten</a:t>
             </a:r>
           </a:p>
           <a:p>
             <a:pPr lvl="1"/>
             <a:r>
-              <a:rPr lang="sv-SE" smtClean="0"/>
+              <a:rPr lang="sv-SE"/>
               <a:t>Nivå två</a:t>
             </a:r>
           </a:p>
           <a:p>
             <a:pPr lvl="2"/>
             <a:r>
-              <a:rPr lang="sv-SE" smtClean="0"/>
+              <a:rPr lang="sv-SE"/>
               <a:t>Nivå tre</a:t>
             </a:r>
           </a:p>
           <a:p>
             <a:pPr lvl="3"/>
             <a:r>
-              <a:rPr lang="sv-SE" smtClean="0"/>
+              <a:rPr lang="sv-SE"/>
               <a:t>Nivå fyra</a:t>
             </a:r>
           </a:p>
           <a:p>
             <a:pPr lvl="4"/>
             <a:r>
-              <a:rPr lang="sv-SE" smtClean="0"/>
+              <a:rPr lang="sv-SE"/>
               <a:t>Nivå fem</a:t>
             </a:r>
-            <a:endParaRPr lang="sv-SE"/>
           </a:p>
         </p:txBody>
       </p:sp>
@@ -640,7 +642,7 @@
               <a:defRPr/>
             </a:pPr>
             <a:r>
-              <a:rPr lang="sv-SE" sz="1200" kern="1200" dirty="0" smtClean="0">
+              <a:rPr lang="sv-SE" sz="1200" kern="1200" dirty="0">
                 <a:solidFill>
                   <a:schemeClr val="tx1"/>
                 </a:solidFill>
@@ -649,7 +651,7 @@
                 <a:ea typeface="+mn-ea"/>
                 <a:cs typeface="+mn-cs"/>
               </a:rPr>
-              <a:t>En testmatris som visar sambandet mellan ekvivalensklasserna och testfallen för denna del.</a:t>
+              <a:t>En kort textuell presentation av vad ni valt ut för att tillämpa ekvivalensklassuppdelning på. Ni ska kort motivera valet, och ge tillräckligt med information för att det ska gå att bedöma er. Detta avsnitt och de följande (till och med testmatrisen) ska finnas för samtliga delar ni tillämpat ekvivalensklassuppdelning på. Om ni inte tillämpat ekvivalensklassuppdelning tar ni bort dessa bilder.</a:t>
             </a:r>
           </a:p>
           <a:p>
@@ -683,7 +685,7 @@
     </p:spTree>
     <p:extLst>
       <p:ext uri="{BB962C8B-B14F-4D97-AF65-F5344CB8AC3E}">
-        <p14:creationId xmlns:p14="http://schemas.microsoft.com/office/powerpoint/2010/main" val="3837171916"/>
+        <p14:creationId xmlns:p14="http://schemas.microsoft.com/office/powerpoint/2010/main" val="2473427308"/>
       </p:ext>
     </p:extLst>
   </p:cSld>
@@ -755,7 +757,7 @@
               <a:defRPr/>
             </a:pPr>
             <a:r>
-              <a:rPr lang="sv-SE" sz="1200" kern="1200" dirty="0" smtClean="0">
+              <a:rPr lang="sv-SE" sz="1200" kern="1200" dirty="0">
                 <a:solidFill>
                   <a:schemeClr val="tx1"/>
                 </a:solidFill>
@@ -764,8 +766,29 @@
                 <a:ea typeface="+mn-ea"/>
                 <a:cs typeface="+mn-cs"/>
               </a:rPr>
-              <a:t>En kort textuell presentation av vad ni valt ut för att tillämpa tillståndsmaskiner på och vilket eller vilka kriterier ni använder för att ta fram testfall från maskinen. Ni ska kort motivera valet, och ge tillräckligt med information för att det ska gå att bedöma er. Detta avsnitt och de följande ska finnas för samtliga delar ni tillämpat tillståndsmaskiner på. Om ni inte tillämpat tillståndsmaskiner tar ni bort dessa bilder.</a:t>
-            </a:r>
+              <a:t>Samtliga ekvivalensklasser för denna del presenterade på ett tydligt sätt. Använd</a:t>
+            </a:r>
+            <a:r>
+              <a:rPr lang="sv-SE" sz="1200" kern="1200" baseline="0" dirty="0">
+                <a:solidFill>
+                  <a:schemeClr val="tx1"/>
+                </a:solidFill>
+                <a:effectLst/>
+                <a:latin typeface="+mn-lt"/>
+                <a:ea typeface="+mn-ea"/>
+                <a:cs typeface="+mn-cs"/>
+              </a:rPr>
+              <a:t> gärna flera sidor om det behövs.</a:t>
+            </a:r>
+            <a:endParaRPr lang="sv-SE" sz="1200" kern="1200" dirty="0">
+              <a:solidFill>
+                <a:schemeClr val="tx1"/>
+              </a:solidFill>
+              <a:effectLst/>
+              <a:latin typeface="+mn-lt"/>
+              <a:ea typeface="+mn-ea"/>
+              <a:cs typeface="+mn-cs"/>
+            </a:endParaRPr>
           </a:p>
           <a:p>
             <a:endParaRPr lang="sv-SE" dirty="0"/>
@@ -798,7 +821,7 @@
     </p:spTree>
     <p:extLst>
       <p:ext uri="{BB962C8B-B14F-4D97-AF65-F5344CB8AC3E}">
-        <p14:creationId xmlns:p14="http://schemas.microsoft.com/office/powerpoint/2010/main" val="2041626993"/>
+        <p14:creationId xmlns:p14="http://schemas.microsoft.com/office/powerpoint/2010/main" val="2613784504"/>
       </p:ext>
     </p:extLst>
   </p:cSld>
@@ -853,8 +876,16 @@
           <a:lstStyle/>
           <a:p>
             <a:r>
-              <a:rPr lang="sv-SE" dirty="0" smtClean="0"/>
-              <a:t>Själva tillståndsmaskinen</a:t>
+              <a:rPr lang="sv-SE" sz="1200" kern="1200" dirty="0">
+                <a:solidFill>
+                  <a:schemeClr val="tx1"/>
+                </a:solidFill>
+                <a:effectLst/>
+                <a:latin typeface="+mn-lt"/>
+                <a:ea typeface="+mn-ea"/>
+                <a:cs typeface="+mn-cs"/>
+              </a:rPr>
+              <a:t>Testfallen som ni fått fram från ekvivalensklasserna. Observera att vi inte vill ha någon kod här, utan bara en tydlig presentation av testfallen i någon lämplig tabellform. </a:t>
             </a:r>
             <a:endParaRPr lang="sv-SE" dirty="0"/>
           </a:p>
@@ -886,7 +917,7 @@
     </p:spTree>
     <p:extLst>
       <p:ext uri="{BB962C8B-B14F-4D97-AF65-F5344CB8AC3E}">
-        <p14:creationId xmlns:p14="http://schemas.microsoft.com/office/powerpoint/2010/main" val="1235134485"/>
+        <p14:creationId xmlns:p14="http://schemas.microsoft.com/office/powerpoint/2010/main" val="3514630878"/>
       </p:ext>
     </p:extLst>
   </p:cSld>
@@ -958,7 +989,7 @@
               <a:defRPr/>
             </a:pPr>
             <a:r>
-              <a:rPr lang="sv-SE" sz="1200" kern="1200" dirty="0" smtClean="0">
+              <a:rPr lang="sv-SE" sz="1200" kern="1200" dirty="0">
                 <a:solidFill>
                   <a:schemeClr val="tx1"/>
                 </a:solidFill>
@@ -967,9 +998,8 @@
                 <a:ea typeface="+mn-ea"/>
                 <a:cs typeface="+mn-cs"/>
               </a:rPr>
-              <a:t>Testfallen som ni fått fram från tillståndsmaskinen. Observera att vi inte vill ha någon kod här, utan bara en tydlig presentation av testfallen i någon lämplig tabellform. </a:t>
-            </a:r>
-            <a:endParaRPr lang="sv-SE" dirty="0" smtClean="0"/>
+              <a:t>En testmatris som visar sambandet mellan ekvivalensklasserna och testfallen för denna del.</a:t>
+            </a:r>
           </a:p>
           <a:p>
             <a:endParaRPr lang="sv-SE" dirty="0"/>
@@ -1002,7 +1032,7 @@
     </p:spTree>
     <p:extLst>
       <p:ext uri="{BB962C8B-B14F-4D97-AF65-F5344CB8AC3E}">
-        <p14:creationId xmlns:p14="http://schemas.microsoft.com/office/powerpoint/2010/main" val="556359333"/>
+        <p14:creationId xmlns:p14="http://schemas.microsoft.com/office/powerpoint/2010/main" val="3837171916"/>
       </p:ext>
     </p:extLst>
   </p:cSld>
@@ -1074,7 +1104,7 @@
               <a:defRPr/>
             </a:pPr>
             <a:r>
-              <a:rPr lang="sv-SE" sz="1200" kern="1200" dirty="0" smtClean="0">
+              <a:rPr lang="sv-SE" sz="1200" kern="1200" dirty="0">
                 <a:solidFill>
                   <a:schemeClr val="tx1"/>
                 </a:solidFill>
@@ -1083,77 +1113,8 @@
                 <a:ea typeface="+mn-ea"/>
                 <a:cs typeface="+mn-cs"/>
               </a:rPr>
-              <a:t>En testmatris (eller annan</a:t>
-            </a:r>
-            <a:r>
-              <a:rPr lang="sv-SE" sz="1200" kern="1200" baseline="0" dirty="0" smtClean="0">
-                <a:solidFill>
-                  <a:schemeClr val="tx1"/>
-                </a:solidFill>
-                <a:effectLst/>
-                <a:latin typeface="+mn-lt"/>
-                <a:ea typeface="+mn-ea"/>
-                <a:cs typeface="+mn-cs"/>
-              </a:rPr>
-              <a:t> lämplig form)</a:t>
-            </a:r>
-            <a:r>
-              <a:rPr lang="sv-SE" sz="1200" kern="1200" dirty="0" smtClean="0">
-                <a:solidFill>
-                  <a:schemeClr val="tx1"/>
-                </a:solidFill>
-                <a:effectLst/>
-                <a:latin typeface="+mn-lt"/>
-                <a:ea typeface="+mn-ea"/>
-                <a:cs typeface="+mn-cs"/>
-              </a:rPr>
-              <a:t> som visar sambandet mellan tillståndsmaskinen och testfallen för denna del så att det går att se att ni tillämpat de kriterier</a:t>
-            </a:r>
-            <a:r>
-              <a:rPr lang="sv-SE" sz="1200" kern="1200" baseline="0" dirty="0" smtClean="0">
-                <a:solidFill>
-                  <a:schemeClr val="tx1"/>
-                </a:solidFill>
-                <a:effectLst/>
-                <a:latin typeface="+mn-lt"/>
-                <a:ea typeface="+mn-ea"/>
-                <a:cs typeface="+mn-cs"/>
-              </a:rPr>
-              <a:t> ni satt upp för att ta fram testfall</a:t>
-            </a:r>
-            <a:r>
-              <a:rPr lang="sv-SE" sz="1200" kern="1200" dirty="0" smtClean="0">
-                <a:solidFill>
-                  <a:schemeClr val="tx1"/>
-                </a:solidFill>
-                <a:effectLst/>
-                <a:latin typeface="+mn-lt"/>
-                <a:ea typeface="+mn-ea"/>
-                <a:cs typeface="+mn-cs"/>
-              </a:rPr>
-              <a:t>. Om detta tydligt framgår från testfallen</a:t>
-            </a:r>
-            <a:r>
-              <a:rPr lang="sv-SE" sz="1200" kern="1200" baseline="0" dirty="0" smtClean="0">
-                <a:solidFill>
-                  <a:schemeClr val="tx1"/>
-                </a:solidFill>
-                <a:effectLst/>
-                <a:latin typeface="+mn-lt"/>
-                <a:ea typeface="+mn-ea"/>
-                <a:cs typeface="+mn-cs"/>
-              </a:rPr>
-              <a:t> så kan denna bild plockas bort.</a:t>
-            </a:r>
-            <a:endParaRPr lang="sv-SE" sz="1200" kern="1200" dirty="0" smtClean="0">
-              <a:solidFill>
-                <a:schemeClr val="tx1"/>
-              </a:solidFill>
-              <a:effectLst/>
-              <a:latin typeface="+mn-lt"/>
-              <a:ea typeface="+mn-ea"/>
-              <a:cs typeface="+mn-cs"/>
-            </a:endParaRPr>
+              <a:t>En kort textuell presentation av vad ni valt ut för att tillämpa tillståndsmaskiner på och vilket eller vilka kriterier ni använder för att ta fram testfall från maskinen. Ni ska kort motivera valet, och ge tillräckligt med information för att det ska gå att bedöma er. Detta avsnitt och de följande ska finnas för samtliga delar ni tillämpat tillståndsmaskiner på. Om ni inte tillämpat tillståndsmaskiner tar ni bort dessa bilder.</a:t>
+            </a:r>
           </a:p>
           <a:p>
             <a:endParaRPr lang="sv-SE" dirty="0"/>
@@ -1186,7 +1147,7 @@
     </p:spTree>
     <p:extLst>
       <p:ext uri="{BB962C8B-B14F-4D97-AF65-F5344CB8AC3E}">
-        <p14:creationId xmlns:p14="http://schemas.microsoft.com/office/powerpoint/2010/main" val="61413010"/>
+        <p14:creationId xmlns:p14="http://schemas.microsoft.com/office/powerpoint/2010/main" val="2041626993"/>
       </p:ext>
     </p:extLst>
   </p:cSld>
@@ -1240,6 +1201,93 @@
           <a:bodyPr/>
           <a:lstStyle/>
           <a:p>
+            <a:r>
+              <a:rPr lang="sv-SE" dirty="0"/>
+              <a:t>Själva tillståndsmaskinen</a:t>
+            </a:r>
+          </a:p>
+        </p:txBody>
+      </p:sp>
+      <p:sp>
+        <p:nvSpPr>
+          <p:cNvPr id="4" name="Platshållare för bildnummer 3"/>
+          <p:cNvSpPr>
+            <a:spLocks noGrp="1"/>
+          </p:cNvSpPr>
+          <p:nvPr>
+            <p:ph type="sldNum" sz="quarter" idx="10"/>
+          </p:nvPr>
+        </p:nvSpPr>
+        <p:spPr/>
+        <p:txBody>
+          <a:bodyPr/>
+          <a:lstStyle/>
+          <a:p>
+            <a:fld id="{8667F948-D2CB-486C-A2EA-FEABC2DAAE8D}" type="slidenum">
+              <a:rPr lang="sv-SE" smtClean="0"/>
+              <a:t>15</a:t>
+            </a:fld>
+            <a:endParaRPr lang="sv-SE"/>
+          </a:p>
+        </p:txBody>
+      </p:sp>
+    </p:spTree>
+    <p:extLst>
+      <p:ext uri="{BB962C8B-B14F-4D97-AF65-F5344CB8AC3E}">
+        <p14:creationId xmlns:p14="http://schemas.microsoft.com/office/powerpoint/2010/main" val="1235134485"/>
+      </p:ext>
+    </p:extLst>
+  </p:cSld>
+  <p:clrMapOvr>
+    <a:masterClrMapping/>
+  </p:clrMapOvr>
+</p:notes>
+</file>
+
+<file path=ppt/notesSlides/notesSlide16.xml><?xml version="1.0" encoding="utf-8"?>
+<p:notes xmlns:a="http://schemas.openxmlformats.org/drawingml/2006/main" xmlns:r="http://schemas.openxmlformats.org/officeDocument/2006/relationships" xmlns:p="http://schemas.openxmlformats.org/presentationml/2006/main">
+  <p:cSld>
+    <p:spTree>
+      <p:nvGrpSpPr>
+        <p:cNvPr id="1" name=""/>
+        <p:cNvGrpSpPr/>
+        <p:nvPr/>
+      </p:nvGrpSpPr>
+      <p:grpSpPr>
+        <a:xfrm>
+          <a:off x="0" y="0"/>
+          <a:ext cx="0" cy="0"/>
+          <a:chOff x="0" y="0"/>
+          <a:chExt cx="0" cy="0"/>
+        </a:xfrm>
+      </p:grpSpPr>
+      <p:sp>
+        <p:nvSpPr>
+          <p:cNvPr id="2" name="Platshållare för bildobjekt 1"/>
+          <p:cNvSpPr>
+            <a:spLocks noGrp="1" noRot="1" noChangeAspect="1"/>
+          </p:cNvSpPr>
+          <p:nvPr>
+            <p:ph type="sldImg"/>
+          </p:nvPr>
+        </p:nvSpPr>
+        <p:spPr/>
+      </p:sp>
+      <p:sp>
+        <p:nvSpPr>
+          <p:cNvPr id="3" name="Platshållare för anteckningar 2"/>
+          <p:cNvSpPr>
+            <a:spLocks noGrp="1"/>
+          </p:cNvSpPr>
+          <p:nvPr>
+            <p:ph type="body" idx="1"/>
+          </p:nvPr>
+        </p:nvSpPr>
+        <p:spPr/>
+        <p:txBody>
+          <a:bodyPr/>
+          <a:lstStyle/>
+          <a:p>
             <a:pPr marL="0" marR="0" lvl="0" indent="0" algn="l" defTabSz="914400" rtl="0" eaLnBrk="1" fontAlgn="auto" latinLnBrk="0" hangingPunct="1">
               <a:lnSpc>
                 <a:spcPct val="100000"/>
@@ -1258,7 +1306,7 @@
               <a:defRPr/>
             </a:pPr>
             <a:r>
-              <a:rPr lang="sv-SE" sz="1200" kern="1200" dirty="0" smtClean="0">
+              <a:rPr lang="sv-SE" sz="1200" kern="1200" dirty="0">
                 <a:solidFill>
                   <a:schemeClr val="tx1"/>
                 </a:solidFill>
@@ -1267,98 +1315,11 @@
                 <a:ea typeface="+mn-ea"/>
                 <a:cs typeface="+mn-cs"/>
               </a:rPr>
-              <a:t>En kort textuell presentation av vad ni valt ut för att tillämpa beslutstabeller. Ni ska kort motivera valet, och ge tillräckligt med information för att det ska gå att bedöma er. Detta avsnitt och de följande ska finnas för samtliga delar ni tillämpat beslutstabeller på. Om ni inte tillämpat beslutstabeller tar ni bort dessa bilder.</a:t>
-            </a:r>
-          </a:p>
-          <a:p>
+              <a:t>Testfallen som ni fått fram från tillståndsmaskinen. Observera att vi inte vill ha någon kod här, utan bara en tydlig presentation av testfallen i någon lämplig tabellform. </a:t>
+            </a:r>
             <a:endParaRPr lang="sv-SE" dirty="0"/>
           </a:p>
-        </p:txBody>
-      </p:sp>
-      <p:sp>
-        <p:nvSpPr>
-          <p:cNvPr id="4" name="Platshållare för bildnummer 3"/>
-          <p:cNvSpPr>
-            <a:spLocks noGrp="1"/>
-          </p:cNvSpPr>
-          <p:nvPr>
-            <p:ph type="sldNum" sz="quarter" idx="10"/>
-          </p:nvPr>
-        </p:nvSpPr>
-        <p:spPr/>
-        <p:txBody>
-          <a:bodyPr/>
-          <a:lstStyle/>
-          <a:p>
-            <a:fld id="{8667F948-D2CB-486C-A2EA-FEABC2DAAE8D}" type="slidenum">
-              <a:rPr lang="sv-SE" smtClean="0"/>
-              <a:t>15</a:t>
-            </a:fld>
-            <a:endParaRPr lang="sv-SE"/>
-          </a:p>
-        </p:txBody>
-      </p:sp>
-    </p:spTree>
-    <p:extLst>
-      <p:ext uri="{BB962C8B-B14F-4D97-AF65-F5344CB8AC3E}">
-        <p14:creationId xmlns:p14="http://schemas.microsoft.com/office/powerpoint/2010/main" val="504764227"/>
-      </p:ext>
-    </p:extLst>
-  </p:cSld>
-  <p:clrMapOvr>
-    <a:masterClrMapping/>
-  </p:clrMapOvr>
-</p:notes>
-</file>
-
-<file path=ppt/notesSlides/notesSlide16.xml><?xml version="1.0" encoding="utf-8"?>
-<p:notes xmlns:a="http://schemas.openxmlformats.org/drawingml/2006/main" xmlns:r="http://schemas.openxmlformats.org/officeDocument/2006/relationships" xmlns:p="http://schemas.openxmlformats.org/presentationml/2006/main">
-  <p:cSld>
-    <p:spTree>
-      <p:nvGrpSpPr>
-        <p:cNvPr id="1" name=""/>
-        <p:cNvGrpSpPr/>
-        <p:nvPr/>
-      </p:nvGrpSpPr>
-      <p:grpSpPr>
-        <a:xfrm>
-          <a:off x="0" y="0"/>
-          <a:ext cx="0" cy="0"/>
-          <a:chOff x="0" y="0"/>
-          <a:chExt cx="0" cy="0"/>
-        </a:xfrm>
-      </p:grpSpPr>
-      <p:sp>
-        <p:nvSpPr>
-          <p:cNvPr id="2" name="Platshållare för bildobjekt 1"/>
-          <p:cNvSpPr>
-            <a:spLocks noGrp="1" noRot="1" noChangeAspect="1"/>
-          </p:cNvSpPr>
-          <p:nvPr>
-            <p:ph type="sldImg"/>
-          </p:nvPr>
-        </p:nvSpPr>
-        <p:spPr/>
-      </p:sp>
-      <p:sp>
-        <p:nvSpPr>
-          <p:cNvPr id="3" name="Platshållare för anteckningar 2"/>
-          <p:cNvSpPr>
-            <a:spLocks noGrp="1"/>
-          </p:cNvSpPr>
-          <p:nvPr>
-            <p:ph type="body" idx="1"/>
-          </p:nvPr>
-        </p:nvSpPr>
-        <p:spPr/>
-        <p:txBody>
-          <a:bodyPr/>
-          <a:lstStyle/>
-          <a:p>
-            <a:r>
-              <a:rPr lang="sv-SE" dirty="0" smtClean="0"/>
-              <a:t>Själva beslutstabellen</a:t>
-            </a:r>
+          <a:p>
             <a:endParaRPr lang="sv-SE" dirty="0"/>
           </a:p>
         </p:txBody>
@@ -1389,7 +1350,7 @@
     </p:spTree>
     <p:extLst>
       <p:ext uri="{BB962C8B-B14F-4D97-AF65-F5344CB8AC3E}">
-        <p14:creationId xmlns:p14="http://schemas.microsoft.com/office/powerpoint/2010/main" val="2646750995"/>
+        <p14:creationId xmlns:p14="http://schemas.microsoft.com/office/powerpoint/2010/main" val="556359333"/>
       </p:ext>
     </p:extLst>
   </p:cSld>
@@ -1443,10 +1404,106 @@
           <a:bodyPr/>
           <a:lstStyle/>
           <a:p>
-            <a:r>
-              <a:rPr lang="sv-SE" dirty="0" smtClean="0"/>
-              <a:t>Beslutsträdet om ni gjort ett sådant</a:t>
-            </a:r>
+            <a:pPr marL="0" marR="0" lvl="0" indent="0" algn="l" defTabSz="914400" rtl="0" eaLnBrk="1" fontAlgn="auto" latinLnBrk="0" hangingPunct="1">
+              <a:lnSpc>
+                <a:spcPct val="100000"/>
+              </a:lnSpc>
+              <a:spcBef>
+                <a:spcPts val="0"/>
+              </a:spcBef>
+              <a:spcAft>
+                <a:spcPts val="0"/>
+              </a:spcAft>
+              <a:buClrTx/>
+              <a:buSzTx/>
+              <a:buFontTx/>
+              <a:buNone/>
+              <a:tabLst/>
+              <a:defRPr/>
+            </a:pPr>
+            <a:r>
+              <a:rPr lang="sv-SE" sz="1200" kern="1200" dirty="0">
+                <a:solidFill>
+                  <a:schemeClr val="tx1"/>
+                </a:solidFill>
+                <a:effectLst/>
+                <a:latin typeface="+mn-lt"/>
+                <a:ea typeface="+mn-ea"/>
+                <a:cs typeface="+mn-cs"/>
+              </a:rPr>
+              <a:t>En testmatris (eller annan</a:t>
+            </a:r>
+            <a:r>
+              <a:rPr lang="sv-SE" sz="1200" kern="1200" baseline="0" dirty="0">
+                <a:solidFill>
+                  <a:schemeClr val="tx1"/>
+                </a:solidFill>
+                <a:effectLst/>
+                <a:latin typeface="+mn-lt"/>
+                <a:ea typeface="+mn-ea"/>
+                <a:cs typeface="+mn-cs"/>
+              </a:rPr>
+              <a:t> lämplig form)</a:t>
+            </a:r>
+            <a:r>
+              <a:rPr lang="sv-SE" sz="1200" kern="1200" dirty="0">
+                <a:solidFill>
+                  <a:schemeClr val="tx1"/>
+                </a:solidFill>
+                <a:effectLst/>
+                <a:latin typeface="+mn-lt"/>
+                <a:ea typeface="+mn-ea"/>
+                <a:cs typeface="+mn-cs"/>
+              </a:rPr>
+              <a:t> som visar sambandet mellan tillståndsmaskinen och testfallen för denna del så att det går att se att ni tillämpat de kriterier</a:t>
+            </a:r>
+            <a:r>
+              <a:rPr lang="sv-SE" sz="1200" kern="1200" baseline="0" dirty="0">
+                <a:solidFill>
+                  <a:schemeClr val="tx1"/>
+                </a:solidFill>
+                <a:effectLst/>
+                <a:latin typeface="+mn-lt"/>
+                <a:ea typeface="+mn-ea"/>
+                <a:cs typeface="+mn-cs"/>
+              </a:rPr>
+              <a:t> ni satt upp för att ta fram testfall</a:t>
+            </a:r>
+            <a:r>
+              <a:rPr lang="sv-SE" sz="1200" kern="1200" dirty="0">
+                <a:solidFill>
+                  <a:schemeClr val="tx1"/>
+                </a:solidFill>
+                <a:effectLst/>
+                <a:latin typeface="+mn-lt"/>
+                <a:ea typeface="+mn-ea"/>
+                <a:cs typeface="+mn-cs"/>
+              </a:rPr>
+              <a:t>. Om detta tydligt framgår från testfallen</a:t>
+            </a:r>
+            <a:r>
+              <a:rPr lang="sv-SE" sz="1200" kern="1200" baseline="0" dirty="0">
+                <a:solidFill>
+                  <a:schemeClr val="tx1"/>
+                </a:solidFill>
+                <a:effectLst/>
+                <a:latin typeface="+mn-lt"/>
+                <a:ea typeface="+mn-ea"/>
+                <a:cs typeface="+mn-cs"/>
+              </a:rPr>
+              <a:t> så kan denna bild plockas bort.</a:t>
+            </a:r>
+            <a:endParaRPr lang="sv-SE" sz="1200" kern="1200" dirty="0">
+              <a:solidFill>
+                <a:schemeClr val="tx1"/>
+              </a:solidFill>
+              <a:effectLst/>
+              <a:latin typeface="+mn-lt"/>
+              <a:ea typeface="+mn-ea"/>
+              <a:cs typeface="+mn-cs"/>
+            </a:endParaRPr>
+          </a:p>
+          <a:p>
             <a:endParaRPr lang="sv-SE" dirty="0"/>
           </a:p>
         </p:txBody>
@@ -1477,7 +1534,7 @@
     </p:spTree>
     <p:extLst>
       <p:ext uri="{BB962C8B-B14F-4D97-AF65-F5344CB8AC3E}">
-        <p14:creationId xmlns:p14="http://schemas.microsoft.com/office/powerpoint/2010/main" val="1191027264"/>
+        <p14:creationId xmlns:p14="http://schemas.microsoft.com/office/powerpoint/2010/main" val="61413010"/>
       </p:ext>
     </p:extLst>
   </p:cSld>
@@ -1549,7 +1606,7 @@
               <a:defRPr/>
             </a:pPr>
             <a:r>
-              <a:rPr lang="sv-SE" sz="1200" kern="1200" dirty="0" smtClean="0">
+              <a:rPr lang="sv-SE" sz="1200" kern="1200" dirty="0">
                 <a:solidFill>
                   <a:schemeClr val="tx1"/>
                 </a:solidFill>
@@ -1558,9 +1615,8 @@
                 <a:ea typeface="+mn-ea"/>
                 <a:cs typeface="+mn-cs"/>
               </a:rPr>
-              <a:t>Testfallen som ni fått fram från beslutstabellen. Observera att vi inte vill ha någon kod här, utan bara en tydlig presentation av testfallen i någon lämplig tabellform. </a:t>
-            </a:r>
-            <a:endParaRPr lang="sv-SE" dirty="0" smtClean="0"/>
+              <a:t>En kort textuell presentation av vad ni valt ut för att tillämpa beslutstabeller. Ni ska kort motivera valet, och ge tillräckligt med information för att det ska gå att bedöma er. Detta avsnitt och de följande ska finnas för samtliga delar ni tillämpat beslutstabeller på. Om ni inte tillämpat beslutstabeller tar ni bort dessa bilder.</a:t>
+            </a:r>
           </a:p>
           <a:p>
             <a:endParaRPr lang="sv-SE" dirty="0"/>
@@ -1593,7 +1649,7 @@
     </p:spTree>
     <p:extLst>
       <p:ext uri="{BB962C8B-B14F-4D97-AF65-F5344CB8AC3E}">
-        <p14:creationId xmlns:p14="http://schemas.microsoft.com/office/powerpoint/2010/main" val="586387250"/>
+        <p14:creationId xmlns:p14="http://schemas.microsoft.com/office/powerpoint/2010/main" val="504764227"/>
       </p:ext>
     </p:extLst>
   </p:cSld>
@@ -1647,6 +1703,264 @@
           <a:bodyPr/>
           <a:lstStyle/>
           <a:p>
+            <a:r>
+              <a:rPr lang="sv-SE" dirty="0"/>
+              <a:t>Själva beslutstabellen</a:t>
+            </a:r>
+          </a:p>
+        </p:txBody>
+      </p:sp>
+      <p:sp>
+        <p:nvSpPr>
+          <p:cNvPr id="4" name="Platshållare för bildnummer 3"/>
+          <p:cNvSpPr>
+            <a:spLocks noGrp="1"/>
+          </p:cNvSpPr>
+          <p:nvPr>
+            <p:ph type="sldNum" sz="quarter" idx="10"/>
+          </p:nvPr>
+        </p:nvSpPr>
+        <p:spPr/>
+        <p:txBody>
+          <a:bodyPr/>
+          <a:lstStyle/>
+          <a:p>
+            <a:fld id="{8667F948-D2CB-486C-A2EA-FEABC2DAAE8D}" type="slidenum">
+              <a:rPr lang="sv-SE" smtClean="0"/>
+              <a:t>19</a:t>
+            </a:fld>
+            <a:endParaRPr lang="sv-SE"/>
+          </a:p>
+        </p:txBody>
+      </p:sp>
+    </p:spTree>
+    <p:extLst>
+      <p:ext uri="{BB962C8B-B14F-4D97-AF65-F5344CB8AC3E}">
+        <p14:creationId xmlns:p14="http://schemas.microsoft.com/office/powerpoint/2010/main" val="2646750995"/>
+      </p:ext>
+    </p:extLst>
+  </p:cSld>
+  <p:clrMapOvr>
+    <a:masterClrMapping/>
+  </p:clrMapOvr>
+</p:notes>
+</file>
+
+<file path=ppt/notesSlides/notesSlide2.xml><?xml version="1.0" encoding="utf-8"?>
+<p:notes xmlns:a="http://schemas.openxmlformats.org/drawingml/2006/main" xmlns:r="http://schemas.openxmlformats.org/officeDocument/2006/relationships" xmlns:p="http://schemas.openxmlformats.org/presentationml/2006/main">
+  <p:cSld>
+    <p:spTree>
+      <p:nvGrpSpPr>
+        <p:cNvPr id="1" name=""/>
+        <p:cNvGrpSpPr/>
+        <p:nvPr/>
+      </p:nvGrpSpPr>
+      <p:grpSpPr>
+        <a:xfrm>
+          <a:off x="0" y="0"/>
+          <a:ext cx="0" cy="0"/>
+          <a:chOff x="0" y="0"/>
+          <a:chExt cx="0" cy="0"/>
+        </a:xfrm>
+      </p:grpSpPr>
+      <p:sp>
+        <p:nvSpPr>
+          <p:cNvPr id="2" name="Platshållare för bildobjekt 1"/>
+          <p:cNvSpPr>
+            <a:spLocks noGrp="1" noRot="1" noChangeAspect="1"/>
+          </p:cNvSpPr>
+          <p:nvPr>
+            <p:ph type="sldImg"/>
+          </p:nvPr>
+        </p:nvSpPr>
+        <p:spPr/>
+      </p:sp>
+      <p:sp>
+        <p:nvSpPr>
+          <p:cNvPr id="3" name="Platshållare för anteckningar 2"/>
+          <p:cNvSpPr>
+            <a:spLocks noGrp="1"/>
+          </p:cNvSpPr>
+          <p:nvPr>
+            <p:ph type="body" idx="1"/>
+          </p:nvPr>
+        </p:nvSpPr>
+        <p:spPr/>
+        <p:txBody>
+          <a:bodyPr/>
+          <a:lstStyle/>
+          <a:p>
+            <a:endParaRPr lang="sv-SE"/>
+          </a:p>
+        </p:txBody>
+      </p:sp>
+      <p:sp>
+        <p:nvSpPr>
+          <p:cNvPr id="4" name="Platshållare för bildnummer 3"/>
+          <p:cNvSpPr>
+            <a:spLocks noGrp="1"/>
+          </p:cNvSpPr>
+          <p:nvPr>
+            <p:ph type="sldNum" sz="quarter" idx="10"/>
+          </p:nvPr>
+        </p:nvSpPr>
+        <p:spPr/>
+        <p:txBody>
+          <a:bodyPr/>
+          <a:lstStyle/>
+          <a:p>
+            <a:fld id="{8667F948-D2CB-486C-A2EA-FEABC2DAAE8D}" type="slidenum">
+              <a:rPr lang="sv-SE" smtClean="0"/>
+              <a:t>2</a:t>
+            </a:fld>
+            <a:endParaRPr lang="sv-SE"/>
+          </a:p>
+        </p:txBody>
+      </p:sp>
+    </p:spTree>
+    <p:extLst>
+      <p:ext uri="{BB962C8B-B14F-4D97-AF65-F5344CB8AC3E}">
+        <p14:creationId xmlns:p14="http://schemas.microsoft.com/office/powerpoint/2010/main" val="335544334"/>
+      </p:ext>
+    </p:extLst>
+  </p:cSld>
+  <p:clrMapOvr>
+    <a:masterClrMapping/>
+  </p:clrMapOvr>
+</p:notes>
+</file>
+
+<file path=ppt/notesSlides/notesSlide20.xml><?xml version="1.0" encoding="utf-8"?>
+<p:notes xmlns:a="http://schemas.openxmlformats.org/drawingml/2006/main" xmlns:r="http://schemas.openxmlformats.org/officeDocument/2006/relationships" xmlns:p="http://schemas.openxmlformats.org/presentationml/2006/main">
+  <p:cSld>
+    <p:spTree>
+      <p:nvGrpSpPr>
+        <p:cNvPr id="1" name=""/>
+        <p:cNvGrpSpPr/>
+        <p:nvPr/>
+      </p:nvGrpSpPr>
+      <p:grpSpPr>
+        <a:xfrm>
+          <a:off x="0" y="0"/>
+          <a:ext cx="0" cy="0"/>
+          <a:chOff x="0" y="0"/>
+          <a:chExt cx="0" cy="0"/>
+        </a:xfrm>
+      </p:grpSpPr>
+      <p:sp>
+        <p:nvSpPr>
+          <p:cNvPr id="2" name="Platshållare för bildobjekt 1"/>
+          <p:cNvSpPr>
+            <a:spLocks noGrp="1" noRot="1" noChangeAspect="1"/>
+          </p:cNvSpPr>
+          <p:nvPr>
+            <p:ph type="sldImg"/>
+          </p:nvPr>
+        </p:nvSpPr>
+        <p:spPr/>
+      </p:sp>
+      <p:sp>
+        <p:nvSpPr>
+          <p:cNvPr id="3" name="Platshållare för anteckningar 2"/>
+          <p:cNvSpPr>
+            <a:spLocks noGrp="1"/>
+          </p:cNvSpPr>
+          <p:nvPr>
+            <p:ph type="body" idx="1"/>
+          </p:nvPr>
+        </p:nvSpPr>
+        <p:spPr/>
+        <p:txBody>
+          <a:bodyPr/>
+          <a:lstStyle/>
+          <a:p>
+            <a:r>
+              <a:rPr lang="sv-SE" dirty="0"/>
+              <a:t>Beslutsträdet om ni gjort ett sådant</a:t>
+            </a:r>
+          </a:p>
+        </p:txBody>
+      </p:sp>
+      <p:sp>
+        <p:nvSpPr>
+          <p:cNvPr id="4" name="Platshållare för bildnummer 3"/>
+          <p:cNvSpPr>
+            <a:spLocks noGrp="1"/>
+          </p:cNvSpPr>
+          <p:nvPr>
+            <p:ph type="sldNum" sz="quarter" idx="10"/>
+          </p:nvPr>
+        </p:nvSpPr>
+        <p:spPr/>
+        <p:txBody>
+          <a:bodyPr/>
+          <a:lstStyle/>
+          <a:p>
+            <a:fld id="{8667F948-D2CB-486C-A2EA-FEABC2DAAE8D}" type="slidenum">
+              <a:rPr lang="sv-SE" smtClean="0"/>
+              <a:t>20</a:t>
+            </a:fld>
+            <a:endParaRPr lang="sv-SE"/>
+          </a:p>
+        </p:txBody>
+      </p:sp>
+    </p:spTree>
+    <p:extLst>
+      <p:ext uri="{BB962C8B-B14F-4D97-AF65-F5344CB8AC3E}">
+        <p14:creationId xmlns:p14="http://schemas.microsoft.com/office/powerpoint/2010/main" val="1191027264"/>
+      </p:ext>
+    </p:extLst>
+  </p:cSld>
+  <p:clrMapOvr>
+    <a:masterClrMapping/>
+  </p:clrMapOvr>
+</p:notes>
+</file>
+
+<file path=ppt/notesSlides/notesSlide21.xml><?xml version="1.0" encoding="utf-8"?>
+<p:notes xmlns:a="http://schemas.openxmlformats.org/drawingml/2006/main" xmlns:r="http://schemas.openxmlformats.org/officeDocument/2006/relationships" xmlns:p="http://schemas.openxmlformats.org/presentationml/2006/main">
+  <p:cSld>
+    <p:spTree>
+      <p:nvGrpSpPr>
+        <p:cNvPr id="1" name=""/>
+        <p:cNvGrpSpPr/>
+        <p:nvPr/>
+      </p:nvGrpSpPr>
+      <p:grpSpPr>
+        <a:xfrm>
+          <a:off x="0" y="0"/>
+          <a:ext cx="0" cy="0"/>
+          <a:chOff x="0" y="0"/>
+          <a:chExt cx="0" cy="0"/>
+        </a:xfrm>
+      </p:grpSpPr>
+      <p:sp>
+        <p:nvSpPr>
+          <p:cNvPr id="2" name="Platshållare för bildobjekt 1"/>
+          <p:cNvSpPr>
+            <a:spLocks noGrp="1" noRot="1" noChangeAspect="1"/>
+          </p:cNvSpPr>
+          <p:nvPr>
+            <p:ph type="sldImg"/>
+          </p:nvPr>
+        </p:nvSpPr>
+        <p:spPr/>
+      </p:sp>
+      <p:sp>
+        <p:nvSpPr>
+          <p:cNvPr id="3" name="Platshållare för anteckningar 2"/>
+          <p:cNvSpPr>
+            <a:spLocks noGrp="1"/>
+          </p:cNvSpPr>
+          <p:nvPr>
+            <p:ph type="body" idx="1"/>
+          </p:nvPr>
+        </p:nvSpPr>
+        <p:spPr/>
+        <p:txBody>
+          <a:bodyPr/>
+          <a:lstStyle/>
+          <a:p>
             <a:pPr marL="0" marR="0" lvl="0" indent="0" algn="l" defTabSz="914400" rtl="0" eaLnBrk="1" fontAlgn="auto" latinLnBrk="0" hangingPunct="1">
               <a:lnSpc>
                 <a:spcPct val="100000"/>
@@ -1665,7 +1979,7 @@
               <a:defRPr/>
             </a:pPr>
             <a:r>
-              <a:rPr lang="sv-SE" sz="1200" kern="1200" dirty="0" smtClean="0">
+              <a:rPr lang="sv-SE" sz="1200" kern="1200" dirty="0">
                 <a:solidFill>
                   <a:schemeClr val="tx1"/>
                 </a:solidFill>
@@ -1674,32 +1988,9 @@
                 <a:ea typeface="+mn-ea"/>
                 <a:cs typeface="+mn-cs"/>
               </a:rPr>
-              <a:t>En kort presentation av den del av koden ni valt ut för att göra en formell granskning av och processen ni använt er av inklusive eventuella checklistor, scenarier, </a:t>
-            </a:r>
-            <a:r>
-              <a:rPr lang="sv-SE" sz="1200" kern="1200" dirty="0" err="1" smtClean="0">
-                <a:solidFill>
-                  <a:schemeClr val="tx1"/>
-                </a:solidFill>
-                <a:effectLst/>
-                <a:latin typeface="+mn-lt"/>
-                <a:ea typeface="+mn-ea"/>
-                <a:cs typeface="+mn-cs"/>
-              </a:rPr>
-              <a:t>edyl</a:t>
-            </a:r>
-            <a:r>
-              <a:rPr lang="sv-SE" sz="1200" kern="1200" dirty="0" smtClean="0">
-                <a:solidFill>
-                  <a:schemeClr val="tx1"/>
-                </a:solidFill>
-                <a:effectLst/>
-                <a:latin typeface="+mn-lt"/>
-                <a:ea typeface="+mn-ea"/>
-                <a:cs typeface="+mn-cs"/>
-              </a:rPr>
-              <a:t>. Ni ska kort motivera valen, och ge tillräckligt med information för att det ska gå att bedöma er. </a:t>
-            </a:r>
+              <a:t>Testfallen som ni fått fram från beslutstabellen. Observera att vi inte vill ha någon kod här, utan bara en tydlig presentation av testfallen i någon lämplig tabellform. </a:t>
+            </a:r>
+            <a:endParaRPr lang="sv-SE" dirty="0"/>
           </a:p>
           <a:p>
             <a:endParaRPr lang="sv-SE" dirty="0"/>
@@ -1723,7 +2014,7 @@
           <a:p>
             <a:fld id="{8667F948-D2CB-486C-A2EA-FEABC2DAAE8D}" type="slidenum">
               <a:rPr lang="sv-SE" smtClean="0"/>
-              <a:t>19</a:t>
+              <a:t>21</a:t>
             </a:fld>
             <a:endParaRPr lang="sv-SE"/>
           </a:p>
@@ -1732,7 +2023,7 @@
     </p:spTree>
     <p:extLst>
       <p:ext uri="{BB962C8B-B14F-4D97-AF65-F5344CB8AC3E}">
-        <p14:creationId xmlns:p14="http://schemas.microsoft.com/office/powerpoint/2010/main" val="1836920504"/>
+        <p14:creationId xmlns:p14="http://schemas.microsoft.com/office/powerpoint/2010/main" val="586387250"/>
       </p:ext>
     </p:extLst>
   </p:cSld>
@@ -1742,91 +2033,7 @@
 </p:notes>
 </file>
 
-<file path=ppt/notesSlides/notesSlide2.xml><?xml version="1.0" encoding="utf-8"?>
-<p:notes xmlns:a="http://schemas.openxmlformats.org/drawingml/2006/main" xmlns:r="http://schemas.openxmlformats.org/officeDocument/2006/relationships" xmlns:p="http://schemas.openxmlformats.org/presentationml/2006/main">
-  <p:cSld>
-    <p:spTree>
-      <p:nvGrpSpPr>
-        <p:cNvPr id="1" name=""/>
-        <p:cNvGrpSpPr/>
-        <p:nvPr/>
-      </p:nvGrpSpPr>
-      <p:grpSpPr>
-        <a:xfrm>
-          <a:off x="0" y="0"/>
-          <a:ext cx="0" cy="0"/>
-          <a:chOff x="0" y="0"/>
-          <a:chExt cx="0" cy="0"/>
-        </a:xfrm>
-      </p:grpSpPr>
-      <p:sp>
-        <p:nvSpPr>
-          <p:cNvPr id="2" name="Platshållare för bildobjekt 1"/>
-          <p:cNvSpPr>
-            <a:spLocks noGrp="1" noRot="1" noChangeAspect="1"/>
-          </p:cNvSpPr>
-          <p:nvPr>
-            <p:ph type="sldImg"/>
-          </p:nvPr>
-        </p:nvSpPr>
-        <p:spPr/>
-      </p:sp>
-      <p:sp>
-        <p:nvSpPr>
-          <p:cNvPr id="3" name="Platshållare för anteckningar 2"/>
-          <p:cNvSpPr>
-            <a:spLocks noGrp="1"/>
-          </p:cNvSpPr>
-          <p:nvPr>
-            <p:ph type="body" idx="1"/>
-          </p:nvPr>
-        </p:nvSpPr>
-        <p:spPr/>
-        <p:txBody>
-          <a:bodyPr/>
-          <a:lstStyle/>
-          <a:p>
-            <a:endParaRPr lang="sv-SE"/>
-          </a:p>
-        </p:txBody>
-      </p:sp>
-      <p:sp>
-        <p:nvSpPr>
-          <p:cNvPr id="4" name="Platshållare för bildnummer 3"/>
-          <p:cNvSpPr>
-            <a:spLocks noGrp="1"/>
-          </p:cNvSpPr>
-          <p:nvPr>
-            <p:ph type="sldNum" sz="quarter" idx="10"/>
-          </p:nvPr>
-        </p:nvSpPr>
-        <p:spPr/>
-        <p:txBody>
-          <a:bodyPr/>
-          <a:lstStyle/>
-          <a:p>
-            <a:fld id="{8667F948-D2CB-486C-A2EA-FEABC2DAAE8D}" type="slidenum">
-              <a:rPr lang="sv-SE" smtClean="0"/>
-              <a:t>2</a:t>
-            </a:fld>
-            <a:endParaRPr lang="sv-SE"/>
-          </a:p>
-        </p:txBody>
-      </p:sp>
-    </p:spTree>
-    <p:extLst>
-      <p:ext uri="{BB962C8B-B14F-4D97-AF65-F5344CB8AC3E}">
-        <p14:creationId xmlns:p14="http://schemas.microsoft.com/office/powerpoint/2010/main" val="335544334"/>
-      </p:ext>
-    </p:extLst>
-  </p:cSld>
-  <p:clrMapOvr>
-    <a:masterClrMapping/>
-  </p:clrMapOvr>
-</p:notes>
-</file>
-
-<file path=ppt/notesSlides/notesSlide20.xml><?xml version="1.0" encoding="utf-8"?>
+<file path=ppt/notesSlides/notesSlide22.xml><?xml version="1.0" encoding="utf-8"?>
 <p:notes xmlns:a="http://schemas.openxmlformats.org/drawingml/2006/main" xmlns:r="http://schemas.openxmlformats.org/officeDocument/2006/relationships" xmlns:p="http://schemas.openxmlformats.org/presentationml/2006/main">
   <p:cSld>
     <p:spTree>
@@ -1888,7 +2095,7 @@
               <a:defRPr/>
             </a:pPr>
             <a:r>
-              <a:rPr lang="sv-SE" sz="1200" kern="1200" dirty="0" smtClean="0">
+              <a:rPr lang="sv-SE" sz="1200" kern="1200" dirty="0">
                 <a:solidFill>
                   <a:schemeClr val="tx1"/>
                 </a:solidFill>
@@ -1897,7 +2104,31 @@
                 <a:ea typeface="+mn-ea"/>
                 <a:cs typeface="+mn-cs"/>
               </a:rPr>
-              <a:t>En lista över de påträffade felen och hur pass allvarliga ni bedömer dem.</a:t>
+              <a:t>En kort presentation av den del av koden ni valt ut för att göra en formell granskning av och processen ni använt er av inklusive eventuella checklistor, scenarier, </a:t>
+            </a:r>
+            <a:r>
+              <a:rPr lang="sv-SE" sz="1200" kern="1200" dirty="0" err="1">
+                <a:solidFill>
+                  <a:schemeClr val="tx1"/>
+                </a:solidFill>
+                <a:effectLst/>
+                <a:latin typeface="+mn-lt"/>
+                <a:ea typeface="+mn-ea"/>
+                <a:cs typeface="+mn-cs"/>
+              </a:rPr>
+              <a:t>edyl</a:t>
+            </a:r>
+            <a:r>
+              <a:rPr lang="sv-SE" sz="1200" kern="1200" dirty="0">
+                <a:solidFill>
+                  <a:schemeClr val="tx1"/>
+                </a:solidFill>
+                <a:effectLst/>
+                <a:latin typeface="+mn-lt"/>
+                <a:ea typeface="+mn-ea"/>
+                <a:cs typeface="+mn-cs"/>
+              </a:rPr>
+              <a:t>. Ni ska kort motivera valen, och ge tillräckligt med information för att det ska gå att bedöma er. </a:t>
             </a:r>
           </a:p>
           <a:p>
@@ -1922,7 +2153,7 @@
           <a:p>
             <a:fld id="{8667F948-D2CB-486C-A2EA-FEABC2DAAE8D}" type="slidenum">
               <a:rPr lang="sv-SE" smtClean="0"/>
-              <a:t>20</a:t>
+              <a:t>22</a:t>
             </a:fld>
             <a:endParaRPr lang="sv-SE"/>
           </a:p>
@@ -1931,7 +2162,7 @@
     </p:spTree>
     <p:extLst>
       <p:ext uri="{BB962C8B-B14F-4D97-AF65-F5344CB8AC3E}">
-        <p14:creationId xmlns:p14="http://schemas.microsoft.com/office/powerpoint/2010/main" val="1645734220"/>
+        <p14:creationId xmlns:p14="http://schemas.microsoft.com/office/powerpoint/2010/main" val="1836920504"/>
       </p:ext>
     </p:extLst>
   </p:cSld>
@@ -1941,7 +2172,7 @@
 </p:notes>
 </file>
 
-<file path=ppt/notesSlides/notesSlide21.xml><?xml version="1.0" encoding="utf-8"?>
+<file path=ppt/notesSlides/notesSlide23.xml><?xml version="1.0" encoding="utf-8"?>
 <p:notes xmlns:a="http://schemas.openxmlformats.org/drawingml/2006/main" xmlns:r="http://schemas.openxmlformats.org/officeDocument/2006/relationships" xmlns:p="http://schemas.openxmlformats.org/presentationml/2006/main">
   <p:cSld>
     <p:spTree>
@@ -2003,7 +2234,7 @@
               <a:defRPr/>
             </a:pPr>
             <a:r>
-              <a:rPr lang="sv-SE" sz="1200" kern="1200" dirty="0" smtClean="0">
+              <a:rPr lang="sv-SE" sz="1200" kern="1200" dirty="0">
                 <a:solidFill>
                   <a:schemeClr val="tx1"/>
                 </a:solidFill>
@@ -2012,31 +2243,7 @@
                 <a:ea typeface="+mn-ea"/>
                 <a:cs typeface="+mn-cs"/>
               </a:rPr>
-              <a:t>En diskussion om vilka era erfarenheter ni dragit av att tillämpa granskning. Det finns inget rätt eller fel här. Enda sättet att bli underkända är att bara fuska över punkten och bara säga något pliktskyldigt. Ni förväntas förhålla er till såväl kursböckerna som utdelat material och IEEE </a:t>
-            </a:r>
-            <a:r>
-              <a:rPr lang="sv-SE" sz="1200" kern="1200" dirty="0" err="1" smtClean="0">
-                <a:solidFill>
-                  <a:schemeClr val="tx1"/>
-                </a:solidFill>
-                <a:effectLst/>
-                <a:latin typeface="+mn-lt"/>
-                <a:ea typeface="+mn-ea"/>
-                <a:cs typeface="+mn-cs"/>
-              </a:rPr>
-              <a:t>Std</a:t>
-            </a:r>
-            <a:r>
-              <a:rPr lang="sv-SE" sz="1200" kern="1200" dirty="0" smtClean="0">
-                <a:solidFill>
-                  <a:schemeClr val="tx1"/>
-                </a:solidFill>
-                <a:effectLst/>
-                <a:latin typeface="+mn-lt"/>
-                <a:ea typeface="+mn-ea"/>
-                <a:cs typeface="+mn-cs"/>
-              </a:rPr>
-              <a:t> 1028.</a:t>
+              <a:t>En lista över de påträffade felen och hur pass allvarliga ni bedömer dem.</a:t>
             </a:r>
           </a:p>
           <a:p>
@@ -2061,7 +2268,7 @@
           <a:p>
             <a:fld id="{8667F948-D2CB-486C-A2EA-FEABC2DAAE8D}" type="slidenum">
               <a:rPr lang="sv-SE" smtClean="0"/>
-              <a:t>21</a:t>
+              <a:t>23</a:t>
             </a:fld>
             <a:endParaRPr lang="sv-SE"/>
           </a:p>
@@ -2070,7 +2277,7 @@
     </p:spTree>
     <p:extLst>
       <p:ext uri="{BB962C8B-B14F-4D97-AF65-F5344CB8AC3E}">
-        <p14:creationId xmlns:p14="http://schemas.microsoft.com/office/powerpoint/2010/main" val="393491449"/>
+        <p14:creationId xmlns:p14="http://schemas.microsoft.com/office/powerpoint/2010/main" val="1645734220"/>
       </p:ext>
     </p:extLst>
   </p:cSld>
@@ -2080,7 +2287,7 @@
 </p:notes>
 </file>
 
-<file path=ppt/notesSlides/notesSlide22.xml><?xml version="1.0" encoding="utf-8"?>
+<file path=ppt/notesSlides/notesSlide24.xml><?xml version="1.0" encoding="utf-8"?>
 <p:notes xmlns:a="http://schemas.openxmlformats.org/drawingml/2006/main" xmlns:r="http://schemas.openxmlformats.org/officeDocument/2006/relationships" xmlns:p="http://schemas.openxmlformats.org/presentationml/2006/main">
   <p:cSld>
     <p:spTree>
@@ -2142,7 +2349,7 @@
               <a:defRPr/>
             </a:pPr>
             <a:r>
-              <a:rPr lang="sv-SE" sz="1200" kern="1200" dirty="0" smtClean="0">
+              <a:rPr lang="sv-SE" sz="1200" kern="1200" dirty="0">
                 <a:solidFill>
                   <a:schemeClr val="tx1"/>
                 </a:solidFill>
@@ -2151,7 +2358,31 @@
                 <a:ea typeface="+mn-ea"/>
                 <a:cs typeface="+mn-cs"/>
               </a:rPr>
-              <a:t>En presentation av de problem som hittats med hjälp av verktyg för statisk analys och en diskussion av dem enligt anvisningarna. Det räcker alltså inte med att bara lista problemen, ni måste förhålla er till dem också. Tänk också på att ni ska göra detta både på koden som den såg ut före granskningen och på koden efter att ni rättat det som kommit fram under granskningen.</a:t>
+              <a:t>En diskussion om vilka era erfarenheter ni dragit av att tillämpa granskning. Det finns inget rätt eller fel här. Enda sättet att bli underkända är att bara fuska över punkten och bara säga något pliktskyldigt. Ni förväntas förhålla er till såväl kursböckerna som utdelat material och IEEE </a:t>
+            </a:r>
+            <a:r>
+              <a:rPr lang="sv-SE" sz="1200" kern="1200" dirty="0" err="1">
+                <a:solidFill>
+                  <a:schemeClr val="tx1"/>
+                </a:solidFill>
+                <a:effectLst/>
+                <a:latin typeface="+mn-lt"/>
+                <a:ea typeface="+mn-ea"/>
+                <a:cs typeface="+mn-cs"/>
+              </a:rPr>
+              <a:t>Std</a:t>
+            </a:r>
+            <a:r>
+              <a:rPr lang="sv-SE" sz="1200" kern="1200" dirty="0">
+                <a:solidFill>
+                  <a:schemeClr val="tx1"/>
+                </a:solidFill>
+                <a:effectLst/>
+                <a:latin typeface="+mn-lt"/>
+                <a:ea typeface="+mn-ea"/>
+                <a:cs typeface="+mn-cs"/>
+              </a:rPr>
+              <a:t> 1028.</a:t>
             </a:r>
           </a:p>
           <a:p>
@@ -2176,7 +2407,7 @@
           <a:p>
             <a:fld id="{8667F948-D2CB-486C-A2EA-FEABC2DAAE8D}" type="slidenum">
               <a:rPr lang="sv-SE" smtClean="0"/>
-              <a:t>22</a:t>
+              <a:t>24</a:t>
             </a:fld>
             <a:endParaRPr lang="sv-SE"/>
           </a:p>
@@ -2185,7 +2416,7 @@
     </p:spTree>
     <p:extLst>
       <p:ext uri="{BB962C8B-B14F-4D97-AF65-F5344CB8AC3E}">
-        <p14:creationId xmlns:p14="http://schemas.microsoft.com/office/powerpoint/2010/main" val="1343433812"/>
+        <p14:creationId xmlns:p14="http://schemas.microsoft.com/office/powerpoint/2010/main" val="393491449"/>
       </p:ext>
     </p:extLst>
   </p:cSld>
@@ -2195,7 +2426,7 @@
 </p:notes>
 </file>
 
-<file path=ppt/notesSlides/notesSlide23.xml><?xml version="1.0" encoding="utf-8"?>
+<file path=ppt/notesSlides/notesSlide25.xml><?xml version="1.0" encoding="utf-8"?>
 <p:notes xmlns:a="http://schemas.openxmlformats.org/drawingml/2006/main" xmlns:r="http://schemas.openxmlformats.org/officeDocument/2006/relationships" xmlns:p="http://schemas.openxmlformats.org/presentationml/2006/main">
   <p:cSld>
     <p:spTree>
@@ -2257,7 +2488,7 @@
               <a:defRPr/>
             </a:pPr>
             <a:r>
-              <a:rPr lang="sv-SE" sz="1200" kern="1200" dirty="0" smtClean="0">
+              <a:rPr lang="sv-SE" sz="1200" kern="1200" dirty="0">
                 <a:solidFill>
                   <a:schemeClr val="tx1"/>
                 </a:solidFill>
@@ -2266,7 +2497,7 @@
                 <a:ea typeface="+mn-ea"/>
                 <a:cs typeface="+mn-cs"/>
               </a:rPr>
-              <a:t>En presentation och diskussion kring ett antal lämpliga statiska mått på koden. Att vi inte specificerar exakt vilka mått som ska tas upp beror på att olika verktyg har olika uppsättningar, men vi förväntar oss fler och mer intressanta mått än bara rena storleksmått som LOC, #klasser, #metoder, etc. Även här är det viktigt att förhållas sig till måtten, inte bara lista dem.</a:t>
+              <a:t>En presentation av de problem som hittats med hjälp av verktyg för statisk analys och en diskussion av dem enligt anvisningarna. Det räcker alltså inte med att bara lista problemen, ni måste förhålla er till dem också. Tänk också på att ni ska göra detta både på koden som den såg ut före granskningen och på koden efter att ni rättat det som kommit fram under granskningen.</a:t>
             </a:r>
           </a:p>
           <a:p>
@@ -2291,7 +2522,7 @@
           <a:p>
             <a:fld id="{8667F948-D2CB-486C-A2EA-FEABC2DAAE8D}" type="slidenum">
               <a:rPr lang="sv-SE" smtClean="0"/>
-              <a:t>23</a:t>
+              <a:t>25</a:t>
             </a:fld>
             <a:endParaRPr lang="sv-SE"/>
           </a:p>
@@ -2300,7 +2531,7 @@
     </p:spTree>
     <p:extLst>
       <p:ext uri="{BB962C8B-B14F-4D97-AF65-F5344CB8AC3E}">
-        <p14:creationId xmlns:p14="http://schemas.microsoft.com/office/powerpoint/2010/main" val="247082709"/>
+        <p14:creationId xmlns:p14="http://schemas.microsoft.com/office/powerpoint/2010/main" val="1343433812"/>
       </p:ext>
     </p:extLst>
   </p:cSld>
@@ -2310,7 +2541,7 @@
 </p:notes>
 </file>
 
-<file path=ppt/notesSlides/notesSlide24.xml><?xml version="1.0" encoding="utf-8"?>
+<file path=ppt/notesSlides/notesSlide26.xml><?xml version="1.0" encoding="utf-8"?>
 <p:notes xmlns:a="http://schemas.openxmlformats.org/drawingml/2006/main" xmlns:r="http://schemas.openxmlformats.org/officeDocument/2006/relationships" xmlns:p="http://schemas.openxmlformats.org/presentationml/2006/main">
   <p:cSld>
     <p:spTree>
@@ -2372,7 +2603,7 @@
               <a:defRPr/>
             </a:pPr>
             <a:r>
-              <a:rPr lang="sv-SE" sz="1200" kern="1200" dirty="0" smtClean="0">
+              <a:rPr lang="sv-SE" sz="1200" kern="1200" dirty="0">
                 <a:solidFill>
                   <a:schemeClr val="tx1"/>
                 </a:solidFill>
@@ -2381,7 +2612,7 @@
                 <a:ea typeface="+mn-ea"/>
                 <a:cs typeface="+mn-cs"/>
               </a:rPr>
-              <a:t>En översikt över vilken täckningsgrad era testfall uppnått. Denna kan antagligen tas rakt av från verktyget ni använt för att mäta den. Om ni inte uppnått fullständig täckning så ska detta förklaras och motiveras.</a:t>
+              <a:t>En presentation och diskussion kring ett antal lämpliga statiska mått på koden. Att vi inte specificerar exakt vilka mått som ska tas upp beror på att olika verktyg har olika uppsättningar, men vi förväntar oss fler och mer intressanta mått än bara rena storleksmått som LOC, #klasser, #metoder, etc. Även här är det viktigt att förhållas sig till måtten, inte bara lista dem.</a:t>
             </a:r>
           </a:p>
           <a:p>
@@ -2406,7 +2637,7 @@
           <a:p>
             <a:fld id="{8667F948-D2CB-486C-A2EA-FEABC2DAAE8D}" type="slidenum">
               <a:rPr lang="sv-SE" smtClean="0"/>
-              <a:t>24</a:t>
+              <a:t>26</a:t>
             </a:fld>
             <a:endParaRPr lang="sv-SE"/>
           </a:p>
@@ -2415,7 +2646,7 @@
     </p:spTree>
     <p:extLst>
       <p:ext uri="{BB962C8B-B14F-4D97-AF65-F5344CB8AC3E}">
-        <p14:creationId xmlns:p14="http://schemas.microsoft.com/office/powerpoint/2010/main" val="169751880"/>
+        <p14:creationId xmlns:p14="http://schemas.microsoft.com/office/powerpoint/2010/main" val="247082709"/>
       </p:ext>
     </p:extLst>
   </p:cSld>
@@ -2425,7 +2656,7 @@
 </p:notes>
 </file>
 
-<file path=ppt/notesSlides/notesSlide25.xml><?xml version="1.0" encoding="utf-8"?>
+<file path=ppt/notesSlides/notesSlide27.xml><?xml version="1.0" encoding="utf-8"?>
 <p:notes xmlns:a="http://schemas.openxmlformats.org/drawingml/2006/main" xmlns:r="http://schemas.openxmlformats.org/officeDocument/2006/relationships" xmlns:p="http://schemas.openxmlformats.org/presentationml/2006/main">
   <p:cSld>
     <p:spTree>
@@ -2487,7 +2718,7 @@
               <a:defRPr/>
             </a:pPr>
             <a:r>
-              <a:rPr lang="sv-SE" sz="1200" kern="1200" dirty="0" smtClean="0">
+              <a:rPr lang="sv-SE" sz="1200" kern="1200" dirty="0">
                 <a:solidFill>
                   <a:schemeClr val="tx1"/>
                 </a:solidFill>
@@ -2496,9 +2727,93 @@
                 <a:ea typeface="+mn-ea"/>
                 <a:cs typeface="+mn-cs"/>
               </a:rPr>
-              <a:t>En kort presentation av hur ni gått tillväga för att testa koden med en profiler och vilka resultat ni fick fram. Även här är det viktigt att förhållas sig till måtten, inte bara presentera dem.</a:t>
-            </a:r>
-          </a:p>
+              <a:t>En översikt över vilken täckningsgrad era testfall uppnått. Denna kan antagligen tas rakt av från verktyget ni använt för att mäta den. Om ni inte uppnått fullständig täckning så ska detta förklaras och motiveras.</a:t>
+            </a:r>
+          </a:p>
+          <a:p>
+            <a:endParaRPr lang="sv-SE" dirty="0"/>
+          </a:p>
+        </p:txBody>
+      </p:sp>
+      <p:sp>
+        <p:nvSpPr>
+          <p:cNvPr id="4" name="Platshållare för bildnummer 3"/>
+          <p:cNvSpPr>
+            <a:spLocks noGrp="1"/>
+          </p:cNvSpPr>
+          <p:nvPr>
+            <p:ph type="sldNum" sz="quarter" idx="10"/>
+          </p:nvPr>
+        </p:nvSpPr>
+        <p:spPr/>
+        <p:txBody>
+          <a:bodyPr/>
+          <a:lstStyle/>
+          <a:p>
+            <a:fld id="{8667F948-D2CB-486C-A2EA-FEABC2DAAE8D}" type="slidenum">
+              <a:rPr lang="sv-SE" smtClean="0"/>
+              <a:t>27</a:t>
+            </a:fld>
+            <a:endParaRPr lang="sv-SE"/>
+          </a:p>
+        </p:txBody>
+      </p:sp>
+    </p:spTree>
+    <p:extLst>
+      <p:ext uri="{BB962C8B-B14F-4D97-AF65-F5344CB8AC3E}">
+        <p14:creationId xmlns:p14="http://schemas.microsoft.com/office/powerpoint/2010/main" val="169751880"/>
+      </p:ext>
+    </p:extLst>
+  </p:cSld>
+  <p:clrMapOvr>
+    <a:masterClrMapping/>
+  </p:clrMapOvr>
+</p:notes>
+</file>
+
+<file path=ppt/notesSlides/notesSlide28.xml><?xml version="1.0" encoding="utf-8"?>
+<p:notes xmlns:a="http://schemas.openxmlformats.org/drawingml/2006/main" xmlns:r="http://schemas.openxmlformats.org/officeDocument/2006/relationships" xmlns:p="http://schemas.openxmlformats.org/presentationml/2006/main">
+  <p:cSld>
+    <p:spTree>
+      <p:nvGrpSpPr>
+        <p:cNvPr id="1" name=""/>
+        <p:cNvGrpSpPr/>
+        <p:nvPr/>
+      </p:nvGrpSpPr>
+      <p:grpSpPr>
+        <a:xfrm>
+          <a:off x="0" y="0"/>
+          <a:ext cx="0" cy="0"/>
+          <a:chOff x="0" y="0"/>
+          <a:chExt cx="0" cy="0"/>
+        </a:xfrm>
+      </p:grpSpPr>
+      <p:sp>
+        <p:nvSpPr>
+          <p:cNvPr id="2" name="Platshållare för bildobjekt 1"/>
+          <p:cNvSpPr>
+            <a:spLocks noGrp="1" noRot="1" noChangeAspect="1"/>
+          </p:cNvSpPr>
+          <p:nvPr>
+            <p:ph type="sldImg"/>
+          </p:nvPr>
+        </p:nvSpPr>
+        <p:spPr/>
+      </p:sp>
+      <p:sp>
+        <p:nvSpPr>
+          <p:cNvPr id="3" name="Platshållare för anteckningar 2"/>
+          <p:cNvSpPr>
+            <a:spLocks noGrp="1"/>
+          </p:cNvSpPr>
+          <p:nvPr>
+            <p:ph type="body" idx="1"/>
+          </p:nvPr>
+        </p:nvSpPr>
+        <p:spPr/>
+        <p:txBody>
+          <a:bodyPr/>
+          <a:lstStyle/>
           <a:p>
             <a:pPr marL="0" marR="0" lvl="0" indent="0" algn="l" defTabSz="914400" rtl="0" eaLnBrk="1" fontAlgn="auto" latinLnBrk="0" hangingPunct="1">
               <a:lnSpc>
@@ -2517,100 +2832,19 @@
               <a:tabLst/>
               <a:defRPr/>
             </a:pPr>
-            <a:endParaRPr lang="sv-SE" sz="1200" kern="1200" dirty="0" smtClean="0">
-              <a:solidFill>
-                <a:schemeClr val="tx1"/>
-              </a:solidFill>
-              <a:effectLst/>
-              <a:latin typeface="+mn-lt"/>
-              <a:ea typeface="+mn-ea"/>
-              <a:cs typeface="+mn-cs"/>
-            </a:endParaRPr>
-          </a:p>
-          <a:p>
-            <a:endParaRPr lang="sv-SE" dirty="0"/>
-          </a:p>
-        </p:txBody>
-      </p:sp>
-      <p:sp>
-        <p:nvSpPr>
-          <p:cNvPr id="4" name="Platshållare för bildnummer 3"/>
-          <p:cNvSpPr>
-            <a:spLocks noGrp="1"/>
-          </p:cNvSpPr>
-          <p:nvPr>
-            <p:ph type="sldNum" sz="quarter" idx="10"/>
-          </p:nvPr>
-        </p:nvSpPr>
-        <p:spPr/>
-        <p:txBody>
-          <a:bodyPr/>
-          <a:lstStyle/>
-          <a:p>
-            <a:fld id="{8667F948-D2CB-486C-A2EA-FEABC2DAAE8D}" type="slidenum">
-              <a:rPr lang="sv-SE" smtClean="0"/>
-              <a:t>25</a:t>
-            </a:fld>
-            <a:endParaRPr lang="sv-SE"/>
-          </a:p>
-        </p:txBody>
-      </p:sp>
-    </p:spTree>
-    <p:extLst>
-      <p:ext uri="{BB962C8B-B14F-4D97-AF65-F5344CB8AC3E}">
-        <p14:creationId xmlns:p14="http://schemas.microsoft.com/office/powerpoint/2010/main" val="1278246246"/>
-      </p:ext>
-    </p:extLst>
-  </p:cSld>
-  <p:clrMapOvr>
-    <a:masterClrMapping/>
-  </p:clrMapOvr>
-</p:notes>
-</file>
-
-<file path=ppt/notesSlides/notesSlide26.xml><?xml version="1.0" encoding="utf-8"?>
-<p:notes xmlns:a="http://schemas.openxmlformats.org/drawingml/2006/main" xmlns:r="http://schemas.openxmlformats.org/officeDocument/2006/relationships" xmlns:p="http://schemas.openxmlformats.org/presentationml/2006/main">
-  <p:cSld>
-    <p:spTree>
-      <p:nvGrpSpPr>
-        <p:cNvPr id="1" name=""/>
-        <p:cNvGrpSpPr/>
-        <p:nvPr/>
-      </p:nvGrpSpPr>
-      <p:grpSpPr>
-        <a:xfrm>
-          <a:off x="0" y="0"/>
-          <a:ext cx="0" cy="0"/>
-          <a:chOff x="0" y="0"/>
-          <a:chExt cx="0" cy="0"/>
-        </a:xfrm>
-      </p:grpSpPr>
-      <p:sp>
-        <p:nvSpPr>
-          <p:cNvPr id="2" name="Platshållare för bildobjekt 1"/>
-          <p:cNvSpPr>
-            <a:spLocks noGrp="1" noRot="1" noChangeAspect="1"/>
-          </p:cNvSpPr>
-          <p:nvPr>
-            <p:ph type="sldImg"/>
-          </p:nvPr>
-        </p:nvSpPr>
-        <p:spPr/>
-      </p:sp>
-      <p:sp>
-        <p:nvSpPr>
-          <p:cNvPr id="3" name="Platshållare för anteckningar 2"/>
-          <p:cNvSpPr>
-            <a:spLocks noGrp="1"/>
-          </p:cNvSpPr>
-          <p:nvPr>
-            <p:ph type="body" idx="1"/>
-          </p:nvPr>
-        </p:nvSpPr>
-        <p:spPr/>
-        <p:txBody>
-          <a:bodyPr/>
-          <a:lstStyle/>
+            <a:r>
+              <a:rPr lang="sv-SE" sz="1200" kern="1200" dirty="0">
+                <a:solidFill>
+                  <a:schemeClr val="tx1"/>
+                </a:solidFill>
+                <a:effectLst/>
+                <a:latin typeface="+mn-lt"/>
+                <a:ea typeface="+mn-ea"/>
+                <a:cs typeface="+mn-cs"/>
+              </a:rPr>
+              <a:t>En kort presentation av hur ni gått tillväga för att testa koden med en profiler och vilka resultat ni fick fram. Även här är det viktigt att förhållas sig till måtten, inte bara presentera dem.</a:t>
+            </a:r>
+          </a:p>
           <a:p>
             <a:pPr marL="0" marR="0" lvl="0" indent="0" algn="l" defTabSz="914400" rtl="0" eaLnBrk="1" fontAlgn="auto" latinLnBrk="0" hangingPunct="1">
               <a:lnSpc>
@@ -2629,18 +2863,15 @@
               <a:tabLst/>
               <a:defRPr/>
             </a:pPr>
-            <a:r>
-              <a:rPr lang="sv-SE" sz="1200" kern="1200" dirty="0" smtClean="0">
-                <a:solidFill>
-                  <a:schemeClr val="tx1"/>
-                </a:solidFill>
-                <a:effectLst/>
-                <a:latin typeface="+mn-lt"/>
-                <a:ea typeface="+mn-ea"/>
-                <a:cs typeface="+mn-cs"/>
-              </a:rPr>
-              <a:t>Byggscriptets första (seriösa) version, och den slutliga.</a:t>
-            </a:r>
+            <a:endParaRPr lang="sv-SE" sz="1200" kern="1200" dirty="0">
+              <a:solidFill>
+                <a:schemeClr val="tx1"/>
+              </a:solidFill>
+              <a:effectLst/>
+              <a:latin typeface="+mn-lt"/>
+              <a:ea typeface="+mn-ea"/>
+              <a:cs typeface="+mn-cs"/>
+            </a:endParaRPr>
           </a:p>
           <a:p>
             <a:endParaRPr lang="sv-SE" dirty="0"/>
@@ -2664,7 +2895,7 @@
           <a:p>
             <a:fld id="{8667F948-D2CB-486C-A2EA-FEABC2DAAE8D}" type="slidenum">
               <a:rPr lang="sv-SE" smtClean="0"/>
-              <a:t>26</a:t>
+              <a:t>28</a:t>
             </a:fld>
             <a:endParaRPr lang="sv-SE"/>
           </a:p>
@@ -2673,7 +2904,7 @@
     </p:spTree>
     <p:extLst>
       <p:ext uri="{BB962C8B-B14F-4D97-AF65-F5344CB8AC3E}">
-        <p14:creationId xmlns:p14="http://schemas.microsoft.com/office/powerpoint/2010/main" val="109849433"/>
+        <p14:creationId xmlns:p14="http://schemas.microsoft.com/office/powerpoint/2010/main" val="1278246246"/>
       </p:ext>
     </p:extLst>
   </p:cSld>
@@ -2683,7 +2914,7 @@
 </p:notes>
 </file>
 
-<file path=ppt/notesSlides/notesSlide27.xml><?xml version="1.0" encoding="utf-8"?>
+<file path=ppt/notesSlides/notesSlide29.xml><?xml version="1.0" encoding="utf-8"?>
 <p:notes xmlns:a="http://schemas.openxmlformats.org/drawingml/2006/main" xmlns:r="http://schemas.openxmlformats.org/officeDocument/2006/relationships" xmlns:p="http://schemas.openxmlformats.org/presentationml/2006/main">
   <p:cSld>
     <p:spTree>
@@ -2745,7 +2976,7 @@
               <a:defRPr/>
             </a:pPr>
             <a:r>
-              <a:rPr lang="sv-SE" sz="1200" kern="1200" dirty="0" smtClean="0">
+              <a:rPr lang="sv-SE" sz="1200" kern="1200" dirty="0">
                 <a:solidFill>
                   <a:schemeClr val="tx1"/>
                 </a:solidFill>
@@ -2754,7 +2985,7 @@
                 <a:ea typeface="+mn-ea"/>
                 <a:cs typeface="+mn-cs"/>
               </a:rPr>
-              <a:t>Här kan ni ta upp övrigt av relevans för bedömningen av ert arbete. Om avsnittet inte behövs kan det plockas bort.</a:t>
+              <a:t>Byggscriptets första (seriösa) version, och den slutliga.</a:t>
             </a:r>
           </a:p>
           <a:p>
@@ -2779,7 +3010,7 @@
           <a:p>
             <a:fld id="{8667F948-D2CB-486C-A2EA-FEABC2DAAE8D}" type="slidenum">
               <a:rPr lang="sv-SE" smtClean="0"/>
-              <a:t>27</a:t>
+              <a:t>29</a:t>
             </a:fld>
             <a:endParaRPr lang="sv-SE"/>
           </a:p>
@@ -2788,7 +3019,7 @@
     </p:spTree>
     <p:extLst>
       <p:ext uri="{BB962C8B-B14F-4D97-AF65-F5344CB8AC3E}">
-        <p14:creationId xmlns:p14="http://schemas.microsoft.com/office/powerpoint/2010/main" val="3113925887"/>
+        <p14:creationId xmlns:p14="http://schemas.microsoft.com/office/powerpoint/2010/main" val="109849433"/>
       </p:ext>
     </p:extLst>
   </p:cSld>
@@ -2860,7 +3091,7 @@
               <a:defRPr/>
             </a:pPr>
             <a:r>
-              <a:rPr lang="sv-SE" dirty="0" smtClean="0"/>
+              <a:rPr lang="sv-SE" dirty="0"/>
               <a:t>En eller flera bilder som visar designen av det slutliga systemet. Lämpligt format är ett eller flera klassdiagram, plus eventuella andra modeller som behövs för att förstå hur systemet är uppbyggt. Diagrammen ska vara läsbara. Det är dock fullständigt okej att de är detaljerade, bara det går att zooma in ordentligt på dem. Ett tips är att börja med ett översiktligt diagram som inte innehåller mer än paket och klassnamn, och att sedan lägga till mer detaljerade diagram efter det.</a:t>
             </a:r>
           </a:p>
@@ -2896,6 +3127,121 @@
     <p:extLst>
       <p:ext uri="{BB962C8B-B14F-4D97-AF65-F5344CB8AC3E}">
         <p14:creationId xmlns:p14="http://schemas.microsoft.com/office/powerpoint/2010/main" val="407466993"/>
+      </p:ext>
+    </p:extLst>
+  </p:cSld>
+  <p:clrMapOvr>
+    <a:masterClrMapping/>
+  </p:clrMapOvr>
+</p:notes>
+</file>
+
+<file path=ppt/notesSlides/notesSlide30.xml><?xml version="1.0" encoding="utf-8"?>
+<p:notes xmlns:a="http://schemas.openxmlformats.org/drawingml/2006/main" xmlns:r="http://schemas.openxmlformats.org/officeDocument/2006/relationships" xmlns:p="http://schemas.openxmlformats.org/presentationml/2006/main">
+  <p:cSld>
+    <p:spTree>
+      <p:nvGrpSpPr>
+        <p:cNvPr id="1" name=""/>
+        <p:cNvGrpSpPr/>
+        <p:nvPr/>
+      </p:nvGrpSpPr>
+      <p:grpSpPr>
+        <a:xfrm>
+          <a:off x="0" y="0"/>
+          <a:ext cx="0" cy="0"/>
+          <a:chOff x="0" y="0"/>
+          <a:chExt cx="0" cy="0"/>
+        </a:xfrm>
+      </p:grpSpPr>
+      <p:sp>
+        <p:nvSpPr>
+          <p:cNvPr id="2" name="Platshållare för bildobjekt 1"/>
+          <p:cNvSpPr>
+            <a:spLocks noGrp="1" noRot="1" noChangeAspect="1"/>
+          </p:cNvSpPr>
+          <p:nvPr>
+            <p:ph type="sldImg"/>
+          </p:nvPr>
+        </p:nvSpPr>
+        <p:spPr/>
+      </p:sp>
+      <p:sp>
+        <p:nvSpPr>
+          <p:cNvPr id="3" name="Platshållare för anteckningar 2"/>
+          <p:cNvSpPr>
+            <a:spLocks noGrp="1"/>
+          </p:cNvSpPr>
+          <p:nvPr>
+            <p:ph type="body" idx="1"/>
+          </p:nvPr>
+        </p:nvSpPr>
+        <p:spPr/>
+        <p:txBody>
+          <a:bodyPr/>
+          <a:lstStyle/>
+          <a:p>
+            <a:pPr marL="0" marR="0" lvl="0" indent="0" algn="l" defTabSz="914400" rtl="0" eaLnBrk="1" fontAlgn="auto" latinLnBrk="0" hangingPunct="1">
+              <a:lnSpc>
+                <a:spcPct val="100000"/>
+              </a:lnSpc>
+              <a:spcBef>
+                <a:spcPts val="0"/>
+              </a:spcBef>
+              <a:spcAft>
+                <a:spcPts val="0"/>
+              </a:spcAft>
+              <a:buClrTx/>
+              <a:buSzTx/>
+              <a:buFontTx/>
+              <a:buNone/>
+              <a:tabLst/>
+              <a:defRPr/>
+            </a:pPr>
+            <a:r>
+              <a:rPr lang="sv-SE" sz="1200" kern="1200" dirty="0">
+                <a:solidFill>
+                  <a:schemeClr val="tx1"/>
+                </a:solidFill>
+                <a:effectLst/>
+                <a:latin typeface="+mn-lt"/>
+                <a:ea typeface="+mn-ea"/>
+                <a:cs typeface="+mn-cs"/>
+              </a:rPr>
+              <a:t>Här kan ni ta upp övrigt av relevans för bedömningen av ert arbete. Om avsnittet inte behövs kan det plockas bort.</a:t>
+            </a:r>
+          </a:p>
+          <a:p>
+            <a:endParaRPr lang="sv-SE" dirty="0"/>
+          </a:p>
+        </p:txBody>
+      </p:sp>
+      <p:sp>
+        <p:nvSpPr>
+          <p:cNvPr id="4" name="Platshållare för bildnummer 3"/>
+          <p:cNvSpPr>
+            <a:spLocks noGrp="1"/>
+          </p:cNvSpPr>
+          <p:nvPr>
+            <p:ph type="sldNum" sz="quarter" idx="10"/>
+          </p:nvPr>
+        </p:nvSpPr>
+        <p:spPr/>
+        <p:txBody>
+          <a:bodyPr/>
+          <a:lstStyle/>
+          <a:p>
+            <a:fld id="{8667F948-D2CB-486C-A2EA-FEABC2DAAE8D}" type="slidenum">
+              <a:rPr lang="sv-SE" smtClean="0"/>
+              <a:t>30</a:t>
+            </a:fld>
+            <a:endParaRPr lang="sv-SE"/>
+          </a:p>
+        </p:txBody>
+      </p:sp>
+    </p:spTree>
+    <p:extLst>
+      <p:ext uri="{BB962C8B-B14F-4D97-AF65-F5344CB8AC3E}">
+        <p14:creationId xmlns:p14="http://schemas.microsoft.com/office/powerpoint/2010/main" val="3113925887"/>
       </p:ext>
     </p:extLst>
   </p:cSld>
@@ -2967,7 +3313,7 @@
               <a:defRPr/>
             </a:pPr>
             <a:r>
-              <a:rPr lang="sv-SE" sz="1200" kern="1200" dirty="0" smtClean="0">
+              <a:rPr lang="sv-SE" sz="1200" kern="1200" dirty="0">
                 <a:solidFill>
                   <a:schemeClr val="tx1"/>
                 </a:solidFill>
@@ -2979,7 +3325,7 @@
               <a:t>Två eller tre exempel per</a:t>
             </a:r>
             <a:r>
-              <a:rPr lang="sv-SE" sz="1200" kern="1200" baseline="0" dirty="0" smtClean="0">
+              <a:rPr lang="sv-SE" sz="1200" kern="1200" baseline="0" dirty="0">
                 <a:solidFill>
                   <a:schemeClr val="tx1"/>
                 </a:solidFill>
@@ -2991,7 +3337,7 @@
               <a:t> person i projektet på hur ni tillämpat TDD med koden för såväl testfallen som koden som ska testas. (Det kan alltså bli upp till 15 sidor för en fempersonersgrupp.) Exemplen ska vara från olika </a:t>
             </a:r>
             <a:r>
-              <a:rPr lang="sv-SE" sz="1200" kern="1200" baseline="0" dirty="0" err="1" smtClean="0">
+              <a:rPr lang="sv-SE" sz="1200" kern="1200" baseline="0" dirty="0" err="1">
                 <a:solidFill>
                   <a:schemeClr val="tx1"/>
                 </a:solidFill>
@@ -3003,7 +3349,7 @@
               <a:t>faser</a:t>
             </a:r>
             <a:r>
-              <a:rPr lang="sv-SE" sz="1200" kern="1200" dirty="0" err="1" smtClean="0">
+              <a:rPr lang="sv-SE" sz="1200" kern="1200" dirty="0" err="1">
                 <a:solidFill>
                   <a:schemeClr val="tx1"/>
                 </a:solidFill>
@@ -3015,7 +3361,7 @@
               <a:t>i</a:t>
             </a:r>
             <a:r>
-              <a:rPr lang="sv-SE" sz="1200" kern="1200" dirty="0" smtClean="0">
+              <a:rPr lang="sv-SE" sz="1200" kern="1200" dirty="0">
                 <a:solidFill>
                   <a:schemeClr val="tx1"/>
                 </a:solidFill>
@@ -3130,7 +3476,7 @@
               <a:defRPr/>
             </a:pPr>
             <a:r>
-              <a:rPr lang="sv-SE" sz="1200" kern="1200" dirty="0" smtClean="0">
+              <a:rPr lang="sv-SE" sz="1200" kern="1200" dirty="0">
                 <a:solidFill>
                   <a:schemeClr val="tx1"/>
                 </a:solidFill>
@@ -3142,7 +3488,7 @@
               <a:t>Två eller tre exempel per</a:t>
             </a:r>
             <a:r>
-              <a:rPr lang="sv-SE" sz="1200" kern="1200" baseline="0" dirty="0" smtClean="0">
+              <a:rPr lang="sv-SE" sz="1200" kern="1200" baseline="0" dirty="0">
                 <a:solidFill>
                   <a:schemeClr val="tx1"/>
                 </a:solidFill>
@@ -3154,7 +3500,7 @@
               <a:t> person i projektet på hur ni tillämpat TDD med koden för såväl testfallen som koden som ska testas. (Det kan alltså bli upp till 15 sidor för en fempersonersgrupp.) Exemplen ska vara från olika </a:t>
             </a:r>
             <a:r>
-              <a:rPr lang="sv-SE" sz="1200" kern="1200" baseline="0" dirty="0" err="1" smtClean="0">
+              <a:rPr lang="sv-SE" sz="1200" kern="1200" baseline="0" dirty="0" err="1">
                 <a:solidFill>
                   <a:schemeClr val="tx1"/>
                 </a:solidFill>
@@ -3166,7 +3512,7 @@
               <a:t>faser</a:t>
             </a:r>
             <a:r>
-              <a:rPr lang="sv-SE" sz="1200" kern="1200" dirty="0" err="1" smtClean="0">
+              <a:rPr lang="sv-SE" sz="1200" kern="1200" dirty="0" err="1">
                 <a:solidFill>
                   <a:schemeClr val="tx1"/>
                 </a:solidFill>
@@ -3178,7 +3524,7 @@
               <a:t>i</a:t>
             </a:r>
             <a:r>
-              <a:rPr lang="sv-SE" sz="1200" kern="1200" dirty="0" smtClean="0">
+              <a:rPr lang="sv-SE" sz="1200" kern="1200" dirty="0">
                 <a:solidFill>
                   <a:schemeClr val="tx1"/>
                 </a:solidFill>
@@ -3293,8 +3639,64 @@
               <a:defRPr/>
             </a:pPr>
             <a:r>
-              <a:rPr lang="sv-SE" dirty="0" smtClean="0"/>
-              <a:t>En diskussion om vilka era erfarenheter ni dragit av att tillämpa TDD. Det finns inget rätt eller fel här. Enda sättet att bli underkända är att bara fuska över punkten och säga något pliktskyldigt.</a:t>
+              <a:rPr lang="sv-SE" sz="1200" kern="1200" dirty="0">
+                <a:solidFill>
+                  <a:schemeClr val="tx1"/>
+                </a:solidFill>
+                <a:effectLst/>
+                <a:latin typeface="+mn-lt"/>
+                <a:ea typeface="+mn-ea"/>
+                <a:cs typeface="+mn-cs"/>
+              </a:rPr>
+              <a:t>Två eller tre exempel per</a:t>
+            </a:r>
+            <a:r>
+              <a:rPr lang="sv-SE" sz="1200" kern="1200" baseline="0" dirty="0">
+                <a:solidFill>
+                  <a:schemeClr val="tx1"/>
+                </a:solidFill>
+                <a:effectLst/>
+                <a:latin typeface="+mn-lt"/>
+                <a:ea typeface="+mn-ea"/>
+                <a:cs typeface="+mn-cs"/>
+              </a:rPr>
+              <a:t> person i projektet på hur ni tillämpat TDD med koden för såväl testfallen som koden som ska testas. (Det kan alltså bli upp till 15 sidor för en fempersonersgrupp.) Exemplen ska vara från olika </a:t>
+            </a:r>
+            <a:r>
+              <a:rPr lang="sv-SE" sz="1200" kern="1200" baseline="0" dirty="0" err="1">
+                <a:solidFill>
+                  <a:schemeClr val="tx1"/>
+                </a:solidFill>
+                <a:effectLst/>
+                <a:latin typeface="+mn-lt"/>
+                <a:ea typeface="+mn-ea"/>
+                <a:cs typeface="+mn-cs"/>
+              </a:rPr>
+              <a:t>faser</a:t>
+            </a:r>
+            <a:r>
+              <a:rPr lang="sv-SE" sz="1200" kern="1200" dirty="0" err="1">
+                <a:solidFill>
+                  <a:schemeClr val="tx1"/>
+                </a:solidFill>
+                <a:effectLst/>
+                <a:latin typeface="+mn-lt"/>
+                <a:ea typeface="+mn-ea"/>
+                <a:cs typeface="+mn-cs"/>
+              </a:rPr>
+              <a:t>i</a:t>
+            </a:r>
+            <a:r>
+              <a:rPr lang="sv-SE" sz="1200" kern="1200" dirty="0">
+                <a:solidFill>
+                  <a:schemeClr val="tx1"/>
+                </a:solidFill>
+                <a:effectLst/>
+                <a:latin typeface="+mn-lt"/>
+                <a:ea typeface="+mn-ea"/>
+                <a:cs typeface="+mn-cs"/>
+              </a:rPr>
+              <a:t> projektet. Om ni har använt versionshanteringssystemet ordentligt bör all information som efterfrågas här finnas i det. Tänk på att kodexemplen ska vara läsbara. </a:t>
             </a:r>
           </a:p>
           <a:p>
@@ -3328,7 +3730,7 @@
     </p:spTree>
     <p:extLst>
       <p:ext uri="{BB962C8B-B14F-4D97-AF65-F5344CB8AC3E}">
-        <p14:creationId xmlns:p14="http://schemas.microsoft.com/office/powerpoint/2010/main" val="4160569562"/>
+        <p14:creationId xmlns:p14="http://schemas.microsoft.com/office/powerpoint/2010/main" val="437511418"/>
       </p:ext>
     </p:extLst>
   </p:cSld>
@@ -3400,7 +3802,7 @@
               <a:defRPr/>
             </a:pPr>
             <a:r>
-              <a:rPr lang="sv-SE" sz="1200" kern="1200" dirty="0" smtClean="0">
+              <a:rPr lang="sv-SE" sz="1200" kern="1200" dirty="0">
                 <a:solidFill>
                   <a:schemeClr val="tx1"/>
                 </a:solidFill>
@@ -3409,7 +3811,55 @@
                 <a:ea typeface="+mn-ea"/>
                 <a:cs typeface="+mn-cs"/>
               </a:rPr>
-              <a:t>En kort textuell presentation av vad ni valt ut för att tillämpa ekvivalensklassuppdelning på. Ni ska kort motivera valet, och ge tillräckligt med information för att det ska gå att bedöma er. Detta avsnitt och de följande (till och med testmatrisen) ska finnas för samtliga delar ni tillämpat ekvivalensklassuppdelning på. Om ni inte tillämpat ekvivalensklassuppdelning tar ni bort dessa bilder.</a:t>
+              <a:t>Två eller tre exempel per</a:t>
+            </a:r>
+            <a:r>
+              <a:rPr lang="sv-SE" sz="1200" kern="1200" baseline="0" dirty="0">
+                <a:solidFill>
+                  <a:schemeClr val="tx1"/>
+                </a:solidFill>
+                <a:effectLst/>
+                <a:latin typeface="+mn-lt"/>
+                <a:ea typeface="+mn-ea"/>
+                <a:cs typeface="+mn-cs"/>
+              </a:rPr>
+              <a:t> person i projektet på hur ni tillämpat TDD med koden för såväl testfallen som koden som ska testas. (Det kan alltså bli upp till 15 sidor för en fempersonersgrupp.) Exemplen ska vara från olika </a:t>
+            </a:r>
+            <a:r>
+              <a:rPr lang="sv-SE" sz="1200" kern="1200" baseline="0" dirty="0" err="1">
+                <a:solidFill>
+                  <a:schemeClr val="tx1"/>
+                </a:solidFill>
+                <a:effectLst/>
+                <a:latin typeface="+mn-lt"/>
+                <a:ea typeface="+mn-ea"/>
+                <a:cs typeface="+mn-cs"/>
+              </a:rPr>
+              <a:t>faser</a:t>
+            </a:r>
+            <a:r>
+              <a:rPr lang="sv-SE" sz="1200" kern="1200" dirty="0" err="1">
+                <a:solidFill>
+                  <a:schemeClr val="tx1"/>
+                </a:solidFill>
+                <a:effectLst/>
+                <a:latin typeface="+mn-lt"/>
+                <a:ea typeface="+mn-ea"/>
+                <a:cs typeface="+mn-cs"/>
+              </a:rPr>
+              <a:t>i</a:t>
+            </a:r>
+            <a:r>
+              <a:rPr lang="sv-SE" sz="1200" kern="1200" dirty="0">
+                <a:solidFill>
+                  <a:schemeClr val="tx1"/>
+                </a:solidFill>
+                <a:effectLst/>
+                <a:latin typeface="+mn-lt"/>
+                <a:ea typeface="+mn-ea"/>
+                <a:cs typeface="+mn-cs"/>
+              </a:rPr>
+              <a:t> projektet. Om ni har använt versionshanteringssystemet ordentligt bör all information som efterfrågas här finnas i det. Tänk på att kodexemplen ska vara läsbara. </a:t>
             </a:r>
           </a:p>
           <a:p>
@@ -3443,7 +3893,7 @@
     </p:spTree>
     <p:extLst>
       <p:ext uri="{BB962C8B-B14F-4D97-AF65-F5344CB8AC3E}">
-        <p14:creationId xmlns:p14="http://schemas.microsoft.com/office/powerpoint/2010/main" val="2473427308"/>
+        <p14:creationId xmlns:p14="http://schemas.microsoft.com/office/powerpoint/2010/main" val="2111164777"/>
       </p:ext>
     </p:extLst>
   </p:cSld>
@@ -3515,7 +3965,7 @@
               <a:defRPr/>
             </a:pPr>
             <a:r>
-              <a:rPr lang="sv-SE" sz="1200" kern="1200" dirty="0" smtClean="0">
+              <a:rPr lang="sv-SE" sz="1200" kern="1200" dirty="0">
                 <a:solidFill>
                   <a:schemeClr val="tx1"/>
                 </a:solidFill>
@@ -3524,10 +3974,10 @@
                 <a:ea typeface="+mn-ea"/>
                 <a:cs typeface="+mn-cs"/>
               </a:rPr>
-              <a:t>Samtliga ekvivalensklasser för denna del presenterade på ett tydligt sätt. Använd</a:t>
-            </a:r>
-            <a:r>
-              <a:rPr lang="sv-SE" sz="1200" kern="1200" baseline="0" dirty="0" smtClean="0">
+              <a:t>Två eller tre exempel per</a:t>
+            </a:r>
+            <a:r>
+              <a:rPr lang="sv-SE" sz="1200" kern="1200" baseline="0" dirty="0">
                 <a:solidFill>
                   <a:schemeClr val="tx1"/>
                 </a:solidFill>
@@ -3536,17 +3986,44 @@
                 <a:ea typeface="+mn-ea"/>
                 <a:cs typeface="+mn-cs"/>
               </a:rPr>
-              <a:t> gärna flera sidor om det behövs.</a:t>
-            </a:r>
-            <a:endParaRPr lang="sv-SE" sz="1200" kern="1200" dirty="0" smtClean="0">
-              <a:solidFill>
-                <a:schemeClr val="tx1"/>
-              </a:solidFill>
-              <a:effectLst/>
-              <a:latin typeface="+mn-lt"/>
-              <a:ea typeface="+mn-ea"/>
-              <a:cs typeface="+mn-cs"/>
-            </a:endParaRPr>
+              <a:t> person i projektet på hur ni tillämpat TDD med koden för såväl testfallen som koden som ska testas. (Det kan alltså bli upp till 15 sidor för en fempersonersgrupp.) Exemplen ska vara från olika </a:t>
+            </a:r>
+            <a:r>
+              <a:rPr lang="sv-SE" sz="1200" kern="1200" baseline="0" dirty="0" err="1">
+                <a:solidFill>
+                  <a:schemeClr val="tx1"/>
+                </a:solidFill>
+                <a:effectLst/>
+                <a:latin typeface="+mn-lt"/>
+                <a:ea typeface="+mn-ea"/>
+                <a:cs typeface="+mn-cs"/>
+              </a:rPr>
+              <a:t>faser</a:t>
+            </a:r>
+            <a:r>
+              <a:rPr lang="sv-SE" sz="1200" kern="1200" dirty="0" err="1">
+                <a:solidFill>
+                  <a:schemeClr val="tx1"/>
+                </a:solidFill>
+                <a:effectLst/>
+                <a:latin typeface="+mn-lt"/>
+                <a:ea typeface="+mn-ea"/>
+                <a:cs typeface="+mn-cs"/>
+              </a:rPr>
+              <a:t>i</a:t>
+            </a:r>
+            <a:r>
+              <a:rPr lang="sv-SE" sz="1200" kern="1200" dirty="0">
+                <a:solidFill>
+                  <a:schemeClr val="tx1"/>
+                </a:solidFill>
+                <a:effectLst/>
+                <a:latin typeface="+mn-lt"/>
+                <a:ea typeface="+mn-ea"/>
+                <a:cs typeface="+mn-cs"/>
+              </a:rPr>
+              <a:t> projektet. Om ni har använt versionshanteringssystemet ordentligt bör all information som efterfrågas här finnas i det. Tänk på att kodexemplen ska vara läsbara. </a:t>
+            </a:r>
           </a:p>
           <a:p>
             <a:endParaRPr lang="sv-SE" dirty="0"/>
@@ -3579,7 +4056,7 @@
     </p:spTree>
     <p:extLst>
       <p:ext uri="{BB962C8B-B14F-4D97-AF65-F5344CB8AC3E}">
-        <p14:creationId xmlns:p14="http://schemas.microsoft.com/office/powerpoint/2010/main" val="2613784504"/>
+        <p14:creationId xmlns:p14="http://schemas.microsoft.com/office/powerpoint/2010/main" val="3529345129"/>
       </p:ext>
     </p:extLst>
   </p:cSld>
@@ -3633,18 +4110,29 @@
           <a:bodyPr/>
           <a:lstStyle/>
           <a:p>
-            <a:r>
-              <a:rPr lang="sv-SE" sz="1200" kern="1200" dirty="0" smtClean="0">
-                <a:solidFill>
-                  <a:schemeClr val="tx1"/>
-                </a:solidFill>
-                <a:effectLst/>
-                <a:latin typeface="+mn-lt"/>
-                <a:ea typeface="+mn-ea"/>
-                <a:cs typeface="+mn-cs"/>
-              </a:rPr>
-              <a:t>Testfallen som ni fått fram från ekvivalensklasserna. Observera att vi inte vill ha någon kod här, utan bara en tydlig presentation av testfallen i någon lämplig tabellform. </a:t>
-            </a:r>
+            <a:pPr marL="0" marR="0" lvl="0" indent="0" algn="l" defTabSz="914400" rtl="0" eaLnBrk="1" fontAlgn="auto" latinLnBrk="0" hangingPunct="1">
+              <a:lnSpc>
+                <a:spcPct val="100000"/>
+              </a:lnSpc>
+              <a:spcBef>
+                <a:spcPts val="0"/>
+              </a:spcBef>
+              <a:spcAft>
+                <a:spcPts val="0"/>
+              </a:spcAft>
+              <a:buClrTx/>
+              <a:buSzTx/>
+              <a:buFontTx/>
+              <a:buNone/>
+              <a:tabLst/>
+              <a:defRPr/>
+            </a:pPr>
+            <a:r>
+              <a:rPr lang="sv-SE" dirty="0"/>
+              <a:t>En diskussion om vilka era erfarenheter ni dragit av att tillämpa TDD. Det finns inget rätt eller fel här. Enda sättet att bli underkända är att bara fuska över punkten och säga något pliktskyldigt.</a:t>
+            </a:r>
+          </a:p>
+          <a:p>
             <a:endParaRPr lang="sv-SE" dirty="0"/>
           </a:p>
         </p:txBody>
@@ -3675,7 +4163,7 @@
     </p:spTree>
     <p:extLst>
       <p:ext uri="{BB962C8B-B14F-4D97-AF65-F5344CB8AC3E}">
-        <p14:creationId xmlns:p14="http://schemas.microsoft.com/office/powerpoint/2010/main" val="3514630878"/>
+        <p14:creationId xmlns:p14="http://schemas.microsoft.com/office/powerpoint/2010/main" val="4160569562"/>
       </p:ext>
     </p:extLst>
   </p:cSld>
@@ -3727,10 +4215,9 @@
           </a:lstStyle>
           <a:p>
             <a:r>
-              <a:rPr lang="sv-SE" smtClean="0"/>
+              <a:rPr lang="sv-SE"/>
               <a:t>Klicka här för att ändra format</a:t>
             </a:r>
-            <a:endParaRPr lang="sv-SE"/>
           </a:p>
         </p:txBody>
       </p:sp>
@@ -3792,10 +4279,9 @@
           </a:lstStyle>
           <a:p>
             <a:r>
-              <a:rPr lang="sv-SE" smtClean="0"/>
+              <a:rPr lang="sv-SE"/>
               <a:t>Klicka här för att ändra format på underrubrik i bakgrunden</a:t>
             </a:r>
-            <a:endParaRPr lang="sv-SE"/>
           </a:p>
         </p:txBody>
       </p:sp>
@@ -3910,10 +4396,9 @@
           <a:lstStyle/>
           <a:p>
             <a:r>
-              <a:rPr lang="sv-SE" smtClean="0"/>
+              <a:rPr lang="sv-SE"/>
               <a:t>Klicka här för att ändra format</a:t>
             </a:r>
-            <a:endParaRPr lang="sv-SE"/>
           </a:p>
         </p:txBody>
       </p:sp>
@@ -3934,38 +4419,37 @@
           <a:p>
             <a:pPr lvl="0"/>
             <a:r>
-              <a:rPr lang="sv-SE" smtClean="0"/>
+              <a:rPr lang="sv-SE"/>
               <a:t>Klicka här för att ändra format på bakgrundstexten</a:t>
             </a:r>
           </a:p>
           <a:p>
             <a:pPr lvl="1"/>
             <a:r>
-              <a:rPr lang="sv-SE" smtClean="0"/>
+              <a:rPr lang="sv-SE"/>
               <a:t>Nivå två</a:t>
             </a:r>
           </a:p>
           <a:p>
             <a:pPr lvl="2"/>
             <a:r>
-              <a:rPr lang="sv-SE" smtClean="0"/>
+              <a:rPr lang="sv-SE"/>
               <a:t>Nivå tre</a:t>
             </a:r>
           </a:p>
           <a:p>
             <a:pPr lvl="3"/>
             <a:r>
-              <a:rPr lang="sv-SE" smtClean="0"/>
+              <a:rPr lang="sv-SE"/>
               <a:t>Nivå fyra</a:t>
             </a:r>
           </a:p>
           <a:p>
             <a:pPr lvl="4"/>
             <a:r>
-              <a:rPr lang="sv-SE" smtClean="0"/>
+              <a:rPr lang="sv-SE"/>
               <a:t>Nivå fem</a:t>
             </a:r>
-            <a:endParaRPr lang="sv-SE"/>
           </a:p>
         </p:txBody>
       </p:sp>
@@ -4085,10 +4569,9 @@
           <a:lstStyle/>
           <a:p>
             <a:r>
-              <a:rPr lang="sv-SE" smtClean="0"/>
+              <a:rPr lang="sv-SE"/>
               <a:t>Klicka här för att ändra format</a:t>
             </a:r>
-            <a:endParaRPr lang="sv-SE"/>
           </a:p>
         </p:txBody>
       </p:sp>
@@ -4114,38 +4597,37 @@
           <a:p>
             <a:pPr lvl="0"/>
             <a:r>
-              <a:rPr lang="sv-SE" smtClean="0"/>
+              <a:rPr lang="sv-SE"/>
               <a:t>Klicka här för att ändra format på bakgrundstexten</a:t>
             </a:r>
           </a:p>
           <a:p>
             <a:pPr lvl="1"/>
             <a:r>
-              <a:rPr lang="sv-SE" smtClean="0"/>
+              <a:rPr lang="sv-SE"/>
               <a:t>Nivå två</a:t>
             </a:r>
           </a:p>
           <a:p>
             <a:pPr lvl="2"/>
             <a:r>
-              <a:rPr lang="sv-SE" smtClean="0"/>
+              <a:rPr lang="sv-SE"/>
               <a:t>Nivå tre</a:t>
             </a:r>
           </a:p>
           <a:p>
             <a:pPr lvl="3"/>
             <a:r>
-              <a:rPr lang="sv-SE" smtClean="0"/>
+              <a:rPr lang="sv-SE"/>
               <a:t>Nivå fyra</a:t>
             </a:r>
           </a:p>
           <a:p>
             <a:pPr lvl="4"/>
             <a:r>
-              <a:rPr lang="sv-SE" smtClean="0"/>
+              <a:rPr lang="sv-SE"/>
               <a:t>Nivå fem</a:t>
             </a:r>
-            <a:endParaRPr lang="sv-SE"/>
           </a:p>
         </p:txBody>
       </p:sp>
@@ -4260,10 +4742,9 @@
           <a:lstStyle/>
           <a:p>
             <a:r>
-              <a:rPr lang="sv-SE" smtClean="0"/>
+              <a:rPr lang="sv-SE"/>
               <a:t>Klicka här för att ändra format</a:t>
             </a:r>
-            <a:endParaRPr lang="sv-SE"/>
           </a:p>
         </p:txBody>
       </p:sp>
@@ -4284,38 +4765,37 @@
           <a:p>
             <a:pPr lvl="0"/>
             <a:r>
-              <a:rPr lang="sv-SE" smtClean="0"/>
+              <a:rPr lang="sv-SE"/>
               <a:t>Klicka här för att ändra format på bakgrundstexten</a:t>
             </a:r>
           </a:p>
           <a:p>
             <a:pPr lvl="1"/>
             <a:r>
-              <a:rPr lang="sv-SE" smtClean="0"/>
+              <a:rPr lang="sv-SE"/>
               <a:t>Nivå två</a:t>
             </a:r>
           </a:p>
           <a:p>
             <a:pPr lvl="2"/>
             <a:r>
-              <a:rPr lang="sv-SE" smtClean="0"/>
+              <a:rPr lang="sv-SE"/>
               <a:t>Nivå tre</a:t>
             </a:r>
           </a:p>
           <a:p>
             <a:pPr lvl="3"/>
             <a:r>
-              <a:rPr lang="sv-SE" smtClean="0"/>
+              <a:rPr lang="sv-SE"/>
               <a:t>Nivå fyra</a:t>
             </a:r>
           </a:p>
           <a:p>
             <a:pPr lvl="4"/>
             <a:r>
-              <a:rPr lang="sv-SE" smtClean="0"/>
+              <a:rPr lang="sv-SE"/>
               <a:t>Nivå fem</a:t>
             </a:r>
-            <a:endParaRPr lang="sv-SE"/>
           </a:p>
         </p:txBody>
       </p:sp>
@@ -4439,10 +4919,9 @@
           </a:lstStyle>
           <a:p>
             <a:r>
-              <a:rPr lang="sv-SE" smtClean="0"/>
+              <a:rPr lang="sv-SE"/>
               <a:t>Klicka här för att ändra format</a:t>
             </a:r>
-            <a:endParaRPr lang="sv-SE"/>
           </a:p>
         </p:txBody>
       </p:sp>
@@ -4559,7 +5038,7 @@
           <a:p>
             <a:pPr lvl="0"/>
             <a:r>
-              <a:rPr lang="sv-SE" smtClean="0"/>
+              <a:rPr lang="sv-SE"/>
               <a:t>Klicka här för att ändra format på bakgrundstexten</a:t>
             </a:r>
           </a:p>
@@ -4676,10 +5155,9 @@
           <a:lstStyle/>
           <a:p>
             <a:r>
-              <a:rPr lang="sv-SE" smtClean="0"/>
+              <a:rPr lang="sv-SE"/>
               <a:t>Klicka här för att ändra format</a:t>
             </a:r>
-            <a:endParaRPr lang="sv-SE"/>
           </a:p>
         </p:txBody>
       </p:sp>
@@ -4705,38 +5183,37 @@
           <a:p>
             <a:pPr lvl="0"/>
             <a:r>
-              <a:rPr lang="sv-SE" smtClean="0"/>
+              <a:rPr lang="sv-SE"/>
               <a:t>Klicka här för att ändra format på bakgrundstexten</a:t>
             </a:r>
           </a:p>
           <a:p>
             <a:pPr lvl="1"/>
             <a:r>
-              <a:rPr lang="sv-SE" smtClean="0"/>
+              <a:rPr lang="sv-SE"/>
               <a:t>Nivå två</a:t>
             </a:r>
           </a:p>
           <a:p>
             <a:pPr lvl="2"/>
             <a:r>
-              <a:rPr lang="sv-SE" smtClean="0"/>
+              <a:rPr lang="sv-SE"/>
               <a:t>Nivå tre</a:t>
             </a:r>
           </a:p>
           <a:p>
             <a:pPr lvl="3"/>
             <a:r>
-              <a:rPr lang="sv-SE" smtClean="0"/>
+              <a:rPr lang="sv-SE"/>
               <a:t>Nivå fyra</a:t>
             </a:r>
           </a:p>
           <a:p>
             <a:pPr lvl="4"/>
             <a:r>
-              <a:rPr lang="sv-SE" smtClean="0"/>
+              <a:rPr lang="sv-SE"/>
               <a:t>Nivå fem</a:t>
             </a:r>
-            <a:endParaRPr lang="sv-SE"/>
           </a:p>
         </p:txBody>
       </p:sp>
@@ -4762,38 +5239,37 @@
           <a:p>
             <a:pPr lvl="0"/>
             <a:r>
-              <a:rPr lang="sv-SE" smtClean="0"/>
+              <a:rPr lang="sv-SE"/>
               <a:t>Klicka här för att ändra format på bakgrundstexten</a:t>
             </a:r>
           </a:p>
           <a:p>
             <a:pPr lvl="1"/>
             <a:r>
-              <a:rPr lang="sv-SE" smtClean="0"/>
+              <a:rPr lang="sv-SE"/>
               <a:t>Nivå två</a:t>
             </a:r>
           </a:p>
           <a:p>
             <a:pPr lvl="2"/>
             <a:r>
-              <a:rPr lang="sv-SE" smtClean="0"/>
+              <a:rPr lang="sv-SE"/>
               <a:t>Nivå tre</a:t>
             </a:r>
           </a:p>
           <a:p>
             <a:pPr lvl="3"/>
             <a:r>
-              <a:rPr lang="sv-SE" smtClean="0"/>
+              <a:rPr lang="sv-SE"/>
               <a:t>Nivå fyra</a:t>
             </a:r>
           </a:p>
           <a:p>
             <a:pPr lvl="4"/>
             <a:r>
-              <a:rPr lang="sv-SE" smtClean="0"/>
+              <a:rPr lang="sv-SE"/>
               <a:t>Nivå fem</a:t>
             </a:r>
-            <a:endParaRPr lang="sv-SE"/>
           </a:p>
         </p:txBody>
       </p:sp>
@@ -4913,10 +5389,9 @@
           <a:lstStyle/>
           <a:p>
             <a:r>
-              <a:rPr lang="sv-SE" smtClean="0"/>
+              <a:rPr lang="sv-SE"/>
               <a:t>Klicka här för att ändra format</a:t>
             </a:r>
-            <a:endParaRPr lang="sv-SE"/>
           </a:p>
         </p:txBody>
       </p:sp>
@@ -4979,7 +5454,7 @@
           <a:p>
             <a:pPr lvl="0"/>
             <a:r>
-              <a:rPr lang="sv-SE" smtClean="0"/>
+              <a:rPr lang="sv-SE"/>
               <a:t>Klicka här för att ändra format på bakgrundstexten</a:t>
             </a:r>
           </a:p>
@@ -5007,38 +5482,37 @@
           <a:p>
             <a:pPr lvl="0"/>
             <a:r>
-              <a:rPr lang="sv-SE" smtClean="0"/>
+              <a:rPr lang="sv-SE"/>
               <a:t>Klicka här för att ändra format på bakgrundstexten</a:t>
             </a:r>
           </a:p>
           <a:p>
             <a:pPr lvl="1"/>
             <a:r>
-              <a:rPr lang="sv-SE" smtClean="0"/>
+              <a:rPr lang="sv-SE"/>
               <a:t>Nivå två</a:t>
             </a:r>
           </a:p>
           <a:p>
             <a:pPr lvl="2"/>
             <a:r>
-              <a:rPr lang="sv-SE" smtClean="0"/>
+              <a:rPr lang="sv-SE"/>
               <a:t>Nivå tre</a:t>
             </a:r>
           </a:p>
           <a:p>
             <a:pPr lvl="3"/>
             <a:r>
-              <a:rPr lang="sv-SE" smtClean="0"/>
+              <a:rPr lang="sv-SE"/>
               <a:t>Nivå fyra</a:t>
             </a:r>
           </a:p>
           <a:p>
             <a:pPr lvl="4"/>
             <a:r>
-              <a:rPr lang="sv-SE" smtClean="0"/>
+              <a:rPr lang="sv-SE"/>
               <a:t>Nivå fem</a:t>
             </a:r>
-            <a:endParaRPr lang="sv-SE"/>
           </a:p>
         </p:txBody>
       </p:sp>
@@ -5101,7 +5575,7 @@
           <a:p>
             <a:pPr lvl="0"/>
             <a:r>
-              <a:rPr lang="sv-SE" smtClean="0"/>
+              <a:rPr lang="sv-SE"/>
               <a:t>Klicka här för att ändra format på bakgrundstexten</a:t>
             </a:r>
           </a:p>
@@ -5129,38 +5603,37 @@
           <a:p>
             <a:pPr lvl="0"/>
             <a:r>
-              <a:rPr lang="sv-SE" smtClean="0"/>
+              <a:rPr lang="sv-SE"/>
               <a:t>Klicka här för att ändra format på bakgrundstexten</a:t>
             </a:r>
           </a:p>
           <a:p>
             <a:pPr lvl="1"/>
             <a:r>
-              <a:rPr lang="sv-SE" smtClean="0"/>
+              <a:rPr lang="sv-SE"/>
               <a:t>Nivå två</a:t>
             </a:r>
           </a:p>
           <a:p>
             <a:pPr lvl="2"/>
             <a:r>
-              <a:rPr lang="sv-SE" smtClean="0"/>
+              <a:rPr lang="sv-SE"/>
               <a:t>Nivå tre</a:t>
             </a:r>
           </a:p>
           <a:p>
             <a:pPr lvl="3"/>
             <a:r>
-              <a:rPr lang="sv-SE" smtClean="0"/>
+              <a:rPr lang="sv-SE"/>
               <a:t>Nivå fyra</a:t>
             </a:r>
           </a:p>
           <a:p>
             <a:pPr lvl="4"/>
             <a:r>
-              <a:rPr lang="sv-SE" smtClean="0"/>
+              <a:rPr lang="sv-SE"/>
               <a:t>Nivå fem</a:t>
             </a:r>
-            <a:endParaRPr lang="sv-SE"/>
           </a:p>
         </p:txBody>
       </p:sp>
@@ -5275,10 +5748,9 @@
           <a:lstStyle/>
           <a:p>
             <a:r>
-              <a:rPr lang="sv-SE" smtClean="0"/>
+              <a:rPr lang="sv-SE"/>
               <a:t>Klicka här för att ändra format</a:t>
             </a:r>
-            <a:endParaRPr lang="sv-SE"/>
           </a:p>
         </p:txBody>
       </p:sp>
@@ -5497,10 +5969,9 @@
           </a:lstStyle>
           <a:p>
             <a:r>
-              <a:rPr lang="sv-SE" smtClean="0"/>
+              <a:rPr lang="sv-SE"/>
               <a:t>Klicka här för att ändra format</a:t>
             </a:r>
-            <a:endParaRPr lang="sv-SE"/>
           </a:p>
         </p:txBody>
       </p:sp>
@@ -5554,38 +6025,37 @@
           <a:p>
             <a:pPr lvl="0"/>
             <a:r>
-              <a:rPr lang="sv-SE" smtClean="0"/>
+              <a:rPr lang="sv-SE"/>
               <a:t>Klicka här för att ändra format på bakgrundstexten</a:t>
             </a:r>
           </a:p>
           <a:p>
             <a:pPr lvl="1"/>
             <a:r>
-              <a:rPr lang="sv-SE" smtClean="0"/>
+              <a:rPr lang="sv-SE"/>
               <a:t>Nivå två</a:t>
             </a:r>
           </a:p>
           <a:p>
             <a:pPr lvl="2"/>
             <a:r>
-              <a:rPr lang="sv-SE" smtClean="0"/>
+              <a:rPr lang="sv-SE"/>
               <a:t>Nivå tre</a:t>
             </a:r>
           </a:p>
           <a:p>
             <a:pPr lvl="3"/>
             <a:r>
-              <a:rPr lang="sv-SE" smtClean="0"/>
+              <a:rPr lang="sv-SE"/>
               <a:t>Nivå fyra</a:t>
             </a:r>
           </a:p>
           <a:p>
             <a:pPr lvl="4"/>
             <a:r>
-              <a:rPr lang="sv-SE" smtClean="0"/>
+              <a:rPr lang="sv-SE"/>
               <a:t>Nivå fem</a:t>
             </a:r>
-            <a:endParaRPr lang="sv-SE"/>
           </a:p>
         </p:txBody>
       </p:sp>
@@ -5648,7 +6118,7 @@
           <a:p>
             <a:pPr lvl="0"/>
             <a:r>
-              <a:rPr lang="sv-SE" smtClean="0"/>
+              <a:rPr lang="sv-SE"/>
               <a:t>Klicka här för att ändra format på bakgrundstexten</a:t>
             </a:r>
           </a:p>
@@ -5774,10 +6244,9 @@
           </a:lstStyle>
           <a:p>
             <a:r>
-              <a:rPr lang="sv-SE" smtClean="0"/>
+              <a:rPr lang="sv-SE"/>
               <a:t>Klicka här för att ändra format</a:t>
             </a:r>
-            <a:endParaRPr lang="sv-SE"/>
           </a:p>
         </p:txBody>
       </p:sp>
@@ -5901,7 +6370,7 @@
           <a:p>
             <a:pPr lvl="0"/>
             <a:r>
-              <a:rPr lang="sv-SE" smtClean="0"/>
+              <a:rPr lang="sv-SE"/>
               <a:t>Klicka här för att ändra format på bakgrundstexten</a:t>
             </a:r>
           </a:p>
@@ -6033,10 +6502,9 @@
           <a:lstStyle/>
           <a:p>
             <a:r>
-              <a:rPr lang="sv-SE" smtClean="0"/>
+              <a:rPr lang="sv-SE"/>
               <a:t>Klicka här för att ändra format</a:t>
             </a:r>
-            <a:endParaRPr lang="sv-SE"/>
           </a:p>
         </p:txBody>
       </p:sp>
@@ -6067,38 +6535,37 @@
           <a:p>
             <a:pPr lvl="0"/>
             <a:r>
-              <a:rPr lang="sv-SE" smtClean="0"/>
+              <a:rPr lang="sv-SE"/>
               <a:t>Klicka här för att ändra format på bakgrundstexten</a:t>
             </a:r>
           </a:p>
           <a:p>
             <a:pPr lvl="1"/>
             <a:r>
-              <a:rPr lang="sv-SE" smtClean="0"/>
+              <a:rPr lang="sv-SE"/>
               <a:t>Nivå två</a:t>
             </a:r>
           </a:p>
           <a:p>
             <a:pPr lvl="2"/>
             <a:r>
-              <a:rPr lang="sv-SE" smtClean="0"/>
+              <a:rPr lang="sv-SE"/>
               <a:t>Nivå tre</a:t>
             </a:r>
           </a:p>
           <a:p>
             <a:pPr lvl="3"/>
             <a:r>
-              <a:rPr lang="sv-SE" smtClean="0"/>
+              <a:rPr lang="sv-SE"/>
               <a:t>Nivå fyra</a:t>
             </a:r>
           </a:p>
           <a:p>
             <a:pPr lvl="4"/>
             <a:r>
-              <a:rPr lang="sv-SE" smtClean="0"/>
+              <a:rPr lang="sv-SE"/>
               <a:t>Nivå fem</a:t>
             </a:r>
-            <a:endParaRPr lang="sv-SE"/>
           </a:p>
         </p:txBody>
       </p:sp>
@@ -6558,47 +7025,57 @@
           <a:lstStyle/>
           <a:p>
             <a:r>
-              <a:rPr lang="sv-SE" dirty="0" smtClean="0"/>
-              <a:t>Grupp nr: </a:t>
-            </a:r>
-            <a:r>
-              <a:rPr lang="sv-SE" dirty="0" smtClean="0"/>
-              <a:t>11</a:t>
+              <a:rPr lang="sv-SE" dirty="0"/>
+              <a:t>Grupp nr: 11</a:t>
+            </a:r>
+          </a:p>
+        </p:txBody>
+      </p:sp>
+      <p:sp>
+        <p:nvSpPr>
+          <p:cNvPr id="5" name="Platshållare för innehåll 4"/>
+          <p:cNvSpPr>
+            <a:spLocks noGrp="1"/>
+          </p:cNvSpPr>
+          <p:nvPr>
+            <p:ph idx="1"/>
+          </p:nvPr>
+        </p:nvSpPr>
+        <p:spPr/>
+        <p:txBody>
+          <a:bodyPr/>
+          <a:lstStyle/>
+          <a:p>
+            <a:r>
+              <a:rPr lang="sv-SE" dirty="0"/>
+              <a:t>Bjargey Ingólfsdóttir, </a:t>
+            </a:r>
+            <a:r>
+              <a:rPr lang="sv-SE" dirty="0">
+                <a:hlinkClick r:id="rId4"/>
+              </a:rPr>
+              <a:t>bjin3492@student.su.se</a:t>
             </a:r>
             <a:endParaRPr lang="sv-SE" dirty="0"/>
           </a:p>
-        </p:txBody>
-      </p:sp>
-      <p:sp>
-        <p:nvSpPr>
-          <p:cNvPr id="5" name="Platshållare för innehåll 4"/>
-          <p:cNvSpPr>
-            <a:spLocks noGrp="1"/>
-          </p:cNvSpPr>
-          <p:nvPr>
-            <p:ph idx="1"/>
-          </p:nvPr>
-        </p:nvSpPr>
-        <p:spPr/>
-        <p:txBody>
-          <a:bodyPr/>
-          <a:lstStyle/>
-          <a:p>
-            <a:r>
-              <a:rPr lang="sv-SE" dirty="0" smtClean="0"/>
-              <a:t>Linnéa Palmgren, lipa7972@student.su.se</a:t>
-            </a:r>
-          </a:p>
-          <a:p>
-            <a:r>
-              <a:rPr lang="sv-SE" dirty="0" smtClean="0"/>
-              <a:t>Namn </a:t>
-            </a:r>
-            <a:r>
-              <a:rPr lang="sv-SE" dirty="0" smtClean="0"/>
-              <a:t>och e-post till samtliga gruppmedlemmar</a:t>
+          <a:p>
+            <a:r>
+              <a:rPr lang="sv-SE" dirty="0"/>
+              <a:t>Linnéa Palmgren, </a:t>
+            </a:r>
+            <a:r>
+              <a:rPr lang="sv-SE" dirty="0">
+                <a:hlinkClick r:id="rId5"/>
+              </a:rPr>
+              <a:t>lipa7972@student.su.se</a:t>
             </a:r>
             <a:endParaRPr lang="sv-SE" dirty="0"/>
+          </a:p>
+          <a:p>
+            <a:r>
+              <a:rPr lang="sv-SE" dirty="0"/>
+              <a:t>Namn och e-post till samtliga gruppmedlemmar</a:t>
+            </a:r>
           </a:p>
         </p:txBody>
       </p:sp>
@@ -6626,7 +7103,7 @@
           <a:p>
             <a:pPr algn="ctr"/>
             <a:r>
-              <a:rPr lang="sv-SE" sz="5400" b="0" cap="none" spc="0" dirty="0" smtClean="0">
+              <a:rPr lang="sv-SE" sz="5400" b="0" cap="none" spc="0" dirty="0">
                 <a:ln w="0"/>
                 <a:solidFill>
                   <a:schemeClr val="tx1"/>
@@ -6641,19 +7118,6 @@
               </a:rPr>
               <a:t>OBS! Lämnas in i PDF-format</a:t>
             </a:r>
-            <a:endParaRPr lang="sv-SE" sz="5400" b="0" cap="none" spc="0" dirty="0">
-              <a:ln w="0"/>
-              <a:solidFill>
-                <a:schemeClr val="tx1"/>
-              </a:solidFill>
-              <a:effectLst>
-                <a:outerShdw blurRad="38100" dist="19050" dir="2700000" algn="tl" rotWithShape="0">
-                  <a:schemeClr val="dk1">
-                    <a:alpha val="40000"/>
-                  </a:schemeClr>
-                </a:outerShdw>
-              </a:effectLst>
-            </a:endParaRPr>
           </a:p>
         </p:txBody>
       </p:sp>
@@ -6663,7 +7127,7 @@
     </p:custDataLst>
     <p:extLst>
       <p:ext uri="{BB962C8B-B14F-4D97-AF65-F5344CB8AC3E}">
-        <p14:creationId xmlns:p14="http://schemas.microsoft.com/office/powerpoint/2010/main" val="3888471418"/>
+        <p14:creationId xmlns:p14="http://schemas.microsoft.com/office/powerpoint/2010/main" val="1904298164"/>
       </p:ext>
     </p:extLst>
   </p:cSld>
@@ -6706,10 +7170,9 @@
           <a:lstStyle/>
           <a:p>
             <a:r>
-              <a:rPr lang="sv-SE" dirty="0" smtClean="0"/>
-              <a:t>Testmatris</a:t>
-            </a:r>
-            <a:endParaRPr lang="sv-SE" dirty="0"/>
+              <a:rPr lang="sv-SE" dirty="0"/>
+              <a:t>Testfallsdesign ekvivalensklasser</a:t>
+            </a:r>
           </a:p>
         </p:txBody>
       </p:sp>
@@ -6738,7 +7201,7 @@
     </p:custDataLst>
     <p:extLst>
       <p:ext uri="{BB962C8B-B14F-4D97-AF65-F5344CB8AC3E}">
-        <p14:creationId xmlns:p14="http://schemas.microsoft.com/office/powerpoint/2010/main" val="1900409101"/>
+        <p14:creationId xmlns:p14="http://schemas.microsoft.com/office/powerpoint/2010/main" val="3480241241"/>
       </p:ext>
     </p:extLst>
   </p:cSld>
@@ -6781,10 +7244,9 @@
           <a:lstStyle/>
           <a:p>
             <a:r>
-              <a:rPr lang="sv-SE" dirty="0" smtClean="0"/>
-              <a:t>Tillståndsmaskiner</a:t>
-            </a:r>
-            <a:endParaRPr lang="sv-SE" dirty="0"/>
+              <a:rPr lang="sv-SE" dirty="0"/>
+              <a:t>Ekvivalensklasserna</a:t>
+            </a:r>
           </a:p>
         </p:txBody>
       </p:sp>
@@ -6813,7 +7275,7 @@
     </p:custDataLst>
     <p:extLst>
       <p:ext uri="{BB962C8B-B14F-4D97-AF65-F5344CB8AC3E}">
-        <p14:creationId xmlns:p14="http://schemas.microsoft.com/office/powerpoint/2010/main" val="1230194705"/>
+        <p14:creationId xmlns:p14="http://schemas.microsoft.com/office/powerpoint/2010/main" val="3750412782"/>
       </p:ext>
     </p:extLst>
   </p:cSld>
@@ -6856,10 +7318,9 @@
           <a:lstStyle/>
           <a:p>
             <a:r>
-              <a:rPr lang="sv-SE" dirty="0" smtClean="0"/>
-              <a:t>Tillståndsmaskinen</a:t>
-            </a:r>
-            <a:endParaRPr lang="sv-SE" dirty="0"/>
+              <a:rPr lang="sv-SE" dirty="0"/>
+              <a:t>Testfall</a:t>
+            </a:r>
           </a:p>
         </p:txBody>
       </p:sp>
@@ -6888,7 +7349,7 @@
     </p:custDataLst>
     <p:extLst>
       <p:ext uri="{BB962C8B-B14F-4D97-AF65-F5344CB8AC3E}">
-        <p14:creationId xmlns:p14="http://schemas.microsoft.com/office/powerpoint/2010/main" val="2924590265"/>
+        <p14:creationId xmlns:p14="http://schemas.microsoft.com/office/powerpoint/2010/main" val="3595241904"/>
       </p:ext>
     </p:extLst>
   </p:cSld>
@@ -6931,10 +7392,9 @@
           <a:lstStyle/>
           <a:p>
             <a:r>
-              <a:rPr lang="sv-SE" dirty="0" smtClean="0"/>
-              <a:t>Testfall</a:t>
-            </a:r>
-            <a:endParaRPr lang="sv-SE" dirty="0"/>
+              <a:rPr lang="sv-SE" dirty="0"/>
+              <a:t>Testmatris</a:t>
+            </a:r>
           </a:p>
         </p:txBody>
       </p:sp>
@@ -6963,7 +7423,7 @@
     </p:custDataLst>
     <p:extLst>
       <p:ext uri="{BB962C8B-B14F-4D97-AF65-F5344CB8AC3E}">
-        <p14:creationId xmlns:p14="http://schemas.microsoft.com/office/powerpoint/2010/main" val="1268711775"/>
+        <p14:creationId xmlns:p14="http://schemas.microsoft.com/office/powerpoint/2010/main" val="1900409101"/>
       </p:ext>
     </p:extLst>
   </p:cSld>
@@ -7006,10 +7466,9 @@
           <a:lstStyle/>
           <a:p>
             <a:r>
-              <a:rPr lang="sv-SE" dirty="0" smtClean="0"/>
-              <a:t>Testmatris</a:t>
-            </a:r>
-            <a:endParaRPr lang="sv-SE" dirty="0"/>
+              <a:rPr lang="sv-SE" dirty="0"/>
+              <a:t>Tillståndsmaskiner</a:t>
+            </a:r>
           </a:p>
         </p:txBody>
       </p:sp>
@@ -7038,7 +7497,7 @@
     </p:custDataLst>
     <p:extLst>
       <p:ext uri="{BB962C8B-B14F-4D97-AF65-F5344CB8AC3E}">
-        <p14:creationId xmlns:p14="http://schemas.microsoft.com/office/powerpoint/2010/main" val="2129764329"/>
+        <p14:creationId xmlns:p14="http://schemas.microsoft.com/office/powerpoint/2010/main" val="1230194705"/>
       </p:ext>
     </p:extLst>
   </p:cSld>
@@ -7081,10 +7540,9 @@
           <a:lstStyle/>
           <a:p>
             <a:r>
-              <a:rPr lang="sv-SE" dirty="0" smtClean="0"/>
-              <a:t>Beslutstabeller/beslutsträd</a:t>
-            </a:r>
-            <a:endParaRPr lang="sv-SE" dirty="0"/>
+              <a:rPr lang="sv-SE" dirty="0"/>
+              <a:t>Tillståndsmaskinen</a:t>
+            </a:r>
           </a:p>
         </p:txBody>
       </p:sp>
@@ -7113,7 +7571,7 @@
     </p:custDataLst>
     <p:extLst>
       <p:ext uri="{BB962C8B-B14F-4D97-AF65-F5344CB8AC3E}">
-        <p14:creationId xmlns:p14="http://schemas.microsoft.com/office/powerpoint/2010/main" val="2726864417"/>
+        <p14:creationId xmlns:p14="http://schemas.microsoft.com/office/powerpoint/2010/main" val="2924590265"/>
       </p:ext>
     </p:extLst>
   </p:cSld>
@@ -7156,10 +7614,9 @@
           <a:lstStyle/>
           <a:p>
             <a:r>
-              <a:rPr lang="sv-SE" dirty="0" smtClean="0"/>
-              <a:t>Beslutstabell</a:t>
-            </a:r>
-            <a:endParaRPr lang="sv-SE" dirty="0"/>
+              <a:rPr lang="sv-SE" dirty="0"/>
+              <a:t>Testfall</a:t>
+            </a:r>
           </a:p>
         </p:txBody>
       </p:sp>
@@ -7188,7 +7645,7 @@
     </p:custDataLst>
     <p:extLst>
       <p:ext uri="{BB962C8B-B14F-4D97-AF65-F5344CB8AC3E}">
-        <p14:creationId xmlns:p14="http://schemas.microsoft.com/office/powerpoint/2010/main" val="804679524"/>
+        <p14:creationId xmlns:p14="http://schemas.microsoft.com/office/powerpoint/2010/main" val="1268711775"/>
       </p:ext>
     </p:extLst>
   </p:cSld>
@@ -7231,10 +7688,9 @@
           <a:lstStyle/>
           <a:p>
             <a:r>
-              <a:rPr lang="sv-SE" dirty="0" smtClean="0"/>
-              <a:t>Beslutsträd</a:t>
-            </a:r>
-            <a:endParaRPr lang="sv-SE" dirty="0"/>
+              <a:rPr lang="sv-SE" dirty="0"/>
+              <a:t>Testmatris</a:t>
+            </a:r>
           </a:p>
         </p:txBody>
       </p:sp>
@@ -7263,7 +7719,7 @@
     </p:custDataLst>
     <p:extLst>
       <p:ext uri="{BB962C8B-B14F-4D97-AF65-F5344CB8AC3E}">
-        <p14:creationId xmlns:p14="http://schemas.microsoft.com/office/powerpoint/2010/main" val="3386033166"/>
+        <p14:creationId xmlns:p14="http://schemas.microsoft.com/office/powerpoint/2010/main" val="2129764329"/>
       </p:ext>
     </p:extLst>
   </p:cSld>
@@ -7306,10 +7762,9 @@
           <a:lstStyle/>
           <a:p>
             <a:r>
-              <a:rPr lang="sv-SE" dirty="0" smtClean="0"/>
-              <a:t>Testfall</a:t>
-            </a:r>
-            <a:endParaRPr lang="sv-SE" dirty="0"/>
+              <a:rPr lang="sv-SE" dirty="0"/>
+              <a:t>Beslutstabeller/beslutsträd</a:t>
+            </a:r>
           </a:p>
         </p:txBody>
       </p:sp>
@@ -7338,7 +7793,7 @@
     </p:custDataLst>
     <p:extLst>
       <p:ext uri="{BB962C8B-B14F-4D97-AF65-F5344CB8AC3E}">
-        <p14:creationId xmlns:p14="http://schemas.microsoft.com/office/powerpoint/2010/main" val="1644214412"/>
+        <p14:creationId xmlns:p14="http://schemas.microsoft.com/office/powerpoint/2010/main" val="2726864417"/>
       </p:ext>
     </p:extLst>
   </p:cSld>
@@ -7381,10 +7836,9 @@
           <a:lstStyle/>
           <a:p>
             <a:r>
-              <a:rPr lang="sv-SE" dirty="0" smtClean="0"/>
-              <a:t>Granskning</a:t>
-            </a:r>
-            <a:endParaRPr lang="sv-SE" dirty="0"/>
+              <a:rPr lang="sv-SE" dirty="0"/>
+              <a:t>Beslutstabell</a:t>
+            </a:r>
           </a:p>
         </p:txBody>
       </p:sp>
@@ -7413,7 +7867,7 @@
     </p:custDataLst>
     <p:extLst>
       <p:ext uri="{BB962C8B-B14F-4D97-AF65-F5344CB8AC3E}">
-        <p14:creationId xmlns:p14="http://schemas.microsoft.com/office/powerpoint/2010/main" val="3427005653"/>
+        <p14:creationId xmlns:p14="http://schemas.microsoft.com/office/powerpoint/2010/main" val="804679524"/>
       </p:ext>
     </p:extLst>
   </p:cSld>
@@ -7456,58 +7910,48 @@
           <a:lstStyle/>
           <a:p>
             <a:r>
-              <a:rPr lang="sv-SE" dirty="0" smtClean="0"/>
+              <a:rPr lang="sv-SE" dirty="0"/>
               <a:t>Verktyg</a:t>
             </a:r>
+          </a:p>
+        </p:txBody>
+      </p:sp>
+      <p:sp>
+        <p:nvSpPr>
+          <p:cNvPr id="3" name="Platshållare för innehåll 2"/>
+          <p:cNvSpPr>
+            <a:spLocks noGrp="1"/>
+          </p:cNvSpPr>
+          <p:nvPr>
+            <p:ph idx="1"/>
+          </p:nvPr>
+        </p:nvSpPr>
+        <p:spPr/>
+        <p:txBody>
+          <a:bodyPr/>
+          <a:lstStyle/>
+          <a:p>
+            <a:r>
+              <a:rPr lang="sv-SE" dirty="0"/>
+              <a:t>Vilka verktyg använde ni?</a:t>
+            </a:r>
+          </a:p>
+          <a:p>
+            <a:r>
+              <a:rPr lang="sv-SE" dirty="0" err="1"/>
+              <a:t>JUnit</a:t>
+            </a:r>
             <a:endParaRPr lang="sv-SE" dirty="0"/>
           </a:p>
-        </p:txBody>
-      </p:sp>
-      <p:sp>
-        <p:nvSpPr>
-          <p:cNvPr id="3" name="Platshållare för innehåll 2"/>
-          <p:cNvSpPr>
-            <a:spLocks noGrp="1"/>
-          </p:cNvSpPr>
-          <p:nvPr>
-            <p:ph idx="1"/>
-          </p:nvPr>
-        </p:nvSpPr>
-        <p:spPr/>
-        <p:txBody>
-          <a:bodyPr/>
-          <a:lstStyle/>
-          <a:p>
-            <a:r>
-              <a:rPr lang="sv-SE" dirty="0" smtClean="0"/>
-              <a:t>Vilka verktyg använde ni</a:t>
-            </a:r>
-            <a:r>
-              <a:rPr lang="sv-SE" dirty="0" smtClean="0"/>
-              <a:t>?</a:t>
-            </a:r>
-          </a:p>
-          <a:p>
-            <a:r>
-              <a:rPr lang="sv-SE" dirty="0" err="1" smtClean="0"/>
-              <a:t>JUnit</a:t>
-            </a:r>
-            <a:endParaRPr lang="sv-SE" dirty="0" smtClean="0"/>
-          </a:p>
-          <a:p>
-            <a:r>
-              <a:rPr lang="sv-SE" dirty="0" err="1" smtClean="0"/>
+          <a:p>
+            <a:r>
+              <a:rPr lang="sv-SE" dirty="0" err="1"/>
               <a:t>Ant</a:t>
             </a:r>
             <a:r>
-              <a:rPr lang="sv-SE" dirty="0" smtClean="0"/>
-              <a:t> </a:t>
-            </a:r>
-            <a:r>
-              <a:rPr lang="sv-SE" dirty="0" smtClean="0"/>
-              <a:t> </a:t>
-            </a:r>
-            <a:endParaRPr lang="sv-SE" dirty="0"/>
+              <a:rPr lang="sv-SE" dirty="0"/>
+              <a:t>  </a:t>
+            </a:r>
           </a:p>
         </p:txBody>
       </p:sp>
@@ -7560,10 +8004,9 @@
           <a:lstStyle/>
           <a:p>
             <a:r>
-              <a:rPr lang="sv-SE" dirty="0" smtClean="0"/>
-              <a:t>Granskningsrapport</a:t>
-            </a:r>
-            <a:endParaRPr lang="sv-SE" dirty="0"/>
+              <a:rPr lang="sv-SE" dirty="0"/>
+              <a:t>Beslutsträd</a:t>
+            </a:r>
           </a:p>
         </p:txBody>
       </p:sp>
@@ -7592,7 +8035,7 @@
     </p:custDataLst>
     <p:extLst>
       <p:ext uri="{BB962C8B-B14F-4D97-AF65-F5344CB8AC3E}">
-        <p14:creationId xmlns:p14="http://schemas.microsoft.com/office/powerpoint/2010/main" val="3874197174"/>
+        <p14:creationId xmlns:p14="http://schemas.microsoft.com/office/powerpoint/2010/main" val="3386033166"/>
       </p:ext>
     </p:extLst>
   </p:cSld>
@@ -7635,10 +8078,9 @@
           <a:lstStyle/>
           <a:p>
             <a:r>
-              <a:rPr lang="sv-SE" dirty="0" smtClean="0"/>
-              <a:t>Erfarenheter av granskning</a:t>
-            </a:r>
-            <a:endParaRPr lang="sv-SE" dirty="0"/>
+              <a:rPr lang="sv-SE" dirty="0"/>
+              <a:t>Testfall</a:t>
+            </a:r>
           </a:p>
         </p:txBody>
       </p:sp>
@@ -7667,7 +8109,7 @@
     </p:custDataLst>
     <p:extLst>
       <p:ext uri="{BB962C8B-B14F-4D97-AF65-F5344CB8AC3E}">
-        <p14:creationId xmlns:p14="http://schemas.microsoft.com/office/powerpoint/2010/main" val="724679724"/>
+        <p14:creationId xmlns:p14="http://schemas.microsoft.com/office/powerpoint/2010/main" val="1644214412"/>
       </p:ext>
     </p:extLst>
   </p:cSld>
@@ -7710,10 +8152,9 @@
           <a:lstStyle/>
           <a:p>
             <a:r>
-              <a:rPr lang="sv-SE" dirty="0" smtClean="0"/>
-              <a:t>Kodkritiksystem</a:t>
-            </a:r>
-            <a:endParaRPr lang="sv-SE" dirty="0"/>
+              <a:rPr lang="sv-SE" dirty="0"/>
+              <a:t>Granskning</a:t>
+            </a:r>
           </a:p>
         </p:txBody>
       </p:sp>
@@ -7742,7 +8183,7 @@
     </p:custDataLst>
     <p:extLst>
       <p:ext uri="{BB962C8B-B14F-4D97-AF65-F5344CB8AC3E}">
-        <p14:creationId xmlns:p14="http://schemas.microsoft.com/office/powerpoint/2010/main" val="847618868"/>
+        <p14:creationId xmlns:p14="http://schemas.microsoft.com/office/powerpoint/2010/main" val="3427005653"/>
       </p:ext>
     </p:extLst>
   </p:cSld>
@@ -7785,10 +8226,9 @@
           <a:lstStyle/>
           <a:p>
             <a:r>
-              <a:rPr lang="sv-SE" dirty="0" smtClean="0"/>
-              <a:t>Statiska mått</a:t>
-            </a:r>
-            <a:endParaRPr lang="sv-SE" dirty="0"/>
+              <a:rPr lang="sv-SE" dirty="0"/>
+              <a:t>Granskningsrapport</a:t>
+            </a:r>
           </a:p>
         </p:txBody>
       </p:sp>
@@ -7817,7 +8257,7 @@
     </p:custDataLst>
     <p:extLst>
       <p:ext uri="{BB962C8B-B14F-4D97-AF65-F5344CB8AC3E}">
-        <p14:creationId xmlns:p14="http://schemas.microsoft.com/office/powerpoint/2010/main" val="3620096591"/>
+        <p14:creationId xmlns:p14="http://schemas.microsoft.com/office/powerpoint/2010/main" val="3874197174"/>
       </p:ext>
     </p:extLst>
   </p:cSld>
@@ -7860,10 +8300,9 @@
           <a:lstStyle/>
           <a:p>
             <a:r>
-              <a:rPr lang="sv-SE" dirty="0" smtClean="0"/>
-              <a:t>Täckningsgrad</a:t>
-            </a:r>
-            <a:endParaRPr lang="sv-SE" dirty="0"/>
+              <a:rPr lang="sv-SE" dirty="0"/>
+              <a:t>Erfarenheter av granskning</a:t>
+            </a:r>
           </a:p>
         </p:txBody>
       </p:sp>
@@ -7892,7 +8331,7 @@
     </p:custDataLst>
     <p:extLst>
       <p:ext uri="{BB962C8B-B14F-4D97-AF65-F5344CB8AC3E}">
-        <p14:creationId xmlns:p14="http://schemas.microsoft.com/office/powerpoint/2010/main" val="3476279416"/>
+        <p14:creationId xmlns:p14="http://schemas.microsoft.com/office/powerpoint/2010/main" val="724679724"/>
       </p:ext>
     </p:extLst>
   </p:cSld>
@@ -7935,10 +8374,9 @@
           <a:lstStyle/>
           <a:p>
             <a:r>
-              <a:rPr lang="sv-SE" dirty="0" smtClean="0"/>
-              <a:t>Profiler</a:t>
-            </a:r>
-            <a:endParaRPr lang="sv-SE" dirty="0"/>
+              <a:rPr lang="sv-SE" dirty="0"/>
+              <a:t>Kodkritiksystem</a:t>
+            </a:r>
           </a:p>
         </p:txBody>
       </p:sp>
@@ -7967,7 +8405,7 @@
     </p:custDataLst>
     <p:extLst>
       <p:ext uri="{BB962C8B-B14F-4D97-AF65-F5344CB8AC3E}">
-        <p14:creationId xmlns:p14="http://schemas.microsoft.com/office/powerpoint/2010/main" val="4124232571"/>
+        <p14:creationId xmlns:p14="http://schemas.microsoft.com/office/powerpoint/2010/main" val="847618868"/>
       </p:ext>
     </p:extLst>
   </p:cSld>
@@ -8010,10 +8448,9 @@
           <a:lstStyle/>
           <a:p>
             <a:r>
-              <a:rPr lang="sv-SE" dirty="0" smtClean="0"/>
-              <a:t>Byggscript</a:t>
-            </a:r>
-            <a:endParaRPr lang="sv-SE" dirty="0"/>
+              <a:rPr lang="sv-SE" dirty="0"/>
+              <a:t>Statiska mått</a:t>
+            </a:r>
           </a:p>
         </p:txBody>
       </p:sp>
@@ -8042,7 +8479,7 @@
     </p:custDataLst>
     <p:extLst>
       <p:ext uri="{BB962C8B-B14F-4D97-AF65-F5344CB8AC3E}">
-        <p14:creationId xmlns:p14="http://schemas.microsoft.com/office/powerpoint/2010/main" val="963717311"/>
+        <p14:creationId xmlns:p14="http://schemas.microsoft.com/office/powerpoint/2010/main" val="3620096591"/>
       </p:ext>
     </p:extLst>
   </p:cSld>
@@ -8085,10 +8522,9 @@
           <a:lstStyle/>
           <a:p>
             <a:r>
-              <a:rPr lang="sv-SE" dirty="0" smtClean="0"/>
-              <a:t>Övrigt</a:t>
-            </a:r>
-            <a:endParaRPr lang="sv-SE" dirty="0"/>
+              <a:rPr lang="sv-SE" dirty="0"/>
+              <a:t>Täckningsgrad</a:t>
+            </a:r>
           </a:p>
         </p:txBody>
       </p:sp>
@@ -8117,7 +8553,155 @@
     </p:custDataLst>
     <p:extLst>
       <p:ext uri="{BB962C8B-B14F-4D97-AF65-F5344CB8AC3E}">
-        <p14:creationId xmlns:p14="http://schemas.microsoft.com/office/powerpoint/2010/main" val="3016223473"/>
+        <p14:creationId xmlns:p14="http://schemas.microsoft.com/office/powerpoint/2010/main" val="3476279416"/>
+      </p:ext>
+    </p:extLst>
+  </p:cSld>
+  <p:clrMapOvr>
+    <a:masterClrMapping/>
+  </p:clrMapOvr>
+</p:sld>
+</file>
+
+<file path=ppt/slides/slide28.xml><?xml version="1.0" encoding="utf-8"?>
+<p:sld xmlns:a="http://schemas.openxmlformats.org/drawingml/2006/main" xmlns:r="http://schemas.openxmlformats.org/officeDocument/2006/relationships" xmlns:p="http://schemas.openxmlformats.org/presentationml/2006/main">
+  <p:cSld>
+    <p:spTree>
+      <p:nvGrpSpPr>
+        <p:cNvPr id="1" name=""/>
+        <p:cNvGrpSpPr/>
+        <p:nvPr/>
+      </p:nvGrpSpPr>
+      <p:grpSpPr>
+        <a:xfrm>
+          <a:off x="0" y="0"/>
+          <a:ext cx="0" cy="0"/>
+          <a:chOff x="0" y="0"/>
+          <a:chExt cx="0" cy="0"/>
+        </a:xfrm>
+      </p:grpSpPr>
+      <p:sp>
+        <p:nvSpPr>
+          <p:cNvPr id="2" name="Rubrik 1"/>
+          <p:cNvSpPr>
+            <a:spLocks noGrp="1"/>
+          </p:cNvSpPr>
+          <p:nvPr>
+            <p:ph type="title"/>
+          </p:nvPr>
+        </p:nvSpPr>
+        <p:spPr/>
+        <p:txBody>
+          <a:bodyPr/>
+          <a:lstStyle/>
+          <a:p>
+            <a:r>
+              <a:rPr lang="sv-SE" dirty="0"/>
+              <a:t>Profiler</a:t>
+            </a:r>
+          </a:p>
+        </p:txBody>
+      </p:sp>
+      <p:sp>
+        <p:nvSpPr>
+          <p:cNvPr id="3" name="Platshållare för innehåll 2"/>
+          <p:cNvSpPr>
+            <a:spLocks noGrp="1"/>
+          </p:cNvSpPr>
+          <p:nvPr>
+            <p:ph idx="1"/>
+          </p:nvPr>
+        </p:nvSpPr>
+        <p:spPr/>
+        <p:txBody>
+          <a:bodyPr/>
+          <a:lstStyle/>
+          <a:p>
+            <a:endParaRPr lang="sv-SE"/>
+          </a:p>
+        </p:txBody>
+      </p:sp>
+    </p:spTree>
+    <p:custDataLst>
+      <p:tags r:id="rId1"/>
+    </p:custDataLst>
+    <p:extLst>
+      <p:ext uri="{BB962C8B-B14F-4D97-AF65-F5344CB8AC3E}">
+        <p14:creationId xmlns:p14="http://schemas.microsoft.com/office/powerpoint/2010/main" val="4124232571"/>
+      </p:ext>
+    </p:extLst>
+  </p:cSld>
+  <p:clrMapOvr>
+    <a:masterClrMapping/>
+  </p:clrMapOvr>
+</p:sld>
+</file>
+
+<file path=ppt/slides/slide29.xml><?xml version="1.0" encoding="utf-8"?>
+<p:sld xmlns:a="http://schemas.openxmlformats.org/drawingml/2006/main" xmlns:r="http://schemas.openxmlformats.org/officeDocument/2006/relationships" xmlns:p="http://schemas.openxmlformats.org/presentationml/2006/main">
+  <p:cSld>
+    <p:spTree>
+      <p:nvGrpSpPr>
+        <p:cNvPr id="1" name=""/>
+        <p:cNvGrpSpPr/>
+        <p:nvPr/>
+      </p:nvGrpSpPr>
+      <p:grpSpPr>
+        <a:xfrm>
+          <a:off x="0" y="0"/>
+          <a:ext cx="0" cy="0"/>
+          <a:chOff x="0" y="0"/>
+          <a:chExt cx="0" cy="0"/>
+        </a:xfrm>
+      </p:grpSpPr>
+      <p:sp>
+        <p:nvSpPr>
+          <p:cNvPr id="2" name="Rubrik 1"/>
+          <p:cNvSpPr>
+            <a:spLocks noGrp="1"/>
+          </p:cNvSpPr>
+          <p:nvPr>
+            <p:ph type="title"/>
+          </p:nvPr>
+        </p:nvSpPr>
+        <p:spPr/>
+        <p:txBody>
+          <a:bodyPr/>
+          <a:lstStyle/>
+          <a:p>
+            <a:r>
+              <a:rPr lang="sv-SE" dirty="0"/>
+              <a:t>Byggscript</a:t>
+            </a:r>
+          </a:p>
+        </p:txBody>
+      </p:sp>
+      <p:sp>
+        <p:nvSpPr>
+          <p:cNvPr id="3" name="Platshållare för innehåll 2"/>
+          <p:cNvSpPr>
+            <a:spLocks noGrp="1"/>
+          </p:cNvSpPr>
+          <p:nvPr>
+            <p:ph idx="1"/>
+          </p:nvPr>
+        </p:nvSpPr>
+        <p:spPr/>
+        <p:txBody>
+          <a:bodyPr/>
+          <a:lstStyle/>
+          <a:p>
+            <a:endParaRPr lang="sv-SE"/>
+          </a:p>
+        </p:txBody>
+      </p:sp>
+    </p:spTree>
+    <p:custDataLst>
+      <p:tags r:id="rId1"/>
+    </p:custDataLst>
+    <p:extLst>
+      <p:ext uri="{BB962C8B-B14F-4D97-AF65-F5344CB8AC3E}">
+        <p14:creationId xmlns:p14="http://schemas.microsoft.com/office/powerpoint/2010/main" val="963717311"/>
       </p:ext>
     </p:extLst>
   </p:cSld>
@@ -8160,10 +8744,9 @@
           <a:lstStyle/>
           <a:p>
             <a:r>
-              <a:rPr lang="sv-SE" dirty="0" smtClean="0"/>
+              <a:rPr lang="sv-SE" dirty="0"/>
               <a:t>Slutlig design</a:t>
             </a:r>
-            <a:endParaRPr lang="sv-SE" dirty="0"/>
           </a:p>
         </p:txBody>
       </p:sp>
@@ -8193,6 +8776,80 @@
     <p:extLst>
       <p:ext uri="{BB962C8B-B14F-4D97-AF65-F5344CB8AC3E}">
         <p14:creationId xmlns:p14="http://schemas.microsoft.com/office/powerpoint/2010/main" val="3617610750"/>
+      </p:ext>
+    </p:extLst>
+  </p:cSld>
+  <p:clrMapOvr>
+    <a:masterClrMapping/>
+  </p:clrMapOvr>
+</p:sld>
+</file>
+
+<file path=ppt/slides/slide30.xml><?xml version="1.0" encoding="utf-8"?>
+<p:sld xmlns:a="http://schemas.openxmlformats.org/drawingml/2006/main" xmlns:r="http://schemas.openxmlformats.org/officeDocument/2006/relationships" xmlns:p="http://schemas.openxmlformats.org/presentationml/2006/main">
+  <p:cSld>
+    <p:spTree>
+      <p:nvGrpSpPr>
+        <p:cNvPr id="1" name=""/>
+        <p:cNvGrpSpPr/>
+        <p:nvPr/>
+      </p:nvGrpSpPr>
+      <p:grpSpPr>
+        <a:xfrm>
+          <a:off x="0" y="0"/>
+          <a:ext cx="0" cy="0"/>
+          <a:chOff x="0" y="0"/>
+          <a:chExt cx="0" cy="0"/>
+        </a:xfrm>
+      </p:grpSpPr>
+      <p:sp>
+        <p:nvSpPr>
+          <p:cNvPr id="2" name="Rubrik 1"/>
+          <p:cNvSpPr>
+            <a:spLocks noGrp="1"/>
+          </p:cNvSpPr>
+          <p:nvPr>
+            <p:ph type="title"/>
+          </p:nvPr>
+        </p:nvSpPr>
+        <p:spPr/>
+        <p:txBody>
+          <a:bodyPr/>
+          <a:lstStyle/>
+          <a:p>
+            <a:r>
+              <a:rPr lang="sv-SE" dirty="0"/>
+              <a:t>Övrigt</a:t>
+            </a:r>
+          </a:p>
+        </p:txBody>
+      </p:sp>
+      <p:sp>
+        <p:nvSpPr>
+          <p:cNvPr id="3" name="Platshållare för innehåll 2"/>
+          <p:cNvSpPr>
+            <a:spLocks noGrp="1"/>
+          </p:cNvSpPr>
+          <p:nvPr>
+            <p:ph idx="1"/>
+          </p:nvPr>
+        </p:nvSpPr>
+        <p:spPr/>
+        <p:txBody>
+          <a:bodyPr/>
+          <a:lstStyle/>
+          <a:p>
+            <a:endParaRPr lang="sv-SE"/>
+          </a:p>
+        </p:txBody>
+      </p:sp>
+    </p:spTree>
+    <p:custDataLst>
+      <p:tags r:id="rId1"/>
+    </p:custDataLst>
+    <p:extLst>
+      <p:ext uri="{BB962C8B-B14F-4D97-AF65-F5344CB8AC3E}">
+        <p14:creationId xmlns:p14="http://schemas.microsoft.com/office/powerpoint/2010/main" val="3016223473"/>
       </p:ext>
     </p:extLst>
   </p:cSld>
@@ -8235,12 +8892,30 @@
           <a:lstStyle/>
           <a:p>
             <a:r>
-              <a:rPr lang="sv-SE" dirty="0" smtClean="0"/>
-              <a:t>TDD-exempel: </a:t>
-            </a:r>
-            <a:r>
-              <a:rPr lang="sv-SE" dirty="0" smtClean="0"/>
-              <a:t>namn (kopiera denna sida och fyll i kopian)</a:t>
+              <a:rPr lang="sv-SE" dirty="0"/>
+              <a:t>TDD-exempel: namn (kopiera denna sida och fyll i kopian)</a:t>
+            </a:r>
+          </a:p>
+        </p:txBody>
+      </p:sp>
+      <p:sp>
+        <p:nvSpPr>
+          <p:cNvPr id="4" name="Platshållare för text 3"/>
+          <p:cNvSpPr>
+            <a:spLocks noGrp="1"/>
+          </p:cNvSpPr>
+          <p:nvPr>
+            <p:ph type="body" idx="1"/>
+          </p:nvPr>
+        </p:nvSpPr>
+        <p:spPr/>
+        <p:txBody>
+          <a:bodyPr/>
+          <a:lstStyle/>
+          <a:p>
+            <a:r>
+              <a:rPr lang="sv-SE" dirty="0" err="1"/>
+              <a:t>Testkod</a:t>
             </a:r>
             <a:endParaRPr lang="sv-SE" dirty="0"/>
           </a:p>
@@ -8248,29 +8923,6 @@
       </p:sp>
       <p:sp>
         <p:nvSpPr>
-          <p:cNvPr id="4" name="Platshållare för text 3"/>
-          <p:cNvSpPr>
-            <a:spLocks noGrp="1"/>
-          </p:cNvSpPr>
-          <p:nvPr>
-            <p:ph type="body" idx="1"/>
-          </p:nvPr>
-        </p:nvSpPr>
-        <p:spPr/>
-        <p:txBody>
-          <a:bodyPr/>
-          <a:lstStyle/>
-          <a:p>
-            <a:r>
-              <a:rPr lang="sv-SE" dirty="0" err="1" smtClean="0"/>
-              <a:t>Testkod</a:t>
-            </a:r>
-            <a:endParaRPr lang="sv-SE" dirty="0"/>
-          </a:p>
-        </p:txBody>
-      </p:sp>
-      <p:sp>
-        <p:nvSpPr>
           <p:cNvPr id="5" name="Platshållare för innehåll 4"/>
           <p:cNvSpPr>
             <a:spLocks noGrp="1"/>
@@ -8304,10 +8956,9 @@
           <a:lstStyle/>
           <a:p>
             <a:r>
-              <a:rPr lang="sv-SE" dirty="0" smtClean="0"/>
+              <a:rPr lang="sv-SE" dirty="0"/>
               <a:t>Koden som testas</a:t>
             </a:r>
-            <a:endParaRPr lang="sv-SE" dirty="0"/>
           </a:p>
         </p:txBody>
       </p:sp>
@@ -8379,12 +9030,30 @@
           <a:lstStyle/>
           <a:p>
             <a:r>
-              <a:rPr lang="sv-SE" dirty="0" smtClean="0"/>
-              <a:t>TDD-exempel: </a:t>
-            </a:r>
-            <a:r>
-              <a:rPr lang="sv-SE" dirty="0" smtClean="0"/>
-              <a:t>Linnéa Palmgren</a:t>
+              <a:rPr lang="sv-SE" dirty="0"/>
+              <a:t>TDD-exempel: Linnéa Palmgren</a:t>
+            </a:r>
+          </a:p>
+        </p:txBody>
+      </p:sp>
+      <p:sp>
+        <p:nvSpPr>
+          <p:cNvPr id="4" name="Platshållare för text 3"/>
+          <p:cNvSpPr>
+            <a:spLocks noGrp="1"/>
+          </p:cNvSpPr>
+          <p:nvPr>
+            <p:ph type="body" idx="1"/>
+          </p:nvPr>
+        </p:nvSpPr>
+        <p:spPr/>
+        <p:txBody>
+          <a:bodyPr/>
+          <a:lstStyle/>
+          <a:p>
+            <a:r>
+              <a:rPr lang="sv-SE" dirty="0" err="1"/>
+              <a:t>Testkod</a:t>
             </a:r>
             <a:endParaRPr lang="sv-SE" dirty="0"/>
           </a:p>
@@ -8392,48 +9061,25 @@
       </p:sp>
       <p:sp>
         <p:nvSpPr>
-          <p:cNvPr id="4" name="Platshållare för text 3"/>
-          <p:cNvSpPr>
-            <a:spLocks noGrp="1"/>
-          </p:cNvSpPr>
-          <p:nvPr>
-            <p:ph type="body" idx="1"/>
-          </p:nvPr>
-        </p:nvSpPr>
-        <p:spPr/>
-        <p:txBody>
-          <a:bodyPr/>
-          <a:lstStyle/>
-          <a:p>
-            <a:r>
-              <a:rPr lang="sv-SE" dirty="0" err="1" smtClean="0"/>
-              <a:t>Testkod</a:t>
-            </a:r>
+          <p:cNvPr id="5" name="Platshållare för innehåll 4"/>
+          <p:cNvSpPr>
+            <a:spLocks noGrp="1"/>
+          </p:cNvSpPr>
+          <p:nvPr>
+            <p:ph sz="half" idx="2"/>
+          </p:nvPr>
+        </p:nvSpPr>
+        <p:spPr/>
+        <p:txBody>
+          <a:bodyPr/>
+          <a:lstStyle/>
+          <a:p>
             <a:endParaRPr lang="sv-SE" dirty="0"/>
           </a:p>
         </p:txBody>
       </p:sp>
       <p:sp>
         <p:nvSpPr>
-          <p:cNvPr id="5" name="Platshållare för innehåll 4"/>
-          <p:cNvSpPr>
-            <a:spLocks noGrp="1"/>
-          </p:cNvSpPr>
-          <p:nvPr>
-            <p:ph sz="half" idx="2"/>
-          </p:nvPr>
-        </p:nvSpPr>
-        <p:spPr/>
-        <p:txBody>
-          <a:bodyPr/>
-          <a:lstStyle/>
-          <a:p>
-            <a:endParaRPr lang="sv-SE" dirty="0"/>
-          </a:p>
-        </p:txBody>
-      </p:sp>
-      <p:sp>
-        <p:nvSpPr>
           <p:cNvPr id="6" name="Platshållare för text 5"/>
           <p:cNvSpPr>
             <a:spLocks noGrp="1"/>
@@ -8448,10 +9094,9 @@
           <a:lstStyle/>
           <a:p>
             <a:r>
-              <a:rPr lang="sv-SE" dirty="0" smtClean="0"/>
+              <a:rPr lang="sv-SE" dirty="0"/>
               <a:t>Koden som testas</a:t>
             </a:r>
-            <a:endParaRPr lang="sv-SE" dirty="0"/>
           </a:p>
         </p:txBody>
       </p:sp>
@@ -8509,7 +9154,7 @@
       </p:grpSpPr>
       <p:sp>
         <p:nvSpPr>
-          <p:cNvPr id="9" name="Rubrik 8"/>
+          <p:cNvPr id="2" name="Rubrik 1"/>
           <p:cNvSpPr>
             <a:spLocks noGrp="1"/>
           </p:cNvSpPr>
@@ -8523,39 +9168,132 @@
           <a:lstStyle/>
           <a:p>
             <a:r>
-              <a:rPr lang="sv-SE" dirty="0" smtClean="0"/>
-              <a:t>TDD erfarenheter</a:t>
+              <a:rPr lang="sv-SE" dirty="0" err="1"/>
+              <a:t>TDD-exempel:Bjargey</a:t>
+            </a:r>
+            <a:r>
+              <a:rPr lang="sv-SE" dirty="0"/>
+              <a:t> Ingólfsdóttir</a:t>
+            </a:r>
+          </a:p>
+        </p:txBody>
+      </p:sp>
+      <p:sp>
+        <p:nvSpPr>
+          <p:cNvPr id="4" name="Platshållare för text 3"/>
+          <p:cNvSpPr>
+            <a:spLocks noGrp="1"/>
+          </p:cNvSpPr>
+          <p:nvPr>
+            <p:ph type="body" idx="1"/>
+          </p:nvPr>
+        </p:nvSpPr>
+        <p:spPr/>
+        <p:txBody>
+          <a:bodyPr/>
+          <a:lstStyle/>
+          <a:p>
+            <a:r>
+              <a:rPr lang="sv-SE" dirty="0" err="1"/>
+              <a:t>Testkod</a:t>
             </a:r>
             <a:endParaRPr lang="sv-SE" dirty="0"/>
           </a:p>
         </p:txBody>
       </p:sp>
-      <p:sp>
-        <p:nvSpPr>
-          <p:cNvPr id="10" name="Platshållare för innehåll 9"/>
-          <p:cNvSpPr>
-            <a:spLocks noGrp="1"/>
-          </p:cNvSpPr>
-          <p:nvPr>
-            <p:ph idx="1"/>
-          </p:nvPr>
-        </p:nvSpPr>
-        <p:spPr/>
-        <p:txBody>
-          <a:bodyPr/>
-          <a:lstStyle/>
-          <a:p>
-            <a:endParaRPr lang="sv-SE" dirty="0"/>
-          </a:p>
-        </p:txBody>
-      </p:sp>
+      <p:pic>
+        <p:nvPicPr>
+          <p:cNvPr id="3" name="Platshållare för innehåll 2">
+            <a:extLst>
+              <a:ext uri="{FF2B5EF4-FFF2-40B4-BE49-F238E27FC236}">
+                <a16:creationId xmlns:a16="http://schemas.microsoft.com/office/drawing/2014/main" id="{864FEA21-E32D-43E2-9646-B66287A78D49}"/>
+              </a:ext>
+            </a:extLst>
+          </p:cNvPr>
+          <p:cNvPicPr>
+            <a:picLocks noGrp="1" noChangeAspect="1"/>
+          </p:cNvPicPr>
+          <p:nvPr>
+            <p:ph sz="half" idx="2"/>
+          </p:nvPr>
+        </p:nvPicPr>
+        <p:blipFill>
+          <a:blip r:embed="rId4"/>
+          <a:stretch>
+            <a:fillRect/>
+          </a:stretch>
+        </p:blipFill>
+        <p:spPr>
+          <a:xfrm>
+            <a:off x="384918" y="3257950"/>
+            <a:ext cx="5634883" cy="1689353"/>
+          </a:xfrm>
+          <a:prstGeom prst="rect">
+            <a:avLst/>
+          </a:prstGeom>
+        </p:spPr>
+      </p:pic>
+      <p:sp>
+        <p:nvSpPr>
+          <p:cNvPr id="6" name="Platshållare för text 5"/>
+          <p:cNvSpPr>
+            <a:spLocks noGrp="1"/>
+          </p:cNvSpPr>
+          <p:nvPr>
+            <p:ph type="body" sz="quarter" idx="3"/>
+          </p:nvPr>
+        </p:nvSpPr>
+        <p:spPr/>
+        <p:txBody>
+          <a:bodyPr/>
+          <a:lstStyle/>
+          <a:p>
+            <a:r>
+              <a:rPr lang="sv-SE" dirty="0"/>
+              <a:t>Koden som testas</a:t>
+            </a:r>
+          </a:p>
+        </p:txBody>
+      </p:sp>
+      <p:pic>
+        <p:nvPicPr>
+          <p:cNvPr id="8" name="Platshållare för innehåll 7">
+            <a:extLst>
+              <a:ext uri="{FF2B5EF4-FFF2-40B4-BE49-F238E27FC236}">
+                <a16:creationId xmlns:a16="http://schemas.microsoft.com/office/drawing/2014/main" id="{7A9D6C6A-FF50-4160-86E6-2EDF66CCA991}"/>
+              </a:ext>
+            </a:extLst>
+          </p:cNvPr>
+          <p:cNvPicPr>
+            <a:picLocks noGrp="1" noChangeAspect="1"/>
+          </p:cNvPicPr>
+          <p:nvPr>
+            <p:ph sz="quarter" idx="4"/>
+          </p:nvPr>
+        </p:nvPicPr>
+        <p:blipFill>
+          <a:blip r:embed="rId5"/>
+          <a:stretch>
+            <a:fillRect/>
+          </a:stretch>
+        </p:blipFill>
+        <p:spPr>
+          <a:xfrm>
+            <a:off x="6671746" y="3266913"/>
+            <a:ext cx="4457302" cy="1568598"/>
+          </a:xfrm>
+          <a:prstGeom prst="rect">
+            <a:avLst/>
+          </a:prstGeom>
+        </p:spPr>
+      </p:pic>
     </p:spTree>
     <p:custDataLst>
       <p:tags r:id="rId1"/>
     </p:custDataLst>
     <p:extLst>
       <p:ext uri="{BB962C8B-B14F-4D97-AF65-F5344CB8AC3E}">
-        <p14:creationId xmlns:p14="http://schemas.microsoft.com/office/powerpoint/2010/main" val="1458286633"/>
+        <p14:creationId xmlns:p14="http://schemas.microsoft.com/office/powerpoint/2010/main" val="1949933306"/>
       </p:ext>
     </p:extLst>
   </p:cSld>
@@ -8598,8 +9336,34 @@
           <a:lstStyle/>
           <a:p>
             <a:r>
-              <a:rPr lang="sv-SE" dirty="0" smtClean="0"/>
-              <a:t>Testfallsdesign ekvivalensklasser</a:t>
+              <a:rPr lang="sv-SE" dirty="0" err="1"/>
+              <a:t>TDD-exempel:Bjargey</a:t>
+            </a:r>
+            <a:r>
+              <a:rPr lang="sv-SE" dirty="0"/>
+              <a:t> Ingólfsdóttir</a:t>
+            </a:r>
+          </a:p>
+        </p:txBody>
+      </p:sp>
+      <p:sp>
+        <p:nvSpPr>
+          <p:cNvPr id="4" name="Platshållare för text 3"/>
+          <p:cNvSpPr>
+            <a:spLocks noGrp="1"/>
+          </p:cNvSpPr>
+          <p:nvPr>
+            <p:ph type="body" idx="1"/>
+          </p:nvPr>
+        </p:nvSpPr>
+        <p:spPr/>
+        <p:txBody>
+          <a:bodyPr/>
+          <a:lstStyle/>
+          <a:p>
+            <a:r>
+              <a:rPr lang="sv-SE" dirty="0" err="1"/>
+              <a:t>Testkod</a:t>
             </a:r>
             <a:endParaRPr lang="sv-SE" dirty="0"/>
           </a:p>
@@ -8607,30 +9371,97 @@
       </p:sp>
       <p:sp>
         <p:nvSpPr>
-          <p:cNvPr id="3" name="Platshållare för innehåll 2"/>
-          <p:cNvSpPr>
-            <a:spLocks noGrp="1"/>
-          </p:cNvSpPr>
-          <p:nvPr>
-            <p:ph idx="1"/>
-          </p:nvPr>
-        </p:nvSpPr>
-        <p:spPr/>
-        <p:txBody>
-          <a:bodyPr/>
-          <a:lstStyle/>
-          <a:p>
-            <a:endParaRPr lang="sv-SE"/>
-          </a:p>
-        </p:txBody>
-      </p:sp>
+          <p:cNvPr id="6" name="Platshållare för text 5"/>
+          <p:cNvSpPr>
+            <a:spLocks noGrp="1"/>
+          </p:cNvSpPr>
+          <p:nvPr>
+            <p:ph type="body" sz="quarter" idx="3"/>
+          </p:nvPr>
+        </p:nvSpPr>
+        <p:spPr/>
+        <p:txBody>
+          <a:bodyPr/>
+          <a:lstStyle/>
+          <a:p>
+            <a:r>
+              <a:rPr lang="sv-SE" dirty="0"/>
+              <a:t>Koden som testas</a:t>
+            </a:r>
+          </a:p>
+        </p:txBody>
+      </p:sp>
+      <p:pic>
+        <p:nvPicPr>
+          <p:cNvPr id="14" name="Platshållare för innehåll 13">
+            <a:extLst>
+              <a:ext uri="{FF2B5EF4-FFF2-40B4-BE49-F238E27FC236}">
+                <a16:creationId xmlns:a16="http://schemas.microsoft.com/office/drawing/2014/main" id="{782F486D-D497-46DE-97A2-08CF1FAFFC27}"/>
+              </a:ext>
+            </a:extLst>
+          </p:cNvPr>
+          <p:cNvPicPr>
+            <a:picLocks noGrp="1" noChangeAspect="1"/>
+          </p:cNvPicPr>
+          <p:nvPr>
+            <p:ph sz="quarter" idx="4"/>
+          </p:nvPr>
+        </p:nvPicPr>
+        <p:blipFill>
+          <a:blip r:embed="rId4"/>
+          <a:stretch>
+            <a:fillRect/>
+          </a:stretch>
+        </p:blipFill>
+        <p:spPr>
+          <a:xfrm>
+            <a:off x="6172199" y="3006726"/>
+            <a:ext cx="5998509" cy="2360452"/>
+          </a:xfrm>
+          <a:prstGeom prst="rect">
+            <a:avLst/>
+          </a:prstGeom>
+        </p:spPr>
+      </p:pic>
+      <p:pic>
+        <p:nvPicPr>
+          <p:cNvPr id="13" name="Platshållare för innehåll 12">
+            <a:extLst>
+              <a:ext uri="{FF2B5EF4-FFF2-40B4-BE49-F238E27FC236}">
+                <a16:creationId xmlns:a16="http://schemas.microsoft.com/office/drawing/2014/main" id="{B9A7EA65-3F37-47C8-BE59-12FE46DB30C3}"/>
+              </a:ext>
+            </a:extLst>
+          </p:cNvPr>
+          <p:cNvPicPr>
+            <a:picLocks noGrp="1" noChangeAspect="1"/>
+          </p:cNvPicPr>
+          <p:nvPr>
+            <p:ph sz="half" idx="2"/>
+          </p:nvPr>
+        </p:nvPicPr>
+        <p:blipFill>
+          <a:blip r:embed="rId5"/>
+          <a:stretch>
+            <a:fillRect/>
+          </a:stretch>
+        </p:blipFill>
+        <p:spPr>
+          <a:xfrm>
+            <a:off x="62981" y="3741683"/>
+            <a:ext cx="5937701" cy="1070732"/>
+          </a:xfrm>
+          <a:prstGeom prst="rect">
+            <a:avLst/>
+          </a:prstGeom>
+        </p:spPr>
+      </p:pic>
     </p:spTree>
     <p:custDataLst>
       <p:tags r:id="rId1"/>
     </p:custDataLst>
     <p:extLst>
       <p:ext uri="{BB962C8B-B14F-4D97-AF65-F5344CB8AC3E}">
-        <p14:creationId xmlns:p14="http://schemas.microsoft.com/office/powerpoint/2010/main" val="3480241241"/>
+        <p14:creationId xmlns:p14="http://schemas.microsoft.com/office/powerpoint/2010/main" val="2171053083"/>
       </p:ext>
     </p:extLst>
   </p:cSld>
@@ -8673,8 +9504,34 @@
           <a:lstStyle/>
           <a:p>
             <a:r>
-              <a:rPr lang="sv-SE" dirty="0" smtClean="0"/>
-              <a:t>Ekvivalensklasserna</a:t>
+              <a:rPr lang="sv-SE" dirty="0" err="1"/>
+              <a:t>TDD-exempel:Bjargey</a:t>
+            </a:r>
+            <a:r>
+              <a:rPr lang="sv-SE" dirty="0"/>
+              <a:t> Ingólfsdóttir</a:t>
+            </a:r>
+          </a:p>
+        </p:txBody>
+      </p:sp>
+      <p:sp>
+        <p:nvSpPr>
+          <p:cNvPr id="4" name="Platshållare för text 3"/>
+          <p:cNvSpPr>
+            <a:spLocks noGrp="1"/>
+          </p:cNvSpPr>
+          <p:nvPr>
+            <p:ph type="body" idx="1"/>
+          </p:nvPr>
+        </p:nvSpPr>
+        <p:spPr/>
+        <p:txBody>
+          <a:bodyPr/>
+          <a:lstStyle/>
+          <a:p>
+            <a:r>
+              <a:rPr lang="sv-SE" dirty="0" err="1"/>
+              <a:t>Testkod</a:t>
             </a:r>
             <a:endParaRPr lang="sv-SE" dirty="0"/>
           </a:p>
@@ -8682,30 +9539,97 @@
       </p:sp>
       <p:sp>
         <p:nvSpPr>
-          <p:cNvPr id="3" name="Platshållare för innehåll 2"/>
-          <p:cNvSpPr>
-            <a:spLocks noGrp="1"/>
-          </p:cNvSpPr>
-          <p:nvPr>
-            <p:ph idx="1"/>
-          </p:nvPr>
-        </p:nvSpPr>
-        <p:spPr/>
-        <p:txBody>
-          <a:bodyPr/>
-          <a:lstStyle/>
-          <a:p>
-            <a:endParaRPr lang="sv-SE"/>
-          </a:p>
-        </p:txBody>
-      </p:sp>
+          <p:cNvPr id="6" name="Platshållare för text 5"/>
+          <p:cNvSpPr>
+            <a:spLocks noGrp="1"/>
+          </p:cNvSpPr>
+          <p:nvPr>
+            <p:ph type="body" sz="quarter" idx="3"/>
+          </p:nvPr>
+        </p:nvSpPr>
+        <p:spPr/>
+        <p:txBody>
+          <a:bodyPr/>
+          <a:lstStyle/>
+          <a:p>
+            <a:r>
+              <a:rPr lang="sv-SE" dirty="0"/>
+              <a:t>Koden som testas</a:t>
+            </a:r>
+          </a:p>
+        </p:txBody>
+      </p:sp>
+      <p:pic>
+        <p:nvPicPr>
+          <p:cNvPr id="8" name="Platshållare för innehåll 7">
+            <a:extLst>
+              <a:ext uri="{FF2B5EF4-FFF2-40B4-BE49-F238E27FC236}">
+                <a16:creationId xmlns:a16="http://schemas.microsoft.com/office/drawing/2014/main" id="{7E580B70-D670-41FA-8638-4B66A1929055}"/>
+              </a:ext>
+            </a:extLst>
+          </p:cNvPr>
+          <p:cNvPicPr>
+            <a:picLocks noGrp="1" noChangeAspect="1"/>
+          </p:cNvPicPr>
+          <p:nvPr>
+            <p:ph sz="quarter" idx="4"/>
+          </p:nvPr>
+        </p:nvPicPr>
+        <p:blipFill>
+          <a:blip r:embed="rId4"/>
+          <a:stretch>
+            <a:fillRect/>
+          </a:stretch>
+        </p:blipFill>
+        <p:spPr>
+          <a:xfrm>
+            <a:off x="6831956" y="3835904"/>
+            <a:ext cx="5094189" cy="823912"/>
+          </a:xfrm>
+          <a:prstGeom prst="rect">
+            <a:avLst/>
+          </a:prstGeom>
+        </p:spPr>
+      </p:pic>
+      <p:pic>
+        <p:nvPicPr>
+          <p:cNvPr id="11" name="Platshållare för innehåll 10">
+            <a:extLst>
+              <a:ext uri="{FF2B5EF4-FFF2-40B4-BE49-F238E27FC236}">
+                <a16:creationId xmlns:a16="http://schemas.microsoft.com/office/drawing/2014/main" id="{4F938606-BFA6-4E62-A54C-85983F8E5D56}"/>
+              </a:ext>
+            </a:extLst>
+          </p:cNvPr>
+          <p:cNvPicPr>
+            <a:picLocks noGrp="1" noChangeAspect="1"/>
+          </p:cNvPicPr>
+          <p:nvPr>
+            <p:ph sz="half" idx="2"/>
+          </p:nvPr>
+        </p:nvPicPr>
+        <p:blipFill>
+          <a:blip r:embed="rId5"/>
+          <a:stretch>
+            <a:fillRect/>
+          </a:stretch>
+        </p:blipFill>
+        <p:spPr>
+          <a:xfrm>
+            <a:off x="140834" y="3289738"/>
+            <a:ext cx="5856742" cy="1889737"/>
+          </a:xfrm>
+          <a:prstGeom prst="rect">
+            <a:avLst/>
+          </a:prstGeom>
+        </p:spPr>
+      </p:pic>
     </p:spTree>
     <p:custDataLst>
       <p:tags r:id="rId1"/>
     </p:custDataLst>
     <p:extLst>
       <p:ext uri="{BB962C8B-B14F-4D97-AF65-F5344CB8AC3E}">
-        <p14:creationId xmlns:p14="http://schemas.microsoft.com/office/powerpoint/2010/main" val="3750412782"/>
+        <p14:creationId xmlns:p14="http://schemas.microsoft.com/office/powerpoint/2010/main" val="4061453420"/>
       </p:ext>
     </p:extLst>
   </p:cSld>
@@ -8734,7 +9658,7 @@
       </p:grpSpPr>
       <p:sp>
         <p:nvSpPr>
-          <p:cNvPr id="2" name="Rubrik 1"/>
+          <p:cNvPr id="9" name="Rubrik 8"/>
           <p:cNvSpPr>
             <a:spLocks noGrp="1"/>
           </p:cNvSpPr>
@@ -8748,29 +9672,28 @@
           <a:lstStyle/>
           <a:p>
             <a:r>
-              <a:rPr lang="sv-SE" dirty="0" smtClean="0"/>
-              <a:t>Testfall</a:t>
-            </a:r>
+              <a:rPr lang="sv-SE" dirty="0"/>
+              <a:t>TDD erfarenheter</a:t>
+            </a:r>
+          </a:p>
+        </p:txBody>
+      </p:sp>
+      <p:sp>
+        <p:nvSpPr>
+          <p:cNvPr id="10" name="Platshållare för innehåll 9"/>
+          <p:cNvSpPr>
+            <a:spLocks noGrp="1"/>
+          </p:cNvSpPr>
+          <p:nvPr>
+            <p:ph idx="1"/>
+          </p:nvPr>
+        </p:nvSpPr>
+        <p:spPr/>
+        <p:txBody>
+          <a:bodyPr/>
+          <a:lstStyle/>
+          <a:p>
             <a:endParaRPr lang="sv-SE" dirty="0"/>
-          </a:p>
-        </p:txBody>
-      </p:sp>
-      <p:sp>
-        <p:nvSpPr>
-          <p:cNvPr id="3" name="Platshållare för innehåll 2"/>
-          <p:cNvSpPr>
-            <a:spLocks noGrp="1"/>
-          </p:cNvSpPr>
-          <p:nvPr>
-            <p:ph idx="1"/>
-          </p:nvPr>
-        </p:nvSpPr>
-        <p:spPr/>
-        <p:txBody>
-          <a:bodyPr/>
-          <a:lstStyle/>
-          <a:p>
-            <a:endParaRPr lang="sv-SE"/>
           </a:p>
         </p:txBody>
       </p:sp>
@@ -8780,7 +9703,7 @@
     </p:custDataLst>
     <p:extLst>
       <p:ext uri="{BB962C8B-B14F-4D97-AF65-F5344CB8AC3E}">
-        <p14:creationId xmlns:p14="http://schemas.microsoft.com/office/powerpoint/2010/main" val="3595241904"/>
+        <p14:creationId xmlns:p14="http://schemas.microsoft.com/office/powerpoint/2010/main" val="1458286633"/>
       </p:ext>
     </p:extLst>
   </p:cSld>
@@ -8917,7 +9840,25 @@
 </p:tagLst>
 </file>
 
+<file path=ppt/tags/tag29.xml><?xml version="1.0" encoding="utf-8"?>
+<p:tagLst xmlns:a="http://schemas.openxmlformats.org/drawingml/2006/main" xmlns:r="http://schemas.openxmlformats.org/officeDocument/2006/relationships" xmlns:p="http://schemas.openxmlformats.org/presentationml/2006/main">
+  <p:tag name="ARTICULATE_SLIDE_THUMBNAIL_REFRESH" val="1"/>
+</p:tagLst>
+</file>
+
 <file path=ppt/tags/tag3.xml><?xml version="1.0" encoding="utf-8"?>
+<p:tagLst xmlns:a="http://schemas.openxmlformats.org/drawingml/2006/main" xmlns:r="http://schemas.openxmlformats.org/officeDocument/2006/relationships" xmlns:p="http://schemas.openxmlformats.org/presentationml/2006/main">
+  <p:tag name="ARTICULATE_SLIDE_THUMBNAIL_REFRESH" val="1"/>
+</p:tagLst>
+</file>
+
+<file path=ppt/tags/tag30.xml><?xml version="1.0" encoding="utf-8"?>
+<p:tagLst xmlns:a="http://schemas.openxmlformats.org/drawingml/2006/main" xmlns:r="http://schemas.openxmlformats.org/officeDocument/2006/relationships" xmlns:p="http://schemas.openxmlformats.org/presentationml/2006/main">
+  <p:tag name="ARTICULATE_SLIDE_THUMBNAIL_REFRESH" val="1"/>
+</p:tagLst>
+</file>
+
+<file path=ppt/tags/tag31.xml><?xml version="1.0" encoding="utf-8"?>
 <p:tagLst xmlns:a="http://schemas.openxmlformats.org/drawingml/2006/main" xmlns:r="http://schemas.openxmlformats.org/officeDocument/2006/relationships" xmlns:p="http://schemas.openxmlformats.org/presentationml/2006/main">
   <p:tag name="ARTICULATE_SLIDE_THUMBNAIL_REFRESH" val="1"/>
 </p:tagLst>

</xml_diff>

<commit_message>
added Kalles TDD example
</commit_message>
<xml_diff>
--- a/slutredovisning.pptx
+++ b/slutredovisning.pptx
@@ -5,48 +5,49 @@
     <p:sldMasterId id="2147483648" r:id="rId1"/>
   </p:sldMasterIdLst>
   <p:notesMasterIdLst>
-    <p:notesMasterId r:id="rId36"/>
+    <p:notesMasterId r:id="rId37"/>
   </p:notesMasterIdLst>
   <p:sldIdLst>
     <p:sldId id="286" r:id="rId2"/>
     <p:sldId id="257" r:id="rId3"/>
     <p:sldId id="258" r:id="rId4"/>
     <p:sldId id="259" r:id="rId5"/>
-    <p:sldId id="290" r:id="rId6"/>
-    <p:sldId id="291" r:id="rId7"/>
-    <p:sldId id="283" r:id="rId8"/>
-    <p:sldId id="284" r:id="rId9"/>
-    <p:sldId id="285" r:id="rId10"/>
-    <p:sldId id="287" r:id="rId11"/>
-    <p:sldId id="288" r:id="rId12"/>
-    <p:sldId id="289" r:id="rId13"/>
-    <p:sldId id="260" r:id="rId14"/>
-    <p:sldId id="261" r:id="rId15"/>
-    <p:sldId id="262" r:id="rId16"/>
-    <p:sldId id="263" r:id="rId17"/>
-    <p:sldId id="264" r:id="rId18"/>
-    <p:sldId id="265" r:id="rId19"/>
-    <p:sldId id="266" r:id="rId20"/>
-    <p:sldId id="267" r:id="rId21"/>
-    <p:sldId id="268" r:id="rId22"/>
-    <p:sldId id="269" r:id="rId23"/>
-    <p:sldId id="270" r:id="rId24"/>
-    <p:sldId id="272" r:id="rId25"/>
-    <p:sldId id="271" r:id="rId26"/>
-    <p:sldId id="273" r:id="rId27"/>
-    <p:sldId id="274" r:id="rId28"/>
-    <p:sldId id="275" r:id="rId29"/>
-    <p:sldId id="276" r:id="rId30"/>
-    <p:sldId id="277" r:id="rId31"/>
-    <p:sldId id="278" r:id="rId32"/>
-    <p:sldId id="279" r:id="rId33"/>
-    <p:sldId id="280" r:id="rId34"/>
-    <p:sldId id="281" r:id="rId35"/>
+    <p:sldId id="292" r:id="rId6"/>
+    <p:sldId id="290" r:id="rId7"/>
+    <p:sldId id="291" r:id="rId8"/>
+    <p:sldId id="283" r:id="rId9"/>
+    <p:sldId id="284" r:id="rId10"/>
+    <p:sldId id="285" r:id="rId11"/>
+    <p:sldId id="287" r:id="rId12"/>
+    <p:sldId id="288" r:id="rId13"/>
+    <p:sldId id="289" r:id="rId14"/>
+    <p:sldId id="260" r:id="rId15"/>
+    <p:sldId id="261" r:id="rId16"/>
+    <p:sldId id="262" r:id="rId17"/>
+    <p:sldId id="263" r:id="rId18"/>
+    <p:sldId id="264" r:id="rId19"/>
+    <p:sldId id="265" r:id="rId20"/>
+    <p:sldId id="266" r:id="rId21"/>
+    <p:sldId id="267" r:id="rId22"/>
+    <p:sldId id="268" r:id="rId23"/>
+    <p:sldId id="269" r:id="rId24"/>
+    <p:sldId id="270" r:id="rId25"/>
+    <p:sldId id="272" r:id="rId26"/>
+    <p:sldId id="271" r:id="rId27"/>
+    <p:sldId id="273" r:id="rId28"/>
+    <p:sldId id="274" r:id="rId29"/>
+    <p:sldId id="275" r:id="rId30"/>
+    <p:sldId id="276" r:id="rId31"/>
+    <p:sldId id="277" r:id="rId32"/>
+    <p:sldId id="278" r:id="rId33"/>
+    <p:sldId id="279" r:id="rId34"/>
+    <p:sldId id="280" r:id="rId35"/>
+    <p:sldId id="281" r:id="rId36"/>
   </p:sldIdLst>
   <p:sldSz cx="12192000" cy="6858000"/>
   <p:notesSz cx="6858000" cy="9144000"/>
   <p:custDataLst>
-    <p:tags r:id="rId37"/>
+    <p:tags r:id="rId38"/>
   </p:custDataLst>
   <p:defaultTextStyle>
     <a:defPPr>
@@ -737,7 +738,7 @@
     </p:spTree>
     <p:extLst>
       <p:ext uri="{BB962C8B-B14F-4D97-AF65-F5344CB8AC3E}">
-        <p14:creationId xmlns:p14="http://schemas.microsoft.com/office/powerpoint/2010/main" val="2412738235"/>
+        <p14:creationId xmlns:p14="http://schemas.microsoft.com/office/powerpoint/2010/main" val="3529345129"/>
       </p:ext>
     </p:extLst>
   </p:cSld>
@@ -900,7 +901,7 @@
     </p:spTree>
     <p:extLst>
       <p:ext uri="{BB962C8B-B14F-4D97-AF65-F5344CB8AC3E}">
-        <p14:creationId xmlns:p14="http://schemas.microsoft.com/office/powerpoint/2010/main" val="821439361"/>
+        <p14:creationId xmlns:p14="http://schemas.microsoft.com/office/powerpoint/2010/main" val="2412738235"/>
       </p:ext>
     </p:extLst>
   </p:cSld>
@@ -1063,7 +1064,7 @@
     </p:spTree>
     <p:extLst>
       <p:ext uri="{BB962C8B-B14F-4D97-AF65-F5344CB8AC3E}">
-        <p14:creationId xmlns:p14="http://schemas.microsoft.com/office/powerpoint/2010/main" val="1174372183"/>
+        <p14:creationId xmlns:p14="http://schemas.microsoft.com/office/powerpoint/2010/main" val="821439361"/>
       </p:ext>
     </p:extLst>
   </p:cSld>
@@ -1135,8 +1136,64 @@
               <a:defRPr/>
             </a:pPr>
             <a:r>
-              <a:rPr lang="sv-SE" dirty="0"/>
-              <a:t>En diskussion om vilka era erfarenheter ni dragit av att tillämpa TDD. Det finns inget rätt eller fel här. Enda sättet att bli underkända är att bara fuska över punkten och säga något pliktskyldigt.</a:t>
+              <a:rPr lang="sv-SE" sz="1200" kern="1200" dirty="0">
+                <a:solidFill>
+                  <a:schemeClr val="tx1"/>
+                </a:solidFill>
+                <a:effectLst/>
+                <a:latin typeface="+mn-lt"/>
+                <a:ea typeface="+mn-ea"/>
+                <a:cs typeface="+mn-cs"/>
+              </a:rPr>
+              <a:t>Två eller tre exempel per</a:t>
+            </a:r>
+            <a:r>
+              <a:rPr lang="sv-SE" sz="1200" kern="1200" baseline="0" dirty="0">
+                <a:solidFill>
+                  <a:schemeClr val="tx1"/>
+                </a:solidFill>
+                <a:effectLst/>
+                <a:latin typeface="+mn-lt"/>
+                <a:ea typeface="+mn-ea"/>
+                <a:cs typeface="+mn-cs"/>
+              </a:rPr>
+              <a:t> person i projektet på hur ni tillämpat TDD med koden för såväl testfallen som koden som ska testas. (Det kan alltså bli upp till 15 sidor för en fempersonersgrupp.) Exemplen ska vara från olika </a:t>
+            </a:r>
+            <a:r>
+              <a:rPr lang="sv-SE" sz="1200" kern="1200" baseline="0" dirty="0" err="1">
+                <a:solidFill>
+                  <a:schemeClr val="tx1"/>
+                </a:solidFill>
+                <a:effectLst/>
+                <a:latin typeface="+mn-lt"/>
+                <a:ea typeface="+mn-ea"/>
+                <a:cs typeface="+mn-cs"/>
+              </a:rPr>
+              <a:t>faser</a:t>
+            </a:r>
+            <a:r>
+              <a:rPr lang="sv-SE" sz="1200" kern="1200" dirty="0" err="1">
+                <a:solidFill>
+                  <a:schemeClr val="tx1"/>
+                </a:solidFill>
+                <a:effectLst/>
+                <a:latin typeface="+mn-lt"/>
+                <a:ea typeface="+mn-ea"/>
+                <a:cs typeface="+mn-cs"/>
+              </a:rPr>
+              <a:t>i</a:t>
+            </a:r>
+            <a:r>
+              <a:rPr lang="sv-SE" sz="1200" kern="1200" dirty="0">
+                <a:solidFill>
+                  <a:schemeClr val="tx1"/>
+                </a:solidFill>
+                <a:effectLst/>
+                <a:latin typeface="+mn-lt"/>
+                <a:ea typeface="+mn-ea"/>
+                <a:cs typeface="+mn-cs"/>
+              </a:rPr>
+              <a:t> projektet. Om ni har använt versionshanteringssystemet ordentligt bör all information som efterfrågas här finnas i det. Tänk på att kodexemplen ska vara läsbara. </a:t>
             </a:r>
           </a:p>
           <a:p>
@@ -1170,7 +1227,7 @@
     </p:spTree>
     <p:extLst>
       <p:ext uri="{BB962C8B-B14F-4D97-AF65-F5344CB8AC3E}">
-        <p14:creationId xmlns:p14="http://schemas.microsoft.com/office/powerpoint/2010/main" val="4160569562"/>
+        <p14:creationId xmlns:p14="http://schemas.microsoft.com/office/powerpoint/2010/main" val="1174372183"/>
       </p:ext>
     </p:extLst>
   </p:cSld>
@@ -1242,16 +1299,8 @@
               <a:defRPr/>
             </a:pPr>
             <a:r>
-              <a:rPr lang="sv-SE" sz="1200" kern="1200" dirty="0">
-                <a:solidFill>
-                  <a:schemeClr val="tx1"/>
-                </a:solidFill>
-                <a:effectLst/>
-                <a:latin typeface="+mn-lt"/>
-                <a:ea typeface="+mn-ea"/>
-                <a:cs typeface="+mn-cs"/>
-              </a:rPr>
-              <a:t>En kort textuell presentation av vad ni valt ut för att tillämpa ekvivalensklassuppdelning på. Ni ska kort motivera valet, och ge tillräckligt med information för att det ska gå att bedöma er. Detta avsnitt och de följande (till och med testmatrisen) ska finnas för samtliga delar ni tillämpat ekvivalensklassuppdelning på. Om ni inte tillämpat ekvivalensklassuppdelning tar ni bort dessa bilder.</a:t>
+              <a:rPr lang="sv-SE" dirty="0"/>
+              <a:t>En diskussion om vilka era erfarenheter ni dragit av att tillämpa TDD. Det finns inget rätt eller fel här. Enda sättet att bli underkända är att bara fuska över punkten och säga något pliktskyldigt.</a:t>
             </a:r>
           </a:p>
           <a:p>
@@ -1285,7 +1334,7 @@
     </p:spTree>
     <p:extLst>
       <p:ext uri="{BB962C8B-B14F-4D97-AF65-F5344CB8AC3E}">
-        <p14:creationId xmlns:p14="http://schemas.microsoft.com/office/powerpoint/2010/main" val="2473427308"/>
+        <p14:creationId xmlns:p14="http://schemas.microsoft.com/office/powerpoint/2010/main" val="4160569562"/>
       </p:ext>
     </p:extLst>
   </p:cSld>
@@ -1366,29 +1415,8 @@
                 <a:ea typeface="+mn-ea"/>
                 <a:cs typeface="+mn-cs"/>
               </a:rPr>
-              <a:t>Samtliga ekvivalensklasser för denna del presenterade på ett tydligt sätt. Använd</a:t>
-            </a:r>
-            <a:r>
-              <a:rPr lang="sv-SE" sz="1200" kern="1200" baseline="0" dirty="0">
-                <a:solidFill>
-                  <a:schemeClr val="tx1"/>
-                </a:solidFill>
-                <a:effectLst/>
-                <a:latin typeface="+mn-lt"/>
-                <a:ea typeface="+mn-ea"/>
-                <a:cs typeface="+mn-cs"/>
-              </a:rPr>
-              <a:t> gärna flera sidor om det behövs.</a:t>
-            </a:r>
-            <a:endParaRPr lang="sv-SE" sz="1200" kern="1200" dirty="0">
-              <a:solidFill>
-                <a:schemeClr val="tx1"/>
-              </a:solidFill>
-              <a:effectLst/>
-              <a:latin typeface="+mn-lt"/>
-              <a:ea typeface="+mn-ea"/>
-              <a:cs typeface="+mn-cs"/>
-            </a:endParaRPr>
+              <a:t>En kort textuell presentation av vad ni valt ut för att tillämpa ekvivalensklassuppdelning på. Ni ska kort motivera valet, och ge tillräckligt med information för att det ska gå att bedöma er. Detta avsnitt och de följande (till och med testmatrisen) ska finnas för samtliga delar ni tillämpat ekvivalensklassuppdelning på. Om ni inte tillämpat ekvivalensklassuppdelning tar ni bort dessa bilder.</a:t>
+            </a:r>
           </a:p>
           <a:p>
             <a:endParaRPr lang="sv-SE" dirty="0"/>
@@ -1421,7 +1449,7 @@
     </p:spTree>
     <p:extLst>
       <p:ext uri="{BB962C8B-B14F-4D97-AF65-F5344CB8AC3E}">
-        <p14:creationId xmlns:p14="http://schemas.microsoft.com/office/powerpoint/2010/main" val="2613784504"/>
+        <p14:creationId xmlns:p14="http://schemas.microsoft.com/office/powerpoint/2010/main" val="2473427308"/>
       </p:ext>
     </p:extLst>
   </p:cSld>
@@ -1475,6 +1503,23 @@
           <a:bodyPr/>
           <a:lstStyle/>
           <a:p>
+            <a:pPr marL="0" marR="0" lvl="0" indent="0" algn="l" defTabSz="914400" rtl="0" eaLnBrk="1" fontAlgn="auto" latinLnBrk="0" hangingPunct="1">
+              <a:lnSpc>
+                <a:spcPct val="100000"/>
+              </a:lnSpc>
+              <a:spcBef>
+                <a:spcPts val="0"/>
+              </a:spcBef>
+              <a:spcAft>
+                <a:spcPts val="0"/>
+              </a:spcAft>
+              <a:buClrTx/>
+              <a:buSzTx/>
+              <a:buFontTx/>
+              <a:buNone/>
+              <a:tabLst/>
+              <a:defRPr/>
+            </a:pPr>
             <a:r>
               <a:rPr lang="sv-SE" sz="1200" kern="1200" dirty="0">
                 <a:solidFill>
@@ -1485,8 +1530,31 @@
                 <a:ea typeface="+mn-ea"/>
                 <a:cs typeface="+mn-cs"/>
               </a:rPr>
-              <a:t>Testfallen som ni fått fram från ekvivalensklasserna. Observera att vi inte vill ha någon kod här, utan bara en tydlig presentation av testfallen i någon lämplig tabellform. </a:t>
-            </a:r>
+              <a:t>Samtliga ekvivalensklasser för denna del presenterade på ett tydligt sätt. Använd</a:t>
+            </a:r>
+            <a:r>
+              <a:rPr lang="sv-SE" sz="1200" kern="1200" baseline="0" dirty="0">
+                <a:solidFill>
+                  <a:schemeClr val="tx1"/>
+                </a:solidFill>
+                <a:effectLst/>
+                <a:latin typeface="+mn-lt"/>
+                <a:ea typeface="+mn-ea"/>
+                <a:cs typeface="+mn-cs"/>
+              </a:rPr>
+              <a:t> gärna flera sidor om det behövs.</a:t>
+            </a:r>
+            <a:endParaRPr lang="sv-SE" sz="1200" kern="1200" dirty="0">
+              <a:solidFill>
+                <a:schemeClr val="tx1"/>
+              </a:solidFill>
+              <a:effectLst/>
+              <a:latin typeface="+mn-lt"/>
+              <a:ea typeface="+mn-ea"/>
+              <a:cs typeface="+mn-cs"/>
+            </a:endParaRPr>
+          </a:p>
+          <a:p>
             <a:endParaRPr lang="sv-SE" dirty="0"/>
           </a:p>
         </p:txBody>
@@ -1517,7 +1585,7 @@
     </p:spTree>
     <p:extLst>
       <p:ext uri="{BB962C8B-B14F-4D97-AF65-F5344CB8AC3E}">
-        <p14:creationId xmlns:p14="http://schemas.microsoft.com/office/powerpoint/2010/main" val="3514630878"/>
+        <p14:creationId xmlns:p14="http://schemas.microsoft.com/office/powerpoint/2010/main" val="2613784504"/>
       </p:ext>
     </p:extLst>
   </p:cSld>
@@ -1571,23 +1639,6 @@
           <a:bodyPr/>
           <a:lstStyle/>
           <a:p>
-            <a:pPr marL="0" marR="0" lvl="0" indent="0" algn="l" defTabSz="914400" rtl="0" eaLnBrk="1" fontAlgn="auto" latinLnBrk="0" hangingPunct="1">
-              <a:lnSpc>
-                <a:spcPct val="100000"/>
-              </a:lnSpc>
-              <a:spcBef>
-                <a:spcPts val="0"/>
-              </a:spcBef>
-              <a:spcAft>
-                <a:spcPts val="0"/>
-              </a:spcAft>
-              <a:buClrTx/>
-              <a:buSzTx/>
-              <a:buFontTx/>
-              <a:buNone/>
-              <a:tabLst/>
-              <a:defRPr/>
-            </a:pPr>
             <a:r>
               <a:rPr lang="sv-SE" sz="1200" kern="1200" dirty="0">
                 <a:solidFill>
@@ -1598,10 +1649,8 @@
                 <a:ea typeface="+mn-ea"/>
                 <a:cs typeface="+mn-cs"/>
               </a:rPr>
-              <a:t>En testmatris som visar sambandet mellan ekvivalensklasserna och testfallen för denna del.</a:t>
-            </a:r>
-          </a:p>
-          <a:p>
+              <a:t>Testfallen som ni fått fram från ekvivalensklasserna. Observera att vi inte vill ha någon kod här, utan bara en tydlig presentation av testfallen i någon lämplig tabellform. </a:t>
+            </a:r>
             <a:endParaRPr lang="sv-SE" dirty="0"/>
           </a:p>
         </p:txBody>
@@ -1632,7 +1681,7 @@
     </p:spTree>
     <p:extLst>
       <p:ext uri="{BB962C8B-B14F-4D97-AF65-F5344CB8AC3E}">
-        <p14:creationId xmlns:p14="http://schemas.microsoft.com/office/powerpoint/2010/main" val="3837171916"/>
+        <p14:creationId xmlns:p14="http://schemas.microsoft.com/office/powerpoint/2010/main" val="3514630878"/>
       </p:ext>
     </p:extLst>
   </p:cSld>
@@ -1713,7 +1762,7 @@
                 <a:ea typeface="+mn-ea"/>
                 <a:cs typeface="+mn-cs"/>
               </a:rPr>
-              <a:t>En kort textuell presentation av vad ni valt ut för att tillämpa tillståndsmaskiner på och vilket eller vilka kriterier ni använder för att ta fram testfall från maskinen. Ni ska kort motivera valet, och ge tillräckligt med information för att det ska gå att bedöma er. Detta avsnitt och de följande ska finnas för samtliga delar ni tillämpat tillståndsmaskiner på. Om ni inte tillämpat tillståndsmaskiner tar ni bort dessa bilder.</a:t>
+              <a:t>En testmatris som visar sambandet mellan ekvivalensklasserna och testfallen för denna del.</a:t>
             </a:r>
           </a:p>
           <a:p>
@@ -1747,7 +1796,7 @@
     </p:spTree>
     <p:extLst>
       <p:ext uri="{BB962C8B-B14F-4D97-AF65-F5344CB8AC3E}">
-        <p14:creationId xmlns:p14="http://schemas.microsoft.com/office/powerpoint/2010/main" val="2041626993"/>
+        <p14:creationId xmlns:p14="http://schemas.microsoft.com/office/powerpoint/2010/main" val="3837171916"/>
       </p:ext>
     </p:extLst>
   </p:cSld>
@@ -1801,10 +1850,38 @@
           <a:bodyPr/>
           <a:lstStyle/>
           <a:p>
-            <a:r>
-              <a:rPr lang="sv-SE" dirty="0"/>
-              <a:t>Själva tillståndsmaskinen</a:t>
-            </a:r>
+            <a:pPr marL="0" marR="0" lvl="0" indent="0" algn="l" defTabSz="914400" rtl="0" eaLnBrk="1" fontAlgn="auto" latinLnBrk="0" hangingPunct="1">
+              <a:lnSpc>
+                <a:spcPct val="100000"/>
+              </a:lnSpc>
+              <a:spcBef>
+                <a:spcPts val="0"/>
+              </a:spcBef>
+              <a:spcAft>
+                <a:spcPts val="0"/>
+              </a:spcAft>
+              <a:buClrTx/>
+              <a:buSzTx/>
+              <a:buFontTx/>
+              <a:buNone/>
+              <a:tabLst/>
+              <a:defRPr/>
+            </a:pPr>
+            <a:r>
+              <a:rPr lang="sv-SE" sz="1200" kern="1200" dirty="0">
+                <a:solidFill>
+                  <a:schemeClr val="tx1"/>
+                </a:solidFill>
+                <a:effectLst/>
+                <a:latin typeface="+mn-lt"/>
+                <a:ea typeface="+mn-ea"/>
+                <a:cs typeface="+mn-cs"/>
+              </a:rPr>
+              <a:t>En kort textuell presentation av vad ni valt ut för att tillämpa tillståndsmaskiner på och vilket eller vilka kriterier ni använder för att ta fram testfall från maskinen. Ni ska kort motivera valet, och ge tillräckligt med information för att det ska gå att bedöma er. Detta avsnitt och de följande ska finnas för samtliga delar ni tillämpat tillståndsmaskiner på. Om ni inte tillämpat tillståndsmaskiner tar ni bort dessa bilder.</a:t>
+            </a:r>
+          </a:p>
+          <a:p>
+            <a:endParaRPr lang="sv-SE" dirty="0"/>
           </a:p>
         </p:txBody>
       </p:sp>
@@ -1834,7 +1911,7 @@
     </p:spTree>
     <p:extLst>
       <p:ext uri="{BB962C8B-B14F-4D97-AF65-F5344CB8AC3E}">
-        <p14:creationId xmlns:p14="http://schemas.microsoft.com/office/powerpoint/2010/main" val="1235134485"/>
+        <p14:creationId xmlns:p14="http://schemas.microsoft.com/office/powerpoint/2010/main" val="2041626993"/>
       </p:ext>
     </p:extLst>
   </p:cSld>
@@ -1972,39 +2049,10 @@
           <a:bodyPr/>
           <a:lstStyle/>
           <a:p>
-            <a:pPr marL="0" marR="0" lvl="0" indent="0" algn="l" defTabSz="914400" rtl="0" eaLnBrk="1" fontAlgn="auto" latinLnBrk="0" hangingPunct="1">
-              <a:lnSpc>
-                <a:spcPct val="100000"/>
-              </a:lnSpc>
-              <a:spcBef>
-                <a:spcPts val="0"/>
-              </a:spcBef>
-              <a:spcAft>
-                <a:spcPts val="0"/>
-              </a:spcAft>
-              <a:buClrTx/>
-              <a:buSzTx/>
-              <a:buFontTx/>
-              <a:buNone/>
-              <a:tabLst/>
-              <a:defRPr/>
-            </a:pPr>
-            <a:r>
-              <a:rPr lang="sv-SE" sz="1200" kern="1200" dirty="0">
-                <a:solidFill>
-                  <a:schemeClr val="tx1"/>
-                </a:solidFill>
-                <a:effectLst/>
-                <a:latin typeface="+mn-lt"/>
-                <a:ea typeface="+mn-ea"/>
-                <a:cs typeface="+mn-cs"/>
-              </a:rPr>
-              <a:t>Testfallen som ni fått fram från tillståndsmaskinen. Observera att vi inte vill ha någon kod här, utan bara en tydlig presentation av testfallen i någon lämplig tabellform. </a:t>
-            </a:r>
-            <a:endParaRPr lang="sv-SE" dirty="0"/>
-          </a:p>
-          <a:p>
-            <a:endParaRPr lang="sv-SE" dirty="0"/>
+            <a:r>
+              <a:rPr lang="sv-SE" dirty="0"/>
+              <a:t>Själva tillståndsmaskinen</a:t>
+            </a:r>
           </a:p>
         </p:txBody>
       </p:sp>
@@ -2034,7 +2082,7 @@
     </p:spTree>
     <p:extLst>
       <p:ext uri="{BB962C8B-B14F-4D97-AF65-F5344CB8AC3E}">
-        <p14:creationId xmlns:p14="http://schemas.microsoft.com/office/powerpoint/2010/main" val="556359333"/>
+        <p14:creationId xmlns:p14="http://schemas.microsoft.com/office/powerpoint/2010/main" val="1235134485"/>
       </p:ext>
     </p:extLst>
   </p:cSld>
@@ -2115,77 +2163,9 @@
                 <a:ea typeface="+mn-ea"/>
                 <a:cs typeface="+mn-cs"/>
               </a:rPr>
-              <a:t>En testmatris (eller annan</a:t>
-            </a:r>
-            <a:r>
-              <a:rPr lang="sv-SE" sz="1200" kern="1200" baseline="0" dirty="0">
-                <a:solidFill>
-                  <a:schemeClr val="tx1"/>
-                </a:solidFill>
-                <a:effectLst/>
-                <a:latin typeface="+mn-lt"/>
-                <a:ea typeface="+mn-ea"/>
-                <a:cs typeface="+mn-cs"/>
-              </a:rPr>
-              <a:t> lämplig form)</a:t>
-            </a:r>
-            <a:r>
-              <a:rPr lang="sv-SE" sz="1200" kern="1200" dirty="0">
-                <a:solidFill>
-                  <a:schemeClr val="tx1"/>
-                </a:solidFill>
-                <a:effectLst/>
-                <a:latin typeface="+mn-lt"/>
-                <a:ea typeface="+mn-ea"/>
-                <a:cs typeface="+mn-cs"/>
-              </a:rPr>
-              <a:t> som visar sambandet mellan tillståndsmaskinen och testfallen för denna del så att det går att se att ni tillämpat de kriterier</a:t>
-            </a:r>
-            <a:r>
-              <a:rPr lang="sv-SE" sz="1200" kern="1200" baseline="0" dirty="0">
-                <a:solidFill>
-                  <a:schemeClr val="tx1"/>
-                </a:solidFill>
-                <a:effectLst/>
-                <a:latin typeface="+mn-lt"/>
-                <a:ea typeface="+mn-ea"/>
-                <a:cs typeface="+mn-cs"/>
-              </a:rPr>
-              <a:t> ni satt upp för att ta fram testfall</a:t>
-            </a:r>
-            <a:r>
-              <a:rPr lang="sv-SE" sz="1200" kern="1200" dirty="0">
-                <a:solidFill>
-                  <a:schemeClr val="tx1"/>
-                </a:solidFill>
-                <a:effectLst/>
-                <a:latin typeface="+mn-lt"/>
-                <a:ea typeface="+mn-ea"/>
-                <a:cs typeface="+mn-cs"/>
-              </a:rPr>
-              <a:t>. Om detta tydligt framgår från testfallen</a:t>
-            </a:r>
-            <a:r>
-              <a:rPr lang="sv-SE" sz="1200" kern="1200" baseline="0" dirty="0">
-                <a:solidFill>
-                  <a:schemeClr val="tx1"/>
-                </a:solidFill>
-                <a:effectLst/>
-                <a:latin typeface="+mn-lt"/>
-                <a:ea typeface="+mn-ea"/>
-                <a:cs typeface="+mn-cs"/>
-              </a:rPr>
-              <a:t> så kan denna bild plockas bort.</a:t>
-            </a:r>
-            <a:endParaRPr lang="sv-SE" sz="1200" kern="1200" dirty="0">
-              <a:solidFill>
-                <a:schemeClr val="tx1"/>
-              </a:solidFill>
-              <a:effectLst/>
-              <a:latin typeface="+mn-lt"/>
-              <a:ea typeface="+mn-ea"/>
-              <a:cs typeface="+mn-cs"/>
-            </a:endParaRPr>
+              <a:t>Testfallen som ni fått fram från tillståndsmaskinen. Observera att vi inte vill ha någon kod här, utan bara en tydlig presentation av testfallen i någon lämplig tabellform. </a:t>
+            </a:r>
+            <a:endParaRPr lang="sv-SE" dirty="0"/>
           </a:p>
           <a:p>
             <a:endParaRPr lang="sv-SE" dirty="0"/>
@@ -2218,7 +2198,7 @@
     </p:spTree>
     <p:extLst>
       <p:ext uri="{BB962C8B-B14F-4D97-AF65-F5344CB8AC3E}">
-        <p14:creationId xmlns:p14="http://schemas.microsoft.com/office/powerpoint/2010/main" val="61413010"/>
+        <p14:creationId xmlns:p14="http://schemas.microsoft.com/office/powerpoint/2010/main" val="556359333"/>
       </p:ext>
     </p:extLst>
   </p:cSld>
@@ -2299,8 +2279,77 @@
                 <a:ea typeface="+mn-ea"/>
                 <a:cs typeface="+mn-cs"/>
               </a:rPr>
-              <a:t>En kort textuell presentation av vad ni valt ut för att tillämpa beslutstabeller. Ni ska kort motivera valet, och ge tillräckligt med information för att det ska gå att bedöma er. Detta avsnitt och de följande ska finnas för samtliga delar ni tillämpat beslutstabeller på. Om ni inte tillämpat beslutstabeller tar ni bort dessa bilder.</a:t>
-            </a:r>
+              <a:t>En testmatris (eller annan</a:t>
+            </a:r>
+            <a:r>
+              <a:rPr lang="sv-SE" sz="1200" kern="1200" baseline="0" dirty="0">
+                <a:solidFill>
+                  <a:schemeClr val="tx1"/>
+                </a:solidFill>
+                <a:effectLst/>
+                <a:latin typeface="+mn-lt"/>
+                <a:ea typeface="+mn-ea"/>
+                <a:cs typeface="+mn-cs"/>
+              </a:rPr>
+              <a:t> lämplig form)</a:t>
+            </a:r>
+            <a:r>
+              <a:rPr lang="sv-SE" sz="1200" kern="1200" dirty="0">
+                <a:solidFill>
+                  <a:schemeClr val="tx1"/>
+                </a:solidFill>
+                <a:effectLst/>
+                <a:latin typeface="+mn-lt"/>
+                <a:ea typeface="+mn-ea"/>
+                <a:cs typeface="+mn-cs"/>
+              </a:rPr>
+              <a:t> som visar sambandet mellan tillståndsmaskinen och testfallen för denna del så att det går att se att ni tillämpat de kriterier</a:t>
+            </a:r>
+            <a:r>
+              <a:rPr lang="sv-SE" sz="1200" kern="1200" baseline="0" dirty="0">
+                <a:solidFill>
+                  <a:schemeClr val="tx1"/>
+                </a:solidFill>
+                <a:effectLst/>
+                <a:latin typeface="+mn-lt"/>
+                <a:ea typeface="+mn-ea"/>
+                <a:cs typeface="+mn-cs"/>
+              </a:rPr>
+              <a:t> ni satt upp för att ta fram testfall</a:t>
+            </a:r>
+            <a:r>
+              <a:rPr lang="sv-SE" sz="1200" kern="1200" dirty="0">
+                <a:solidFill>
+                  <a:schemeClr val="tx1"/>
+                </a:solidFill>
+                <a:effectLst/>
+                <a:latin typeface="+mn-lt"/>
+                <a:ea typeface="+mn-ea"/>
+                <a:cs typeface="+mn-cs"/>
+              </a:rPr>
+              <a:t>. Om detta tydligt framgår från testfallen</a:t>
+            </a:r>
+            <a:r>
+              <a:rPr lang="sv-SE" sz="1200" kern="1200" baseline="0" dirty="0">
+                <a:solidFill>
+                  <a:schemeClr val="tx1"/>
+                </a:solidFill>
+                <a:effectLst/>
+                <a:latin typeface="+mn-lt"/>
+                <a:ea typeface="+mn-ea"/>
+                <a:cs typeface="+mn-cs"/>
+              </a:rPr>
+              <a:t> så kan denna bild plockas bort.</a:t>
+            </a:r>
+            <a:endParaRPr lang="sv-SE" sz="1200" kern="1200" dirty="0">
+              <a:solidFill>
+                <a:schemeClr val="tx1"/>
+              </a:solidFill>
+              <a:effectLst/>
+              <a:latin typeface="+mn-lt"/>
+              <a:ea typeface="+mn-ea"/>
+              <a:cs typeface="+mn-cs"/>
+            </a:endParaRPr>
           </a:p>
           <a:p>
             <a:endParaRPr lang="sv-SE" dirty="0"/>
@@ -2333,7 +2382,7 @@
     </p:spTree>
     <p:extLst>
       <p:ext uri="{BB962C8B-B14F-4D97-AF65-F5344CB8AC3E}">
-        <p14:creationId xmlns:p14="http://schemas.microsoft.com/office/powerpoint/2010/main" val="504764227"/>
+        <p14:creationId xmlns:p14="http://schemas.microsoft.com/office/powerpoint/2010/main" val="61413010"/>
       </p:ext>
     </p:extLst>
   </p:cSld>
@@ -2387,10 +2436,38 @@
           <a:bodyPr/>
           <a:lstStyle/>
           <a:p>
-            <a:r>
-              <a:rPr lang="sv-SE" dirty="0"/>
-              <a:t>Själva beslutstabellen</a:t>
-            </a:r>
+            <a:pPr marL="0" marR="0" lvl="0" indent="0" algn="l" defTabSz="914400" rtl="0" eaLnBrk="1" fontAlgn="auto" latinLnBrk="0" hangingPunct="1">
+              <a:lnSpc>
+                <a:spcPct val="100000"/>
+              </a:lnSpc>
+              <a:spcBef>
+                <a:spcPts val="0"/>
+              </a:spcBef>
+              <a:spcAft>
+                <a:spcPts val="0"/>
+              </a:spcAft>
+              <a:buClrTx/>
+              <a:buSzTx/>
+              <a:buFontTx/>
+              <a:buNone/>
+              <a:tabLst/>
+              <a:defRPr/>
+            </a:pPr>
+            <a:r>
+              <a:rPr lang="sv-SE" sz="1200" kern="1200" dirty="0">
+                <a:solidFill>
+                  <a:schemeClr val="tx1"/>
+                </a:solidFill>
+                <a:effectLst/>
+                <a:latin typeface="+mn-lt"/>
+                <a:ea typeface="+mn-ea"/>
+                <a:cs typeface="+mn-cs"/>
+              </a:rPr>
+              <a:t>En kort textuell presentation av vad ni valt ut för att tillämpa beslutstabeller. Ni ska kort motivera valet, och ge tillräckligt med information för att det ska gå att bedöma er. Detta avsnitt och de följande ska finnas för samtliga delar ni tillämpat beslutstabeller på. Om ni inte tillämpat beslutstabeller tar ni bort dessa bilder.</a:t>
+            </a:r>
+          </a:p>
+          <a:p>
+            <a:endParaRPr lang="sv-SE" dirty="0"/>
           </a:p>
         </p:txBody>
       </p:sp>
@@ -2420,7 +2497,7 @@
     </p:spTree>
     <p:extLst>
       <p:ext uri="{BB962C8B-B14F-4D97-AF65-F5344CB8AC3E}">
-        <p14:creationId xmlns:p14="http://schemas.microsoft.com/office/powerpoint/2010/main" val="2646750995"/>
+        <p14:creationId xmlns:p14="http://schemas.microsoft.com/office/powerpoint/2010/main" val="504764227"/>
       </p:ext>
     </p:extLst>
   </p:cSld>
@@ -2476,7 +2553,7 @@
           <a:p>
             <a:r>
               <a:rPr lang="sv-SE" dirty="0"/>
-              <a:t>Beslutsträdet om ni gjort ett sådant</a:t>
+              <a:t>Själva beslutstabellen</a:t>
             </a:r>
           </a:p>
         </p:txBody>
@@ -2507,7 +2584,7 @@
     </p:spTree>
     <p:extLst>
       <p:ext uri="{BB962C8B-B14F-4D97-AF65-F5344CB8AC3E}">
-        <p14:creationId xmlns:p14="http://schemas.microsoft.com/office/powerpoint/2010/main" val="1191027264"/>
+        <p14:creationId xmlns:p14="http://schemas.microsoft.com/office/powerpoint/2010/main" val="2646750995"/>
       </p:ext>
     </p:extLst>
   </p:cSld>
@@ -2561,39 +2638,10 @@
           <a:bodyPr/>
           <a:lstStyle/>
           <a:p>
-            <a:pPr marL="0" marR="0" lvl="0" indent="0" algn="l" defTabSz="914400" rtl="0" eaLnBrk="1" fontAlgn="auto" latinLnBrk="0" hangingPunct="1">
-              <a:lnSpc>
-                <a:spcPct val="100000"/>
-              </a:lnSpc>
-              <a:spcBef>
-                <a:spcPts val="0"/>
-              </a:spcBef>
-              <a:spcAft>
-                <a:spcPts val="0"/>
-              </a:spcAft>
-              <a:buClrTx/>
-              <a:buSzTx/>
-              <a:buFontTx/>
-              <a:buNone/>
-              <a:tabLst/>
-              <a:defRPr/>
-            </a:pPr>
-            <a:r>
-              <a:rPr lang="sv-SE" sz="1200" kern="1200" dirty="0">
-                <a:solidFill>
-                  <a:schemeClr val="tx1"/>
-                </a:solidFill>
-                <a:effectLst/>
-                <a:latin typeface="+mn-lt"/>
-                <a:ea typeface="+mn-ea"/>
-                <a:cs typeface="+mn-cs"/>
-              </a:rPr>
-              <a:t>Testfallen som ni fått fram från beslutstabellen. Observera att vi inte vill ha någon kod här, utan bara en tydlig presentation av testfallen i någon lämplig tabellform. </a:t>
-            </a:r>
-            <a:endParaRPr lang="sv-SE" dirty="0"/>
-          </a:p>
-          <a:p>
-            <a:endParaRPr lang="sv-SE" dirty="0"/>
+            <a:r>
+              <a:rPr lang="sv-SE" dirty="0"/>
+              <a:t>Beslutsträdet om ni gjort ett sådant</a:t>
+            </a:r>
           </a:p>
         </p:txBody>
       </p:sp>
@@ -2623,7 +2671,7 @@
     </p:spTree>
     <p:extLst>
       <p:ext uri="{BB962C8B-B14F-4D97-AF65-F5344CB8AC3E}">
-        <p14:creationId xmlns:p14="http://schemas.microsoft.com/office/powerpoint/2010/main" val="586387250"/>
+        <p14:creationId xmlns:p14="http://schemas.microsoft.com/office/powerpoint/2010/main" val="1191027264"/>
       </p:ext>
     </p:extLst>
   </p:cSld>
@@ -2704,32 +2752,9 @@
                 <a:ea typeface="+mn-ea"/>
                 <a:cs typeface="+mn-cs"/>
               </a:rPr>
-              <a:t>En kort presentation av den del av koden ni valt ut för att göra en formell granskning av och processen ni använt er av inklusive eventuella checklistor, scenarier, </a:t>
-            </a:r>
-            <a:r>
-              <a:rPr lang="sv-SE" sz="1200" kern="1200" dirty="0" err="1">
-                <a:solidFill>
-                  <a:schemeClr val="tx1"/>
-                </a:solidFill>
-                <a:effectLst/>
-                <a:latin typeface="+mn-lt"/>
-                <a:ea typeface="+mn-ea"/>
-                <a:cs typeface="+mn-cs"/>
-              </a:rPr>
-              <a:t>edyl</a:t>
-            </a:r>
-            <a:r>
-              <a:rPr lang="sv-SE" sz="1200" kern="1200" dirty="0">
-                <a:solidFill>
-                  <a:schemeClr val="tx1"/>
-                </a:solidFill>
-                <a:effectLst/>
-                <a:latin typeface="+mn-lt"/>
-                <a:ea typeface="+mn-ea"/>
-                <a:cs typeface="+mn-cs"/>
-              </a:rPr>
-              <a:t>. Ni ska kort motivera valen, och ge tillräckligt med information för att det ska gå att bedöma er. </a:t>
-            </a:r>
+              <a:t>Testfallen som ni fått fram från beslutstabellen. Observera att vi inte vill ha någon kod här, utan bara en tydlig presentation av testfallen i någon lämplig tabellform. </a:t>
+            </a:r>
+            <a:endParaRPr lang="sv-SE" dirty="0"/>
           </a:p>
           <a:p>
             <a:endParaRPr lang="sv-SE" dirty="0"/>
@@ -2762,7 +2787,7 @@
     </p:spTree>
     <p:extLst>
       <p:ext uri="{BB962C8B-B14F-4D97-AF65-F5344CB8AC3E}">
-        <p14:creationId xmlns:p14="http://schemas.microsoft.com/office/powerpoint/2010/main" val="1836920504"/>
+        <p14:creationId xmlns:p14="http://schemas.microsoft.com/office/powerpoint/2010/main" val="586387250"/>
       </p:ext>
     </p:extLst>
   </p:cSld>
@@ -2843,7 +2868,31 @@
                 <a:ea typeface="+mn-ea"/>
                 <a:cs typeface="+mn-cs"/>
               </a:rPr>
-              <a:t>En lista över de påträffade felen och hur pass allvarliga ni bedömer dem.</a:t>
+              <a:t>En kort presentation av den del av koden ni valt ut för att göra en formell granskning av och processen ni använt er av inklusive eventuella checklistor, scenarier, </a:t>
+            </a:r>
+            <a:r>
+              <a:rPr lang="sv-SE" sz="1200" kern="1200" dirty="0" err="1">
+                <a:solidFill>
+                  <a:schemeClr val="tx1"/>
+                </a:solidFill>
+                <a:effectLst/>
+                <a:latin typeface="+mn-lt"/>
+                <a:ea typeface="+mn-ea"/>
+                <a:cs typeface="+mn-cs"/>
+              </a:rPr>
+              <a:t>edyl</a:t>
+            </a:r>
+            <a:r>
+              <a:rPr lang="sv-SE" sz="1200" kern="1200" dirty="0">
+                <a:solidFill>
+                  <a:schemeClr val="tx1"/>
+                </a:solidFill>
+                <a:effectLst/>
+                <a:latin typeface="+mn-lt"/>
+                <a:ea typeface="+mn-ea"/>
+                <a:cs typeface="+mn-cs"/>
+              </a:rPr>
+              <a:t>. Ni ska kort motivera valen, och ge tillräckligt med information för att det ska gå att bedöma er. </a:t>
             </a:r>
           </a:p>
           <a:p>
@@ -2877,7 +2926,7 @@
     </p:spTree>
     <p:extLst>
       <p:ext uri="{BB962C8B-B14F-4D97-AF65-F5344CB8AC3E}">
-        <p14:creationId xmlns:p14="http://schemas.microsoft.com/office/powerpoint/2010/main" val="1645734220"/>
+        <p14:creationId xmlns:p14="http://schemas.microsoft.com/office/powerpoint/2010/main" val="1836920504"/>
       </p:ext>
     </p:extLst>
   </p:cSld>
@@ -2958,31 +3007,7 @@
                 <a:ea typeface="+mn-ea"/>
                 <a:cs typeface="+mn-cs"/>
               </a:rPr>
-              <a:t>En diskussion om vilka era erfarenheter ni dragit av att tillämpa granskning. Det finns inget rätt eller fel här. Enda sättet att bli underkända är att bara fuska över punkten och bara säga något pliktskyldigt. Ni förväntas förhålla er till såväl kursböckerna som utdelat material och IEEE </a:t>
-            </a:r>
-            <a:r>
-              <a:rPr lang="sv-SE" sz="1200" kern="1200" dirty="0" err="1">
-                <a:solidFill>
-                  <a:schemeClr val="tx1"/>
-                </a:solidFill>
-                <a:effectLst/>
-                <a:latin typeface="+mn-lt"/>
-                <a:ea typeface="+mn-ea"/>
-                <a:cs typeface="+mn-cs"/>
-              </a:rPr>
-              <a:t>Std</a:t>
-            </a:r>
-            <a:r>
-              <a:rPr lang="sv-SE" sz="1200" kern="1200" dirty="0">
-                <a:solidFill>
-                  <a:schemeClr val="tx1"/>
-                </a:solidFill>
-                <a:effectLst/>
-                <a:latin typeface="+mn-lt"/>
-                <a:ea typeface="+mn-ea"/>
-                <a:cs typeface="+mn-cs"/>
-              </a:rPr>
-              <a:t> 1028.</a:t>
+              <a:t>En lista över de påträffade felen och hur pass allvarliga ni bedömer dem.</a:t>
             </a:r>
           </a:p>
           <a:p>
@@ -3016,7 +3041,7 @@
     </p:spTree>
     <p:extLst>
       <p:ext uri="{BB962C8B-B14F-4D97-AF65-F5344CB8AC3E}">
-        <p14:creationId xmlns:p14="http://schemas.microsoft.com/office/powerpoint/2010/main" val="393491449"/>
+        <p14:creationId xmlns:p14="http://schemas.microsoft.com/office/powerpoint/2010/main" val="1645734220"/>
       </p:ext>
     </p:extLst>
   </p:cSld>
@@ -3097,7 +3122,31 @@
                 <a:ea typeface="+mn-ea"/>
                 <a:cs typeface="+mn-cs"/>
               </a:rPr>
-              <a:t>En presentation av de problem som hittats med hjälp av verktyg för statisk analys och en diskussion av dem enligt anvisningarna. Det räcker alltså inte med att bara lista problemen, ni måste förhålla er till dem också. Tänk också på att ni ska göra detta både på koden som den såg ut före granskningen och på koden efter att ni rättat det som kommit fram under granskningen.</a:t>
+              <a:t>En diskussion om vilka era erfarenheter ni dragit av att tillämpa granskning. Det finns inget rätt eller fel här. Enda sättet att bli underkända är att bara fuska över punkten och bara säga något pliktskyldigt. Ni förväntas förhålla er till såväl kursböckerna som utdelat material och IEEE </a:t>
+            </a:r>
+            <a:r>
+              <a:rPr lang="sv-SE" sz="1200" kern="1200" dirty="0" err="1">
+                <a:solidFill>
+                  <a:schemeClr val="tx1"/>
+                </a:solidFill>
+                <a:effectLst/>
+                <a:latin typeface="+mn-lt"/>
+                <a:ea typeface="+mn-ea"/>
+                <a:cs typeface="+mn-cs"/>
+              </a:rPr>
+              <a:t>Std</a:t>
+            </a:r>
+            <a:r>
+              <a:rPr lang="sv-SE" sz="1200" kern="1200" dirty="0">
+                <a:solidFill>
+                  <a:schemeClr val="tx1"/>
+                </a:solidFill>
+                <a:effectLst/>
+                <a:latin typeface="+mn-lt"/>
+                <a:ea typeface="+mn-ea"/>
+                <a:cs typeface="+mn-cs"/>
+              </a:rPr>
+              <a:t> 1028.</a:t>
             </a:r>
           </a:p>
           <a:p>
@@ -3131,7 +3180,7 @@
     </p:spTree>
     <p:extLst>
       <p:ext uri="{BB962C8B-B14F-4D97-AF65-F5344CB8AC3E}">
-        <p14:creationId xmlns:p14="http://schemas.microsoft.com/office/powerpoint/2010/main" val="1343433812"/>
+        <p14:creationId xmlns:p14="http://schemas.microsoft.com/office/powerpoint/2010/main" val="393491449"/>
       </p:ext>
     </p:extLst>
   </p:cSld>
@@ -3319,7 +3368,7 @@
                 <a:ea typeface="+mn-ea"/>
                 <a:cs typeface="+mn-cs"/>
               </a:rPr>
-              <a:t>En presentation och diskussion kring ett antal lämpliga statiska mått på koden. Att vi inte specificerar exakt vilka mått som ska tas upp beror på att olika verktyg har olika uppsättningar, men vi förväntar oss fler och mer intressanta mått än bara rena storleksmått som LOC, #klasser, #metoder, etc. Även här är det viktigt att förhållas sig till måtten, inte bara lista dem.</a:t>
+              <a:t>En presentation av de problem som hittats med hjälp av verktyg för statisk analys och en diskussion av dem enligt anvisningarna. Det räcker alltså inte med att bara lista problemen, ni måste förhålla er till dem också. Tänk också på att ni ska göra detta både på koden som den såg ut före granskningen och på koden efter att ni rättat det som kommit fram under granskningen.</a:t>
             </a:r>
           </a:p>
           <a:p>
@@ -3353,7 +3402,7 @@
     </p:spTree>
     <p:extLst>
       <p:ext uri="{BB962C8B-B14F-4D97-AF65-F5344CB8AC3E}">
-        <p14:creationId xmlns:p14="http://schemas.microsoft.com/office/powerpoint/2010/main" val="247082709"/>
+        <p14:creationId xmlns:p14="http://schemas.microsoft.com/office/powerpoint/2010/main" val="1343433812"/>
       </p:ext>
     </p:extLst>
   </p:cSld>
@@ -3434,7 +3483,7 @@
                 <a:ea typeface="+mn-ea"/>
                 <a:cs typeface="+mn-cs"/>
               </a:rPr>
-              <a:t>En översikt över vilken täckningsgrad era testfall uppnått. Denna kan antagligen tas rakt av från verktyget ni använt för att mäta den. Om ni inte uppnått fullständig täckning så ska detta förklaras och motiveras.</a:t>
+              <a:t>En presentation och diskussion kring ett antal lämpliga statiska mått på koden. Att vi inte specificerar exakt vilka mått som ska tas upp beror på att olika verktyg har olika uppsättningar, men vi förväntar oss fler och mer intressanta mått än bara rena storleksmått som LOC, #klasser, #metoder, etc. Även här är det viktigt att förhållas sig till måtten, inte bara lista dem.</a:t>
             </a:r>
           </a:p>
           <a:p>
@@ -3468,7 +3517,7 @@
     </p:spTree>
     <p:extLst>
       <p:ext uri="{BB962C8B-B14F-4D97-AF65-F5344CB8AC3E}">
-        <p14:creationId xmlns:p14="http://schemas.microsoft.com/office/powerpoint/2010/main" val="169751880"/>
+        <p14:creationId xmlns:p14="http://schemas.microsoft.com/office/powerpoint/2010/main" val="247082709"/>
       </p:ext>
     </p:extLst>
   </p:cSld>
@@ -3549,6 +3598,121 @@
                 <a:ea typeface="+mn-ea"/>
                 <a:cs typeface="+mn-cs"/>
               </a:rPr>
+              <a:t>En översikt över vilken täckningsgrad era testfall uppnått. Denna kan antagligen tas rakt av från verktyget ni använt för att mäta den. Om ni inte uppnått fullständig täckning så ska detta förklaras och motiveras.</a:t>
+            </a:r>
+          </a:p>
+          <a:p>
+            <a:endParaRPr lang="sv-SE" dirty="0"/>
+          </a:p>
+        </p:txBody>
+      </p:sp>
+      <p:sp>
+        <p:nvSpPr>
+          <p:cNvPr id="4" name="Platshållare för bildnummer 3"/>
+          <p:cNvSpPr>
+            <a:spLocks noGrp="1"/>
+          </p:cNvSpPr>
+          <p:nvPr>
+            <p:ph type="sldNum" sz="quarter" idx="10"/>
+          </p:nvPr>
+        </p:nvSpPr>
+        <p:spPr/>
+        <p:txBody>
+          <a:bodyPr/>
+          <a:lstStyle/>
+          <a:p>
+            <a:fld id="{8667F948-D2CB-486C-A2EA-FEABC2DAAE8D}" type="slidenum">
+              <a:rPr lang="sv-SE" smtClean="0"/>
+              <a:t>32</a:t>
+            </a:fld>
+            <a:endParaRPr lang="sv-SE"/>
+          </a:p>
+        </p:txBody>
+      </p:sp>
+    </p:spTree>
+    <p:extLst>
+      <p:ext uri="{BB962C8B-B14F-4D97-AF65-F5344CB8AC3E}">
+        <p14:creationId xmlns:p14="http://schemas.microsoft.com/office/powerpoint/2010/main" val="169751880"/>
+      </p:ext>
+    </p:extLst>
+  </p:cSld>
+  <p:clrMapOvr>
+    <a:masterClrMapping/>
+  </p:clrMapOvr>
+</p:notes>
+</file>
+
+<file path=ppt/notesSlides/notesSlide33.xml><?xml version="1.0" encoding="utf-8"?>
+<p:notes xmlns:a="http://schemas.openxmlformats.org/drawingml/2006/main" xmlns:r="http://schemas.openxmlformats.org/officeDocument/2006/relationships" xmlns:p="http://schemas.openxmlformats.org/presentationml/2006/main">
+  <p:cSld>
+    <p:spTree>
+      <p:nvGrpSpPr>
+        <p:cNvPr id="1" name=""/>
+        <p:cNvGrpSpPr/>
+        <p:nvPr/>
+      </p:nvGrpSpPr>
+      <p:grpSpPr>
+        <a:xfrm>
+          <a:off x="0" y="0"/>
+          <a:ext cx="0" cy="0"/>
+          <a:chOff x="0" y="0"/>
+          <a:chExt cx="0" cy="0"/>
+        </a:xfrm>
+      </p:grpSpPr>
+      <p:sp>
+        <p:nvSpPr>
+          <p:cNvPr id="2" name="Platshållare för bildobjekt 1"/>
+          <p:cNvSpPr>
+            <a:spLocks noGrp="1" noRot="1" noChangeAspect="1"/>
+          </p:cNvSpPr>
+          <p:nvPr>
+            <p:ph type="sldImg"/>
+          </p:nvPr>
+        </p:nvSpPr>
+        <p:spPr/>
+      </p:sp>
+      <p:sp>
+        <p:nvSpPr>
+          <p:cNvPr id="3" name="Platshållare för anteckningar 2"/>
+          <p:cNvSpPr>
+            <a:spLocks noGrp="1"/>
+          </p:cNvSpPr>
+          <p:nvPr>
+            <p:ph type="body" idx="1"/>
+          </p:nvPr>
+        </p:nvSpPr>
+        <p:spPr/>
+        <p:txBody>
+          <a:bodyPr/>
+          <a:lstStyle/>
+          <a:p>
+            <a:pPr marL="0" marR="0" lvl="0" indent="0" algn="l" defTabSz="914400" rtl="0" eaLnBrk="1" fontAlgn="auto" latinLnBrk="0" hangingPunct="1">
+              <a:lnSpc>
+                <a:spcPct val="100000"/>
+              </a:lnSpc>
+              <a:spcBef>
+                <a:spcPts val="0"/>
+              </a:spcBef>
+              <a:spcAft>
+                <a:spcPts val="0"/>
+              </a:spcAft>
+              <a:buClrTx/>
+              <a:buSzTx/>
+              <a:buFontTx/>
+              <a:buNone/>
+              <a:tabLst/>
+              <a:defRPr/>
+            </a:pPr>
+            <a:r>
+              <a:rPr lang="sv-SE" sz="1200" kern="1200" dirty="0">
+                <a:solidFill>
+                  <a:schemeClr val="tx1"/>
+                </a:solidFill>
+                <a:effectLst/>
+                <a:latin typeface="+mn-lt"/>
+                <a:ea typeface="+mn-ea"/>
+                <a:cs typeface="+mn-cs"/>
+              </a:rPr>
               <a:t>En kort presentation av hur ni gått tillväga för att testa koden med en profiler och vilka resultat ni fick fram. Även här är det viktigt att förhållas sig till måtten, inte bara presentera dem.</a:t>
             </a:r>
           </a:p>
@@ -3602,7 +3766,7 @@
           <a:p>
             <a:fld id="{8667F948-D2CB-486C-A2EA-FEABC2DAAE8D}" type="slidenum">
               <a:rPr lang="sv-SE" smtClean="0"/>
-              <a:t>32</a:t>
+              <a:t>33</a:t>
             </a:fld>
             <a:endParaRPr lang="sv-SE"/>
           </a:p>
@@ -3612,121 +3776,6 @@
     <p:extLst>
       <p:ext uri="{BB962C8B-B14F-4D97-AF65-F5344CB8AC3E}">
         <p14:creationId xmlns:p14="http://schemas.microsoft.com/office/powerpoint/2010/main" val="1278246246"/>
-      </p:ext>
-    </p:extLst>
-  </p:cSld>
-  <p:clrMapOvr>
-    <a:masterClrMapping/>
-  </p:clrMapOvr>
-</p:notes>
-</file>
-
-<file path=ppt/notesSlides/notesSlide33.xml><?xml version="1.0" encoding="utf-8"?>
-<p:notes xmlns:a="http://schemas.openxmlformats.org/drawingml/2006/main" xmlns:r="http://schemas.openxmlformats.org/officeDocument/2006/relationships" xmlns:p="http://schemas.openxmlformats.org/presentationml/2006/main">
-  <p:cSld>
-    <p:spTree>
-      <p:nvGrpSpPr>
-        <p:cNvPr id="1" name=""/>
-        <p:cNvGrpSpPr/>
-        <p:nvPr/>
-      </p:nvGrpSpPr>
-      <p:grpSpPr>
-        <a:xfrm>
-          <a:off x="0" y="0"/>
-          <a:ext cx="0" cy="0"/>
-          <a:chOff x="0" y="0"/>
-          <a:chExt cx="0" cy="0"/>
-        </a:xfrm>
-      </p:grpSpPr>
-      <p:sp>
-        <p:nvSpPr>
-          <p:cNvPr id="2" name="Platshållare för bildobjekt 1"/>
-          <p:cNvSpPr>
-            <a:spLocks noGrp="1" noRot="1" noChangeAspect="1"/>
-          </p:cNvSpPr>
-          <p:nvPr>
-            <p:ph type="sldImg"/>
-          </p:nvPr>
-        </p:nvSpPr>
-        <p:spPr/>
-      </p:sp>
-      <p:sp>
-        <p:nvSpPr>
-          <p:cNvPr id="3" name="Platshållare för anteckningar 2"/>
-          <p:cNvSpPr>
-            <a:spLocks noGrp="1"/>
-          </p:cNvSpPr>
-          <p:nvPr>
-            <p:ph type="body" idx="1"/>
-          </p:nvPr>
-        </p:nvSpPr>
-        <p:spPr/>
-        <p:txBody>
-          <a:bodyPr/>
-          <a:lstStyle/>
-          <a:p>
-            <a:pPr marL="0" marR="0" lvl="0" indent="0" algn="l" defTabSz="914400" rtl="0" eaLnBrk="1" fontAlgn="auto" latinLnBrk="0" hangingPunct="1">
-              <a:lnSpc>
-                <a:spcPct val="100000"/>
-              </a:lnSpc>
-              <a:spcBef>
-                <a:spcPts val="0"/>
-              </a:spcBef>
-              <a:spcAft>
-                <a:spcPts val="0"/>
-              </a:spcAft>
-              <a:buClrTx/>
-              <a:buSzTx/>
-              <a:buFontTx/>
-              <a:buNone/>
-              <a:tabLst/>
-              <a:defRPr/>
-            </a:pPr>
-            <a:r>
-              <a:rPr lang="sv-SE" sz="1200" kern="1200" dirty="0">
-                <a:solidFill>
-                  <a:schemeClr val="tx1"/>
-                </a:solidFill>
-                <a:effectLst/>
-                <a:latin typeface="+mn-lt"/>
-                <a:ea typeface="+mn-ea"/>
-                <a:cs typeface="+mn-cs"/>
-              </a:rPr>
-              <a:t>Byggscriptets första (seriösa) version, och den slutliga.</a:t>
-            </a:r>
-          </a:p>
-          <a:p>
-            <a:endParaRPr lang="sv-SE" dirty="0"/>
-          </a:p>
-        </p:txBody>
-      </p:sp>
-      <p:sp>
-        <p:nvSpPr>
-          <p:cNvPr id="4" name="Platshållare för bildnummer 3"/>
-          <p:cNvSpPr>
-            <a:spLocks noGrp="1"/>
-          </p:cNvSpPr>
-          <p:nvPr>
-            <p:ph type="sldNum" sz="quarter" idx="10"/>
-          </p:nvPr>
-        </p:nvSpPr>
-        <p:spPr/>
-        <p:txBody>
-          <a:bodyPr/>
-          <a:lstStyle/>
-          <a:p>
-            <a:fld id="{8667F948-D2CB-486C-A2EA-FEABC2DAAE8D}" type="slidenum">
-              <a:rPr lang="sv-SE" smtClean="0"/>
-              <a:t>33</a:t>
-            </a:fld>
-            <a:endParaRPr lang="sv-SE"/>
-          </a:p>
-        </p:txBody>
-      </p:sp>
-    </p:spTree>
-    <p:extLst>
-      <p:ext uri="{BB962C8B-B14F-4D97-AF65-F5344CB8AC3E}">
-        <p14:creationId xmlns:p14="http://schemas.microsoft.com/office/powerpoint/2010/main" val="109849433"/>
       </p:ext>
     </p:extLst>
   </p:cSld>
@@ -3807,7 +3856,7 @@
                 <a:ea typeface="+mn-ea"/>
                 <a:cs typeface="+mn-cs"/>
               </a:rPr>
-              <a:t>Här kan ni ta upp övrigt av relevans för bedömningen av ert arbete. Om avsnittet inte behövs kan det plockas bort.</a:t>
+              <a:t>Byggscriptets första (seriösa) version, och den slutliga.</a:t>
             </a:r>
           </a:p>
           <a:p>
@@ -3833,6 +3882,121 @@
             <a:fld id="{8667F948-D2CB-486C-A2EA-FEABC2DAAE8D}" type="slidenum">
               <a:rPr lang="sv-SE" smtClean="0"/>
               <a:t>34</a:t>
+            </a:fld>
+            <a:endParaRPr lang="sv-SE"/>
+          </a:p>
+        </p:txBody>
+      </p:sp>
+    </p:spTree>
+    <p:extLst>
+      <p:ext uri="{BB962C8B-B14F-4D97-AF65-F5344CB8AC3E}">
+        <p14:creationId xmlns:p14="http://schemas.microsoft.com/office/powerpoint/2010/main" val="109849433"/>
+      </p:ext>
+    </p:extLst>
+  </p:cSld>
+  <p:clrMapOvr>
+    <a:masterClrMapping/>
+  </p:clrMapOvr>
+</p:notes>
+</file>
+
+<file path=ppt/notesSlides/notesSlide35.xml><?xml version="1.0" encoding="utf-8"?>
+<p:notes xmlns:a="http://schemas.openxmlformats.org/drawingml/2006/main" xmlns:r="http://schemas.openxmlformats.org/officeDocument/2006/relationships" xmlns:p="http://schemas.openxmlformats.org/presentationml/2006/main">
+  <p:cSld>
+    <p:spTree>
+      <p:nvGrpSpPr>
+        <p:cNvPr id="1" name=""/>
+        <p:cNvGrpSpPr/>
+        <p:nvPr/>
+      </p:nvGrpSpPr>
+      <p:grpSpPr>
+        <a:xfrm>
+          <a:off x="0" y="0"/>
+          <a:ext cx="0" cy="0"/>
+          <a:chOff x="0" y="0"/>
+          <a:chExt cx="0" cy="0"/>
+        </a:xfrm>
+      </p:grpSpPr>
+      <p:sp>
+        <p:nvSpPr>
+          <p:cNvPr id="2" name="Platshållare för bildobjekt 1"/>
+          <p:cNvSpPr>
+            <a:spLocks noGrp="1" noRot="1" noChangeAspect="1"/>
+          </p:cNvSpPr>
+          <p:nvPr>
+            <p:ph type="sldImg"/>
+          </p:nvPr>
+        </p:nvSpPr>
+        <p:spPr/>
+      </p:sp>
+      <p:sp>
+        <p:nvSpPr>
+          <p:cNvPr id="3" name="Platshållare för anteckningar 2"/>
+          <p:cNvSpPr>
+            <a:spLocks noGrp="1"/>
+          </p:cNvSpPr>
+          <p:nvPr>
+            <p:ph type="body" idx="1"/>
+          </p:nvPr>
+        </p:nvSpPr>
+        <p:spPr/>
+        <p:txBody>
+          <a:bodyPr/>
+          <a:lstStyle/>
+          <a:p>
+            <a:pPr marL="0" marR="0" lvl="0" indent="0" algn="l" defTabSz="914400" rtl="0" eaLnBrk="1" fontAlgn="auto" latinLnBrk="0" hangingPunct="1">
+              <a:lnSpc>
+                <a:spcPct val="100000"/>
+              </a:lnSpc>
+              <a:spcBef>
+                <a:spcPts val="0"/>
+              </a:spcBef>
+              <a:spcAft>
+                <a:spcPts val="0"/>
+              </a:spcAft>
+              <a:buClrTx/>
+              <a:buSzTx/>
+              <a:buFontTx/>
+              <a:buNone/>
+              <a:tabLst/>
+              <a:defRPr/>
+            </a:pPr>
+            <a:r>
+              <a:rPr lang="sv-SE" sz="1200" kern="1200" dirty="0">
+                <a:solidFill>
+                  <a:schemeClr val="tx1"/>
+                </a:solidFill>
+                <a:effectLst/>
+                <a:latin typeface="+mn-lt"/>
+                <a:ea typeface="+mn-ea"/>
+                <a:cs typeface="+mn-cs"/>
+              </a:rPr>
+              <a:t>Här kan ni ta upp övrigt av relevans för bedömningen av ert arbete. Om avsnittet inte behövs kan det plockas bort.</a:t>
+            </a:r>
+          </a:p>
+          <a:p>
+            <a:endParaRPr lang="sv-SE" dirty="0"/>
+          </a:p>
+        </p:txBody>
+      </p:sp>
+      <p:sp>
+        <p:nvSpPr>
+          <p:cNvPr id="4" name="Platshållare för bildnummer 3"/>
+          <p:cNvSpPr>
+            <a:spLocks noGrp="1"/>
+          </p:cNvSpPr>
+          <p:nvPr>
+            <p:ph type="sldNum" sz="quarter" idx="10"/>
+          </p:nvPr>
+        </p:nvSpPr>
+        <p:spPr/>
+        <p:txBody>
+          <a:bodyPr/>
+          <a:lstStyle/>
+          <a:p>
+            <a:fld id="{8667F948-D2CB-486C-A2EA-FEABC2DAAE8D}" type="slidenum">
+              <a:rPr lang="sv-SE" smtClean="0"/>
+              <a:t>35</a:t>
             </a:fld>
             <a:endParaRPr lang="sv-SE"/>
           </a:p>
@@ -4167,7 +4331,7 @@
     </p:spTree>
     <p:extLst>
       <p:ext uri="{BB962C8B-B14F-4D97-AF65-F5344CB8AC3E}">
-        <p14:creationId xmlns:p14="http://schemas.microsoft.com/office/powerpoint/2010/main" val="4026030065"/>
+        <p14:creationId xmlns:p14="http://schemas.microsoft.com/office/powerpoint/2010/main" val="1991747670"/>
       </p:ext>
     </p:extLst>
   </p:cSld>
@@ -4330,7 +4494,7 @@
     </p:spTree>
     <p:extLst>
       <p:ext uri="{BB962C8B-B14F-4D97-AF65-F5344CB8AC3E}">
-        <p14:creationId xmlns:p14="http://schemas.microsoft.com/office/powerpoint/2010/main" val="3674663265"/>
+        <p14:creationId xmlns:p14="http://schemas.microsoft.com/office/powerpoint/2010/main" val="4026030065"/>
       </p:ext>
     </p:extLst>
   </p:cSld>
@@ -4493,7 +4657,7 @@
     </p:spTree>
     <p:extLst>
       <p:ext uri="{BB962C8B-B14F-4D97-AF65-F5344CB8AC3E}">
-        <p14:creationId xmlns:p14="http://schemas.microsoft.com/office/powerpoint/2010/main" val="437511418"/>
+        <p14:creationId xmlns:p14="http://schemas.microsoft.com/office/powerpoint/2010/main" val="3674663265"/>
       </p:ext>
     </p:extLst>
   </p:cSld>
@@ -4656,7 +4820,7 @@
     </p:spTree>
     <p:extLst>
       <p:ext uri="{BB962C8B-B14F-4D97-AF65-F5344CB8AC3E}">
-        <p14:creationId xmlns:p14="http://schemas.microsoft.com/office/powerpoint/2010/main" val="2111164777"/>
+        <p14:creationId xmlns:p14="http://schemas.microsoft.com/office/powerpoint/2010/main" val="437511418"/>
       </p:ext>
     </p:extLst>
   </p:cSld>
@@ -4819,7 +4983,7 @@
     </p:spTree>
     <p:extLst>
       <p:ext uri="{BB962C8B-B14F-4D97-AF65-F5344CB8AC3E}">
-        <p14:creationId xmlns:p14="http://schemas.microsoft.com/office/powerpoint/2010/main" val="3529345129"/>
+        <p14:creationId xmlns:p14="http://schemas.microsoft.com/office/powerpoint/2010/main" val="2111164777"/>
       </p:ext>
     </p:extLst>
   </p:cSld>
@@ -7720,10 +7884,40 @@
               <a:t>Linnéa Palmgren, </a:t>
             </a:r>
             <a:r>
-              <a:rPr lang="sv-SE" dirty="0">
+              <a:rPr lang="sv-SE" dirty="0" smtClean="0">
                 <a:hlinkClick r:id="rId5"/>
               </a:rPr>
               <a:t>lipa7972@student.su.se</a:t>
+            </a:r>
+            <a:endParaRPr lang="sv-SE" dirty="0" smtClean="0"/>
+          </a:p>
+          <a:p>
+            <a:r>
+              <a:rPr lang="sv-SE" dirty="0"/>
+              <a:t>Karl Gustafsson, </a:t>
+            </a:r>
+            <a:r>
+              <a:rPr lang="sv-SE" dirty="0" smtClean="0">
+                <a:hlinkClick r:id="rId6"/>
+              </a:rPr>
+              <a:t>kagu9654@student.su.se</a:t>
+            </a:r>
+            <a:endParaRPr lang="sv-SE" dirty="0"/>
+          </a:p>
+          <a:p>
+            <a:r>
+              <a:rPr lang="sv-SE" dirty="0" smtClean="0"/>
+              <a:t>Magnus Palmstierna, </a:t>
+            </a:r>
+            <a:r>
+              <a:rPr lang="sv-SE" dirty="0" smtClean="0">
+                <a:hlinkClick r:id="rId7"/>
+              </a:rPr>
+              <a:t>mapa7956@student.su.se</a:t>
+            </a:r>
+            <a:r>
+              <a:rPr lang="sv-SE" dirty="0" smtClean="0"/>
+              <a:t> </a:t>
             </a:r>
             <a:endParaRPr lang="sv-SE" dirty="0"/>
           </a:p>
@@ -7826,6 +8020,174 @@
           <a:lstStyle/>
           <a:p>
             <a:r>
+              <a:rPr lang="sv-SE" dirty="0" err="1"/>
+              <a:t>TDD-exempel:Bjargey</a:t>
+            </a:r>
+            <a:r>
+              <a:rPr lang="sv-SE" dirty="0"/>
+              <a:t> Ingólfsdóttir</a:t>
+            </a:r>
+          </a:p>
+        </p:txBody>
+      </p:sp>
+      <p:sp>
+        <p:nvSpPr>
+          <p:cNvPr id="4" name="Platshållare för text 3"/>
+          <p:cNvSpPr>
+            <a:spLocks noGrp="1"/>
+          </p:cNvSpPr>
+          <p:nvPr>
+            <p:ph type="body" idx="1"/>
+          </p:nvPr>
+        </p:nvSpPr>
+        <p:spPr/>
+        <p:txBody>
+          <a:bodyPr/>
+          <a:lstStyle/>
+          <a:p>
+            <a:r>
+              <a:rPr lang="sv-SE" dirty="0" err="1"/>
+              <a:t>Testkod</a:t>
+            </a:r>
+            <a:endParaRPr lang="sv-SE" dirty="0"/>
+          </a:p>
+        </p:txBody>
+      </p:sp>
+      <p:sp>
+        <p:nvSpPr>
+          <p:cNvPr id="6" name="Platshållare för text 5"/>
+          <p:cNvSpPr>
+            <a:spLocks noGrp="1"/>
+          </p:cNvSpPr>
+          <p:nvPr>
+            <p:ph type="body" sz="quarter" idx="3"/>
+          </p:nvPr>
+        </p:nvSpPr>
+        <p:spPr/>
+        <p:txBody>
+          <a:bodyPr/>
+          <a:lstStyle/>
+          <a:p>
+            <a:r>
+              <a:rPr lang="sv-SE" dirty="0"/>
+              <a:t>Koden som testas</a:t>
+            </a:r>
+          </a:p>
+        </p:txBody>
+      </p:sp>
+      <p:pic>
+        <p:nvPicPr>
+          <p:cNvPr id="8" name="Platshållare för innehåll 7">
+            <a:extLst>
+              <a:ext uri="{FF2B5EF4-FFF2-40B4-BE49-F238E27FC236}">
+                <a16:creationId xmlns:a16="http://schemas.microsoft.com/office/drawing/2014/main" id="{7E580B70-D670-41FA-8638-4B66A1929055}"/>
+              </a:ext>
+            </a:extLst>
+          </p:cNvPr>
+          <p:cNvPicPr>
+            <a:picLocks noGrp="1" noChangeAspect="1"/>
+          </p:cNvPicPr>
+          <p:nvPr>
+            <p:ph sz="quarter" idx="4"/>
+          </p:nvPr>
+        </p:nvPicPr>
+        <p:blipFill>
+          <a:blip r:embed="rId4"/>
+          <a:stretch>
+            <a:fillRect/>
+          </a:stretch>
+        </p:blipFill>
+        <p:spPr>
+          <a:xfrm>
+            <a:off x="6831956" y="3835904"/>
+            <a:ext cx="5094189" cy="823912"/>
+          </a:xfrm>
+          <a:prstGeom prst="rect">
+            <a:avLst/>
+          </a:prstGeom>
+        </p:spPr>
+      </p:pic>
+      <p:pic>
+        <p:nvPicPr>
+          <p:cNvPr id="11" name="Platshållare för innehåll 10">
+            <a:extLst>
+              <a:ext uri="{FF2B5EF4-FFF2-40B4-BE49-F238E27FC236}">
+                <a16:creationId xmlns:a16="http://schemas.microsoft.com/office/drawing/2014/main" id="{4F938606-BFA6-4E62-A54C-85983F8E5D56}"/>
+              </a:ext>
+            </a:extLst>
+          </p:cNvPr>
+          <p:cNvPicPr>
+            <a:picLocks noGrp="1" noChangeAspect="1"/>
+          </p:cNvPicPr>
+          <p:nvPr>
+            <p:ph sz="half" idx="2"/>
+          </p:nvPr>
+        </p:nvPicPr>
+        <p:blipFill>
+          <a:blip r:embed="rId5"/>
+          <a:stretch>
+            <a:fillRect/>
+          </a:stretch>
+        </p:blipFill>
+        <p:spPr>
+          <a:xfrm>
+            <a:off x="140834" y="3289738"/>
+            <a:ext cx="5856742" cy="1889737"/>
+          </a:xfrm>
+          <a:prstGeom prst="rect">
+            <a:avLst/>
+          </a:prstGeom>
+        </p:spPr>
+      </p:pic>
+    </p:spTree>
+    <p:custDataLst>
+      <p:tags r:id="rId1"/>
+    </p:custDataLst>
+    <p:extLst>
+      <p:ext uri="{BB962C8B-B14F-4D97-AF65-F5344CB8AC3E}">
+        <p14:creationId xmlns:p14="http://schemas.microsoft.com/office/powerpoint/2010/main" val="4061453420"/>
+      </p:ext>
+    </p:extLst>
+  </p:cSld>
+  <p:clrMapOvr>
+    <a:masterClrMapping/>
+  </p:clrMapOvr>
+</p:sld>
+</file>
+
+<file path=ppt/slides/slide11.xml><?xml version="1.0" encoding="utf-8"?>
+<p:sld xmlns:a="http://schemas.openxmlformats.org/drawingml/2006/main" xmlns:r="http://schemas.openxmlformats.org/officeDocument/2006/relationships" xmlns:p="http://schemas.openxmlformats.org/presentationml/2006/main">
+  <p:cSld>
+    <p:spTree>
+      <p:nvGrpSpPr>
+        <p:cNvPr id="1" name=""/>
+        <p:cNvGrpSpPr/>
+        <p:nvPr/>
+      </p:nvGrpSpPr>
+      <p:grpSpPr>
+        <a:xfrm>
+          <a:off x="0" y="0"/>
+          <a:ext cx="0" cy="0"/>
+          <a:chOff x="0" y="0"/>
+          <a:chExt cx="0" cy="0"/>
+        </a:xfrm>
+      </p:grpSpPr>
+      <p:sp>
+        <p:nvSpPr>
+          <p:cNvPr id="2" name="Rubrik 1"/>
+          <p:cNvSpPr>
+            <a:spLocks noGrp="1"/>
+          </p:cNvSpPr>
+          <p:nvPr>
+            <p:ph type="title"/>
+          </p:nvPr>
+        </p:nvSpPr>
+        <p:spPr/>
+        <p:txBody>
+          <a:bodyPr/>
+          <a:lstStyle/>
+          <a:p>
+            <a:r>
               <a:rPr lang="sv-SE" dirty="0"/>
               <a:t>TDD-exempel: Linnéa Palmgren</a:t>
             </a:r>
@@ -10812,6 +11174,19 @@
               </a:rPr>
               <a:t>Override</a:t>
             </a:r>
+            <a:r>
+              <a:rPr kumimoji="0" lang="sv-SE" altLang="sv-SE" sz="800" b="0" i="0" u="none" strike="noStrike" cap="none" normalizeH="0" baseline="0" dirty="0">
+                <a:ln>
+                  <a:noFill/>
+                </a:ln>
+                <a:solidFill>
+                  <a:srgbClr val="BBB529"/>
+                </a:solidFill>
+                <a:effectLst/>
+                <a:latin typeface="Consolas" panose="020B0609020204030204" pitchFamily="49" charset="0"/>
+              </a:rPr>
+              <a:t/>
+            </a:r>
             <a:br>
               <a:rPr kumimoji="0" lang="sv-SE" altLang="sv-SE" sz="800" b="0" i="0" u="none" strike="noStrike" cap="none" normalizeH="0" baseline="0" dirty="0">
                 <a:ln>
@@ -11927,7 +12302,7 @@
 </p:sld>
 </file>
 
-<file path=ppt/slides/slide11.xml><?xml version="1.0" encoding="utf-8"?>
+<file path=ppt/slides/slide12.xml><?xml version="1.0" encoding="utf-8"?>
 <p:sld xmlns:a="http://schemas.openxmlformats.org/drawingml/2006/main" xmlns:r="http://schemas.openxmlformats.org/officeDocument/2006/relationships" xmlns:p="http://schemas.openxmlformats.org/presentationml/2006/main">
   <p:cSld>
     <p:spTree>
@@ -12777,6 +13152,19 @@
                 <a:latin typeface="Consolas" panose="020B0609020204030204" pitchFamily="49" charset="0"/>
               </a:rPr>
             </a:br>
+            <a:r>
+              <a:rPr kumimoji="0" lang="sv-SE" altLang="sv-SE" sz="1000" b="0" i="0" u="none" strike="noStrike" cap="none" normalizeH="0" baseline="0" dirty="0">
+                <a:ln>
+                  <a:noFill/>
+                </a:ln>
+                <a:solidFill>
+                  <a:srgbClr val="A9B7C6"/>
+                </a:solidFill>
+                <a:effectLst/>
+                <a:latin typeface="Consolas" panose="020B0609020204030204" pitchFamily="49" charset="0"/>
+              </a:rPr>
+              <a:t/>
+            </a:r>
             <a:br>
               <a:rPr kumimoji="0" lang="sv-SE" altLang="sv-SE" sz="1000" b="0" i="0" u="none" strike="noStrike" cap="none" normalizeH="0" baseline="0" dirty="0">
                 <a:ln>
@@ -14878,7 +15266,7 @@
 </p:sld>
 </file>
 
-<file path=ppt/slides/slide12.xml><?xml version="1.0" encoding="utf-8"?>
+<file path=ppt/slides/slide13.xml><?xml version="1.0" encoding="utf-8"?>
 <p:sld xmlns:a="http://schemas.openxmlformats.org/drawingml/2006/main" xmlns:r="http://schemas.openxmlformats.org/officeDocument/2006/relationships" xmlns:p="http://schemas.openxmlformats.org/presentationml/2006/main">
   <p:cSld>
     <p:spTree>
@@ -17602,6 +17990,19 @@
               </a:rPr>
               <a:t>    }</a:t>
             </a:r>
+            <a:r>
+              <a:rPr kumimoji="0" lang="sv-SE" altLang="sv-SE" sz="800" b="0" i="0" u="none" strike="noStrike" cap="none" normalizeH="0" baseline="0" dirty="0">
+                <a:ln>
+                  <a:noFill/>
+                </a:ln>
+                <a:solidFill>
+                  <a:srgbClr val="CC7832"/>
+                </a:solidFill>
+                <a:effectLst/>
+                <a:latin typeface="Consolas" panose="020B0609020204030204" pitchFamily="49" charset="0"/>
+              </a:rPr>
+              <a:t/>
+            </a:r>
             <a:br>
               <a:rPr kumimoji="0" lang="sv-SE" altLang="sv-SE" sz="800" b="0" i="0" u="none" strike="noStrike" cap="none" normalizeH="0" baseline="0" dirty="0">
                 <a:ln>
@@ -18163,6 +18564,19 @@
                 <a:latin typeface="Consolas" panose="020B0609020204030204" pitchFamily="49" charset="0"/>
               </a:rPr>
             </a:br>
+            <a:r>
+              <a:rPr kumimoji="0" lang="sv-SE" altLang="sv-SE" sz="800" b="0" i="0" u="none" strike="noStrike" cap="none" normalizeH="0" baseline="0" dirty="0">
+                <a:ln>
+                  <a:noFill/>
+                </a:ln>
+                <a:solidFill>
+                  <a:srgbClr val="A9B7C6"/>
+                </a:solidFill>
+                <a:effectLst/>
+                <a:latin typeface="Consolas" panose="020B0609020204030204" pitchFamily="49" charset="0"/>
+              </a:rPr>
+              <a:t/>
+            </a:r>
             <a:br>
               <a:rPr kumimoji="0" lang="sv-SE" altLang="sv-SE" sz="800" b="0" i="0" u="none" strike="noStrike" cap="none" normalizeH="0" baseline="0" dirty="0">
                 <a:ln>
@@ -18554,80 +18968,6 @@
     <p:extLst>
       <p:ext uri="{BB962C8B-B14F-4D97-AF65-F5344CB8AC3E}">
         <p14:creationId xmlns:p14="http://schemas.microsoft.com/office/powerpoint/2010/main" val="2700327524"/>
-      </p:ext>
-    </p:extLst>
-  </p:cSld>
-  <p:clrMapOvr>
-    <a:masterClrMapping/>
-  </p:clrMapOvr>
-</p:sld>
-</file>
-
-<file path=ppt/slides/slide13.xml><?xml version="1.0" encoding="utf-8"?>
-<p:sld xmlns:a="http://schemas.openxmlformats.org/drawingml/2006/main" xmlns:r="http://schemas.openxmlformats.org/officeDocument/2006/relationships" xmlns:p="http://schemas.openxmlformats.org/presentationml/2006/main">
-  <p:cSld>
-    <p:spTree>
-      <p:nvGrpSpPr>
-        <p:cNvPr id="1" name=""/>
-        <p:cNvGrpSpPr/>
-        <p:nvPr/>
-      </p:nvGrpSpPr>
-      <p:grpSpPr>
-        <a:xfrm>
-          <a:off x="0" y="0"/>
-          <a:ext cx="0" cy="0"/>
-          <a:chOff x="0" y="0"/>
-          <a:chExt cx="0" cy="0"/>
-        </a:xfrm>
-      </p:grpSpPr>
-      <p:sp>
-        <p:nvSpPr>
-          <p:cNvPr id="9" name="Rubrik 8"/>
-          <p:cNvSpPr>
-            <a:spLocks noGrp="1"/>
-          </p:cNvSpPr>
-          <p:nvPr>
-            <p:ph type="title"/>
-          </p:nvPr>
-        </p:nvSpPr>
-        <p:spPr/>
-        <p:txBody>
-          <a:bodyPr/>
-          <a:lstStyle/>
-          <a:p>
-            <a:r>
-              <a:rPr lang="sv-SE" dirty="0"/>
-              <a:t>TDD erfarenheter</a:t>
-            </a:r>
-          </a:p>
-        </p:txBody>
-      </p:sp>
-      <p:sp>
-        <p:nvSpPr>
-          <p:cNvPr id="10" name="Platshållare för innehåll 9"/>
-          <p:cNvSpPr>
-            <a:spLocks noGrp="1"/>
-          </p:cNvSpPr>
-          <p:nvPr>
-            <p:ph idx="1"/>
-          </p:nvPr>
-        </p:nvSpPr>
-        <p:spPr/>
-        <p:txBody>
-          <a:bodyPr/>
-          <a:lstStyle/>
-          <a:p>
-            <a:endParaRPr lang="sv-SE" dirty="0"/>
-          </a:p>
-        </p:txBody>
-      </p:sp>
-    </p:spTree>
-    <p:custDataLst>
-      <p:tags r:id="rId1"/>
-    </p:custDataLst>
-    <p:extLst>
-      <p:ext uri="{BB962C8B-B14F-4D97-AF65-F5344CB8AC3E}">
-        <p14:creationId xmlns:p14="http://schemas.microsoft.com/office/powerpoint/2010/main" val="1458286633"/>
       </p:ext>
     </p:extLst>
   </p:cSld>
@@ -18656,7 +18996,7 @@
       </p:grpSpPr>
       <p:sp>
         <p:nvSpPr>
-          <p:cNvPr id="2" name="Rubrik 1"/>
+          <p:cNvPr id="9" name="Rubrik 8"/>
           <p:cNvSpPr>
             <a:spLocks noGrp="1"/>
           </p:cNvSpPr>
@@ -18671,14 +19011,14 @@
           <a:p>
             <a:r>
               <a:rPr lang="sv-SE" dirty="0"/>
-              <a:t>Testfallsdesign ekvivalensklasser</a:t>
-            </a:r>
-          </a:p>
-        </p:txBody>
-      </p:sp>
-      <p:sp>
-        <p:nvSpPr>
-          <p:cNvPr id="3" name="Platshållare för innehåll 2"/>
+              <a:t>TDD erfarenheter</a:t>
+            </a:r>
+          </a:p>
+        </p:txBody>
+      </p:sp>
+      <p:sp>
+        <p:nvSpPr>
+          <p:cNvPr id="10" name="Platshållare för innehåll 9"/>
           <p:cNvSpPr>
             <a:spLocks noGrp="1"/>
           </p:cNvSpPr>
@@ -18691,7 +19031,7 @@
           <a:bodyPr/>
           <a:lstStyle/>
           <a:p>
-            <a:endParaRPr lang="sv-SE"/>
+            <a:endParaRPr lang="sv-SE" dirty="0"/>
           </a:p>
         </p:txBody>
       </p:sp>
@@ -18701,7 +19041,7 @@
     </p:custDataLst>
     <p:extLst>
       <p:ext uri="{BB962C8B-B14F-4D97-AF65-F5344CB8AC3E}">
-        <p14:creationId xmlns:p14="http://schemas.microsoft.com/office/powerpoint/2010/main" val="3480241241"/>
+        <p14:creationId xmlns:p14="http://schemas.microsoft.com/office/powerpoint/2010/main" val="1458286633"/>
       </p:ext>
     </p:extLst>
   </p:cSld>
@@ -18745,7 +19085,7 @@
           <a:p>
             <a:r>
               <a:rPr lang="sv-SE" dirty="0"/>
-              <a:t>Ekvivalensklasserna</a:t>
+              <a:t>Testfallsdesign ekvivalensklasser</a:t>
             </a:r>
           </a:p>
         </p:txBody>
@@ -18775,7 +19115,7 @@
     </p:custDataLst>
     <p:extLst>
       <p:ext uri="{BB962C8B-B14F-4D97-AF65-F5344CB8AC3E}">
-        <p14:creationId xmlns:p14="http://schemas.microsoft.com/office/powerpoint/2010/main" val="3750412782"/>
+        <p14:creationId xmlns:p14="http://schemas.microsoft.com/office/powerpoint/2010/main" val="3480241241"/>
       </p:ext>
     </p:extLst>
   </p:cSld>
@@ -18819,7 +19159,7 @@
           <a:p>
             <a:r>
               <a:rPr lang="sv-SE" dirty="0"/>
-              <a:t>Testfall</a:t>
+              <a:t>Ekvivalensklasserna</a:t>
             </a:r>
           </a:p>
         </p:txBody>
@@ -18849,7 +19189,7 @@
     </p:custDataLst>
     <p:extLst>
       <p:ext uri="{BB962C8B-B14F-4D97-AF65-F5344CB8AC3E}">
-        <p14:creationId xmlns:p14="http://schemas.microsoft.com/office/powerpoint/2010/main" val="3595241904"/>
+        <p14:creationId xmlns:p14="http://schemas.microsoft.com/office/powerpoint/2010/main" val="3750412782"/>
       </p:ext>
     </p:extLst>
   </p:cSld>
@@ -18893,7 +19233,7 @@
           <a:p>
             <a:r>
               <a:rPr lang="sv-SE" dirty="0"/>
-              <a:t>Testmatris</a:t>
+              <a:t>Testfall</a:t>
             </a:r>
           </a:p>
         </p:txBody>
@@ -18923,7 +19263,7 @@
     </p:custDataLst>
     <p:extLst>
       <p:ext uri="{BB962C8B-B14F-4D97-AF65-F5344CB8AC3E}">
-        <p14:creationId xmlns:p14="http://schemas.microsoft.com/office/powerpoint/2010/main" val="1900409101"/>
+        <p14:creationId xmlns:p14="http://schemas.microsoft.com/office/powerpoint/2010/main" val="3595241904"/>
       </p:ext>
     </p:extLst>
   </p:cSld>
@@ -18967,7 +19307,7 @@
           <a:p>
             <a:r>
               <a:rPr lang="sv-SE" dirty="0"/>
-              <a:t>Tillståndsmaskiner</a:t>
+              <a:t>Testmatris</a:t>
             </a:r>
           </a:p>
         </p:txBody>
@@ -18997,7 +19337,7 @@
     </p:custDataLst>
     <p:extLst>
       <p:ext uri="{BB962C8B-B14F-4D97-AF65-F5344CB8AC3E}">
-        <p14:creationId xmlns:p14="http://schemas.microsoft.com/office/powerpoint/2010/main" val="1230194705"/>
+        <p14:creationId xmlns:p14="http://schemas.microsoft.com/office/powerpoint/2010/main" val="1900409101"/>
       </p:ext>
     </p:extLst>
   </p:cSld>
@@ -19041,7 +19381,7 @@
           <a:p>
             <a:r>
               <a:rPr lang="sv-SE" dirty="0"/>
-              <a:t>Tillståndsmaskinen</a:t>
+              <a:t>Tillståndsmaskiner</a:t>
             </a:r>
           </a:p>
         </p:txBody>
@@ -19071,7 +19411,7 @@
     </p:custDataLst>
     <p:extLst>
       <p:ext uri="{BB962C8B-B14F-4D97-AF65-F5344CB8AC3E}">
-        <p14:creationId xmlns:p14="http://schemas.microsoft.com/office/powerpoint/2010/main" val="2924590265"/>
+        <p14:creationId xmlns:p14="http://schemas.microsoft.com/office/powerpoint/2010/main" val="1230194705"/>
       </p:ext>
     </p:extLst>
   </p:cSld>
@@ -19209,7 +19549,7 @@
           <a:p>
             <a:r>
               <a:rPr lang="sv-SE" dirty="0"/>
-              <a:t>Testfall</a:t>
+              <a:t>Tillståndsmaskinen</a:t>
             </a:r>
           </a:p>
         </p:txBody>
@@ -19239,7 +19579,7 @@
     </p:custDataLst>
     <p:extLst>
       <p:ext uri="{BB962C8B-B14F-4D97-AF65-F5344CB8AC3E}">
-        <p14:creationId xmlns:p14="http://schemas.microsoft.com/office/powerpoint/2010/main" val="1268711775"/>
+        <p14:creationId xmlns:p14="http://schemas.microsoft.com/office/powerpoint/2010/main" val="2924590265"/>
       </p:ext>
     </p:extLst>
   </p:cSld>
@@ -19283,7 +19623,7 @@
           <a:p>
             <a:r>
               <a:rPr lang="sv-SE" dirty="0"/>
-              <a:t>Testmatris</a:t>
+              <a:t>Testfall</a:t>
             </a:r>
           </a:p>
         </p:txBody>
@@ -19313,7 +19653,7 @@
     </p:custDataLst>
     <p:extLst>
       <p:ext uri="{BB962C8B-B14F-4D97-AF65-F5344CB8AC3E}">
-        <p14:creationId xmlns:p14="http://schemas.microsoft.com/office/powerpoint/2010/main" val="2129764329"/>
+        <p14:creationId xmlns:p14="http://schemas.microsoft.com/office/powerpoint/2010/main" val="1268711775"/>
       </p:ext>
     </p:extLst>
   </p:cSld>
@@ -19357,7 +19697,7 @@
           <a:p>
             <a:r>
               <a:rPr lang="sv-SE" dirty="0"/>
-              <a:t>Beslutstabeller/beslutsträd</a:t>
+              <a:t>Testmatris</a:t>
             </a:r>
           </a:p>
         </p:txBody>
@@ -19387,7 +19727,7 @@
     </p:custDataLst>
     <p:extLst>
       <p:ext uri="{BB962C8B-B14F-4D97-AF65-F5344CB8AC3E}">
-        <p14:creationId xmlns:p14="http://schemas.microsoft.com/office/powerpoint/2010/main" val="2726864417"/>
+        <p14:creationId xmlns:p14="http://schemas.microsoft.com/office/powerpoint/2010/main" val="2129764329"/>
       </p:ext>
     </p:extLst>
   </p:cSld>
@@ -19431,7 +19771,7 @@
           <a:p>
             <a:r>
               <a:rPr lang="sv-SE" dirty="0"/>
-              <a:t>Beslutstabell</a:t>
+              <a:t>Beslutstabeller/beslutsträd</a:t>
             </a:r>
           </a:p>
         </p:txBody>
@@ -19461,7 +19801,7 @@
     </p:custDataLst>
     <p:extLst>
       <p:ext uri="{BB962C8B-B14F-4D97-AF65-F5344CB8AC3E}">
-        <p14:creationId xmlns:p14="http://schemas.microsoft.com/office/powerpoint/2010/main" val="804679524"/>
+        <p14:creationId xmlns:p14="http://schemas.microsoft.com/office/powerpoint/2010/main" val="2726864417"/>
       </p:ext>
     </p:extLst>
   </p:cSld>
@@ -19505,7 +19845,7 @@
           <a:p>
             <a:r>
               <a:rPr lang="sv-SE" dirty="0"/>
-              <a:t>Beslutsträd</a:t>
+              <a:t>Beslutstabell</a:t>
             </a:r>
           </a:p>
         </p:txBody>
@@ -19535,7 +19875,7 @@
     </p:custDataLst>
     <p:extLst>
       <p:ext uri="{BB962C8B-B14F-4D97-AF65-F5344CB8AC3E}">
-        <p14:creationId xmlns:p14="http://schemas.microsoft.com/office/powerpoint/2010/main" val="3386033166"/>
+        <p14:creationId xmlns:p14="http://schemas.microsoft.com/office/powerpoint/2010/main" val="804679524"/>
       </p:ext>
     </p:extLst>
   </p:cSld>
@@ -19579,7 +19919,7 @@
           <a:p>
             <a:r>
               <a:rPr lang="sv-SE" dirty="0"/>
-              <a:t>Testfall</a:t>
+              <a:t>Beslutsträd</a:t>
             </a:r>
           </a:p>
         </p:txBody>
@@ -19609,7 +19949,7 @@
     </p:custDataLst>
     <p:extLst>
       <p:ext uri="{BB962C8B-B14F-4D97-AF65-F5344CB8AC3E}">
-        <p14:creationId xmlns:p14="http://schemas.microsoft.com/office/powerpoint/2010/main" val="1644214412"/>
+        <p14:creationId xmlns:p14="http://schemas.microsoft.com/office/powerpoint/2010/main" val="3386033166"/>
       </p:ext>
     </p:extLst>
   </p:cSld>
@@ -19653,7 +19993,7 @@
           <a:p>
             <a:r>
               <a:rPr lang="sv-SE" dirty="0"/>
-              <a:t>Granskning</a:t>
+              <a:t>Testfall</a:t>
             </a:r>
           </a:p>
         </p:txBody>
@@ -19683,7 +20023,7 @@
     </p:custDataLst>
     <p:extLst>
       <p:ext uri="{BB962C8B-B14F-4D97-AF65-F5344CB8AC3E}">
-        <p14:creationId xmlns:p14="http://schemas.microsoft.com/office/powerpoint/2010/main" val="3427005653"/>
+        <p14:creationId xmlns:p14="http://schemas.microsoft.com/office/powerpoint/2010/main" val="1644214412"/>
       </p:ext>
     </p:extLst>
   </p:cSld>
@@ -19727,7 +20067,7 @@
           <a:p>
             <a:r>
               <a:rPr lang="sv-SE" dirty="0"/>
-              <a:t>Granskningsrapport</a:t>
+              <a:t>Granskning</a:t>
             </a:r>
           </a:p>
         </p:txBody>
@@ -19757,7 +20097,7 @@
     </p:custDataLst>
     <p:extLst>
       <p:ext uri="{BB962C8B-B14F-4D97-AF65-F5344CB8AC3E}">
-        <p14:creationId xmlns:p14="http://schemas.microsoft.com/office/powerpoint/2010/main" val="3874197174"/>
+        <p14:creationId xmlns:p14="http://schemas.microsoft.com/office/powerpoint/2010/main" val="3427005653"/>
       </p:ext>
     </p:extLst>
   </p:cSld>
@@ -19801,7 +20141,7 @@
           <a:p>
             <a:r>
               <a:rPr lang="sv-SE" dirty="0"/>
-              <a:t>Erfarenheter av granskning</a:t>
+              <a:t>Granskningsrapport</a:t>
             </a:r>
           </a:p>
         </p:txBody>
@@ -19831,7 +20171,7 @@
     </p:custDataLst>
     <p:extLst>
       <p:ext uri="{BB962C8B-B14F-4D97-AF65-F5344CB8AC3E}">
-        <p14:creationId xmlns:p14="http://schemas.microsoft.com/office/powerpoint/2010/main" val="724679724"/>
+        <p14:creationId xmlns:p14="http://schemas.microsoft.com/office/powerpoint/2010/main" val="3874197174"/>
       </p:ext>
     </p:extLst>
   </p:cSld>
@@ -19875,7 +20215,7 @@
           <a:p>
             <a:r>
               <a:rPr lang="sv-SE" dirty="0"/>
-              <a:t>Kodkritiksystem</a:t>
+              <a:t>Erfarenheter av granskning</a:t>
             </a:r>
           </a:p>
         </p:txBody>
@@ -19905,7 +20245,7 @@
     </p:custDataLst>
     <p:extLst>
       <p:ext uri="{BB962C8B-B14F-4D97-AF65-F5344CB8AC3E}">
-        <p14:creationId xmlns:p14="http://schemas.microsoft.com/office/powerpoint/2010/main" val="847618868"/>
+        <p14:creationId xmlns:p14="http://schemas.microsoft.com/office/powerpoint/2010/main" val="724679724"/>
       </p:ext>
     </p:extLst>
   </p:cSld>
@@ -20023,7 +20363,7 @@
           <a:p>
             <a:r>
               <a:rPr lang="sv-SE" dirty="0"/>
-              <a:t>Statiska mått</a:t>
+              <a:t>Kodkritiksystem</a:t>
             </a:r>
           </a:p>
         </p:txBody>
@@ -20053,7 +20393,7 @@
     </p:custDataLst>
     <p:extLst>
       <p:ext uri="{BB962C8B-B14F-4D97-AF65-F5344CB8AC3E}">
-        <p14:creationId xmlns:p14="http://schemas.microsoft.com/office/powerpoint/2010/main" val="3620096591"/>
+        <p14:creationId xmlns:p14="http://schemas.microsoft.com/office/powerpoint/2010/main" val="847618868"/>
       </p:ext>
     </p:extLst>
   </p:cSld>
@@ -20097,7 +20437,7 @@
           <a:p>
             <a:r>
               <a:rPr lang="sv-SE" dirty="0"/>
-              <a:t>Täckningsgrad</a:t>
+              <a:t>Statiska mått</a:t>
             </a:r>
           </a:p>
         </p:txBody>
@@ -20127,7 +20467,7 @@
     </p:custDataLst>
     <p:extLst>
       <p:ext uri="{BB962C8B-B14F-4D97-AF65-F5344CB8AC3E}">
-        <p14:creationId xmlns:p14="http://schemas.microsoft.com/office/powerpoint/2010/main" val="3476279416"/>
+        <p14:creationId xmlns:p14="http://schemas.microsoft.com/office/powerpoint/2010/main" val="3620096591"/>
       </p:ext>
     </p:extLst>
   </p:cSld>
@@ -20171,7 +20511,7 @@
           <a:p>
             <a:r>
               <a:rPr lang="sv-SE" dirty="0"/>
-              <a:t>Profiler</a:t>
+              <a:t>Täckningsgrad</a:t>
             </a:r>
           </a:p>
         </p:txBody>
@@ -20201,7 +20541,7 @@
     </p:custDataLst>
     <p:extLst>
       <p:ext uri="{BB962C8B-B14F-4D97-AF65-F5344CB8AC3E}">
-        <p14:creationId xmlns:p14="http://schemas.microsoft.com/office/powerpoint/2010/main" val="4124232571"/>
+        <p14:creationId xmlns:p14="http://schemas.microsoft.com/office/powerpoint/2010/main" val="3476279416"/>
       </p:ext>
     </p:extLst>
   </p:cSld>
@@ -20245,6 +20585,80 @@
           <a:p>
             <a:r>
               <a:rPr lang="sv-SE" dirty="0"/>
+              <a:t>Profiler</a:t>
+            </a:r>
+          </a:p>
+        </p:txBody>
+      </p:sp>
+      <p:sp>
+        <p:nvSpPr>
+          <p:cNvPr id="3" name="Platshållare för innehåll 2"/>
+          <p:cNvSpPr>
+            <a:spLocks noGrp="1"/>
+          </p:cNvSpPr>
+          <p:nvPr>
+            <p:ph idx="1"/>
+          </p:nvPr>
+        </p:nvSpPr>
+        <p:spPr/>
+        <p:txBody>
+          <a:bodyPr/>
+          <a:lstStyle/>
+          <a:p>
+            <a:endParaRPr lang="sv-SE"/>
+          </a:p>
+        </p:txBody>
+      </p:sp>
+    </p:spTree>
+    <p:custDataLst>
+      <p:tags r:id="rId1"/>
+    </p:custDataLst>
+    <p:extLst>
+      <p:ext uri="{BB962C8B-B14F-4D97-AF65-F5344CB8AC3E}">
+        <p14:creationId xmlns:p14="http://schemas.microsoft.com/office/powerpoint/2010/main" val="4124232571"/>
+      </p:ext>
+    </p:extLst>
+  </p:cSld>
+  <p:clrMapOvr>
+    <a:masterClrMapping/>
+  </p:clrMapOvr>
+</p:sld>
+</file>
+
+<file path=ppt/slides/slide34.xml><?xml version="1.0" encoding="utf-8"?>
+<p:sld xmlns:a="http://schemas.openxmlformats.org/drawingml/2006/main" xmlns:r="http://schemas.openxmlformats.org/officeDocument/2006/relationships" xmlns:p="http://schemas.openxmlformats.org/presentationml/2006/main">
+  <p:cSld>
+    <p:spTree>
+      <p:nvGrpSpPr>
+        <p:cNvPr id="1" name=""/>
+        <p:cNvGrpSpPr/>
+        <p:nvPr/>
+      </p:nvGrpSpPr>
+      <p:grpSpPr>
+        <a:xfrm>
+          <a:off x="0" y="0"/>
+          <a:ext cx="0" cy="0"/>
+          <a:chOff x="0" y="0"/>
+          <a:chExt cx="0" cy="0"/>
+        </a:xfrm>
+      </p:grpSpPr>
+      <p:sp>
+        <p:nvSpPr>
+          <p:cNvPr id="2" name="Rubrik 1"/>
+          <p:cNvSpPr>
+            <a:spLocks noGrp="1"/>
+          </p:cNvSpPr>
+          <p:nvPr>
+            <p:ph type="title"/>
+          </p:nvPr>
+        </p:nvSpPr>
+        <p:spPr/>
+        <p:txBody>
+          <a:bodyPr/>
+          <a:lstStyle/>
+          <a:p>
+            <a:r>
+              <a:rPr lang="sv-SE" dirty="0"/>
               <a:t>Byggscript</a:t>
             </a:r>
           </a:p>
@@ -20285,7 +20699,7 @@
 </p:sld>
 </file>
 
-<file path=ppt/slides/slide34.xml><?xml version="1.0" encoding="utf-8"?>
+<file path=ppt/slides/slide35.xml><?xml version="1.0" encoding="utf-8"?>
 <p:sld xmlns:a="http://schemas.openxmlformats.org/drawingml/2006/main" xmlns:r="http://schemas.openxmlformats.org/officeDocument/2006/relationships" xmlns:p="http://schemas.openxmlformats.org/presentationml/2006/main">
   <p:cSld>
     <p:spTree>
@@ -20498,6 +20912,176 @@
 </file>
 
 <file path=ppt/slides/slide5.xml><?xml version="1.0" encoding="utf-8"?>
+<p:sld xmlns:a="http://schemas.openxmlformats.org/drawingml/2006/main" xmlns:r="http://schemas.openxmlformats.org/officeDocument/2006/relationships" xmlns:p="http://schemas.openxmlformats.org/presentationml/2006/main">
+  <p:cSld>
+    <p:spTree>
+      <p:nvGrpSpPr>
+        <p:cNvPr id="1" name=""/>
+        <p:cNvGrpSpPr/>
+        <p:nvPr/>
+      </p:nvGrpSpPr>
+      <p:grpSpPr>
+        <a:xfrm>
+          <a:off x="0" y="0"/>
+          <a:ext cx="0" cy="0"/>
+          <a:chOff x="0" y="0"/>
+          <a:chExt cx="0" cy="0"/>
+        </a:xfrm>
+      </p:grpSpPr>
+      <p:sp>
+        <p:nvSpPr>
+          <p:cNvPr id="2" name="Rubrik 1"/>
+          <p:cNvSpPr>
+            <a:spLocks noGrp="1"/>
+          </p:cNvSpPr>
+          <p:nvPr>
+            <p:ph type="title"/>
+          </p:nvPr>
+        </p:nvSpPr>
+        <p:spPr/>
+        <p:txBody>
+          <a:bodyPr/>
+          <a:lstStyle/>
+          <a:p>
+            <a:r>
+              <a:rPr lang="sv-SE" dirty="0"/>
+              <a:t>TDD-exempel: Karl Gustafsson</a:t>
+            </a:r>
+          </a:p>
+        </p:txBody>
+      </p:sp>
+      <p:sp>
+        <p:nvSpPr>
+          <p:cNvPr id="4" name="Platshållare för text 3"/>
+          <p:cNvSpPr>
+            <a:spLocks noGrp="1"/>
+          </p:cNvSpPr>
+          <p:nvPr>
+            <p:ph type="body" idx="1"/>
+          </p:nvPr>
+        </p:nvSpPr>
+        <p:spPr/>
+        <p:txBody>
+          <a:bodyPr/>
+          <a:lstStyle/>
+          <a:p>
+            <a:r>
+              <a:rPr lang="sv-SE" dirty="0" err="1"/>
+              <a:t>Testkod</a:t>
+            </a:r>
+            <a:endParaRPr lang="sv-SE" dirty="0"/>
+          </a:p>
+        </p:txBody>
+      </p:sp>
+      <p:pic>
+        <p:nvPicPr>
+          <p:cNvPr id="8" name="Content Placeholder 7" descr="A screenshot of a social media post&#10;&#10;Description automatically generated">
+            <a:extLst>
+              <a:ext uri="{FF2B5EF4-FFF2-40B4-BE49-F238E27FC236}">
+                <a16:creationId xmlns:a16="http://schemas.microsoft.com/office/drawing/2014/main" id="{095D9F5D-137E-4F55-B392-F84400881565}"/>
+              </a:ext>
+            </a:extLst>
+          </p:cNvPr>
+          <p:cNvPicPr>
+            <a:picLocks noGrp="1" noChangeAspect="1"/>
+          </p:cNvPicPr>
+          <p:nvPr>
+            <p:ph sz="half" idx="2"/>
+          </p:nvPr>
+        </p:nvPicPr>
+        <p:blipFill>
+          <a:blip r:embed="rId4">
+            <a:extLst>
+              <a:ext uri="{28A0092B-C50C-407E-A947-70E740481C1C}">
+                <a14:useLocalDpi xmlns:a14="http://schemas.microsoft.com/office/drawing/2010/main" val="0"/>
+              </a:ext>
+            </a:extLst>
+          </a:blip>
+          <a:stretch>
+            <a:fillRect/>
+          </a:stretch>
+        </p:blipFill>
+        <p:spPr>
+          <a:xfrm>
+            <a:off x="839788" y="2573997"/>
+            <a:ext cx="5157787" cy="3546744"/>
+          </a:xfrm>
+        </p:spPr>
+      </p:pic>
+      <p:sp>
+        <p:nvSpPr>
+          <p:cNvPr id="6" name="Platshållare för text 5"/>
+          <p:cNvSpPr>
+            <a:spLocks noGrp="1"/>
+          </p:cNvSpPr>
+          <p:nvPr>
+            <p:ph type="body" sz="quarter" idx="3"/>
+          </p:nvPr>
+        </p:nvSpPr>
+        <p:spPr/>
+        <p:txBody>
+          <a:bodyPr/>
+          <a:lstStyle/>
+          <a:p>
+            <a:r>
+              <a:rPr lang="sv-SE" dirty="0"/>
+              <a:t>Koden som testas</a:t>
+            </a:r>
+          </a:p>
+        </p:txBody>
+      </p:sp>
+      <p:pic>
+        <p:nvPicPr>
+          <p:cNvPr id="10" name="Content Placeholder 9" descr="A screenshot of a social media post&#10;&#10;Description automatically generated">
+            <a:extLst>
+              <a:ext uri="{FF2B5EF4-FFF2-40B4-BE49-F238E27FC236}">
+                <a16:creationId xmlns:a16="http://schemas.microsoft.com/office/drawing/2014/main" id="{B38AC717-5834-4097-8BCB-9AC1BA90CE45}"/>
+              </a:ext>
+            </a:extLst>
+          </p:cNvPr>
+          <p:cNvPicPr>
+            <a:picLocks noGrp="1" noChangeAspect="1"/>
+          </p:cNvPicPr>
+          <p:nvPr>
+            <p:ph sz="quarter" idx="4"/>
+          </p:nvPr>
+        </p:nvPicPr>
+        <p:blipFill>
+          <a:blip r:embed="rId5">
+            <a:extLst>
+              <a:ext uri="{28A0092B-C50C-407E-A947-70E740481C1C}">
+                <a14:useLocalDpi xmlns:a14="http://schemas.microsoft.com/office/drawing/2010/main" val="0"/>
+              </a:ext>
+            </a:extLst>
+          </a:blip>
+          <a:stretch>
+            <a:fillRect/>
+          </a:stretch>
+        </p:blipFill>
+        <p:spPr>
+          <a:xfrm>
+            <a:off x="6172200" y="3339855"/>
+            <a:ext cx="5183188" cy="1836982"/>
+          </a:xfrm>
+        </p:spPr>
+      </p:pic>
+    </p:spTree>
+    <p:custDataLst>
+      <p:tags r:id="rId1"/>
+    </p:custDataLst>
+    <p:extLst>
+      <p:ext uri="{BB962C8B-B14F-4D97-AF65-F5344CB8AC3E}">
+        <p14:creationId xmlns:p14="http://schemas.microsoft.com/office/powerpoint/2010/main" val="3180580350"/>
+      </p:ext>
+    </p:extLst>
+  </p:cSld>
+  <p:clrMapOvr>
+    <a:masterClrMapping/>
+  </p:clrMapOvr>
+</p:sld>
+</file>
+
+<file path=ppt/slides/slide6.xml><?xml version="1.0" encoding="utf-8"?>
 <p:sld xmlns:a="http://schemas.openxmlformats.org/drawingml/2006/main" xmlns:r="http://schemas.openxmlformats.org/officeDocument/2006/relationships" xmlns:p="http://schemas.openxmlformats.org/presentationml/2006/main">
   <p:cSld>
     <p:spTree>
@@ -20677,7 +21261,7 @@
 </p:sld>
 </file>
 
-<file path=ppt/slides/slide6.xml><?xml version="1.0" encoding="utf-8"?>
+<file path=ppt/slides/slide7.xml><?xml version="1.0" encoding="utf-8"?>
 <p:sld xmlns:a="http://schemas.openxmlformats.org/drawingml/2006/main" xmlns:r="http://schemas.openxmlformats.org/officeDocument/2006/relationships" xmlns:p="http://schemas.openxmlformats.org/presentationml/2006/main">
   <p:cSld>
     <p:spTree>
@@ -20857,7 +21441,7 @@
 </p:sld>
 </file>
 
-<file path=ppt/slides/slide7.xml><?xml version="1.0" encoding="utf-8"?>
+<file path=ppt/slides/slide8.xml><?xml version="1.0" encoding="utf-8"?>
 <p:sld xmlns:a="http://schemas.openxmlformats.org/drawingml/2006/main" xmlns:r="http://schemas.openxmlformats.org/officeDocument/2006/relationships" xmlns:p="http://schemas.openxmlformats.org/presentationml/2006/main">
   <p:cSld>
     <p:spTree>
@@ -21025,7 +21609,7 @@
 </p:sld>
 </file>
 
-<file path=ppt/slides/slide8.xml><?xml version="1.0" encoding="utf-8"?>
+<file path=ppt/slides/slide9.xml><?xml version="1.0" encoding="utf-8"?>
 <p:sld xmlns:a="http://schemas.openxmlformats.org/drawingml/2006/main" xmlns:r="http://schemas.openxmlformats.org/officeDocument/2006/relationships" xmlns:p="http://schemas.openxmlformats.org/presentationml/2006/main">
   <p:cSld>
     <p:spTree>
@@ -21184,174 +21768,6 @@
     <p:extLst>
       <p:ext uri="{BB962C8B-B14F-4D97-AF65-F5344CB8AC3E}">
         <p14:creationId xmlns:p14="http://schemas.microsoft.com/office/powerpoint/2010/main" val="2171053083"/>
-      </p:ext>
-    </p:extLst>
-  </p:cSld>
-  <p:clrMapOvr>
-    <a:masterClrMapping/>
-  </p:clrMapOvr>
-</p:sld>
-</file>
-
-<file path=ppt/slides/slide9.xml><?xml version="1.0" encoding="utf-8"?>
-<p:sld xmlns:a="http://schemas.openxmlformats.org/drawingml/2006/main" xmlns:r="http://schemas.openxmlformats.org/officeDocument/2006/relationships" xmlns:p="http://schemas.openxmlformats.org/presentationml/2006/main">
-  <p:cSld>
-    <p:spTree>
-      <p:nvGrpSpPr>
-        <p:cNvPr id="1" name=""/>
-        <p:cNvGrpSpPr/>
-        <p:nvPr/>
-      </p:nvGrpSpPr>
-      <p:grpSpPr>
-        <a:xfrm>
-          <a:off x="0" y="0"/>
-          <a:ext cx="0" cy="0"/>
-          <a:chOff x="0" y="0"/>
-          <a:chExt cx="0" cy="0"/>
-        </a:xfrm>
-      </p:grpSpPr>
-      <p:sp>
-        <p:nvSpPr>
-          <p:cNvPr id="2" name="Rubrik 1"/>
-          <p:cNvSpPr>
-            <a:spLocks noGrp="1"/>
-          </p:cNvSpPr>
-          <p:nvPr>
-            <p:ph type="title"/>
-          </p:nvPr>
-        </p:nvSpPr>
-        <p:spPr/>
-        <p:txBody>
-          <a:bodyPr/>
-          <a:lstStyle/>
-          <a:p>
-            <a:r>
-              <a:rPr lang="sv-SE" dirty="0" err="1"/>
-              <a:t>TDD-exempel:Bjargey</a:t>
-            </a:r>
-            <a:r>
-              <a:rPr lang="sv-SE" dirty="0"/>
-              <a:t> Ingólfsdóttir</a:t>
-            </a:r>
-          </a:p>
-        </p:txBody>
-      </p:sp>
-      <p:sp>
-        <p:nvSpPr>
-          <p:cNvPr id="4" name="Platshållare för text 3"/>
-          <p:cNvSpPr>
-            <a:spLocks noGrp="1"/>
-          </p:cNvSpPr>
-          <p:nvPr>
-            <p:ph type="body" idx="1"/>
-          </p:nvPr>
-        </p:nvSpPr>
-        <p:spPr/>
-        <p:txBody>
-          <a:bodyPr/>
-          <a:lstStyle/>
-          <a:p>
-            <a:r>
-              <a:rPr lang="sv-SE" dirty="0" err="1"/>
-              <a:t>Testkod</a:t>
-            </a:r>
-            <a:endParaRPr lang="sv-SE" dirty="0"/>
-          </a:p>
-        </p:txBody>
-      </p:sp>
-      <p:sp>
-        <p:nvSpPr>
-          <p:cNvPr id="6" name="Platshållare för text 5"/>
-          <p:cNvSpPr>
-            <a:spLocks noGrp="1"/>
-          </p:cNvSpPr>
-          <p:nvPr>
-            <p:ph type="body" sz="quarter" idx="3"/>
-          </p:nvPr>
-        </p:nvSpPr>
-        <p:spPr/>
-        <p:txBody>
-          <a:bodyPr/>
-          <a:lstStyle/>
-          <a:p>
-            <a:r>
-              <a:rPr lang="sv-SE" dirty="0"/>
-              <a:t>Koden som testas</a:t>
-            </a:r>
-          </a:p>
-        </p:txBody>
-      </p:sp>
-      <p:pic>
-        <p:nvPicPr>
-          <p:cNvPr id="8" name="Platshållare för innehåll 7">
-            <a:extLst>
-              <a:ext uri="{FF2B5EF4-FFF2-40B4-BE49-F238E27FC236}">
-                <a16:creationId xmlns:a16="http://schemas.microsoft.com/office/drawing/2014/main" id="{7E580B70-D670-41FA-8638-4B66A1929055}"/>
-              </a:ext>
-            </a:extLst>
-          </p:cNvPr>
-          <p:cNvPicPr>
-            <a:picLocks noGrp="1" noChangeAspect="1"/>
-          </p:cNvPicPr>
-          <p:nvPr>
-            <p:ph sz="quarter" idx="4"/>
-          </p:nvPr>
-        </p:nvPicPr>
-        <p:blipFill>
-          <a:blip r:embed="rId4"/>
-          <a:stretch>
-            <a:fillRect/>
-          </a:stretch>
-        </p:blipFill>
-        <p:spPr>
-          <a:xfrm>
-            <a:off x="6831956" y="3835904"/>
-            <a:ext cx="5094189" cy="823912"/>
-          </a:xfrm>
-          <a:prstGeom prst="rect">
-            <a:avLst/>
-          </a:prstGeom>
-        </p:spPr>
-      </p:pic>
-      <p:pic>
-        <p:nvPicPr>
-          <p:cNvPr id="11" name="Platshållare för innehåll 10">
-            <a:extLst>
-              <a:ext uri="{FF2B5EF4-FFF2-40B4-BE49-F238E27FC236}">
-                <a16:creationId xmlns:a16="http://schemas.microsoft.com/office/drawing/2014/main" id="{4F938606-BFA6-4E62-A54C-85983F8E5D56}"/>
-              </a:ext>
-            </a:extLst>
-          </p:cNvPr>
-          <p:cNvPicPr>
-            <a:picLocks noGrp="1" noChangeAspect="1"/>
-          </p:cNvPicPr>
-          <p:nvPr>
-            <p:ph sz="half" idx="2"/>
-          </p:nvPr>
-        </p:nvPicPr>
-        <p:blipFill>
-          <a:blip r:embed="rId5"/>
-          <a:stretch>
-            <a:fillRect/>
-          </a:stretch>
-        </p:blipFill>
-        <p:spPr>
-          <a:xfrm>
-            <a:off x="140834" y="3289738"/>
-            <a:ext cx="5856742" cy="1889737"/>
-          </a:xfrm>
-          <a:prstGeom prst="rect">
-            <a:avLst/>
-          </a:prstGeom>
-        </p:spPr>
-      </p:pic>
-    </p:spTree>
-    <p:custDataLst>
-      <p:tags r:id="rId1"/>
-    </p:custDataLst>
-    <p:extLst>
-      <p:ext uri="{BB962C8B-B14F-4D97-AF65-F5344CB8AC3E}">
-        <p14:creationId xmlns:p14="http://schemas.microsoft.com/office/powerpoint/2010/main" val="4061453420"/>
       </p:ext>
     </p:extLst>
   </p:cSld>
@@ -21531,6 +21947,12 @@
 </file>
 
 <file path=ppt/tags/tag35.xml><?xml version="1.0" encoding="utf-8"?>
+<p:tagLst xmlns:a="http://schemas.openxmlformats.org/drawingml/2006/main" xmlns:r="http://schemas.openxmlformats.org/officeDocument/2006/relationships" xmlns:p="http://schemas.openxmlformats.org/presentationml/2006/main">
+  <p:tag name="ARTICULATE_SLIDE_THUMBNAIL_REFRESH" val="1"/>
+</p:tagLst>
+</file>
+
+<file path=ppt/tags/tag36.xml><?xml version="1.0" encoding="utf-8"?>
 <p:tagLst xmlns:a="http://schemas.openxmlformats.org/drawingml/2006/main" xmlns:r="http://schemas.openxmlformats.org/officeDocument/2006/relationships" xmlns:p="http://schemas.openxmlformats.org/presentationml/2006/main">
   <p:tag name="ARTICULATE_SLIDE_THUMBNAIL_REFRESH" val="1"/>
 </p:tagLst>

</xml_diff>

<commit_message>
added slides about the inspection
</commit_message>
<xml_diff>
--- a/slutredovisning.pptx
+++ b/slutredovisning.pptx
@@ -34,9 +34,9 @@
     <p:sldId id="270" r:id="rId25"/>
     <p:sldId id="272" r:id="rId26"/>
     <p:sldId id="271" r:id="rId27"/>
-    <p:sldId id="273" r:id="rId28"/>
-    <p:sldId id="274" r:id="rId29"/>
-    <p:sldId id="275" r:id="rId30"/>
+    <p:sldId id="293" r:id="rId28"/>
+    <p:sldId id="294" r:id="rId29"/>
+    <p:sldId id="295" r:id="rId30"/>
     <p:sldId id="276" r:id="rId31"/>
     <p:sldId id="277" r:id="rId32"/>
     <p:sldId id="278" r:id="rId33"/>
@@ -234,7 +234,7 @@
           <a:p>
             <a:fld id="{78657D70-8167-4127-866D-BAA56A2DFFEF}" type="datetimeFigureOut">
               <a:rPr lang="sv-SE" smtClean="0"/>
-              <a:t>2019-10-30</a:t>
+              <a:t>2019-10-31</a:t>
             </a:fld>
             <a:endParaRPr lang="sv-SE"/>
           </a:p>
@@ -2859,7 +2859,7 @@
               <a:defRPr/>
             </a:pPr>
             <a:r>
-              <a:rPr lang="sv-SE" sz="1200" kern="1200" dirty="0">
+              <a:rPr lang="sv-SE" sz="1200" kern="1200" dirty="0" smtClean="0">
                 <a:solidFill>
                   <a:schemeClr val="tx1"/>
                 </a:solidFill>
@@ -2871,7 +2871,7 @@
               <a:t>En kort presentation av den del av koden ni valt ut för att göra en formell granskning av och processen ni använt er av inklusive eventuella checklistor, scenarier, </a:t>
             </a:r>
             <a:r>
-              <a:rPr lang="sv-SE" sz="1200" kern="1200" dirty="0" err="1">
+              <a:rPr lang="sv-SE" sz="1200" kern="1200" dirty="0" err="1" smtClean="0">
                 <a:solidFill>
                   <a:schemeClr val="tx1"/>
                 </a:solidFill>
@@ -2883,7 +2883,7 @@
               <a:t>edyl</a:t>
             </a:r>
             <a:r>
-              <a:rPr lang="sv-SE" sz="1200" kern="1200" dirty="0">
+              <a:rPr lang="sv-SE" sz="1200" kern="1200" dirty="0" smtClean="0">
                 <a:solidFill>
                   <a:schemeClr val="tx1"/>
                 </a:solidFill>
@@ -2926,7 +2926,7 @@
     </p:spTree>
     <p:extLst>
       <p:ext uri="{BB962C8B-B14F-4D97-AF65-F5344CB8AC3E}">
-        <p14:creationId xmlns:p14="http://schemas.microsoft.com/office/powerpoint/2010/main" val="1836920504"/>
+        <p14:creationId xmlns:p14="http://schemas.microsoft.com/office/powerpoint/2010/main" val="1402935123"/>
       </p:ext>
     </p:extLst>
   </p:cSld>
@@ -2998,7 +2998,7 @@
               <a:defRPr/>
             </a:pPr>
             <a:r>
-              <a:rPr lang="sv-SE" sz="1200" kern="1200" dirty="0">
+              <a:rPr lang="sv-SE" sz="1200" kern="1200" dirty="0" smtClean="0">
                 <a:solidFill>
                   <a:schemeClr val="tx1"/>
                 </a:solidFill>
@@ -3041,7 +3041,7 @@
     </p:spTree>
     <p:extLst>
       <p:ext uri="{BB962C8B-B14F-4D97-AF65-F5344CB8AC3E}">
-        <p14:creationId xmlns:p14="http://schemas.microsoft.com/office/powerpoint/2010/main" val="1645734220"/>
+        <p14:creationId xmlns:p14="http://schemas.microsoft.com/office/powerpoint/2010/main" val="4003170347"/>
       </p:ext>
     </p:extLst>
   </p:cSld>
@@ -3113,7 +3113,7 @@
               <a:defRPr/>
             </a:pPr>
             <a:r>
-              <a:rPr lang="sv-SE" sz="1200" kern="1200" dirty="0">
+              <a:rPr lang="sv-SE" sz="1200" kern="1200" dirty="0" smtClean="0">
                 <a:solidFill>
                   <a:schemeClr val="tx1"/>
                 </a:solidFill>
@@ -3125,7 +3125,7 @@
               <a:t>En diskussion om vilka era erfarenheter ni dragit av att tillämpa granskning. Det finns inget rätt eller fel här. Enda sättet att bli underkända är att bara fuska över punkten och bara säga något pliktskyldigt. Ni förväntas förhålla er till såväl kursböckerna som utdelat material och IEEE </a:t>
             </a:r>
             <a:r>
-              <a:rPr lang="sv-SE" sz="1200" kern="1200" dirty="0" err="1">
+              <a:rPr lang="sv-SE" sz="1200" kern="1200" dirty="0" err="1" smtClean="0">
                 <a:solidFill>
                   <a:schemeClr val="tx1"/>
                 </a:solidFill>
@@ -3137,7 +3137,7 @@
               <a:t>Std</a:t>
             </a:r>
             <a:r>
-              <a:rPr lang="sv-SE" sz="1200" kern="1200" dirty="0">
+              <a:rPr lang="sv-SE" sz="1200" kern="1200" dirty="0" smtClean="0">
                 <a:solidFill>
                   <a:schemeClr val="tx1"/>
                 </a:solidFill>
@@ -3180,7 +3180,7 @@
     </p:spTree>
     <p:extLst>
       <p:ext uri="{BB962C8B-B14F-4D97-AF65-F5344CB8AC3E}">
-        <p14:creationId xmlns:p14="http://schemas.microsoft.com/office/powerpoint/2010/main" val="393491449"/>
+        <p14:creationId xmlns:p14="http://schemas.microsoft.com/office/powerpoint/2010/main" val="3774513394"/>
       </p:ext>
     </p:extLst>
   </p:cSld>
@@ -5122,7 +5122,7 @@
           <a:p>
             <a:fld id="{B4C653A3-D7FF-4AF7-943B-34A467C3139E}" type="datetimeFigureOut">
               <a:rPr lang="sv-SE" smtClean="0"/>
-              <a:t>2019-10-30</a:t>
+              <a:t>2019-10-31</a:t>
             </a:fld>
             <a:endParaRPr lang="sv-SE"/>
           </a:p>
@@ -5290,7 +5290,7 @@
           <a:p>
             <a:fld id="{B4C653A3-D7FF-4AF7-943B-34A467C3139E}" type="datetimeFigureOut">
               <a:rPr lang="sv-SE" smtClean="0"/>
-              <a:t>2019-10-30</a:t>
+              <a:t>2019-10-31</a:t>
             </a:fld>
             <a:endParaRPr lang="sv-SE"/>
           </a:p>
@@ -5468,7 +5468,7 @@
           <a:p>
             <a:fld id="{B4C653A3-D7FF-4AF7-943B-34A467C3139E}" type="datetimeFigureOut">
               <a:rPr lang="sv-SE" smtClean="0"/>
-              <a:t>2019-10-30</a:t>
+              <a:t>2019-10-31</a:t>
             </a:fld>
             <a:endParaRPr lang="sv-SE"/>
           </a:p>
@@ -5636,7 +5636,7 @@
           <a:p>
             <a:fld id="{B4C653A3-D7FF-4AF7-943B-34A467C3139E}" type="datetimeFigureOut">
               <a:rPr lang="sv-SE" smtClean="0"/>
-              <a:t>2019-10-30</a:t>
+              <a:t>2019-10-31</a:t>
             </a:fld>
             <a:endParaRPr lang="sv-SE"/>
           </a:p>
@@ -5881,7 +5881,7 @@
           <a:p>
             <a:fld id="{B4C653A3-D7FF-4AF7-943B-34A467C3139E}" type="datetimeFigureOut">
               <a:rPr lang="sv-SE" smtClean="0"/>
-              <a:t>2019-10-30</a:t>
+              <a:t>2019-10-31</a:t>
             </a:fld>
             <a:endParaRPr lang="sv-SE"/>
           </a:p>
@@ -6110,7 +6110,7 @@
           <a:p>
             <a:fld id="{B4C653A3-D7FF-4AF7-943B-34A467C3139E}" type="datetimeFigureOut">
               <a:rPr lang="sv-SE" smtClean="0"/>
-              <a:t>2019-10-30</a:t>
+              <a:t>2019-10-31</a:t>
             </a:fld>
             <a:endParaRPr lang="sv-SE"/>
           </a:p>
@@ -6474,7 +6474,7 @@
           <a:p>
             <a:fld id="{B4C653A3-D7FF-4AF7-943B-34A467C3139E}" type="datetimeFigureOut">
               <a:rPr lang="sv-SE" smtClean="0"/>
-              <a:t>2019-10-30</a:t>
+              <a:t>2019-10-31</a:t>
             </a:fld>
             <a:endParaRPr lang="sv-SE"/>
           </a:p>
@@ -6591,7 +6591,7 @@
           <a:p>
             <a:fld id="{B4C653A3-D7FF-4AF7-943B-34A467C3139E}" type="datetimeFigureOut">
               <a:rPr lang="sv-SE" smtClean="0"/>
-              <a:t>2019-10-30</a:t>
+              <a:t>2019-10-31</a:t>
             </a:fld>
             <a:endParaRPr lang="sv-SE"/>
           </a:p>
@@ -6686,7 +6686,7 @@
           <a:p>
             <a:fld id="{B4C653A3-D7FF-4AF7-943B-34A467C3139E}" type="datetimeFigureOut">
               <a:rPr lang="sv-SE" smtClean="0"/>
-              <a:t>2019-10-30</a:t>
+              <a:t>2019-10-31</a:t>
             </a:fld>
             <a:endParaRPr lang="sv-SE"/>
           </a:p>
@@ -6961,7 +6961,7 @@
           <a:p>
             <a:fld id="{B4C653A3-D7FF-4AF7-943B-34A467C3139E}" type="datetimeFigureOut">
               <a:rPr lang="sv-SE" smtClean="0"/>
-              <a:t>2019-10-30</a:t>
+              <a:t>2019-10-31</a:t>
             </a:fld>
             <a:endParaRPr lang="sv-SE"/>
           </a:p>
@@ -7213,7 +7213,7 @@
           <a:p>
             <a:fld id="{B4C653A3-D7FF-4AF7-943B-34A467C3139E}" type="datetimeFigureOut">
               <a:rPr lang="sv-SE" smtClean="0"/>
-              <a:t>2019-10-30</a:t>
+              <a:t>2019-10-31</a:t>
             </a:fld>
             <a:endParaRPr lang="sv-SE"/>
           </a:p>
@@ -7424,7 +7424,7 @@
           <a:p>
             <a:fld id="{B4C653A3-D7FF-4AF7-943B-34A467C3139E}" type="datetimeFigureOut">
               <a:rPr lang="sv-SE" smtClean="0"/>
-              <a:t>2019-10-30</a:t>
+              <a:t>2019-10-31</a:t>
             </a:fld>
             <a:endParaRPr lang="sv-SE"/>
           </a:p>
@@ -20066,9 +20066,10 @@
           <a:lstStyle/>
           <a:p>
             <a:r>
-              <a:rPr lang="sv-SE" dirty="0"/>
+              <a:rPr lang="sv-SE" dirty="0" smtClean="0"/>
               <a:t>Granskning</a:t>
             </a:r>
+            <a:endParaRPr lang="sv-SE" dirty="0"/>
           </a:p>
         </p:txBody>
       </p:sp>
@@ -20087,7 +20088,33 @@
           <a:bodyPr/>
           <a:lstStyle/>
           <a:p>
-            <a:endParaRPr lang="sv-SE"/>
+            <a:r>
+              <a:rPr lang="sv-SE" dirty="0" smtClean="0"/>
+              <a:t>Vi valde att granska metoden </a:t>
+            </a:r>
+            <a:r>
+              <a:rPr lang="sv-SE" dirty="0" err="1" smtClean="0"/>
+              <a:t>Effect</a:t>
+            </a:r>
+            <a:r>
+              <a:rPr lang="sv-SE" dirty="0" smtClean="0"/>
+              <a:t>, då den är den största metoden i programmet, samt innehåller en del </a:t>
+            </a:r>
+            <a:r>
+              <a:rPr lang="sv-SE" dirty="0" err="1" smtClean="0"/>
+              <a:t>if</a:t>
+            </a:r>
+            <a:r>
+              <a:rPr lang="sv-SE" dirty="0" smtClean="0"/>
+              <a:t>- och switch-satser. </a:t>
+            </a:r>
+          </a:p>
+          <a:p>
+            <a:r>
+              <a:rPr lang="sv-SE" dirty="0" smtClean="0"/>
+              <a:t>Då vi inte har ett färdigt program, är det svårt att göra en inspektion utifrån ett scenario, så vi valde att göra den utifrån en checklista. Vi utgick ifrån den checklista som använts i kursen och anpassade den till den kod vi skulle granska. </a:t>
+            </a:r>
+            <a:endParaRPr lang="sv-SE" dirty="0"/>
           </a:p>
         </p:txBody>
       </p:sp>
@@ -20097,7 +20124,7 @@
     </p:custDataLst>
     <p:extLst>
       <p:ext uri="{BB962C8B-B14F-4D97-AF65-F5344CB8AC3E}">
-        <p14:creationId xmlns:p14="http://schemas.microsoft.com/office/powerpoint/2010/main" val="3427005653"/>
+        <p14:creationId xmlns:p14="http://schemas.microsoft.com/office/powerpoint/2010/main" val="427268963"/>
       </p:ext>
     </p:extLst>
   </p:cSld>
@@ -20140,38 +20167,387 @@
           <a:lstStyle/>
           <a:p>
             <a:r>
-              <a:rPr lang="sv-SE" dirty="0"/>
+              <a:rPr lang="sv-SE" dirty="0" smtClean="0"/>
               <a:t>Granskningsrapport</a:t>
             </a:r>
+            <a:endParaRPr lang="sv-SE" dirty="0"/>
           </a:p>
         </p:txBody>
       </p:sp>
-      <p:sp>
-        <p:nvSpPr>
-          <p:cNvPr id="3" name="Platshållare för innehåll 2"/>
-          <p:cNvSpPr>
-            <a:spLocks noGrp="1"/>
-          </p:cNvSpPr>
+      <p:graphicFrame>
+        <p:nvGraphicFramePr>
+          <p:cNvPr id="4" name="Platshållare för innehåll 3"/>
+          <p:cNvGraphicFramePr>
+            <a:graphicFrameLocks noGrp="1"/>
+          </p:cNvGraphicFramePr>
           <p:nvPr>
             <p:ph idx="1"/>
           </p:nvPr>
-        </p:nvSpPr>
-        <p:spPr/>
-        <p:txBody>
-          <a:bodyPr/>
-          <a:lstStyle/>
-          <a:p>
-            <a:endParaRPr lang="sv-SE"/>
-          </a:p>
-        </p:txBody>
-      </p:sp>
+        </p:nvGraphicFramePr>
+        <p:xfrm>
+          <a:off x="838200" y="1825625"/>
+          <a:ext cx="10515600" cy="1854200"/>
+        </p:xfrm>
+        <a:graphic>
+          <a:graphicData uri="http://schemas.openxmlformats.org/drawingml/2006/table">
+            <a:tbl>
+              <a:tblPr firstRow="1" bandRow="1">
+                <a:tableStyleId>{5C22544A-7EE6-4342-B048-85BDC9FD1C3A}</a:tableStyleId>
+              </a:tblPr>
+              <a:tblGrid>
+                <a:gridCol w="7424451">
+                  <a:extLst>
+                    <a:ext uri="{9D8B030D-6E8A-4147-A177-3AD203B41FA5}">
+                      <a16:colId xmlns:a16="http://schemas.microsoft.com/office/drawing/2014/main" val="338078767"/>
+                    </a:ext>
+                  </a:extLst>
+                </a:gridCol>
+                <a:gridCol w="3091149">
+                  <a:extLst>
+                    <a:ext uri="{9D8B030D-6E8A-4147-A177-3AD203B41FA5}">
+                      <a16:colId xmlns:a16="http://schemas.microsoft.com/office/drawing/2014/main" val="249532832"/>
+                    </a:ext>
+                  </a:extLst>
+                </a:gridCol>
+              </a:tblGrid>
+              <a:tr h="370840">
+                <a:tc>
+                  <a:txBody>
+                    <a:bodyPr/>
+                    <a:lstStyle/>
+                    <a:p>
+                      <a:r>
+                        <a:rPr lang="sv-SE" dirty="0" smtClean="0"/>
+                        <a:t>Fel hittade i koden utifrån checklistan </a:t>
+                      </a:r>
+                      <a:endParaRPr lang="sv-SE" dirty="0"/>
+                    </a:p>
+                  </a:txBody>
+                  <a:tcPr/>
+                </a:tc>
+                <a:tc>
+                  <a:txBody>
+                    <a:bodyPr/>
+                    <a:lstStyle/>
+                    <a:p>
+                      <a:r>
+                        <a:rPr lang="sv-SE" dirty="0" smtClean="0"/>
+                        <a:t>Bedömd</a:t>
+                      </a:r>
+                      <a:r>
+                        <a:rPr lang="sv-SE" baseline="0" dirty="0" smtClean="0"/>
+                        <a:t> </a:t>
+                      </a:r>
+                      <a:r>
+                        <a:rPr lang="sv-SE" dirty="0" smtClean="0"/>
+                        <a:t>nivå</a:t>
+                      </a:r>
+                      <a:endParaRPr lang="sv-SE" dirty="0"/>
+                    </a:p>
+                  </a:txBody>
+                  <a:tcPr/>
+                </a:tc>
+                <a:extLst>
+                  <a:ext uri="{0D108BD9-81ED-4DB2-BD59-A6C34878D82A}">
+                    <a16:rowId xmlns:a16="http://schemas.microsoft.com/office/drawing/2014/main" val="962685739"/>
+                  </a:ext>
+                </a:extLst>
+              </a:tr>
+              <a:tr h="370840">
+                <a:tc>
+                  <a:txBody>
+                    <a:bodyPr/>
+                    <a:lstStyle/>
+                    <a:p>
+                      <a:r>
+                        <a:rPr lang="sv-SE" dirty="0" err="1" smtClean="0"/>
+                        <a:t>Some</a:t>
+                      </a:r>
+                      <a:r>
+                        <a:rPr lang="sv-SE" baseline="0" dirty="0" smtClean="0"/>
+                        <a:t> </a:t>
+                      </a:r>
+                      <a:r>
+                        <a:rPr lang="sv-SE" baseline="0" dirty="0" err="1" smtClean="0"/>
+                        <a:t>methods</a:t>
+                      </a:r>
+                      <a:r>
+                        <a:rPr lang="sv-SE" baseline="0" dirty="0" smtClean="0"/>
+                        <a:t> </a:t>
+                      </a:r>
+                      <a:r>
+                        <a:rPr lang="sv-SE" baseline="0" dirty="0" err="1" smtClean="0"/>
+                        <a:t>could</a:t>
+                      </a:r>
+                      <a:r>
+                        <a:rPr lang="sv-SE" baseline="0" dirty="0" smtClean="0"/>
+                        <a:t> be </a:t>
+                      </a:r>
+                      <a:r>
+                        <a:rPr lang="sv-SE" baseline="0" dirty="0" err="1" smtClean="0"/>
+                        <a:t>further</a:t>
+                      </a:r>
+                      <a:r>
+                        <a:rPr lang="sv-SE" baseline="0" dirty="0" smtClean="0"/>
+                        <a:t> </a:t>
+                      </a:r>
+                      <a:r>
+                        <a:rPr lang="sv-SE" baseline="0" dirty="0" err="1" smtClean="0"/>
+                        <a:t>restricted</a:t>
+                      </a:r>
+                      <a:endParaRPr lang="sv-SE" dirty="0"/>
+                    </a:p>
+                  </a:txBody>
+                  <a:tcPr/>
+                </a:tc>
+                <a:tc>
+                  <a:txBody>
+                    <a:bodyPr/>
+                    <a:lstStyle/>
+                    <a:p>
+                      <a:r>
+                        <a:rPr lang="sv-SE" dirty="0" smtClean="0"/>
+                        <a:t>Minor</a:t>
+                      </a:r>
+                      <a:endParaRPr lang="sv-SE" dirty="0"/>
+                    </a:p>
+                  </a:txBody>
+                  <a:tcPr/>
+                </a:tc>
+                <a:extLst>
+                  <a:ext uri="{0D108BD9-81ED-4DB2-BD59-A6C34878D82A}">
+                    <a16:rowId xmlns:a16="http://schemas.microsoft.com/office/drawing/2014/main" val="4016213691"/>
+                  </a:ext>
+                </a:extLst>
+              </a:tr>
+              <a:tr h="370840">
+                <a:tc>
+                  <a:txBody>
+                    <a:bodyPr/>
+                    <a:lstStyle/>
+                    <a:p>
+                      <a:r>
+                        <a:rPr lang="sv-SE" baseline="0" dirty="0" err="1" smtClean="0"/>
+                        <a:t>One</a:t>
+                      </a:r>
+                      <a:r>
+                        <a:rPr lang="sv-SE" baseline="0" dirty="0" smtClean="0"/>
+                        <a:t> </a:t>
+                      </a:r>
+                      <a:r>
+                        <a:rPr lang="sv-SE" baseline="0" dirty="0" err="1" smtClean="0"/>
+                        <a:t>method</a:t>
+                      </a:r>
+                      <a:r>
+                        <a:rPr lang="sv-SE" baseline="0" dirty="0" smtClean="0"/>
+                        <a:t> </a:t>
+                      </a:r>
+                      <a:r>
+                        <a:rPr lang="sv-SE" baseline="0" dirty="0" err="1" smtClean="0"/>
+                        <a:t>doesn’t</a:t>
+                      </a:r>
+                      <a:r>
+                        <a:rPr lang="sv-SE" baseline="0" dirty="0" smtClean="0"/>
+                        <a:t> check </a:t>
+                      </a:r>
+                      <a:r>
+                        <a:rPr lang="sv-SE" baseline="0" dirty="0" err="1" smtClean="0"/>
+                        <a:t>if</a:t>
+                      </a:r>
+                      <a:r>
+                        <a:rPr lang="sv-SE" baseline="0" dirty="0" smtClean="0"/>
+                        <a:t> </a:t>
+                      </a:r>
+                      <a:r>
+                        <a:rPr lang="sv-SE" baseline="0" dirty="0" err="1" smtClean="0"/>
+                        <a:t>method</a:t>
+                      </a:r>
+                      <a:r>
+                        <a:rPr lang="sv-SE" baseline="0" dirty="0" smtClean="0"/>
+                        <a:t> parameter ”</a:t>
+                      </a:r>
+                      <a:r>
+                        <a:rPr lang="sv-SE" baseline="0" dirty="0" err="1" smtClean="0"/>
+                        <a:t>target</a:t>
+                      </a:r>
+                      <a:r>
+                        <a:rPr lang="sv-SE" baseline="0" dirty="0" smtClean="0"/>
+                        <a:t>” is </a:t>
+                      </a:r>
+                      <a:r>
+                        <a:rPr lang="sv-SE" baseline="0" dirty="0" err="1" smtClean="0"/>
+                        <a:t>null</a:t>
+                      </a:r>
+                      <a:endParaRPr lang="sv-SE" baseline="0" dirty="0" smtClean="0"/>
+                    </a:p>
+                  </a:txBody>
+                  <a:tcPr/>
+                </a:tc>
+                <a:tc>
+                  <a:txBody>
+                    <a:bodyPr/>
+                    <a:lstStyle/>
+                    <a:p>
+                      <a:r>
+                        <a:rPr lang="sv-SE" dirty="0" smtClean="0"/>
+                        <a:t>Minor</a:t>
+                      </a:r>
+                      <a:endParaRPr lang="sv-SE" dirty="0"/>
+                    </a:p>
+                  </a:txBody>
+                  <a:tcPr/>
+                </a:tc>
+                <a:extLst>
+                  <a:ext uri="{0D108BD9-81ED-4DB2-BD59-A6C34878D82A}">
+                    <a16:rowId xmlns:a16="http://schemas.microsoft.com/office/drawing/2014/main" val="3518260526"/>
+                  </a:ext>
+                </a:extLst>
+              </a:tr>
+              <a:tr h="370840">
+                <a:tc>
+                  <a:txBody>
+                    <a:bodyPr/>
+                    <a:lstStyle/>
+                    <a:p>
+                      <a:r>
+                        <a:rPr lang="sv-SE" dirty="0" smtClean="0"/>
+                        <a:t>No </a:t>
+                      </a:r>
+                      <a:r>
+                        <a:rPr lang="sv-SE" dirty="0" err="1" smtClean="0"/>
+                        <a:t>comments</a:t>
+                      </a:r>
+                      <a:r>
+                        <a:rPr lang="sv-SE" dirty="0" smtClean="0"/>
+                        <a:t> </a:t>
+                      </a:r>
+                      <a:r>
+                        <a:rPr lang="sv-SE" dirty="0" err="1" smtClean="0"/>
+                        <a:t>when</a:t>
+                      </a:r>
+                      <a:r>
+                        <a:rPr lang="sv-SE" dirty="0" smtClean="0"/>
+                        <a:t> break </a:t>
+                      </a:r>
+                      <a:r>
+                        <a:rPr lang="sv-SE" dirty="0" err="1" smtClean="0"/>
+                        <a:t>isn’t</a:t>
+                      </a:r>
+                      <a:r>
+                        <a:rPr lang="sv-SE" dirty="0" smtClean="0"/>
+                        <a:t> </a:t>
+                      </a:r>
+                      <a:r>
+                        <a:rPr lang="sv-SE" dirty="0" err="1" smtClean="0"/>
+                        <a:t>used</a:t>
+                      </a:r>
+                      <a:r>
+                        <a:rPr lang="sv-SE" dirty="0" smtClean="0"/>
+                        <a:t> in switch</a:t>
+                      </a:r>
+                      <a:r>
+                        <a:rPr lang="sv-SE" baseline="0" dirty="0" smtClean="0"/>
+                        <a:t> </a:t>
+                      </a:r>
+                      <a:r>
+                        <a:rPr lang="sv-SE" baseline="0" dirty="0" err="1" smtClean="0"/>
+                        <a:t>statements</a:t>
+                      </a:r>
+                      <a:endParaRPr lang="sv-SE" dirty="0"/>
+                    </a:p>
+                  </a:txBody>
+                  <a:tcPr/>
+                </a:tc>
+                <a:tc>
+                  <a:txBody>
+                    <a:bodyPr/>
+                    <a:lstStyle/>
+                    <a:p>
+                      <a:r>
+                        <a:rPr lang="sv-SE" dirty="0" smtClean="0"/>
+                        <a:t>Minor</a:t>
+                      </a:r>
+                      <a:endParaRPr lang="sv-SE" dirty="0"/>
+                    </a:p>
+                  </a:txBody>
+                  <a:tcPr/>
+                </a:tc>
+                <a:extLst>
+                  <a:ext uri="{0D108BD9-81ED-4DB2-BD59-A6C34878D82A}">
+                    <a16:rowId xmlns:a16="http://schemas.microsoft.com/office/drawing/2014/main" val="2707699792"/>
+                  </a:ext>
+                </a:extLst>
+              </a:tr>
+              <a:tr h="370840">
+                <a:tc>
+                  <a:txBody>
+                    <a:bodyPr/>
+                    <a:lstStyle/>
+                    <a:p>
+                      <a:r>
+                        <a:rPr lang="sv-SE" dirty="0" smtClean="0"/>
+                        <a:t>5 </a:t>
+                      </a:r>
+                      <a:r>
+                        <a:rPr lang="sv-SE" dirty="0" err="1" smtClean="0"/>
+                        <a:t>lines</a:t>
+                      </a:r>
+                      <a:r>
+                        <a:rPr lang="sv-SE" dirty="0" smtClean="0"/>
+                        <a:t> </a:t>
+                      </a:r>
+                      <a:r>
+                        <a:rPr lang="sv-SE" dirty="0" err="1" smtClean="0"/>
+                        <a:t>are</a:t>
+                      </a:r>
+                      <a:r>
+                        <a:rPr lang="sv-SE" baseline="0" dirty="0" smtClean="0"/>
+                        <a:t> </a:t>
+                      </a:r>
+                      <a:r>
+                        <a:rPr lang="sv-SE" baseline="0" dirty="0" err="1" smtClean="0"/>
+                        <a:t>too</a:t>
+                      </a:r>
+                      <a:r>
+                        <a:rPr lang="sv-SE" baseline="0" dirty="0" smtClean="0"/>
+                        <a:t> long</a:t>
+                      </a:r>
+                      <a:endParaRPr lang="sv-SE" dirty="0"/>
+                    </a:p>
+                  </a:txBody>
+                  <a:tcPr/>
+                </a:tc>
+                <a:tc>
+                  <a:txBody>
+                    <a:bodyPr/>
+                    <a:lstStyle/>
+                    <a:p>
+                      <a:r>
+                        <a:rPr lang="sv-SE" dirty="0" smtClean="0"/>
+                        <a:t>Minor</a:t>
+                      </a:r>
+                      <a:endParaRPr lang="sv-SE" dirty="0"/>
+                    </a:p>
+                  </a:txBody>
+                  <a:tcPr/>
+                </a:tc>
+                <a:extLst>
+                  <a:ext uri="{0D108BD9-81ED-4DB2-BD59-A6C34878D82A}">
+                    <a16:rowId xmlns:a16="http://schemas.microsoft.com/office/drawing/2014/main" val="1406746979"/>
+                  </a:ext>
+                </a:extLst>
+              </a:tr>
+            </a:tbl>
+          </a:graphicData>
+        </a:graphic>
+      </p:graphicFrame>
     </p:spTree>
     <p:custDataLst>
       <p:tags r:id="rId1"/>
     </p:custDataLst>
     <p:extLst>
       <p:ext uri="{BB962C8B-B14F-4D97-AF65-F5344CB8AC3E}">
-        <p14:creationId xmlns:p14="http://schemas.microsoft.com/office/powerpoint/2010/main" val="3874197174"/>
+        <p14:creationId xmlns:p14="http://schemas.microsoft.com/office/powerpoint/2010/main" val="3507758360"/>
       </p:ext>
     </p:extLst>
   </p:cSld>
@@ -20214,9 +20590,10 @@
           <a:lstStyle/>
           <a:p>
             <a:r>
-              <a:rPr lang="sv-SE" dirty="0"/>
+              <a:rPr lang="sv-SE" dirty="0" smtClean="0"/>
               <a:t>Erfarenheter av granskning</a:t>
             </a:r>
+            <a:endParaRPr lang="sv-SE" dirty="0"/>
           </a:p>
         </p:txBody>
       </p:sp>
@@ -20235,7 +20612,21 @@
           <a:bodyPr/>
           <a:lstStyle/>
           <a:p>
-            <a:endParaRPr lang="sv-SE"/>
+            <a:r>
+              <a:rPr lang="sv-SE" dirty="0" smtClean="0"/>
+              <a:t>Vi anser att det är bättre med informell granskning när det gäller kod av denna storlek och på denn</a:t>
+            </a:r>
+            <a:r>
+              <a:rPr lang="sv-SE" dirty="0" smtClean="0"/>
+              <a:t>a nivå. </a:t>
+            </a:r>
+          </a:p>
+          <a:p>
+            <a:r>
+              <a:rPr lang="sv-SE" dirty="0" smtClean="0"/>
+              <a:t>Det bästa med inspektionen var att man fick en idé om vilka saker man själv behöver tänka på i framtiden. Möjligtvis att man gör en egen lista med saker man har svårt med eller brukar missa, så att man själv kan hålla koll på att man kodar på ett bra sätt och får bra vanor. </a:t>
+            </a:r>
+            <a:endParaRPr lang="sv-SE" dirty="0"/>
           </a:p>
         </p:txBody>
       </p:sp>
@@ -20245,7 +20636,7 @@
     </p:custDataLst>
     <p:extLst>
       <p:ext uri="{BB962C8B-B14F-4D97-AF65-F5344CB8AC3E}">
-        <p14:creationId xmlns:p14="http://schemas.microsoft.com/office/powerpoint/2010/main" val="724679724"/>
+        <p14:creationId xmlns:p14="http://schemas.microsoft.com/office/powerpoint/2010/main" val="3676843999"/>
       </p:ext>
     </p:extLst>
   </p:cSld>

</xml_diff>

<commit_message>
slides with beslutsträd removed
</commit_message>
<xml_diff>
--- a/slutredovisning.pptx
+++ b/slutredovisning.pptx
@@ -5,7 +5,7 @@
     <p:sldMasterId id="2147483648" r:id="rId1"/>
   </p:sldMasterIdLst>
   <p:notesMasterIdLst>
-    <p:notesMasterId r:id="rId37"/>
+    <p:notesMasterId r:id="rId33"/>
   </p:notesMasterIdLst>
   <p:sldIdLst>
     <p:sldId id="286" r:id="rId2"/>
@@ -30,24 +30,20 @@
     <p:sldId id="266" r:id="rId21"/>
     <p:sldId id="267" r:id="rId22"/>
     <p:sldId id="268" r:id="rId23"/>
-    <p:sldId id="269" r:id="rId24"/>
-    <p:sldId id="270" r:id="rId25"/>
-    <p:sldId id="272" r:id="rId26"/>
-    <p:sldId id="271" r:id="rId27"/>
-    <p:sldId id="293" r:id="rId28"/>
-    <p:sldId id="294" r:id="rId29"/>
-    <p:sldId id="295" r:id="rId30"/>
-    <p:sldId id="276" r:id="rId31"/>
-    <p:sldId id="277" r:id="rId32"/>
-    <p:sldId id="278" r:id="rId33"/>
-    <p:sldId id="279" r:id="rId34"/>
-    <p:sldId id="280" r:id="rId35"/>
-    <p:sldId id="281" r:id="rId36"/>
+    <p:sldId id="293" r:id="rId24"/>
+    <p:sldId id="294" r:id="rId25"/>
+    <p:sldId id="295" r:id="rId26"/>
+    <p:sldId id="276" r:id="rId27"/>
+    <p:sldId id="277" r:id="rId28"/>
+    <p:sldId id="278" r:id="rId29"/>
+    <p:sldId id="279" r:id="rId30"/>
+    <p:sldId id="280" r:id="rId31"/>
+    <p:sldId id="281" r:id="rId32"/>
   </p:sldIdLst>
   <p:sldSz cx="12192000" cy="6858000"/>
   <p:notesSz cx="6858000" cy="9144000"/>
   <p:custDataLst>
-    <p:tags r:id="rId38"/>
+    <p:tags r:id="rId34"/>
   </p:custDataLst>
   <p:defaultTextStyle>
     <a:defPPr>
@@ -2454,7 +2450,7 @@
               <a:defRPr/>
             </a:pPr>
             <a:r>
-              <a:rPr lang="sv-SE" sz="1200" kern="1200" dirty="0">
+              <a:rPr lang="sv-SE" sz="1200" kern="1200" dirty="0" smtClean="0">
                 <a:solidFill>
                   <a:schemeClr val="tx1"/>
                 </a:solidFill>
@@ -2463,7 +2459,31 @@
                 <a:ea typeface="+mn-ea"/>
                 <a:cs typeface="+mn-cs"/>
               </a:rPr>
-              <a:t>En kort textuell presentation av vad ni valt ut för att tillämpa beslutstabeller. Ni ska kort motivera valet, och ge tillräckligt med information för att det ska gå att bedöma er. Detta avsnitt och de följande ska finnas för samtliga delar ni tillämpat beslutstabeller på. Om ni inte tillämpat beslutstabeller tar ni bort dessa bilder.</a:t>
+              <a:t>En kort presentation av den del av koden ni valt ut för att göra en formell granskning av och processen ni använt er av inklusive eventuella checklistor, scenarier, </a:t>
+            </a:r>
+            <a:r>
+              <a:rPr lang="sv-SE" sz="1200" kern="1200" dirty="0" err="1" smtClean="0">
+                <a:solidFill>
+                  <a:schemeClr val="tx1"/>
+                </a:solidFill>
+                <a:effectLst/>
+                <a:latin typeface="+mn-lt"/>
+                <a:ea typeface="+mn-ea"/>
+                <a:cs typeface="+mn-cs"/>
+              </a:rPr>
+              <a:t>edyl</a:t>
+            </a:r>
+            <a:r>
+              <a:rPr lang="sv-SE" sz="1200" kern="1200" dirty="0" smtClean="0">
+                <a:solidFill>
+                  <a:schemeClr val="tx1"/>
+                </a:solidFill>
+                <a:effectLst/>
+                <a:latin typeface="+mn-lt"/>
+                <a:ea typeface="+mn-ea"/>
+                <a:cs typeface="+mn-cs"/>
+              </a:rPr>
+              <a:t>. Ni ska kort motivera valen, och ge tillräckligt med information för att det ska gå att bedöma er. </a:t>
             </a:r>
           </a:p>
           <a:p>
@@ -2497,7 +2517,7 @@
     </p:spTree>
     <p:extLst>
       <p:ext uri="{BB962C8B-B14F-4D97-AF65-F5344CB8AC3E}">
-        <p14:creationId xmlns:p14="http://schemas.microsoft.com/office/powerpoint/2010/main" val="504764227"/>
+        <p14:creationId xmlns:p14="http://schemas.microsoft.com/office/powerpoint/2010/main" val="1402935123"/>
       </p:ext>
     </p:extLst>
   </p:cSld>
@@ -2551,10 +2571,38 @@
           <a:bodyPr/>
           <a:lstStyle/>
           <a:p>
-            <a:r>
-              <a:rPr lang="sv-SE" dirty="0"/>
-              <a:t>Själva beslutstabellen</a:t>
-            </a:r>
+            <a:pPr marL="0" marR="0" lvl="0" indent="0" algn="l" defTabSz="914400" rtl="0" eaLnBrk="1" fontAlgn="auto" latinLnBrk="0" hangingPunct="1">
+              <a:lnSpc>
+                <a:spcPct val="100000"/>
+              </a:lnSpc>
+              <a:spcBef>
+                <a:spcPts val="0"/>
+              </a:spcBef>
+              <a:spcAft>
+                <a:spcPts val="0"/>
+              </a:spcAft>
+              <a:buClrTx/>
+              <a:buSzTx/>
+              <a:buFontTx/>
+              <a:buNone/>
+              <a:tabLst/>
+              <a:defRPr/>
+            </a:pPr>
+            <a:r>
+              <a:rPr lang="sv-SE" sz="1200" kern="1200" dirty="0" smtClean="0">
+                <a:solidFill>
+                  <a:schemeClr val="tx1"/>
+                </a:solidFill>
+                <a:effectLst/>
+                <a:latin typeface="+mn-lt"/>
+                <a:ea typeface="+mn-ea"/>
+                <a:cs typeface="+mn-cs"/>
+              </a:rPr>
+              <a:t>En lista över de påträffade felen och hur pass allvarliga ni bedömer dem.</a:t>
+            </a:r>
+          </a:p>
+          <a:p>
+            <a:endParaRPr lang="sv-SE" dirty="0"/>
           </a:p>
         </p:txBody>
       </p:sp>
@@ -2584,7 +2632,7 @@
     </p:spTree>
     <p:extLst>
       <p:ext uri="{BB962C8B-B14F-4D97-AF65-F5344CB8AC3E}">
-        <p14:creationId xmlns:p14="http://schemas.microsoft.com/office/powerpoint/2010/main" val="2646750995"/>
+        <p14:creationId xmlns:p14="http://schemas.microsoft.com/office/powerpoint/2010/main" val="4003170347"/>
       </p:ext>
     </p:extLst>
   </p:cSld>
@@ -2638,10 +2686,62 @@
           <a:bodyPr/>
           <a:lstStyle/>
           <a:p>
-            <a:r>
-              <a:rPr lang="sv-SE" dirty="0"/>
-              <a:t>Beslutsträdet om ni gjort ett sådant</a:t>
-            </a:r>
+            <a:pPr marL="0" marR="0" lvl="0" indent="0" algn="l" defTabSz="914400" rtl="0" eaLnBrk="1" fontAlgn="auto" latinLnBrk="0" hangingPunct="1">
+              <a:lnSpc>
+                <a:spcPct val="100000"/>
+              </a:lnSpc>
+              <a:spcBef>
+                <a:spcPts val="0"/>
+              </a:spcBef>
+              <a:spcAft>
+                <a:spcPts val="0"/>
+              </a:spcAft>
+              <a:buClrTx/>
+              <a:buSzTx/>
+              <a:buFontTx/>
+              <a:buNone/>
+              <a:tabLst/>
+              <a:defRPr/>
+            </a:pPr>
+            <a:r>
+              <a:rPr lang="sv-SE" sz="1200" kern="1200" dirty="0" smtClean="0">
+                <a:solidFill>
+                  <a:schemeClr val="tx1"/>
+                </a:solidFill>
+                <a:effectLst/>
+                <a:latin typeface="+mn-lt"/>
+                <a:ea typeface="+mn-ea"/>
+                <a:cs typeface="+mn-cs"/>
+              </a:rPr>
+              <a:t>En diskussion om vilka era erfarenheter ni dragit av att tillämpa granskning. Det finns inget rätt eller fel här. Enda sättet att bli underkända är att bara fuska över punkten och bara säga något pliktskyldigt. Ni förväntas förhålla er till såväl kursböckerna som utdelat material och IEEE </a:t>
+            </a:r>
+            <a:r>
+              <a:rPr lang="sv-SE" sz="1200" kern="1200" dirty="0" err="1" smtClean="0">
+                <a:solidFill>
+                  <a:schemeClr val="tx1"/>
+                </a:solidFill>
+                <a:effectLst/>
+                <a:latin typeface="+mn-lt"/>
+                <a:ea typeface="+mn-ea"/>
+                <a:cs typeface="+mn-cs"/>
+              </a:rPr>
+              <a:t>Std</a:t>
+            </a:r>
+            <a:r>
+              <a:rPr lang="sv-SE" sz="1200" kern="1200" dirty="0" smtClean="0">
+                <a:solidFill>
+                  <a:schemeClr val="tx1"/>
+                </a:solidFill>
+                <a:effectLst/>
+                <a:latin typeface="+mn-lt"/>
+                <a:ea typeface="+mn-ea"/>
+                <a:cs typeface="+mn-cs"/>
+              </a:rPr>
+              <a:t> 1028.</a:t>
+            </a:r>
+          </a:p>
+          <a:p>
+            <a:endParaRPr lang="sv-SE" dirty="0"/>
           </a:p>
         </p:txBody>
       </p:sp>
@@ -2671,7 +2771,7 @@
     </p:spTree>
     <p:extLst>
       <p:ext uri="{BB962C8B-B14F-4D97-AF65-F5344CB8AC3E}">
-        <p14:creationId xmlns:p14="http://schemas.microsoft.com/office/powerpoint/2010/main" val="1191027264"/>
+        <p14:creationId xmlns:p14="http://schemas.microsoft.com/office/powerpoint/2010/main" val="3774513394"/>
       </p:ext>
     </p:extLst>
   </p:cSld>
@@ -2752,9 +2852,8 @@
                 <a:ea typeface="+mn-ea"/>
                 <a:cs typeface="+mn-cs"/>
               </a:rPr>
-              <a:t>Testfallen som ni fått fram från beslutstabellen. Observera att vi inte vill ha någon kod här, utan bara en tydlig presentation av testfallen i någon lämplig tabellform. </a:t>
-            </a:r>
-            <a:endParaRPr lang="sv-SE" dirty="0"/>
+              <a:t>En presentation av de problem som hittats med hjälp av verktyg för statisk analys och en diskussion av dem enligt anvisningarna. Det räcker alltså inte med att bara lista problemen, ni måste förhålla er till dem också. Tänk också på att ni ska göra detta både på koden som den såg ut före granskningen och på koden efter att ni rättat det som kommit fram under granskningen.</a:t>
+            </a:r>
           </a:p>
           <a:p>
             <a:endParaRPr lang="sv-SE" dirty="0"/>
@@ -2787,7 +2886,7 @@
     </p:spTree>
     <p:extLst>
       <p:ext uri="{BB962C8B-B14F-4D97-AF65-F5344CB8AC3E}">
-        <p14:creationId xmlns:p14="http://schemas.microsoft.com/office/powerpoint/2010/main" val="586387250"/>
+        <p14:creationId xmlns:p14="http://schemas.microsoft.com/office/powerpoint/2010/main" val="1343433812"/>
       </p:ext>
     </p:extLst>
   </p:cSld>
@@ -2859,7 +2958,7 @@
               <a:defRPr/>
             </a:pPr>
             <a:r>
-              <a:rPr lang="sv-SE" sz="1200" kern="1200" dirty="0" smtClean="0">
+              <a:rPr lang="sv-SE" sz="1200" kern="1200" dirty="0">
                 <a:solidFill>
                   <a:schemeClr val="tx1"/>
                 </a:solidFill>
@@ -2868,31 +2967,7 @@
                 <a:ea typeface="+mn-ea"/>
                 <a:cs typeface="+mn-cs"/>
               </a:rPr>
-              <a:t>En kort presentation av den del av koden ni valt ut för att göra en formell granskning av och processen ni använt er av inklusive eventuella checklistor, scenarier, </a:t>
-            </a:r>
-            <a:r>
-              <a:rPr lang="sv-SE" sz="1200" kern="1200" dirty="0" err="1" smtClean="0">
-                <a:solidFill>
-                  <a:schemeClr val="tx1"/>
-                </a:solidFill>
-                <a:effectLst/>
-                <a:latin typeface="+mn-lt"/>
-                <a:ea typeface="+mn-ea"/>
-                <a:cs typeface="+mn-cs"/>
-              </a:rPr>
-              <a:t>edyl</a:t>
-            </a:r>
-            <a:r>
-              <a:rPr lang="sv-SE" sz="1200" kern="1200" dirty="0" smtClean="0">
-                <a:solidFill>
-                  <a:schemeClr val="tx1"/>
-                </a:solidFill>
-                <a:effectLst/>
-                <a:latin typeface="+mn-lt"/>
-                <a:ea typeface="+mn-ea"/>
-                <a:cs typeface="+mn-cs"/>
-              </a:rPr>
-              <a:t>. Ni ska kort motivera valen, och ge tillräckligt med information för att det ska gå att bedöma er. </a:t>
+              <a:t>En presentation och diskussion kring ett antal lämpliga statiska mått på koden. Att vi inte specificerar exakt vilka mått som ska tas upp beror på att olika verktyg har olika uppsättningar, men vi förväntar oss fler och mer intressanta mått än bara rena storleksmått som LOC, #klasser, #metoder, etc. Även här är det viktigt att förhållas sig till måtten, inte bara lista dem.</a:t>
             </a:r>
           </a:p>
           <a:p>
@@ -2926,7 +3001,7 @@
     </p:spTree>
     <p:extLst>
       <p:ext uri="{BB962C8B-B14F-4D97-AF65-F5344CB8AC3E}">
-        <p14:creationId xmlns:p14="http://schemas.microsoft.com/office/powerpoint/2010/main" val="1402935123"/>
+        <p14:creationId xmlns:p14="http://schemas.microsoft.com/office/powerpoint/2010/main" val="247082709"/>
       </p:ext>
     </p:extLst>
   </p:cSld>
@@ -2998,7 +3073,7 @@
               <a:defRPr/>
             </a:pPr>
             <a:r>
-              <a:rPr lang="sv-SE" sz="1200" kern="1200" dirty="0" smtClean="0">
+              <a:rPr lang="sv-SE" sz="1200" kern="1200" dirty="0">
                 <a:solidFill>
                   <a:schemeClr val="tx1"/>
                 </a:solidFill>
@@ -3007,7 +3082,7 @@
                 <a:ea typeface="+mn-ea"/>
                 <a:cs typeface="+mn-cs"/>
               </a:rPr>
-              <a:t>En lista över de påträffade felen och hur pass allvarliga ni bedömer dem.</a:t>
+              <a:t>En översikt över vilken täckningsgrad era testfall uppnått. Denna kan antagligen tas rakt av från verktyget ni använt för att mäta den. Om ni inte uppnått fullständig täckning så ska detta förklaras och motiveras.</a:t>
             </a:r>
           </a:p>
           <a:p>
@@ -3041,7 +3116,7 @@
     </p:spTree>
     <p:extLst>
       <p:ext uri="{BB962C8B-B14F-4D97-AF65-F5344CB8AC3E}">
-        <p14:creationId xmlns:p14="http://schemas.microsoft.com/office/powerpoint/2010/main" val="4003170347"/>
+        <p14:creationId xmlns:p14="http://schemas.microsoft.com/office/powerpoint/2010/main" val="169751880"/>
       </p:ext>
     </p:extLst>
   </p:cSld>
@@ -3113,7 +3188,7 @@
               <a:defRPr/>
             </a:pPr>
             <a:r>
-              <a:rPr lang="sv-SE" sz="1200" kern="1200" dirty="0" smtClean="0">
+              <a:rPr lang="sv-SE" sz="1200" kern="1200" dirty="0">
                 <a:solidFill>
                   <a:schemeClr val="tx1"/>
                 </a:solidFill>
@@ -3122,32 +3197,36 @@
                 <a:ea typeface="+mn-ea"/>
                 <a:cs typeface="+mn-cs"/>
               </a:rPr>
-              <a:t>En diskussion om vilka era erfarenheter ni dragit av att tillämpa granskning. Det finns inget rätt eller fel här. Enda sättet att bli underkända är att bara fuska över punkten och bara säga något pliktskyldigt. Ni förväntas förhålla er till såväl kursböckerna som utdelat material och IEEE </a:t>
-            </a:r>
-            <a:r>
-              <a:rPr lang="sv-SE" sz="1200" kern="1200" dirty="0" err="1" smtClean="0">
-                <a:solidFill>
-                  <a:schemeClr val="tx1"/>
-                </a:solidFill>
-                <a:effectLst/>
-                <a:latin typeface="+mn-lt"/>
-                <a:ea typeface="+mn-ea"/>
-                <a:cs typeface="+mn-cs"/>
-              </a:rPr>
-              <a:t>Std</a:t>
-            </a:r>
-            <a:r>
-              <a:rPr lang="sv-SE" sz="1200" kern="1200" dirty="0" smtClean="0">
-                <a:solidFill>
-                  <a:schemeClr val="tx1"/>
-                </a:solidFill>
-                <a:effectLst/>
-                <a:latin typeface="+mn-lt"/>
-                <a:ea typeface="+mn-ea"/>
-                <a:cs typeface="+mn-cs"/>
-              </a:rPr>
-              <a:t> 1028.</a:t>
-            </a:r>
+              <a:t>En kort presentation av hur ni gått tillväga för att testa koden med en profiler och vilka resultat ni fick fram. Även här är det viktigt att förhållas sig till måtten, inte bara presentera dem.</a:t>
+            </a:r>
+          </a:p>
+          <a:p>
+            <a:pPr marL="0" marR="0" lvl="0" indent="0" algn="l" defTabSz="914400" rtl="0" eaLnBrk="1" fontAlgn="auto" latinLnBrk="0" hangingPunct="1">
+              <a:lnSpc>
+                <a:spcPct val="100000"/>
+              </a:lnSpc>
+              <a:spcBef>
+                <a:spcPts val="0"/>
+              </a:spcBef>
+              <a:spcAft>
+                <a:spcPts val="0"/>
+              </a:spcAft>
+              <a:buClrTx/>
+              <a:buSzTx/>
+              <a:buFontTx/>
+              <a:buNone/>
+              <a:tabLst/>
+              <a:defRPr/>
+            </a:pPr>
+            <a:endParaRPr lang="sv-SE" sz="1200" kern="1200" dirty="0">
+              <a:solidFill>
+                <a:schemeClr val="tx1"/>
+              </a:solidFill>
+              <a:effectLst/>
+              <a:latin typeface="+mn-lt"/>
+              <a:ea typeface="+mn-ea"/>
+              <a:cs typeface="+mn-cs"/>
+            </a:endParaRPr>
           </a:p>
           <a:p>
             <a:endParaRPr lang="sv-SE" dirty="0"/>
@@ -3180,7 +3259,7 @@
     </p:spTree>
     <p:extLst>
       <p:ext uri="{BB962C8B-B14F-4D97-AF65-F5344CB8AC3E}">
-        <p14:creationId xmlns:p14="http://schemas.microsoft.com/office/powerpoint/2010/main" val="3774513394"/>
+        <p14:creationId xmlns:p14="http://schemas.microsoft.com/office/powerpoint/2010/main" val="1278246246"/>
       </p:ext>
     </p:extLst>
   </p:cSld>
@@ -3368,7 +3447,7 @@
                 <a:ea typeface="+mn-ea"/>
                 <a:cs typeface="+mn-cs"/>
               </a:rPr>
-              <a:t>En presentation av de problem som hittats med hjälp av verktyg för statisk analys och en diskussion av dem enligt anvisningarna. Det räcker alltså inte med att bara lista problemen, ni måste förhålla er till dem också. Tänk också på att ni ska göra detta både på koden som den såg ut före granskningen och på koden efter att ni rättat det som kommit fram under granskningen.</a:t>
+              <a:t>Byggscriptets första (seriösa) version, och den slutliga.</a:t>
             </a:r>
           </a:p>
           <a:p>
@@ -3402,7 +3481,7 @@
     </p:spTree>
     <p:extLst>
       <p:ext uri="{BB962C8B-B14F-4D97-AF65-F5344CB8AC3E}">
-        <p14:creationId xmlns:p14="http://schemas.microsoft.com/office/powerpoint/2010/main" val="1343433812"/>
+        <p14:creationId xmlns:p14="http://schemas.microsoft.com/office/powerpoint/2010/main" val="109849433"/>
       </p:ext>
     </p:extLst>
   </p:cSld>
@@ -3483,7 +3562,7 @@
                 <a:ea typeface="+mn-ea"/>
                 <a:cs typeface="+mn-cs"/>
               </a:rPr>
-              <a:t>En presentation och diskussion kring ett antal lämpliga statiska mått på koden. Att vi inte specificerar exakt vilka mått som ska tas upp beror på att olika verktyg har olika uppsättningar, men vi förväntar oss fler och mer intressanta mått än bara rena storleksmått som LOC, #klasser, #metoder, etc. Även här är det viktigt att förhållas sig till måtten, inte bara lista dem.</a:t>
+              <a:t>Här kan ni ta upp övrigt av relevans för bedömningen av ert arbete. Om avsnittet inte behövs kan det plockas bort.</a:t>
             </a:r>
           </a:p>
           <a:p>
@@ -3509,494 +3588,6 @@
             <a:fld id="{8667F948-D2CB-486C-A2EA-FEABC2DAAE8D}" type="slidenum">
               <a:rPr lang="sv-SE" smtClean="0"/>
               <a:t>31</a:t>
-            </a:fld>
-            <a:endParaRPr lang="sv-SE"/>
-          </a:p>
-        </p:txBody>
-      </p:sp>
-    </p:spTree>
-    <p:extLst>
-      <p:ext uri="{BB962C8B-B14F-4D97-AF65-F5344CB8AC3E}">
-        <p14:creationId xmlns:p14="http://schemas.microsoft.com/office/powerpoint/2010/main" val="247082709"/>
-      </p:ext>
-    </p:extLst>
-  </p:cSld>
-  <p:clrMapOvr>
-    <a:masterClrMapping/>
-  </p:clrMapOvr>
-</p:notes>
-</file>
-
-<file path=ppt/notesSlides/notesSlide32.xml><?xml version="1.0" encoding="utf-8"?>
-<p:notes xmlns:a="http://schemas.openxmlformats.org/drawingml/2006/main" xmlns:r="http://schemas.openxmlformats.org/officeDocument/2006/relationships" xmlns:p="http://schemas.openxmlformats.org/presentationml/2006/main">
-  <p:cSld>
-    <p:spTree>
-      <p:nvGrpSpPr>
-        <p:cNvPr id="1" name=""/>
-        <p:cNvGrpSpPr/>
-        <p:nvPr/>
-      </p:nvGrpSpPr>
-      <p:grpSpPr>
-        <a:xfrm>
-          <a:off x="0" y="0"/>
-          <a:ext cx="0" cy="0"/>
-          <a:chOff x="0" y="0"/>
-          <a:chExt cx="0" cy="0"/>
-        </a:xfrm>
-      </p:grpSpPr>
-      <p:sp>
-        <p:nvSpPr>
-          <p:cNvPr id="2" name="Platshållare för bildobjekt 1"/>
-          <p:cNvSpPr>
-            <a:spLocks noGrp="1" noRot="1" noChangeAspect="1"/>
-          </p:cNvSpPr>
-          <p:nvPr>
-            <p:ph type="sldImg"/>
-          </p:nvPr>
-        </p:nvSpPr>
-        <p:spPr/>
-      </p:sp>
-      <p:sp>
-        <p:nvSpPr>
-          <p:cNvPr id="3" name="Platshållare för anteckningar 2"/>
-          <p:cNvSpPr>
-            <a:spLocks noGrp="1"/>
-          </p:cNvSpPr>
-          <p:nvPr>
-            <p:ph type="body" idx="1"/>
-          </p:nvPr>
-        </p:nvSpPr>
-        <p:spPr/>
-        <p:txBody>
-          <a:bodyPr/>
-          <a:lstStyle/>
-          <a:p>
-            <a:pPr marL="0" marR="0" lvl="0" indent="0" algn="l" defTabSz="914400" rtl="0" eaLnBrk="1" fontAlgn="auto" latinLnBrk="0" hangingPunct="1">
-              <a:lnSpc>
-                <a:spcPct val="100000"/>
-              </a:lnSpc>
-              <a:spcBef>
-                <a:spcPts val="0"/>
-              </a:spcBef>
-              <a:spcAft>
-                <a:spcPts val="0"/>
-              </a:spcAft>
-              <a:buClrTx/>
-              <a:buSzTx/>
-              <a:buFontTx/>
-              <a:buNone/>
-              <a:tabLst/>
-              <a:defRPr/>
-            </a:pPr>
-            <a:r>
-              <a:rPr lang="sv-SE" sz="1200" kern="1200" dirty="0">
-                <a:solidFill>
-                  <a:schemeClr val="tx1"/>
-                </a:solidFill>
-                <a:effectLst/>
-                <a:latin typeface="+mn-lt"/>
-                <a:ea typeface="+mn-ea"/>
-                <a:cs typeface="+mn-cs"/>
-              </a:rPr>
-              <a:t>En översikt över vilken täckningsgrad era testfall uppnått. Denna kan antagligen tas rakt av från verktyget ni använt för att mäta den. Om ni inte uppnått fullständig täckning så ska detta förklaras och motiveras.</a:t>
-            </a:r>
-          </a:p>
-          <a:p>
-            <a:endParaRPr lang="sv-SE" dirty="0"/>
-          </a:p>
-        </p:txBody>
-      </p:sp>
-      <p:sp>
-        <p:nvSpPr>
-          <p:cNvPr id="4" name="Platshållare för bildnummer 3"/>
-          <p:cNvSpPr>
-            <a:spLocks noGrp="1"/>
-          </p:cNvSpPr>
-          <p:nvPr>
-            <p:ph type="sldNum" sz="quarter" idx="10"/>
-          </p:nvPr>
-        </p:nvSpPr>
-        <p:spPr/>
-        <p:txBody>
-          <a:bodyPr/>
-          <a:lstStyle/>
-          <a:p>
-            <a:fld id="{8667F948-D2CB-486C-A2EA-FEABC2DAAE8D}" type="slidenum">
-              <a:rPr lang="sv-SE" smtClean="0"/>
-              <a:t>32</a:t>
-            </a:fld>
-            <a:endParaRPr lang="sv-SE"/>
-          </a:p>
-        </p:txBody>
-      </p:sp>
-    </p:spTree>
-    <p:extLst>
-      <p:ext uri="{BB962C8B-B14F-4D97-AF65-F5344CB8AC3E}">
-        <p14:creationId xmlns:p14="http://schemas.microsoft.com/office/powerpoint/2010/main" val="169751880"/>
-      </p:ext>
-    </p:extLst>
-  </p:cSld>
-  <p:clrMapOvr>
-    <a:masterClrMapping/>
-  </p:clrMapOvr>
-</p:notes>
-</file>
-
-<file path=ppt/notesSlides/notesSlide33.xml><?xml version="1.0" encoding="utf-8"?>
-<p:notes xmlns:a="http://schemas.openxmlformats.org/drawingml/2006/main" xmlns:r="http://schemas.openxmlformats.org/officeDocument/2006/relationships" xmlns:p="http://schemas.openxmlformats.org/presentationml/2006/main">
-  <p:cSld>
-    <p:spTree>
-      <p:nvGrpSpPr>
-        <p:cNvPr id="1" name=""/>
-        <p:cNvGrpSpPr/>
-        <p:nvPr/>
-      </p:nvGrpSpPr>
-      <p:grpSpPr>
-        <a:xfrm>
-          <a:off x="0" y="0"/>
-          <a:ext cx="0" cy="0"/>
-          <a:chOff x="0" y="0"/>
-          <a:chExt cx="0" cy="0"/>
-        </a:xfrm>
-      </p:grpSpPr>
-      <p:sp>
-        <p:nvSpPr>
-          <p:cNvPr id="2" name="Platshållare för bildobjekt 1"/>
-          <p:cNvSpPr>
-            <a:spLocks noGrp="1" noRot="1" noChangeAspect="1"/>
-          </p:cNvSpPr>
-          <p:nvPr>
-            <p:ph type="sldImg"/>
-          </p:nvPr>
-        </p:nvSpPr>
-        <p:spPr/>
-      </p:sp>
-      <p:sp>
-        <p:nvSpPr>
-          <p:cNvPr id="3" name="Platshållare för anteckningar 2"/>
-          <p:cNvSpPr>
-            <a:spLocks noGrp="1"/>
-          </p:cNvSpPr>
-          <p:nvPr>
-            <p:ph type="body" idx="1"/>
-          </p:nvPr>
-        </p:nvSpPr>
-        <p:spPr/>
-        <p:txBody>
-          <a:bodyPr/>
-          <a:lstStyle/>
-          <a:p>
-            <a:pPr marL="0" marR="0" lvl="0" indent="0" algn="l" defTabSz="914400" rtl="0" eaLnBrk="1" fontAlgn="auto" latinLnBrk="0" hangingPunct="1">
-              <a:lnSpc>
-                <a:spcPct val="100000"/>
-              </a:lnSpc>
-              <a:spcBef>
-                <a:spcPts val="0"/>
-              </a:spcBef>
-              <a:spcAft>
-                <a:spcPts val="0"/>
-              </a:spcAft>
-              <a:buClrTx/>
-              <a:buSzTx/>
-              <a:buFontTx/>
-              <a:buNone/>
-              <a:tabLst/>
-              <a:defRPr/>
-            </a:pPr>
-            <a:r>
-              <a:rPr lang="sv-SE" sz="1200" kern="1200" dirty="0">
-                <a:solidFill>
-                  <a:schemeClr val="tx1"/>
-                </a:solidFill>
-                <a:effectLst/>
-                <a:latin typeface="+mn-lt"/>
-                <a:ea typeface="+mn-ea"/>
-                <a:cs typeface="+mn-cs"/>
-              </a:rPr>
-              <a:t>En kort presentation av hur ni gått tillväga för att testa koden med en profiler och vilka resultat ni fick fram. Även här är det viktigt att förhållas sig till måtten, inte bara presentera dem.</a:t>
-            </a:r>
-          </a:p>
-          <a:p>
-            <a:pPr marL="0" marR="0" lvl="0" indent="0" algn="l" defTabSz="914400" rtl="0" eaLnBrk="1" fontAlgn="auto" latinLnBrk="0" hangingPunct="1">
-              <a:lnSpc>
-                <a:spcPct val="100000"/>
-              </a:lnSpc>
-              <a:spcBef>
-                <a:spcPts val="0"/>
-              </a:spcBef>
-              <a:spcAft>
-                <a:spcPts val="0"/>
-              </a:spcAft>
-              <a:buClrTx/>
-              <a:buSzTx/>
-              <a:buFontTx/>
-              <a:buNone/>
-              <a:tabLst/>
-              <a:defRPr/>
-            </a:pPr>
-            <a:endParaRPr lang="sv-SE" sz="1200" kern="1200" dirty="0">
-              <a:solidFill>
-                <a:schemeClr val="tx1"/>
-              </a:solidFill>
-              <a:effectLst/>
-              <a:latin typeface="+mn-lt"/>
-              <a:ea typeface="+mn-ea"/>
-              <a:cs typeface="+mn-cs"/>
-            </a:endParaRPr>
-          </a:p>
-          <a:p>
-            <a:endParaRPr lang="sv-SE" dirty="0"/>
-          </a:p>
-        </p:txBody>
-      </p:sp>
-      <p:sp>
-        <p:nvSpPr>
-          <p:cNvPr id="4" name="Platshållare för bildnummer 3"/>
-          <p:cNvSpPr>
-            <a:spLocks noGrp="1"/>
-          </p:cNvSpPr>
-          <p:nvPr>
-            <p:ph type="sldNum" sz="quarter" idx="10"/>
-          </p:nvPr>
-        </p:nvSpPr>
-        <p:spPr/>
-        <p:txBody>
-          <a:bodyPr/>
-          <a:lstStyle/>
-          <a:p>
-            <a:fld id="{8667F948-D2CB-486C-A2EA-FEABC2DAAE8D}" type="slidenum">
-              <a:rPr lang="sv-SE" smtClean="0"/>
-              <a:t>33</a:t>
-            </a:fld>
-            <a:endParaRPr lang="sv-SE"/>
-          </a:p>
-        </p:txBody>
-      </p:sp>
-    </p:spTree>
-    <p:extLst>
-      <p:ext uri="{BB962C8B-B14F-4D97-AF65-F5344CB8AC3E}">
-        <p14:creationId xmlns:p14="http://schemas.microsoft.com/office/powerpoint/2010/main" val="1278246246"/>
-      </p:ext>
-    </p:extLst>
-  </p:cSld>
-  <p:clrMapOvr>
-    <a:masterClrMapping/>
-  </p:clrMapOvr>
-</p:notes>
-</file>
-
-<file path=ppt/notesSlides/notesSlide34.xml><?xml version="1.0" encoding="utf-8"?>
-<p:notes xmlns:a="http://schemas.openxmlformats.org/drawingml/2006/main" xmlns:r="http://schemas.openxmlformats.org/officeDocument/2006/relationships" xmlns:p="http://schemas.openxmlformats.org/presentationml/2006/main">
-  <p:cSld>
-    <p:spTree>
-      <p:nvGrpSpPr>
-        <p:cNvPr id="1" name=""/>
-        <p:cNvGrpSpPr/>
-        <p:nvPr/>
-      </p:nvGrpSpPr>
-      <p:grpSpPr>
-        <a:xfrm>
-          <a:off x="0" y="0"/>
-          <a:ext cx="0" cy="0"/>
-          <a:chOff x="0" y="0"/>
-          <a:chExt cx="0" cy="0"/>
-        </a:xfrm>
-      </p:grpSpPr>
-      <p:sp>
-        <p:nvSpPr>
-          <p:cNvPr id="2" name="Platshållare för bildobjekt 1"/>
-          <p:cNvSpPr>
-            <a:spLocks noGrp="1" noRot="1" noChangeAspect="1"/>
-          </p:cNvSpPr>
-          <p:nvPr>
-            <p:ph type="sldImg"/>
-          </p:nvPr>
-        </p:nvSpPr>
-        <p:spPr/>
-      </p:sp>
-      <p:sp>
-        <p:nvSpPr>
-          <p:cNvPr id="3" name="Platshållare för anteckningar 2"/>
-          <p:cNvSpPr>
-            <a:spLocks noGrp="1"/>
-          </p:cNvSpPr>
-          <p:nvPr>
-            <p:ph type="body" idx="1"/>
-          </p:nvPr>
-        </p:nvSpPr>
-        <p:spPr/>
-        <p:txBody>
-          <a:bodyPr/>
-          <a:lstStyle/>
-          <a:p>
-            <a:pPr marL="0" marR="0" lvl="0" indent="0" algn="l" defTabSz="914400" rtl="0" eaLnBrk="1" fontAlgn="auto" latinLnBrk="0" hangingPunct="1">
-              <a:lnSpc>
-                <a:spcPct val="100000"/>
-              </a:lnSpc>
-              <a:spcBef>
-                <a:spcPts val="0"/>
-              </a:spcBef>
-              <a:spcAft>
-                <a:spcPts val="0"/>
-              </a:spcAft>
-              <a:buClrTx/>
-              <a:buSzTx/>
-              <a:buFontTx/>
-              <a:buNone/>
-              <a:tabLst/>
-              <a:defRPr/>
-            </a:pPr>
-            <a:r>
-              <a:rPr lang="sv-SE" sz="1200" kern="1200" dirty="0">
-                <a:solidFill>
-                  <a:schemeClr val="tx1"/>
-                </a:solidFill>
-                <a:effectLst/>
-                <a:latin typeface="+mn-lt"/>
-                <a:ea typeface="+mn-ea"/>
-                <a:cs typeface="+mn-cs"/>
-              </a:rPr>
-              <a:t>Byggscriptets första (seriösa) version, och den slutliga.</a:t>
-            </a:r>
-          </a:p>
-          <a:p>
-            <a:endParaRPr lang="sv-SE" dirty="0"/>
-          </a:p>
-        </p:txBody>
-      </p:sp>
-      <p:sp>
-        <p:nvSpPr>
-          <p:cNvPr id="4" name="Platshållare för bildnummer 3"/>
-          <p:cNvSpPr>
-            <a:spLocks noGrp="1"/>
-          </p:cNvSpPr>
-          <p:nvPr>
-            <p:ph type="sldNum" sz="quarter" idx="10"/>
-          </p:nvPr>
-        </p:nvSpPr>
-        <p:spPr/>
-        <p:txBody>
-          <a:bodyPr/>
-          <a:lstStyle/>
-          <a:p>
-            <a:fld id="{8667F948-D2CB-486C-A2EA-FEABC2DAAE8D}" type="slidenum">
-              <a:rPr lang="sv-SE" smtClean="0"/>
-              <a:t>34</a:t>
-            </a:fld>
-            <a:endParaRPr lang="sv-SE"/>
-          </a:p>
-        </p:txBody>
-      </p:sp>
-    </p:spTree>
-    <p:extLst>
-      <p:ext uri="{BB962C8B-B14F-4D97-AF65-F5344CB8AC3E}">
-        <p14:creationId xmlns:p14="http://schemas.microsoft.com/office/powerpoint/2010/main" val="109849433"/>
-      </p:ext>
-    </p:extLst>
-  </p:cSld>
-  <p:clrMapOvr>
-    <a:masterClrMapping/>
-  </p:clrMapOvr>
-</p:notes>
-</file>
-
-<file path=ppt/notesSlides/notesSlide35.xml><?xml version="1.0" encoding="utf-8"?>
-<p:notes xmlns:a="http://schemas.openxmlformats.org/drawingml/2006/main" xmlns:r="http://schemas.openxmlformats.org/officeDocument/2006/relationships" xmlns:p="http://schemas.openxmlformats.org/presentationml/2006/main">
-  <p:cSld>
-    <p:spTree>
-      <p:nvGrpSpPr>
-        <p:cNvPr id="1" name=""/>
-        <p:cNvGrpSpPr/>
-        <p:nvPr/>
-      </p:nvGrpSpPr>
-      <p:grpSpPr>
-        <a:xfrm>
-          <a:off x="0" y="0"/>
-          <a:ext cx="0" cy="0"/>
-          <a:chOff x="0" y="0"/>
-          <a:chExt cx="0" cy="0"/>
-        </a:xfrm>
-      </p:grpSpPr>
-      <p:sp>
-        <p:nvSpPr>
-          <p:cNvPr id="2" name="Platshållare för bildobjekt 1"/>
-          <p:cNvSpPr>
-            <a:spLocks noGrp="1" noRot="1" noChangeAspect="1"/>
-          </p:cNvSpPr>
-          <p:nvPr>
-            <p:ph type="sldImg"/>
-          </p:nvPr>
-        </p:nvSpPr>
-        <p:spPr/>
-      </p:sp>
-      <p:sp>
-        <p:nvSpPr>
-          <p:cNvPr id="3" name="Platshållare för anteckningar 2"/>
-          <p:cNvSpPr>
-            <a:spLocks noGrp="1"/>
-          </p:cNvSpPr>
-          <p:nvPr>
-            <p:ph type="body" idx="1"/>
-          </p:nvPr>
-        </p:nvSpPr>
-        <p:spPr/>
-        <p:txBody>
-          <a:bodyPr/>
-          <a:lstStyle/>
-          <a:p>
-            <a:pPr marL="0" marR="0" lvl="0" indent="0" algn="l" defTabSz="914400" rtl="0" eaLnBrk="1" fontAlgn="auto" latinLnBrk="0" hangingPunct="1">
-              <a:lnSpc>
-                <a:spcPct val="100000"/>
-              </a:lnSpc>
-              <a:spcBef>
-                <a:spcPts val="0"/>
-              </a:spcBef>
-              <a:spcAft>
-                <a:spcPts val="0"/>
-              </a:spcAft>
-              <a:buClrTx/>
-              <a:buSzTx/>
-              <a:buFontTx/>
-              <a:buNone/>
-              <a:tabLst/>
-              <a:defRPr/>
-            </a:pPr>
-            <a:r>
-              <a:rPr lang="sv-SE" sz="1200" kern="1200" dirty="0">
-                <a:solidFill>
-                  <a:schemeClr val="tx1"/>
-                </a:solidFill>
-                <a:effectLst/>
-                <a:latin typeface="+mn-lt"/>
-                <a:ea typeface="+mn-ea"/>
-                <a:cs typeface="+mn-cs"/>
-              </a:rPr>
-              <a:t>Här kan ni ta upp övrigt av relevans för bedömningen av ert arbete. Om avsnittet inte behövs kan det plockas bort.</a:t>
-            </a:r>
-          </a:p>
-          <a:p>
-            <a:endParaRPr lang="sv-SE" dirty="0"/>
-          </a:p>
-        </p:txBody>
-      </p:sp>
-      <p:sp>
-        <p:nvSpPr>
-          <p:cNvPr id="4" name="Platshållare för bildnummer 3"/>
-          <p:cNvSpPr>
-            <a:spLocks noGrp="1"/>
-          </p:cNvSpPr>
-          <p:nvPr>
-            <p:ph type="sldNum" sz="quarter" idx="10"/>
-          </p:nvPr>
-        </p:nvSpPr>
-        <p:spPr/>
-        <p:txBody>
-          <a:bodyPr/>
-          <a:lstStyle/>
-          <a:p>
-            <a:fld id="{8667F948-D2CB-486C-A2EA-FEABC2DAAE8D}" type="slidenum">
-              <a:rPr lang="sv-SE" smtClean="0"/>
-              <a:t>35</a:t>
             </a:fld>
             <a:endParaRPr lang="sv-SE"/>
           </a:p>
@@ -19770,302 +19361,6 @@
           <a:lstStyle/>
           <a:p>
             <a:r>
-              <a:rPr lang="sv-SE" dirty="0"/>
-              <a:t>Beslutstabeller/beslutsträd</a:t>
-            </a:r>
-          </a:p>
-        </p:txBody>
-      </p:sp>
-      <p:sp>
-        <p:nvSpPr>
-          <p:cNvPr id="3" name="Platshållare för innehåll 2"/>
-          <p:cNvSpPr>
-            <a:spLocks noGrp="1"/>
-          </p:cNvSpPr>
-          <p:nvPr>
-            <p:ph idx="1"/>
-          </p:nvPr>
-        </p:nvSpPr>
-        <p:spPr/>
-        <p:txBody>
-          <a:bodyPr/>
-          <a:lstStyle/>
-          <a:p>
-            <a:endParaRPr lang="sv-SE"/>
-          </a:p>
-        </p:txBody>
-      </p:sp>
-    </p:spTree>
-    <p:custDataLst>
-      <p:tags r:id="rId1"/>
-    </p:custDataLst>
-    <p:extLst>
-      <p:ext uri="{BB962C8B-B14F-4D97-AF65-F5344CB8AC3E}">
-        <p14:creationId xmlns:p14="http://schemas.microsoft.com/office/powerpoint/2010/main" val="2726864417"/>
-      </p:ext>
-    </p:extLst>
-  </p:cSld>
-  <p:clrMapOvr>
-    <a:masterClrMapping/>
-  </p:clrMapOvr>
-</p:sld>
-</file>
-
-<file path=ppt/slides/slide24.xml><?xml version="1.0" encoding="utf-8"?>
-<p:sld xmlns:a="http://schemas.openxmlformats.org/drawingml/2006/main" xmlns:r="http://schemas.openxmlformats.org/officeDocument/2006/relationships" xmlns:p="http://schemas.openxmlformats.org/presentationml/2006/main">
-  <p:cSld>
-    <p:spTree>
-      <p:nvGrpSpPr>
-        <p:cNvPr id="1" name=""/>
-        <p:cNvGrpSpPr/>
-        <p:nvPr/>
-      </p:nvGrpSpPr>
-      <p:grpSpPr>
-        <a:xfrm>
-          <a:off x="0" y="0"/>
-          <a:ext cx="0" cy="0"/>
-          <a:chOff x="0" y="0"/>
-          <a:chExt cx="0" cy="0"/>
-        </a:xfrm>
-      </p:grpSpPr>
-      <p:sp>
-        <p:nvSpPr>
-          <p:cNvPr id="2" name="Rubrik 1"/>
-          <p:cNvSpPr>
-            <a:spLocks noGrp="1"/>
-          </p:cNvSpPr>
-          <p:nvPr>
-            <p:ph type="title"/>
-          </p:nvPr>
-        </p:nvSpPr>
-        <p:spPr/>
-        <p:txBody>
-          <a:bodyPr/>
-          <a:lstStyle/>
-          <a:p>
-            <a:r>
-              <a:rPr lang="sv-SE" dirty="0"/>
-              <a:t>Beslutstabell</a:t>
-            </a:r>
-          </a:p>
-        </p:txBody>
-      </p:sp>
-      <p:sp>
-        <p:nvSpPr>
-          <p:cNvPr id="3" name="Platshållare för innehåll 2"/>
-          <p:cNvSpPr>
-            <a:spLocks noGrp="1"/>
-          </p:cNvSpPr>
-          <p:nvPr>
-            <p:ph idx="1"/>
-          </p:nvPr>
-        </p:nvSpPr>
-        <p:spPr/>
-        <p:txBody>
-          <a:bodyPr/>
-          <a:lstStyle/>
-          <a:p>
-            <a:endParaRPr lang="sv-SE"/>
-          </a:p>
-        </p:txBody>
-      </p:sp>
-    </p:spTree>
-    <p:custDataLst>
-      <p:tags r:id="rId1"/>
-    </p:custDataLst>
-    <p:extLst>
-      <p:ext uri="{BB962C8B-B14F-4D97-AF65-F5344CB8AC3E}">
-        <p14:creationId xmlns:p14="http://schemas.microsoft.com/office/powerpoint/2010/main" val="804679524"/>
-      </p:ext>
-    </p:extLst>
-  </p:cSld>
-  <p:clrMapOvr>
-    <a:masterClrMapping/>
-  </p:clrMapOvr>
-</p:sld>
-</file>
-
-<file path=ppt/slides/slide25.xml><?xml version="1.0" encoding="utf-8"?>
-<p:sld xmlns:a="http://schemas.openxmlformats.org/drawingml/2006/main" xmlns:r="http://schemas.openxmlformats.org/officeDocument/2006/relationships" xmlns:p="http://schemas.openxmlformats.org/presentationml/2006/main">
-  <p:cSld>
-    <p:spTree>
-      <p:nvGrpSpPr>
-        <p:cNvPr id="1" name=""/>
-        <p:cNvGrpSpPr/>
-        <p:nvPr/>
-      </p:nvGrpSpPr>
-      <p:grpSpPr>
-        <a:xfrm>
-          <a:off x="0" y="0"/>
-          <a:ext cx="0" cy="0"/>
-          <a:chOff x="0" y="0"/>
-          <a:chExt cx="0" cy="0"/>
-        </a:xfrm>
-      </p:grpSpPr>
-      <p:sp>
-        <p:nvSpPr>
-          <p:cNvPr id="2" name="Rubrik 1"/>
-          <p:cNvSpPr>
-            <a:spLocks noGrp="1"/>
-          </p:cNvSpPr>
-          <p:nvPr>
-            <p:ph type="title"/>
-          </p:nvPr>
-        </p:nvSpPr>
-        <p:spPr/>
-        <p:txBody>
-          <a:bodyPr/>
-          <a:lstStyle/>
-          <a:p>
-            <a:r>
-              <a:rPr lang="sv-SE" dirty="0"/>
-              <a:t>Beslutsträd</a:t>
-            </a:r>
-          </a:p>
-        </p:txBody>
-      </p:sp>
-      <p:sp>
-        <p:nvSpPr>
-          <p:cNvPr id="3" name="Platshållare för innehåll 2"/>
-          <p:cNvSpPr>
-            <a:spLocks noGrp="1"/>
-          </p:cNvSpPr>
-          <p:nvPr>
-            <p:ph idx="1"/>
-          </p:nvPr>
-        </p:nvSpPr>
-        <p:spPr/>
-        <p:txBody>
-          <a:bodyPr/>
-          <a:lstStyle/>
-          <a:p>
-            <a:endParaRPr lang="sv-SE"/>
-          </a:p>
-        </p:txBody>
-      </p:sp>
-    </p:spTree>
-    <p:custDataLst>
-      <p:tags r:id="rId1"/>
-    </p:custDataLst>
-    <p:extLst>
-      <p:ext uri="{BB962C8B-B14F-4D97-AF65-F5344CB8AC3E}">
-        <p14:creationId xmlns:p14="http://schemas.microsoft.com/office/powerpoint/2010/main" val="3386033166"/>
-      </p:ext>
-    </p:extLst>
-  </p:cSld>
-  <p:clrMapOvr>
-    <a:masterClrMapping/>
-  </p:clrMapOvr>
-</p:sld>
-</file>
-
-<file path=ppt/slides/slide26.xml><?xml version="1.0" encoding="utf-8"?>
-<p:sld xmlns:a="http://schemas.openxmlformats.org/drawingml/2006/main" xmlns:r="http://schemas.openxmlformats.org/officeDocument/2006/relationships" xmlns:p="http://schemas.openxmlformats.org/presentationml/2006/main">
-  <p:cSld>
-    <p:spTree>
-      <p:nvGrpSpPr>
-        <p:cNvPr id="1" name=""/>
-        <p:cNvGrpSpPr/>
-        <p:nvPr/>
-      </p:nvGrpSpPr>
-      <p:grpSpPr>
-        <a:xfrm>
-          <a:off x="0" y="0"/>
-          <a:ext cx="0" cy="0"/>
-          <a:chOff x="0" y="0"/>
-          <a:chExt cx="0" cy="0"/>
-        </a:xfrm>
-      </p:grpSpPr>
-      <p:sp>
-        <p:nvSpPr>
-          <p:cNvPr id="2" name="Rubrik 1"/>
-          <p:cNvSpPr>
-            <a:spLocks noGrp="1"/>
-          </p:cNvSpPr>
-          <p:nvPr>
-            <p:ph type="title"/>
-          </p:nvPr>
-        </p:nvSpPr>
-        <p:spPr/>
-        <p:txBody>
-          <a:bodyPr/>
-          <a:lstStyle/>
-          <a:p>
-            <a:r>
-              <a:rPr lang="sv-SE" dirty="0"/>
-              <a:t>Testfall</a:t>
-            </a:r>
-          </a:p>
-        </p:txBody>
-      </p:sp>
-      <p:sp>
-        <p:nvSpPr>
-          <p:cNvPr id="3" name="Platshållare för innehåll 2"/>
-          <p:cNvSpPr>
-            <a:spLocks noGrp="1"/>
-          </p:cNvSpPr>
-          <p:nvPr>
-            <p:ph idx="1"/>
-          </p:nvPr>
-        </p:nvSpPr>
-        <p:spPr/>
-        <p:txBody>
-          <a:bodyPr/>
-          <a:lstStyle/>
-          <a:p>
-            <a:endParaRPr lang="sv-SE"/>
-          </a:p>
-        </p:txBody>
-      </p:sp>
-    </p:spTree>
-    <p:custDataLst>
-      <p:tags r:id="rId1"/>
-    </p:custDataLst>
-    <p:extLst>
-      <p:ext uri="{BB962C8B-B14F-4D97-AF65-F5344CB8AC3E}">
-        <p14:creationId xmlns:p14="http://schemas.microsoft.com/office/powerpoint/2010/main" val="1644214412"/>
-      </p:ext>
-    </p:extLst>
-  </p:cSld>
-  <p:clrMapOvr>
-    <a:masterClrMapping/>
-  </p:clrMapOvr>
-</p:sld>
-</file>
-
-<file path=ppt/slides/slide27.xml><?xml version="1.0" encoding="utf-8"?>
-<p:sld xmlns:a="http://schemas.openxmlformats.org/drawingml/2006/main" xmlns:r="http://schemas.openxmlformats.org/officeDocument/2006/relationships" xmlns:p="http://schemas.openxmlformats.org/presentationml/2006/main">
-  <p:cSld>
-    <p:spTree>
-      <p:nvGrpSpPr>
-        <p:cNvPr id="1" name=""/>
-        <p:cNvGrpSpPr/>
-        <p:nvPr/>
-      </p:nvGrpSpPr>
-      <p:grpSpPr>
-        <a:xfrm>
-          <a:off x="0" y="0"/>
-          <a:ext cx="0" cy="0"/>
-          <a:chOff x="0" y="0"/>
-          <a:chExt cx="0" cy="0"/>
-        </a:xfrm>
-      </p:grpSpPr>
-      <p:sp>
-        <p:nvSpPr>
-          <p:cNvPr id="2" name="Rubrik 1"/>
-          <p:cNvSpPr>
-            <a:spLocks noGrp="1"/>
-          </p:cNvSpPr>
-          <p:nvPr>
-            <p:ph type="title"/>
-          </p:nvPr>
-        </p:nvSpPr>
-        <p:spPr/>
-        <p:txBody>
-          <a:bodyPr/>
-          <a:lstStyle/>
-          <a:p>
-            <a:r>
               <a:rPr lang="sv-SE" dirty="0" smtClean="0"/>
               <a:t>Granskning</a:t>
             </a:r>
@@ -20134,7 +19429,7 @@
 </p:sld>
 </file>
 
-<file path=ppt/slides/slide28.xml><?xml version="1.0" encoding="utf-8"?>
+<file path=ppt/slides/slide24.xml><?xml version="1.0" encoding="utf-8"?>
 <p:sld xmlns:a="http://schemas.openxmlformats.org/drawingml/2006/main" xmlns:r="http://schemas.openxmlformats.org/officeDocument/2006/relationships" xmlns:p="http://schemas.openxmlformats.org/presentationml/2006/main">
   <p:cSld>
     <p:spTree>
@@ -20557,6 +19852,313 @@
 </p:sld>
 </file>
 
+<file path=ppt/slides/slide25.xml><?xml version="1.0" encoding="utf-8"?>
+<p:sld xmlns:a="http://schemas.openxmlformats.org/drawingml/2006/main" xmlns:r="http://schemas.openxmlformats.org/officeDocument/2006/relationships" xmlns:p="http://schemas.openxmlformats.org/presentationml/2006/main">
+  <p:cSld>
+    <p:spTree>
+      <p:nvGrpSpPr>
+        <p:cNvPr id="1" name=""/>
+        <p:cNvGrpSpPr/>
+        <p:nvPr/>
+      </p:nvGrpSpPr>
+      <p:grpSpPr>
+        <a:xfrm>
+          <a:off x="0" y="0"/>
+          <a:ext cx="0" cy="0"/>
+          <a:chOff x="0" y="0"/>
+          <a:chExt cx="0" cy="0"/>
+        </a:xfrm>
+      </p:grpSpPr>
+      <p:sp>
+        <p:nvSpPr>
+          <p:cNvPr id="2" name="Rubrik 1"/>
+          <p:cNvSpPr>
+            <a:spLocks noGrp="1"/>
+          </p:cNvSpPr>
+          <p:nvPr>
+            <p:ph type="title"/>
+          </p:nvPr>
+        </p:nvSpPr>
+        <p:spPr/>
+        <p:txBody>
+          <a:bodyPr/>
+          <a:lstStyle/>
+          <a:p>
+            <a:r>
+              <a:rPr lang="sv-SE" dirty="0" smtClean="0"/>
+              <a:t>Erfarenheter av granskning</a:t>
+            </a:r>
+            <a:endParaRPr lang="sv-SE" dirty="0"/>
+          </a:p>
+        </p:txBody>
+      </p:sp>
+      <p:sp>
+        <p:nvSpPr>
+          <p:cNvPr id="3" name="Platshållare för innehåll 2"/>
+          <p:cNvSpPr>
+            <a:spLocks noGrp="1"/>
+          </p:cNvSpPr>
+          <p:nvPr>
+            <p:ph idx="1"/>
+          </p:nvPr>
+        </p:nvSpPr>
+        <p:spPr/>
+        <p:txBody>
+          <a:bodyPr/>
+          <a:lstStyle/>
+          <a:p>
+            <a:r>
+              <a:rPr lang="sv-SE" dirty="0" smtClean="0"/>
+              <a:t>Vi anser att det är bättre med informell granskning när det gäller kod av denna storlek och på denna nivå. </a:t>
+            </a:r>
+          </a:p>
+          <a:p>
+            <a:r>
+              <a:rPr lang="sv-SE" dirty="0" smtClean="0"/>
+              <a:t>Det bästa med inspektionen var att man fick en idé om vilka saker man själv behöver tänka på i framtiden. Möjligtvis att man gör en egen lista med saker man har svårt med eller brukar missa, så att man själv kan hålla koll på att man kodar på ett bra sätt och får bra vanor. </a:t>
+            </a:r>
+            <a:endParaRPr lang="sv-SE" dirty="0"/>
+          </a:p>
+        </p:txBody>
+      </p:sp>
+    </p:spTree>
+    <p:custDataLst>
+      <p:tags r:id="rId1"/>
+    </p:custDataLst>
+    <p:extLst>
+      <p:ext uri="{BB962C8B-B14F-4D97-AF65-F5344CB8AC3E}">
+        <p14:creationId xmlns:p14="http://schemas.microsoft.com/office/powerpoint/2010/main" val="3676843999"/>
+      </p:ext>
+    </p:extLst>
+  </p:cSld>
+  <p:clrMapOvr>
+    <a:masterClrMapping/>
+  </p:clrMapOvr>
+</p:sld>
+</file>
+
+<file path=ppt/slides/slide26.xml><?xml version="1.0" encoding="utf-8"?>
+<p:sld xmlns:a="http://schemas.openxmlformats.org/drawingml/2006/main" xmlns:r="http://schemas.openxmlformats.org/officeDocument/2006/relationships" xmlns:p="http://schemas.openxmlformats.org/presentationml/2006/main">
+  <p:cSld>
+    <p:spTree>
+      <p:nvGrpSpPr>
+        <p:cNvPr id="1" name=""/>
+        <p:cNvGrpSpPr/>
+        <p:nvPr/>
+      </p:nvGrpSpPr>
+      <p:grpSpPr>
+        <a:xfrm>
+          <a:off x="0" y="0"/>
+          <a:ext cx="0" cy="0"/>
+          <a:chOff x="0" y="0"/>
+          <a:chExt cx="0" cy="0"/>
+        </a:xfrm>
+      </p:grpSpPr>
+      <p:sp>
+        <p:nvSpPr>
+          <p:cNvPr id="2" name="Rubrik 1"/>
+          <p:cNvSpPr>
+            <a:spLocks noGrp="1"/>
+          </p:cNvSpPr>
+          <p:nvPr>
+            <p:ph type="title"/>
+          </p:nvPr>
+        </p:nvSpPr>
+        <p:spPr/>
+        <p:txBody>
+          <a:bodyPr/>
+          <a:lstStyle/>
+          <a:p>
+            <a:r>
+              <a:rPr lang="sv-SE" dirty="0"/>
+              <a:t>Kodkritiksystem</a:t>
+            </a:r>
+          </a:p>
+        </p:txBody>
+      </p:sp>
+      <p:sp>
+        <p:nvSpPr>
+          <p:cNvPr id="3" name="Platshållare för innehåll 2"/>
+          <p:cNvSpPr>
+            <a:spLocks noGrp="1"/>
+          </p:cNvSpPr>
+          <p:nvPr>
+            <p:ph idx="1"/>
+          </p:nvPr>
+        </p:nvSpPr>
+        <p:spPr/>
+        <p:txBody>
+          <a:bodyPr/>
+          <a:lstStyle/>
+          <a:p>
+            <a:endParaRPr lang="sv-SE"/>
+          </a:p>
+        </p:txBody>
+      </p:sp>
+    </p:spTree>
+    <p:custDataLst>
+      <p:tags r:id="rId1"/>
+    </p:custDataLst>
+    <p:extLst>
+      <p:ext uri="{BB962C8B-B14F-4D97-AF65-F5344CB8AC3E}">
+        <p14:creationId xmlns:p14="http://schemas.microsoft.com/office/powerpoint/2010/main" val="847618868"/>
+      </p:ext>
+    </p:extLst>
+  </p:cSld>
+  <p:clrMapOvr>
+    <a:masterClrMapping/>
+  </p:clrMapOvr>
+</p:sld>
+</file>
+
+<file path=ppt/slides/slide27.xml><?xml version="1.0" encoding="utf-8"?>
+<p:sld xmlns:a="http://schemas.openxmlformats.org/drawingml/2006/main" xmlns:r="http://schemas.openxmlformats.org/officeDocument/2006/relationships" xmlns:p="http://schemas.openxmlformats.org/presentationml/2006/main">
+  <p:cSld>
+    <p:spTree>
+      <p:nvGrpSpPr>
+        <p:cNvPr id="1" name=""/>
+        <p:cNvGrpSpPr/>
+        <p:nvPr/>
+      </p:nvGrpSpPr>
+      <p:grpSpPr>
+        <a:xfrm>
+          <a:off x="0" y="0"/>
+          <a:ext cx="0" cy="0"/>
+          <a:chOff x="0" y="0"/>
+          <a:chExt cx="0" cy="0"/>
+        </a:xfrm>
+      </p:grpSpPr>
+      <p:sp>
+        <p:nvSpPr>
+          <p:cNvPr id="2" name="Rubrik 1"/>
+          <p:cNvSpPr>
+            <a:spLocks noGrp="1"/>
+          </p:cNvSpPr>
+          <p:nvPr>
+            <p:ph type="title"/>
+          </p:nvPr>
+        </p:nvSpPr>
+        <p:spPr/>
+        <p:txBody>
+          <a:bodyPr/>
+          <a:lstStyle/>
+          <a:p>
+            <a:r>
+              <a:rPr lang="sv-SE" dirty="0"/>
+              <a:t>Statiska mått</a:t>
+            </a:r>
+          </a:p>
+        </p:txBody>
+      </p:sp>
+      <p:sp>
+        <p:nvSpPr>
+          <p:cNvPr id="3" name="Platshållare för innehåll 2"/>
+          <p:cNvSpPr>
+            <a:spLocks noGrp="1"/>
+          </p:cNvSpPr>
+          <p:nvPr>
+            <p:ph idx="1"/>
+          </p:nvPr>
+        </p:nvSpPr>
+        <p:spPr/>
+        <p:txBody>
+          <a:bodyPr/>
+          <a:lstStyle/>
+          <a:p>
+            <a:endParaRPr lang="sv-SE"/>
+          </a:p>
+        </p:txBody>
+      </p:sp>
+    </p:spTree>
+    <p:custDataLst>
+      <p:tags r:id="rId1"/>
+    </p:custDataLst>
+    <p:extLst>
+      <p:ext uri="{BB962C8B-B14F-4D97-AF65-F5344CB8AC3E}">
+        <p14:creationId xmlns:p14="http://schemas.microsoft.com/office/powerpoint/2010/main" val="3620096591"/>
+      </p:ext>
+    </p:extLst>
+  </p:cSld>
+  <p:clrMapOvr>
+    <a:masterClrMapping/>
+  </p:clrMapOvr>
+</p:sld>
+</file>
+
+<file path=ppt/slides/slide28.xml><?xml version="1.0" encoding="utf-8"?>
+<p:sld xmlns:a="http://schemas.openxmlformats.org/drawingml/2006/main" xmlns:r="http://schemas.openxmlformats.org/officeDocument/2006/relationships" xmlns:p="http://schemas.openxmlformats.org/presentationml/2006/main">
+  <p:cSld>
+    <p:spTree>
+      <p:nvGrpSpPr>
+        <p:cNvPr id="1" name=""/>
+        <p:cNvGrpSpPr/>
+        <p:nvPr/>
+      </p:nvGrpSpPr>
+      <p:grpSpPr>
+        <a:xfrm>
+          <a:off x="0" y="0"/>
+          <a:ext cx="0" cy="0"/>
+          <a:chOff x="0" y="0"/>
+          <a:chExt cx="0" cy="0"/>
+        </a:xfrm>
+      </p:grpSpPr>
+      <p:sp>
+        <p:nvSpPr>
+          <p:cNvPr id="2" name="Rubrik 1"/>
+          <p:cNvSpPr>
+            <a:spLocks noGrp="1"/>
+          </p:cNvSpPr>
+          <p:nvPr>
+            <p:ph type="title"/>
+          </p:nvPr>
+        </p:nvSpPr>
+        <p:spPr/>
+        <p:txBody>
+          <a:bodyPr/>
+          <a:lstStyle/>
+          <a:p>
+            <a:r>
+              <a:rPr lang="sv-SE" dirty="0"/>
+              <a:t>Täckningsgrad</a:t>
+            </a:r>
+          </a:p>
+        </p:txBody>
+      </p:sp>
+      <p:sp>
+        <p:nvSpPr>
+          <p:cNvPr id="3" name="Platshållare för innehåll 2"/>
+          <p:cNvSpPr>
+            <a:spLocks noGrp="1"/>
+          </p:cNvSpPr>
+          <p:nvPr>
+            <p:ph idx="1"/>
+          </p:nvPr>
+        </p:nvSpPr>
+        <p:spPr/>
+        <p:txBody>
+          <a:bodyPr/>
+          <a:lstStyle/>
+          <a:p>
+            <a:endParaRPr lang="sv-SE"/>
+          </a:p>
+        </p:txBody>
+      </p:sp>
+    </p:spTree>
+    <p:custDataLst>
+      <p:tags r:id="rId1"/>
+    </p:custDataLst>
+    <p:extLst>
+      <p:ext uri="{BB962C8B-B14F-4D97-AF65-F5344CB8AC3E}">
+        <p14:creationId xmlns:p14="http://schemas.microsoft.com/office/powerpoint/2010/main" val="3476279416"/>
+      </p:ext>
+    </p:extLst>
+  </p:cSld>
+  <p:clrMapOvr>
+    <a:masterClrMapping/>
+  </p:clrMapOvr>
+</p:sld>
+</file>
+
 <file path=ppt/slides/slide29.xml><?xml version="1.0" encoding="utf-8"?>
 <p:sld xmlns:a="http://schemas.openxmlformats.org/drawingml/2006/main" xmlns:r="http://schemas.openxmlformats.org/officeDocument/2006/relationships" xmlns:p="http://schemas.openxmlformats.org/presentationml/2006/main">
   <p:cSld>
@@ -20590,10 +20192,9 @@
           <a:lstStyle/>
           <a:p>
             <a:r>
-              <a:rPr lang="sv-SE" dirty="0" smtClean="0"/>
-              <a:t>Erfarenheter av granskning</a:t>
-            </a:r>
-            <a:endParaRPr lang="sv-SE" dirty="0"/>
+              <a:rPr lang="sv-SE" dirty="0"/>
+              <a:t>Profiler</a:t>
+            </a:r>
           </a:p>
         </p:txBody>
       </p:sp>
@@ -20612,21 +20213,7 @@
           <a:bodyPr/>
           <a:lstStyle/>
           <a:p>
-            <a:r>
-              <a:rPr lang="sv-SE" dirty="0" smtClean="0"/>
-              <a:t>Vi anser att det är bättre med informell granskning när det gäller kod av denna storlek och på denn</a:t>
-            </a:r>
-            <a:r>
-              <a:rPr lang="sv-SE" dirty="0" smtClean="0"/>
-              <a:t>a nivå. </a:t>
-            </a:r>
-          </a:p>
-          <a:p>
-            <a:r>
-              <a:rPr lang="sv-SE" dirty="0" smtClean="0"/>
-              <a:t>Det bästa med inspektionen var att man fick en idé om vilka saker man själv behöver tänka på i framtiden. Möjligtvis att man gör en egen lista med saker man har svårt med eller brukar missa, så att man själv kan hålla koll på att man kodar på ett bra sätt och får bra vanor. </a:t>
-            </a:r>
-            <a:endParaRPr lang="sv-SE" dirty="0"/>
+            <a:endParaRPr lang="sv-SE"/>
           </a:p>
         </p:txBody>
       </p:sp>
@@ -20636,7 +20223,7 @@
     </p:custDataLst>
     <p:extLst>
       <p:ext uri="{BB962C8B-B14F-4D97-AF65-F5344CB8AC3E}">
-        <p14:creationId xmlns:p14="http://schemas.microsoft.com/office/powerpoint/2010/main" val="3676843999"/>
+        <p14:creationId xmlns:p14="http://schemas.microsoft.com/office/powerpoint/2010/main" val="4124232571"/>
       </p:ext>
     </p:extLst>
   </p:cSld>
@@ -20754,302 +20341,6 @@
           <a:p>
             <a:r>
               <a:rPr lang="sv-SE" dirty="0"/>
-              <a:t>Kodkritiksystem</a:t>
-            </a:r>
-          </a:p>
-        </p:txBody>
-      </p:sp>
-      <p:sp>
-        <p:nvSpPr>
-          <p:cNvPr id="3" name="Platshållare för innehåll 2"/>
-          <p:cNvSpPr>
-            <a:spLocks noGrp="1"/>
-          </p:cNvSpPr>
-          <p:nvPr>
-            <p:ph idx="1"/>
-          </p:nvPr>
-        </p:nvSpPr>
-        <p:spPr/>
-        <p:txBody>
-          <a:bodyPr/>
-          <a:lstStyle/>
-          <a:p>
-            <a:endParaRPr lang="sv-SE"/>
-          </a:p>
-        </p:txBody>
-      </p:sp>
-    </p:spTree>
-    <p:custDataLst>
-      <p:tags r:id="rId1"/>
-    </p:custDataLst>
-    <p:extLst>
-      <p:ext uri="{BB962C8B-B14F-4D97-AF65-F5344CB8AC3E}">
-        <p14:creationId xmlns:p14="http://schemas.microsoft.com/office/powerpoint/2010/main" val="847618868"/>
-      </p:ext>
-    </p:extLst>
-  </p:cSld>
-  <p:clrMapOvr>
-    <a:masterClrMapping/>
-  </p:clrMapOvr>
-</p:sld>
-</file>
-
-<file path=ppt/slides/slide31.xml><?xml version="1.0" encoding="utf-8"?>
-<p:sld xmlns:a="http://schemas.openxmlformats.org/drawingml/2006/main" xmlns:r="http://schemas.openxmlformats.org/officeDocument/2006/relationships" xmlns:p="http://schemas.openxmlformats.org/presentationml/2006/main">
-  <p:cSld>
-    <p:spTree>
-      <p:nvGrpSpPr>
-        <p:cNvPr id="1" name=""/>
-        <p:cNvGrpSpPr/>
-        <p:nvPr/>
-      </p:nvGrpSpPr>
-      <p:grpSpPr>
-        <a:xfrm>
-          <a:off x="0" y="0"/>
-          <a:ext cx="0" cy="0"/>
-          <a:chOff x="0" y="0"/>
-          <a:chExt cx="0" cy="0"/>
-        </a:xfrm>
-      </p:grpSpPr>
-      <p:sp>
-        <p:nvSpPr>
-          <p:cNvPr id="2" name="Rubrik 1"/>
-          <p:cNvSpPr>
-            <a:spLocks noGrp="1"/>
-          </p:cNvSpPr>
-          <p:nvPr>
-            <p:ph type="title"/>
-          </p:nvPr>
-        </p:nvSpPr>
-        <p:spPr/>
-        <p:txBody>
-          <a:bodyPr/>
-          <a:lstStyle/>
-          <a:p>
-            <a:r>
-              <a:rPr lang="sv-SE" dirty="0"/>
-              <a:t>Statiska mått</a:t>
-            </a:r>
-          </a:p>
-        </p:txBody>
-      </p:sp>
-      <p:sp>
-        <p:nvSpPr>
-          <p:cNvPr id="3" name="Platshållare för innehåll 2"/>
-          <p:cNvSpPr>
-            <a:spLocks noGrp="1"/>
-          </p:cNvSpPr>
-          <p:nvPr>
-            <p:ph idx="1"/>
-          </p:nvPr>
-        </p:nvSpPr>
-        <p:spPr/>
-        <p:txBody>
-          <a:bodyPr/>
-          <a:lstStyle/>
-          <a:p>
-            <a:endParaRPr lang="sv-SE"/>
-          </a:p>
-        </p:txBody>
-      </p:sp>
-    </p:spTree>
-    <p:custDataLst>
-      <p:tags r:id="rId1"/>
-    </p:custDataLst>
-    <p:extLst>
-      <p:ext uri="{BB962C8B-B14F-4D97-AF65-F5344CB8AC3E}">
-        <p14:creationId xmlns:p14="http://schemas.microsoft.com/office/powerpoint/2010/main" val="3620096591"/>
-      </p:ext>
-    </p:extLst>
-  </p:cSld>
-  <p:clrMapOvr>
-    <a:masterClrMapping/>
-  </p:clrMapOvr>
-</p:sld>
-</file>
-
-<file path=ppt/slides/slide32.xml><?xml version="1.0" encoding="utf-8"?>
-<p:sld xmlns:a="http://schemas.openxmlformats.org/drawingml/2006/main" xmlns:r="http://schemas.openxmlformats.org/officeDocument/2006/relationships" xmlns:p="http://schemas.openxmlformats.org/presentationml/2006/main">
-  <p:cSld>
-    <p:spTree>
-      <p:nvGrpSpPr>
-        <p:cNvPr id="1" name=""/>
-        <p:cNvGrpSpPr/>
-        <p:nvPr/>
-      </p:nvGrpSpPr>
-      <p:grpSpPr>
-        <a:xfrm>
-          <a:off x="0" y="0"/>
-          <a:ext cx="0" cy="0"/>
-          <a:chOff x="0" y="0"/>
-          <a:chExt cx="0" cy="0"/>
-        </a:xfrm>
-      </p:grpSpPr>
-      <p:sp>
-        <p:nvSpPr>
-          <p:cNvPr id="2" name="Rubrik 1"/>
-          <p:cNvSpPr>
-            <a:spLocks noGrp="1"/>
-          </p:cNvSpPr>
-          <p:nvPr>
-            <p:ph type="title"/>
-          </p:nvPr>
-        </p:nvSpPr>
-        <p:spPr/>
-        <p:txBody>
-          <a:bodyPr/>
-          <a:lstStyle/>
-          <a:p>
-            <a:r>
-              <a:rPr lang="sv-SE" dirty="0"/>
-              <a:t>Täckningsgrad</a:t>
-            </a:r>
-          </a:p>
-        </p:txBody>
-      </p:sp>
-      <p:sp>
-        <p:nvSpPr>
-          <p:cNvPr id="3" name="Platshållare för innehåll 2"/>
-          <p:cNvSpPr>
-            <a:spLocks noGrp="1"/>
-          </p:cNvSpPr>
-          <p:nvPr>
-            <p:ph idx="1"/>
-          </p:nvPr>
-        </p:nvSpPr>
-        <p:spPr/>
-        <p:txBody>
-          <a:bodyPr/>
-          <a:lstStyle/>
-          <a:p>
-            <a:endParaRPr lang="sv-SE"/>
-          </a:p>
-        </p:txBody>
-      </p:sp>
-    </p:spTree>
-    <p:custDataLst>
-      <p:tags r:id="rId1"/>
-    </p:custDataLst>
-    <p:extLst>
-      <p:ext uri="{BB962C8B-B14F-4D97-AF65-F5344CB8AC3E}">
-        <p14:creationId xmlns:p14="http://schemas.microsoft.com/office/powerpoint/2010/main" val="3476279416"/>
-      </p:ext>
-    </p:extLst>
-  </p:cSld>
-  <p:clrMapOvr>
-    <a:masterClrMapping/>
-  </p:clrMapOvr>
-</p:sld>
-</file>
-
-<file path=ppt/slides/slide33.xml><?xml version="1.0" encoding="utf-8"?>
-<p:sld xmlns:a="http://schemas.openxmlformats.org/drawingml/2006/main" xmlns:r="http://schemas.openxmlformats.org/officeDocument/2006/relationships" xmlns:p="http://schemas.openxmlformats.org/presentationml/2006/main">
-  <p:cSld>
-    <p:spTree>
-      <p:nvGrpSpPr>
-        <p:cNvPr id="1" name=""/>
-        <p:cNvGrpSpPr/>
-        <p:nvPr/>
-      </p:nvGrpSpPr>
-      <p:grpSpPr>
-        <a:xfrm>
-          <a:off x="0" y="0"/>
-          <a:ext cx="0" cy="0"/>
-          <a:chOff x="0" y="0"/>
-          <a:chExt cx="0" cy="0"/>
-        </a:xfrm>
-      </p:grpSpPr>
-      <p:sp>
-        <p:nvSpPr>
-          <p:cNvPr id="2" name="Rubrik 1"/>
-          <p:cNvSpPr>
-            <a:spLocks noGrp="1"/>
-          </p:cNvSpPr>
-          <p:nvPr>
-            <p:ph type="title"/>
-          </p:nvPr>
-        </p:nvSpPr>
-        <p:spPr/>
-        <p:txBody>
-          <a:bodyPr/>
-          <a:lstStyle/>
-          <a:p>
-            <a:r>
-              <a:rPr lang="sv-SE" dirty="0"/>
-              <a:t>Profiler</a:t>
-            </a:r>
-          </a:p>
-        </p:txBody>
-      </p:sp>
-      <p:sp>
-        <p:nvSpPr>
-          <p:cNvPr id="3" name="Platshållare för innehåll 2"/>
-          <p:cNvSpPr>
-            <a:spLocks noGrp="1"/>
-          </p:cNvSpPr>
-          <p:nvPr>
-            <p:ph idx="1"/>
-          </p:nvPr>
-        </p:nvSpPr>
-        <p:spPr/>
-        <p:txBody>
-          <a:bodyPr/>
-          <a:lstStyle/>
-          <a:p>
-            <a:endParaRPr lang="sv-SE"/>
-          </a:p>
-        </p:txBody>
-      </p:sp>
-    </p:spTree>
-    <p:custDataLst>
-      <p:tags r:id="rId1"/>
-    </p:custDataLst>
-    <p:extLst>
-      <p:ext uri="{BB962C8B-B14F-4D97-AF65-F5344CB8AC3E}">
-        <p14:creationId xmlns:p14="http://schemas.microsoft.com/office/powerpoint/2010/main" val="4124232571"/>
-      </p:ext>
-    </p:extLst>
-  </p:cSld>
-  <p:clrMapOvr>
-    <a:masterClrMapping/>
-  </p:clrMapOvr>
-</p:sld>
-</file>
-
-<file path=ppt/slides/slide34.xml><?xml version="1.0" encoding="utf-8"?>
-<p:sld xmlns:a="http://schemas.openxmlformats.org/drawingml/2006/main" xmlns:r="http://schemas.openxmlformats.org/officeDocument/2006/relationships" xmlns:p="http://schemas.openxmlformats.org/presentationml/2006/main">
-  <p:cSld>
-    <p:spTree>
-      <p:nvGrpSpPr>
-        <p:cNvPr id="1" name=""/>
-        <p:cNvGrpSpPr/>
-        <p:nvPr/>
-      </p:nvGrpSpPr>
-      <p:grpSpPr>
-        <a:xfrm>
-          <a:off x="0" y="0"/>
-          <a:ext cx="0" cy="0"/>
-          <a:chOff x="0" y="0"/>
-          <a:chExt cx="0" cy="0"/>
-        </a:xfrm>
-      </p:grpSpPr>
-      <p:sp>
-        <p:nvSpPr>
-          <p:cNvPr id="2" name="Rubrik 1"/>
-          <p:cNvSpPr>
-            <a:spLocks noGrp="1"/>
-          </p:cNvSpPr>
-          <p:nvPr>
-            <p:ph type="title"/>
-          </p:nvPr>
-        </p:nvSpPr>
-        <p:spPr/>
-        <p:txBody>
-          <a:bodyPr/>
-          <a:lstStyle/>
-          <a:p>
-            <a:r>
-              <a:rPr lang="sv-SE" dirty="0"/>
               <a:t>Byggscript</a:t>
             </a:r>
           </a:p>
@@ -21090,7 +20381,7 @@
 </p:sld>
 </file>
 
-<file path=ppt/slides/slide35.xml><?xml version="1.0" encoding="utf-8"?>
+<file path=ppt/slides/slide31.xml><?xml version="1.0" encoding="utf-8"?>
 <p:sld xmlns:a="http://schemas.openxmlformats.org/drawingml/2006/main" xmlns:r="http://schemas.openxmlformats.org/officeDocument/2006/relationships" xmlns:p="http://schemas.openxmlformats.org/presentationml/2006/main">
   <p:cSld>
     <p:spTree>
@@ -22320,30 +21611,6 @@
 </file>
 
 <file path=ppt/tags/tag32.xml><?xml version="1.0" encoding="utf-8"?>
-<p:tagLst xmlns:a="http://schemas.openxmlformats.org/drawingml/2006/main" xmlns:r="http://schemas.openxmlformats.org/officeDocument/2006/relationships" xmlns:p="http://schemas.openxmlformats.org/presentationml/2006/main">
-  <p:tag name="ARTICULATE_SLIDE_THUMBNAIL_REFRESH" val="1"/>
-</p:tagLst>
-</file>
-
-<file path=ppt/tags/tag33.xml><?xml version="1.0" encoding="utf-8"?>
-<p:tagLst xmlns:a="http://schemas.openxmlformats.org/drawingml/2006/main" xmlns:r="http://schemas.openxmlformats.org/officeDocument/2006/relationships" xmlns:p="http://schemas.openxmlformats.org/presentationml/2006/main">
-  <p:tag name="ARTICULATE_SLIDE_THUMBNAIL_REFRESH" val="1"/>
-</p:tagLst>
-</file>
-
-<file path=ppt/tags/tag34.xml><?xml version="1.0" encoding="utf-8"?>
-<p:tagLst xmlns:a="http://schemas.openxmlformats.org/drawingml/2006/main" xmlns:r="http://schemas.openxmlformats.org/officeDocument/2006/relationships" xmlns:p="http://schemas.openxmlformats.org/presentationml/2006/main">
-  <p:tag name="ARTICULATE_SLIDE_THUMBNAIL_REFRESH" val="1"/>
-</p:tagLst>
-</file>
-
-<file path=ppt/tags/tag35.xml><?xml version="1.0" encoding="utf-8"?>
-<p:tagLst xmlns:a="http://schemas.openxmlformats.org/drawingml/2006/main" xmlns:r="http://schemas.openxmlformats.org/officeDocument/2006/relationships" xmlns:p="http://schemas.openxmlformats.org/presentationml/2006/main">
-  <p:tag name="ARTICULATE_SLIDE_THUMBNAIL_REFRESH" val="1"/>
-</p:tagLst>
-</file>
-
-<file path=ppt/tags/tag36.xml><?xml version="1.0" encoding="utf-8"?>
 <p:tagLst xmlns:a="http://schemas.openxmlformats.org/drawingml/2006/main" xmlns:r="http://schemas.openxmlformats.org/officeDocument/2006/relationships" xmlns:p="http://schemas.openxmlformats.org/presentationml/2006/main">
   <p:tag name="ARTICULATE_SLIDE_THUMBNAIL_REFRESH" val="1"/>
 </p:tagLst>

</xml_diff>

<commit_message>
added one point in TDD erfarenheter
</commit_message>
<xml_diff>
--- a/slutredovisning.pptx
+++ b/slutredovisning.pptx
@@ -18621,6 +18621,12 @@
         <p:txBody>
           <a:bodyPr/>
           <a:lstStyle/>
+          <a:p>
+            <a:r>
+              <a:rPr lang="sv-SE" dirty="0"/>
+              <a:t>För att lättare kunna tillämpa TDD, krävs bra diskussioner och tidig generell struktur för hur programmet ska fungera, och vilka klasser som ska ansvara för vad. </a:t>
+            </a:r>
+          </a:p>
           <a:p>
             <a:endParaRPr lang="sv-SE" dirty="0"/>
           </a:p>

</xml_diff>

<commit_message>
Added Class diagrams to the presentation
</commit_message>
<xml_diff>
--- a/slutredovisning.pptx
+++ b/slutredovisning.pptx
@@ -5,45 +5,46 @@
     <p:sldMasterId id="2147483648" r:id="rId1"/>
   </p:sldMasterIdLst>
   <p:notesMasterIdLst>
-    <p:notesMasterId r:id="rId33"/>
+    <p:notesMasterId r:id="rId34"/>
   </p:notesMasterIdLst>
   <p:sldIdLst>
     <p:sldId id="286" r:id="rId2"/>
     <p:sldId id="257" r:id="rId3"/>
     <p:sldId id="258" r:id="rId4"/>
-    <p:sldId id="259" r:id="rId5"/>
-    <p:sldId id="292" r:id="rId6"/>
-    <p:sldId id="290" r:id="rId7"/>
-    <p:sldId id="291" r:id="rId8"/>
-    <p:sldId id="283" r:id="rId9"/>
-    <p:sldId id="284" r:id="rId10"/>
-    <p:sldId id="285" r:id="rId11"/>
-    <p:sldId id="287" r:id="rId12"/>
-    <p:sldId id="288" r:id="rId13"/>
-    <p:sldId id="289" r:id="rId14"/>
-    <p:sldId id="260" r:id="rId15"/>
-    <p:sldId id="261" r:id="rId16"/>
-    <p:sldId id="262" r:id="rId17"/>
-    <p:sldId id="263" r:id="rId18"/>
-    <p:sldId id="264" r:id="rId19"/>
-    <p:sldId id="265" r:id="rId20"/>
-    <p:sldId id="266" r:id="rId21"/>
-    <p:sldId id="267" r:id="rId22"/>
-    <p:sldId id="268" r:id="rId23"/>
-    <p:sldId id="293" r:id="rId24"/>
-    <p:sldId id="294" r:id="rId25"/>
-    <p:sldId id="295" r:id="rId26"/>
-    <p:sldId id="276" r:id="rId27"/>
-    <p:sldId id="277" r:id="rId28"/>
-    <p:sldId id="278" r:id="rId29"/>
-    <p:sldId id="279" r:id="rId30"/>
-    <p:sldId id="280" r:id="rId31"/>
-    <p:sldId id="281" r:id="rId32"/>
+    <p:sldId id="296" r:id="rId5"/>
+    <p:sldId id="259" r:id="rId6"/>
+    <p:sldId id="292" r:id="rId7"/>
+    <p:sldId id="290" r:id="rId8"/>
+    <p:sldId id="291" r:id="rId9"/>
+    <p:sldId id="283" r:id="rId10"/>
+    <p:sldId id="284" r:id="rId11"/>
+    <p:sldId id="285" r:id="rId12"/>
+    <p:sldId id="287" r:id="rId13"/>
+    <p:sldId id="288" r:id="rId14"/>
+    <p:sldId id="289" r:id="rId15"/>
+    <p:sldId id="260" r:id="rId16"/>
+    <p:sldId id="261" r:id="rId17"/>
+    <p:sldId id="262" r:id="rId18"/>
+    <p:sldId id="263" r:id="rId19"/>
+    <p:sldId id="264" r:id="rId20"/>
+    <p:sldId id="265" r:id="rId21"/>
+    <p:sldId id="266" r:id="rId22"/>
+    <p:sldId id="267" r:id="rId23"/>
+    <p:sldId id="268" r:id="rId24"/>
+    <p:sldId id="293" r:id="rId25"/>
+    <p:sldId id="294" r:id="rId26"/>
+    <p:sldId id="295" r:id="rId27"/>
+    <p:sldId id="276" r:id="rId28"/>
+    <p:sldId id="277" r:id="rId29"/>
+    <p:sldId id="278" r:id="rId30"/>
+    <p:sldId id="279" r:id="rId31"/>
+    <p:sldId id="280" r:id="rId32"/>
+    <p:sldId id="281" r:id="rId33"/>
   </p:sldIdLst>
   <p:sldSz cx="12192000" cy="6858000"/>
   <p:notesSz cx="6858000" cy="9144000"/>
   <p:custDataLst>
-    <p:tags r:id="rId34"/>
+    <p:tags r:id="rId35"/>
   </p:custDataLst>
   <p:defaultTextStyle>
     <a:defPPr>
@@ -734,7 +735,7 @@
     </p:spTree>
     <p:extLst>
       <p:ext uri="{BB962C8B-B14F-4D97-AF65-F5344CB8AC3E}">
-        <p14:creationId xmlns:p14="http://schemas.microsoft.com/office/powerpoint/2010/main" val="3529345129"/>
+        <p14:creationId xmlns:p14="http://schemas.microsoft.com/office/powerpoint/2010/main" val="2111164777"/>
       </p:ext>
     </p:extLst>
   </p:cSld>
@@ -897,7 +898,7 @@
     </p:spTree>
     <p:extLst>
       <p:ext uri="{BB962C8B-B14F-4D97-AF65-F5344CB8AC3E}">
-        <p14:creationId xmlns:p14="http://schemas.microsoft.com/office/powerpoint/2010/main" val="2412738235"/>
+        <p14:creationId xmlns:p14="http://schemas.microsoft.com/office/powerpoint/2010/main" val="3529345129"/>
       </p:ext>
     </p:extLst>
   </p:cSld>
@@ -1060,7 +1061,7 @@
     </p:spTree>
     <p:extLst>
       <p:ext uri="{BB962C8B-B14F-4D97-AF65-F5344CB8AC3E}">
-        <p14:creationId xmlns:p14="http://schemas.microsoft.com/office/powerpoint/2010/main" val="821439361"/>
+        <p14:creationId xmlns:p14="http://schemas.microsoft.com/office/powerpoint/2010/main" val="2412738235"/>
       </p:ext>
     </p:extLst>
   </p:cSld>
@@ -1223,7 +1224,7 @@
     </p:spTree>
     <p:extLst>
       <p:ext uri="{BB962C8B-B14F-4D97-AF65-F5344CB8AC3E}">
-        <p14:creationId xmlns:p14="http://schemas.microsoft.com/office/powerpoint/2010/main" val="1174372183"/>
+        <p14:creationId xmlns:p14="http://schemas.microsoft.com/office/powerpoint/2010/main" val="821439361"/>
       </p:ext>
     </p:extLst>
   </p:cSld>
@@ -1295,8 +1296,64 @@
               <a:defRPr/>
             </a:pPr>
             <a:r>
-              <a:rPr lang="sv-SE" dirty="0"/>
-              <a:t>En diskussion om vilka era erfarenheter ni dragit av att tillämpa TDD. Det finns inget rätt eller fel här. Enda sättet att bli underkända är att bara fuska över punkten och säga något pliktskyldigt.</a:t>
+              <a:rPr lang="sv-SE" sz="1200" kern="1200" dirty="0">
+                <a:solidFill>
+                  <a:schemeClr val="tx1"/>
+                </a:solidFill>
+                <a:effectLst/>
+                <a:latin typeface="+mn-lt"/>
+                <a:ea typeface="+mn-ea"/>
+                <a:cs typeface="+mn-cs"/>
+              </a:rPr>
+              <a:t>Två eller tre exempel per</a:t>
+            </a:r>
+            <a:r>
+              <a:rPr lang="sv-SE" sz="1200" kern="1200" baseline="0" dirty="0">
+                <a:solidFill>
+                  <a:schemeClr val="tx1"/>
+                </a:solidFill>
+                <a:effectLst/>
+                <a:latin typeface="+mn-lt"/>
+                <a:ea typeface="+mn-ea"/>
+                <a:cs typeface="+mn-cs"/>
+              </a:rPr>
+              <a:t> person i projektet på hur ni tillämpat TDD med koden för såväl testfallen som koden som ska testas. (Det kan alltså bli upp till 15 sidor för en fempersonersgrupp.) Exemplen ska vara från olika </a:t>
+            </a:r>
+            <a:r>
+              <a:rPr lang="sv-SE" sz="1200" kern="1200" baseline="0" dirty="0" err="1">
+                <a:solidFill>
+                  <a:schemeClr val="tx1"/>
+                </a:solidFill>
+                <a:effectLst/>
+                <a:latin typeface="+mn-lt"/>
+                <a:ea typeface="+mn-ea"/>
+                <a:cs typeface="+mn-cs"/>
+              </a:rPr>
+              <a:t>faser</a:t>
+            </a:r>
+            <a:r>
+              <a:rPr lang="sv-SE" sz="1200" kern="1200" dirty="0" err="1">
+                <a:solidFill>
+                  <a:schemeClr val="tx1"/>
+                </a:solidFill>
+                <a:effectLst/>
+                <a:latin typeface="+mn-lt"/>
+                <a:ea typeface="+mn-ea"/>
+                <a:cs typeface="+mn-cs"/>
+              </a:rPr>
+              <a:t>i</a:t>
+            </a:r>
+            <a:r>
+              <a:rPr lang="sv-SE" sz="1200" kern="1200" dirty="0">
+                <a:solidFill>
+                  <a:schemeClr val="tx1"/>
+                </a:solidFill>
+                <a:effectLst/>
+                <a:latin typeface="+mn-lt"/>
+                <a:ea typeface="+mn-ea"/>
+                <a:cs typeface="+mn-cs"/>
+              </a:rPr>
+              <a:t> projektet. Om ni har använt versionshanteringssystemet ordentligt bör all information som efterfrågas här finnas i det. Tänk på att kodexemplen ska vara läsbara. </a:t>
             </a:r>
           </a:p>
           <a:p>
@@ -1330,7 +1387,7 @@
     </p:spTree>
     <p:extLst>
       <p:ext uri="{BB962C8B-B14F-4D97-AF65-F5344CB8AC3E}">
-        <p14:creationId xmlns:p14="http://schemas.microsoft.com/office/powerpoint/2010/main" val="4160569562"/>
+        <p14:creationId xmlns:p14="http://schemas.microsoft.com/office/powerpoint/2010/main" val="1174372183"/>
       </p:ext>
     </p:extLst>
   </p:cSld>
@@ -1402,16 +1459,8 @@
               <a:defRPr/>
             </a:pPr>
             <a:r>
-              <a:rPr lang="sv-SE" sz="1200" kern="1200" dirty="0">
-                <a:solidFill>
-                  <a:schemeClr val="tx1"/>
-                </a:solidFill>
-                <a:effectLst/>
-                <a:latin typeface="+mn-lt"/>
-                <a:ea typeface="+mn-ea"/>
-                <a:cs typeface="+mn-cs"/>
-              </a:rPr>
-              <a:t>En kort textuell presentation av vad ni valt ut för att tillämpa ekvivalensklassuppdelning på. Ni ska kort motivera valet, och ge tillräckligt med information för att det ska gå att bedöma er. Detta avsnitt och de följande (till och med testmatrisen) ska finnas för samtliga delar ni tillämpat ekvivalensklassuppdelning på. Om ni inte tillämpat ekvivalensklassuppdelning tar ni bort dessa bilder.</a:t>
+              <a:rPr lang="sv-SE" dirty="0"/>
+              <a:t>En diskussion om vilka era erfarenheter ni dragit av att tillämpa TDD. Det finns inget rätt eller fel här. Enda sättet att bli underkända är att bara fuska över punkten och säga något pliktskyldigt.</a:t>
             </a:r>
           </a:p>
           <a:p>
@@ -1445,7 +1494,7 @@
     </p:spTree>
     <p:extLst>
       <p:ext uri="{BB962C8B-B14F-4D97-AF65-F5344CB8AC3E}">
-        <p14:creationId xmlns:p14="http://schemas.microsoft.com/office/powerpoint/2010/main" val="2473427308"/>
+        <p14:creationId xmlns:p14="http://schemas.microsoft.com/office/powerpoint/2010/main" val="4160569562"/>
       </p:ext>
     </p:extLst>
   </p:cSld>
@@ -1526,29 +1575,8 @@
                 <a:ea typeface="+mn-ea"/>
                 <a:cs typeface="+mn-cs"/>
               </a:rPr>
-              <a:t>Samtliga ekvivalensklasser för denna del presenterade på ett tydligt sätt. Använd</a:t>
-            </a:r>
-            <a:r>
-              <a:rPr lang="sv-SE" sz="1200" kern="1200" baseline="0" dirty="0">
-                <a:solidFill>
-                  <a:schemeClr val="tx1"/>
-                </a:solidFill>
-                <a:effectLst/>
-                <a:latin typeface="+mn-lt"/>
-                <a:ea typeface="+mn-ea"/>
-                <a:cs typeface="+mn-cs"/>
-              </a:rPr>
-              <a:t> gärna flera sidor om det behövs.</a:t>
-            </a:r>
-            <a:endParaRPr lang="sv-SE" sz="1200" kern="1200" dirty="0">
-              <a:solidFill>
-                <a:schemeClr val="tx1"/>
-              </a:solidFill>
-              <a:effectLst/>
-              <a:latin typeface="+mn-lt"/>
-              <a:ea typeface="+mn-ea"/>
-              <a:cs typeface="+mn-cs"/>
-            </a:endParaRPr>
+              <a:t>En kort textuell presentation av vad ni valt ut för att tillämpa ekvivalensklassuppdelning på. Ni ska kort motivera valet, och ge tillräckligt med information för att det ska gå att bedöma er. Detta avsnitt och de följande (till och med testmatrisen) ska finnas för samtliga delar ni tillämpat ekvivalensklassuppdelning på. Om ni inte tillämpat ekvivalensklassuppdelning tar ni bort dessa bilder.</a:t>
+            </a:r>
           </a:p>
           <a:p>
             <a:endParaRPr lang="sv-SE" dirty="0"/>
@@ -1581,7 +1609,7 @@
     </p:spTree>
     <p:extLst>
       <p:ext uri="{BB962C8B-B14F-4D97-AF65-F5344CB8AC3E}">
-        <p14:creationId xmlns:p14="http://schemas.microsoft.com/office/powerpoint/2010/main" val="2613784504"/>
+        <p14:creationId xmlns:p14="http://schemas.microsoft.com/office/powerpoint/2010/main" val="2473427308"/>
       </p:ext>
     </p:extLst>
   </p:cSld>
@@ -1635,6 +1663,23 @@
           <a:bodyPr/>
           <a:lstStyle/>
           <a:p>
+            <a:pPr marL="0" marR="0" lvl="0" indent="0" algn="l" defTabSz="914400" rtl="0" eaLnBrk="1" fontAlgn="auto" latinLnBrk="0" hangingPunct="1">
+              <a:lnSpc>
+                <a:spcPct val="100000"/>
+              </a:lnSpc>
+              <a:spcBef>
+                <a:spcPts val="0"/>
+              </a:spcBef>
+              <a:spcAft>
+                <a:spcPts val="0"/>
+              </a:spcAft>
+              <a:buClrTx/>
+              <a:buSzTx/>
+              <a:buFontTx/>
+              <a:buNone/>
+              <a:tabLst/>
+              <a:defRPr/>
+            </a:pPr>
             <a:r>
               <a:rPr lang="sv-SE" sz="1200" kern="1200" dirty="0">
                 <a:solidFill>
@@ -1645,8 +1690,31 @@
                 <a:ea typeface="+mn-ea"/>
                 <a:cs typeface="+mn-cs"/>
               </a:rPr>
-              <a:t>Testfallen som ni fått fram från ekvivalensklasserna. Observera att vi inte vill ha någon kod här, utan bara en tydlig presentation av testfallen i någon lämplig tabellform. </a:t>
-            </a:r>
+              <a:t>Samtliga ekvivalensklasser för denna del presenterade på ett tydligt sätt. Använd</a:t>
+            </a:r>
+            <a:r>
+              <a:rPr lang="sv-SE" sz="1200" kern="1200" baseline="0" dirty="0">
+                <a:solidFill>
+                  <a:schemeClr val="tx1"/>
+                </a:solidFill>
+                <a:effectLst/>
+                <a:latin typeface="+mn-lt"/>
+                <a:ea typeface="+mn-ea"/>
+                <a:cs typeface="+mn-cs"/>
+              </a:rPr>
+              <a:t> gärna flera sidor om det behövs.</a:t>
+            </a:r>
+            <a:endParaRPr lang="sv-SE" sz="1200" kern="1200" dirty="0">
+              <a:solidFill>
+                <a:schemeClr val="tx1"/>
+              </a:solidFill>
+              <a:effectLst/>
+              <a:latin typeface="+mn-lt"/>
+              <a:ea typeface="+mn-ea"/>
+              <a:cs typeface="+mn-cs"/>
+            </a:endParaRPr>
+          </a:p>
+          <a:p>
             <a:endParaRPr lang="sv-SE" dirty="0"/>
           </a:p>
         </p:txBody>
@@ -1677,7 +1745,7 @@
     </p:spTree>
     <p:extLst>
       <p:ext uri="{BB962C8B-B14F-4D97-AF65-F5344CB8AC3E}">
-        <p14:creationId xmlns:p14="http://schemas.microsoft.com/office/powerpoint/2010/main" val="3514630878"/>
+        <p14:creationId xmlns:p14="http://schemas.microsoft.com/office/powerpoint/2010/main" val="2613784504"/>
       </p:ext>
     </p:extLst>
   </p:cSld>
@@ -1731,23 +1799,6 @@
           <a:bodyPr/>
           <a:lstStyle/>
           <a:p>
-            <a:pPr marL="0" marR="0" lvl="0" indent="0" algn="l" defTabSz="914400" rtl="0" eaLnBrk="1" fontAlgn="auto" latinLnBrk="0" hangingPunct="1">
-              <a:lnSpc>
-                <a:spcPct val="100000"/>
-              </a:lnSpc>
-              <a:spcBef>
-                <a:spcPts val="0"/>
-              </a:spcBef>
-              <a:spcAft>
-                <a:spcPts val="0"/>
-              </a:spcAft>
-              <a:buClrTx/>
-              <a:buSzTx/>
-              <a:buFontTx/>
-              <a:buNone/>
-              <a:tabLst/>
-              <a:defRPr/>
-            </a:pPr>
             <a:r>
               <a:rPr lang="sv-SE" sz="1200" kern="1200" dirty="0">
                 <a:solidFill>
@@ -1758,10 +1809,8 @@
                 <a:ea typeface="+mn-ea"/>
                 <a:cs typeface="+mn-cs"/>
               </a:rPr>
-              <a:t>En testmatris som visar sambandet mellan ekvivalensklasserna och testfallen för denna del.</a:t>
-            </a:r>
-          </a:p>
-          <a:p>
+              <a:t>Testfallen som ni fått fram från ekvivalensklasserna. Observera att vi inte vill ha någon kod här, utan bara en tydlig presentation av testfallen i någon lämplig tabellform. </a:t>
+            </a:r>
             <a:endParaRPr lang="sv-SE" dirty="0"/>
           </a:p>
         </p:txBody>
@@ -1792,7 +1841,7 @@
     </p:spTree>
     <p:extLst>
       <p:ext uri="{BB962C8B-B14F-4D97-AF65-F5344CB8AC3E}">
-        <p14:creationId xmlns:p14="http://schemas.microsoft.com/office/powerpoint/2010/main" val="3837171916"/>
+        <p14:creationId xmlns:p14="http://schemas.microsoft.com/office/powerpoint/2010/main" val="3514630878"/>
       </p:ext>
     </p:extLst>
   </p:cSld>
@@ -1873,7 +1922,7 @@
                 <a:ea typeface="+mn-ea"/>
                 <a:cs typeface="+mn-cs"/>
               </a:rPr>
-              <a:t>En kort textuell presentation av vad ni valt ut för att tillämpa tillståndsmaskiner på och vilket eller vilka kriterier ni använder för att ta fram testfall från maskinen. Ni ska kort motivera valet, och ge tillräckligt med information för att det ska gå att bedöma er. Detta avsnitt och de följande ska finnas för samtliga delar ni tillämpat tillståndsmaskiner på. Om ni inte tillämpat tillståndsmaskiner tar ni bort dessa bilder.</a:t>
+              <a:t>En testmatris som visar sambandet mellan ekvivalensklasserna och testfallen för denna del.</a:t>
             </a:r>
           </a:p>
           <a:p>
@@ -1907,7 +1956,7 @@
     </p:spTree>
     <p:extLst>
       <p:ext uri="{BB962C8B-B14F-4D97-AF65-F5344CB8AC3E}">
-        <p14:creationId xmlns:p14="http://schemas.microsoft.com/office/powerpoint/2010/main" val="2041626993"/>
+        <p14:creationId xmlns:p14="http://schemas.microsoft.com/office/powerpoint/2010/main" val="3837171916"/>
       </p:ext>
     </p:extLst>
   </p:cSld>
@@ -2045,10 +2094,38 @@
           <a:bodyPr/>
           <a:lstStyle/>
           <a:p>
-            <a:r>
-              <a:rPr lang="sv-SE" dirty="0"/>
-              <a:t>Själva tillståndsmaskinen</a:t>
-            </a:r>
+            <a:pPr marL="0" marR="0" lvl="0" indent="0" algn="l" defTabSz="914400" rtl="0" eaLnBrk="1" fontAlgn="auto" latinLnBrk="0" hangingPunct="1">
+              <a:lnSpc>
+                <a:spcPct val="100000"/>
+              </a:lnSpc>
+              <a:spcBef>
+                <a:spcPts val="0"/>
+              </a:spcBef>
+              <a:spcAft>
+                <a:spcPts val="0"/>
+              </a:spcAft>
+              <a:buClrTx/>
+              <a:buSzTx/>
+              <a:buFontTx/>
+              <a:buNone/>
+              <a:tabLst/>
+              <a:defRPr/>
+            </a:pPr>
+            <a:r>
+              <a:rPr lang="sv-SE" sz="1200" kern="1200" dirty="0">
+                <a:solidFill>
+                  <a:schemeClr val="tx1"/>
+                </a:solidFill>
+                <a:effectLst/>
+                <a:latin typeface="+mn-lt"/>
+                <a:ea typeface="+mn-ea"/>
+                <a:cs typeface="+mn-cs"/>
+              </a:rPr>
+              <a:t>En kort textuell presentation av vad ni valt ut för att tillämpa tillståndsmaskiner på och vilket eller vilka kriterier ni använder för att ta fram testfall från maskinen. Ni ska kort motivera valet, och ge tillräckligt med information för att det ska gå att bedöma er. Detta avsnitt och de följande ska finnas för samtliga delar ni tillämpat tillståndsmaskiner på. Om ni inte tillämpat tillståndsmaskiner tar ni bort dessa bilder.</a:t>
+            </a:r>
+          </a:p>
+          <a:p>
+            <a:endParaRPr lang="sv-SE" dirty="0"/>
           </a:p>
         </p:txBody>
       </p:sp>
@@ -2078,7 +2155,7 @@
     </p:spTree>
     <p:extLst>
       <p:ext uri="{BB962C8B-B14F-4D97-AF65-F5344CB8AC3E}">
-        <p14:creationId xmlns:p14="http://schemas.microsoft.com/office/powerpoint/2010/main" val="1235134485"/>
+        <p14:creationId xmlns:p14="http://schemas.microsoft.com/office/powerpoint/2010/main" val="2041626993"/>
       </p:ext>
     </p:extLst>
   </p:cSld>
@@ -2132,39 +2209,10 @@
           <a:bodyPr/>
           <a:lstStyle/>
           <a:p>
-            <a:pPr marL="0" marR="0" lvl="0" indent="0" algn="l" defTabSz="914400" rtl="0" eaLnBrk="1" fontAlgn="auto" latinLnBrk="0" hangingPunct="1">
-              <a:lnSpc>
-                <a:spcPct val="100000"/>
-              </a:lnSpc>
-              <a:spcBef>
-                <a:spcPts val="0"/>
-              </a:spcBef>
-              <a:spcAft>
-                <a:spcPts val="0"/>
-              </a:spcAft>
-              <a:buClrTx/>
-              <a:buSzTx/>
-              <a:buFontTx/>
-              <a:buNone/>
-              <a:tabLst/>
-              <a:defRPr/>
-            </a:pPr>
-            <a:r>
-              <a:rPr lang="sv-SE" sz="1200" kern="1200" dirty="0">
-                <a:solidFill>
-                  <a:schemeClr val="tx1"/>
-                </a:solidFill>
-                <a:effectLst/>
-                <a:latin typeface="+mn-lt"/>
-                <a:ea typeface="+mn-ea"/>
-                <a:cs typeface="+mn-cs"/>
-              </a:rPr>
-              <a:t>Testfallen som ni fått fram från tillståndsmaskinen. Observera att vi inte vill ha någon kod här, utan bara en tydlig presentation av testfallen i någon lämplig tabellform. </a:t>
-            </a:r>
-            <a:endParaRPr lang="sv-SE" dirty="0"/>
-          </a:p>
-          <a:p>
-            <a:endParaRPr lang="sv-SE" dirty="0"/>
+            <a:r>
+              <a:rPr lang="sv-SE" dirty="0"/>
+              <a:t>Själva tillståndsmaskinen</a:t>
+            </a:r>
           </a:p>
         </p:txBody>
       </p:sp>
@@ -2194,7 +2242,7 @@
     </p:spTree>
     <p:extLst>
       <p:ext uri="{BB962C8B-B14F-4D97-AF65-F5344CB8AC3E}">
-        <p14:creationId xmlns:p14="http://schemas.microsoft.com/office/powerpoint/2010/main" val="556359333"/>
+        <p14:creationId xmlns:p14="http://schemas.microsoft.com/office/powerpoint/2010/main" val="1235134485"/>
       </p:ext>
     </p:extLst>
   </p:cSld>
@@ -2275,77 +2323,9 @@
                 <a:ea typeface="+mn-ea"/>
                 <a:cs typeface="+mn-cs"/>
               </a:rPr>
-              <a:t>En testmatris (eller annan</a:t>
-            </a:r>
-            <a:r>
-              <a:rPr lang="sv-SE" sz="1200" kern="1200" baseline="0" dirty="0">
-                <a:solidFill>
-                  <a:schemeClr val="tx1"/>
-                </a:solidFill>
-                <a:effectLst/>
-                <a:latin typeface="+mn-lt"/>
-                <a:ea typeface="+mn-ea"/>
-                <a:cs typeface="+mn-cs"/>
-              </a:rPr>
-              <a:t> lämplig form)</a:t>
-            </a:r>
-            <a:r>
-              <a:rPr lang="sv-SE" sz="1200" kern="1200" dirty="0">
-                <a:solidFill>
-                  <a:schemeClr val="tx1"/>
-                </a:solidFill>
-                <a:effectLst/>
-                <a:latin typeface="+mn-lt"/>
-                <a:ea typeface="+mn-ea"/>
-                <a:cs typeface="+mn-cs"/>
-              </a:rPr>
-              <a:t> som visar sambandet mellan tillståndsmaskinen och testfallen för denna del så att det går att se att ni tillämpat de kriterier</a:t>
-            </a:r>
-            <a:r>
-              <a:rPr lang="sv-SE" sz="1200" kern="1200" baseline="0" dirty="0">
-                <a:solidFill>
-                  <a:schemeClr val="tx1"/>
-                </a:solidFill>
-                <a:effectLst/>
-                <a:latin typeface="+mn-lt"/>
-                <a:ea typeface="+mn-ea"/>
-                <a:cs typeface="+mn-cs"/>
-              </a:rPr>
-              <a:t> ni satt upp för att ta fram testfall</a:t>
-            </a:r>
-            <a:r>
-              <a:rPr lang="sv-SE" sz="1200" kern="1200" dirty="0">
-                <a:solidFill>
-                  <a:schemeClr val="tx1"/>
-                </a:solidFill>
-                <a:effectLst/>
-                <a:latin typeface="+mn-lt"/>
-                <a:ea typeface="+mn-ea"/>
-                <a:cs typeface="+mn-cs"/>
-              </a:rPr>
-              <a:t>. Om detta tydligt framgår från testfallen</a:t>
-            </a:r>
-            <a:r>
-              <a:rPr lang="sv-SE" sz="1200" kern="1200" baseline="0" dirty="0">
-                <a:solidFill>
-                  <a:schemeClr val="tx1"/>
-                </a:solidFill>
-                <a:effectLst/>
-                <a:latin typeface="+mn-lt"/>
-                <a:ea typeface="+mn-ea"/>
-                <a:cs typeface="+mn-cs"/>
-              </a:rPr>
-              <a:t> så kan denna bild plockas bort.</a:t>
-            </a:r>
-            <a:endParaRPr lang="sv-SE" sz="1200" kern="1200" dirty="0">
-              <a:solidFill>
-                <a:schemeClr val="tx1"/>
-              </a:solidFill>
-              <a:effectLst/>
-              <a:latin typeface="+mn-lt"/>
-              <a:ea typeface="+mn-ea"/>
-              <a:cs typeface="+mn-cs"/>
-            </a:endParaRPr>
+              <a:t>Testfallen som ni fått fram från tillståndsmaskinen. Observera att vi inte vill ha någon kod här, utan bara en tydlig presentation av testfallen i någon lämplig tabellform. </a:t>
+            </a:r>
+            <a:endParaRPr lang="sv-SE" dirty="0"/>
           </a:p>
           <a:p>
             <a:endParaRPr lang="sv-SE" dirty="0"/>
@@ -2378,7 +2358,7 @@
     </p:spTree>
     <p:extLst>
       <p:ext uri="{BB962C8B-B14F-4D97-AF65-F5344CB8AC3E}">
-        <p14:creationId xmlns:p14="http://schemas.microsoft.com/office/powerpoint/2010/main" val="61413010"/>
+        <p14:creationId xmlns:p14="http://schemas.microsoft.com/office/powerpoint/2010/main" val="556359333"/>
       </p:ext>
     </p:extLst>
   </p:cSld>
@@ -2450,7 +2430,7 @@
               <a:defRPr/>
             </a:pPr>
             <a:r>
-              <a:rPr lang="sv-SE" sz="1200" kern="1200" dirty="0" smtClean="0">
+              <a:rPr lang="sv-SE" sz="1200" kern="1200" dirty="0">
                 <a:solidFill>
                   <a:schemeClr val="tx1"/>
                 </a:solidFill>
@@ -2459,10 +2439,10 @@
                 <a:ea typeface="+mn-ea"/>
                 <a:cs typeface="+mn-cs"/>
               </a:rPr>
-              <a:t>En kort presentation av den del av koden ni valt ut för att göra en formell granskning av och processen ni använt er av inklusive eventuella checklistor, scenarier, </a:t>
-            </a:r>
-            <a:r>
-              <a:rPr lang="sv-SE" sz="1200" kern="1200" dirty="0" err="1" smtClean="0">
+              <a:t>En testmatris (eller annan</a:t>
+            </a:r>
+            <a:r>
+              <a:rPr lang="sv-SE" sz="1200" kern="1200" baseline="0" dirty="0">
                 <a:solidFill>
                   <a:schemeClr val="tx1"/>
                 </a:solidFill>
@@ -2471,10 +2451,10 @@
                 <a:ea typeface="+mn-ea"/>
                 <a:cs typeface="+mn-cs"/>
               </a:rPr>
-              <a:t>edyl</a:t>
-            </a:r>
-            <a:r>
-              <a:rPr lang="sv-SE" sz="1200" kern="1200" dirty="0" smtClean="0">
+              <a:t> lämplig form)</a:t>
+            </a:r>
+            <a:r>
+              <a:rPr lang="sv-SE" sz="1200" kern="1200" dirty="0">
                 <a:solidFill>
                   <a:schemeClr val="tx1"/>
                 </a:solidFill>
@@ -2483,8 +2463,53 @@
                 <a:ea typeface="+mn-ea"/>
                 <a:cs typeface="+mn-cs"/>
               </a:rPr>
-              <a:t>. Ni ska kort motivera valen, och ge tillräckligt med information för att det ska gå att bedöma er. </a:t>
-            </a:r>
+              <a:t> som visar sambandet mellan tillståndsmaskinen och testfallen för denna del så att det går att se att ni tillämpat de kriterier</a:t>
+            </a:r>
+            <a:r>
+              <a:rPr lang="sv-SE" sz="1200" kern="1200" baseline="0" dirty="0">
+                <a:solidFill>
+                  <a:schemeClr val="tx1"/>
+                </a:solidFill>
+                <a:effectLst/>
+                <a:latin typeface="+mn-lt"/>
+                <a:ea typeface="+mn-ea"/>
+                <a:cs typeface="+mn-cs"/>
+              </a:rPr>
+              <a:t> ni satt upp för att ta fram testfall</a:t>
+            </a:r>
+            <a:r>
+              <a:rPr lang="sv-SE" sz="1200" kern="1200" dirty="0">
+                <a:solidFill>
+                  <a:schemeClr val="tx1"/>
+                </a:solidFill>
+                <a:effectLst/>
+                <a:latin typeface="+mn-lt"/>
+                <a:ea typeface="+mn-ea"/>
+                <a:cs typeface="+mn-cs"/>
+              </a:rPr>
+              <a:t>. Om detta tydligt framgår från testfallen</a:t>
+            </a:r>
+            <a:r>
+              <a:rPr lang="sv-SE" sz="1200" kern="1200" baseline="0" dirty="0">
+                <a:solidFill>
+                  <a:schemeClr val="tx1"/>
+                </a:solidFill>
+                <a:effectLst/>
+                <a:latin typeface="+mn-lt"/>
+                <a:ea typeface="+mn-ea"/>
+                <a:cs typeface="+mn-cs"/>
+              </a:rPr>
+              <a:t> så kan denna bild plockas bort.</a:t>
+            </a:r>
+            <a:endParaRPr lang="sv-SE" sz="1200" kern="1200" dirty="0">
+              <a:solidFill>
+                <a:schemeClr val="tx1"/>
+              </a:solidFill>
+              <a:effectLst/>
+              <a:latin typeface="+mn-lt"/>
+              <a:ea typeface="+mn-ea"/>
+              <a:cs typeface="+mn-cs"/>
+            </a:endParaRPr>
           </a:p>
           <a:p>
             <a:endParaRPr lang="sv-SE" dirty="0"/>
@@ -2517,7 +2542,7 @@
     </p:spTree>
     <p:extLst>
       <p:ext uri="{BB962C8B-B14F-4D97-AF65-F5344CB8AC3E}">
-        <p14:creationId xmlns:p14="http://schemas.microsoft.com/office/powerpoint/2010/main" val="1402935123"/>
+        <p14:creationId xmlns:p14="http://schemas.microsoft.com/office/powerpoint/2010/main" val="61413010"/>
       </p:ext>
     </p:extLst>
   </p:cSld>
@@ -2589,7 +2614,7 @@
               <a:defRPr/>
             </a:pPr>
             <a:r>
-              <a:rPr lang="sv-SE" sz="1200" kern="1200" dirty="0" smtClean="0">
+              <a:rPr lang="sv-SE" sz="1200" kern="1200" dirty="0">
                 <a:solidFill>
                   <a:schemeClr val="tx1"/>
                 </a:solidFill>
@@ -2598,7 +2623,31 @@
                 <a:ea typeface="+mn-ea"/>
                 <a:cs typeface="+mn-cs"/>
               </a:rPr>
-              <a:t>En lista över de påträffade felen och hur pass allvarliga ni bedömer dem.</a:t>
+              <a:t>En kort presentation av den del av koden ni valt ut för att göra en formell granskning av och processen ni använt er av inklusive eventuella checklistor, scenarier, </a:t>
+            </a:r>
+            <a:r>
+              <a:rPr lang="sv-SE" sz="1200" kern="1200" dirty="0" err="1">
+                <a:solidFill>
+                  <a:schemeClr val="tx1"/>
+                </a:solidFill>
+                <a:effectLst/>
+                <a:latin typeface="+mn-lt"/>
+                <a:ea typeface="+mn-ea"/>
+                <a:cs typeface="+mn-cs"/>
+              </a:rPr>
+              <a:t>edyl</a:t>
+            </a:r>
+            <a:r>
+              <a:rPr lang="sv-SE" sz="1200" kern="1200" dirty="0">
+                <a:solidFill>
+                  <a:schemeClr val="tx1"/>
+                </a:solidFill>
+                <a:effectLst/>
+                <a:latin typeface="+mn-lt"/>
+                <a:ea typeface="+mn-ea"/>
+                <a:cs typeface="+mn-cs"/>
+              </a:rPr>
+              <a:t>. Ni ska kort motivera valen, och ge tillräckligt med information för att det ska gå att bedöma er. </a:t>
             </a:r>
           </a:p>
           <a:p>
@@ -2632,7 +2681,7 @@
     </p:spTree>
     <p:extLst>
       <p:ext uri="{BB962C8B-B14F-4D97-AF65-F5344CB8AC3E}">
-        <p14:creationId xmlns:p14="http://schemas.microsoft.com/office/powerpoint/2010/main" val="4003170347"/>
+        <p14:creationId xmlns:p14="http://schemas.microsoft.com/office/powerpoint/2010/main" val="1402935123"/>
       </p:ext>
     </p:extLst>
   </p:cSld>
@@ -2704,7 +2753,7 @@
               <a:defRPr/>
             </a:pPr>
             <a:r>
-              <a:rPr lang="sv-SE" sz="1200" kern="1200" dirty="0" smtClean="0">
+              <a:rPr lang="sv-SE" sz="1200" kern="1200" dirty="0">
                 <a:solidFill>
                   <a:schemeClr val="tx1"/>
                 </a:solidFill>
@@ -2713,31 +2762,7 @@
                 <a:ea typeface="+mn-ea"/>
                 <a:cs typeface="+mn-cs"/>
               </a:rPr>
-              <a:t>En diskussion om vilka era erfarenheter ni dragit av att tillämpa granskning. Det finns inget rätt eller fel här. Enda sättet att bli underkända är att bara fuska över punkten och bara säga något pliktskyldigt. Ni förväntas förhålla er till såväl kursböckerna som utdelat material och IEEE </a:t>
-            </a:r>
-            <a:r>
-              <a:rPr lang="sv-SE" sz="1200" kern="1200" dirty="0" err="1" smtClean="0">
-                <a:solidFill>
-                  <a:schemeClr val="tx1"/>
-                </a:solidFill>
-                <a:effectLst/>
-                <a:latin typeface="+mn-lt"/>
-                <a:ea typeface="+mn-ea"/>
-                <a:cs typeface="+mn-cs"/>
-              </a:rPr>
-              <a:t>Std</a:t>
-            </a:r>
-            <a:r>
-              <a:rPr lang="sv-SE" sz="1200" kern="1200" dirty="0" smtClean="0">
-                <a:solidFill>
-                  <a:schemeClr val="tx1"/>
-                </a:solidFill>
-                <a:effectLst/>
-                <a:latin typeface="+mn-lt"/>
-                <a:ea typeface="+mn-ea"/>
-                <a:cs typeface="+mn-cs"/>
-              </a:rPr>
-              <a:t> 1028.</a:t>
+              <a:t>En lista över de påträffade felen och hur pass allvarliga ni bedömer dem.</a:t>
             </a:r>
           </a:p>
           <a:p>
@@ -2771,7 +2796,7 @@
     </p:spTree>
     <p:extLst>
       <p:ext uri="{BB962C8B-B14F-4D97-AF65-F5344CB8AC3E}">
-        <p14:creationId xmlns:p14="http://schemas.microsoft.com/office/powerpoint/2010/main" val="3774513394"/>
+        <p14:creationId xmlns:p14="http://schemas.microsoft.com/office/powerpoint/2010/main" val="4003170347"/>
       </p:ext>
     </p:extLst>
   </p:cSld>
@@ -2852,7 +2877,31 @@
                 <a:ea typeface="+mn-ea"/>
                 <a:cs typeface="+mn-cs"/>
               </a:rPr>
-              <a:t>En presentation av de problem som hittats med hjälp av verktyg för statisk analys och en diskussion av dem enligt anvisningarna. Det räcker alltså inte med att bara lista problemen, ni måste förhålla er till dem också. Tänk också på att ni ska göra detta både på koden som den såg ut före granskningen och på koden efter att ni rättat det som kommit fram under granskningen.</a:t>
+              <a:t>En diskussion om vilka era erfarenheter ni dragit av att tillämpa granskning. Det finns inget rätt eller fel här. Enda sättet att bli underkända är att bara fuska över punkten och bara säga något pliktskyldigt. Ni förväntas förhålla er till såväl kursböckerna som utdelat material och IEEE </a:t>
+            </a:r>
+            <a:r>
+              <a:rPr lang="sv-SE" sz="1200" kern="1200" dirty="0" err="1">
+                <a:solidFill>
+                  <a:schemeClr val="tx1"/>
+                </a:solidFill>
+                <a:effectLst/>
+                <a:latin typeface="+mn-lt"/>
+                <a:ea typeface="+mn-ea"/>
+                <a:cs typeface="+mn-cs"/>
+              </a:rPr>
+              <a:t>Std</a:t>
+            </a:r>
+            <a:r>
+              <a:rPr lang="sv-SE" sz="1200" kern="1200" dirty="0">
+                <a:solidFill>
+                  <a:schemeClr val="tx1"/>
+                </a:solidFill>
+                <a:effectLst/>
+                <a:latin typeface="+mn-lt"/>
+                <a:ea typeface="+mn-ea"/>
+                <a:cs typeface="+mn-cs"/>
+              </a:rPr>
+              <a:t> 1028.</a:t>
             </a:r>
           </a:p>
           <a:p>
@@ -2886,7 +2935,7 @@
     </p:spTree>
     <p:extLst>
       <p:ext uri="{BB962C8B-B14F-4D97-AF65-F5344CB8AC3E}">
-        <p14:creationId xmlns:p14="http://schemas.microsoft.com/office/powerpoint/2010/main" val="1343433812"/>
+        <p14:creationId xmlns:p14="http://schemas.microsoft.com/office/powerpoint/2010/main" val="3774513394"/>
       </p:ext>
     </p:extLst>
   </p:cSld>
@@ -2967,7 +3016,7 @@
                 <a:ea typeface="+mn-ea"/>
                 <a:cs typeface="+mn-cs"/>
               </a:rPr>
-              <a:t>En presentation och diskussion kring ett antal lämpliga statiska mått på koden. Att vi inte specificerar exakt vilka mått som ska tas upp beror på att olika verktyg har olika uppsättningar, men vi förväntar oss fler och mer intressanta mått än bara rena storleksmått som LOC, #klasser, #metoder, etc. Även här är det viktigt att förhållas sig till måtten, inte bara lista dem.</a:t>
+              <a:t>En presentation av de problem som hittats med hjälp av verktyg för statisk analys och en diskussion av dem enligt anvisningarna. Det räcker alltså inte med att bara lista problemen, ni måste förhålla er till dem också. Tänk också på att ni ska göra detta både på koden som den såg ut före granskningen och på koden efter att ni rättat det som kommit fram under granskningen.</a:t>
             </a:r>
           </a:p>
           <a:p>
@@ -3001,7 +3050,7 @@
     </p:spTree>
     <p:extLst>
       <p:ext uri="{BB962C8B-B14F-4D97-AF65-F5344CB8AC3E}">
-        <p14:creationId xmlns:p14="http://schemas.microsoft.com/office/powerpoint/2010/main" val="247082709"/>
+        <p14:creationId xmlns:p14="http://schemas.microsoft.com/office/powerpoint/2010/main" val="1343433812"/>
       </p:ext>
     </p:extLst>
   </p:cSld>
@@ -3082,7 +3131,7 @@
                 <a:ea typeface="+mn-ea"/>
                 <a:cs typeface="+mn-cs"/>
               </a:rPr>
-              <a:t>En översikt över vilken täckningsgrad era testfall uppnått. Denna kan antagligen tas rakt av från verktyget ni använt för att mäta den. Om ni inte uppnått fullständig täckning så ska detta förklaras och motiveras.</a:t>
+              <a:t>En presentation och diskussion kring ett antal lämpliga statiska mått på koden. Att vi inte specificerar exakt vilka mått som ska tas upp beror på att olika verktyg har olika uppsättningar, men vi förväntar oss fler och mer intressanta mått än bara rena storleksmått som LOC, #klasser, #metoder, etc. Även här är det viktigt att förhållas sig till måtten, inte bara lista dem.</a:t>
             </a:r>
           </a:p>
           <a:p>
@@ -3116,7 +3165,7 @@
     </p:spTree>
     <p:extLst>
       <p:ext uri="{BB962C8B-B14F-4D97-AF65-F5344CB8AC3E}">
-        <p14:creationId xmlns:p14="http://schemas.microsoft.com/office/powerpoint/2010/main" val="169751880"/>
+        <p14:creationId xmlns:p14="http://schemas.microsoft.com/office/powerpoint/2010/main" val="247082709"/>
       </p:ext>
     </p:extLst>
   </p:cSld>
@@ -3197,36 +3246,8 @@
                 <a:ea typeface="+mn-ea"/>
                 <a:cs typeface="+mn-cs"/>
               </a:rPr>
-              <a:t>En kort presentation av hur ni gått tillväga för att testa koden med en profiler och vilka resultat ni fick fram. Även här är det viktigt att förhållas sig till måtten, inte bara presentera dem.</a:t>
-            </a:r>
-          </a:p>
-          <a:p>
-            <a:pPr marL="0" marR="0" lvl="0" indent="0" algn="l" defTabSz="914400" rtl="0" eaLnBrk="1" fontAlgn="auto" latinLnBrk="0" hangingPunct="1">
-              <a:lnSpc>
-                <a:spcPct val="100000"/>
-              </a:lnSpc>
-              <a:spcBef>
-                <a:spcPts val="0"/>
-              </a:spcBef>
-              <a:spcAft>
-                <a:spcPts val="0"/>
-              </a:spcAft>
-              <a:buClrTx/>
-              <a:buSzTx/>
-              <a:buFontTx/>
-              <a:buNone/>
-              <a:tabLst/>
-              <a:defRPr/>
-            </a:pPr>
-            <a:endParaRPr lang="sv-SE" sz="1200" kern="1200" dirty="0">
-              <a:solidFill>
-                <a:schemeClr val="tx1"/>
-              </a:solidFill>
-              <a:effectLst/>
-              <a:latin typeface="+mn-lt"/>
-              <a:ea typeface="+mn-ea"/>
-              <a:cs typeface="+mn-cs"/>
-            </a:endParaRPr>
+              <a:t>En översikt över vilken täckningsgrad era testfall uppnått. Denna kan antagligen tas rakt av från verktyget ni använt för att mäta den. Om ni inte uppnått fullständig täckning så ska detta förklaras och motiveras.</a:t>
+            </a:r>
           </a:p>
           <a:p>
             <a:endParaRPr lang="sv-SE" dirty="0"/>
@@ -3259,7 +3280,7 @@
     </p:spTree>
     <p:extLst>
       <p:ext uri="{BB962C8B-B14F-4D97-AF65-F5344CB8AC3E}">
-        <p14:creationId xmlns:p14="http://schemas.microsoft.com/office/powerpoint/2010/main" val="1278246246"/>
+        <p14:creationId xmlns:p14="http://schemas.microsoft.com/office/powerpoint/2010/main" val="169751880"/>
       </p:ext>
     </p:extLst>
   </p:cSld>
@@ -3447,8 +3468,36 @@
                 <a:ea typeface="+mn-ea"/>
                 <a:cs typeface="+mn-cs"/>
               </a:rPr>
-              <a:t>Byggscriptets första (seriösa) version, och den slutliga.</a:t>
-            </a:r>
+              <a:t>En kort presentation av hur ni gått tillväga för att testa koden med en profiler och vilka resultat ni fick fram. Även här är det viktigt att förhållas sig till måtten, inte bara presentera dem.</a:t>
+            </a:r>
+          </a:p>
+          <a:p>
+            <a:pPr marL="0" marR="0" lvl="0" indent="0" algn="l" defTabSz="914400" rtl="0" eaLnBrk="1" fontAlgn="auto" latinLnBrk="0" hangingPunct="1">
+              <a:lnSpc>
+                <a:spcPct val="100000"/>
+              </a:lnSpc>
+              <a:spcBef>
+                <a:spcPts val="0"/>
+              </a:spcBef>
+              <a:spcAft>
+                <a:spcPts val="0"/>
+              </a:spcAft>
+              <a:buClrTx/>
+              <a:buSzTx/>
+              <a:buFontTx/>
+              <a:buNone/>
+              <a:tabLst/>
+              <a:defRPr/>
+            </a:pPr>
+            <a:endParaRPr lang="sv-SE" sz="1200" kern="1200" dirty="0">
+              <a:solidFill>
+                <a:schemeClr val="tx1"/>
+              </a:solidFill>
+              <a:effectLst/>
+              <a:latin typeface="+mn-lt"/>
+              <a:ea typeface="+mn-ea"/>
+              <a:cs typeface="+mn-cs"/>
+            </a:endParaRPr>
           </a:p>
           <a:p>
             <a:endParaRPr lang="sv-SE" dirty="0"/>
@@ -3481,7 +3530,7 @@
     </p:spTree>
     <p:extLst>
       <p:ext uri="{BB962C8B-B14F-4D97-AF65-F5344CB8AC3E}">
-        <p14:creationId xmlns:p14="http://schemas.microsoft.com/office/powerpoint/2010/main" val="109849433"/>
+        <p14:creationId xmlns:p14="http://schemas.microsoft.com/office/powerpoint/2010/main" val="1278246246"/>
       </p:ext>
     </p:extLst>
   </p:cSld>
@@ -3562,7 +3611,7 @@
                 <a:ea typeface="+mn-ea"/>
                 <a:cs typeface="+mn-cs"/>
               </a:rPr>
-              <a:t>Här kan ni ta upp övrigt av relevans för bedömningen av ert arbete. Om avsnittet inte behövs kan det plockas bort.</a:t>
+              <a:t>Byggscriptets första (seriösa) version, och den slutliga.</a:t>
             </a:r>
           </a:p>
           <a:p>
@@ -3588,6 +3637,121 @@
             <a:fld id="{8667F948-D2CB-486C-A2EA-FEABC2DAAE8D}" type="slidenum">
               <a:rPr lang="sv-SE" smtClean="0"/>
               <a:t>31</a:t>
+            </a:fld>
+            <a:endParaRPr lang="sv-SE"/>
+          </a:p>
+        </p:txBody>
+      </p:sp>
+    </p:spTree>
+    <p:extLst>
+      <p:ext uri="{BB962C8B-B14F-4D97-AF65-F5344CB8AC3E}">
+        <p14:creationId xmlns:p14="http://schemas.microsoft.com/office/powerpoint/2010/main" val="109849433"/>
+      </p:ext>
+    </p:extLst>
+  </p:cSld>
+  <p:clrMapOvr>
+    <a:masterClrMapping/>
+  </p:clrMapOvr>
+</p:notes>
+</file>
+
+<file path=ppt/notesSlides/notesSlide32.xml><?xml version="1.0" encoding="utf-8"?>
+<p:notes xmlns:a="http://schemas.openxmlformats.org/drawingml/2006/main" xmlns:r="http://schemas.openxmlformats.org/officeDocument/2006/relationships" xmlns:p="http://schemas.openxmlformats.org/presentationml/2006/main">
+  <p:cSld>
+    <p:spTree>
+      <p:nvGrpSpPr>
+        <p:cNvPr id="1" name=""/>
+        <p:cNvGrpSpPr/>
+        <p:nvPr/>
+      </p:nvGrpSpPr>
+      <p:grpSpPr>
+        <a:xfrm>
+          <a:off x="0" y="0"/>
+          <a:ext cx="0" cy="0"/>
+          <a:chOff x="0" y="0"/>
+          <a:chExt cx="0" cy="0"/>
+        </a:xfrm>
+      </p:grpSpPr>
+      <p:sp>
+        <p:nvSpPr>
+          <p:cNvPr id="2" name="Platshållare för bildobjekt 1"/>
+          <p:cNvSpPr>
+            <a:spLocks noGrp="1" noRot="1" noChangeAspect="1"/>
+          </p:cNvSpPr>
+          <p:nvPr>
+            <p:ph type="sldImg"/>
+          </p:nvPr>
+        </p:nvSpPr>
+        <p:spPr/>
+      </p:sp>
+      <p:sp>
+        <p:nvSpPr>
+          <p:cNvPr id="3" name="Platshållare för anteckningar 2"/>
+          <p:cNvSpPr>
+            <a:spLocks noGrp="1"/>
+          </p:cNvSpPr>
+          <p:nvPr>
+            <p:ph type="body" idx="1"/>
+          </p:nvPr>
+        </p:nvSpPr>
+        <p:spPr/>
+        <p:txBody>
+          <a:bodyPr/>
+          <a:lstStyle/>
+          <a:p>
+            <a:pPr marL="0" marR="0" lvl="0" indent="0" algn="l" defTabSz="914400" rtl="0" eaLnBrk="1" fontAlgn="auto" latinLnBrk="0" hangingPunct="1">
+              <a:lnSpc>
+                <a:spcPct val="100000"/>
+              </a:lnSpc>
+              <a:spcBef>
+                <a:spcPts val="0"/>
+              </a:spcBef>
+              <a:spcAft>
+                <a:spcPts val="0"/>
+              </a:spcAft>
+              <a:buClrTx/>
+              <a:buSzTx/>
+              <a:buFontTx/>
+              <a:buNone/>
+              <a:tabLst/>
+              <a:defRPr/>
+            </a:pPr>
+            <a:r>
+              <a:rPr lang="sv-SE" sz="1200" kern="1200" dirty="0">
+                <a:solidFill>
+                  <a:schemeClr val="tx1"/>
+                </a:solidFill>
+                <a:effectLst/>
+                <a:latin typeface="+mn-lt"/>
+                <a:ea typeface="+mn-ea"/>
+                <a:cs typeface="+mn-cs"/>
+              </a:rPr>
+              <a:t>Här kan ni ta upp övrigt av relevans för bedömningen av ert arbete. Om avsnittet inte behövs kan det plockas bort.</a:t>
+            </a:r>
+          </a:p>
+          <a:p>
+            <a:endParaRPr lang="sv-SE" dirty="0"/>
+          </a:p>
+        </p:txBody>
+      </p:sp>
+      <p:sp>
+        <p:nvSpPr>
+          <p:cNvPr id="4" name="Platshållare för bildnummer 3"/>
+          <p:cNvSpPr>
+            <a:spLocks noGrp="1"/>
+          </p:cNvSpPr>
+          <p:nvPr>
+            <p:ph type="sldNum" sz="quarter" idx="10"/>
+          </p:nvPr>
+        </p:nvSpPr>
+        <p:spPr/>
+        <p:txBody>
+          <a:bodyPr/>
+          <a:lstStyle/>
+          <a:p>
+            <a:fld id="{8667F948-D2CB-486C-A2EA-FEABC2DAAE8D}" type="slidenum">
+              <a:rPr lang="sv-SE" smtClean="0"/>
+              <a:t>32</a:t>
             </a:fld>
             <a:endParaRPr lang="sv-SE"/>
           </a:p>
@@ -3668,64 +3832,8 @@
               <a:defRPr/>
             </a:pPr>
             <a:r>
-              <a:rPr lang="sv-SE" sz="1200" kern="1200" dirty="0">
-                <a:solidFill>
-                  <a:schemeClr val="tx1"/>
-                </a:solidFill>
-                <a:effectLst/>
-                <a:latin typeface="+mn-lt"/>
-                <a:ea typeface="+mn-ea"/>
-                <a:cs typeface="+mn-cs"/>
-              </a:rPr>
-              <a:t>Två eller tre exempel per</a:t>
-            </a:r>
-            <a:r>
-              <a:rPr lang="sv-SE" sz="1200" kern="1200" baseline="0" dirty="0">
-                <a:solidFill>
-                  <a:schemeClr val="tx1"/>
-                </a:solidFill>
-                <a:effectLst/>
-                <a:latin typeface="+mn-lt"/>
-                <a:ea typeface="+mn-ea"/>
-                <a:cs typeface="+mn-cs"/>
-              </a:rPr>
-              <a:t> person i projektet på hur ni tillämpat TDD med koden för såväl testfallen som koden som ska testas. (Det kan alltså bli upp till 15 sidor för en fempersonersgrupp.) Exemplen ska vara från olika </a:t>
-            </a:r>
-            <a:r>
-              <a:rPr lang="sv-SE" sz="1200" kern="1200" baseline="0" dirty="0" err="1">
-                <a:solidFill>
-                  <a:schemeClr val="tx1"/>
-                </a:solidFill>
-                <a:effectLst/>
-                <a:latin typeface="+mn-lt"/>
-                <a:ea typeface="+mn-ea"/>
-                <a:cs typeface="+mn-cs"/>
-              </a:rPr>
-              <a:t>faser</a:t>
-            </a:r>
-            <a:r>
-              <a:rPr lang="sv-SE" sz="1200" kern="1200" dirty="0" err="1">
-                <a:solidFill>
-                  <a:schemeClr val="tx1"/>
-                </a:solidFill>
-                <a:effectLst/>
-                <a:latin typeface="+mn-lt"/>
-                <a:ea typeface="+mn-ea"/>
-                <a:cs typeface="+mn-cs"/>
-              </a:rPr>
-              <a:t>i</a:t>
-            </a:r>
-            <a:r>
-              <a:rPr lang="sv-SE" sz="1200" kern="1200" dirty="0">
-                <a:solidFill>
-                  <a:schemeClr val="tx1"/>
-                </a:solidFill>
-                <a:effectLst/>
-                <a:latin typeface="+mn-lt"/>
-                <a:ea typeface="+mn-ea"/>
-                <a:cs typeface="+mn-cs"/>
-              </a:rPr>
-              <a:t> projektet. Om ni har använt versionshanteringssystemet ordentligt bör all information som efterfrågas här finnas i det. Tänk på att kodexemplen ska vara läsbara. </a:t>
+              <a:rPr lang="sv-SE" dirty="0"/>
+              <a:t>En eller flera bilder som visar designen av det slutliga systemet. Lämpligt format är ett eller flera klassdiagram, plus eventuella andra modeller som behövs för att förstå hur systemet är uppbyggt. Diagrammen ska vara läsbara. Det är dock fullständigt okej att de är detaljerade, bara det går att zooma in ordentligt på dem. Ett tips är att börja med ett översiktligt diagram som inte innehåller mer än paket och klassnamn, och att sedan lägga till mer detaljerade diagram efter det.</a:t>
             </a:r>
           </a:p>
           <a:p>
@@ -3759,7 +3867,7 @@
     </p:spTree>
     <p:extLst>
       <p:ext uri="{BB962C8B-B14F-4D97-AF65-F5344CB8AC3E}">
-        <p14:creationId xmlns:p14="http://schemas.microsoft.com/office/powerpoint/2010/main" val="3344281794"/>
+        <p14:creationId xmlns:p14="http://schemas.microsoft.com/office/powerpoint/2010/main" val="2360573447"/>
       </p:ext>
     </p:extLst>
   </p:cSld>
@@ -3922,7 +4030,7 @@
     </p:spTree>
     <p:extLst>
       <p:ext uri="{BB962C8B-B14F-4D97-AF65-F5344CB8AC3E}">
-        <p14:creationId xmlns:p14="http://schemas.microsoft.com/office/powerpoint/2010/main" val="1991747670"/>
+        <p14:creationId xmlns:p14="http://schemas.microsoft.com/office/powerpoint/2010/main" val="3344281794"/>
       </p:ext>
     </p:extLst>
   </p:cSld>
@@ -4085,7 +4193,7 @@
     </p:spTree>
     <p:extLst>
       <p:ext uri="{BB962C8B-B14F-4D97-AF65-F5344CB8AC3E}">
-        <p14:creationId xmlns:p14="http://schemas.microsoft.com/office/powerpoint/2010/main" val="4026030065"/>
+        <p14:creationId xmlns:p14="http://schemas.microsoft.com/office/powerpoint/2010/main" val="1991747670"/>
       </p:ext>
     </p:extLst>
   </p:cSld>
@@ -4248,7 +4356,7 @@
     </p:spTree>
     <p:extLst>
       <p:ext uri="{BB962C8B-B14F-4D97-AF65-F5344CB8AC3E}">
-        <p14:creationId xmlns:p14="http://schemas.microsoft.com/office/powerpoint/2010/main" val="3674663265"/>
+        <p14:creationId xmlns:p14="http://schemas.microsoft.com/office/powerpoint/2010/main" val="4026030065"/>
       </p:ext>
     </p:extLst>
   </p:cSld>
@@ -4411,7 +4519,7 @@
     </p:spTree>
     <p:extLst>
       <p:ext uri="{BB962C8B-B14F-4D97-AF65-F5344CB8AC3E}">
-        <p14:creationId xmlns:p14="http://schemas.microsoft.com/office/powerpoint/2010/main" val="437511418"/>
+        <p14:creationId xmlns:p14="http://schemas.microsoft.com/office/powerpoint/2010/main" val="3674663265"/>
       </p:ext>
     </p:extLst>
   </p:cSld>
@@ -4574,7 +4682,7 @@
     </p:spTree>
     <p:extLst>
       <p:ext uri="{BB962C8B-B14F-4D97-AF65-F5344CB8AC3E}">
-        <p14:creationId xmlns:p14="http://schemas.microsoft.com/office/powerpoint/2010/main" val="2111164777"/>
+        <p14:creationId xmlns:p14="http://schemas.microsoft.com/office/powerpoint/2010/main" val="437511418"/>
       </p:ext>
     </p:extLst>
   </p:cSld>
@@ -7475,12 +7583,12 @@
               <a:t>Linnéa Palmgren, </a:t>
             </a:r>
             <a:r>
-              <a:rPr lang="sv-SE" dirty="0" smtClean="0">
+              <a:rPr lang="sv-SE" dirty="0">
                 <a:hlinkClick r:id="rId5"/>
               </a:rPr>
               <a:t>lipa7972@student.su.se</a:t>
             </a:r>
-            <a:endParaRPr lang="sv-SE" dirty="0" smtClean="0"/>
+            <a:endParaRPr lang="sv-SE" dirty="0"/>
           </a:p>
           <a:p>
             <a:r>
@@ -7488,7 +7596,7 @@
               <a:t>Karl Gustafsson, </a:t>
             </a:r>
             <a:r>
-              <a:rPr lang="sv-SE" dirty="0" smtClean="0">
+              <a:rPr lang="sv-SE" dirty="0">
                 <a:hlinkClick r:id="rId6"/>
               </a:rPr>
               <a:t>kagu9654@student.su.se</a:t>
@@ -7497,20 +7605,19 @@
           </a:p>
           <a:p>
             <a:r>
-              <a:rPr lang="sv-SE" dirty="0" smtClean="0"/>
+              <a:rPr lang="sv-SE" dirty="0"/>
               <a:t>Magnus Palmstierna, </a:t>
             </a:r>
             <a:r>
-              <a:rPr lang="sv-SE" dirty="0" smtClean="0">
+              <a:rPr lang="sv-SE" dirty="0">
                 <a:hlinkClick r:id="rId7"/>
               </a:rPr>
               <a:t>mapa7956@student.su.se</a:t>
             </a:r>
             <a:r>
-              <a:rPr lang="sv-SE" dirty="0" smtClean="0"/>
+              <a:rPr lang="sv-SE" dirty="0"/>
               <a:t> </a:t>
             </a:r>
-            <a:endParaRPr lang="sv-SE" dirty="0"/>
           </a:p>
           <a:p>
             <a:r>
@@ -7668,6 +7775,174 @@
       </p:sp>
       <p:pic>
         <p:nvPicPr>
+          <p:cNvPr id="14" name="Platshållare för innehåll 13">
+            <a:extLst>
+              <a:ext uri="{FF2B5EF4-FFF2-40B4-BE49-F238E27FC236}">
+                <a16:creationId xmlns:a16="http://schemas.microsoft.com/office/drawing/2014/main" id="{782F486D-D497-46DE-97A2-08CF1FAFFC27}"/>
+              </a:ext>
+            </a:extLst>
+          </p:cNvPr>
+          <p:cNvPicPr>
+            <a:picLocks noGrp="1" noChangeAspect="1"/>
+          </p:cNvPicPr>
+          <p:nvPr>
+            <p:ph sz="quarter" idx="4"/>
+          </p:nvPr>
+        </p:nvPicPr>
+        <p:blipFill>
+          <a:blip r:embed="rId4"/>
+          <a:stretch>
+            <a:fillRect/>
+          </a:stretch>
+        </p:blipFill>
+        <p:spPr>
+          <a:xfrm>
+            <a:off x="6172199" y="3006726"/>
+            <a:ext cx="5998509" cy="2360452"/>
+          </a:xfrm>
+          <a:prstGeom prst="rect">
+            <a:avLst/>
+          </a:prstGeom>
+        </p:spPr>
+      </p:pic>
+      <p:pic>
+        <p:nvPicPr>
+          <p:cNvPr id="13" name="Platshållare för innehåll 12">
+            <a:extLst>
+              <a:ext uri="{FF2B5EF4-FFF2-40B4-BE49-F238E27FC236}">
+                <a16:creationId xmlns:a16="http://schemas.microsoft.com/office/drawing/2014/main" id="{B9A7EA65-3F37-47C8-BE59-12FE46DB30C3}"/>
+              </a:ext>
+            </a:extLst>
+          </p:cNvPr>
+          <p:cNvPicPr>
+            <a:picLocks noGrp="1" noChangeAspect="1"/>
+          </p:cNvPicPr>
+          <p:nvPr>
+            <p:ph sz="half" idx="2"/>
+          </p:nvPr>
+        </p:nvPicPr>
+        <p:blipFill>
+          <a:blip r:embed="rId5"/>
+          <a:stretch>
+            <a:fillRect/>
+          </a:stretch>
+        </p:blipFill>
+        <p:spPr>
+          <a:xfrm>
+            <a:off x="62981" y="3741683"/>
+            <a:ext cx="5937701" cy="1070732"/>
+          </a:xfrm>
+          <a:prstGeom prst="rect">
+            <a:avLst/>
+          </a:prstGeom>
+        </p:spPr>
+      </p:pic>
+    </p:spTree>
+    <p:custDataLst>
+      <p:tags r:id="rId1"/>
+    </p:custDataLst>
+    <p:extLst>
+      <p:ext uri="{BB962C8B-B14F-4D97-AF65-F5344CB8AC3E}">
+        <p14:creationId xmlns:p14="http://schemas.microsoft.com/office/powerpoint/2010/main" val="2171053083"/>
+      </p:ext>
+    </p:extLst>
+  </p:cSld>
+  <p:clrMapOvr>
+    <a:masterClrMapping/>
+  </p:clrMapOvr>
+</p:sld>
+</file>
+
+<file path=ppt/slides/slide11.xml><?xml version="1.0" encoding="utf-8"?>
+<p:sld xmlns:a="http://schemas.openxmlformats.org/drawingml/2006/main" xmlns:r="http://schemas.openxmlformats.org/officeDocument/2006/relationships" xmlns:p="http://schemas.openxmlformats.org/presentationml/2006/main">
+  <p:cSld>
+    <p:spTree>
+      <p:nvGrpSpPr>
+        <p:cNvPr id="1" name=""/>
+        <p:cNvGrpSpPr/>
+        <p:nvPr/>
+      </p:nvGrpSpPr>
+      <p:grpSpPr>
+        <a:xfrm>
+          <a:off x="0" y="0"/>
+          <a:ext cx="0" cy="0"/>
+          <a:chOff x="0" y="0"/>
+          <a:chExt cx="0" cy="0"/>
+        </a:xfrm>
+      </p:grpSpPr>
+      <p:sp>
+        <p:nvSpPr>
+          <p:cNvPr id="2" name="Rubrik 1"/>
+          <p:cNvSpPr>
+            <a:spLocks noGrp="1"/>
+          </p:cNvSpPr>
+          <p:nvPr>
+            <p:ph type="title"/>
+          </p:nvPr>
+        </p:nvSpPr>
+        <p:spPr/>
+        <p:txBody>
+          <a:bodyPr/>
+          <a:lstStyle/>
+          <a:p>
+            <a:r>
+              <a:rPr lang="sv-SE" dirty="0" err="1"/>
+              <a:t>TDD-exempel:Bjargey</a:t>
+            </a:r>
+            <a:r>
+              <a:rPr lang="sv-SE" dirty="0"/>
+              <a:t> Ingólfsdóttir</a:t>
+            </a:r>
+          </a:p>
+        </p:txBody>
+      </p:sp>
+      <p:sp>
+        <p:nvSpPr>
+          <p:cNvPr id="4" name="Platshållare för text 3"/>
+          <p:cNvSpPr>
+            <a:spLocks noGrp="1"/>
+          </p:cNvSpPr>
+          <p:nvPr>
+            <p:ph type="body" idx="1"/>
+          </p:nvPr>
+        </p:nvSpPr>
+        <p:spPr/>
+        <p:txBody>
+          <a:bodyPr/>
+          <a:lstStyle/>
+          <a:p>
+            <a:r>
+              <a:rPr lang="sv-SE" dirty="0" err="1"/>
+              <a:t>Testkod</a:t>
+            </a:r>
+            <a:endParaRPr lang="sv-SE" dirty="0"/>
+          </a:p>
+        </p:txBody>
+      </p:sp>
+      <p:sp>
+        <p:nvSpPr>
+          <p:cNvPr id="6" name="Platshållare för text 5"/>
+          <p:cNvSpPr>
+            <a:spLocks noGrp="1"/>
+          </p:cNvSpPr>
+          <p:nvPr>
+            <p:ph type="body" sz="quarter" idx="3"/>
+          </p:nvPr>
+        </p:nvSpPr>
+        <p:spPr/>
+        <p:txBody>
+          <a:bodyPr/>
+          <a:lstStyle/>
+          <a:p>
+            <a:r>
+              <a:rPr lang="sv-SE" dirty="0"/>
+              <a:t>Koden som testas</a:t>
+            </a:r>
+          </a:p>
+        </p:txBody>
+      </p:sp>
+      <p:pic>
+        <p:nvPicPr>
           <p:cNvPr id="8" name="Platshållare för innehåll 7">
             <a:extLst>
               <a:ext uri="{FF2B5EF4-FFF2-40B4-BE49-F238E27FC236}">
@@ -7746,7 +8021,7 @@
 </p:sld>
 </file>
 
-<file path=ppt/slides/slide11.xml><?xml version="1.0" encoding="utf-8"?>
+<file path=ppt/slides/slide12.xml><?xml version="1.0" encoding="utf-8"?>
 <p:sld xmlns:a="http://schemas.openxmlformats.org/drawingml/2006/main" xmlns:r="http://schemas.openxmlformats.org/officeDocument/2006/relationships" xmlns:p="http://schemas.openxmlformats.org/presentationml/2006/main">
   <p:cSld>
     <p:spTree>
@@ -10765,19 +11040,6 @@
               </a:rPr>
               <a:t>Override</a:t>
             </a:r>
-            <a:r>
-              <a:rPr kumimoji="0" lang="sv-SE" altLang="sv-SE" sz="800" b="0" i="0" u="none" strike="noStrike" cap="none" normalizeH="0" baseline="0" dirty="0">
-                <a:ln>
-                  <a:noFill/>
-                </a:ln>
-                <a:solidFill>
-                  <a:srgbClr val="BBB529"/>
-                </a:solidFill>
-                <a:effectLst/>
-                <a:latin typeface="Consolas" panose="020B0609020204030204" pitchFamily="49" charset="0"/>
-              </a:rPr>
-              <a:t/>
-            </a:r>
             <a:br>
               <a:rPr kumimoji="0" lang="sv-SE" altLang="sv-SE" sz="800" b="0" i="0" u="none" strike="noStrike" cap="none" normalizeH="0" baseline="0" dirty="0">
                 <a:ln>
@@ -11893,7 +12155,7 @@
 </p:sld>
 </file>
 
-<file path=ppt/slides/slide12.xml><?xml version="1.0" encoding="utf-8"?>
+<file path=ppt/slides/slide13.xml><?xml version="1.0" encoding="utf-8"?>
 <p:sld xmlns:a="http://schemas.openxmlformats.org/drawingml/2006/main" xmlns:r="http://schemas.openxmlformats.org/officeDocument/2006/relationships" xmlns:p="http://schemas.openxmlformats.org/presentationml/2006/main">
   <p:cSld>
     <p:spTree>
@@ -12743,19 +13005,6 @@
                 <a:latin typeface="Consolas" panose="020B0609020204030204" pitchFamily="49" charset="0"/>
               </a:rPr>
             </a:br>
-            <a:r>
-              <a:rPr kumimoji="0" lang="sv-SE" altLang="sv-SE" sz="1000" b="0" i="0" u="none" strike="noStrike" cap="none" normalizeH="0" baseline="0" dirty="0">
-                <a:ln>
-                  <a:noFill/>
-                </a:ln>
-                <a:solidFill>
-                  <a:srgbClr val="A9B7C6"/>
-                </a:solidFill>
-                <a:effectLst/>
-                <a:latin typeface="Consolas" panose="020B0609020204030204" pitchFamily="49" charset="0"/>
-              </a:rPr>
-              <a:t/>
-            </a:r>
             <a:br>
               <a:rPr kumimoji="0" lang="sv-SE" altLang="sv-SE" sz="1000" b="0" i="0" u="none" strike="noStrike" cap="none" normalizeH="0" baseline="0" dirty="0">
                 <a:ln>
@@ -14857,7 +15106,7 @@
 </p:sld>
 </file>
 
-<file path=ppt/slides/slide13.xml><?xml version="1.0" encoding="utf-8"?>
+<file path=ppt/slides/slide14.xml><?xml version="1.0" encoding="utf-8"?>
 <p:sld xmlns:a="http://schemas.openxmlformats.org/drawingml/2006/main" xmlns:r="http://schemas.openxmlformats.org/officeDocument/2006/relationships" xmlns:p="http://schemas.openxmlformats.org/presentationml/2006/main">
   <p:cSld>
     <p:spTree>
@@ -17581,19 +17830,6 @@
               </a:rPr>
               <a:t>    }</a:t>
             </a:r>
-            <a:r>
-              <a:rPr kumimoji="0" lang="sv-SE" altLang="sv-SE" sz="800" b="0" i="0" u="none" strike="noStrike" cap="none" normalizeH="0" baseline="0" dirty="0">
-                <a:ln>
-                  <a:noFill/>
-                </a:ln>
-                <a:solidFill>
-                  <a:srgbClr val="CC7832"/>
-                </a:solidFill>
-                <a:effectLst/>
-                <a:latin typeface="Consolas" panose="020B0609020204030204" pitchFamily="49" charset="0"/>
-              </a:rPr>
-              <a:t/>
-            </a:r>
             <a:br>
               <a:rPr kumimoji="0" lang="sv-SE" altLang="sv-SE" sz="800" b="0" i="0" u="none" strike="noStrike" cap="none" normalizeH="0" baseline="0" dirty="0">
                 <a:ln>
@@ -18155,19 +18391,6 @@
                 <a:latin typeface="Consolas" panose="020B0609020204030204" pitchFamily="49" charset="0"/>
               </a:rPr>
             </a:br>
-            <a:r>
-              <a:rPr kumimoji="0" lang="sv-SE" altLang="sv-SE" sz="800" b="0" i="0" u="none" strike="noStrike" cap="none" normalizeH="0" baseline="0" dirty="0">
-                <a:ln>
-                  <a:noFill/>
-                </a:ln>
-                <a:solidFill>
-                  <a:srgbClr val="A9B7C6"/>
-                </a:solidFill>
-                <a:effectLst/>
-                <a:latin typeface="Consolas" panose="020B0609020204030204" pitchFamily="49" charset="0"/>
-              </a:rPr>
-              <a:t/>
-            </a:r>
             <a:br>
               <a:rPr kumimoji="0" lang="sv-SE" altLang="sv-SE" sz="800" b="0" i="0" u="none" strike="noStrike" cap="none" normalizeH="0" baseline="0" dirty="0">
                 <a:ln>
@@ -18559,86 +18782,6 @@
     <p:extLst>
       <p:ext uri="{BB962C8B-B14F-4D97-AF65-F5344CB8AC3E}">
         <p14:creationId xmlns:p14="http://schemas.microsoft.com/office/powerpoint/2010/main" val="2700327524"/>
-      </p:ext>
-    </p:extLst>
-  </p:cSld>
-  <p:clrMapOvr>
-    <a:masterClrMapping/>
-  </p:clrMapOvr>
-</p:sld>
-</file>
-
-<file path=ppt/slides/slide14.xml><?xml version="1.0" encoding="utf-8"?>
-<p:sld xmlns:a="http://schemas.openxmlformats.org/drawingml/2006/main" xmlns:r="http://schemas.openxmlformats.org/officeDocument/2006/relationships" xmlns:p="http://schemas.openxmlformats.org/presentationml/2006/main">
-  <p:cSld>
-    <p:spTree>
-      <p:nvGrpSpPr>
-        <p:cNvPr id="1" name=""/>
-        <p:cNvGrpSpPr/>
-        <p:nvPr/>
-      </p:nvGrpSpPr>
-      <p:grpSpPr>
-        <a:xfrm>
-          <a:off x="0" y="0"/>
-          <a:ext cx="0" cy="0"/>
-          <a:chOff x="0" y="0"/>
-          <a:chExt cx="0" cy="0"/>
-        </a:xfrm>
-      </p:grpSpPr>
-      <p:sp>
-        <p:nvSpPr>
-          <p:cNvPr id="9" name="Rubrik 8"/>
-          <p:cNvSpPr>
-            <a:spLocks noGrp="1"/>
-          </p:cNvSpPr>
-          <p:nvPr>
-            <p:ph type="title"/>
-          </p:nvPr>
-        </p:nvSpPr>
-        <p:spPr/>
-        <p:txBody>
-          <a:bodyPr/>
-          <a:lstStyle/>
-          <a:p>
-            <a:r>
-              <a:rPr lang="sv-SE" dirty="0"/>
-              <a:t>TDD erfarenheter</a:t>
-            </a:r>
-          </a:p>
-        </p:txBody>
-      </p:sp>
-      <p:sp>
-        <p:nvSpPr>
-          <p:cNvPr id="10" name="Platshållare för innehåll 9"/>
-          <p:cNvSpPr>
-            <a:spLocks noGrp="1"/>
-          </p:cNvSpPr>
-          <p:nvPr>
-            <p:ph idx="1"/>
-          </p:nvPr>
-        </p:nvSpPr>
-        <p:spPr/>
-        <p:txBody>
-          <a:bodyPr/>
-          <a:lstStyle/>
-          <a:p>
-            <a:r>
-              <a:rPr lang="sv-SE" dirty="0"/>
-              <a:t>För att lättare kunna tillämpa TDD, krävs bra diskussioner och tidig generell struktur för hur programmet ska fungera, och vilka klasser som ska ansvara för vad. </a:t>
-            </a:r>
-          </a:p>
-          <a:p>
-            <a:endParaRPr lang="sv-SE" dirty="0"/>
-          </a:p>
-        </p:txBody>
-      </p:sp>
-    </p:spTree>
-    <p:custDataLst>
-      <p:tags r:id="rId1"/>
-    </p:custDataLst>
-    <p:extLst>
-      <p:ext uri="{BB962C8B-B14F-4D97-AF65-F5344CB8AC3E}">
-        <p14:creationId xmlns:p14="http://schemas.microsoft.com/office/powerpoint/2010/main" val="1458286633"/>
       </p:ext>
     </p:extLst>
   </p:cSld>
@@ -18667,7 +18810,7 @@
       </p:grpSpPr>
       <p:sp>
         <p:nvSpPr>
-          <p:cNvPr id="2" name="Rubrik 1"/>
+          <p:cNvPr id="9" name="Rubrik 8"/>
           <p:cNvSpPr>
             <a:spLocks noGrp="1"/>
           </p:cNvSpPr>
@@ -18682,14 +18825,14 @@
           <a:p>
             <a:r>
               <a:rPr lang="sv-SE" dirty="0"/>
-              <a:t>Testfallsdesign ekvivalensklasser</a:t>
+              <a:t>TDD erfarenheter</a:t>
             </a:r>
           </a:p>
         </p:txBody>
       </p:sp>
       <p:sp>
         <p:nvSpPr>
-          <p:cNvPr id="3" name="Platshållare för innehåll 2"/>
+          <p:cNvPr id="10" name="Platshållare för innehåll 9"/>
           <p:cNvSpPr>
             <a:spLocks noGrp="1"/>
           </p:cNvSpPr>
@@ -18702,7 +18845,13 @@
           <a:bodyPr/>
           <a:lstStyle/>
           <a:p>
-            <a:endParaRPr lang="sv-SE"/>
+            <a:r>
+              <a:rPr lang="sv-SE" dirty="0"/>
+              <a:t>För att lättare kunna tillämpa TDD, krävs bra diskussioner och tidig generell struktur för hur programmet ska fungera, och vilka klasser som ska ansvara för vad. </a:t>
+            </a:r>
+          </a:p>
+          <a:p>
+            <a:endParaRPr lang="sv-SE" dirty="0"/>
           </a:p>
         </p:txBody>
       </p:sp>
@@ -18712,7 +18861,7 @@
     </p:custDataLst>
     <p:extLst>
       <p:ext uri="{BB962C8B-B14F-4D97-AF65-F5344CB8AC3E}">
-        <p14:creationId xmlns:p14="http://schemas.microsoft.com/office/powerpoint/2010/main" val="3480241241"/>
+        <p14:creationId xmlns:p14="http://schemas.microsoft.com/office/powerpoint/2010/main" val="1458286633"/>
       </p:ext>
     </p:extLst>
   </p:cSld>
@@ -18756,7 +18905,7 @@
           <a:p>
             <a:r>
               <a:rPr lang="sv-SE" dirty="0"/>
-              <a:t>Ekvivalensklasserna</a:t>
+              <a:t>Testfallsdesign ekvivalensklasser</a:t>
             </a:r>
           </a:p>
         </p:txBody>
@@ -18786,7 +18935,7 @@
     </p:custDataLst>
     <p:extLst>
       <p:ext uri="{BB962C8B-B14F-4D97-AF65-F5344CB8AC3E}">
-        <p14:creationId xmlns:p14="http://schemas.microsoft.com/office/powerpoint/2010/main" val="3750412782"/>
+        <p14:creationId xmlns:p14="http://schemas.microsoft.com/office/powerpoint/2010/main" val="3480241241"/>
       </p:ext>
     </p:extLst>
   </p:cSld>
@@ -18830,7 +18979,7 @@
           <a:p>
             <a:r>
               <a:rPr lang="sv-SE" dirty="0"/>
-              <a:t>Testfall</a:t>
+              <a:t>Ekvivalensklasserna</a:t>
             </a:r>
           </a:p>
         </p:txBody>
@@ -18860,7 +19009,7 @@
     </p:custDataLst>
     <p:extLst>
       <p:ext uri="{BB962C8B-B14F-4D97-AF65-F5344CB8AC3E}">
-        <p14:creationId xmlns:p14="http://schemas.microsoft.com/office/powerpoint/2010/main" val="3595241904"/>
+        <p14:creationId xmlns:p14="http://schemas.microsoft.com/office/powerpoint/2010/main" val="3750412782"/>
       </p:ext>
     </p:extLst>
   </p:cSld>
@@ -18904,7 +19053,7 @@
           <a:p>
             <a:r>
               <a:rPr lang="sv-SE" dirty="0"/>
-              <a:t>Testmatris</a:t>
+              <a:t>Testfall</a:t>
             </a:r>
           </a:p>
         </p:txBody>
@@ -18934,7 +19083,7 @@
     </p:custDataLst>
     <p:extLst>
       <p:ext uri="{BB962C8B-B14F-4D97-AF65-F5344CB8AC3E}">
-        <p14:creationId xmlns:p14="http://schemas.microsoft.com/office/powerpoint/2010/main" val="1900409101"/>
+        <p14:creationId xmlns:p14="http://schemas.microsoft.com/office/powerpoint/2010/main" val="3595241904"/>
       </p:ext>
     </p:extLst>
   </p:cSld>
@@ -18978,7 +19127,7 @@
           <a:p>
             <a:r>
               <a:rPr lang="sv-SE" dirty="0"/>
-              <a:t>Tillståndsmaskiner</a:t>
+              <a:t>Testmatris</a:t>
             </a:r>
           </a:p>
         </p:txBody>
@@ -19008,7 +19157,7 @@
     </p:custDataLst>
     <p:extLst>
       <p:ext uri="{BB962C8B-B14F-4D97-AF65-F5344CB8AC3E}">
-        <p14:creationId xmlns:p14="http://schemas.microsoft.com/office/powerpoint/2010/main" val="1230194705"/>
+        <p14:creationId xmlns:p14="http://schemas.microsoft.com/office/powerpoint/2010/main" val="1900409101"/>
       </p:ext>
     </p:extLst>
   </p:cSld>
@@ -19146,7 +19295,7 @@
           <a:p>
             <a:r>
               <a:rPr lang="sv-SE" dirty="0"/>
-              <a:t>Tillståndsmaskinen</a:t>
+              <a:t>Tillståndsmaskiner</a:t>
             </a:r>
           </a:p>
         </p:txBody>
@@ -19176,7 +19325,7 @@
     </p:custDataLst>
     <p:extLst>
       <p:ext uri="{BB962C8B-B14F-4D97-AF65-F5344CB8AC3E}">
-        <p14:creationId xmlns:p14="http://schemas.microsoft.com/office/powerpoint/2010/main" val="2924590265"/>
+        <p14:creationId xmlns:p14="http://schemas.microsoft.com/office/powerpoint/2010/main" val="1230194705"/>
       </p:ext>
     </p:extLst>
   </p:cSld>
@@ -19220,7 +19369,7 @@
           <a:p>
             <a:r>
               <a:rPr lang="sv-SE" dirty="0"/>
-              <a:t>Testfall</a:t>
+              <a:t>Tillståndsmaskinen</a:t>
             </a:r>
           </a:p>
         </p:txBody>
@@ -19250,7 +19399,7 @@
     </p:custDataLst>
     <p:extLst>
       <p:ext uri="{BB962C8B-B14F-4D97-AF65-F5344CB8AC3E}">
-        <p14:creationId xmlns:p14="http://schemas.microsoft.com/office/powerpoint/2010/main" val="1268711775"/>
+        <p14:creationId xmlns:p14="http://schemas.microsoft.com/office/powerpoint/2010/main" val="2924590265"/>
       </p:ext>
     </p:extLst>
   </p:cSld>
@@ -19294,7 +19443,7 @@
           <a:p>
             <a:r>
               <a:rPr lang="sv-SE" dirty="0"/>
-              <a:t>Testmatris</a:t>
+              <a:t>Testfall</a:t>
             </a:r>
           </a:p>
         </p:txBody>
@@ -19324,7 +19473,7 @@
     </p:custDataLst>
     <p:extLst>
       <p:ext uri="{BB962C8B-B14F-4D97-AF65-F5344CB8AC3E}">
-        <p14:creationId xmlns:p14="http://schemas.microsoft.com/office/powerpoint/2010/main" val="2129764329"/>
+        <p14:creationId xmlns:p14="http://schemas.microsoft.com/office/powerpoint/2010/main" val="1268711775"/>
       </p:ext>
     </p:extLst>
   </p:cSld>
@@ -19367,10 +19516,9 @@
           <a:lstStyle/>
           <a:p>
             <a:r>
-              <a:rPr lang="sv-SE" dirty="0" smtClean="0"/>
-              <a:t>Granskning</a:t>
-            </a:r>
-            <a:endParaRPr lang="sv-SE" dirty="0"/>
+              <a:rPr lang="sv-SE" dirty="0"/>
+              <a:t>Testmatris</a:t>
+            </a:r>
           </a:p>
         </p:txBody>
       </p:sp>
@@ -19389,33 +19537,7 @@
           <a:bodyPr/>
           <a:lstStyle/>
           <a:p>
-            <a:r>
-              <a:rPr lang="sv-SE" dirty="0" smtClean="0"/>
-              <a:t>Vi valde att granska metoden </a:t>
-            </a:r>
-            <a:r>
-              <a:rPr lang="sv-SE" dirty="0" err="1" smtClean="0"/>
-              <a:t>Effect</a:t>
-            </a:r>
-            <a:r>
-              <a:rPr lang="sv-SE" dirty="0" smtClean="0"/>
-              <a:t>, då den är den största metoden i programmet, samt innehåller en del </a:t>
-            </a:r>
-            <a:r>
-              <a:rPr lang="sv-SE" dirty="0" err="1" smtClean="0"/>
-              <a:t>if</a:t>
-            </a:r>
-            <a:r>
-              <a:rPr lang="sv-SE" dirty="0" smtClean="0"/>
-              <a:t>- och switch-satser. </a:t>
-            </a:r>
-          </a:p>
-          <a:p>
-            <a:r>
-              <a:rPr lang="sv-SE" dirty="0" smtClean="0"/>
-              <a:t>Då vi inte har ett färdigt program, är det svårt att göra en inspektion utifrån ett scenario, så vi valde att göra den utifrån en checklista. Vi utgick ifrån den checklista som använts i kursen och anpassade den till den kod vi skulle granska. </a:t>
-            </a:r>
-            <a:endParaRPr lang="sv-SE" dirty="0"/>
+            <a:endParaRPr lang="sv-SE"/>
           </a:p>
         </p:txBody>
       </p:sp>
@@ -19425,7 +19547,7 @@
     </p:custDataLst>
     <p:extLst>
       <p:ext uri="{BB962C8B-B14F-4D97-AF65-F5344CB8AC3E}">
-        <p14:creationId xmlns:p14="http://schemas.microsoft.com/office/powerpoint/2010/main" val="427268963"/>
+        <p14:creationId xmlns:p14="http://schemas.microsoft.com/office/powerpoint/2010/main" val="2129764329"/>
       </p:ext>
     </p:extLst>
   </p:cSld>
@@ -19468,10 +19590,108 @@
           <a:lstStyle/>
           <a:p>
             <a:r>
-              <a:rPr lang="sv-SE" dirty="0" smtClean="0"/>
+              <a:rPr lang="sv-SE" dirty="0"/>
+              <a:t>Granskning</a:t>
+            </a:r>
+          </a:p>
+        </p:txBody>
+      </p:sp>
+      <p:sp>
+        <p:nvSpPr>
+          <p:cNvPr id="3" name="Platshållare för innehåll 2"/>
+          <p:cNvSpPr>
+            <a:spLocks noGrp="1"/>
+          </p:cNvSpPr>
+          <p:nvPr>
+            <p:ph idx="1"/>
+          </p:nvPr>
+        </p:nvSpPr>
+        <p:spPr/>
+        <p:txBody>
+          <a:bodyPr/>
+          <a:lstStyle/>
+          <a:p>
+            <a:r>
+              <a:rPr lang="sv-SE" dirty="0"/>
+              <a:t>Vi valde att granska metoden </a:t>
+            </a:r>
+            <a:r>
+              <a:rPr lang="sv-SE" dirty="0" err="1"/>
+              <a:t>Effect</a:t>
+            </a:r>
+            <a:r>
+              <a:rPr lang="sv-SE" dirty="0"/>
+              <a:t>, då den är den största metoden i programmet, samt innehåller en del </a:t>
+            </a:r>
+            <a:r>
+              <a:rPr lang="sv-SE" dirty="0" err="1"/>
+              <a:t>if</a:t>
+            </a:r>
+            <a:r>
+              <a:rPr lang="sv-SE" dirty="0"/>
+              <a:t>- och switch-satser. </a:t>
+            </a:r>
+          </a:p>
+          <a:p>
+            <a:r>
+              <a:rPr lang="sv-SE" dirty="0"/>
+              <a:t>Då vi inte har ett färdigt program, är det svårt att göra en inspektion utifrån ett scenario, så vi valde att göra den utifrån en checklista. Vi utgick ifrån den checklista som använts i kursen och anpassade den till den kod vi skulle granska. </a:t>
+            </a:r>
+          </a:p>
+        </p:txBody>
+      </p:sp>
+    </p:spTree>
+    <p:custDataLst>
+      <p:tags r:id="rId1"/>
+    </p:custDataLst>
+    <p:extLst>
+      <p:ext uri="{BB962C8B-B14F-4D97-AF65-F5344CB8AC3E}">
+        <p14:creationId xmlns:p14="http://schemas.microsoft.com/office/powerpoint/2010/main" val="427268963"/>
+      </p:ext>
+    </p:extLst>
+  </p:cSld>
+  <p:clrMapOvr>
+    <a:masterClrMapping/>
+  </p:clrMapOvr>
+</p:sld>
+</file>
+
+<file path=ppt/slides/slide25.xml><?xml version="1.0" encoding="utf-8"?>
+<p:sld xmlns:a="http://schemas.openxmlformats.org/drawingml/2006/main" xmlns:r="http://schemas.openxmlformats.org/officeDocument/2006/relationships" xmlns:p="http://schemas.openxmlformats.org/presentationml/2006/main">
+  <p:cSld>
+    <p:spTree>
+      <p:nvGrpSpPr>
+        <p:cNvPr id="1" name=""/>
+        <p:cNvGrpSpPr/>
+        <p:nvPr/>
+      </p:nvGrpSpPr>
+      <p:grpSpPr>
+        <a:xfrm>
+          <a:off x="0" y="0"/>
+          <a:ext cx="0" cy="0"/>
+          <a:chOff x="0" y="0"/>
+          <a:chExt cx="0" cy="0"/>
+        </a:xfrm>
+      </p:grpSpPr>
+      <p:sp>
+        <p:nvSpPr>
+          <p:cNvPr id="2" name="Rubrik 1"/>
+          <p:cNvSpPr>
+            <a:spLocks noGrp="1"/>
+          </p:cNvSpPr>
+          <p:nvPr>
+            <p:ph type="title"/>
+          </p:nvPr>
+        </p:nvSpPr>
+        <p:spPr/>
+        <p:txBody>
+          <a:bodyPr/>
+          <a:lstStyle/>
+          <a:p>
+            <a:r>
+              <a:rPr lang="sv-SE" dirty="0"/>
               <a:t>Granskningsrapport</a:t>
             </a:r>
-            <a:endParaRPr lang="sv-SE" dirty="0"/>
           </a:p>
         </p:txBody>
       </p:sp>
@@ -19518,10 +19738,9 @@
                     <a:lstStyle/>
                     <a:p>
                       <a:r>
-                        <a:rPr lang="sv-SE" dirty="0" smtClean="0"/>
+                        <a:rPr lang="sv-SE" dirty="0"/>
                         <a:t>Fel hittade i koden utifrån checklistan </a:t>
                       </a:r>
-                      <a:endParaRPr lang="sv-SE" dirty="0"/>
                     </a:p>
                   </a:txBody>
                   <a:tcPr/>
@@ -19532,18 +19751,17 @@
                     <a:lstStyle/>
                     <a:p>
                       <a:r>
-                        <a:rPr lang="sv-SE" dirty="0" smtClean="0"/>
+                        <a:rPr lang="sv-SE" dirty="0"/>
                         <a:t>Bedömd</a:t>
                       </a:r>
                       <a:r>
-                        <a:rPr lang="sv-SE" baseline="0" dirty="0" smtClean="0"/>
+                        <a:rPr lang="sv-SE" baseline="0" dirty="0"/>
                         <a:t> </a:t>
                       </a:r>
                       <a:r>
-                        <a:rPr lang="sv-SE" dirty="0" smtClean="0"/>
+                        <a:rPr lang="sv-SE" dirty="0"/>
                         <a:t>nivå</a:t>
                       </a:r>
-                      <a:endParaRPr lang="sv-SE" dirty="0"/>
                     </a:p>
                   </a:txBody>
                   <a:tcPr/>
@@ -19561,39 +19779,39 @@
                     <a:lstStyle/>
                     <a:p>
                       <a:r>
-                        <a:rPr lang="sv-SE" dirty="0" err="1" smtClean="0"/>
+                        <a:rPr lang="sv-SE" dirty="0" err="1"/>
                         <a:t>Some</a:t>
                       </a:r>
                       <a:r>
-                        <a:rPr lang="sv-SE" baseline="0" dirty="0" smtClean="0"/>
+                        <a:rPr lang="sv-SE" baseline="0" dirty="0"/>
                         <a:t> </a:t>
                       </a:r>
                       <a:r>
-                        <a:rPr lang="sv-SE" baseline="0" dirty="0" err="1" smtClean="0"/>
+                        <a:rPr lang="sv-SE" baseline="0" dirty="0" err="1"/>
                         <a:t>methods</a:t>
                       </a:r>
                       <a:r>
-                        <a:rPr lang="sv-SE" baseline="0" dirty="0" smtClean="0"/>
+                        <a:rPr lang="sv-SE" baseline="0" dirty="0"/>
                         <a:t> </a:t>
                       </a:r>
                       <a:r>
-                        <a:rPr lang="sv-SE" baseline="0" dirty="0" err="1" smtClean="0"/>
+                        <a:rPr lang="sv-SE" baseline="0" dirty="0" err="1"/>
                         <a:t>could</a:t>
                       </a:r>
                       <a:r>
-                        <a:rPr lang="sv-SE" baseline="0" dirty="0" smtClean="0"/>
+                        <a:rPr lang="sv-SE" baseline="0" dirty="0"/>
                         <a:t> be </a:t>
                       </a:r>
                       <a:r>
-                        <a:rPr lang="sv-SE" baseline="0" dirty="0" err="1" smtClean="0"/>
+                        <a:rPr lang="sv-SE" baseline="0" dirty="0" err="1"/>
                         <a:t>further</a:t>
                       </a:r>
                       <a:r>
-                        <a:rPr lang="sv-SE" baseline="0" dirty="0" smtClean="0"/>
+                        <a:rPr lang="sv-SE" baseline="0" dirty="0"/>
                         <a:t> </a:t>
                       </a:r>
                       <a:r>
-                        <a:rPr lang="sv-SE" baseline="0" dirty="0" err="1" smtClean="0"/>
+                        <a:rPr lang="sv-SE" baseline="0" dirty="0" err="1"/>
                         <a:t>restricted</a:t>
                       </a:r>
                       <a:endParaRPr lang="sv-SE" dirty="0"/>
@@ -19607,10 +19825,9 @@
                     <a:lstStyle/>
                     <a:p>
                       <a:r>
-                        <a:rPr lang="sv-SE" dirty="0" smtClean="0"/>
+                        <a:rPr lang="sv-SE" dirty="0"/>
                         <a:t>Minor</a:t>
                       </a:r>
-                      <a:endParaRPr lang="sv-SE" dirty="0"/>
                     </a:p>
                   </a:txBody>
                   <a:tcPr/>
@@ -19628,58 +19845,58 @@
                     <a:lstStyle/>
                     <a:p>
                       <a:r>
-                        <a:rPr lang="sv-SE" baseline="0" dirty="0" err="1" smtClean="0"/>
+                        <a:rPr lang="sv-SE" baseline="0" dirty="0" err="1"/>
                         <a:t>One</a:t>
                       </a:r>
                       <a:r>
-                        <a:rPr lang="sv-SE" baseline="0" dirty="0" smtClean="0"/>
+                        <a:rPr lang="sv-SE" baseline="0" dirty="0"/>
                         <a:t> </a:t>
                       </a:r>
                       <a:r>
-                        <a:rPr lang="sv-SE" baseline="0" dirty="0" err="1" smtClean="0"/>
+                        <a:rPr lang="sv-SE" baseline="0" dirty="0" err="1"/>
                         <a:t>method</a:t>
                       </a:r>
                       <a:r>
-                        <a:rPr lang="sv-SE" baseline="0" dirty="0" smtClean="0"/>
+                        <a:rPr lang="sv-SE" baseline="0" dirty="0"/>
                         <a:t> </a:t>
                       </a:r>
                       <a:r>
-                        <a:rPr lang="sv-SE" baseline="0" dirty="0" err="1" smtClean="0"/>
+                        <a:rPr lang="sv-SE" baseline="0" dirty="0" err="1"/>
                         <a:t>doesn’t</a:t>
                       </a:r>
                       <a:r>
-                        <a:rPr lang="sv-SE" baseline="0" dirty="0" smtClean="0"/>
+                        <a:rPr lang="sv-SE" baseline="0" dirty="0"/>
                         <a:t> check </a:t>
                       </a:r>
                       <a:r>
-                        <a:rPr lang="sv-SE" baseline="0" dirty="0" err="1" smtClean="0"/>
+                        <a:rPr lang="sv-SE" baseline="0" dirty="0" err="1"/>
                         <a:t>if</a:t>
                       </a:r>
                       <a:r>
-                        <a:rPr lang="sv-SE" baseline="0" dirty="0" smtClean="0"/>
+                        <a:rPr lang="sv-SE" baseline="0" dirty="0"/>
                         <a:t> </a:t>
                       </a:r>
                       <a:r>
-                        <a:rPr lang="sv-SE" baseline="0" dirty="0" err="1" smtClean="0"/>
+                        <a:rPr lang="sv-SE" baseline="0" dirty="0" err="1"/>
                         <a:t>method</a:t>
                       </a:r>
                       <a:r>
-                        <a:rPr lang="sv-SE" baseline="0" dirty="0" smtClean="0"/>
+                        <a:rPr lang="sv-SE" baseline="0" dirty="0"/>
                         <a:t> parameter ”</a:t>
                       </a:r>
                       <a:r>
-                        <a:rPr lang="sv-SE" baseline="0" dirty="0" err="1" smtClean="0"/>
+                        <a:rPr lang="sv-SE" baseline="0" dirty="0" err="1"/>
                         <a:t>target</a:t>
                       </a:r>
                       <a:r>
-                        <a:rPr lang="sv-SE" baseline="0" dirty="0" smtClean="0"/>
+                        <a:rPr lang="sv-SE" baseline="0" dirty="0"/>
                         <a:t>” is </a:t>
                       </a:r>
                       <a:r>
-                        <a:rPr lang="sv-SE" baseline="0" dirty="0" err="1" smtClean="0"/>
+                        <a:rPr lang="sv-SE" baseline="0" dirty="0" err="1"/>
                         <a:t>null</a:t>
                       </a:r>
-                      <a:endParaRPr lang="sv-SE" baseline="0" dirty="0" smtClean="0"/>
+                      <a:endParaRPr lang="sv-SE" baseline="0" dirty="0"/>
                     </a:p>
                   </a:txBody>
                   <a:tcPr/>
@@ -19690,10 +19907,9 @@
                     <a:lstStyle/>
                     <a:p>
                       <a:r>
-                        <a:rPr lang="sv-SE" dirty="0" smtClean="0"/>
+                        <a:rPr lang="sv-SE" dirty="0"/>
                         <a:t>Minor</a:t>
                       </a:r>
-                      <a:endParaRPr lang="sv-SE" dirty="0"/>
                     </a:p>
                   </a:txBody>
                   <a:tcPr/>
@@ -19711,47 +19927,47 @@
                     <a:lstStyle/>
                     <a:p>
                       <a:r>
-                        <a:rPr lang="sv-SE" dirty="0" smtClean="0"/>
+                        <a:rPr lang="sv-SE" dirty="0"/>
                         <a:t>No </a:t>
                       </a:r>
                       <a:r>
-                        <a:rPr lang="sv-SE" dirty="0" err="1" smtClean="0"/>
+                        <a:rPr lang="sv-SE" dirty="0" err="1"/>
                         <a:t>comments</a:t>
                       </a:r>
                       <a:r>
-                        <a:rPr lang="sv-SE" dirty="0" smtClean="0"/>
+                        <a:rPr lang="sv-SE" dirty="0"/>
                         <a:t> </a:t>
                       </a:r>
                       <a:r>
-                        <a:rPr lang="sv-SE" dirty="0" err="1" smtClean="0"/>
+                        <a:rPr lang="sv-SE" dirty="0" err="1"/>
                         <a:t>when</a:t>
                       </a:r>
                       <a:r>
-                        <a:rPr lang="sv-SE" dirty="0" smtClean="0"/>
+                        <a:rPr lang="sv-SE" dirty="0"/>
                         <a:t> break </a:t>
                       </a:r>
                       <a:r>
-                        <a:rPr lang="sv-SE" dirty="0" err="1" smtClean="0"/>
+                        <a:rPr lang="sv-SE" dirty="0" err="1"/>
                         <a:t>isn’t</a:t>
                       </a:r>
                       <a:r>
-                        <a:rPr lang="sv-SE" dirty="0" smtClean="0"/>
+                        <a:rPr lang="sv-SE" dirty="0"/>
                         <a:t> </a:t>
                       </a:r>
                       <a:r>
-                        <a:rPr lang="sv-SE" dirty="0" err="1" smtClean="0"/>
+                        <a:rPr lang="sv-SE" dirty="0" err="1"/>
                         <a:t>used</a:t>
                       </a:r>
                       <a:r>
-                        <a:rPr lang="sv-SE" dirty="0" smtClean="0"/>
+                        <a:rPr lang="sv-SE" dirty="0"/>
                         <a:t> in switch</a:t>
                       </a:r>
                       <a:r>
-                        <a:rPr lang="sv-SE" baseline="0" dirty="0" smtClean="0"/>
+                        <a:rPr lang="sv-SE" baseline="0" dirty="0"/>
                         <a:t> </a:t>
                       </a:r>
                       <a:r>
-                        <a:rPr lang="sv-SE" baseline="0" dirty="0" err="1" smtClean="0"/>
+                        <a:rPr lang="sv-SE" baseline="0" dirty="0" err="1"/>
                         <a:t>statements</a:t>
                       </a:r>
                       <a:endParaRPr lang="sv-SE" dirty="0"/>
@@ -19765,10 +19981,9 @@
                     <a:lstStyle/>
                     <a:p>
                       <a:r>
-                        <a:rPr lang="sv-SE" dirty="0" smtClean="0"/>
+                        <a:rPr lang="sv-SE" dirty="0"/>
                         <a:t>Minor</a:t>
                       </a:r>
-                      <a:endParaRPr lang="sv-SE" dirty="0"/>
                     </a:p>
                   </a:txBody>
                   <a:tcPr/>
@@ -19786,31 +20001,31 @@
                     <a:lstStyle/>
                     <a:p>
                       <a:r>
-                        <a:rPr lang="sv-SE" dirty="0" smtClean="0"/>
+                        <a:rPr lang="sv-SE" dirty="0"/>
                         <a:t>5 </a:t>
                       </a:r>
                       <a:r>
-                        <a:rPr lang="sv-SE" dirty="0" err="1" smtClean="0"/>
+                        <a:rPr lang="sv-SE" dirty="0" err="1"/>
                         <a:t>lines</a:t>
                       </a:r>
                       <a:r>
-                        <a:rPr lang="sv-SE" dirty="0" smtClean="0"/>
+                        <a:rPr lang="sv-SE" dirty="0"/>
                         <a:t> </a:t>
                       </a:r>
                       <a:r>
-                        <a:rPr lang="sv-SE" dirty="0" err="1" smtClean="0"/>
+                        <a:rPr lang="sv-SE" dirty="0" err="1"/>
                         <a:t>are</a:t>
                       </a:r>
                       <a:r>
-                        <a:rPr lang="sv-SE" baseline="0" dirty="0" smtClean="0"/>
+                        <a:rPr lang="sv-SE" baseline="0" dirty="0"/>
                         <a:t> </a:t>
                       </a:r>
                       <a:r>
-                        <a:rPr lang="sv-SE" baseline="0" dirty="0" err="1" smtClean="0"/>
+                        <a:rPr lang="sv-SE" baseline="0" dirty="0" err="1"/>
                         <a:t>too</a:t>
                       </a:r>
                       <a:r>
-                        <a:rPr lang="sv-SE" baseline="0" dirty="0" smtClean="0"/>
+                        <a:rPr lang="sv-SE" baseline="0" dirty="0"/>
                         <a:t> long</a:t>
                       </a:r>
                       <a:endParaRPr lang="sv-SE" dirty="0"/>
@@ -19824,10 +20039,9 @@
                     <a:lstStyle/>
                     <a:p>
                       <a:r>
-                        <a:rPr lang="sv-SE" dirty="0" smtClean="0"/>
+                        <a:rPr lang="sv-SE" dirty="0"/>
                         <a:t>Minor</a:t>
                       </a:r>
-                      <a:endParaRPr lang="sv-SE" dirty="0"/>
                     </a:p>
                   </a:txBody>
                   <a:tcPr/>
@@ -19858,91 +20072,6 @@
 </p:sld>
 </file>
 
-<file path=ppt/slides/slide25.xml><?xml version="1.0" encoding="utf-8"?>
-<p:sld xmlns:a="http://schemas.openxmlformats.org/drawingml/2006/main" xmlns:r="http://schemas.openxmlformats.org/officeDocument/2006/relationships" xmlns:p="http://schemas.openxmlformats.org/presentationml/2006/main">
-  <p:cSld>
-    <p:spTree>
-      <p:nvGrpSpPr>
-        <p:cNvPr id="1" name=""/>
-        <p:cNvGrpSpPr/>
-        <p:nvPr/>
-      </p:nvGrpSpPr>
-      <p:grpSpPr>
-        <a:xfrm>
-          <a:off x="0" y="0"/>
-          <a:ext cx="0" cy="0"/>
-          <a:chOff x="0" y="0"/>
-          <a:chExt cx="0" cy="0"/>
-        </a:xfrm>
-      </p:grpSpPr>
-      <p:sp>
-        <p:nvSpPr>
-          <p:cNvPr id="2" name="Rubrik 1"/>
-          <p:cNvSpPr>
-            <a:spLocks noGrp="1"/>
-          </p:cNvSpPr>
-          <p:nvPr>
-            <p:ph type="title"/>
-          </p:nvPr>
-        </p:nvSpPr>
-        <p:spPr/>
-        <p:txBody>
-          <a:bodyPr/>
-          <a:lstStyle/>
-          <a:p>
-            <a:r>
-              <a:rPr lang="sv-SE" dirty="0" smtClean="0"/>
-              <a:t>Erfarenheter av granskning</a:t>
-            </a:r>
-            <a:endParaRPr lang="sv-SE" dirty="0"/>
-          </a:p>
-        </p:txBody>
-      </p:sp>
-      <p:sp>
-        <p:nvSpPr>
-          <p:cNvPr id="3" name="Platshållare för innehåll 2"/>
-          <p:cNvSpPr>
-            <a:spLocks noGrp="1"/>
-          </p:cNvSpPr>
-          <p:nvPr>
-            <p:ph idx="1"/>
-          </p:nvPr>
-        </p:nvSpPr>
-        <p:spPr/>
-        <p:txBody>
-          <a:bodyPr/>
-          <a:lstStyle/>
-          <a:p>
-            <a:r>
-              <a:rPr lang="sv-SE" dirty="0" smtClean="0"/>
-              <a:t>Vi anser att det är bättre med informell granskning när det gäller kod av denna storlek och på denna nivå. </a:t>
-            </a:r>
-          </a:p>
-          <a:p>
-            <a:r>
-              <a:rPr lang="sv-SE" dirty="0" smtClean="0"/>
-              <a:t>Det bästa med inspektionen var att man fick en idé om vilka saker man själv behöver tänka på i framtiden. Möjligtvis att man gör en egen lista med saker man har svårt med eller brukar missa, så att man själv kan hålla koll på att man kodar på ett bra sätt och får bra vanor. </a:t>
-            </a:r>
-            <a:endParaRPr lang="sv-SE" dirty="0"/>
-          </a:p>
-        </p:txBody>
-      </p:sp>
-    </p:spTree>
-    <p:custDataLst>
-      <p:tags r:id="rId1"/>
-    </p:custDataLst>
-    <p:extLst>
-      <p:ext uri="{BB962C8B-B14F-4D97-AF65-F5344CB8AC3E}">
-        <p14:creationId xmlns:p14="http://schemas.microsoft.com/office/powerpoint/2010/main" val="3676843999"/>
-      </p:ext>
-    </p:extLst>
-  </p:cSld>
-  <p:clrMapOvr>
-    <a:masterClrMapping/>
-  </p:clrMapOvr>
-</p:sld>
-</file>
-
 <file path=ppt/slides/slide26.xml><?xml version="1.0" encoding="utf-8"?>
 <p:sld xmlns:a="http://schemas.openxmlformats.org/drawingml/2006/main" xmlns:r="http://schemas.openxmlformats.org/officeDocument/2006/relationships" xmlns:p="http://schemas.openxmlformats.org/presentationml/2006/main">
   <p:cSld>
@@ -19977,7 +20106,7 @@
           <a:p>
             <a:r>
               <a:rPr lang="sv-SE" dirty="0"/>
-              <a:t>Kodkritiksystem</a:t>
+              <a:t>Erfarenheter av granskning</a:t>
             </a:r>
           </a:p>
         </p:txBody>
@@ -19997,7 +20126,16 @@
           <a:bodyPr/>
           <a:lstStyle/>
           <a:p>
-            <a:endParaRPr lang="sv-SE"/>
+            <a:r>
+              <a:rPr lang="sv-SE" dirty="0"/>
+              <a:t>Vi anser att det är bättre med informell granskning när det gäller kod av denna storlek och på denna nivå. </a:t>
+            </a:r>
+          </a:p>
+          <a:p>
+            <a:r>
+              <a:rPr lang="sv-SE" dirty="0"/>
+              <a:t>Det bästa med inspektionen var att man fick en idé om vilka saker man själv behöver tänka på i framtiden. Möjligtvis att man gör en egen lista med saker man har svårt med eller brukar missa, så att man själv kan hålla koll på att man kodar på ett bra sätt och får bra vanor. </a:t>
+            </a:r>
           </a:p>
         </p:txBody>
       </p:sp>
@@ -20007,7 +20145,7 @@
     </p:custDataLst>
     <p:extLst>
       <p:ext uri="{BB962C8B-B14F-4D97-AF65-F5344CB8AC3E}">
-        <p14:creationId xmlns:p14="http://schemas.microsoft.com/office/powerpoint/2010/main" val="847618868"/>
+        <p14:creationId xmlns:p14="http://schemas.microsoft.com/office/powerpoint/2010/main" val="3676843999"/>
       </p:ext>
     </p:extLst>
   </p:cSld>
@@ -20051,7 +20189,7 @@
           <a:p>
             <a:r>
               <a:rPr lang="sv-SE" dirty="0"/>
-              <a:t>Statiska mått</a:t>
+              <a:t>Kodkritiksystem</a:t>
             </a:r>
           </a:p>
         </p:txBody>
@@ -20081,7 +20219,7 @@
     </p:custDataLst>
     <p:extLst>
       <p:ext uri="{BB962C8B-B14F-4D97-AF65-F5344CB8AC3E}">
-        <p14:creationId xmlns:p14="http://schemas.microsoft.com/office/powerpoint/2010/main" val="3620096591"/>
+        <p14:creationId xmlns:p14="http://schemas.microsoft.com/office/powerpoint/2010/main" val="847618868"/>
       </p:ext>
     </p:extLst>
   </p:cSld>
@@ -20125,7 +20263,7 @@
           <a:p>
             <a:r>
               <a:rPr lang="sv-SE" dirty="0"/>
-              <a:t>Täckningsgrad</a:t>
+              <a:t>Statiska mått</a:t>
             </a:r>
           </a:p>
         </p:txBody>
@@ -20155,7 +20293,7 @@
     </p:custDataLst>
     <p:extLst>
       <p:ext uri="{BB962C8B-B14F-4D97-AF65-F5344CB8AC3E}">
-        <p14:creationId xmlns:p14="http://schemas.microsoft.com/office/powerpoint/2010/main" val="3476279416"/>
+        <p14:creationId xmlns:p14="http://schemas.microsoft.com/office/powerpoint/2010/main" val="3620096591"/>
       </p:ext>
     </p:extLst>
   </p:cSld>
@@ -20199,7 +20337,7 @@
           <a:p>
             <a:r>
               <a:rPr lang="sv-SE" dirty="0"/>
-              <a:t>Profiler</a:t>
+              <a:t>Täckningsgrad</a:t>
             </a:r>
           </a:p>
         </p:txBody>
@@ -20229,7 +20367,7 @@
     </p:custDataLst>
     <p:extLst>
       <p:ext uri="{BB962C8B-B14F-4D97-AF65-F5344CB8AC3E}">
-        <p14:creationId xmlns:p14="http://schemas.microsoft.com/office/powerpoint/2010/main" val="4124232571"/>
+        <p14:creationId xmlns:p14="http://schemas.microsoft.com/office/powerpoint/2010/main" val="3476279416"/>
       </p:ext>
     </p:extLst>
   </p:cSld>
@@ -20278,25 +20416,41 @@
           </a:p>
         </p:txBody>
       </p:sp>
-      <p:sp>
-        <p:nvSpPr>
-          <p:cNvPr id="3" name="Platshållare för innehåll 2"/>
-          <p:cNvSpPr>
-            <a:spLocks noGrp="1"/>
-          </p:cNvSpPr>
+      <p:pic>
+        <p:nvPicPr>
+          <p:cNvPr id="9" name="Platshållare för innehåll 8" descr="En bild som visar skärmbild, dator&#10;&#10;Automatiskt genererad beskrivning">
+            <a:extLst>
+              <a:ext uri="{FF2B5EF4-FFF2-40B4-BE49-F238E27FC236}">
+                <a16:creationId xmlns:a16="http://schemas.microsoft.com/office/drawing/2014/main" id="{BEEEA538-F5D1-4046-BDE6-F446F66AC88C}"/>
+              </a:ext>
+            </a:extLst>
+          </p:cNvPr>
+          <p:cNvPicPr>
+            <a:picLocks noGrp="1" noChangeAspect="1"/>
+          </p:cNvPicPr>
           <p:nvPr>
             <p:ph idx="1"/>
           </p:nvPr>
-        </p:nvSpPr>
-        <p:spPr/>
-        <p:txBody>
-          <a:bodyPr/>
-          <a:lstStyle/>
-          <a:p>
-            <a:endParaRPr lang="sv-SE" dirty="0"/>
-          </a:p>
-        </p:txBody>
-      </p:sp>
+        </p:nvPicPr>
+        <p:blipFill>
+          <a:blip r:embed="rId4" cstate="print">
+            <a:extLst>
+              <a:ext uri="{28A0092B-C50C-407E-A947-70E740481C1C}">
+                <a14:useLocalDpi xmlns:a14="http://schemas.microsoft.com/office/drawing/2010/main" val="0"/>
+              </a:ext>
+            </a:extLst>
+          </a:blip>
+          <a:stretch>
+            <a:fillRect/>
+          </a:stretch>
+        </p:blipFill>
+        <p:spPr>
+          <a:xfrm>
+            <a:off x="3438083" y="0"/>
+            <a:ext cx="9016675" cy="6967431"/>
+          </a:xfrm>
+        </p:spPr>
+      </p:pic>
     </p:spTree>
     <p:custDataLst>
       <p:tags r:id="rId1"/>
@@ -20347,6 +20501,80 @@
           <a:p>
             <a:r>
               <a:rPr lang="sv-SE" dirty="0"/>
+              <a:t>Profiler</a:t>
+            </a:r>
+          </a:p>
+        </p:txBody>
+      </p:sp>
+      <p:sp>
+        <p:nvSpPr>
+          <p:cNvPr id="3" name="Platshållare för innehåll 2"/>
+          <p:cNvSpPr>
+            <a:spLocks noGrp="1"/>
+          </p:cNvSpPr>
+          <p:nvPr>
+            <p:ph idx="1"/>
+          </p:nvPr>
+        </p:nvSpPr>
+        <p:spPr/>
+        <p:txBody>
+          <a:bodyPr/>
+          <a:lstStyle/>
+          <a:p>
+            <a:endParaRPr lang="sv-SE"/>
+          </a:p>
+        </p:txBody>
+      </p:sp>
+    </p:spTree>
+    <p:custDataLst>
+      <p:tags r:id="rId1"/>
+    </p:custDataLst>
+    <p:extLst>
+      <p:ext uri="{BB962C8B-B14F-4D97-AF65-F5344CB8AC3E}">
+        <p14:creationId xmlns:p14="http://schemas.microsoft.com/office/powerpoint/2010/main" val="4124232571"/>
+      </p:ext>
+    </p:extLst>
+  </p:cSld>
+  <p:clrMapOvr>
+    <a:masterClrMapping/>
+  </p:clrMapOvr>
+</p:sld>
+</file>
+
+<file path=ppt/slides/slide31.xml><?xml version="1.0" encoding="utf-8"?>
+<p:sld xmlns:a="http://schemas.openxmlformats.org/drawingml/2006/main" xmlns:r="http://schemas.openxmlformats.org/officeDocument/2006/relationships" xmlns:p="http://schemas.openxmlformats.org/presentationml/2006/main">
+  <p:cSld>
+    <p:spTree>
+      <p:nvGrpSpPr>
+        <p:cNvPr id="1" name=""/>
+        <p:cNvGrpSpPr/>
+        <p:nvPr/>
+      </p:nvGrpSpPr>
+      <p:grpSpPr>
+        <a:xfrm>
+          <a:off x="0" y="0"/>
+          <a:ext cx="0" cy="0"/>
+          <a:chOff x="0" y="0"/>
+          <a:chExt cx="0" cy="0"/>
+        </a:xfrm>
+      </p:grpSpPr>
+      <p:sp>
+        <p:nvSpPr>
+          <p:cNvPr id="2" name="Rubrik 1"/>
+          <p:cNvSpPr>
+            <a:spLocks noGrp="1"/>
+          </p:cNvSpPr>
+          <p:nvPr>
+            <p:ph type="title"/>
+          </p:nvPr>
+        </p:nvSpPr>
+        <p:spPr/>
+        <p:txBody>
+          <a:bodyPr/>
+          <a:lstStyle/>
+          <a:p>
+            <a:r>
+              <a:rPr lang="sv-SE" dirty="0"/>
               <a:t>Byggscript</a:t>
             </a:r>
           </a:p>
@@ -20387,7 +20615,7 @@
 </p:sld>
 </file>
 
-<file path=ppt/slides/slide31.xml><?xml version="1.0" encoding="utf-8"?>
+<file path=ppt/slides/slide32.xml><?xml version="1.0" encoding="utf-8"?>
 <p:sld xmlns:a="http://schemas.openxmlformats.org/drawingml/2006/main" xmlns:r="http://schemas.openxmlformats.org/officeDocument/2006/relationships" xmlns:p="http://schemas.openxmlformats.org/presentationml/2006/main">
   <p:cSld>
     <p:spTree>
@@ -20495,6 +20723,96 @@
           <a:p>
             <a:r>
               <a:rPr lang="sv-SE" dirty="0"/>
+              <a:t>Slutlig design</a:t>
+            </a:r>
+          </a:p>
+        </p:txBody>
+      </p:sp>
+      <p:pic>
+        <p:nvPicPr>
+          <p:cNvPr id="11" name="Platshållare för innehåll 10" descr="En bild som visar karta, text&#10;&#10;Automatiskt genererad beskrivning">
+            <a:extLst>
+              <a:ext uri="{FF2B5EF4-FFF2-40B4-BE49-F238E27FC236}">
+                <a16:creationId xmlns:a16="http://schemas.microsoft.com/office/drawing/2014/main" id="{E3AC02AC-C6B2-4FB4-A91F-B42C0E8AED85}"/>
+              </a:ext>
+            </a:extLst>
+          </p:cNvPr>
+          <p:cNvPicPr>
+            <a:picLocks noGrp="1" noChangeAspect="1"/>
+          </p:cNvPicPr>
+          <p:nvPr>
+            <p:ph idx="1"/>
+          </p:nvPr>
+        </p:nvPicPr>
+        <p:blipFill>
+          <a:blip r:embed="rId4" cstate="print">
+            <a:extLst>
+              <a:ext uri="{28A0092B-C50C-407E-A947-70E740481C1C}">
+                <a14:useLocalDpi xmlns:a14="http://schemas.microsoft.com/office/drawing/2010/main" val="0"/>
+              </a:ext>
+            </a:extLst>
+          </a:blip>
+          <a:stretch>
+            <a:fillRect/>
+          </a:stretch>
+        </p:blipFill>
+        <p:spPr>
+          <a:xfrm>
+            <a:off x="5145785" y="273269"/>
+            <a:ext cx="3911904" cy="6055989"/>
+          </a:xfrm>
+        </p:spPr>
+      </p:pic>
+    </p:spTree>
+    <p:custDataLst>
+      <p:tags r:id="rId1"/>
+    </p:custDataLst>
+    <p:extLst>
+      <p:ext uri="{BB962C8B-B14F-4D97-AF65-F5344CB8AC3E}">
+        <p14:creationId xmlns:p14="http://schemas.microsoft.com/office/powerpoint/2010/main" val="1566951365"/>
+      </p:ext>
+    </p:extLst>
+  </p:cSld>
+  <p:clrMapOvr>
+    <a:masterClrMapping/>
+  </p:clrMapOvr>
+</p:sld>
+</file>
+
+<file path=ppt/slides/slide5.xml><?xml version="1.0" encoding="utf-8"?>
+<p:sld xmlns:a="http://schemas.openxmlformats.org/drawingml/2006/main" xmlns:r="http://schemas.openxmlformats.org/officeDocument/2006/relationships" xmlns:p="http://schemas.openxmlformats.org/presentationml/2006/main">
+  <p:cSld>
+    <p:spTree>
+      <p:nvGrpSpPr>
+        <p:cNvPr id="1" name=""/>
+        <p:cNvGrpSpPr/>
+        <p:nvPr/>
+      </p:nvGrpSpPr>
+      <p:grpSpPr>
+        <a:xfrm>
+          <a:off x="0" y="0"/>
+          <a:ext cx="0" cy="0"/>
+          <a:chOff x="0" y="0"/>
+          <a:chExt cx="0" cy="0"/>
+        </a:xfrm>
+      </p:grpSpPr>
+      <p:sp>
+        <p:nvSpPr>
+          <p:cNvPr id="2" name="Rubrik 1"/>
+          <p:cNvSpPr>
+            <a:spLocks noGrp="1"/>
+          </p:cNvSpPr>
+          <p:nvPr>
+            <p:ph type="title"/>
+          </p:nvPr>
+        </p:nvSpPr>
+        <p:spPr/>
+        <p:txBody>
+          <a:bodyPr/>
+          <a:lstStyle/>
+          <a:p>
+            <a:r>
+              <a:rPr lang="sv-SE" dirty="0"/>
               <a:t>TDD-exempel: namn (kopiera denna sida och fyll i kopian)</a:t>
             </a:r>
           </a:p>
@@ -20599,7 +20917,7 @@
 </p:sld>
 </file>
 
-<file path=ppt/slides/slide5.xml><?xml version="1.0" encoding="utf-8"?>
+<file path=ppt/slides/slide6.xml><?xml version="1.0" encoding="utf-8"?>
 <p:sld xmlns:a="http://schemas.openxmlformats.org/drawingml/2006/main" xmlns:r="http://schemas.openxmlformats.org/officeDocument/2006/relationships" xmlns:p="http://schemas.openxmlformats.org/presentationml/2006/main">
   <p:cSld>
     <p:spTree>
@@ -20769,7 +21087,7 @@
 </p:sld>
 </file>
 
-<file path=ppt/slides/slide6.xml><?xml version="1.0" encoding="utf-8"?>
+<file path=ppt/slides/slide7.xml><?xml version="1.0" encoding="utf-8"?>
 <p:sld xmlns:a="http://schemas.openxmlformats.org/drawingml/2006/main" xmlns:r="http://schemas.openxmlformats.org/officeDocument/2006/relationships" xmlns:p="http://schemas.openxmlformats.org/presentationml/2006/main">
   <p:cSld>
     <p:spTree>
@@ -20949,7 +21267,7 @@
 </p:sld>
 </file>
 
-<file path=ppt/slides/slide7.xml><?xml version="1.0" encoding="utf-8"?>
+<file path=ppt/slides/slide8.xml><?xml version="1.0" encoding="utf-8"?>
 <p:sld xmlns:a="http://schemas.openxmlformats.org/drawingml/2006/main" xmlns:r="http://schemas.openxmlformats.org/officeDocument/2006/relationships" xmlns:p="http://schemas.openxmlformats.org/presentationml/2006/main">
   <p:cSld>
     <p:spTree>
@@ -21129,7 +21447,7 @@
 </p:sld>
 </file>
 
-<file path=ppt/slides/slide8.xml><?xml version="1.0" encoding="utf-8"?>
+<file path=ppt/slides/slide9.xml><?xml version="1.0" encoding="utf-8"?>
 <p:sld xmlns:a="http://schemas.openxmlformats.org/drawingml/2006/main" xmlns:r="http://schemas.openxmlformats.org/officeDocument/2006/relationships" xmlns:p="http://schemas.openxmlformats.org/presentationml/2006/main">
   <p:cSld>
     <p:spTree>
@@ -21288,174 +21606,6 @@
     <p:extLst>
       <p:ext uri="{BB962C8B-B14F-4D97-AF65-F5344CB8AC3E}">
         <p14:creationId xmlns:p14="http://schemas.microsoft.com/office/powerpoint/2010/main" val="1949933306"/>
-      </p:ext>
-    </p:extLst>
-  </p:cSld>
-  <p:clrMapOvr>
-    <a:masterClrMapping/>
-  </p:clrMapOvr>
-</p:sld>
-</file>
-
-<file path=ppt/slides/slide9.xml><?xml version="1.0" encoding="utf-8"?>
-<p:sld xmlns:a="http://schemas.openxmlformats.org/drawingml/2006/main" xmlns:r="http://schemas.openxmlformats.org/officeDocument/2006/relationships" xmlns:p="http://schemas.openxmlformats.org/presentationml/2006/main">
-  <p:cSld>
-    <p:spTree>
-      <p:nvGrpSpPr>
-        <p:cNvPr id="1" name=""/>
-        <p:cNvGrpSpPr/>
-        <p:nvPr/>
-      </p:nvGrpSpPr>
-      <p:grpSpPr>
-        <a:xfrm>
-          <a:off x="0" y="0"/>
-          <a:ext cx="0" cy="0"/>
-          <a:chOff x="0" y="0"/>
-          <a:chExt cx="0" cy="0"/>
-        </a:xfrm>
-      </p:grpSpPr>
-      <p:sp>
-        <p:nvSpPr>
-          <p:cNvPr id="2" name="Rubrik 1"/>
-          <p:cNvSpPr>
-            <a:spLocks noGrp="1"/>
-          </p:cNvSpPr>
-          <p:nvPr>
-            <p:ph type="title"/>
-          </p:nvPr>
-        </p:nvSpPr>
-        <p:spPr/>
-        <p:txBody>
-          <a:bodyPr/>
-          <a:lstStyle/>
-          <a:p>
-            <a:r>
-              <a:rPr lang="sv-SE" dirty="0" err="1"/>
-              <a:t>TDD-exempel:Bjargey</a:t>
-            </a:r>
-            <a:r>
-              <a:rPr lang="sv-SE" dirty="0"/>
-              <a:t> Ingólfsdóttir</a:t>
-            </a:r>
-          </a:p>
-        </p:txBody>
-      </p:sp>
-      <p:sp>
-        <p:nvSpPr>
-          <p:cNvPr id="4" name="Platshållare för text 3"/>
-          <p:cNvSpPr>
-            <a:spLocks noGrp="1"/>
-          </p:cNvSpPr>
-          <p:nvPr>
-            <p:ph type="body" idx="1"/>
-          </p:nvPr>
-        </p:nvSpPr>
-        <p:spPr/>
-        <p:txBody>
-          <a:bodyPr/>
-          <a:lstStyle/>
-          <a:p>
-            <a:r>
-              <a:rPr lang="sv-SE" dirty="0" err="1"/>
-              <a:t>Testkod</a:t>
-            </a:r>
-            <a:endParaRPr lang="sv-SE" dirty="0"/>
-          </a:p>
-        </p:txBody>
-      </p:sp>
-      <p:sp>
-        <p:nvSpPr>
-          <p:cNvPr id="6" name="Platshållare för text 5"/>
-          <p:cNvSpPr>
-            <a:spLocks noGrp="1"/>
-          </p:cNvSpPr>
-          <p:nvPr>
-            <p:ph type="body" sz="quarter" idx="3"/>
-          </p:nvPr>
-        </p:nvSpPr>
-        <p:spPr/>
-        <p:txBody>
-          <a:bodyPr/>
-          <a:lstStyle/>
-          <a:p>
-            <a:r>
-              <a:rPr lang="sv-SE" dirty="0"/>
-              <a:t>Koden som testas</a:t>
-            </a:r>
-          </a:p>
-        </p:txBody>
-      </p:sp>
-      <p:pic>
-        <p:nvPicPr>
-          <p:cNvPr id="14" name="Platshållare för innehåll 13">
-            <a:extLst>
-              <a:ext uri="{FF2B5EF4-FFF2-40B4-BE49-F238E27FC236}">
-                <a16:creationId xmlns:a16="http://schemas.microsoft.com/office/drawing/2014/main" id="{782F486D-D497-46DE-97A2-08CF1FAFFC27}"/>
-              </a:ext>
-            </a:extLst>
-          </p:cNvPr>
-          <p:cNvPicPr>
-            <a:picLocks noGrp="1" noChangeAspect="1"/>
-          </p:cNvPicPr>
-          <p:nvPr>
-            <p:ph sz="quarter" idx="4"/>
-          </p:nvPr>
-        </p:nvPicPr>
-        <p:blipFill>
-          <a:blip r:embed="rId4"/>
-          <a:stretch>
-            <a:fillRect/>
-          </a:stretch>
-        </p:blipFill>
-        <p:spPr>
-          <a:xfrm>
-            <a:off x="6172199" y="3006726"/>
-            <a:ext cx="5998509" cy="2360452"/>
-          </a:xfrm>
-          <a:prstGeom prst="rect">
-            <a:avLst/>
-          </a:prstGeom>
-        </p:spPr>
-      </p:pic>
-      <p:pic>
-        <p:nvPicPr>
-          <p:cNvPr id="13" name="Platshållare för innehåll 12">
-            <a:extLst>
-              <a:ext uri="{FF2B5EF4-FFF2-40B4-BE49-F238E27FC236}">
-                <a16:creationId xmlns:a16="http://schemas.microsoft.com/office/drawing/2014/main" id="{B9A7EA65-3F37-47C8-BE59-12FE46DB30C3}"/>
-              </a:ext>
-            </a:extLst>
-          </p:cNvPr>
-          <p:cNvPicPr>
-            <a:picLocks noGrp="1" noChangeAspect="1"/>
-          </p:cNvPicPr>
-          <p:nvPr>
-            <p:ph sz="half" idx="2"/>
-          </p:nvPr>
-        </p:nvPicPr>
-        <p:blipFill>
-          <a:blip r:embed="rId5"/>
-          <a:stretch>
-            <a:fillRect/>
-          </a:stretch>
-        </p:blipFill>
-        <p:spPr>
-          <a:xfrm>
-            <a:off x="62981" y="3741683"/>
-            <a:ext cx="5937701" cy="1070732"/>
-          </a:xfrm>
-          <a:prstGeom prst="rect">
-            <a:avLst/>
-          </a:prstGeom>
-        </p:spPr>
-      </p:pic>
-    </p:spTree>
-    <p:custDataLst>
-      <p:tags r:id="rId1"/>
-    </p:custDataLst>
-    <p:extLst>
-      <p:ext uri="{BB962C8B-B14F-4D97-AF65-F5344CB8AC3E}">
-        <p14:creationId xmlns:p14="http://schemas.microsoft.com/office/powerpoint/2010/main" val="2171053083"/>
       </p:ext>
     </p:extLst>
   </p:cSld>
@@ -21617,6 +21767,12 @@
 </file>
 
 <file path=ppt/tags/tag32.xml><?xml version="1.0" encoding="utf-8"?>
+<p:tagLst xmlns:a="http://schemas.openxmlformats.org/drawingml/2006/main" xmlns:r="http://schemas.openxmlformats.org/officeDocument/2006/relationships" xmlns:p="http://schemas.openxmlformats.org/presentationml/2006/main">
+  <p:tag name="ARTICULATE_SLIDE_THUMBNAIL_REFRESH" val="1"/>
+</p:tagLst>
+</file>
+
+<file path=ppt/tags/tag33.xml><?xml version="1.0" encoding="utf-8"?>
 <p:tagLst xmlns:a="http://schemas.openxmlformats.org/drawingml/2006/main" xmlns:r="http://schemas.openxmlformats.org/officeDocument/2006/relationships" xmlns:p="http://schemas.openxmlformats.org/presentationml/2006/main">
   <p:tag name="ARTICULATE_SLIDE_THUMBNAIL_REFRESH" val="1"/>
 </p:tagLst>

</xml_diff>

<commit_message>
added tool to the list
</commit_message>
<xml_diff>
--- a/slutredovisning.pptx
+++ b/slutredovisning.pptx
@@ -11040,6 +11040,19 @@
               </a:rPr>
               <a:t>Override</a:t>
             </a:r>
+            <a:r>
+              <a:rPr kumimoji="0" lang="sv-SE" altLang="sv-SE" sz="800" b="0" i="0" u="none" strike="noStrike" cap="none" normalizeH="0" baseline="0" dirty="0">
+                <a:ln>
+                  <a:noFill/>
+                </a:ln>
+                <a:solidFill>
+                  <a:srgbClr val="BBB529"/>
+                </a:solidFill>
+                <a:effectLst/>
+                <a:latin typeface="Consolas" panose="020B0609020204030204" pitchFamily="49" charset="0"/>
+              </a:rPr>
+              <a:t/>
+            </a:r>
             <a:br>
               <a:rPr kumimoji="0" lang="sv-SE" altLang="sv-SE" sz="800" b="0" i="0" u="none" strike="noStrike" cap="none" normalizeH="0" baseline="0" dirty="0">
                 <a:ln>
@@ -13005,6 +13018,19 @@
                 <a:latin typeface="Consolas" panose="020B0609020204030204" pitchFamily="49" charset="0"/>
               </a:rPr>
             </a:br>
+            <a:r>
+              <a:rPr kumimoji="0" lang="sv-SE" altLang="sv-SE" sz="1000" b="0" i="0" u="none" strike="noStrike" cap="none" normalizeH="0" baseline="0" dirty="0">
+                <a:ln>
+                  <a:noFill/>
+                </a:ln>
+                <a:solidFill>
+                  <a:srgbClr val="A9B7C6"/>
+                </a:solidFill>
+                <a:effectLst/>
+                <a:latin typeface="Consolas" panose="020B0609020204030204" pitchFamily="49" charset="0"/>
+              </a:rPr>
+              <a:t/>
+            </a:r>
             <a:br>
               <a:rPr kumimoji="0" lang="sv-SE" altLang="sv-SE" sz="1000" b="0" i="0" u="none" strike="noStrike" cap="none" normalizeH="0" baseline="0" dirty="0">
                 <a:ln>
@@ -17830,6 +17856,19 @@
               </a:rPr>
               <a:t>    }</a:t>
             </a:r>
+            <a:r>
+              <a:rPr kumimoji="0" lang="sv-SE" altLang="sv-SE" sz="800" b="0" i="0" u="none" strike="noStrike" cap="none" normalizeH="0" baseline="0" dirty="0">
+                <a:ln>
+                  <a:noFill/>
+                </a:ln>
+                <a:solidFill>
+                  <a:srgbClr val="CC7832"/>
+                </a:solidFill>
+                <a:effectLst/>
+                <a:latin typeface="Consolas" panose="020B0609020204030204" pitchFamily="49" charset="0"/>
+              </a:rPr>
+              <a:t/>
+            </a:r>
             <a:br>
               <a:rPr kumimoji="0" lang="sv-SE" altLang="sv-SE" sz="800" b="0" i="0" u="none" strike="noStrike" cap="none" normalizeH="0" baseline="0" dirty="0">
                 <a:ln>
@@ -18391,6 +18430,19 @@
                 <a:latin typeface="Consolas" panose="020B0609020204030204" pitchFamily="49" charset="0"/>
               </a:rPr>
             </a:br>
+            <a:r>
+              <a:rPr kumimoji="0" lang="sv-SE" altLang="sv-SE" sz="800" b="0" i="0" u="none" strike="noStrike" cap="none" normalizeH="0" baseline="0" dirty="0">
+                <a:ln>
+                  <a:noFill/>
+                </a:ln>
+                <a:solidFill>
+                  <a:srgbClr val="A9B7C6"/>
+                </a:solidFill>
+                <a:effectLst/>
+                <a:latin typeface="Consolas" panose="020B0609020204030204" pitchFamily="49" charset="0"/>
+              </a:rPr>
+              <a:t/>
+            </a:r>
             <a:br>
               <a:rPr kumimoji="0" lang="sv-SE" altLang="sv-SE" sz="800" b="0" i="0" u="none" strike="noStrike" cap="none" normalizeH="0" baseline="0" dirty="0">
                 <a:ln>
@@ -19242,6 +19294,18 @@
               <a:rPr lang="sv-SE" dirty="0"/>
               <a:t>  </a:t>
             </a:r>
+            <a:endParaRPr lang="sv-SE" dirty="0" smtClean="0"/>
+          </a:p>
+          <a:p>
+            <a:r>
+              <a:rPr lang="sv-SE" dirty="0" smtClean="0"/>
+              <a:t>Java Flight </a:t>
+            </a:r>
+            <a:r>
+              <a:rPr lang="sv-SE" smtClean="0"/>
+              <a:t>Recorder</a:t>
+            </a:r>
+            <a:endParaRPr lang="sv-SE" dirty="0"/>
           </a:p>
         </p:txBody>
       </p:sp>

</xml_diff>

<commit_message>
Added checklist för granskningen
</commit_message>
<xml_diff>
--- a/slutredovisning.pptx
+++ b/slutredovisning.pptx
@@ -5,7 +5,7 @@
     <p:sldMasterId id="2147483648" r:id="rId1"/>
   </p:sldMasterIdLst>
   <p:notesMasterIdLst>
-    <p:notesMasterId r:id="rId34"/>
+    <p:notesMasterId r:id="rId35"/>
   </p:notesMasterIdLst>
   <p:sldIdLst>
     <p:sldId id="286" r:id="rId2"/>
@@ -32,19 +32,20 @@
     <p:sldId id="267" r:id="rId23"/>
     <p:sldId id="268" r:id="rId24"/>
     <p:sldId id="293" r:id="rId25"/>
-    <p:sldId id="294" r:id="rId26"/>
-    <p:sldId id="295" r:id="rId27"/>
-    <p:sldId id="276" r:id="rId28"/>
-    <p:sldId id="277" r:id="rId29"/>
-    <p:sldId id="278" r:id="rId30"/>
-    <p:sldId id="279" r:id="rId31"/>
-    <p:sldId id="280" r:id="rId32"/>
-    <p:sldId id="281" r:id="rId33"/>
+    <p:sldId id="297" r:id="rId26"/>
+    <p:sldId id="294" r:id="rId27"/>
+    <p:sldId id="295" r:id="rId28"/>
+    <p:sldId id="276" r:id="rId29"/>
+    <p:sldId id="277" r:id="rId30"/>
+    <p:sldId id="278" r:id="rId31"/>
+    <p:sldId id="279" r:id="rId32"/>
+    <p:sldId id="280" r:id="rId33"/>
+    <p:sldId id="281" r:id="rId34"/>
   </p:sldIdLst>
   <p:sldSz cx="12192000" cy="6858000"/>
   <p:notesSz cx="6858000" cy="9144000"/>
   <p:custDataLst>
-    <p:tags r:id="rId35"/>
+    <p:tags r:id="rId36"/>
   </p:custDataLst>
   <p:defaultTextStyle>
     <a:defPPr>
@@ -2762,7 +2763,31 @@
                 <a:ea typeface="+mn-ea"/>
                 <a:cs typeface="+mn-cs"/>
               </a:rPr>
-              <a:t>En lista över de påträffade felen och hur pass allvarliga ni bedömer dem.</a:t>
+              <a:t>En kort presentation av den del av koden ni valt ut för att göra en formell granskning av och processen ni använt er av inklusive eventuella checklistor, scenarier, </a:t>
+            </a:r>
+            <a:r>
+              <a:rPr lang="sv-SE" sz="1200" kern="1200" dirty="0" err="1">
+                <a:solidFill>
+                  <a:schemeClr val="tx1"/>
+                </a:solidFill>
+                <a:effectLst/>
+                <a:latin typeface="+mn-lt"/>
+                <a:ea typeface="+mn-ea"/>
+                <a:cs typeface="+mn-cs"/>
+              </a:rPr>
+              <a:t>edyl</a:t>
+            </a:r>
+            <a:r>
+              <a:rPr lang="sv-SE" sz="1200" kern="1200" dirty="0">
+                <a:solidFill>
+                  <a:schemeClr val="tx1"/>
+                </a:solidFill>
+                <a:effectLst/>
+                <a:latin typeface="+mn-lt"/>
+                <a:ea typeface="+mn-ea"/>
+                <a:cs typeface="+mn-cs"/>
+              </a:rPr>
+              <a:t>. Ni ska kort motivera valen, och ge tillräckligt med information för att det ska gå att bedöma er. </a:t>
             </a:r>
           </a:p>
           <a:p>
@@ -2796,7 +2821,7 @@
     </p:spTree>
     <p:extLst>
       <p:ext uri="{BB962C8B-B14F-4D97-AF65-F5344CB8AC3E}">
-        <p14:creationId xmlns:p14="http://schemas.microsoft.com/office/powerpoint/2010/main" val="4003170347"/>
+        <p14:creationId xmlns:p14="http://schemas.microsoft.com/office/powerpoint/2010/main" val="650456655"/>
       </p:ext>
     </p:extLst>
   </p:cSld>
@@ -2877,31 +2902,7 @@
                 <a:ea typeface="+mn-ea"/>
                 <a:cs typeface="+mn-cs"/>
               </a:rPr>
-              <a:t>En diskussion om vilka era erfarenheter ni dragit av att tillämpa granskning. Det finns inget rätt eller fel här. Enda sättet att bli underkända är att bara fuska över punkten och bara säga något pliktskyldigt. Ni förväntas förhålla er till såväl kursböckerna som utdelat material och IEEE </a:t>
-            </a:r>
-            <a:r>
-              <a:rPr lang="sv-SE" sz="1200" kern="1200" dirty="0" err="1">
-                <a:solidFill>
-                  <a:schemeClr val="tx1"/>
-                </a:solidFill>
-                <a:effectLst/>
-                <a:latin typeface="+mn-lt"/>
-                <a:ea typeface="+mn-ea"/>
-                <a:cs typeface="+mn-cs"/>
-              </a:rPr>
-              <a:t>Std</a:t>
-            </a:r>
-            <a:r>
-              <a:rPr lang="sv-SE" sz="1200" kern="1200" dirty="0">
-                <a:solidFill>
-                  <a:schemeClr val="tx1"/>
-                </a:solidFill>
-                <a:effectLst/>
-                <a:latin typeface="+mn-lt"/>
-                <a:ea typeface="+mn-ea"/>
-                <a:cs typeface="+mn-cs"/>
-              </a:rPr>
-              <a:t> 1028.</a:t>
+              <a:t>En lista över de påträffade felen och hur pass allvarliga ni bedömer dem.</a:t>
             </a:r>
           </a:p>
           <a:p>
@@ -2935,7 +2936,7 @@
     </p:spTree>
     <p:extLst>
       <p:ext uri="{BB962C8B-B14F-4D97-AF65-F5344CB8AC3E}">
-        <p14:creationId xmlns:p14="http://schemas.microsoft.com/office/powerpoint/2010/main" val="3774513394"/>
+        <p14:creationId xmlns:p14="http://schemas.microsoft.com/office/powerpoint/2010/main" val="4003170347"/>
       </p:ext>
     </p:extLst>
   </p:cSld>
@@ -3016,7 +3017,31 @@
                 <a:ea typeface="+mn-ea"/>
                 <a:cs typeface="+mn-cs"/>
               </a:rPr>
-              <a:t>En presentation av de problem som hittats med hjälp av verktyg för statisk analys och en diskussion av dem enligt anvisningarna. Det räcker alltså inte med att bara lista problemen, ni måste förhålla er till dem också. Tänk också på att ni ska göra detta både på koden som den såg ut före granskningen och på koden efter att ni rättat det som kommit fram under granskningen.</a:t>
+              <a:t>En diskussion om vilka era erfarenheter ni dragit av att tillämpa granskning. Det finns inget rätt eller fel här. Enda sättet att bli underkända är att bara fuska över punkten och bara säga något pliktskyldigt. Ni förväntas förhålla er till såväl kursböckerna som utdelat material och IEEE </a:t>
+            </a:r>
+            <a:r>
+              <a:rPr lang="sv-SE" sz="1200" kern="1200" dirty="0" err="1">
+                <a:solidFill>
+                  <a:schemeClr val="tx1"/>
+                </a:solidFill>
+                <a:effectLst/>
+                <a:latin typeface="+mn-lt"/>
+                <a:ea typeface="+mn-ea"/>
+                <a:cs typeface="+mn-cs"/>
+              </a:rPr>
+              <a:t>Std</a:t>
+            </a:r>
+            <a:r>
+              <a:rPr lang="sv-SE" sz="1200" kern="1200" dirty="0">
+                <a:solidFill>
+                  <a:schemeClr val="tx1"/>
+                </a:solidFill>
+                <a:effectLst/>
+                <a:latin typeface="+mn-lt"/>
+                <a:ea typeface="+mn-ea"/>
+                <a:cs typeface="+mn-cs"/>
+              </a:rPr>
+              <a:t> 1028.</a:t>
             </a:r>
           </a:p>
           <a:p>
@@ -3050,7 +3075,7 @@
     </p:spTree>
     <p:extLst>
       <p:ext uri="{BB962C8B-B14F-4D97-AF65-F5344CB8AC3E}">
-        <p14:creationId xmlns:p14="http://schemas.microsoft.com/office/powerpoint/2010/main" val="1343433812"/>
+        <p14:creationId xmlns:p14="http://schemas.microsoft.com/office/powerpoint/2010/main" val="3774513394"/>
       </p:ext>
     </p:extLst>
   </p:cSld>
@@ -3131,7 +3156,7 @@
                 <a:ea typeface="+mn-ea"/>
                 <a:cs typeface="+mn-cs"/>
               </a:rPr>
-              <a:t>En presentation och diskussion kring ett antal lämpliga statiska mått på koden. Att vi inte specificerar exakt vilka mått som ska tas upp beror på att olika verktyg har olika uppsättningar, men vi förväntar oss fler och mer intressanta mått än bara rena storleksmått som LOC, #klasser, #metoder, etc. Även här är det viktigt att förhållas sig till måtten, inte bara lista dem.</a:t>
+              <a:t>En presentation av de problem som hittats med hjälp av verktyg för statisk analys och en diskussion av dem enligt anvisningarna. Det räcker alltså inte med att bara lista problemen, ni måste förhålla er till dem också. Tänk också på att ni ska göra detta både på koden som den såg ut före granskningen och på koden efter att ni rättat det som kommit fram under granskningen.</a:t>
             </a:r>
           </a:p>
           <a:p>
@@ -3165,7 +3190,7 @@
     </p:spTree>
     <p:extLst>
       <p:ext uri="{BB962C8B-B14F-4D97-AF65-F5344CB8AC3E}">
-        <p14:creationId xmlns:p14="http://schemas.microsoft.com/office/powerpoint/2010/main" val="247082709"/>
+        <p14:creationId xmlns:p14="http://schemas.microsoft.com/office/powerpoint/2010/main" val="1343433812"/>
       </p:ext>
     </p:extLst>
   </p:cSld>
@@ -3246,7 +3271,7 @@
                 <a:ea typeface="+mn-ea"/>
                 <a:cs typeface="+mn-cs"/>
               </a:rPr>
-              <a:t>En översikt över vilken täckningsgrad era testfall uppnått. Denna kan antagligen tas rakt av från verktyget ni använt för att mäta den. Om ni inte uppnått fullständig täckning så ska detta förklaras och motiveras.</a:t>
+              <a:t>En presentation och diskussion kring ett antal lämpliga statiska mått på koden. Att vi inte specificerar exakt vilka mått som ska tas upp beror på att olika verktyg har olika uppsättningar, men vi förväntar oss fler och mer intressanta mått än bara rena storleksmått som LOC, #klasser, #metoder, etc. Även här är det viktigt att förhållas sig till måtten, inte bara lista dem.</a:t>
             </a:r>
           </a:p>
           <a:p>
@@ -3280,7 +3305,7 @@
     </p:spTree>
     <p:extLst>
       <p:ext uri="{BB962C8B-B14F-4D97-AF65-F5344CB8AC3E}">
-        <p14:creationId xmlns:p14="http://schemas.microsoft.com/office/powerpoint/2010/main" val="169751880"/>
+        <p14:creationId xmlns:p14="http://schemas.microsoft.com/office/powerpoint/2010/main" val="247082709"/>
       </p:ext>
     </p:extLst>
   </p:cSld>
@@ -3468,6 +3493,121 @@
                 <a:ea typeface="+mn-ea"/>
                 <a:cs typeface="+mn-cs"/>
               </a:rPr>
+              <a:t>En översikt över vilken täckningsgrad era testfall uppnått. Denna kan antagligen tas rakt av från verktyget ni använt för att mäta den. Om ni inte uppnått fullständig täckning så ska detta förklaras och motiveras.</a:t>
+            </a:r>
+          </a:p>
+          <a:p>
+            <a:endParaRPr lang="sv-SE" dirty="0"/>
+          </a:p>
+        </p:txBody>
+      </p:sp>
+      <p:sp>
+        <p:nvSpPr>
+          <p:cNvPr id="4" name="Platshållare för bildnummer 3"/>
+          <p:cNvSpPr>
+            <a:spLocks noGrp="1"/>
+          </p:cNvSpPr>
+          <p:nvPr>
+            <p:ph type="sldNum" sz="quarter" idx="10"/>
+          </p:nvPr>
+        </p:nvSpPr>
+        <p:spPr/>
+        <p:txBody>
+          <a:bodyPr/>
+          <a:lstStyle/>
+          <a:p>
+            <a:fld id="{8667F948-D2CB-486C-A2EA-FEABC2DAAE8D}" type="slidenum">
+              <a:rPr lang="sv-SE" smtClean="0"/>
+              <a:t>30</a:t>
+            </a:fld>
+            <a:endParaRPr lang="sv-SE"/>
+          </a:p>
+        </p:txBody>
+      </p:sp>
+    </p:spTree>
+    <p:extLst>
+      <p:ext uri="{BB962C8B-B14F-4D97-AF65-F5344CB8AC3E}">
+        <p14:creationId xmlns:p14="http://schemas.microsoft.com/office/powerpoint/2010/main" val="169751880"/>
+      </p:ext>
+    </p:extLst>
+  </p:cSld>
+  <p:clrMapOvr>
+    <a:masterClrMapping/>
+  </p:clrMapOvr>
+</p:notes>
+</file>
+
+<file path=ppt/notesSlides/notesSlide31.xml><?xml version="1.0" encoding="utf-8"?>
+<p:notes xmlns:a="http://schemas.openxmlformats.org/drawingml/2006/main" xmlns:r="http://schemas.openxmlformats.org/officeDocument/2006/relationships" xmlns:p="http://schemas.openxmlformats.org/presentationml/2006/main">
+  <p:cSld>
+    <p:spTree>
+      <p:nvGrpSpPr>
+        <p:cNvPr id="1" name=""/>
+        <p:cNvGrpSpPr/>
+        <p:nvPr/>
+      </p:nvGrpSpPr>
+      <p:grpSpPr>
+        <a:xfrm>
+          <a:off x="0" y="0"/>
+          <a:ext cx="0" cy="0"/>
+          <a:chOff x="0" y="0"/>
+          <a:chExt cx="0" cy="0"/>
+        </a:xfrm>
+      </p:grpSpPr>
+      <p:sp>
+        <p:nvSpPr>
+          <p:cNvPr id="2" name="Platshållare för bildobjekt 1"/>
+          <p:cNvSpPr>
+            <a:spLocks noGrp="1" noRot="1" noChangeAspect="1"/>
+          </p:cNvSpPr>
+          <p:nvPr>
+            <p:ph type="sldImg"/>
+          </p:nvPr>
+        </p:nvSpPr>
+        <p:spPr/>
+      </p:sp>
+      <p:sp>
+        <p:nvSpPr>
+          <p:cNvPr id="3" name="Platshållare för anteckningar 2"/>
+          <p:cNvSpPr>
+            <a:spLocks noGrp="1"/>
+          </p:cNvSpPr>
+          <p:nvPr>
+            <p:ph type="body" idx="1"/>
+          </p:nvPr>
+        </p:nvSpPr>
+        <p:spPr/>
+        <p:txBody>
+          <a:bodyPr/>
+          <a:lstStyle/>
+          <a:p>
+            <a:pPr marL="0" marR="0" lvl="0" indent="0" algn="l" defTabSz="914400" rtl="0" eaLnBrk="1" fontAlgn="auto" latinLnBrk="0" hangingPunct="1">
+              <a:lnSpc>
+                <a:spcPct val="100000"/>
+              </a:lnSpc>
+              <a:spcBef>
+                <a:spcPts val="0"/>
+              </a:spcBef>
+              <a:spcAft>
+                <a:spcPts val="0"/>
+              </a:spcAft>
+              <a:buClrTx/>
+              <a:buSzTx/>
+              <a:buFontTx/>
+              <a:buNone/>
+              <a:tabLst/>
+              <a:defRPr/>
+            </a:pPr>
+            <a:r>
+              <a:rPr lang="sv-SE" sz="1200" kern="1200" dirty="0">
+                <a:solidFill>
+                  <a:schemeClr val="tx1"/>
+                </a:solidFill>
+                <a:effectLst/>
+                <a:latin typeface="+mn-lt"/>
+                <a:ea typeface="+mn-ea"/>
+                <a:cs typeface="+mn-cs"/>
+              </a:rPr>
               <a:t>En kort presentation av hur ni gått tillväga för att testa koden med en profiler och vilka resultat ni fick fram. Även här är det viktigt att förhållas sig till måtten, inte bara presentera dem.</a:t>
             </a:r>
           </a:p>
@@ -3521,7 +3661,7 @@
           <a:p>
             <a:fld id="{8667F948-D2CB-486C-A2EA-FEABC2DAAE8D}" type="slidenum">
               <a:rPr lang="sv-SE" smtClean="0"/>
-              <a:t>30</a:t>
+              <a:t>31</a:t>
             </a:fld>
             <a:endParaRPr lang="sv-SE"/>
           </a:p>
@@ -3531,121 +3671,6 @@
     <p:extLst>
       <p:ext uri="{BB962C8B-B14F-4D97-AF65-F5344CB8AC3E}">
         <p14:creationId xmlns:p14="http://schemas.microsoft.com/office/powerpoint/2010/main" val="1278246246"/>
-      </p:ext>
-    </p:extLst>
-  </p:cSld>
-  <p:clrMapOvr>
-    <a:masterClrMapping/>
-  </p:clrMapOvr>
-</p:notes>
-</file>
-
-<file path=ppt/notesSlides/notesSlide31.xml><?xml version="1.0" encoding="utf-8"?>
-<p:notes xmlns:a="http://schemas.openxmlformats.org/drawingml/2006/main" xmlns:r="http://schemas.openxmlformats.org/officeDocument/2006/relationships" xmlns:p="http://schemas.openxmlformats.org/presentationml/2006/main">
-  <p:cSld>
-    <p:spTree>
-      <p:nvGrpSpPr>
-        <p:cNvPr id="1" name=""/>
-        <p:cNvGrpSpPr/>
-        <p:nvPr/>
-      </p:nvGrpSpPr>
-      <p:grpSpPr>
-        <a:xfrm>
-          <a:off x="0" y="0"/>
-          <a:ext cx="0" cy="0"/>
-          <a:chOff x="0" y="0"/>
-          <a:chExt cx="0" cy="0"/>
-        </a:xfrm>
-      </p:grpSpPr>
-      <p:sp>
-        <p:nvSpPr>
-          <p:cNvPr id="2" name="Platshållare för bildobjekt 1"/>
-          <p:cNvSpPr>
-            <a:spLocks noGrp="1" noRot="1" noChangeAspect="1"/>
-          </p:cNvSpPr>
-          <p:nvPr>
-            <p:ph type="sldImg"/>
-          </p:nvPr>
-        </p:nvSpPr>
-        <p:spPr/>
-      </p:sp>
-      <p:sp>
-        <p:nvSpPr>
-          <p:cNvPr id="3" name="Platshållare för anteckningar 2"/>
-          <p:cNvSpPr>
-            <a:spLocks noGrp="1"/>
-          </p:cNvSpPr>
-          <p:nvPr>
-            <p:ph type="body" idx="1"/>
-          </p:nvPr>
-        </p:nvSpPr>
-        <p:spPr/>
-        <p:txBody>
-          <a:bodyPr/>
-          <a:lstStyle/>
-          <a:p>
-            <a:pPr marL="0" marR="0" lvl="0" indent="0" algn="l" defTabSz="914400" rtl="0" eaLnBrk="1" fontAlgn="auto" latinLnBrk="0" hangingPunct="1">
-              <a:lnSpc>
-                <a:spcPct val="100000"/>
-              </a:lnSpc>
-              <a:spcBef>
-                <a:spcPts val="0"/>
-              </a:spcBef>
-              <a:spcAft>
-                <a:spcPts val="0"/>
-              </a:spcAft>
-              <a:buClrTx/>
-              <a:buSzTx/>
-              <a:buFontTx/>
-              <a:buNone/>
-              <a:tabLst/>
-              <a:defRPr/>
-            </a:pPr>
-            <a:r>
-              <a:rPr lang="sv-SE" sz="1200" kern="1200" dirty="0">
-                <a:solidFill>
-                  <a:schemeClr val="tx1"/>
-                </a:solidFill>
-                <a:effectLst/>
-                <a:latin typeface="+mn-lt"/>
-                <a:ea typeface="+mn-ea"/>
-                <a:cs typeface="+mn-cs"/>
-              </a:rPr>
-              <a:t>Byggscriptets första (seriösa) version, och den slutliga.</a:t>
-            </a:r>
-          </a:p>
-          <a:p>
-            <a:endParaRPr lang="sv-SE" dirty="0"/>
-          </a:p>
-        </p:txBody>
-      </p:sp>
-      <p:sp>
-        <p:nvSpPr>
-          <p:cNvPr id="4" name="Platshållare för bildnummer 3"/>
-          <p:cNvSpPr>
-            <a:spLocks noGrp="1"/>
-          </p:cNvSpPr>
-          <p:nvPr>
-            <p:ph type="sldNum" sz="quarter" idx="10"/>
-          </p:nvPr>
-        </p:nvSpPr>
-        <p:spPr/>
-        <p:txBody>
-          <a:bodyPr/>
-          <a:lstStyle/>
-          <a:p>
-            <a:fld id="{8667F948-D2CB-486C-A2EA-FEABC2DAAE8D}" type="slidenum">
-              <a:rPr lang="sv-SE" smtClean="0"/>
-              <a:t>31</a:t>
-            </a:fld>
-            <a:endParaRPr lang="sv-SE"/>
-          </a:p>
-        </p:txBody>
-      </p:sp>
-    </p:spTree>
-    <p:extLst>
-      <p:ext uri="{BB962C8B-B14F-4D97-AF65-F5344CB8AC3E}">
-        <p14:creationId xmlns:p14="http://schemas.microsoft.com/office/powerpoint/2010/main" val="109849433"/>
       </p:ext>
     </p:extLst>
   </p:cSld>
@@ -3726,7 +3751,7 @@
                 <a:ea typeface="+mn-ea"/>
                 <a:cs typeface="+mn-cs"/>
               </a:rPr>
-              <a:t>Här kan ni ta upp övrigt av relevans för bedömningen av ert arbete. Om avsnittet inte behövs kan det plockas bort.</a:t>
+              <a:t>Byggscriptets första (seriösa) version, och den slutliga.</a:t>
             </a:r>
           </a:p>
           <a:p>
@@ -3752,6 +3777,121 @@
             <a:fld id="{8667F948-D2CB-486C-A2EA-FEABC2DAAE8D}" type="slidenum">
               <a:rPr lang="sv-SE" smtClean="0"/>
               <a:t>32</a:t>
+            </a:fld>
+            <a:endParaRPr lang="sv-SE"/>
+          </a:p>
+        </p:txBody>
+      </p:sp>
+    </p:spTree>
+    <p:extLst>
+      <p:ext uri="{BB962C8B-B14F-4D97-AF65-F5344CB8AC3E}">
+        <p14:creationId xmlns:p14="http://schemas.microsoft.com/office/powerpoint/2010/main" val="109849433"/>
+      </p:ext>
+    </p:extLst>
+  </p:cSld>
+  <p:clrMapOvr>
+    <a:masterClrMapping/>
+  </p:clrMapOvr>
+</p:notes>
+</file>
+
+<file path=ppt/notesSlides/notesSlide33.xml><?xml version="1.0" encoding="utf-8"?>
+<p:notes xmlns:a="http://schemas.openxmlformats.org/drawingml/2006/main" xmlns:r="http://schemas.openxmlformats.org/officeDocument/2006/relationships" xmlns:p="http://schemas.openxmlformats.org/presentationml/2006/main">
+  <p:cSld>
+    <p:spTree>
+      <p:nvGrpSpPr>
+        <p:cNvPr id="1" name=""/>
+        <p:cNvGrpSpPr/>
+        <p:nvPr/>
+      </p:nvGrpSpPr>
+      <p:grpSpPr>
+        <a:xfrm>
+          <a:off x="0" y="0"/>
+          <a:ext cx="0" cy="0"/>
+          <a:chOff x="0" y="0"/>
+          <a:chExt cx="0" cy="0"/>
+        </a:xfrm>
+      </p:grpSpPr>
+      <p:sp>
+        <p:nvSpPr>
+          <p:cNvPr id="2" name="Platshållare för bildobjekt 1"/>
+          <p:cNvSpPr>
+            <a:spLocks noGrp="1" noRot="1" noChangeAspect="1"/>
+          </p:cNvSpPr>
+          <p:nvPr>
+            <p:ph type="sldImg"/>
+          </p:nvPr>
+        </p:nvSpPr>
+        <p:spPr/>
+      </p:sp>
+      <p:sp>
+        <p:nvSpPr>
+          <p:cNvPr id="3" name="Platshållare för anteckningar 2"/>
+          <p:cNvSpPr>
+            <a:spLocks noGrp="1"/>
+          </p:cNvSpPr>
+          <p:nvPr>
+            <p:ph type="body" idx="1"/>
+          </p:nvPr>
+        </p:nvSpPr>
+        <p:spPr/>
+        <p:txBody>
+          <a:bodyPr/>
+          <a:lstStyle/>
+          <a:p>
+            <a:pPr marL="0" marR="0" lvl="0" indent="0" algn="l" defTabSz="914400" rtl="0" eaLnBrk="1" fontAlgn="auto" latinLnBrk="0" hangingPunct="1">
+              <a:lnSpc>
+                <a:spcPct val="100000"/>
+              </a:lnSpc>
+              <a:spcBef>
+                <a:spcPts val="0"/>
+              </a:spcBef>
+              <a:spcAft>
+                <a:spcPts val="0"/>
+              </a:spcAft>
+              <a:buClrTx/>
+              <a:buSzTx/>
+              <a:buFontTx/>
+              <a:buNone/>
+              <a:tabLst/>
+              <a:defRPr/>
+            </a:pPr>
+            <a:r>
+              <a:rPr lang="sv-SE" sz="1200" kern="1200" dirty="0">
+                <a:solidFill>
+                  <a:schemeClr val="tx1"/>
+                </a:solidFill>
+                <a:effectLst/>
+                <a:latin typeface="+mn-lt"/>
+                <a:ea typeface="+mn-ea"/>
+                <a:cs typeface="+mn-cs"/>
+              </a:rPr>
+              <a:t>Här kan ni ta upp övrigt av relevans för bedömningen av ert arbete. Om avsnittet inte behövs kan det plockas bort.</a:t>
+            </a:r>
+          </a:p>
+          <a:p>
+            <a:endParaRPr lang="sv-SE" dirty="0"/>
+          </a:p>
+        </p:txBody>
+      </p:sp>
+      <p:sp>
+        <p:nvSpPr>
+          <p:cNvPr id="4" name="Platshållare för bildnummer 3"/>
+          <p:cNvSpPr>
+            <a:spLocks noGrp="1"/>
+          </p:cNvSpPr>
+          <p:nvPr>
+            <p:ph type="sldNum" sz="quarter" idx="10"/>
+          </p:nvPr>
+        </p:nvSpPr>
+        <p:spPr/>
+        <p:txBody>
+          <a:bodyPr/>
+          <a:lstStyle/>
+          <a:p>
+            <a:fld id="{8667F948-D2CB-486C-A2EA-FEABC2DAAE8D}" type="slidenum">
+              <a:rPr lang="sv-SE" smtClean="0"/>
+              <a:t>33</a:t>
             </a:fld>
             <a:endParaRPr lang="sv-SE"/>
           </a:p>
@@ -11040,19 +11180,6 @@
               </a:rPr>
               <a:t>Override</a:t>
             </a:r>
-            <a:r>
-              <a:rPr kumimoji="0" lang="sv-SE" altLang="sv-SE" sz="800" b="0" i="0" u="none" strike="noStrike" cap="none" normalizeH="0" baseline="0" dirty="0">
-                <a:ln>
-                  <a:noFill/>
-                </a:ln>
-                <a:solidFill>
-                  <a:srgbClr val="BBB529"/>
-                </a:solidFill>
-                <a:effectLst/>
-                <a:latin typeface="Consolas" panose="020B0609020204030204" pitchFamily="49" charset="0"/>
-              </a:rPr>
-              <a:t/>
-            </a:r>
             <a:br>
               <a:rPr kumimoji="0" lang="sv-SE" altLang="sv-SE" sz="800" b="0" i="0" u="none" strike="noStrike" cap="none" normalizeH="0" baseline="0" dirty="0">
                 <a:ln>
@@ -13018,19 +13145,6 @@
                 <a:latin typeface="Consolas" panose="020B0609020204030204" pitchFamily="49" charset="0"/>
               </a:rPr>
             </a:br>
-            <a:r>
-              <a:rPr kumimoji="0" lang="sv-SE" altLang="sv-SE" sz="1000" b="0" i="0" u="none" strike="noStrike" cap="none" normalizeH="0" baseline="0" dirty="0">
-                <a:ln>
-                  <a:noFill/>
-                </a:ln>
-                <a:solidFill>
-                  <a:srgbClr val="A9B7C6"/>
-                </a:solidFill>
-                <a:effectLst/>
-                <a:latin typeface="Consolas" panose="020B0609020204030204" pitchFamily="49" charset="0"/>
-              </a:rPr>
-              <a:t/>
-            </a:r>
             <a:br>
               <a:rPr kumimoji="0" lang="sv-SE" altLang="sv-SE" sz="1000" b="0" i="0" u="none" strike="noStrike" cap="none" normalizeH="0" baseline="0" dirty="0">
                 <a:ln>
@@ -17856,19 +17970,6 @@
               </a:rPr>
               <a:t>    }</a:t>
             </a:r>
-            <a:r>
-              <a:rPr kumimoji="0" lang="sv-SE" altLang="sv-SE" sz="800" b="0" i="0" u="none" strike="noStrike" cap="none" normalizeH="0" baseline="0" dirty="0">
-                <a:ln>
-                  <a:noFill/>
-                </a:ln>
-                <a:solidFill>
-                  <a:srgbClr val="CC7832"/>
-                </a:solidFill>
-                <a:effectLst/>
-                <a:latin typeface="Consolas" panose="020B0609020204030204" pitchFamily="49" charset="0"/>
-              </a:rPr>
-              <a:t/>
-            </a:r>
             <a:br>
               <a:rPr kumimoji="0" lang="sv-SE" altLang="sv-SE" sz="800" b="0" i="0" u="none" strike="noStrike" cap="none" normalizeH="0" baseline="0" dirty="0">
                 <a:ln>
@@ -18430,19 +18531,6 @@
                 <a:latin typeface="Consolas" panose="020B0609020204030204" pitchFamily="49" charset="0"/>
               </a:rPr>
             </a:br>
-            <a:r>
-              <a:rPr kumimoji="0" lang="sv-SE" altLang="sv-SE" sz="800" b="0" i="0" u="none" strike="noStrike" cap="none" normalizeH="0" baseline="0" dirty="0">
-                <a:ln>
-                  <a:noFill/>
-                </a:ln>
-                <a:solidFill>
-                  <a:srgbClr val="A9B7C6"/>
-                </a:solidFill>
-                <a:effectLst/>
-                <a:latin typeface="Consolas" panose="020B0609020204030204" pitchFamily="49" charset="0"/>
-              </a:rPr>
-              <a:t/>
-            </a:r>
             <a:br>
               <a:rPr kumimoji="0" lang="sv-SE" altLang="sv-SE" sz="800" b="0" i="0" u="none" strike="noStrike" cap="none" normalizeH="0" baseline="0" dirty="0">
                 <a:ln>
@@ -19294,15 +19382,14 @@
               <a:rPr lang="sv-SE" dirty="0"/>
               <a:t>  </a:t>
             </a:r>
-            <a:endParaRPr lang="sv-SE" dirty="0" smtClean="0"/>
-          </a:p>
-          <a:p>
-            <a:r>
-              <a:rPr lang="sv-SE" dirty="0" smtClean="0"/>
+          </a:p>
+          <a:p>
+            <a:r>
+              <a:rPr lang="sv-SE" dirty="0"/>
               <a:t>Java Flight </a:t>
             </a:r>
             <a:r>
-              <a:rPr lang="sv-SE" smtClean="0"/>
+              <a:rPr lang="sv-SE"/>
               <a:t>Recorder</a:t>
             </a:r>
             <a:endParaRPr lang="sv-SE" dirty="0"/>
@@ -19721,6 +19808,96 @@
 </file>
 
 <file path=ppt/slides/slide25.xml><?xml version="1.0" encoding="utf-8"?>
+<p:sld xmlns:a="http://schemas.openxmlformats.org/drawingml/2006/main" xmlns:r="http://schemas.openxmlformats.org/officeDocument/2006/relationships" xmlns:p="http://schemas.openxmlformats.org/presentationml/2006/main">
+  <p:cSld>
+    <p:spTree>
+      <p:nvGrpSpPr>
+        <p:cNvPr id="1" name=""/>
+        <p:cNvGrpSpPr/>
+        <p:nvPr/>
+      </p:nvGrpSpPr>
+      <p:grpSpPr>
+        <a:xfrm>
+          <a:off x="0" y="0"/>
+          <a:ext cx="0" cy="0"/>
+          <a:chOff x="0" y="0"/>
+          <a:chExt cx="0" cy="0"/>
+        </a:xfrm>
+      </p:grpSpPr>
+      <p:sp>
+        <p:nvSpPr>
+          <p:cNvPr id="2" name="Rubrik 1"/>
+          <p:cNvSpPr>
+            <a:spLocks noGrp="1"/>
+          </p:cNvSpPr>
+          <p:nvPr>
+            <p:ph type="title"/>
+          </p:nvPr>
+        </p:nvSpPr>
+        <p:spPr/>
+        <p:txBody>
+          <a:bodyPr/>
+          <a:lstStyle/>
+          <a:p>
+            <a:r>
+              <a:rPr lang="sv-SE" dirty="0"/>
+              <a:t>Granskning</a:t>
+            </a:r>
+          </a:p>
+        </p:txBody>
+      </p:sp>
+      <p:pic>
+        <p:nvPicPr>
+          <p:cNvPr id="5" name="Platshållare för innehåll 4" descr="En bild som visar skärmbild&#10;&#10;Automatiskt genererad beskrivning">
+            <a:extLst>
+              <a:ext uri="{FF2B5EF4-FFF2-40B4-BE49-F238E27FC236}">
+                <a16:creationId xmlns:a16="http://schemas.microsoft.com/office/drawing/2014/main" id="{BC26F6E0-B95C-47C9-8228-D4444D6EA6FD}"/>
+              </a:ext>
+            </a:extLst>
+          </p:cNvPr>
+          <p:cNvPicPr>
+            <a:picLocks noGrp="1" noChangeAspect="1"/>
+          </p:cNvPicPr>
+          <p:nvPr>
+            <p:ph idx="1"/>
+          </p:nvPr>
+        </p:nvPicPr>
+        <p:blipFill>
+          <a:blip r:embed="rId4">
+            <a:extLst>
+              <a:ext uri="{28A0092B-C50C-407E-A947-70E740481C1C}">
+                <a14:useLocalDpi xmlns:a14="http://schemas.microsoft.com/office/drawing/2010/main" val="0"/>
+              </a:ext>
+            </a:extLst>
+          </a:blip>
+          <a:stretch>
+            <a:fillRect/>
+          </a:stretch>
+        </p:blipFill>
+        <p:spPr>
+          <a:xfrm>
+            <a:off x="2397093" y="1357714"/>
+            <a:ext cx="8193322" cy="4819250"/>
+          </a:xfrm>
+        </p:spPr>
+      </p:pic>
+    </p:spTree>
+    <p:custDataLst>
+      <p:tags r:id="rId1"/>
+    </p:custDataLst>
+    <p:extLst>
+      <p:ext uri="{BB962C8B-B14F-4D97-AF65-F5344CB8AC3E}">
+        <p14:creationId xmlns:p14="http://schemas.microsoft.com/office/powerpoint/2010/main" val="2762908969"/>
+      </p:ext>
+    </p:extLst>
+  </p:cSld>
+  <p:clrMapOvr>
+    <a:masterClrMapping/>
+  </p:clrMapOvr>
+</p:sld>
+</file>
+
+<file path=ppt/slides/slide26.xml><?xml version="1.0" encoding="utf-8"?>
 <p:sld xmlns:a="http://schemas.openxmlformats.org/drawingml/2006/main" xmlns:r="http://schemas.openxmlformats.org/officeDocument/2006/relationships" xmlns:p="http://schemas.openxmlformats.org/presentationml/2006/main">
   <p:cSld>
     <p:spTree>
@@ -20136,89 +20313,6 @@
 </p:sld>
 </file>
 
-<file path=ppt/slides/slide26.xml><?xml version="1.0" encoding="utf-8"?>
-<p:sld xmlns:a="http://schemas.openxmlformats.org/drawingml/2006/main" xmlns:r="http://schemas.openxmlformats.org/officeDocument/2006/relationships" xmlns:p="http://schemas.openxmlformats.org/presentationml/2006/main">
-  <p:cSld>
-    <p:spTree>
-      <p:nvGrpSpPr>
-        <p:cNvPr id="1" name=""/>
-        <p:cNvGrpSpPr/>
-        <p:nvPr/>
-      </p:nvGrpSpPr>
-      <p:grpSpPr>
-        <a:xfrm>
-          <a:off x="0" y="0"/>
-          <a:ext cx="0" cy="0"/>
-          <a:chOff x="0" y="0"/>
-          <a:chExt cx="0" cy="0"/>
-        </a:xfrm>
-      </p:grpSpPr>
-      <p:sp>
-        <p:nvSpPr>
-          <p:cNvPr id="2" name="Rubrik 1"/>
-          <p:cNvSpPr>
-            <a:spLocks noGrp="1"/>
-          </p:cNvSpPr>
-          <p:nvPr>
-            <p:ph type="title"/>
-          </p:nvPr>
-        </p:nvSpPr>
-        <p:spPr/>
-        <p:txBody>
-          <a:bodyPr/>
-          <a:lstStyle/>
-          <a:p>
-            <a:r>
-              <a:rPr lang="sv-SE" dirty="0"/>
-              <a:t>Erfarenheter av granskning</a:t>
-            </a:r>
-          </a:p>
-        </p:txBody>
-      </p:sp>
-      <p:sp>
-        <p:nvSpPr>
-          <p:cNvPr id="3" name="Platshållare för innehåll 2"/>
-          <p:cNvSpPr>
-            <a:spLocks noGrp="1"/>
-          </p:cNvSpPr>
-          <p:nvPr>
-            <p:ph idx="1"/>
-          </p:nvPr>
-        </p:nvSpPr>
-        <p:spPr/>
-        <p:txBody>
-          <a:bodyPr/>
-          <a:lstStyle/>
-          <a:p>
-            <a:r>
-              <a:rPr lang="sv-SE" dirty="0"/>
-              <a:t>Vi anser att det är bättre med informell granskning när det gäller kod av denna storlek och på denna nivå. </a:t>
-            </a:r>
-          </a:p>
-          <a:p>
-            <a:r>
-              <a:rPr lang="sv-SE" dirty="0"/>
-              <a:t>Det bästa med inspektionen var att man fick en idé om vilka saker man själv behöver tänka på i framtiden. Möjligtvis att man gör en egen lista med saker man har svårt med eller brukar missa, så att man själv kan hålla koll på att man kodar på ett bra sätt och får bra vanor. </a:t>
-            </a:r>
-          </a:p>
-        </p:txBody>
-      </p:sp>
-    </p:spTree>
-    <p:custDataLst>
-      <p:tags r:id="rId1"/>
-    </p:custDataLst>
-    <p:extLst>
-      <p:ext uri="{BB962C8B-B14F-4D97-AF65-F5344CB8AC3E}">
-        <p14:creationId xmlns:p14="http://schemas.microsoft.com/office/powerpoint/2010/main" val="3676843999"/>
-      </p:ext>
-    </p:extLst>
-  </p:cSld>
-  <p:clrMapOvr>
-    <a:masterClrMapping/>
-  </p:clrMapOvr>
-</p:sld>
-</file>
-
 <file path=ppt/slides/slide27.xml><?xml version="1.0" encoding="utf-8"?>
 <p:sld xmlns:a="http://schemas.openxmlformats.org/drawingml/2006/main" xmlns:r="http://schemas.openxmlformats.org/officeDocument/2006/relationships" xmlns:p="http://schemas.openxmlformats.org/presentationml/2006/main">
   <p:cSld>
@@ -20253,7 +20347,7 @@
           <a:p>
             <a:r>
               <a:rPr lang="sv-SE" dirty="0"/>
-              <a:t>Kodkritiksystem</a:t>
+              <a:t>Erfarenheter av granskning</a:t>
             </a:r>
           </a:p>
         </p:txBody>
@@ -20273,7 +20367,16 @@
           <a:bodyPr/>
           <a:lstStyle/>
           <a:p>
-            <a:endParaRPr lang="sv-SE"/>
+            <a:r>
+              <a:rPr lang="sv-SE" dirty="0"/>
+              <a:t>Vi anser att det är bättre med informell granskning när det gäller kod av denna storlek och på denna nivå. </a:t>
+            </a:r>
+          </a:p>
+          <a:p>
+            <a:r>
+              <a:rPr lang="sv-SE" dirty="0"/>
+              <a:t>Det bästa med inspektionen var att man fick en idé om vilka saker man själv behöver tänka på i framtiden. Möjligtvis att man gör en egen lista med saker man har svårt med eller brukar missa, så att man själv kan hålla koll på att man kodar på ett bra sätt och får bra vanor. </a:t>
+            </a:r>
           </a:p>
         </p:txBody>
       </p:sp>
@@ -20283,7 +20386,7 @@
     </p:custDataLst>
     <p:extLst>
       <p:ext uri="{BB962C8B-B14F-4D97-AF65-F5344CB8AC3E}">
-        <p14:creationId xmlns:p14="http://schemas.microsoft.com/office/powerpoint/2010/main" val="847618868"/>
+        <p14:creationId xmlns:p14="http://schemas.microsoft.com/office/powerpoint/2010/main" val="3676843999"/>
       </p:ext>
     </p:extLst>
   </p:cSld>
@@ -20327,7 +20430,7 @@
           <a:p>
             <a:r>
               <a:rPr lang="sv-SE" dirty="0"/>
-              <a:t>Statiska mått</a:t>
+              <a:t>Kodkritiksystem</a:t>
             </a:r>
           </a:p>
         </p:txBody>
@@ -20357,7 +20460,7 @@
     </p:custDataLst>
     <p:extLst>
       <p:ext uri="{BB962C8B-B14F-4D97-AF65-F5344CB8AC3E}">
-        <p14:creationId xmlns:p14="http://schemas.microsoft.com/office/powerpoint/2010/main" val="3620096591"/>
+        <p14:creationId xmlns:p14="http://schemas.microsoft.com/office/powerpoint/2010/main" val="847618868"/>
       </p:ext>
     </p:extLst>
   </p:cSld>
@@ -20401,7 +20504,7 @@
           <a:p>
             <a:r>
               <a:rPr lang="sv-SE" dirty="0"/>
-              <a:t>Täckningsgrad</a:t>
+              <a:t>Statiska mått</a:t>
             </a:r>
           </a:p>
         </p:txBody>
@@ -20431,7 +20534,7 @@
     </p:custDataLst>
     <p:extLst>
       <p:ext uri="{BB962C8B-B14F-4D97-AF65-F5344CB8AC3E}">
-        <p14:creationId xmlns:p14="http://schemas.microsoft.com/office/powerpoint/2010/main" val="3476279416"/>
+        <p14:creationId xmlns:p14="http://schemas.microsoft.com/office/powerpoint/2010/main" val="3620096591"/>
       </p:ext>
     </p:extLst>
   </p:cSld>
@@ -20565,7 +20668,7 @@
           <a:p>
             <a:r>
               <a:rPr lang="sv-SE" dirty="0"/>
-              <a:t>Profiler</a:t>
+              <a:t>Täckningsgrad</a:t>
             </a:r>
           </a:p>
         </p:txBody>
@@ -20595,7 +20698,7 @@
     </p:custDataLst>
     <p:extLst>
       <p:ext uri="{BB962C8B-B14F-4D97-AF65-F5344CB8AC3E}">
-        <p14:creationId xmlns:p14="http://schemas.microsoft.com/office/powerpoint/2010/main" val="4124232571"/>
+        <p14:creationId xmlns:p14="http://schemas.microsoft.com/office/powerpoint/2010/main" val="3476279416"/>
       </p:ext>
     </p:extLst>
   </p:cSld>
@@ -20639,6 +20742,80 @@
           <a:p>
             <a:r>
               <a:rPr lang="sv-SE" dirty="0"/>
+              <a:t>Profiler</a:t>
+            </a:r>
+          </a:p>
+        </p:txBody>
+      </p:sp>
+      <p:sp>
+        <p:nvSpPr>
+          <p:cNvPr id="3" name="Platshållare för innehåll 2"/>
+          <p:cNvSpPr>
+            <a:spLocks noGrp="1"/>
+          </p:cNvSpPr>
+          <p:nvPr>
+            <p:ph idx="1"/>
+          </p:nvPr>
+        </p:nvSpPr>
+        <p:spPr/>
+        <p:txBody>
+          <a:bodyPr/>
+          <a:lstStyle/>
+          <a:p>
+            <a:endParaRPr lang="sv-SE"/>
+          </a:p>
+        </p:txBody>
+      </p:sp>
+    </p:spTree>
+    <p:custDataLst>
+      <p:tags r:id="rId1"/>
+    </p:custDataLst>
+    <p:extLst>
+      <p:ext uri="{BB962C8B-B14F-4D97-AF65-F5344CB8AC3E}">
+        <p14:creationId xmlns:p14="http://schemas.microsoft.com/office/powerpoint/2010/main" val="4124232571"/>
+      </p:ext>
+    </p:extLst>
+  </p:cSld>
+  <p:clrMapOvr>
+    <a:masterClrMapping/>
+  </p:clrMapOvr>
+</p:sld>
+</file>
+
+<file path=ppt/slides/slide32.xml><?xml version="1.0" encoding="utf-8"?>
+<p:sld xmlns:a="http://schemas.openxmlformats.org/drawingml/2006/main" xmlns:r="http://schemas.openxmlformats.org/officeDocument/2006/relationships" xmlns:p="http://schemas.openxmlformats.org/presentationml/2006/main">
+  <p:cSld>
+    <p:spTree>
+      <p:nvGrpSpPr>
+        <p:cNvPr id="1" name=""/>
+        <p:cNvGrpSpPr/>
+        <p:nvPr/>
+      </p:nvGrpSpPr>
+      <p:grpSpPr>
+        <a:xfrm>
+          <a:off x="0" y="0"/>
+          <a:ext cx="0" cy="0"/>
+          <a:chOff x="0" y="0"/>
+          <a:chExt cx="0" cy="0"/>
+        </a:xfrm>
+      </p:grpSpPr>
+      <p:sp>
+        <p:nvSpPr>
+          <p:cNvPr id="2" name="Rubrik 1"/>
+          <p:cNvSpPr>
+            <a:spLocks noGrp="1"/>
+          </p:cNvSpPr>
+          <p:nvPr>
+            <p:ph type="title"/>
+          </p:nvPr>
+        </p:nvSpPr>
+        <p:spPr/>
+        <p:txBody>
+          <a:bodyPr/>
+          <a:lstStyle/>
+          <a:p>
+            <a:r>
+              <a:rPr lang="sv-SE" dirty="0"/>
               <a:t>Byggscript</a:t>
             </a:r>
           </a:p>
@@ -20679,7 +20856,7 @@
 </p:sld>
 </file>
 
-<file path=ppt/slides/slide32.xml><?xml version="1.0" encoding="utf-8"?>
+<file path=ppt/slides/slide33.xml><?xml version="1.0" encoding="utf-8"?>
 <p:sld xmlns:a="http://schemas.openxmlformats.org/drawingml/2006/main" xmlns:r="http://schemas.openxmlformats.org/officeDocument/2006/relationships" xmlns:p="http://schemas.openxmlformats.org/presentationml/2006/main">
   <p:cSld>
     <p:spTree>
@@ -21837,6 +22014,12 @@
 </file>
 
 <file path=ppt/tags/tag33.xml><?xml version="1.0" encoding="utf-8"?>
+<p:tagLst xmlns:a="http://schemas.openxmlformats.org/drawingml/2006/main" xmlns:r="http://schemas.openxmlformats.org/officeDocument/2006/relationships" xmlns:p="http://schemas.openxmlformats.org/presentationml/2006/main">
+  <p:tag name="ARTICULATE_SLIDE_THUMBNAIL_REFRESH" val="1"/>
+</p:tagLst>
+</file>
+
+<file path=ppt/tags/tag34.xml><?xml version="1.0" encoding="utf-8"?>
 <p:tagLst xmlns:a="http://schemas.openxmlformats.org/drawingml/2006/main" xmlns:r="http://schemas.openxmlformats.org/officeDocument/2006/relationships" xmlns:p="http://schemas.openxmlformats.org/presentationml/2006/main">
   <p:tag name="ARTICULATE_SLIDE_THUMBNAIL_REFRESH" val="1"/>
 </p:tagLst>

</xml_diff>

<commit_message>
LOOK AT THIS GRAPH
</commit_message>
<xml_diff>
--- a/slutredovisning.pptx
+++ b/slutredovisning.pptx
@@ -19369,23 +19369,6 @@
           <a:p>
             <a:r>
               <a:rPr lang="sv-SE" dirty="0" err="1"/>
-              <a:t>MetricsReloaded</a:t>
-            </a:r>
-            <a:r>
-              <a:rPr lang="sv-SE" dirty="0"/>
-              <a:t> </a:t>
-            </a:r>
-          </a:p>
-          <a:p>
-            <a:r>
-              <a:rPr lang="sv-SE" dirty="0" err="1"/>
-              <a:t>Statistic</a:t>
-            </a:r>
-            <a:endParaRPr lang="sv-SE" dirty="0"/>
-          </a:p>
-          <a:p>
-            <a:r>
-              <a:rPr lang="sv-SE" dirty="0" err="1"/>
               <a:t>JUnit</a:t>
             </a:r>
             <a:endParaRPr lang="sv-SE" dirty="0"/>
@@ -19406,15 +19389,8 @@
               <a:t>Java Flight </a:t>
             </a:r>
             <a:r>
-              <a:rPr lang="sv-SE" dirty="0" err="1"/>
+              <a:rPr lang="sv-SE"/>
               <a:t>Recorder</a:t>
-            </a:r>
-            <a:endParaRPr lang="sv-SE" dirty="0"/>
-          </a:p>
-          <a:p>
-            <a:r>
-              <a:rPr lang="sv-SE" dirty="0" err="1"/>
-              <a:t>CodeMR</a:t>
             </a:r>
             <a:endParaRPr lang="sv-SE" dirty="0"/>
           </a:p>
@@ -20691,6 +20667,14 @@
 <file path=ppt/slides/slide29.xml><?xml version="1.0" encoding="utf-8"?>
 <p:sld xmlns:a="http://schemas.openxmlformats.org/drawingml/2006/main" xmlns:r="http://schemas.openxmlformats.org/officeDocument/2006/relationships" xmlns:p="http://schemas.openxmlformats.org/presentationml/2006/main">
   <p:cSld>
+    <p:bg>
+      <p:bgPr>
+        <a:solidFill>
+          <a:schemeClr val="bg1"/>
+        </a:solidFill>
+        <a:effectLst/>
+      </p:bgPr>
+    </p:bg>
     <p:spTree>
       <p:nvGrpSpPr>
         <p:cNvPr id="1" name=""/>
@@ -20707,6 +20691,69 @@
       </p:grpSpPr>
       <p:sp>
         <p:nvSpPr>
+          <p:cNvPr id="19" name="Flowchart: Document 18">
+            <a:extLst>
+              <a:ext uri="{FF2B5EF4-FFF2-40B4-BE49-F238E27FC236}">
+                <a16:creationId xmlns:a16="http://schemas.microsoft.com/office/drawing/2014/main" id="{D12DDE76-C203-4047-9998-63900085B5E8}"/>
+              </a:ext>
+              <a:ext uri="{C183D7F6-B498-43B3-948B-1728B52AA6E4}">
+                <adec:decorative xmlns:adec="http://schemas.microsoft.com/office/drawing/2017/decorative" val="1"/>
+              </a:ext>
+            </a:extLst>
+          </p:cNvPr>
+          <p:cNvSpPr>
+            <a:spLocks noGrp="1" noRot="1" noChangeAspect="1" noMove="1" noResize="1" noEditPoints="1" noAdjustHandles="1" noChangeArrowheads="1" noChangeShapeType="1" noTextEdit="1"/>
+          </p:cNvSpPr>
+          <p:nvPr>
+            <p:extLst>
+              <p:ext uri="{386F3935-93C4-4BCD-93E2-E3B085C9AB24}">
+                <p16:designElem xmlns:p16="http://schemas.microsoft.com/office/powerpoint/2015/main" val="1"/>
+              </p:ext>
+            </p:extLst>
+          </p:nvPr>
+        </p:nvSpPr>
+        <p:spPr>
+          <a:xfrm>
+            <a:off x="638175" y="0"/>
+            <a:ext cx="3248025" cy="3400426"/>
+          </a:xfrm>
+          <a:prstGeom prst="flowChartDocument">
+            <a:avLst/>
+          </a:prstGeom>
+          <a:solidFill>
+            <a:srgbClr val="2D7740"/>
+          </a:solidFill>
+          <a:ln>
+            <a:noFill/>
+          </a:ln>
+        </p:spPr>
+        <p:style>
+          <a:lnRef idx="2">
+            <a:schemeClr val="accent1">
+              <a:shade val="50000"/>
+            </a:schemeClr>
+          </a:lnRef>
+          <a:fillRef idx="1">
+            <a:schemeClr val="accent1"/>
+          </a:fillRef>
+          <a:effectRef idx="0">
+            <a:schemeClr val="accent1"/>
+          </a:effectRef>
+          <a:fontRef idx="minor">
+            <a:schemeClr val="lt1"/>
+          </a:fontRef>
+        </p:style>
+        <p:txBody>
+          <a:bodyPr rtlCol="0" anchor="ctr"/>
+          <a:lstStyle/>
+          <a:p>
+            <a:pPr algn="ctr"/>
+            <a:endParaRPr lang="en-US"/>
+          </a:p>
+        </p:txBody>
+      </p:sp>
+      <p:sp>
+        <p:nvSpPr>
           <p:cNvPr id="2" name="Rubrik 1"/>
           <p:cNvSpPr>
             <a:spLocks noGrp="1"/>
@@ -20715,37 +20762,175 @@
             <p:ph type="title"/>
           </p:nvPr>
         </p:nvSpPr>
-        <p:spPr/>
+        <p:spPr>
+          <a:xfrm>
+            <a:off x="838200" y="171162"/>
+            <a:ext cx="2840182" cy="2371148"/>
+          </a:xfrm>
+        </p:spPr>
         <p:txBody>
-          <a:bodyPr/>
+          <a:bodyPr vert="horz" lIns="91440" tIns="45720" rIns="91440" bIns="45720" rtlCol="0" anchor="ctr">
+            <a:normAutofit/>
+          </a:bodyPr>
           <a:lstStyle/>
           <a:p>
             <a:r>
-              <a:rPr lang="sv-SE" dirty="0"/>
+              <a:rPr lang="en-US" sz="3200" kern="1200">
+                <a:solidFill>
+                  <a:srgbClr val="FFFFFF"/>
+                </a:solidFill>
+                <a:latin typeface="+mj-lt"/>
+                <a:ea typeface="+mj-ea"/>
+                <a:cs typeface="+mj-cs"/>
+              </a:rPr>
               <a:t>Statiska mått</a:t>
             </a:r>
           </a:p>
         </p:txBody>
       </p:sp>
-      <p:sp>
-        <p:nvSpPr>
-          <p:cNvPr id="3" name="Platshållare för innehåll 2"/>
-          <p:cNvSpPr>
-            <a:spLocks noGrp="1"/>
-          </p:cNvSpPr>
+      <p:pic>
+        <p:nvPicPr>
+          <p:cNvPr id="5" name="Content Placeholder 4">
+            <a:extLst>
+              <a:ext uri="{FF2B5EF4-FFF2-40B4-BE49-F238E27FC236}">
+                <a16:creationId xmlns:a16="http://schemas.microsoft.com/office/drawing/2014/main" id="{D1587F59-7E92-433E-AC62-F733170B3197}"/>
+              </a:ext>
+            </a:extLst>
+          </p:cNvPr>
+          <p:cNvPicPr>
+            <a:picLocks noGrp="1" noChangeAspect="1"/>
+          </p:cNvPicPr>
           <p:nvPr>
             <p:ph idx="1"/>
           </p:nvPr>
-        </p:nvSpPr>
-        <p:spPr/>
-        <p:txBody>
-          <a:bodyPr/>
-          <a:lstStyle/>
-          <a:p>
-            <a:endParaRPr lang="sv-SE"/>
-          </a:p>
-        </p:txBody>
-      </p:sp>
+        </p:nvPicPr>
+        <p:blipFill>
+          <a:blip r:embed="rId4">
+            <a:extLst>
+              <a:ext uri="{28A0092B-C50C-407E-A947-70E740481C1C}">
+                <a14:useLocalDpi xmlns:a14="http://schemas.microsoft.com/office/drawing/2010/main" val="0"/>
+              </a:ext>
+            </a:extLst>
+          </a:blip>
+          <a:stretch>
+            <a:fillRect/>
+          </a:stretch>
+        </p:blipFill>
+        <p:spPr>
+          <a:xfrm>
+            <a:off x="4348163" y="681038"/>
+            <a:ext cx="2863850" cy="5495925"/>
+          </a:xfrm>
+        </p:spPr>
+      </p:pic>
+      <p:pic>
+        <p:nvPicPr>
+          <p:cNvPr id="10" name="Picture 9">
+            <a:extLst>
+              <a:ext uri="{FF2B5EF4-FFF2-40B4-BE49-F238E27FC236}">
+                <a16:creationId xmlns:a16="http://schemas.microsoft.com/office/drawing/2014/main" id="{A84A7DC4-2710-44EA-A8B6-362790F5E353}"/>
+              </a:ext>
+            </a:extLst>
+          </p:cNvPr>
+          <p:cNvPicPr>
+            <a:picLocks noChangeAspect="1"/>
+          </p:cNvPicPr>
+          <p:nvPr/>
+        </p:nvPicPr>
+        <p:blipFill>
+          <a:blip r:embed="rId5">
+            <a:extLst>
+              <a:ext uri="{28A0092B-C50C-407E-A947-70E740481C1C}">
+                <a14:useLocalDpi xmlns:a14="http://schemas.microsoft.com/office/drawing/2010/main" val="0"/>
+              </a:ext>
+            </a:extLst>
+          </a:blip>
+          <a:stretch>
+            <a:fillRect/>
+          </a:stretch>
+        </p:blipFill>
+        <p:spPr>
+          <a:xfrm>
+            <a:off x="9705975" y="681038"/>
+            <a:ext cx="1706563" cy="2222500"/>
+          </a:xfrm>
+          <a:prstGeom prst="rect">
+            <a:avLst/>
+          </a:prstGeom>
+        </p:spPr>
+      </p:pic>
+      <p:pic>
+        <p:nvPicPr>
+          <p:cNvPr id="12" name="Picture 11">
+            <a:extLst>
+              <a:ext uri="{FF2B5EF4-FFF2-40B4-BE49-F238E27FC236}">
+                <a16:creationId xmlns:a16="http://schemas.microsoft.com/office/drawing/2014/main" id="{C7194336-F149-4068-90E9-EB266EEED0A6}"/>
+              </a:ext>
+            </a:extLst>
+          </p:cNvPr>
+          <p:cNvPicPr>
+            <a:picLocks noChangeAspect="1"/>
+          </p:cNvPicPr>
+          <p:nvPr/>
+        </p:nvPicPr>
+        <p:blipFill>
+          <a:blip r:embed="rId6">
+            <a:extLst>
+              <a:ext uri="{28A0092B-C50C-407E-A947-70E740481C1C}">
+                <a14:useLocalDpi xmlns:a14="http://schemas.microsoft.com/office/drawing/2010/main" val="0"/>
+              </a:ext>
+            </a:extLst>
+          </a:blip>
+          <a:stretch>
+            <a:fillRect/>
+          </a:stretch>
+        </p:blipFill>
+        <p:spPr>
+          <a:xfrm>
+            <a:off x="7296150" y="681038"/>
+            <a:ext cx="2327275" cy="2222500"/>
+          </a:xfrm>
+          <a:prstGeom prst="rect">
+            <a:avLst/>
+          </a:prstGeom>
+        </p:spPr>
+      </p:pic>
+      <p:pic>
+        <p:nvPicPr>
+          <p:cNvPr id="14" name="Picture 13">
+            <a:extLst>
+              <a:ext uri="{FF2B5EF4-FFF2-40B4-BE49-F238E27FC236}">
+                <a16:creationId xmlns:a16="http://schemas.microsoft.com/office/drawing/2014/main" id="{B3A20C76-F8E5-49E5-81B6-AE5CC65DD2AD}"/>
+              </a:ext>
+            </a:extLst>
+          </p:cNvPr>
+          <p:cNvPicPr>
+            <a:picLocks noChangeAspect="1"/>
+          </p:cNvPicPr>
+          <p:nvPr/>
+        </p:nvPicPr>
+        <p:blipFill>
+          <a:blip r:embed="rId7">
+            <a:extLst>
+              <a:ext uri="{28A0092B-C50C-407E-A947-70E740481C1C}">
+                <a14:useLocalDpi xmlns:a14="http://schemas.microsoft.com/office/drawing/2010/main" val="0"/>
+              </a:ext>
+            </a:extLst>
+          </a:blip>
+          <a:stretch>
+            <a:fillRect/>
+          </a:stretch>
+        </p:blipFill>
+        <p:spPr>
+          <a:xfrm>
+            <a:off x="7296150" y="2986088"/>
+            <a:ext cx="4116388" cy="3189288"/>
+          </a:xfrm>
+          <a:prstGeom prst="rect">
+            <a:avLst/>
+          </a:prstGeom>
+        </p:spPr>
+      </p:pic>
     </p:spTree>
     <p:custDataLst>
       <p:tags r:id="rId1"/>
@@ -21189,10 +21374,10 @@
       </p:sp>
       <p:pic>
         <p:nvPicPr>
-          <p:cNvPr id="6" name="Platshållare för innehåll 5" descr="En bild som visar karta, skärmbild&#10;&#10;Automatiskt genererad beskrivning">
+          <p:cNvPr id="11" name="Platshållare för innehåll 10" descr="En bild som visar karta, text&#10;&#10;Automatiskt genererad beskrivning">
             <a:extLst>
               <a:ext uri="{FF2B5EF4-FFF2-40B4-BE49-F238E27FC236}">
-                <a16:creationId xmlns:a16="http://schemas.microsoft.com/office/drawing/2014/main" id="{19891F9D-CA66-454C-9F98-38472F90A84A}"/>
+                <a16:creationId xmlns:a16="http://schemas.microsoft.com/office/drawing/2014/main" id="{E3AC02AC-C6B2-4FB4-A91F-B42C0E8AED85}"/>
               </a:ext>
             </a:extLst>
           </p:cNvPr>
@@ -21217,8 +21402,8 @@
         </p:blipFill>
         <p:spPr>
           <a:xfrm>
-            <a:off x="4737415" y="301074"/>
-            <a:ext cx="3978882" cy="6371877"/>
+            <a:off x="5145785" y="273269"/>
+            <a:ext cx="3911904" cy="6055989"/>
           </a:xfrm>
         </p:spPr>
       </p:pic>

</xml_diff>

<commit_message>
added explanation to profiler
</commit_message>
<xml_diff>
--- a/slutredovisning.pptx
+++ b/slutredovisning.pptx
@@ -40,7 +40,7 @@
     <p:sldId id="276" r:id="rId31"/>
     <p:sldId id="277" r:id="rId32"/>
     <p:sldId id="278" r:id="rId33"/>
-    <p:sldId id="279" r:id="rId34"/>
+    <p:sldId id="303" r:id="rId34"/>
     <p:sldId id="280" r:id="rId35"/>
     <p:sldId id="281" r:id="rId36"/>
   </p:sldIdLst>
@@ -3927,7 +3927,7 @@
               <a:defRPr/>
             </a:pPr>
             <a:r>
-              <a:rPr lang="sv-SE" sz="1200" kern="1200" dirty="0">
+              <a:rPr lang="sv-SE" sz="1200" kern="1200" dirty="0" smtClean="0">
                 <a:solidFill>
                   <a:schemeClr val="tx1"/>
                 </a:solidFill>
@@ -3957,7 +3957,7 @@
               <a:tabLst/>
               <a:defRPr/>
             </a:pPr>
-            <a:endParaRPr lang="sv-SE" sz="1200" kern="1200" dirty="0">
+            <a:endParaRPr lang="sv-SE" sz="1200" kern="1200" dirty="0" smtClean="0">
               <a:solidFill>
                 <a:schemeClr val="tx1"/>
               </a:solidFill>
@@ -3998,7 +3998,7 @@
     </p:spTree>
     <p:extLst>
       <p:ext uri="{BB962C8B-B14F-4D97-AF65-F5344CB8AC3E}">
-        <p14:creationId xmlns:p14="http://schemas.microsoft.com/office/powerpoint/2010/main" val="1278246246"/>
+        <p14:creationId xmlns:p14="http://schemas.microsoft.com/office/powerpoint/2010/main" val="389922590"/>
       </p:ext>
     </p:extLst>
   </p:cSld>
@@ -11808,6 +11808,19 @@
               </a:rPr>
               <a:t>Override</a:t>
             </a:r>
+            <a:r>
+              <a:rPr kumimoji="0" lang="sv-SE" altLang="sv-SE" sz="800" b="0" i="0" u="none" strike="noStrike" cap="none" normalizeH="0" baseline="0" dirty="0">
+                <a:ln>
+                  <a:noFill/>
+                </a:ln>
+                <a:solidFill>
+                  <a:srgbClr val="BBB529"/>
+                </a:solidFill>
+                <a:effectLst/>
+                <a:latin typeface="Consolas" panose="020B0609020204030204" pitchFamily="49" charset="0"/>
+              </a:rPr>
+              <a:t/>
+            </a:r>
             <a:br>
               <a:rPr kumimoji="0" lang="sv-SE" altLang="sv-SE" sz="800" b="0" i="0" u="none" strike="noStrike" cap="none" normalizeH="0" baseline="0" dirty="0">
                 <a:ln>
@@ -13773,6 +13786,19 @@
                 <a:latin typeface="Consolas" panose="020B0609020204030204" pitchFamily="49" charset="0"/>
               </a:rPr>
             </a:br>
+            <a:r>
+              <a:rPr kumimoji="0" lang="sv-SE" altLang="sv-SE" sz="1000" b="0" i="0" u="none" strike="noStrike" cap="none" normalizeH="0" baseline="0" dirty="0">
+                <a:ln>
+                  <a:noFill/>
+                </a:ln>
+                <a:solidFill>
+                  <a:srgbClr val="A9B7C6"/>
+                </a:solidFill>
+                <a:effectLst/>
+                <a:latin typeface="Consolas" panose="020B0609020204030204" pitchFamily="49" charset="0"/>
+              </a:rPr>
+              <a:t/>
+            </a:r>
             <a:br>
               <a:rPr kumimoji="0" lang="sv-SE" altLang="sv-SE" sz="1000" b="0" i="0" u="none" strike="noStrike" cap="none" normalizeH="0" baseline="0" dirty="0">
                 <a:ln>
@@ -18598,6 +18624,19 @@
               </a:rPr>
               <a:t>    }</a:t>
             </a:r>
+            <a:r>
+              <a:rPr kumimoji="0" lang="sv-SE" altLang="sv-SE" sz="800" b="0" i="0" u="none" strike="noStrike" cap="none" normalizeH="0" baseline="0" dirty="0">
+                <a:ln>
+                  <a:noFill/>
+                </a:ln>
+                <a:solidFill>
+                  <a:srgbClr val="CC7832"/>
+                </a:solidFill>
+                <a:effectLst/>
+                <a:latin typeface="Consolas" panose="020B0609020204030204" pitchFamily="49" charset="0"/>
+              </a:rPr>
+              <a:t/>
+            </a:r>
             <a:br>
               <a:rPr kumimoji="0" lang="sv-SE" altLang="sv-SE" sz="800" b="0" i="0" u="none" strike="noStrike" cap="none" normalizeH="0" baseline="0" dirty="0">
                 <a:ln>
@@ -19159,6 +19198,19 @@
                 <a:latin typeface="Consolas" panose="020B0609020204030204" pitchFamily="49" charset="0"/>
               </a:rPr>
             </a:br>
+            <a:r>
+              <a:rPr kumimoji="0" lang="sv-SE" altLang="sv-SE" sz="800" b="0" i="0" u="none" strike="noStrike" cap="none" normalizeH="0" baseline="0" dirty="0">
+                <a:ln>
+                  <a:noFill/>
+                </a:ln>
+                <a:solidFill>
+                  <a:srgbClr val="A9B7C6"/>
+                </a:solidFill>
+                <a:effectLst/>
+                <a:latin typeface="Consolas" panose="020B0609020204030204" pitchFamily="49" charset="0"/>
+              </a:rPr>
+              <a:t/>
+            </a:r>
             <a:br>
               <a:rPr kumimoji="0" lang="sv-SE" altLang="sv-SE" sz="800" b="0" i="0" u="none" strike="noStrike" cap="none" normalizeH="0" baseline="0" dirty="0">
                 <a:ln>
@@ -19917,8 +19969,20 @@
               <a:t>Java Flight </a:t>
             </a:r>
             <a:r>
-              <a:rPr lang="sv-SE" dirty="0" err="1"/>
+              <a:rPr lang="sv-SE" dirty="0" err="1" smtClean="0"/>
               <a:t>Recorder</a:t>
+            </a:r>
+            <a:r>
+              <a:rPr lang="sv-SE" dirty="0" smtClean="0"/>
+              <a:t> (</a:t>
+            </a:r>
+            <a:r>
+              <a:rPr lang="sv-SE" dirty="0" err="1" smtClean="0"/>
+              <a:t>IntelliJ</a:t>
+            </a:r>
+            <a:r>
+              <a:rPr lang="sv-SE" dirty="0" smtClean="0"/>
+              <a:t> Plugin)</a:t>
             </a:r>
             <a:endParaRPr lang="sv-SE" dirty="0"/>
           </a:p>
@@ -19972,10 +20036,9 @@
               <a:t>IntelliJ</a:t>
             </a:r>
             <a:r>
-              <a:rPr lang="sv-SE"/>
+              <a:rPr lang="sv-SE" dirty="0"/>
               <a:t> Plugin)</a:t>
             </a:r>
-            <a:endParaRPr lang="sv-SE" dirty="0"/>
           </a:p>
         </p:txBody>
       </p:sp>
@@ -21276,7 +21339,7 @@
                 <a16:creationId xmlns:a16="http://schemas.microsoft.com/office/drawing/2014/main" id="{823AC064-BC96-4F32-8AE1-B2FD38754823}"/>
               </a:ext>
               <a:ext uri="{C183D7F6-B498-43B3-948B-1728B52AA6E4}">
-                <adec:decorative xmlns:adec="http://schemas.microsoft.com/office/drawing/2017/decorative" val="1"/>
+                <adec:decorative xmlns:adec="http://schemas.microsoft.com/office/drawing/2017/decorative" xmlns="" val="1"/>
               </a:ext>
             </a:extLst>
           </p:cNvPr>
@@ -21413,7 +21476,7 @@
                 <a16:creationId xmlns:a16="http://schemas.microsoft.com/office/drawing/2014/main" id="{7E7C77BC-7138-40B1-A15B-20F57A494629}"/>
               </a:ext>
               <a:ext uri="{C183D7F6-B498-43B3-948B-1728B52AA6E4}">
-                <adec:decorative xmlns:adec="http://schemas.microsoft.com/office/drawing/2017/decorative" val="1"/>
+                <adec:decorative xmlns:adec="http://schemas.microsoft.com/office/drawing/2017/decorative" xmlns="" val="1"/>
               </a:ext>
             </a:extLst>
           </p:cNvPr>
@@ -21544,7 +21607,7 @@
                 <a16:creationId xmlns:a16="http://schemas.microsoft.com/office/drawing/2014/main" id="{D12DDE76-C203-4047-9998-63900085B5E8}"/>
               </a:ext>
               <a:ext uri="{C183D7F6-B498-43B3-948B-1728B52AA6E4}">
-                <adec:decorative xmlns:adec="http://schemas.microsoft.com/office/drawing/2017/decorative" val="1"/>
+                <adec:decorative xmlns:adec="http://schemas.microsoft.com/office/drawing/2017/decorative" xmlns="" val="1"/>
               </a:ext>
             </a:extLst>
           </p:cNvPr>
@@ -21827,7 +21890,7 @@
                 <a16:creationId xmlns:a16="http://schemas.microsoft.com/office/drawing/2014/main" id="{AB45A142-4255-493C-8284-5D566C121B10}"/>
               </a:ext>
               <a:ext uri="{C183D7F6-B498-43B3-948B-1728B52AA6E4}">
-                <adec:decorative xmlns:adec="http://schemas.microsoft.com/office/drawing/2017/decorative" val="1"/>
+                <adec:decorative xmlns:adec="http://schemas.microsoft.com/office/drawing/2017/decorative" xmlns="" val="1"/>
               </a:ext>
             </a:extLst>
           </p:cNvPr>
@@ -21933,7 +21996,7 @@
                 <a16:creationId xmlns:a16="http://schemas.microsoft.com/office/drawing/2014/main" id="{38FB9660-F42F-4313-BBC4-47C007FE484C}"/>
               </a:ext>
               <a:ext uri="{C183D7F6-B498-43B3-948B-1728B52AA6E4}">
-                <adec:decorative xmlns:adec="http://schemas.microsoft.com/office/drawing/2017/decorative" val="1"/>
+                <adec:decorative xmlns:adec="http://schemas.microsoft.com/office/drawing/2017/decorative" xmlns="" val="1"/>
               </a:ext>
             </a:extLst>
           </p:cNvPr>
@@ -22064,9 +22127,10 @@
           <a:lstStyle/>
           <a:p>
             <a:r>
-              <a:rPr lang="sv-SE" dirty="0"/>
+              <a:rPr lang="sv-SE" dirty="0" smtClean="0"/>
               <a:t>Profiler</a:t>
             </a:r>
+            <a:endParaRPr lang="sv-SE" dirty="0"/>
           </a:p>
         </p:txBody>
       </p:sp>
@@ -22085,7 +22149,41 @@
           <a:bodyPr/>
           <a:lstStyle/>
           <a:p>
-            <a:endParaRPr lang="sv-SE"/>
+            <a:r>
+              <a:rPr lang="sv-SE" dirty="0" smtClean="0"/>
+              <a:t>Vi skapade ett program som testade </a:t>
+            </a:r>
+            <a:r>
+              <a:rPr lang="sv-SE" dirty="0" err="1" smtClean="0"/>
+              <a:t>combat</a:t>
+            </a:r>
+            <a:r>
+              <a:rPr lang="sv-SE" dirty="0" smtClean="0"/>
+              <a:t> mellan </a:t>
+            </a:r>
+            <a:r>
+              <a:rPr lang="sv-SE" dirty="0" err="1" smtClean="0"/>
+              <a:t>player</a:t>
+            </a:r>
+            <a:r>
+              <a:rPr lang="sv-SE" dirty="0" smtClean="0"/>
+              <a:t> och monsters i olika rum, och testade den koden med en profiler. </a:t>
+            </a:r>
+            <a:r>
+              <a:rPr lang="sv-SE" dirty="0" smtClean="0"/>
+              <a:t>Då programmet inte körs under någon längre tid, och endast testar ett scenario, valde vi att använda </a:t>
+            </a:r>
+            <a:r>
+              <a:rPr lang="sv-SE" dirty="0" err="1" smtClean="0"/>
+              <a:t>tracing</a:t>
+            </a:r>
+            <a:r>
+              <a:rPr lang="sv-SE" dirty="0" smtClean="0"/>
+              <a:t> istället för sampling. </a:t>
+            </a:r>
+          </a:p>
+          <a:p>
+            <a:endParaRPr lang="sv-SE" dirty="0"/>
           </a:p>
         </p:txBody>
       </p:sp>
@@ -22095,7 +22193,7 @@
     </p:custDataLst>
     <p:extLst>
       <p:ext uri="{BB962C8B-B14F-4D97-AF65-F5344CB8AC3E}">
-        <p14:creationId xmlns:p14="http://schemas.microsoft.com/office/powerpoint/2010/main" val="4124232571"/>
+        <p14:creationId xmlns:p14="http://schemas.microsoft.com/office/powerpoint/2010/main" val="2773165320"/>
       </p:ext>
     </p:extLst>
   </p:cSld>

</xml_diff>

<commit_message>
Tillståndmaskin added to powerpoint
</commit_message>
<xml_diff>
--- a/slutredovisning.pptx
+++ b/slutredovisning.pptx
@@ -5,7 +5,7 @@
     <p:sldMasterId id="2147483648" r:id="rId1"/>
   </p:sldMasterIdLst>
   <p:notesMasterIdLst>
-    <p:notesMasterId r:id="rId37"/>
+    <p:notesMasterId r:id="rId35"/>
   </p:notesMasterIdLst>
   <p:sldIdLst>
     <p:sldId id="286" r:id="rId2"/>
@@ -29,25 +29,23 @@
     <p:sldId id="262" r:id="rId20"/>
     <p:sldId id="301" r:id="rId21"/>
     <p:sldId id="302" r:id="rId22"/>
-    <p:sldId id="265" r:id="rId23"/>
-    <p:sldId id="266" r:id="rId24"/>
-    <p:sldId id="267" r:id="rId25"/>
-    <p:sldId id="268" r:id="rId26"/>
-    <p:sldId id="293" r:id="rId27"/>
-    <p:sldId id="297" r:id="rId28"/>
-    <p:sldId id="294" r:id="rId29"/>
-    <p:sldId id="295" r:id="rId30"/>
-    <p:sldId id="276" r:id="rId31"/>
-    <p:sldId id="277" r:id="rId32"/>
-    <p:sldId id="278" r:id="rId33"/>
-    <p:sldId id="303" r:id="rId34"/>
-    <p:sldId id="280" r:id="rId35"/>
-    <p:sldId id="281" r:id="rId36"/>
+    <p:sldId id="304" r:id="rId23"/>
+    <p:sldId id="305" r:id="rId24"/>
+    <p:sldId id="293" r:id="rId25"/>
+    <p:sldId id="297" r:id="rId26"/>
+    <p:sldId id="294" r:id="rId27"/>
+    <p:sldId id="295" r:id="rId28"/>
+    <p:sldId id="276" r:id="rId29"/>
+    <p:sldId id="277" r:id="rId30"/>
+    <p:sldId id="278" r:id="rId31"/>
+    <p:sldId id="303" r:id="rId32"/>
+    <p:sldId id="280" r:id="rId33"/>
+    <p:sldId id="281" r:id="rId34"/>
   </p:sldIdLst>
   <p:sldSz cx="12192000" cy="6858000"/>
   <p:notesSz cx="6858000" cy="9144000"/>
   <p:custDataLst>
-    <p:tags r:id="rId38"/>
+    <p:tags r:id="rId36"/>
   </p:custDataLst>
   <p:defaultTextStyle>
     <a:defPPr>
@@ -2423,38 +2421,10 @@
           <a:bodyPr/>
           <a:lstStyle/>
           <a:p>
-            <a:pPr marL="0" marR="0" lvl="0" indent="0" algn="l" defTabSz="914400" rtl="0" eaLnBrk="1" fontAlgn="auto" latinLnBrk="0" hangingPunct="1">
-              <a:lnSpc>
-                <a:spcPct val="100000"/>
-              </a:lnSpc>
-              <a:spcBef>
-                <a:spcPts val="0"/>
-              </a:spcBef>
-              <a:spcAft>
-                <a:spcPts val="0"/>
-              </a:spcAft>
-              <a:buClrTx/>
-              <a:buSzTx/>
-              <a:buFontTx/>
-              <a:buNone/>
-              <a:tabLst/>
-              <a:defRPr/>
-            </a:pPr>
-            <a:r>
-              <a:rPr lang="sv-SE" sz="1200" kern="1200" dirty="0">
-                <a:solidFill>
-                  <a:schemeClr val="tx1"/>
-                </a:solidFill>
-                <a:effectLst/>
-                <a:latin typeface="+mn-lt"/>
-                <a:ea typeface="+mn-ea"/>
-                <a:cs typeface="+mn-cs"/>
-              </a:rPr>
-              <a:t>En kort textuell presentation av vad ni valt ut för att tillämpa tillståndsmaskiner på och vilket eller vilka kriterier ni använder för att ta fram testfall från maskinen. Ni ska kort motivera valet, och ge tillräckligt med information för att det ska gå att bedöma er. Detta avsnitt och de följande ska finnas för samtliga delar ni tillämpat tillståndsmaskiner på. Om ni inte tillämpat tillståndsmaskiner tar ni bort dessa bilder.</a:t>
-            </a:r>
-          </a:p>
-          <a:p>
-            <a:endParaRPr lang="sv-SE" dirty="0"/>
+            <a:r>
+              <a:rPr lang="sv-SE" dirty="0"/>
+              <a:t>Själva tillståndsmaskinen</a:t>
+            </a:r>
           </a:p>
         </p:txBody>
       </p:sp>
@@ -2484,7 +2454,7 @@
     </p:spTree>
     <p:extLst>
       <p:ext uri="{BB962C8B-B14F-4D97-AF65-F5344CB8AC3E}">
-        <p14:creationId xmlns:p14="http://schemas.microsoft.com/office/powerpoint/2010/main" val="2041626993"/>
+        <p14:creationId xmlns:p14="http://schemas.microsoft.com/office/powerpoint/2010/main" val="1235134485"/>
       </p:ext>
     </p:extLst>
   </p:cSld>
@@ -2538,10 +2508,39 @@
           <a:bodyPr/>
           <a:lstStyle/>
           <a:p>
-            <a:r>
-              <a:rPr lang="sv-SE" dirty="0"/>
-              <a:t>Själva tillståndsmaskinen</a:t>
-            </a:r>
+            <a:pPr marL="0" marR="0" lvl="0" indent="0" algn="l" defTabSz="914400" rtl="0" eaLnBrk="1" fontAlgn="auto" latinLnBrk="0" hangingPunct="1">
+              <a:lnSpc>
+                <a:spcPct val="100000"/>
+              </a:lnSpc>
+              <a:spcBef>
+                <a:spcPts val="0"/>
+              </a:spcBef>
+              <a:spcAft>
+                <a:spcPts val="0"/>
+              </a:spcAft>
+              <a:buClrTx/>
+              <a:buSzTx/>
+              <a:buFontTx/>
+              <a:buNone/>
+              <a:tabLst/>
+              <a:defRPr/>
+            </a:pPr>
+            <a:r>
+              <a:rPr lang="sv-SE" sz="1200" kern="1200" dirty="0">
+                <a:solidFill>
+                  <a:schemeClr val="tx1"/>
+                </a:solidFill>
+                <a:effectLst/>
+                <a:latin typeface="+mn-lt"/>
+                <a:ea typeface="+mn-ea"/>
+                <a:cs typeface="+mn-cs"/>
+              </a:rPr>
+              <a:t>Testfallen som ni fått fram från tillståndsmaskinen. Observera att vi inte vill ha någon kod här, utan bara en tydlig presentation av testfallen i någon lämplig tabellform. </a:t>
+            </a:r>
+            <a:endParaRPr lang="sv-SE" dirty="0"/>
+          </a:p>
+          <a:p>
+            <a:endParaRPr lang="sv-SE" dirty="0"/>
           </a:p>
         </p:txBody>
       </p:sp>
@@ -2571,7 +2570,7 @@
     </p:spTree>
     <p:extLst>
       <p:ext uri="{BB962C8B-B14F-4D97-AF65-F5344CB8AC3E}">
-        <p14:creationId xmlns:p14="http://schemas.microsoft.com/office/powerpoint/2010/main" val="1235134485"/>
+        <p14:creationId xmlns:p14="http://schemas.microsoft.com/office/powerpoint/2010/main" val="556359333"/>
       </p:ext>
     </p:extLst>
   </p:cSld>
@@ -2652,9 +2651,32 @@
                 <a:ea typeface="+mn-ea"/>
                 <a:cs typeface="+mn-cs"/>
               </a:rPr>
-              <a:t>Testfallen som ni fått fram från tillståndsmaskinen. Observera att vi inte vill ha någon kod här, utan bara en tydlig presentation av testfallen i någon lämplig tabellform. </a:t>
-            </a:r>
-            <a:endParaRPr lang="sv-SE" dirty="0"/>
+              <a:t>En kort presentation av den del av koden ni valt ut för att göra en formell granskning av och processen ni använt er av inklusive eventuella checklistor, scenarier, </a:t>
+            </a:r>
+            <a:r>
+              <a:rPr lang="sv-SE" sz="1200" kern="1200" dirty="0" err="1">
+                <a:solidFill>
+                  <a:schemeClr val="tx1"/>
+                </a:solidFill>
+                <a:effectLst/>
+                <a:latin typeface="+mn-lt"/>
+                <a:ea typeface="+mn-ea"/>
+                <a:cs typeface="+mn-cs"/>
+              </a:rPr>
+              <a:t>edyl</a:t>
+            </a:r>
+            <a:r>
+              <a:rPr lang="sv-SE" sz="1200" kern="1200" dirty="0">
+                <a:solidFill>
+                  <a:schemeClr val="tx1"/>
+                </a:solidFill>
+                <a:effectLst/>
+                <a:latin typeface="+mn-lt"/>
+                <a:ea typeface="+mn-ea"/>
+                <a:cs typeface="+mn-cs"/>
+              </a:rPr>
+              <a:t>. Ni ska kort motivera valen, och ge tillräckligt med information för att det ska gå att bedöma er. </a:t>
+            </a:r>
           </a:p>
           <a:p>
             <a:endParaRPr lang="sv-SE" dirty="0"/>
@@ -2687,7 +2709,7 @@
     </p:spTree>
     <p:extLst>
       <p:ext uri="{BB962C8B-B14F-4D97-AF65-F5344CB8AC3E}">
-        <p14:creationId xmlns:p14="http://schemas.microsoft.com/office/powerpoint/2010/main" val="556359333"/>
+        <p14:creationId xmlns:p14="http://schemas.microsoft.com/office/powerpoint/2010/main" val="1402935123"/>
       </p:ext>
     </p:extLst>
   </p:cSld>
@@ -2768,10 +2790,10 @@
                 <a:ea typeface="+mn-ea"/>
                 <a:cs typeface="+mn-cs"/>
               </a:rPr>
-              <a:t>En testmatris (eller annan</a:t>
-            </a:r>
-            <a:r>
-              <a:rPr lang="sv-SE" sz="1200" kern="1200" baseline="0" dirty="0">
+              <a:t>En kort presentation av den del av koden ni valt ut för att göra en formell granskning av och processen ni använt er av inklusive eventuella checklistor, scenarier, </a:t>
+            </a:r>
+            <a:r>
+              <a:rPr lang="sv-SE" sz="1200" kern="1200" dirty="0" err="1">
                 <a:solidFill>
                   <a:schemeClr val="tx1"/>
                 </a:solidFill>
@@ -2780,7 +2802,7 @@
                 <a:ea typeface="+mn-ea"/>
                 <a:cs typeface="+mn-cs"/>
               </a:rPr>
-              <a:t> lämplig form)</a:t>
+              <a:t>edyl</a:t>
             </a:r>
             <a:r>
               <a:rPr lang="sv-SE" sz="1200" kern="1200" dirty="0">
@@ -2792,53 +2814,8 @@
                 <a:ea typeface="+mn-ea"/>
                 <a:cs typeface="+mn-cs"/>
               </a:rPr>
-              <a:t> som visar sambandet mellan tillståndsmaskinen och testfallen för denna del så att det går att se att ni tillämpat de kriterier</a:t>
-            </a:r>
-            <a:r>
-              <a:rPr lang="sv-SE" sz="1200" kern="1200" baseline="0" dirty="0">
-                <a:solidFill>
-                  <a:schemeClr val="tx1"/>
-                </a:solidFill>
-                <a:effectLst/>
-                <a:latin typeface="+mn-lt"/>
-                <a:ea typeface="+mn-ea"/>
-                <a:cs typeface="+mn-cs"/>
-              </a:rPr>
-              <a:t> ni satt upp för att ta fram testfall</a:t>
-            </a:r>
-            <a:r>
-              <a:rPr lang="sv-SE" sz="1200" kern="1200" dirty="0">
-                <a:solidFill>
-                  <a:schemeClr val="tx1"/>
-                </a:solidFill>
-                <a:effectLst/>
-                <a:latin typeface="+mn-lt"/>
-                <a:ea typeface="+mn-ea"/>
-                <a:cs typeface="+mn-cs"/>
-              </a:rPr>
-              <a:t>. Om detta tydligt framgår från testfallen</a:t>
-            </a:r>
-            <a:r>
-              <a:rPr lang="sv-SE" sz="1200" kern="1200" baseline="0" dirty="0">
-                <a:solidFill>
-                  <a:schemeClr val="tx1"/>
-                </a:solidFill>
-                <a:effectLst/>
-                <a:latin typeface="+mn-lt"/>
-                <a:ea typeface="+mn-ea"/>
-                <a:cs typeface="+mn-cs"/>
-              </a:rPr>
-              <a:t> så kan denna bild plockas bort.</a:t>
-            </a:r>
-            <a:endParaRPr lang="sv-SE" sz="1200" kern="1200" dirty="0">
-              <a:solidFill>
-                <a:schemeClr val="tx1"/>
-              </a:solidFill>
-              <a:effectLst/>
-              <a:latin typeface="+mn-lt"/>
-              <a:ea typeface="+mn-ea"/>
-              <a:cs typeface="+mn-cs"/>
-            </a:endParaRPr>
+              <a:t>. Ni ska kort motivera valen, och ge tillräckligt med information för att det ska gå att bedöma er. </a:t>
+            </a:r>
           </a:p>
           <a:p>
             <a:endParaRPr lang="sv-SE" dirty="0"/>
@@ -2871,7 +2848,7 @@
     </p:spTree>
     <p:extLst>
       <p:ext uri="{BB962C8B-B14F-4D97-AF65-F5344CB8AC3E}">
-        <p14:creationId xmlns:p14="http://schemas.microsoft.com/office/powerpoint/2010/main" val="61413010"/>
+        <p14:creationId xmlns:p14="http://schemas.microsoft.com/office/powerpoint/2010/main" val="650456655"/>
       </p:ext>
     </p:extLst>
   </p:cSld>
@@ -2952,31 +2929,7 @@
                 <a:ea typeface="+mn-ea"/>
                 <a:cs typeface="+mn-cs"/>
               </a:rPr>
-              <a:t>En kort presentation av den del av koden ni valt ut för att göra en formell granskning av och processen ni använt er av inklusive eventuella checklistor, scenarier, </a:t>
-            </a:r>
-            <a:r>
-              <a:rPr lang="sv-SE" sz="1200" kern="1200" dirty="0" err="1">
-                <a:solidFill>
-                  <a:schemeClr val="tx1"/>
-                </a:solidFill>
-                <a:effectLst/>
-                <a:latin typeface="+mn-lt"/>
-                <a:ea typeface="+mn-ea"/>
-                <a:cs typeface="+mn-cs"/>
-              </a:rPr>
-              <a:t>edyl</a:t>
-            </a:r>
-            <a:r>
-              <a:rPr lang="sv-SE" sz="1200" kern="1200" dirty="0">
-                <a:solidFill>
-                  <a:schemeClr val="tx1"/>
-                </a:solidFill>
-                <a:effectLst/>
-                <a:latin typeface="+mn-lt"/>
-                <a:ea typeface="+mn-ea"/>
-                <a:cs typeface="+mn-cs"/>
-              </a:rPr>
-              <a:t>. Ni ska kort motivera valen, och ge tillräckligt med information för att det ska gå att bedöma er. </a:t>
+              <a:t>En lista över de påträffade felen och hur pass allvarliga ni bedömer dem.</a:t>
             </a:r>
           </a:p>
           <a:p>
@@ -3010,7 +2963,7 @@
     </p:spTree>
     <p:extLst>
       <p:ext uri="{BB962C8B-B14F-4D97-AF65-F5344CB8AC3E}">
-        <p14:creationId xmlns:p14="http://schemas.microsoft.com/office/powerpoint/2010/main" val="1402935123"/>
+        <p14:creationId xmlns:p14="http://schemas.microsoft.com/office/powerpoint/2010/main" val="4003170347"/>
       </p:ext>
     </p:extLst>
   </p:cSld>
@@ -3091,7 +3044,7 @@
                 <a:ea typeface="+mn-ea"/>
                 <a:cs typeface="+mn-cs"/>
               </a:rPr>
-              <a:t>En kort presentation av den del av koden ni valt ut för att göra en formell granskning av och processen ni använt er av inklusive eventuella checklistor, scenarier, </a:t>
+              <a:t>En diskussion om vilka era erfarenheter ni dragit av att tillämpa granskning. Det finns inget rätt eller fel här. Enda sättet att bli underkända är att bara fuska över punkten och bara säga något pliktskyldigt. Ni förväntas förhålla er till såväl kursböckerna som utdelat material och IEEE </a:t>
             </a:r>
             <a:r>
               <a:rPr lang="sv-SE" sz="1200" kern="1200" dirty="0" err="1">
@@ -3103,7 +3056,7 @@
                 <a:ea typeface="+mn-ea"/>
                 <a:cs typeface="+mn-cs"/>
               </a:rPr>
-              <a:t>edyl</a:t>
+              <a:t>Std</a:t>
             </a:r>
             <a:r>
               <a:rPr lang="sv-SE" sz="1200" kern="1200" dirty="0">
@@ -3115,7 +3068,7 @@
                 <a:ea typeface="+mn-ea"/>
                 <a:cs typeface="+mn-cs"/>
               </a:rPr>
-              <a:t>. Ni ska kort motivera valen, och ge tillräckligt med information för att det ska gå att bedöma er. </a:t>
+              <a:t> 1028.</a:t>
             </a:r>
           </a:p>
           <a:p>
@@ -3149,7 +3102,7 @@
     </p:spTree>
     <p:extLst>
       <p:ext uri="{BB962C8B-B14F-4D97-AF65-F5344CB8AC3E}">
-        <p14:creationId xmlns:p14="http://schemas.microsoft.com/office/powerpoint/2010/main" val="650456655"/>
+        <p14:creationId xmlns:p14="http://schemas.microsoft.com/office/powerpoint/2010/main" val="3774513394"/>
       </p:ext>
     </p:extLst>
   </p:cSld>
@@ -3230,7 +3183,7 @@
                 <a:ea typeface="+mn-ea"/>
                 <a:cs typeface="+mn-cs"/>
               </a:rPr>
-              <a:t>En lista över de påträffade felen och hur pass allvarliga ni bedömer dem.</a:t>
+              <a:t>En presentation av de problem som hittats med hjälp av verktyg för statisk analys och en diskussion av dem enligt anvisningarna. Det räcker alltså inte med att bara lista problemen, ni måste förhålla er till dem också. Tänk också på att ni ska göra detta både på koden som den såg ut före granskningen och på koden efter att ni rättat det som kommit fram under granskningen.</a:t>
             </a:r>
           </a:p>
           <a:p>
@@ -3264,7 +3217,7 @@
     </p:spTree>
     <p:extLst>
       <p:ext uri="{BB962C8B-B14F-4D97-AF65-F5344CB8AC3E}">
-        <p14:creationId xmlns:p14="http://schemas.microsoft.com/office/powerpoint/2010/main" val="4003170347"/>
+        <p14:creationId xmlns:p14="http://schemas.microsoft.com/office/powerpoint/2010/main" val="1343433812"/>
       </p:ext>
     </p:extLst>
   </p:cSld>
@@ -3345,31 +3298,7 @@
                 <a:ea typeface="+mn-ea"/>
                 <a:cs typeface="+mn-cs"/>
               </a:rPr>
-              <a:t>En diskussion om vilka era erfarenheter ni dragit av att tillämpa granskning. Det finns inget rätt eller fel här. Enda sättet att bli underkända är att bara fuska över punkten och bara säga något pliktskyldigt. Ni förväntas förhålla er till såväl kursböckerna som utdelat material och IEEE </a:t>
-            </a:r>
-            <a:r>
-              <a:rPr lang="sv-SE" sz="1200" kern="1200" dirty="0" err="1">
-                <a:solidFill>
-                  <a:schemeClr val="tx1"/>
-                </a:solidFill>
-                <a:effectLst/>
-                <a:latin typeface="+mn-lt"/>
-                <a:ea typeface="+mn-ea"/>
-                <a:cs typeface="+mn-cs"/>
-              </a:rPr>
-              <a:t>Std</a:t>
-            </a:r>
-            <a:r>
-              <a:rPr lang="sv-SE" sz="1200" kern="1200" dirty="0">
-                <a:solidFill>
-                  <a:schemeClr val="tx1"/>
-                </a:solidFill>
-                <a:effectLst/>
-                <a:latin typeface="+mn-lt"/>
-                <a:ea typeface="+mn-ea"/>
-                <a:cs typeface="+mn-cs"/>
-              </a:rPr>
-              <a:t> 1028.</a:t>
+              <a:t>En presentation och diskussion kring ett antal lämpliga statiska mått på koden. Att vi inte specificerar exakt vilka mått som ska tas upp beror på att olika verktyg har olika uppsättningar, men vi förväntar oss fler och mer intressanta mått än bara rena storleksmått som LOC, #klasser, #metoder, etc. Även här är det viktigt att förhållas sig till måtten, inte bara lista dem.</a:t>
             </a:r>
           </a:p>
           <a:p>
@@ -3403,7 +3332,7 @@
     </p:spTree>
     <p:extLst>
       <p:ext uri="{BB962C8B-B14F-4D97-AF65-F5344CB8AC3E}">
-        <p14:creationId xmlns:p14="http://schemas.microsoft.com/office/powerpoint/2010/main" val="3774513394"/>
+        <p14:creationId xmlns:p14="http://schemas.microsoft.com/office/powerpoint/2010/main" val="247082709"/>
       </p:ext>
     </p:extLst>
   </p:cSld>
@@ -3591,7 +3520,7 @@
                 <a:ea typeface="+mn-ea"/>
                 <a:cs typeface="+mn-cs"/>
               </a:rPr>
-              <a:t>En presentation av de problem som hittats med hjälp av verktyg för statisk analys och en diskussion av dem enligt anvisningarna. Det räcker alltså inte med att bara lista problemen, ni måste förhålla er till dem också. Tänk också på att ni ska göra detta både på koden som den såg ut före granskningen och på koden efter att ni rättat det som kommit fram under granskningen.</a:t>
+              <a:t>En översikt över vilken täckningsgrad era testfall uppnått. Denna kan antagligen tas rakt av från verktyget ni använt för att mäta den. Om ni inte uppnått fullständig täckning så ska detta förklaras och motiveras.</a:t>
             </a:r>
           </a:p>
           <a:p>
@@ -3625,7 +3554,7 @@
     </p:spTree>
     <p:extLst>
       <p:ext uri="{BB962C8B-B14F-4D97-AF65-F5344CB8AC3E}">
-        <p14:creationId xmlns:p14="http://schemas.microsoft.com/office/powerpoint/2010/main" val="1343433812"/>
+        <p14:creationId xmlns:p14="http://schemas.microsoft.com/office/powerpoint/2010/main" val="169751880"/>
       </p:ext>
     </p:extLst>
   </p:cSld>
@@ -3706,8 +3635,36 @@
                 <a:ea typeface="+mn-ea"/>
                 <a:cs typeface="+mn-cs"/>
               </a:rPr>
-              <a:t>En presentation och diskussion kring ett antal lämpliga statiska mått på koden. Att vi inte specificerar exakt vilka mått som ska tas upp beror på att olika verktyg har olika uppsättningar, men vi förväntar oss fler och mer intressanta mått än bara rena storleksmått som LOC, #klasser, #metoder, etc. Även här är det viktigt att förhållas sig till måtten, inte bara lista dem.</a:t>
-            </a:r>
+              <a:t>En kort presentation av hur ni gått tillväga för att testa koden med en profiler och vilka resultat ni fick fram. Även här är det viktigt att förhållas sig till måtten, inte bara presentera dem.</a:t>
+            </a:r>
+          </a:p>
+          <a:p>
+            <a:pPr marL="0" marR="0" lvl="0" indent="0" algn="l" defTabSz="914400" rtl="0" eaLnBrk="1" fontAlgn="auto" latinLnBrk="0" hangingPunct="1">
+              <a:lnSpc>
+                <a:spcPct val="100000"/>
+              </a:lnSpc>
+              <a:spcBef>
+                <a:spcPts val="0"/>
+              </a:spcBef>
+              <a:spcAft>
+                <a:spcPts val="0"/>
+              </a:spcAft>
+              <a:buClrTx/>
+              <a:buSzTx/>
+              <a:buFontTx/>
+              <a:buNone/>
+              <a:tabLst/>
+              <a:defRPr/>
+            </a:pPr>
+            <a:endParaRPr lang="sv-SE" sz="1200" kern="1200" dirty="0">
+              <a:solidFill>
+                <a:schemeClr val="tx1"/>
+              </a:solidFill>
+              <a:effectLst/>
+              <a:latin typeface="+mn-lt"/>
+              <a:ea typeface="+mn-ea"/>
+              <a:cs typeface="+mn-cs"/>
+            </a:endParaRPr>
           </a:p>
           <a:p>
             <a:endParaRPr lang="sv-SE" dirty="0"/>
@@ -3740,7 +3697,7 @@
     </p:spTree>
     <p:extLst>
       <p:ext uri="{BB962C8B-B14F-4D97-AF65-F5344CB8AC3E}">
-        <p14:creationId xmlns:p14="http://schemas.microsoft.com/office/powerpoint/2010/main" val="247082709"/>
+        <p14:creationId xmlns:p14="http://schemas.microsoft.com/office/powerpoint/2010/main" val="389922590"/>
       </p:ext>
     </p:extLst>
   </p:cSld>
@@ -3821,7 +3778,7 @@
                 <a:ea typeface="+mn-ea"/>
                 <a:cs typeface="+mn-cs"/>
               </a:rPr>
-              <a:t>En översikt över vilken täckningsgrad era testfall uppnått. Denna kan antagligen tas rakt av från verktyget ni använt för att mäta den. Om ni inte uppnått fullständig täckning så ska detta förklaras och motiveras.</a:t>
+              <a:t>Byggscriptets första (seriösa) version, och den slutliga.</a:t>
             </a:r>
           </a:p>
           <a:p>
@@ -3855,7 +3812,7 @@
     </p:spTree>
     <p:extLst>
       <p:ext uri="{BB962C8B-B14F-4D97-AF65-F5344CB8AC3E}">
-        <p14:creationId xmlns:p14="http://schemas.microsoft.com/office/powerpoint/2010/main" val="169751880"/>
+        <p14:creationId xmlns:p14="http://schemas.microsoft.com/office/powerpoint/2010/main" val="109849433"/>
       </p:ext>
     </p:extLst>
   </p:cSld>
@@ -3927,7 +3884,7 @@
               <a:defRPr/>
             </a:pPr>
             <a:r>
-              <a:rPr lang="sv-SE" sz="1200" kern="1200" dirty="0" smtClean="0">
+              <a:rPr lang="sv-SE" sz="1200" kern="1200" dirty="0">
                 <a:solidFill>
                   <a:schemeClr val="tx1"/>
                 </a:solidFill>
@@ -3936,36 +3893,8 @@
                 <a:ea typeface="+mn-ea"/>
                 <a:cs typeface="+mn-cs"/>
               </a:rPr>
-              <a:t>En kort presentation av hur ni gått tillväga för att testa koden med en profiler och vilka resultat ni fick fram. Även här är det viktigt att förhållas sig till måtten, inte bara presentera dem.</a:t>
-            </a:r>
-          </a:p>
-          <a:p>
-            <a:pPr marL="0" marR="0" lvl="0" indent="0" algn="l" defTabSz="914400" rtl="0" eaLnBrk="1" fontAlgn="auto" latinLnBrk="0" hangingPunct="1">
-              <a:lnSpc>
-                <a:spcPct val="100000"/>
-              </a:lnSpc>
-              <a:spcBef>
-                <a:spcPts val="0"/>
-              </a:spcBef>
-              <a:spcAft>
-                <a:spcPts val="0"/>
-              </a:spcAft>
-              <a:buClrTx/>
-              <a:buSzTx/>
-              <a:buFontTx/>
-              <a:buNone/>
-              <a:tabLst/>
-              <a:defRPr/>
-            </a:pPr>
-            <a:endParaRPr lang="sv-SE" sz="1200" kern="1200" dirty="0" smtClean="0">
-              <a:solidFill>
-                <a:schemeClr val="tx1"/>
-              </a:solidFill>
-              <a:effectLst/>
-              <a:latin typeface="+mn-lt"/>
-              <a:ea typeface="+mn-ea"/>
-              <a:cs typeface="+mn-cs"/>
-            </a:endParaRPr>
+              <a:t>Här kan ni ta upp övrigt av relevans för bedömningen av ert arbete. Om avsnittet inte behövs kan det plockas bort.</a:t>
+            </a:r>
           </a:p>
           <a:p>
             <a:endParaRPr lang="sv-SE" dirty="0"/>
@@ -3990,236 +3919,6 @@
             <a:fld id="{8667F948-D2CB-486C-A2EA-FEABC2DAAE8D}" type="slidenum">
               <a:rPr lang="sv-SE" smtClean="0"/>
               <a:t>33</a:t>
-            </a:fld>
-            <a:endParaRPr lang="sv-SE"/>
-          </a:p>
-        </p:txBody>
-      </p:sp>
-    </p:spTree>
-    <p:extLst>
-      <p:ext uri="{BB962C8B-B14F-4D97-AF65-F5344CB8AC3E}">
-        <p14:creationId xmlns:p14="http://schemas.microsoft.com/office/powerpoint/2010/main" val="389922590"/>
-      </p:ext>
-    </p:extLst>
-  </p:cSld>
-  <p:clrMapOvr>
-    <a:masterClrMapping/>
-  </p:clrMapOvr>
-</p:notes>
-</file>
-
-<file path=ppt/notesSlides/notesSlide34.xml><?xml version="1.0" encoding="utf-8"?>
-<p:notes xmlns:a="http://schemas.openxmlformats.org/drawingml/2006/main" xmlns:r="http://schemas.openxmlformats.org/officeDocument/2006/relationships" xmlns:p="http://schemas.openxmlformats.org/presentationml/2006/main">
-  <p:cSld>
-    <p:spTree>
-      <p:nvGrpSpPr>
-        <p:cNvPr id="1" name=""/>
-        <p:cNvGrpSpPr/>
-        <p:nvPr/>
-      </p:nvGrpSpPr>
-      <p:grpSpPr>
-        <a:xfrm>
-          <a:off x="0" y="0"/>
-          <a:ext cx="0" cy="0"/>
-          <a:chOff x="0" y="0"/>
-          <a:chExt cx="0" cy="0"/>
-        </a:xfrm>
-      </p:grpSpPr>
-      <p:sp>
-        <p:nvSpPr>
-          <p:cNvPr id="2" name="Platshållare för bildobjekt 1"/>
-          <p:cNvSpPr>
-            <a:spLocks noGrp="1" noRot="1" noChangeAspect="1"/>
-          </p:cNvSpPr>
-          <p:nvPr>
-            <p:ph type="sldImg"/>
-          </p:nvPr>
-        </p:nvSpPr>
-        <p:spPr/>
-      </p:sp>
-      <p:sp>
-        <p:nvSpPr>
-          <p:cNvPr id="3" name="Platshållare för anteckningar 2"/>
-          <p:cNvSpPr>
-            <a:spLocks noGrp="1"/>
-          </p:cNvSpPr>
-          <p:nvPr>
-            <p:ph type="body" idx="1"/>
-          </p:nvPr>
-        </p:nvSpPr>
-        <p:spPr/>
-        <p:txBody>
-          <a:bodyPr/>
-          <a:lstStyle/>
-          <a:p>
-            <a:pPr marL="0" marR="0" lvl="0" indent="0" algn="l" defTabSz="914400" rtl="0" eaLnBrk="1" fontAlgn="auto" latinLnBrk="0" hangingPunct="1">
-              <a:lnSpc>
-                <a:spcPct val="100000"/>
-              </a:lnSpc>
-              <a:spcBef>
-                <a:spcPts val="0"/>
-              </a:spcBef>
-              <a:spcAft>
-                <a:spcPts val="0"/>
-              </a:spcAft>
-              <a:buClrTx/>
-              <a:buSzTx/>
-              <a:buFontTx/>
-              <a:buNone/>
-              <a:tabLst/>
-              <a:defRPr/>
-            </a:pPr>
-            <a:r>
-              <a:rPr lang="sv-SE" sz="1200" kern="1200" dirty="0">
-                <a:solidFill>
-                  <a:schemeClr val="tx1"/>
-                </a:solidFill>
-                <a:effectLst/>
-                <a:latin typeface="+mn-lt"/>
-                <a:ea typeface="+mn-ea"/>
-                <a:cs typeface="+mn-cs"/>
-              </a:rPr>
-              <a:t>Byggscriptets första (seriösa) version, och den slutliga.</a:t>
-            </a:r>
-          </a:p>
-          <a:p>
-            <a:endParaRPr lang="sv-SE" dirty="0"/>
-          </a:p>
-        </p:txBody>
-      </p:sp>
-      <p:sp>
-        <p:nvSpPr>
-          <p:cNvPr id="4" name="Platshållare för bildnummer 3"/>
-          <p:cNvSpPr>
-            <a:spLocks noGrp="1"/>
-          </p:cNvSpPr>
-          <p:nvPr>
-            <p:ph type="sldNum" sz="quarter" idx="10"/>
-          </p:nvPr>
-        </p:nvSpPr>
-        <p:spPr/>
-        <p:txBody>
-          <a:bodyPr/>
-          <a:lstStyle/>
-          <a:p>
-            <a:fld id="{8667F948-D2CB-486C-A2EA-FEABC2DAAE8D}" type="slidenum">
-              <a:rPr lang="sv-SE" smtClean="0"/>
-              <a:t>34</a:t>
-            </a:fld>
-            <a:endParaRPr lang="sv-SE"/>
-          </a:p>
-        </p:txBody>
-      </p:sp>
-    </p:spTree>
-    <p:extLst>
-      <p:ext uri="{BB962C8B-B14F-4D97-AF65-F5344CB8AC3E}">
-        <p14:creationId xmlns:p14="http://schemas.microsoft.com/office/powerpoint/2010/main" val="109849433"/>
-      </p:ext>
-    </p:extLst>
-  </p:cSld>
-  <p:clrMapOvr>
-    <a:masterClrMapping/>
-  </p:clrMapOvr>
-</p:notes>
-</file>
-
-<file path=ppt/notesSlides/notesSlide35.xml><?xml version="1.0" encoding="utf-8"?>
-<p:notes xmlns:a="http://schemas.openxmlformats.org/drawingml/2006/main" xmlns:r="http://schemas.openxmlformats.org/officeDocument/2006/relationships" xmlns:p="http://schemas.openxmlformats.org/presentationml/2006/main">
-  <p:cSld>
-    <p:spTree>
-      <p:nvGrpSpPr>
-        <p:cNvPr id="1" name=""/>
-        <p:cNvGrpSpPr/>
-        <p:nvPr/>
-      </p:nvGrpSpPr>
-      <p:grpSpPr>
-        <a:xfrm>
-          <a:off x="0" y="0"/>
-          <a:ext cx="0" cy="0"/>
-          <a:chOff x="0" y="0"/>
-          <a:chExt cx="0" cy="0"/>
-        </a:xfrm>
-      </p:grpSpPr>
-      <p:sp>
-        <p:nvSpPr>
-          <p:cNvPr id="2" name="Platshållare för bildobjekt 1"/>
-          <p:cNvSpPr>
-            <a:spLocks noGrp="1" noRot="1" noChangeAspect="1"/>
-          </p:cNvSpPr>
-          <p:nvPr>
-            <p:ph type="sldImg"/>
-          </p:nvPr>
-        </p:nvSpPr>
-        <p:spPr/>
-      </p:sp>
-      <p:sp>
-        <p:nvSpPr>
-          <p:cNvPr id="3" name="Platshållare för anteckningar 2"/>
-          <p:cNvSpPr>
-            <a:spLocks noGrp="1"/>
-          </p:cNvSpPr>
-          <p:nvPr>
-            <p:ph type="body" idx="1"/>
-          </p:nvPr>
-        </p:nvSpPr>
-        <p:spPr/>
-        <p:txBody>
-          <a:bodyPr/>
-          <a:lstStyle/>
-          <a:p>
-            <a:pPr marL="0" marR="0" lvl="0" indent="0" algn="l" defTabSz="914400" rtl="0" eaLnBrk="1" fontAlgn="auto" latinLnBrk="0" hangingPunct="1">
-              <a:lnSpc>
-                <a:spcPct val="100000"/>
-              </a:lnSpc>
-              <a:spcBef>
-                <a:spcPts val="0"/>
-              </a:spcBef>
-              <a:spcAft>
-                <a:spcPts val="0"/>
-              </a:spcAft>
-              <a:buClrTx/>
-              <a:buSzTx/>
-              <a:buFontTx/>
-              <a:buNone/>
-              <a:tabLst/>
-              <a:defRPr/>
-            </a:pPr>
-            <a:r>
-              <a:rPr lang="sv-SE" sz="1200" kern="1200" dirty="0">
-                <a:solidFill>
-                  <a:schemeClr val="tx1"/>
-                </a:solidFill>
-                <a:effectLst/>
-                <a:latin typeface="+mn-lt"/>
-                <a:ea typeface="+mn-ea"/>
-                <a:cs typeface="+mn-cs"/>
-              </a:rPr>
-              <a:t>Här kan ni ta upp övrigt av relevans för bedömningen av ert arbete. Om avsnittet inte behövs kan det plockas bort.</a:t>
-            </a:r>
-          </a:p>
-          <a:p>
-            <a:endParaRPr lang="sv-SE" dirty="0"/>
-          </a:p>
-        </p:txBody>
-      </p:sp>
-      <p:sp>
-        <p:nvSpPr>
-          <p:cNvPr id="4" name="Platshållare för bildnummer 3"/>
-          <p:cNvSpPr>
-            <a:spLocks noGrp="1"/>
-          </p:cNvSpPr>
-          <p:nvPr>
-            <p:ph type="sldNum" sz="quarter" idx="10"/>
-          </p:nvPr>
-        </p:nvSpPr>
-        <p:spPr/>
-        <p:txBody>
-          <a:bodyPr/>
-          <a:lstStyle/>
-          <a:p>
-            <a:fld id="{8667F948-D2CB-486C-A2EA-FEABC2DAAE8D}" type="slidenum">
-              <a:rPr lang="sv-SE" smtClean="0"/>
-              <a:t>35</a:t>
             </a:fld>
             <a:endParaRPr lang="sv-SE"/>
           </a:p>
@@ -11808,19 +11507,6 @@
               </a:rPr>
               <a:t>Override</a:t>
             </a:r>
-            <a:r>
-              <a:rPr kumimoji="0" lang="sv-SE" altLang="sv-SE" sz="800" b="0" i="0" u="none" strike="noStrike" cap="none" normalizeH="0" baseline="0" dirty="0">
-                <a:ln>
-                  <a:noFill/>
-                </a:ln>
-                <a:solidFill>
-                  <a:srgbClr val="BBB529"/>
-                </a:solidFill>
-                <a:effectLst/>
-                <a:latin typeface="Consolas" panose="020B0609020204030204" pitchFamily="49" charset="0"/>
-              </a:rPr>
-              <a:t/>
-            </a:r>
             <a:br>
               <a:rPr kumimoji="0" lang="sv-SE" altLang="sv-SE" sz="800" b="0" i="0" u="none" strike="noStrike" cap="none" normalizeH="0" baseline="0" dirty="0">
                 <a:ln>
@@ -13786,19 +13472,6 @@
                 <a:latin typeface="Consolas" panose="020B0609020204030204" pitchFamily="49" charset="0"/>
               </a:rPr>
             </a:br>
-            <a:r>
-              <a:rPr kumimoji="0" lang="sv-SE" altLang="sv-SE" sz="1000" b="0" i="0" u="none" strike="noStrike" cap="none" normalizeH="0" baseline="0" dirty="0">
-                <a:ln>
-                  <a:noFill/>
-                </a:ln>
-                <a:solidFill>
-                  <a:srgbClr val="A9B7C6"/>
-                </a:solidFill>
-                <a:effectLst/>
-                <a:latin typeface="Consolas" panose="020B0609020204030204" pitchFamily="49" charset="0"/>
-              </a:rPr>
-              <a:t/>
-            </a:r>
             <a:br>
               <a:rPr kumimoji="0" lang="sv-SE" altLang="sv-SE" sz="1000" b="0" i="0" u="none" strike="noStrike" cap="none" normalizeH="0" baseline="0" dirty="0">
                 <a:ln>
@@ -18624,19 +18297,6 @@
               </a:rPr>
               <a:t>    }</a:t>
             </a:r>
-            <a:r>
-              <a:rPr kumimoji="0" lang="sv-SE" altLang="sv-SE" sz="800" b="0" i="0" u="none" strike="noStrike" cap="none" normalizeH="0" baseline="0" dirty="0">
-                <a:ln>
-                  <a:noFill/>
-                </a:ln>
-                <a:solidFill>
-                  <a:srgbClr val="CC7832"/>
-                </a:solidFill>
-                <a:effectLst/>
-                <a:latin typeface="Consolas" panose="020B0609020204030204" pitchFamily="49" charset="0"/>
-              </a:rPr>
-              <a:t/>
-            </a:r>
             <a:br>
               <a:rPr kumimoji="0" lang="sv-SE" altLang="sv-SE" sz="800" b="0" i="0" u="none" strike="noStrike" cap="none" normalizeH="0" baseline="0" dirty="0">
                 <a:ln>
@@ -19198,19 +18858,6 @@
                 <a:latin typeface="Consolas" panose="020B0609020204030204" pitchFamily="49" charset="0"/>
               </a:rPr>
             </a:br>
-            <a:r>
-              <a:rPr kumimoji="0" lang="sv-SE" altLang="sv-SE" sz="800" b="0" i="0" u="none" strike="noStrike" cap="none" normalizeH="0" baseline="0" dirty="0">
-                <a:ln>
-                  <a:noFill/>
-                </a:ln>
-                <a:solidFill>
-                  <a:srgbClr val="A9B7C6"/>
-                </a:solidFill>
-                <a:effectLst/>
-                <a:latin typeface="Consolas" panose="020B0609020204030204" pitchFamily="49" charset="0"/>
-              </a:rPr>
-              <a:t/>
-            </a:r>
             <a:br>
               <a:rPr kumimoji="0" lang="sv-SE" altLang="sv-SE" sz="800" b="0" i="0" u="none" strike="noStrike" cap="none" normalizeH="0" baseline="0" dirty="0">
                 <a:ln>
@@ -19969,22 +19616,21 @@
               <a:t>Java Flight </a:t>
             </a:r>
             <a:r>
-              <a:rPr lang="sv-SE" dirty="0" err="1" smtClean="0"/>
+              <a:rPr lang="sv-SE" dirty="0" err="1"/>
               <a:t>Recorder</a:t>
             </a:r>
             <a:r>
-              <a:rPr lang="sv-SE" dirty="0" smtClean="0"/>
+              <a:rPr lang="sv-SE" dirty="0"/>
               <a:t> (</a:t>
             </a:r>
             <a:r>
-              <a:rPr lang="sv-SE" dirty="0" err="1" smtClean="0"/>
+              <a:rPr lang="sv-SE" dirty="0" err="1"/>
               <a:t>IntelliJ</a:t>
             </a:r>
             <a:r>
-              <a:rPr lang="sv-SE" dirty="0" smtClean="0"/>
+              <a:rPr lang="sv-SE" dirty="0"/>
               <a:t> Plugin)</a:t>
             </a:r>
-            <a:endParaRPr lang="sv-SE" dirty="0"/>
           </a:p>
           <a:p>
             <a:r>
@@ -20249,6 +19895,41 @@
           <a:chExt cx="0" cy="0"/>
         </a:xfrm>
       </p:grpSpPr>
+      <p:pic>
+        <p:nvPicPr>
+          <p:cNvPr id="9" name="Content Placeholder 8" descr="A screenshot of a cell phone&#10;&#10;Description automatically generated">
+            <a:extLst>
+              <a:ext uri="{FF2B5EF4-FFF2-40B4-BE49-F238E27FC236}">
+                <a16:creationId xmlns:a16="http://schemas.microsoft.com/office/drawing/2014/main" id="{D14543E6-EA0C-4FFB-8C7A-1AA057CCD9A9}"/>
+              </a:ext>
+            </a:extLst>
+          </p:cNvPr>
+          <p:cNvPicPr>
+            <a:picLocks noGrp="1" noChangeAspect="1"/>
+          </p:cNvPicPr>
+          <p:nvPr>
+            <p:ph idx="1"/>
+          </p:nvPr>
+        </p:nvPicPr>
+        <p:blipFill>
+          <a:blip r:embed="rId4">
+            <a:extLst>
+              <a:ext uri="{28A0092B-C50C-407E-A947-70E740481C1C}">
+                <a14:useLocalDpi xmlns:a14="http://schemas.microsoft.com/office/drawing/2010/main" val="0"/>
+              </a:ext>
+            </a:extLst>
+          </a:blip>
+          <a:stretch>
+            <a:fillRect/>
+          </a:stretch>
+        </p:blipFill>
+        <p:spPr>
+          <a:xfrm>
+            <a:off x="3647661" y="717754"/>
+            <a:ext cx="8242851" cy="5884453"/>
+          </a:xfrm>
+        </p:spPr>
+      </p:pic>
       <p:sp>
         <p:nvSpPr>
           <p:cNvPr id="2" name="Rubrik 1"/>
@@ -20259,34 +19940,20 @@
             <p:ph type="title"/>
           </p:nvPr>
         </p:nvSpPr>
-        <p:spPr/>
+        <p:spPr>
+          <a:xfrm>
+            <a:off x="390940" y="345246"/>
+            <a:ext cx="10515600" cy="1325563"/>
+          </a:xfrm>
+        </p:spPr>
         <p:txBody>
           <a:bodyPr/>
           <a:lstStyle/>
           <a:p>
             <a:r>
               <a:rPr lang="sv-SE" dirty="0"/>
-              <a:t>Tillståndsmaskiner</a:t>
-            </a:r>
-          </a:p>
-        </p:txBody>
-      </p:sp>
-      <p:sp>
-        <p:nvSpPr>
-          <p:cNvPr id="3" name="Platshållare för innehåll 2"/>
-          <p:cNvSpPr>
-            <a:spLocks noGrp="1"/>
-          </p:cNvSpPr>
-          <p:nvPr>
-            <p:ph idx="1"/>
-          </p:nvPr>
-        </p:nvSpPr>
-        <p:spPr/>
-        <p:txBody>
-          <a:bodyPr/>
-          <a:lstStyle/>
-          <a:p>
-            <a:endParaRPr lang="sv-SE"/>
+              <a:t>Tillståndsmaskinen</a:t>
+            </a:r>
           </a:p>
         </p:txBody>
       </p:sp>
@@ -20296,7 +19963,7 @@
     </p:custDataLst>
     <p:extLst>
       <p:ext uri="{BB962C8B-B14F-4D97-AF65-F5344CB8AC3E}">
-        <p14:creationId xmlns:p14="http://schemas.microsoft.com/office/powerpoint/2010/main" val="1230194705"/>
+        <p14:creationId xmlns:p14="http://schemas.microsoft.com/office/powerpoint/2010/main" val="1908727342"/>
       </p:ext>
     </p:extLst>
   </p:cSld>
@@ -20340,37 +20007,664 @@
           <a:p>
             <a:r>
               <a:rPr lang="sv-SE" dirty="0"/>
-              <a:t>Tillståndsmaskinen</a:t>
+              <a:t>Testfall</a:t>
             </a:r>
           </a:p>
         </p:txBody>
       </p:sp>
-      <p:sp>
-        <p:nvSpPr>
-          <p:cNvPr id="3" name="Platshållare för innehåll 2"/>
-          <p:cNvSpPr>
-            <a:spLocks noGrp="1"/>
-          </p:cNvSpPr>
+      <p:graphicFrame>
+        <p:nvGraphicFramePr>
+          <p:cNvPr id="4" name="Table 4">
+            <a:extLst>
+              <a:ext uri="{FF2B5EF4-FFF2-40B4-BE49-F238E27FC236}">
+                <a16:creationId xmlns:a16="http://schemas.microsoft.com/office/drawing/2014/main" id="{52C7CD7E-5385-404D-AAD8-A75A4F81E49A}"/>
+              </a:ext>
+            </a:extLst>
+          </p:cNvPr>
+          <p:cNvGraphicFramePr>
+            <a:graphicFrameLocks noGrp="1"/>
+          </p:cNvGraphicFramePr>
           <p:nvPr>
             <p:ph idx="1"/>
           </p:nvPr>
-        </p:nvSpPr>
-        <p:spPr/>
-        <p:txBody>
-          <a:bodyPr/>
-          <a:lstStyle/>
-          <a:p>
-            <a:endParaRPr lang="sv-SE"/>
-          </a:p>
-        </p:txBody>
-      </p:sp>
+        </p:nvGraphicFramePr>
+        <p:xfrm>
+          <a:off x="838200" y="1825625"/>
+          <a:ext cx="10515600" cy="3937000"/>
+        </p:xfrm>
+        <a:graphic>
+          <a:graphicData uri="http://schemas.openxmlformats.org/drawingml/2006/table">
+            <a:tbl>
+              <a:tblPr firstRow="1" bandRow="1">
+                <a:tableStyleId>{5C22544A-7EE6-4342-B048-85BDC9FD1C3A}</a:tableStyleId>
+              </a:tblPr>
+              <a:tblGrid>
+                <a:gridCol w="2628900">
+                  <a:extLst>
+                    <a:ext uri="{9D8B030D-6E8A-4147-A177-3AD203B41FA5}">
+                      <a16:colId xmlns:a16="http://schemas.microsoft.com/office/drawing/2014/main" val="699762024"/>
+                    </a:ext>
+                  </a:extLst>
+                </a:gridCol>
+                <a:gridCol w="2628900">
+                  <a:extLst>
+                    <a:ext uri="{9D8B030D-6E8A-4147-A177-3AD203B41FA5}">
+                      <a16:colId xmlns:a16="http://schemas.microsoft.com/office/drawing/2014/main" val="822257964"/>
+                    </a:ext>
+                  </a:extLst>
+                </a:gridCol>
+                <a:gridCol w="2628900">
+                  <a:extLst>
+                    <a:ext uri="{9D8B030D-6E8A-4147-A177-3AD203B41FA5}">
+                      <a16:colId xmlns:a16="http://schemas.microsoft.com/office/drawing/2014/main" val="2244064310"/>
+                    </a:ext>
+                  </a:extLst>
+                </a:gridCol>
+                <a:gridCol w="2628900">
+                  <a:extLst>
+                    <a:ext uri="{9D8B030D-6E8A-4147-A177-3AD203B41FA5}">
+                      <a16:colId xmlns:a16="http://schemas.microsoft.com/office/drawing/2014/main" val="1018697329"/>
+                    </a:ext>
+                  </a:extLst>
+                </a:gridCol>
+              </a:tblGrid>
+              <a:tr h="370840">
+                <a:tc>
+                  <a:txBody>
+                    <a:bodyPr/>
+                    <a:lstStyle/>
+                    <a:p>
+                      <a:r>
+                        <a:rPr lang="en-GB" dirty="0"/>
+                        <a:t>ID</a:t>
+                      </a:r>
+                    </a:p>
+                  </a:txBody>
+                  <a:tcPr/>
+                </a:tc>
+                <a:tc>
+                  <a:txBody>
+                    <a:bodyPr/>
+                    <a:lstStyle/>
+                    <a:p>
+                      <a:r>
+                        <a:rPr lang="en-GB" dirty="0" err="1"/>
+                        <a:t>Beskrivning</a:t>
+                      </a:r>
+                      <a:endParaRPr lang="en-GB" dirty="0"/>
+                    </a:p>
+                  </a:txBody>
+                  <a:tcPr/>
+                </a:tc>
+                <a:tc>
+                  <a:txBody>
+                    <a:bodyPr/>
+                    <a:lstStyle/>
+                    <a:p>
+                      <a:pPr marL="0" marR="0" lvl="0" indent="0" algn="l" defTabSz="914400" rtl="0" eaLnBrk="1" fontAlgn="auto" latinLnBrk="0" hangingPunct="1">
+                        <a:lnSpc>
+                          <a:spcPct val="100000"/>
+                        </a:lnSpc>
+                        <a:spcBef>
+                          <a:spcPts val="0"/>
+                        </a:spcBef>
+                        <a:spcAft>
+                          <a:spcPts val="0"/>
+                        </a:spcAft>
+                        <a:buClrTx/>
+                        <a:buSzTx/>
+                        <a:buFontTx/>
+                        <a:buNone/>
+                        <a:tabLst/>
+                        <a:defRPr/>
+                      </a:pPr>
+                      <a:r>
+                        <a:rPr lang="en-GB" dirty="0" err="1"/>
+                        <a:t>Täckta</a:t>
+                      </a:r>
+                      <a:r>
+                        <a:rPr lang="en-GB" dirty="0"/>
+                        <a:t> </a:t>
+                      </a:r>
+                      <a:r>
+                        <a:rPr lang="en-GB" dirty="0" err="1"/>
+                        <a:t>tillstånd</a:t>
+                      </a:r>
+                      <a:endParaRPr lang="en-GB" dirty="0"/>
+                    </a:p>
+                  </a:txBody>
+                  <a:tcPr/>
+                </a:tc>
+                <a:tc>
+                  <a:txBody>
+                    <a:bodyPr/>
+                    <a:lstStyle/>
+                    <a:p>
+                      <a:pPr marL="0" marR="0" lvl="0" indent="0" algn="l" defTabSz="914400" rtl="0" eaLnBrk="1" fontAlgn="auto" latinLnBrk="0" hangingPunct="1">
+                        <a:lnSpc>
+                          <a:spcPct val="100000"/>
+                        </a:lnSpc>
+                        <a:spcBef>
+                          <a:spcPts val="0"/>
+                        </a:spcBef>
+                        <a:spcAft>
+                          <a:spcPts val="0"/>
+                        </a:spcAft>
+                        <a:buClrTx/>
+                        <a:buSzTx/>
+                        <a:buFontTx/>
+                        <a:buNone/>
+                        <a:tabLst/>
+                        <a:defRPr/>
+                      </a:pPr>
+                      <a:r>
+                        <a:rPr lang="en-GB" dirty="0" err="1"/>
+                        <a:t>Täckta</a:t>
+                      </a:r>
+                      <a:r>
+                        <a:rPr lang="en-GB" dirty="0"/>
+                        <a:t> </a:t>
+                      </a:r>
+                      <a:r>
+                        <a:rPr lang="en-GB" dirty="0" err="1"/>
+                        <a:t>övergångar</a:t>
+                      </a:r>
+                      <a:endParaRPr lang="en-GB" dirty="0"/>
+                    </a:p>
+                  </a:txBody>
+                  <a:tcPr/>
+                </a:tc>
+                <a:extLst>
+                  <a:ext uri="{0D108BD9-81ED-4DB2-BD59-A6C34878D82A}">
+                    <a16:rowId xmlns:a16="http://schemas.microsoft.com/office/drawing/2014/main" val="2080756302"/>
+                  </a:ext>
+                </a:extLst>
+              </a:tr>
+              <a:tr h="370840">
+                <a:tc>
+                  <a:txBody>
+                    <a:bodyPr/>
+                    <a:lstStyle/>
+                    <a:p>
+                      <a:r>
+                        <a:rPr lang="en-GB" dirty="0"/>
+                        <a:t>1 (</a:t>
+                      </a:r>
+                      <a:r>
+                        <a:rPr lang="en-GB" dirty="0" err="1"/>
+                        <a:t>testAllTrueStateDiagram</a:t>
+                      </a:r>
+                      <a:r>
+                        <a:rPr lang="en-GB" dirty="0"/>
+                        <a:t>)</a:t>
+                      </a:r>
+                    </a:p>
+                  </a:txBody>
+                  <a:tcPr/>
+                </a:tc>
+                <a:tc>
+                  <a:txBody>
+                    <a:bodyPr/>
+                    <a:lstStyle/>
+                    <a:p>
+                      <a:pPr marL="342900" indent="-342900">
+                        <a:buAutoNum type="arabicPeriod"/>
+                      </a:pPr>
+                      <a:r>
+                        <a:rPr lang="en-GB" dirty="0"/>
+                        <a:t>Target lever</a:t>
+                      </a:r>
+                    </a:p>
+                    <a:p>
+                      <a:pPr marL="342900" indent="-342900">
+                        <a:buAutoNum type="arabicPeriod"/>
+                      </a:pPr>
+                      <a:r>
+                        <a:rPr lang="en-GB" dirty="0"/>
+                        <a:t>Target </a:t>
+                      </a:r>
+                      <a:r>
+                        <a:rPr lang="en-GB" dirty="0" err="1"/>
+                        <a:t>överlever</a:t>
+                      </a:r>
+                      <a:r>
+                        <a:rPr lang="en-GB" dirty="0"/>
+                        <a:t> potential </a:t>
+                      </a:r>
+                      <a:r>
+                        <a:rPr lang="en-GB" dirty="0" err="1"/>
+                        <a:t>effekt</a:t>
+                      </a:r>
+                      <a:endParaRPr lang="en-GB" dirty="0"/>
+                    </a:p>
+                    <a:p>
+                      <a:pPr marL="342900" indent="-342900">
+                        <a:buAutoNum type="arabicPeriod"/>
+                      </a:pPr>
+                      <a:r>
+                        <a:rPr lang="en-GB" dirty="0"/>
+                        <a:t>Combat </a:t>
+                      </a:r>
+                      <a:r>
+                        <a:rPr lang="en-GB" dirty="0" err="1"/>
+                        <a:t>är</a:t>
+                      </a:r>
+                      <a:r>
+                        <a:rPr lang="en-GB" dirty="0"/>
+                        <a:t> slut</a:t>
+                      </a:r>
+                    </a:p>
+                  </a:txBody>
+                  <a:tcPr/>
+                </a:tc>
+                <a:tc>
+                  <a:txBody>
+                    <a:bodyPr/>
+                    <a:lstStyle/>
+                    <a:p>
+                      <a:r>
+                        <a:rPr lang="en-GB" dirty="0" err="1"/>
+                        <a:t>getNextTargetWhoseTurnItIs</a:t>
+                      </a:r>
+                      <a:r>
+                        <a:rPr lang="en-GB" dirty="0"/>
+                        <a:t>(), </a:t>
+                      </a:r>
+                      <a:r>
+                        <a:rPr lang="en-GB" dirty="0" err="1"/>
+                        <a:t>ApplyEffects</a:t>
+                      </a:r>
+                      <a:r>
+                        <a:rPr lang="en-GB" dirty="0"/>
+                        <a:t>(), </a:t>
+                      </a:r>
+                      <a:r>
+                        <a:rPr lang="en-GB" dirty="0" err="1"/>
+                        <a:t>applyEffects</a:t>
+                      </a:r>
+                      <a:r>
+                        <a:rPr lang="en-GB" dirty="0"/>
+                        <a:t>(), </a:t>
+                      </a:r>
+                      <a:r>
+                        <a:rPr lang="en-GB" dirty="0" err="1"/>
+                        <a:t>isCombatFinished</a:t>
+                      </a:r>
+                      <a:r>
+                        <a:rPr lang="en-GB" dirty="0"/>
+                        <a:t>()</a:t>
+                      </a:r>
+                    </a:p>
+                  </a:txBody>
+                  <a:tcPr/>
+                </a:tc>
+                <a:tc>
+                  <a:txBody>
+                    <a:bodyPr/>
+                    <a:lstStyle/>
+                    <a:p>
+                      <a:pPr marL="0" marR="0" lvl="0" indent="0" algn="l" defTabSz="914400" rtl="0" eaLnBrk="1" fontAlgn="auto" latinLnBrk="0" hangingPunct="1">
+                        <a:lnSpc>
+                          <a:spcPct val="100000"/>
+                        </a:lnSpc>
+                        <a:spcBef>
+                          <a:spcPts val="0"/>
+                        </a:spcBef>
+                        <a:spcAft>
+                          <a:spcPts val="0"/>
+                        </a:spcAft>
+                        <a:buClrTx/>
+                        <a:buSzTx/>
+                        <a:buFontTx/>
+                        <a:buNone/>
+                        <a:tabLst/>
+                        <a:defRPr/>
+                      </a:pPr>
+                      <a:r>
+                        <a:rPr lang="en-GB" dirty="0" err="1"/>
+                        <a:t>t.isAlive</a:t>
+                      </a:r>
+                      <a:r>
+                        <a:rPr lang="en-GB" dirty="0"/>
+                        <a:t> = true, </a:t>
+                      </a:r>
+                      <a:r>
+                        <a:rPr lang="en-GB" dirty="0" err="1"/>
+                        <a:t>t.isAlive</a:t>
+                      </a:r>
+                      <a:r>
+                        <a:rPr lang="en-GB" dirty="0"/>
+                        <a:t> = true, </a:t>
+                      </a:r>
+                      <a:r>
+                        <a:rPr lang="en-GB" dirty="0" err="1"/>
+                        <a:t>isCombatFinished</a:t>
+                      </a:r>
+                      <a:r>
+                        <a:rPr lang="en-GB" dirty="0"/>
+                        <a:t>() = false</a:t>
+                      </a:r>
+                    </a:p>
+                    <a:p>
+                      <a:endParaRPr lang="en-GB" dirty="0"/>
+                    </a:p>
+                  </a:txBody>
+                  <a:tcPr/>
+                </a:tc>
+                <a:extLst>
+                  <a:ext uri="{0D108BD9-81ED-4DB2-BD59-A6C34878D82A}">
+                    <a16:rowId xmlns:a16="http://schemas.microsoft.com/office/drawing/2014/main" val="3359427079"/>
+                  </a:ext>
+                </a:extLst>
+              </a:tr>
+              <a:tr h="370840">
+                <a:tc>
+                  <a:txBody>
+                    <a:bodyPr/>
+                    <a:lstStyle/>
+                    <a:p>
+                      <a:r>
+                        <a:rPr lang="en-GB" dirty="0"/>
+                        <a:t>2 (</a:t>
+                      </a:r>
+                      <a:r>
+                        <a:rPr lang="en-GB" dirty="0" err="1"/>
+                        <a:t>testTrueFalseStateDiagram</a:t>
+                      </a:r>
+                      <a:r>
+                        <a:rPr lang="en-GB" dirty="0"/>
+                        <a:t>)</a:t>
+                      </a:r>
+                    </a:p>
+                  </a:txBody>
+                  <a:tcPr/>
+                </a:tc>
+                <a:tc>
+                  <a:txBody>
+                    <a:bodyPr/>
+                    <a:lstStyle/>
+                    <a:p>
+                      <a:pPr marL="342900" indent="-342900">
+                        <a:buAutoNum type="arabicPeriod"/>
+                      </a:pPr>
+                      <a:r>
+                        <a:rPr lang="en-GB" dirty="0"/>
+                        <a:t>Target lever</a:t>
+                      </a:r>
+                    </a:p>
+                    <a:p>
+                      <a:pPr marL="342900" indent="-342900">
+                        <a:buAutoNum type="arabicPeriod"/>
+                      </a:pPr>
+                      <a:r>
+                        <a:rPr lang="en-GB" dirty="0"/>
+                        <a:t>Target </a:t>
+                      </a:r>
+                      <a:r>
+                        <a:rPr lang="en-GB" dirty="0" err="1"/>
+                        <a:t>överlever</a:t>
+                      </a:r>
+                      <a:r>
+                        <a:rPr lang="en-GB" dirty="0"/>
+                        <a:t> </a:t>
+                      </a:r>
+                      <a:r>
+                        <a:rPr lang="en-GB" dirty="0" err="1"/>
+                        <a:t>inte</a:t>
+                      </a:r>
+                      <a:r>
+                        <a:rPr lang="en-GB" dirty="0"/>
+                        <a:t> </a:t>
+                      </a:r>
+                      <a:r>
+                        <a:rPr lang="en-GB" dirty="0" err="1"/>
+                        <a:t>potentiell</a:t>
+                      </a:r>
+                      <a:r>
+                        <a:rPr lang="en-GB" dirty="0"/>
+                        <a:t> effect</a:t>
+                      </a:r>
+                    </a:p>
+                    <a:p>
+                      <a:pPr marL="342900" indent="-342900">
+                        <a:buAutoNum type="arabicPeriod"/>
+                      </a:pPr>
+                      <a:r>
+                        <a:rPr lang="en-GB" dirty="0"/>
+                        <a:t>Combat </a:t>
+                      </a:r>
+                      <a:r>
+                        <a:rPr lang="en-GB" dirty="0" err="1"/>
+                        <a:t>är</a:t>
+                      </a:r>
+                      <a:r>
+                        <a:rPr lang="en-GB" dirty="0"/>
+                        <a:t> slut med </a:t>
+                      </a:r>
+                      <a:r>
+                        <a:rPr lang="en-GB" dirty="0" err="1"/>
+                        <a:t>död</a:t>
+                      </a:r>
+                      <a:r>
+                        <a:rPr lang="en-GB" dirty="0"/>
+                        <a:t> </a:t>
+                      </a:r>
+                      <a:r>
+                        <a:rPr lang="en-GB" dirty="0" err="1"/>
+                        <a:t>spelare</a:t>
+                      </a:r>
+                      <a:endParaRPr lang="en-GB" dirty="0"/>
+                    </a:p>
+                  </a:txBody>
+                  <a:tcPr/>
+                </a:tc>
+                <a:tc>
+                  <a:txBody>
+                    <a:bodyPr/>
+                    <a:lstStyle/>
+                    <a:p>
+                      <a:r>
+                        <a:rPr lang="en-GB" dirty="0" err="1"/>
+                        <a:t>getNextTargetWhoseTurnItIs</a:t>
+                      </a:r>
+                      <a:r>
+                        <a:rPr lang="en-GB" dirty="0"/>
+                        <a:t>(), </a:t>
+                      </a:r>
+                      <a:r>
+                        <a:rPr lang="en-GB" dirty="0" err="1"/>
+                        <a:t>ApplyEffects</a:t>
+                      </a:r>
+                      <a:r>
+                        <a:rPr lang="en-GB" dirty="0"/>
+                        <a:t>(), </a:t>
+                      </a:r>
+                      <a:r>
+                        <a:rPr lang="en-GB" dirty="0" err="1"/>
+                        <a:t>isCombatFinished</a:t>
+                      </a:r>
+                      <a:r>
+                        <a:rPr lang="en-GB" dirty="0"/>
+                        <a:t>()</a:t>
+                      </a:r>
+                    </a:p>
+                  </a:txBody>
+                  <a:tcPr/>
+                </a:tc>
+                <a:tc>
+                  <a:txBody>
+                    <a:bodyPr/>
+                    <a:lstStyle/>
+                    <a:p>
+                      <a:r>
+                        <a:rPr lang="en-GB" dirty="0" err="1"/>
+                        <a:t>t.isAlive</a:t>
+                      </a:r>
+                      <a:r>
+                        <a:rPr lang="en-GB" dirty="0"/>
+                        <a:t> = true, </a:t>
+                      </a:r>
+                      <a:r>
+                        <a:rPr lang="en-GB" dirty="0" err="1"/>
+                        <a:t>t.isAlive</a:t>
+                      </a:r>
+                      <a:r>
+                        <a:rPr lang="en-GB" dirty="0"/>
+                        <a:t> = false</a:t>
+                      </a:r>
+                    </a:p>
+                  </a:txBody>
+                  <a:tcPr/>
+                </a:tc>
+                <a:extLst>
+                  <a:ext uri="{0D108BD9-81ED-4DB2-BD59-A6C34878D82A}">
+                    <a16:rowId xmlns:a16="http://schemas.microsoft.com/office/drawing/2014/main" val="420505223"/>
+                  </a:ext>
+                </a:extLst>
+              </a:tr>
+              <a:tr h="370840">
+                <a:tc>
+                  <a:txBody>
+                    <a:bodyPr/>
+                    <a:lstStyle/>
+                    <a:p>
+                      <a:r>
+                        <a:rPr lang="en-GB" dirty="0"/>
+                        <a:t>3 (</a:t>
+                      </a:r>
+                      <a:r>
+                        <a:rPr lang="en-GB" dirty="0" err="1"/>
+                        <a:t>testFalseStateDiagram</a:t>
+                      </a:r>
+                      <a:r>
+                        <a:rPr lang="en-GB" dirty="0"/>
+                        <a:t>)</a:t>
+                      </a:r>
+                    </a:p>
+                  </a:txBody>
+                  <a:tcPr/>
+                </a:tc>
+                <a:tc>
+                  <a:txBody>
+                    <a:bodyPr/>
+                    <a:lstStyle/>
+                    <a:p>
+                      <a:pPr marL="342900" indent="-342900">
+                        <a:buAutoNum type="arabicPeriod"/>
+                      </a:pPr>
+                      <a:r>
+                        <a:rPr lang="en-GB" dirty="0"/>
+                        <a:t>Target lever </a:t>
+                      </a:r>
+                      <a:r>
+                        <a:rPr lang="en-GB" dirty="0" err="1"/>
+                        <a:t>inte</a:t>
+                      </a:r>
+                      <a:endParaRPr lang="en-GB" dirty="0"/>
+                    </a:p>
+                    <a:p>
+                      <a:pPr marL="342900" indent="-342900">
+                        <a:buAutoNum type="arabicPeriod"/>
+                      </a:pPr>
+                      <a:r>
+                        <a:rPr lang="en-GB" dirty="0"/>
+                        <a:t>Combat </a:t>
+                      </a:r>
+                      <a:r>
+                        <a:rPr lang="en-GB" dirty="0" err="1"/>
+                        <a:t>startar</a:t>
+                      </a:r>
+                      <a:r>
+                        <a:rPr lang="en-GB" dirty="0"/>
+                        <a:t> </a:t>
+                      </a:r>
+                      <a:r>
+                        <a:rPr lang="en-GB" dirty="0" err="1"/>
+                        <a:t>och</a:t>
+                      </a:r>
+                      <a:r>
+                        <a:rPr lang="en-GB" dirty="0"/>
+                        <a:t> </a:t>
+                      </a:r>
+                      <a:r>
+                        <a:rPr lang="en-GB" dirty="0" err="1"/>
+                        <a:t>slutar</a:t>
+                      </a:r>
+                      <a:r>
+                        <a:rPr lang="en-GB" dirty="0"/>
+                        <a:t> </a:t>
+                      </a:r>
+                      <a:r>
+                        <a:rPr lang="en-GB" dirty="0" err="1"/>
+                        <a:t>omedelbart</a:t>
+                      </a:r>
+                      <a:r>
+                        <a:rPr lang="en-GB" dirty="0"/>
+                        <a:t>.</a:t>
+                      </a:r>
+                    </a:p>
+                  </a:txBody>
+                  <a:tcPr/>
+                </a:tc>
+                <a:tc>
+                  <a:txBody>
+                    <a:bodyPr/>
+                    <a:lstStyle/>
+                    <a:p>
+                      <a:r>
+                        <a:rPr lang="en-GB" dirty="0" err="1"/>
+                        <a:t>getNextTargetWhoseTurnItIs</a:t>
+                      </a:r>
+                      <a:r>
+                        <a:rPr lang="en-GB" dirty="0"/>
+                        <a:t>(), </a:t>
+                      </a:r>
+                      <a:r>
+                        <a:rPr lang="en-GB" dirty="0" err="1"/>
+                        <a:t>isCombatFinished</a:t>
+                      </a:r>
+                      <a:r>
+                        <a:rPr lang="en-GB" dirty="0"/>
+                        <a:t>()</a:t>
+                      </a:r>
+                    </a:p>
+                  </a:txBody>
+                  <a:tcPr/>
+                </a:tc>
+                <a:tc>
+                  <a:txBody>
+                    <a:bodyPr/>
+                    <a:lstStyle/>
+                    <a:p>
+                      <a:r>
+                        <a:rPr lang="en-GB" dirty="0" err="1"/>
+                        <a:t>t.isAlive</a:t>
+                      </a:r>
+                      <a:r>
+                        <a:rPr lang="en-GB" dirty="0"/>
+                        <a:t> = false</a:t>
+                      </a:r>
+                    </a:p>
+                  </a:txBody>
+                  <a:tcPr/>
+                </a:tc>
+                <a:extLst>
+                  <a:ext uri="{0D108BD9-81ED-4DB2-BD59-A6C34878D82A}">
+                    <a16:rowId xmlns:a16="http://schemas.microsoft.com/office/drawing/2014/main" val="1543530647"/>
+                  </a:ext>
+                </a:extLst>
+              </a:tr>
+            </a:tbl>
+          </a:graphicData>
+        </a:graphic>
+      </p:graphicFrame>
     </p:spTree>
     <p:custDataLst>
       <p:tags r:id="rId1"/>
     </p:custDataLst>
     <p:extLst>
       <p:ext uri="{BB962C8B-B14F-4D97-AF65-F5344CB8AC3E}">
-        <p14:creationId xmlns:p14="http://schemas.microsoft.com/office/powerpoint/2010/main" val="2924590265"/>
+        <p14:creationId xmlns:p14="http://schemas.microsoft.com/office/powerpoint/2010/main" val="3990220432"/>
       </p:ext>
     </p:extLst>
   </p:cSld>
@@ -20414,154 +20708,6 @@
           <a:p>
             <a:r>
               <a:rPr lang="sv-SE" dirty="0"/>
-              <a:t>Testfall</a:t>
-            </a:r>
-          </a:p>
-        </p:txBody>
-      </p:sp>
-      <p:sp>
-        <p:nvSpPr>
-          <p:cNvPr id="3" name="Platshållare för innehåll 2"/>
-          <p:cNvSpPr>
-            <a:spLocks noGrp="1"/>
-          </p:cNvSpPr>
-          <p:nvPr>
-            <p:ph idx="1"/>
-          </p:nvPr>
-        </p:nvSpPr>
-        <p:spPr/>
-        <p:txBody>
-          <a:bodyPr/>
-          <a:lstStyle/>
-          <a:p>
-            <a:endParaRPr lang="sv-SE"/>
-          </a:p>
-        </p:txBody>
-      </p:sp>
-    </p:spTree>
-    <p:custDataLst>
-      <p:tags r:id="rId1"/>
-    </p:custDataLst>
-    <p:extLst>
-      <p:ext uri="{BB962C8B-B14F-4D97-AF65-F5344CB8AC3E}">
-        <p14:creationId xmlns:p14="http://schemas.microsoft.com/office/powerpoint/2010/main" val="1268711775"/>
-      </p:ext>
-    </p:extLst>
-  </p:cSld>
-  <p:clrMapOvr>
-    <a:masterClrMapping/>
-  </p:clrMapOvr>
-</p:sld>
-</file>
-
-<file path=ppt/slides/slide25.xml><?xml version="1.0" encoding="utf-8"?>
-<p:sld xmlns:a="http://schemas.openxmlformats.org/drawingml/2006/main" xmlns:r="http://schemas.openxmlformats.org/officeDocument/2006/relationships" xmlns:p="http://schemas.openxmlformats.org/presentationml/2006/main">
-  <p:cSld>
-    <p:spTree>
-      <p:nvGrpSpPr>
-        <p:cNvPr id="1" name=""/>
-        <p:cNvGrpSpPr/>
-        <p:nvPr/>
-      </p:nvGrpSpPr>
-      <p:grpSpPr>
-        <a:xfrm>
-          <a:off x="0" y="0"/>
-          <a:ext cx="0" cy="0"/>
-          <a:chOff x="0" y="0"/>
-          <a:chExt cx="0" cy="0"/>
-        </a:xfrm>
-      </p:grpSpPr>
-      <p:sp>
-        <p:nvSpPr>
-          <p:cNvPr id="2" name="Rubrik 1"/>
-          <p:cNvSpPr>
-            <a:spLocks noGrp="1"/>
-          </p:cNvSpPr>
-          <p:nvPr>
-            <p:ph type="title"/>
-          </p:nvPr>
-        </p:nvSpPr>
-        <p:spPr/>
-        <p:txBody>
-          <a:bodyPr/>
-          <a:lstStyle/>
-          <a:p>
-            <a:r>
-              <a:rPr lang="sv-SE" dirty="0"/>
-              <a:t>Testmatris</a:t>
-            </a:r>
-          </a:p>
-        </p:txBody>
-      </p:sp>
-      <p:sp>
-        <p:nvSpPr>
-          <p:cNvPr id="3" name="Platshållare för innehåll 2"/>
-          <p:cNvSpPr>
-            <a:spLocks noGrp="1"/>
-          </p:cNvSpPr>
-          <p:nvPr>
-            <p:ph idx="1"/>
-          </p:nvPr>
-        </p:nvSpPr>
-        <p:spPr/>
-        <p:txBody>
-          <a:bodyPr/>
-          <a:lstStyle/>
-          <a:p>
-            <a:endParaRPr lang="sv-SE"/>
-          </a:p>
-        </p:txBody>
-      </p:sp>
-    </p:spTree>
-    <p:custDataLst>
-      <p:tags r:id="rId1"/>
-    </p:custDataLst>
-    <p:extLst>
-      <p:ext uri="{BB962C8B-B14F-4D97-AF65-F5344CB8AC3E}">
-        <p14:creationId xmlns:p14="http://schemas.microsoft.com/office/powerpoint/2010/main" val="2129764329"/>
-      </p:ext>
-    </p:extLst>
-  </p:cSld>
-  <p:clrMapOvr>
-    <a:masterClrMapping/>
-  </p:clrMapOvr>
-</p:sld>
-</file>
-
-<file path=ppt/slides/slide26.xml><?xml version="1.0" encoding="utf-8"?>
-<p:sld xmlns:a="http://schemas.openxmlformats.org/drawingml/2006/main" xmlns:r="http://schemas.openxmlformats.org/officeDocument/2006/relationships" xmlns:p="http://schemas.openxmlformats.org/presentationml/2006/main">
-  <p:cSld>
-    <p:spTree>
-      <p:nvGrpSpPr>
-        <p:cNvPr id="1" name=""/>
-        <p:cNvGrpSpPr/>
-        <p:nvPr/>
-      </p:nvGrpSpPr>
-      <p:grpSpPr>
-        <a:xfrm>
-          <a:off x="0" y="0"/>
-          <a:ext cx="0" cy="0"/>
-          <a:chOff x="0" y="0"/>
-          <a:chExt cx="0" cy="0"/>
-        </a:xfrm>
-      </p:grpSpPr>
-      <p:sp>
-        <p:nvSpPr>
-          <p:cNvPr id="2" name="Rubrik 1"/>
-          <p:cNvSpPr>
-            <a:spLocks noGrp="1"/>
-          </p:cNvSpPr>
-          <p:nvPr>
-            <p:ph type="title"/>
-          </p:nvPr>
-        </p:nvSpPr>
-        <p:spPr/>
-        <p:txBody>
-          <a:bodyPr/>
-          <a:lstStyle/>
-          <a:p>
-            <a:r>
-              <a:rPr lang="sv-SE" dirty="0"/>
               <a:t>Granskning</a:t>
             </a:r>
           </a:p>
@@ -20627,7 +20773,7 @@
 </p:sld>
 </file>
 
-<file path=ppt/slides/slide27.xml><?xml version="1.0" encoding="utf-8"?>
+<file path=ppt/slides/slide25.xml><?xml version="1.0" encoding="utf-8"?>
 <p:sld xmlns:a="http://schemas.openxmlformats.org/drawingml/2006/main" xmlns:r="http://schemas.openxmlformats.org/officeDocument/2006/relationships" xmlns:p="http://schemas.openxmlformats.org/presentationml/2006/main">
   <p:cSld>
     <p:spTree>
@@ -20717,7 +20863,7 @@
 </p:sld>
 </file>
 
-<file path=ppt/slides/slide28.xml><?xml version="1.0" encoding="utf-8"?>
+<file path=ppt/slides/slide26.xml><?xml version="1.0" encoding="utf-8"?>
 <p:sld xmlns:a="http://schemas.openxmlformats.org/drawingml/2006/main" xmlns:r="http://schemas.openxmlformats.org/officeDocument/2006/relationships" xmlns:p="http://schemas.openxmlformats.org/presentationml/2006/main">
   <p:cSld>
     <p:spTree>
@@ -21133,7 +21279,7 @@
 </p:sld>
 </file>
 
-<file path=ppt/slides/slide29.xml><?xml version="1.0" encoding="utf-8"?>
+<file path=ppt/slides/slide27.xml><?xml version="1.0" encoding="utf-8"?>
 <p:sld xmlns:a="http://schemas.openxmlformats.org/drawingml/2006/main" xmlns:r="http://schemas.openxmlformats.org/officeDocument/2006/relationships" xmlns:p="http://schemas.openxmlformats.org/presentationml/2006/main">
   <p:cSld>
     <p:spTree>
@@ -21216,97 +21362,7 @@
 </p:sld>
 </file>
 
-<file path=ppt/slides/slide3.xml><?xml version="1.0" encoding="utf-8"?>
-<p:sld xmlns:a="http://schemas.openxmlformats.org/drawingml/2006/main" xmlns:r="http://schemas.openxmlformats.org/officeDocument/2006/relationships" xmlns:p="http://schemas.openxmlformats.org/presentationml/2006/main">
-  <p:cSld>
-    <p:spTree>
-      <p:nvGrpSpPr>
-        <p:cNvPr id="1" name=""/>
-        <p:cNvGrpSpPr/>
-        <p:nvPr/>
-      </p:nvGrpSpPr>
-      <p:grpSpPr>
-        <a:xfrm>
-          <a:off x="0" y="0"/>
-          <a:ext cx="0" cy="0"/>
-          <a:chOff x="0" y="0"/>
-          <a:chExt cx="0" cy="0"/>
-        </a:xfrm>
-      </p:grpSpPr>
-      <p:sp>
-        <p:nvSpPr>
-          <p:cNvPr id="2" name="Rubrik 1"/>
-          <p:cNvSpPr>
-            <a:spLocks noGrp="1"/>
-          </p:cNvSpPr>
-          <p:nvPr>
-            <p:ph type="title"/>
-          </p:nvPr>
-        </p:nvSpPr>
-        <p:spPr/>
-        <p:txBody>
-          <a:bodyPr/>
-          <a:lstStyle/>
-          <a:p>
-            <a:r>
-              <a:rPr lang="sv-SE" dirty="0"/>
-              <a:t>Slutlig design</a:t>
-            </a:r>
-          </a:p>
-        </p:txBody>
-      </p:sp>
-      <p:pic>
-        <p:nvPicPr>
-          <p:cNvPr id="9" name="Platshållare för innehåll 8" descr="En bild som visar skärmbild, dator&#10;&#10;Automatiskt genererad beskrivning">
-            <a:extLst>
-              <a:ext uri="{FF2B5EF4-FFF2-40B4-BE49-F238E27FC236}">
-                <a16:creationId xmlns:a16="http://schemas.microsoft.com/office/drawing/2014/main" id="{BEEEA538-F5D1-4046-BDE6-F446F66AC88C}"/>
-              </a:ext>
-            </a:extLst>
-          </p:cNvPr>
-          <p:cNvPicPr>
-            <a:picLocks noGrp="1" noChangeAspect="1"/>
-          </p:cNvPicPr>
-          <p:nvPr>
-            <p:ph idx="1"/>
-          </p:nvPr>
-        </p:nvPicPr>
-        <p:blipFill>
-          <a:blip r:embed="rId4" cstate="print">
-            <a:extLst>
-              <a:ext uri="{28A0092B-C50C-407E-A947-70E740481C1C}">
-                <a14:useLocalDpi xmlns:a14="http://schemas.microsoft.com/office/drawing/2010/main" val="0"/>
-              </a:ext>
-            </a:extLst>
-          </a:blip>
-          <a:stretch>
-            <a:fillRect/>
-          </a:stretch>
-        </p:blipFill>
-        <p:spPr>
-          <a:xfrm>
-            <a:off x="3438083" y="0"/>
-            <a:ext cx="9016675" cy="6967431"/>
-          </a:xfrm>
-        </p:spPr>
-      </p:pic>
-    </p:spTree>
-    <p:custDataLst>
-      <p:tags r:id="rId1"/>
-    </p:custDataLst>
-    <p:extLst>
-      <p:ext uri="{BB962C8B-B14F-4D97-AF65-F5344CB8AC3E}">
-        <p14:creationId xmlns:p14="http://schemas.microsoft.com/office/powerpoint/2010/main" val="3617610750"/>
-      </p:ext>
-    </p:extLst>
-  </p:cSld>
-  <p:clrMapOvr>
-    <a:masterClrMapping/>
-  </p:clrMapOvr>
-</p:sld>
-</file>
-
-<file path=ppt/slides/slide30.xml><?xml version="1.0" encoding="utf-8"?>
+<file path=ppt/slides/slide28.xml><?xml version="1.0" encoding="utf-8"?>
 <p:sld xmlns:a="http://schemas.openxmlformats.org/drawingml/2006/main" xmlns:r="http://schemas.openxmlformats.org/officeDocument/2006/relationships" xmlns:p="http://schemas.openxmlformats.org/presentationml/2006/main">
   <p:cSld>
     <p:bg>
@@ -21339,7 +21395,7 @@
                 <a16:creationId xmlns:a16="http://schemas.microsoft.com/office/drawing/2014/main" id="{823AC064-BC96-4F32-8AE1-B2FD38754823}"/>
               </a:ext>
               <a:ext uri="{C183D7F6-B498-43B3-948B-1728B52AA6E4}">
-                <adec:decorative xmlns:adec="http://schemas.microsoft.com/office/drawing/2017/decorative" xmlns="" val="1"/>
+                <adec:decorative xmlns:adec="http://schemas.microsoft.com/office/drawing/2017/decorative" val="1"/>
               </a:ext>
             </a:extLst>
           </p:cNvPr>
@@ -21476,7 +21532,7 @@
                 <a16:creationId xmlns:a16="http://schemas.microsoft.com/office/drawing/2014/main" id="{7E7C77BC-7138-40B1-A15B-20F57A494629}"/>
               </a:ext>
               <a:ext uri="{C183D7F6-B498-43B3-948B-1728B52AA6E4}">
-                <adec:decorative xmlns:adec="http://schemas.microsoft.com/office/drawing/2017/decorative" xmlns="" val="1"/>
+                <adec:decorative xmlns:adec="http://schemas.microsoft.com/office/drawing/2017/decorative" val="1"/>
               </a:ext>
             </a:extLst>
           </p:cNvPr>
@@ -21574,7 +21630,7 @@
 </p:sld>
 </file>
 
-<file path=ppt/slides/slide31.xml><?xml version="1.0" encoding="utf-8"?>
+<file path=ppt/slides/slide29.xml><?xml version="1.0" encoding="utf-8"?>
 <p:sld xmlns:a="http://schemas.openxmlformats.org/drawingml/2006/main" xmlns:r="http://schemas.openxmlformats.org/officeDocument/2006/relationships" xmlns:p="http://schemas.openxmlformats.org/presentationml/2006/main">
   <p:cSld>
     <p:bg>
@@ -21607,7 +21663,7 @@
                 <a16:creationId xmlns:a16="http://schemas.microsoft.com/office/drawing/2014/main" id="{D12DDE76-C203-4047-9998-63900085B5E8}"/>
               </a:ext>
               <a:ext uri="{C183D7F6-B498-43B3-948B-1728B52AA6E4}">
-                <adec:decorative xmlns:adec="http://schemas.microsoft.com/office/drawing/2017/decorative" xmlns="" val="1"/>
+                <adec:decorative xmlns:adec="http://schemas.microsoft.com/office/drawing/2017/decorative" val="1"/>
               </a:ext>
             </a:extLst>
           </p:cNvPr>
@@ -21857,7 +21913,97 @@
 </p:sld>
 </file>
 
-<file path=ppt/slides/slide32.xml><?xml version="1.0" encoding="utf-8"?>
+<file path=ppt/slides/slide3.xml><?xml version="1.0" encoding="utf-8"?>
+<p:sld xmlns:a="http://schemas.openxmlformats.org/drawingml/2006/main" xmlns:r="http://schemas.openxmlformats.org/officeDocument/2006/relationships" xmlns:p="http://schemas.openxmlformats.org/presentationml/2006/main">
+  <p:cSld>
+    <p:spTree>
+      <p:nvGrpSpPr>
+        <p:cNvPr id="1" name=""/>
+        <p:cNvGrpSpPr/>
+        <p:nvPr/>
+      </p:nvGrpSpPr>
+      <p:grpSpPr>
+        <a:xfrm>
+          <a:off x="0" y="0"/>
+          <a:ext cx="0" cy="0"/>
+          <a:chOff x="0" y="0"/>
+          <a:chExt cx="0" cy="0"/>
+        </a:xfrm>
+      </p:grpSpPr>
+      <p:sp>
+        <p:nvSpPr>
+          <p:cNvPr id="2" name="Rubrik 1"/>
+          <p:cNvSpPr>
+            <a:spLocks noGrp="1"/>
+          </p:cNvSpPr>
+          <p:nvPr>
+            <p:ph type="title"/>
+          </p:nvPr>
+        </p:nvSpPr>
+        <p:spPr/>
+        <p:txBody>
+          <a:bodyPr/>
+          <a:lstStyle/>
+          <a:p>
+            <a:r>
+              <a:rPr lang="sv-SE" dirty="0"/>
+              <a:t>Slutlig design</a:t>
+            </a:r>
+          </a:p>
+        </p:txBody>
+      </p:sp>
+      <p:pic>
+        <p:nvPicPr>
+          <p:cNvPr id="9" name="Platshållare för innehåll 8" descr="En bild som visar skärmbild, dator&#10;&#10;Automatiskt genererad beskrivning">
+            <a:extLst>
+              <a:ext uri="{FF2B5EF4-FFF2-40B4-BE49-F238E27FC236}">
+                <a16:creationId xmlns:a16="http://schemas.microsoft.com/office/drawing/2014/main" id="{BEEEA538-F5D1-4046-BDE6-F446F66AC88C}"/>
+              </a:ext>
+            </a:extLst>
+          </p:cNvPr>
+          <p:cNvPicPr>
+            <a:picLocks noGrp="1" noChangeAspect="1"/>
+          </p:cNvPicPr>
+          <p:nvPr>
+            <p:ph idx="1"/>
+          </p:nvPr>
+        </p:nvPicPr>
+        <p:blipFill>
+          <a:blip r:embed="rId4" cstate="print">
+            <a:extLst>
+              <a:ext uri="{28A0092B-C50C-407E-A947-70E740481C1C}">
+                <a14:useLocalDpi xmlns:a14="http://schemas.microsoft.com/office/drawing/2010/main" val="0"/>
+              </a:ext>
+            </a:extLst>
+          </a:blip>
+          <a:stretch>
+            <a:fillRect/>
+          </a:stretch>
+        </p:blipFill>
+        <p:spPr>
+          <a:xfrm>
+            <a:off x="3438083" y="0"/>
+            <a:ext cx="9016675" cy="6967431"/>
+          </a:xfrm>
+        </p:spPr>
+      </p:pic>
+    </p:spTree>
+    <p:custDataLst>
+      <p:tags r:id="rId1"/>
+    </p:custDataLst>
+    <p:extLst>
+      <p:ext uri="{BB962C8B-B14F-4D97-AF65-F5344CB8AC3E}">
+        <p14:creationId xmlns:p14="http://schemas.microsoft.com/office/powerpoint/2010/main" val="3617610750"/>
+      </p:ext>
+    </p:extLst>
+  </p:cSld>
+  <p:clrMapOvr>
+    <a:masterClrMapping/>
+  </p:clrMapOvr>
+</p:sld>
+</file>
+
+<file path=ppt/slides/slide30.xml><?xml version="1.0" encoding="utf-8"?>
 <p:sld xmlns:a="http://schemas.openxmlformats.org/drawingml/2006/main" xmlns:r="http://schemas.openxmlformats.org/officeDocument/2006/relationships" xmlns:p="http://schemas.openxmlformats.org/presentationml/2006/main">
   <p:cSld>
     <p:bg>
@@ -21890,7 +22036,7 @@
                 <a16:creationId xmlns:a16="http://schemas.microsoft.com/office/drawing/2014/main" id="{AB45A142-4255-493C-8284-5D566C121B10}"/>
               </a:ext>
               <a:ext uri="{C183D7F6-B498-43B3-948B-1728B52AA6E4}">
-                <adec:decorative xmlns:adec="http://schemas.microsoft.com/office/drawing/2017/decorative" xmlns="" val="1"/>
+                <adec:decorative xmlns:adec="http://schemas.microsoft.com/office/drawing/2017/decorative" val="1"/>
               </a:ext>
             </a:extLst>
           </p:cNvPr>
@@ -21996,7 +22142,7 @@
                 <a16:creationId xmlns:a16="http://schemas.microsoft.com/office/drawing/2014/main" id="{38FB9660-F42F-4313-BBC4-47C007FE484C}"/>
               </a:ext>
               <a:ext uri="{C183D7F6-B498-43B3-948B-1728B52AA6E4}">
-                <adec:decorative xmlns:adec="http://schemas.microsoft.com/office/drawing/2017/decorative" xmlns="" val="1"/>
+                <adec:decorative xmlns:adec="http://schemas.microsoft.com/office/drawing/2017/decorative" val="1"/>
               </a:ext>
             </a:extLst>
           </p:cNvPr>
@@ -22094,7 +22240,7 @@
 </p:sld>
 </file>
 
-<file path=ppt/slides/slide33.xml><?xml version="1.0" encoding="utf-8"?>
+<file path=ppt/slides/slide31.xml><?xml version="1.0" encoding="utf-8"?>
 <p:sld xmlns:a="http://schemas.openxmlformats.org/drawingml/2006/main" xmlns:r="http://schemas.openxmlformats.org/officeDocument/2006/relationships" xmlns:p="http://schemas.openxmlformats.org/presentationml/2006/main">
   <p:cSld>
     <p:spTree>
@@ -22127,10 +22273,9 @@
           <a:lstStyle/>
           <a:p>
             <a:r>
-              <a:rPr lang="sv-SE" dirty="0" smtClean="0"/>
+              <a:rPr lang="sv-SE" dirty="0"/>
               <a:t>Profiler</a:t>
             </a:r>
-            <a:endParaRPr lang="sv-SE" dirty="0"/>
           </a:p>
         </p:txBody>
       </p:sp>
@@ -22150,35 +22295,31 @@
           <a:lstStyle/>
           <a:p>
             <a:r>
-              <a:rPr lang="sv-SE" dirty="0" smtClean="0"/>
+              <a:rPr lang="sv-SE" dirty="0"/>
               <a:t>Vi skapade ett program som testade </a:t>
             </a:r>
             <a:r>
-              <a:rPr lang="sv-SE" dirty="0" err="1" smtClean="0"/>
+              <a:rPr lang="sv-SE" dirty="0" err="1"/>
               <a:t>combat</a:t>
             </a:r>
             <a:r>
-              <a:rPr lang="sv-SE" dirty="0" smtClean="0"/>
+              <a:rPr lang="sv-SE" dirty="0"/>
               <a:t> mellan </a:t>
             </a:r>
             <a:r>
-              <a:rPr lang="sv-SE" dirty="0" err="1" smtClean="0"/>
+              <a:rPr lang="sv-SE" dirty="0" err="1"/>
               <a:t>player</a:t>
             </a:r>
             <a:r>
-              <a:rPr lang="sv-SE" dirty="0" smtClean="0"/>
-              <a:t> och monsters i olika rum, och testade den koden med en profiler. </a:t>
-            </a:r>
-            <a:r>
-              <a:rPr lang="sv-SE" dirty="0" smtClean="0"/>
-              <a:t>Då programmet inte körs under någon längre tid, och endast testar ett scenario, valde vi att använda </a:t>
-            </a:r>
-            <a:r>
-              <a:rPr lang="sv-SE" dirty="0" err="1" smtClean="0"/>
+              <a:rPr lang="sv-SE" dirty="0"/>
+              <a:t> och monsters i olika rum, och testade den koden med en profiler. Då programmet inte körs under någon längre tid, och endast testar ett scenario, valde vi att använda </a:t>
+            </a:r>
+            <a:r>
+              <a:rPr lang="sv-SE" dirty="0" err="1"/>
               <a:t>tracing</a:t>
             </a:r>
             <a:r>
-              <a:rPr lang="sv-SE" dirty="0" smtClean="0"/>
+              <a:rPr lang="sv-SE" dirty="0"/>
               <a:t> istället för sampling. </a:t>
             </a:r>
           </a:p>
@@ -22203,7 +22344,7 @@
 </p:sld>
 </file>
 
-<file path=ppt/slides/slide34.xml><?xml version="1.0" encoding="utf-8"?>
+<file path=ppt/slides/slide32.xml><?xml version="1.0" encoding="utf-8"?>
 <p:sld xmlns:a="http://schemas.openxmlformats.org/drawingml/2006/main" xmlns:r="http://schemas.openxmlformats.org/officeDocument/2006/relationships" xmlns:p="http://schemas.openxmlformats.org/presentationml/2006/main">
   <p:cSld>
     <p:spTree>
@@ -22292,7 +22433,7 @@
 </p:sld>
 </file>
 
-<file path=ppt/slides/slide35.xml><?xml version="1.0" encoding="utf-8"?>
+<file path=ppt/slides/slide33.xml><?xml version="1.0" encoding="utf-8"?>
 <p:sld xmlns:a="http://schemas.openxmlformats.org/drawingml/2006/main" xmlns:r="http://schemas.openxmlformats.org/officeDocument/2006/relationships" xmlns:p="http://schemas.openxmlformats.org/presentationml/2006/main">
   <p:cSld>
     <p:spTree>
@@ -23478,18 +23619,6 @@
 </file>
 
 <file path=ppt/tags/tag34.xml><?xml version="1.0" encoding="utf-8"?>
-<p:tagLst xmlns:a="http://schemas.openxmlformats.org/drawingml/2006/main" xmlns:r="http://schemas.openxmlformats.org/officeDocument/2006/relationships" xmlns:p="http://schemas.openxmlformats.org/presentationml/2006/main">
-  <p:tag name="ARTICULATE_SLIDE_THUMBNAIL_REFRESH" val="1"/>
-</p:tagLst>
-</file>
-
-<file path=ppt/tags/tag35.xml><?xml version="1.0" encoding="utf-8"?>
-<p:tagLst xmlns:a="http://schemas.openxmlformats.org/drawingml/2006/main" xmlns:r="http://schemas.openxmlformats.org/officeDocument/2006/relationships" xmlns:p="http://schemas.openxmlformats.org/presentationml/2006/main">
-  <p:tag name="ARTICULATE_SLIDE_THUMBNAIL_REFRESH" val="1"/>
-</p:tagLst>
-</file>
-
-<file path=ppt/tags/tag36.xml><?xml version="1.0" encoding="utf-8"?>
 <p:tagLst xmlns:a="http://schemas.openxmlformats.org/drawingml/2006/main" xmlns:r="http://schemas.openxmlformats.org/officeDocument/2006/relationships" xmlns:p="http://schemas.openxmlformats.org/presentationml/2006/main">
   <p:tag name="ARTICULATE_SLIDE_THUMBNAIL_REFRESH" val="1"/>
 </p:tagLst>

</xml_diff>

<commit_message>
added expl to why samplebossmonster and main classes dont have 100% coverage
</commit_message>
<xml_diff>
--- a/slutredovisning.pptx
+++ b/slutredovisning.pptx
@@ -11507,6 +11507,19 @@
               </a:rPr>
               <a:t>Override</a:t>
             </a:r>
+            <a:r>
+              <a:rPr kumimoji="0" lang="sv-SE" altLang="sv-SE" sz="800" b="0" i="0" u="none" strike="noStrike" cap="none" normalizeH="0" baseline="0" dirty="0">
+                <a:ln>
+                  <a:noFill/>
+                </a:ln>
+                <a:solidFill>
+                  <a:srgbClr val="BBB529"/>
+                </a:solidFill>
+                <a:effectLst/>
+                <a:latin typeface="Consolas" panose="020B0609020204030204" pitchFamily="49" charset="0"/>
+              </a:rPr>
+              <a:t/>
+            </a:r>
             <a:br>
               <a:rPr kumimoji="0" lang="sv-SE" altLang="sv-SE" sz="800" b="0" i="0" u="none" strike="noStrike" cap="none" normalizeH="0" baseline="0" dirty="0">
                 <a:ln>
@@ -13472,6 +13485,19 @@
                 <a:latin typeface="Consolas" panose="020B0609020204030204" pitchFamily="49" charset="0"/>
               </a:rPr>
             </a:br>
+            <a:r>
+              <a:rPr kumimoji="0" lang="sv-SE" altLang="sv-SE" sz="1000" b="0" i="0" u="none" strike="noStrike" cap="none" normalizeH="0" baseline="0" dirty="0">
+                <a:ln>
+                  <a:noFill/>
+                </a:ln>
+                <a:solidFill>
+                  <a:srgbClr val="A9B7C6"/>
+                </a:solidFill>
+                <a:effectLst/>
+                <a:latin typeface="Consolas" panose="020B0609020204030204" pitchFamily="49" charset="0"/>
+              </a:rPr>
+              <a:t/>
+            </a:r>
             <a:br>
               <a:rPr kumimoji="0" lang="sv-SE" altLang="sv-SE" sz="1000" b="0" i="0" u="none" strike="noStrike" cap="none" normalizeH="0" baseline="0" dirty="0">
                 <a:ln>
@@ -18297,6 +18323,19 @@
               </a:rPr>
               <a:t>    }</a:t>
             </a:r>
+            <a:r>
+              <a:rPr kumimoji="0" lang="sv-SE" altLang="sv-SE" sz="800" b="0" i="0" u="none" strike="noStrike" cap="none" normalizeH="0" baseline="0" dirty="0">
+                <a:ln>
+                  <a:noFill/>
+                </a:ln>
+                <a:solidFill>
+                  <a:srgbClr val="CC7832"/>
+                </a:solidFill>
+                <a:effectLst/>
+                <a:latin typeface="Consolas" panose="020B0609020204030204" pitchFamily="49" charset="0"/>
+              </a:rPr>
+              <a:t/>
+            </a:r>
             <a:br>
               <a:rPr kumimoji="0" lang="sv-SE" altLang="sv-SE" sz="800" b="0" i="0" u="none" strike="noStrike" cap="none" normalizeH="0" baseline="0" dirty="0">
                 <a:ln>
@@ -18858,6 +18897,19 @@
                 <a:latin typeface="Consolas" panose="020B0609020204030204" pitchFamily="49" charset="0"/>
               </a:rPr>
             </a:br>
+            <a:r>
+              <a:rPr kumimoji="0" lang="sv-SE" altLang="sv-SE" sz="800" b="0" i="0" u="none" strike="noStrike" cap="none" normalizeH="0" baseline="0" dirty="0">
+                <a:ln>
+                  <a:noFill/>
+                </a:ln>
+                <a:solidFill>
+                  <a:srgbClr val="A9B7C6"/>
+                </a:solidFill>
+                <a:effectLst/>
+                <a:latin typeface="Consolas" panose="020B0609020204030204" pitchFamily="49" charset="0"/>
+              </a:rPr>
+              <a:t/>
+            </a:r>
             <a:br>
               <a:rPr kumimoji="0" lang="sv-SE" altLang="sv-SE" sz="800" b="0" i="0" u="none" strike="noStrike" cap="none" normalizeH="0" baseline="0" dirty="0">
                 <a:ln>
@@ -21395,7 +21447,7 @@
                 <a16:creationId xmlns:a16="http://schemas.microsoft.com/office/drawing/2014/main" id="{823AC064-BC96-4F32-8AE1-B2FD38754823}"/>
               </a:ext>
               <a:ext uri="{C183D7F6-B498-43B3-948B-1728B52AA6E4}">
-                <adec:decorative xmlns:adec="http://schemas.microsoft.com/office/drawing/2017/decorative" val="1"/>
+                <adec:decorative xmlns:adec="http://schemas.microsoft.com/office/drawing/2017/decorative" xmlns="" val="1"/>
               </a:ext>
             </a:extLst>
           </p:cNvPr>
@@ -21532,7 +21584,7 @@
                 <a16:creationId xmlns:a16="http://schemas.microsoft.com/office/drawing/2014/main" id="{7E7C77BC-7138-40B1-A15B-20F57A494629}"/>
               </a:ext>
               <a:ext uri="{C183D7F6-B498-43B3-948B-1728B52AA6E4}">
-                <adec:decorative xmlns:adec="http://schemas.microsoft.com/office/drawing/2017/decorative" val="1"/>
+                <adec:decorative xmlns:adec="http://schemas.microsoft.com/office/drawing/2017/decorative" xmlns="" val="1"/>
               </a:ext>
             </a:extLst>
           </p:cNvPr>
@@ -22484,7 +22536,7 @@
                 <a16:creationId xmlns:a16="http://schemas.microsoft.com/office/drawing/2014/main" id="{D12DDE76-C203-4047-9998-63900085B5E8}"/>
               </a:ext>
               <a:ext uri="{C183D7F6-B498-43B3-948B-1728B52AA6E4}">
-                <adec:decorative xmlns:adec="http://schemas.microsoft.com/office/drawing/2017/decorative" val="1"/>
+                <adec:decorative xmlns:adec="http://schemas.microsoft.com/office/drawing/2017/decorative" xmlns="" val="1"/>
               </a:ext>
             </a:extLst>
           </p:cNvPr>
@@ -22857,7 +22909,7 @@
                 <a16:creationId xmlns:a16="http://schemas.microsoft.com/office/drawing/2014/main" id="{AB45A142-4255-493C-8284-5D566C121B10}"/>
               </a:ext>
               <a:ext uri="{C183D7F6-B498-43B3-948B-1728B52AA6E4}">
-                <adec:decorative xmlns:adec="http://schemas.microsoft.com/office/drawing/2017/decorative" val="1"/>
+                <adec:decorative xmlns:adec="http://schemas.microsoft.com/office/drawing/2017/decorative" xmlns="" val="1"/>
               </a:ext>
             </a:extLst>
           </p:cNvPr>
@@ -22963,7 +23015,7 @@
                 <a16:creationId xmlns:a16="http://schemas.microsoft.com/office/drawing/2014/main" id="{38FB9660-F42F-4313-BBC4-47C007FE484C}"/>
               </a:ext>
               <a:ext uri="{C183D7F6-B498-43B3-948B-1728B52AA6E4}">
-                <adec:decorative xmlns:adec="http://schemas.microsoft.com/office/drawing/2017/decorative" val="1"/>
+                <adec:decorative xmlns:adec="http://schemas.microsoft.com/office/drawing/2017/decorative" xmlns="" val="1"/>
               </a:ext>
             </a:extLst>
           </p:cNvPr>
@@ -23045,6 +23097,400 @@
           </a:prstGeom>
         </p:spPr>
       </p:pic>
+      <p:sp>
+        <p:nvSpPr>
+          <p:cNvPr id="3" name="textruta 2"/>
+          <p:cNvSpPr txBox="1"/>
+          <p:nvPr/>
+        </p:nvSpPr>
+        <p:spPr>
+          <a:xfrm>
+            <a:off x="399795" y="5834643"/>
+            <a:ext cx="4206483" cy="600164"/>
+          </a:xfrm>
+          <a:prstGeom prst="rect">
+            <a:avLst/>
+          </a:prstGeom>
+          <a:noFill/>
+        </p:spPr>
+        <p:txBody>
+          <a:bodyPr wrap="square" rtlCol="0" anchor="b">
+            <a:spAutoFit/>
+          </a:bodyPr>
+          <a:lstStyle/>
+          <a:p>
+            <a:r>
+              <a:rPr lang="en-US" sz="1100" dirty="0">
+                <a:solidFill>
+                  <a:srgbClr val="FFFFFF"/>
+                </a:solidFill>
+              </a:rPr>
+              <a:t>Main </a:t>
+            </a:r>
+            <a:r>
+              <a:rPr lang="en-US" sz="1100" dirty="0" err="1">
+                <a:solidFill>
+                  <a:srgbClr val="FFFFFF"/>
+                </a:solidFill>
+              </a:rPr>
+              <a:t>har</a:t>
+            </a:r>
+            <a:r>
+              <a:rPr lang="en-US" sz="1100" dirty="0">
+                <a:solidFill>
+                  <a:srgbClr val="FFFFFF"/>
+                </a:solidFill>
+              </a:rPr>
+              <a:t> 0% </a:t>
+            </a:r>
+            <a:r>
+              <a:rPr lang="en-US" sz="1100" dirty="0" err="1">
+                <a:solidFill>
+                  <a:srgbClr val="FFFFFF"/>
+                </a:solidFill>
+              </a:rPr>
+              <a:t>täckningsgrad</a:t>
+            </a:r>
+            <a:r>
+              <a:rPr lang="en-US" sz="1100" dirty="0">
+                <a:solidFill>
+                  <a:srgbClr val="FFFFFF"/>
+                </a:solidFill>
+              </a:rPr>
+              <a:t> </a:t>
+            </a:r>
+            <a:r>
+              <a:rPr lang="en-US" sz="1100" dirty="0" err="1">
+                <a:solidFill>
+                  <a:srgbClr val="FFFFFF"/>
+                </a:solidFill>
+              </a:rPr>
+              <a:t>då</a:t>
+            </a:r>
+            <a:r>
+              <a:rPr lang="en-US" sz="1100" dirty="0">
+                <a:solidFill>
+                  <a:srgbClr val="FFFFFF"/>
+                </a:solidFill>
+              </a:rPr>
+              <a:t> </a:t>
+            </a:r>
+            <a:r>
+              <a:rPr lang="en-US" sz="1100" dirty="0" smtClean="0">
+                <a:solidFill>
+                  <a:srgbClr val="FFFFFF"/>
+                </a:solidFill>
+              </a:rPr>
+              <a:t> den </a:t>
+            </a:r>
+            <a:r>
+              <a:rPr lang="en-US" sz="1100" dirty="0" err="1" smtClean="0">
+                <a:solidFill>
+                  <a:srgbClr val="FFFFFF"/>
+                </a:solidFill>
+              </a:rPr>
+              <a:t>inte</a:t>
+            </a:r>
+            <a:r>
+              <a:rPr lang="en-US" sz="1100" dirty="0" smtClean="0">
+                <a:solidFill>
+                  <a:srgbClr val="FFFFFF"/>
+                </a:solidFill>
+              </a:rPr>
+              <a:t> </a:t>
+            </a:r>
+            <a:r>
+              <a:rPr lang="en-US" sz="1100" dirty="0" err="1" smtClean="0">
+                <a:solidFill>
+                  <a:srgbClr val="FFFFFF"/>
+                </a:solidFill>
+              </a:rPr>
+              <a:t>används</a:t>
+            </a:r>
+            <a:r>
+              <a:rPr lang="en-US" sz="1100" dirty="0" smtClean="0">
+                <a:solidFill>
+                  <a:srgbClr val="FFFFFF"/>
+                </a:solidFill>
+              </a:rPr>
+              <a:t>. </a:t>
+            </a:r>
+            <a:r>
+              <a:rPr lang="en-US" sz="1100" dirty="0" err="1" smtClean="0">
+                <a:solidFill>
+                  <a:srgbClr val="FFFFFF"/>
+                </a:solidFill>
+              </a:rPr>
+              <a:t>SampleBossMonster</a:t>
+            </a:r>
+            <a:r>
+              <a:rPr lang="en-US" sz="1100" dirty="0" smtClean="0">
+                <a:solidFill>
+                  <a:srgbClr val="FFFFFF"/>
+                </a:solidFill>
+              </a:rPr>
+              <a:t> </a:t>
+            </a:r>
+            <a:r>
+              <a:rPr lang="en-US" sz="1100" dirty="0" err="1">
+                <a:solidFill>
+                  <a:srgbClr val="FFFFFF"/>
+                </a:solidFill>
+              </a:rPr>
+              <a:t>har</a:t>
+            </a:r>
+            <a:r>
+              <a:rPr lang="en-US" sz="1100" dirty="0">
+                <a:solidFill>
+                  <a:srgbClr val="FFFFFF"/>
+                </a:solidFill>
+              </a:rPr>
+              <a:t> 66% </a:t>
+            </a:r>
+            <a:r>
+              <a:rPr lang="en-US" sz="1100" dirty="0" err="1">
+                <a:solidFill>
+                  <a:srgbClr val="FFFFFF"/>
+                </a:solidFill>
+              </a:rPr>
+              <a:t>täckningsgrad</a:t>
+            </a:r>
+            <a:r>
+              <a:rPr lang="en-US" sz="1100" dirty="0">
+                <a:solidFill>
+                  <a:srgbClr val="FFFFFF"/>
+                </a:solidFill>
+              </a:rPr>
+              <a:t> </a:t>
+            </a:r>
+            <a:r>
+              <a:rPr lang="en-US" sz="1100" dirty="0" err="1">
+                <a:solidFill>
+                  <a:srgbClr val="FFFFFF"/>
+                </a:solidFill>
+              </a:rPr>
+              <a:t>då</a:t>
+            </a:r>
+            <a:r>
+              <a:rPr lang="en-US" sz="1100" dirty="0">
+                <a:solidFill>
+                  <a:srgbClr val="FFFFFF"/>
+                </a:solidFill>
+              </a:rPr>
+              <a:t> den </a:t>
+            </a:r>
+            <a:r>
+              <a:rPr lang="en-US" sz="1100" dirty="0" err="1">
+                <a:solidFill>
+                  <a:srgbClr val="FFFFFF"/>
+                </a:solidFill>
+              </a:rPr>
+              <a:t>endast</a:t>
+            </a:r>
+            <a:r>
+              <a:rPr lang="en-US" sz="1100" dirty="0">
+                <a:solidFill>
+                  <a:srgbClr val="FFFFFF"/>
+                </a:solidFill>
+              </a:rPr>
+              <a:t> </a:t>
+            </a:r>
+            <a:r>
+              <a:rPr lang="en-US" sz="1100" dirty="0" err="1">
+                <a:solidFill>
+                  <a:srgbClr val="FFFFFF"/>
+                </a:solidFill>
+              </a:rPr>
+              <a:t>är</a:t>
+            </a:r>
+            <a:r>
+              <a:rPr lang="en-US" sz="1100" dirty="0">
+                <a:solidFill>
+                  <a:srgbClr val="FFFFFF"/>
+                </a:solidFill>
+              </a:rPr>
+              <a:t> </a:t>
+            </a:r>
+            <a:r>
+              <a:rPr lang="en-US" sz="1100" dirty="0" err="1">
+                <a:solidFill>
+                  <a:srgbClr val="FFFFFF"/>
+                </a:solidFill>
+              </a:rPr>
+              <a:t>en</a:t>
+            </a:r>
+            <a:r>
+              <a:rPr lang="en-US" sz="1100" dirty="0">
+                <a:solidFill>
+                  <a:srgbClr val="FFFFFF"/>
+                </a:solidFill>
+              </a:rPr>
+              <a:t> </a:t>
+            </a:r>
+            <a:r>
+              <a:rPr lang="en-US" sz="1100" dirty="0" err="1">
+                <a:solidFill>
+                  <a:srgbClr val="FFFFFF"/>
+                </a:solidFill>
+              </a:rPr>
+              <a:t>instansiering</a:t>
+            </a:r>
+            <a:r>
+              <a:rPr lang="en-US" sz="1100" dirty="0">
+                <a:solidFill>
+                  <a:srgbClr val="FFFFFF"/>
+                </a:solidFill>
+              </a:rPr>
+              <a:t> </a:t>
+            </a:r>
+            <a:r>
+              <a:rPr lang="en-US" sz="1100" dirty="0" err="1">
+                <a:solidFill>
+                  <a:srgbClr val="FFFFFF"/>
+                </a:solidFill>
+              </a:rPr>
+              <a:t>av</a:t>
+            </a:r>
+            <a:r>
+              <a:rPr lang="en-US" sz="1100" dirty="0">
+                <a:solidFill>
+                  <a:srgbClr val="FFFFFF"/>
+                </a:solidFill>
+              </a:rPr>
+              <a:t> </a:t>
+            </a:r>
+            <a:r>
+              <a:rPr lang="en-US" sz="1100" dirty="0" err="1">
+                <a:solidFill>
+                  <a:srgbClr val="FFFFFF"/>
+                </a:solidFill>
+              </a:rPr>
+              <a:t>BossMonster</a:t>
+            </a:r>
+            <a:r>
+              <a:rPr lang="en-US" sz="1100" dirty="0">
+                <a:solidFill>
+                  <a:srgbClr val="FFFFFF"/>
+                </a:solidFill>
+              </a:rPr>
+              <a:t>, </a:t>
+            </a:r>
+            <a:r>
+              <a:rPr lang="en-US" sz="1100" dirty="0" err="1">
+                <a:solidFill>
+                  <a:srgbClr val="FFFFFF"/>
+                </a:solidFill>
+              </a:rPr>
+              <a:t>och</a:t>
+            </a:r>
+            <a:r>
+              <a:rPr lang="en-US" sz="1100" dirty="0">
+                <a:solidFill>
+                  <a:srgbClr val="FFFFFF"/>
+                </a:solidFill>
+              </a:rPr>
+              <a:t> </a:t>
+            </a:r>
+            <a:r>
+              <a:rPr lang="en-US" sz="1100" dirty="0" err="1">
+                <a:solidFill>
+                  <a:srgbClr val="FFFFFF"/>
+                </a:solidFill>
+              </a:rPr>
+              <a:t>alltså</a:t>
+            </a:r>
+            <a:r>
+              <a:rPr lang="en-US" sz="1100" dirty="0">
+                <a:solidFill>
+                  <a:srgbClr val="FFFFFF"/>
+                </a:solidFill>
+              </a:rPr>
+              <a:t> </a:t>
+            </a:r>
+            <a:r>
+              <a:rPr lang="en-US" sz="1100" dirty="0" err="1">
+                <a:solidFill>
+                  <a:srgbClr val="FFFFFF"/>
+                </a:solidFill>
+              </a:rPr>
+              <a:t>inte</a:t>
+            </a:r>
+            <a:r>
+              <a:rPr lang="en-US" sz="1100" dirty="0">
+                <a:solidFill>
+                  <a:srgbClr val="FFFFFF"/>
+                </a:solidFill>
+              </a:rPr>
+              <a:t> </a:t>
+            </a:r>
+            <a:r>
+              <a:rPr lang="en-US" sz="1100" dirty="0" err="1">
+                <a:solidFill>
+                  <a:srgbClr val="FFFFFF"/>
+                </a:solidFill>
+              </a:rPr>
+              <a:t>en</a:t>
+            </a:r>
+            <a:r>
+              <a:rPr lang="en-US" sz="1100" dirty="0">
+                <a:solidFill>
+                  <a:srgbClr val="FFFFFF"/>
+                </a:solidFill>
+              </a:rPr>
+              <a:t> </a:t>
+            </a:r>
+            <a:r>
+              <a:rPr lang="en-US" sz="1100" dirty="0" err="1">
+                <a:solidFill>
+                  <a:srgbClr val="FFFFFF"/>
+                </a:solidFill>
+              </a:rPr>
+              <a:t>egentlig</a:t>
+            </a:r>
+            <a:r>
+              <a:rPr lang="en-US" sz="1100" dirty="0">
+                <a:solidFill>
+                  <a:srgbClr val="FFFFFF"/>
+                </a:solidFill>
+              </a:rPr>
+              <a:t> del </a:t>
+            </a:r>
+            <a:r>
+              <a:rPr lang="en-US" sz="1100" dirty="0" err="1">
+                <a:solidFill>
+                  <a:srgbClr val="FFFFFF"/>
+                </a:solidFill>
+              </a:rPr>
+              <a:t>av</a:t>
+            </a:r>
+            <a:r>
+              <a:rPr lang="en-US" sz="1100" dirty="0">
+                <a:solidFill>
+                  <a:srgbClr val="FFFFFF"/>
+                </a:solidFill>
+              </a:rPr>
+              <a:t> </a:t>
+            </a:r>
+            <a:r>
+              <a:rPr lang="en-US" sz="1100" dirty="0" err="1">
+                <a:solidFill>
+                  <a:srgbClr val="FFFFFF"/>
+                </a:solidFill>
+              </a:rPr>
+              <a:t>programmet</a:t>
+            </a:r>
+            <a:r>
+              <a:rPr lang="en-US" sz="1100" dirty="0">
+                <a:solidFill>
+                  <a:srgbClr val="FFFFFF"/>
+                </a:solidFill>
+              </a:rPr>
+              <a:t>. </a:t>
+            </a:r>
+            <a:endParaRPr lang="sv-SE" sz="1100" dirty="0"/>
+          </a:p>
+        </p:txBody>
+      </p:sp>
     </p:spTree>
     <p:custDataLst>
       <p:tags r:id="rId1"/>

</xml_diff>